<commit_message>
Added ADN Slide to presentation.
</commit_message>
<xml_diff>
--- a/Presentation/THasINKync.pptx
+++ b/Presentation/THasINKync.pptx
@@ -3,11 +3,13 @@
 <p:presentation xmlns:a="http://schemas.openxmlformats.org/drawingml/2006/main" xmlns:r="http://schemas.openxmlformats.org/officeDocument/2006/relationships" xmlns:p="http://schemas.openxmlformats.org/presentationml/2006/main" saveSubsetFonts="1" autoCompressPictures="0">
   <p:sldMasterIdLst>
     <p:sldMasterId id="2147483648" r:id="rId4"/>
+    <p:sldMasterId id="2147483660" r:id="rId5"/>
   </p:sldMasterIdLst>
   <p:sldIdLst>
-    <p:sldId id="256" r:id="rId5"/>
-    <p:sldId id="257" r:id="rId6"/>
-    <p:sldId id="258" r:id="rId7"/>
+    <p:sldId id="256" r:id="rId6"/>
+    <p:sldId id="259" r:id="rId7"/>
+    <p:sldId id="257" r:id="rId8"/>
+    <p:sldId id="258" r:id="rId9"/>
   </p:sldIdLst>
   <p:sldSz cx="9144000" cy="6858000" type="screen4x3"/>
   <p:notesSz cx="6858000" cy="9144000"/>
@@ -343,7 +345,7 @@
           <a:p>
             <a:fld id="{2A7CB402-B72D-3346-9EA5-354251120F9E}" type="datetimeFigureOut">
               <a:rPr lang="en-US" smtClean="0"/>
-              <a:t>4/10/2015</a:t>
+              <a:t>6/14/2015</a:t>
             </a:fld>
             <a:endParaRPr lang="en-US"/>
           </a:p>
@@ -560,7 +562,7 @@
           <a:p>
             <a:fld id="{2A7CB402-B72D-3346-9EA5-354251120F9E}" type="datetimeFigureOut">
               <a:rPr lang="en-US" smtClean="0"/>
-              <a:t>4/10/2015</a:t>
+              <a:t>6/14/2015</a:t>
             </a:fld>
             <a:endParaRPr lang="en-US"/>
           </a:p>
@@ -721,7 +723,7 @@
           <a:p>
             <a:fld id="{2A7CB402-B72D-3346-9EA5-354251120F9E}" type="datetimeFigureOut">
               <a:rPr lang="en-US" smtClean="0"/>
-              <a:t>4/10/2015</a:t>
+              <a:t>6/14/2015</a:t>
             </a:fld>
             <a:endParaRPr lang="en-US"/>
           </a:p>
@@ -754,6 +756,230 @@
     <p:extLst>
       <p:ext uri="{BB962C8B-B14F-4D97-AF65-F5344CB8AC3E}">
         <p14:creationId xmlns:p14="http://schemas.microsoft.com/office/powerpoint/2010/main" val="186437517"/>
+      </p:ext>
+    </p:extLst>
+  </p:cSld>
+  <p:clrMapOvr>
+    <a:masterClrMapping/>
+  </p:clrMapOvr>
+</p:sldLayout>
+</file>
+
+<file path=ppt/slideLayouts/slideLayout12.xml><?xml version="1.0" encoding="utf-8"?>
+<p:sldLayout xmlns:a="http://schemas.openxmlformats.org/drawingml/2006/main" xmlns:r="http://schemas.openxmlformats.org/officeDocument/2006/relationships" xmlns:p="http://schemas.openxmlformats.org/presentationml/2006/main" type="title">
+  <p:cSld name="Title Slide">
+    <p:spTree>
+      <p:nvGrpSpPr>
+        <p:cNvPr id="1" name=""/>
+        <p:cNvGrpSpPr/>
+        <p:nvPr/>
+      </p:nvGrpSpPr>
+      <p:grpSpPr>
+        <a:xfrm>
+          <a:off x="0" y="0"/>
+          <a:ext cx="0" cy="0"/>
+          <a:chOff x="0" y="0"/>
+          <a:chExt cx="0" cy="0"/>
+        </a:xfrm>
+      </p:grpSpPr>
+      <p:sp>
+        <p:nvSpPr>
+          <p:cNvPr id="2" name="Title 1"/>
+          <p:cNvSpPr>
+            <a:spLocks noGrp="1"/>
+          </p:cNvSpPr>
+          <p:nvPr>
+            <p:ph type="ctrTitle"/>
+          </p:nvPr>
+        </p:nvSpPr>
+        <p:spPr>
+          <a:xfrm>
+            <a:off x="1143000" y="1122363"/>
+            <a:ext cx="6858000" cy="2387600"/>
+          </a:xfrm>
+        </p:spPr>
+        <p:txBody>
+          <a:bodyPr anchor="b"/>
+          <a:lstStyle>
+            <a:lvl1pPr algn="ctr">
+              <a:defRPr sz="4500"/>
+            </a:lvl1pPr>
+          </a:lstStyle>
+          <a:p>
+            <a:r>
+              <a:rPr lang="en-US" smtClean="0"/>
+              <a:t>Click to edit Master title style</a:t>
+            </a:r>
+            <a:endParaRPr lang="en-US" dirty="0"/>
+          </a:p>
+        </p:txBody>
+      </p:sp>
+      <p:sp>
+        <p:nvSpPr>
+          <p:cNvPr id="3" name="Subtitle 2"/>
+          <p:cNvSpPr>
+            <a:spLocks noGrp="1"/>
+          </p:cNvSpPr>
+          <p:nvPr>
+            <p:ph type="subTitle" idx="1"/>
+          </p:nvPr>
+        </p:nvSpPr>
+        <p:spPr>
+          <a:xfrm>
+            <a:off x="1143000" y="3602038"/>
+            <a:ext cx="6858000" cy="1655762"/>
+          </a:xfrm>
+        </p:spPr>
+        <p:txBody>
+          <a:bodyPr/>
+          <a:lstStyle>
+            <a:lvl1pPr marL="0" indent="0" algn="ctr">
+              <a:buNone/>
+              <a:defRPr sz="1800"/>
+            </a:lvl1pPr>
+            <a:lvl2pPr marL="342900" indent="0" algn="ctr">
+              <a:buNone/>
+              <a:defRPr sz="1500"/>
+            </a:lvl2pPr>
+            <a:lvl3pPr marL="685800" indent="0" algn="ctr">
+              <a:buNone/>
+              <a:defRPr sz="1350"/>
+            </a:lvl3pPr>
+            <a:lvl4pPr marL="1028700" indent="0" algn="ctr">
+              <a:buNone/>
+              <a:defRPr sz="1200"/>
+            </a:lvl4pPr>
+            <a:lvl5pPr marL="1371600" indent="0" algn="ctr">
+              <a:buNone/>
+              <a:defRPr sz="1200"/>
+            </a:lvl5pPr>
+            <a:lvl6pPr marL="1714500" indent="0" algn="ctr">
+              <a:buNone/>
+              <a:defRPr sz="1200"/>
+            </a:lvl6pPr>
+            <a:lvl7pPr marL="2057400" indent="0" algn="ctr">
+              <a:buNone/>
+              <a:defRPr sz="1200"/>
+            </a:lvl7pPr>
+            <a:lvl8pPr marL="2400300" indent="0" algn="ctr">
+              <a:buNone/>
+              <a:defRPr sz="1200"/>
+            </a:lvl8pPr>
+            <a:lvl9pPr marL="2743200" indent="0" algn="ctr">
+              <a:buNone/>
+              <a:defRPr sz="1200"/>
+            </a:lvl9pPr>
+          </a:lstStyle>
+          <a:p>
+            <a:r>
+              <a:rPr lang="en-US" smtClean="0"/>
+              <a:t>Click to edit Master subtitle style</a:t>
+            </a:r>
+            <a:endParaRPr lang="en-US" dirty="0"/>
+          </a:p>
+        </p:txBody>
+      </p:sp>
+      <p:sp>
+        <p:nvSpPr>
+          <p:cNvPr id="4" name="Date Placeholder 3"/>
+          <p:cNvSpPr>
+            <a:spLocks noGrp="1"/>
+          </p:cNvSpPr>
+          <p:nvPr>
+            <p:ph type="dt" sz="half" idx="10"/>
+          </p:nvPr>
+        </p:nvSpPr>
+        <p:spPr/>
+        <p:txBody>
+          <a:bodyPr/>
+          <a:lstStyle/>
+          <a:p>
+            <a:fld id="{4CFFEE8A-0C3B-4CE3-BDBE-3AB865C6E9B1}" type="datetimeFigureOut">
+              <a:rPr lang="en-US" smtClean="0">
+                <a:solidFill>
+                  <a:prstClr val="black">
+                    <a:tint val="75000"/>
+                  </a:prstClr>
+                </a:solidFill>
+              </a:rPr>
+              <a:pPr/>
+              <a:t>6/14/2015</a:t>
+            </a:fld>
+            <a:endParaRPr lang="en-US">
+              <a:solidFill>
+                <a:prstClr val="black">
+                  <a:tint val="75000"/>
+                </a:prstClr>
+              </a:solidFill>
+            </a:endParaRPr>
+          </a:p>
+        </p:txBody>
+      </p:sp>
+      <p:sp>
+        <p:nvSpPr>
+          <p:cNvPr id="5" name="Footer Placeholder 4"/>
+          <p:cNvSpPr>
+            <a:spLocks noGrp="1"/>
+          </p:cNvSpPr>
+          <p:nvPr>
+            <p:ph type="ftr" sz="quarter" idx="11"/>
+          </p:nvPr>
+        </p:nvSpPr>
+        <p:spPr/>
+        <p:txBody>
+          <a:bodyPr/>
+          <a:lstStyle/>
+          <a:p>
+            <a:endParaRPr lang="en-US">
+              <a:solidFill>
+                <a:prstClr val="black">
+                  <a:tint val="75000"/>
+                </a:prstClr>
+              </a:solidFill>
+            </a:endParaRPr>
+          </a:p>
+        </p:txBody>
+      </p:sp>
+      <p:sp>
+        <p:nvSpPr>
+          <p:cNvPr id="6" name="Slide Number Placeholder 5"/>
+          <p:cNvSpPr>
+            <a:spLocks noGrp="1"/>
+          </p:cNvSpPr>
+          <p:nvPr>
+            <p:ph type="sldNum" sz="quarter" idx="12"/>
+          </p:nvPr>
+        </p:nvSpPr>
+        <p:spPr/>
+        <p:txBody>
+          <a:bodyPr/>
+          <a:lstStyle/>
+          <a:p>
+            <a:fld id="{E0DBC28C-C8D9-41EE-A049-76BA2ACCFAA1}" type="slidenum">
+              <a:rPr lang="en-US" smtClean="0">
+                <a:solidFill>
+                  <a:prstClr val="black">
+                    <a:tint val="75000"/>
+                  </a:prstClr>
+                </a:solidFill>
+              </a:rPr>
+              <a:pPr/>
+              <a:t>‹#›</a:t>
+            </a:fld>
+            <a:endParaRPr lang="en-US">
+              <a:solidFill>
+                <a:prstClr val="black">
+                  <a:tint val="75000"/>
+                </a:prstClr>
+              </a:solidFill>
+            </a:endParaRPr>
+          </a:p>
+        </p:txBody>
+      </p:sp>
+    </p:spTree>
+    <p:extLst>
+      <p:ext uri="{BB962C8B-B14F-4D97-AF65-F5344CB8AC3E}">
+        <p14:creationId xmlns:p14="http://schemas.microsoft.com/office/powerpoint/2010/main" val="1958623038"/>
       </p:ext>
     </p:extLst>
   </p:cSld>
@@ -944,7 +1170,7 @@
           <a:p>
             <a:fld id="{2A7CB402-B72D-3346-9EA5-354251120F9E}" type="datetimeFigureOut">
               <a:rPr lang="en-US" smtClean="0"/>
-              <a:t>4/10/2015</a:t>
+              <a:t>6/14/2015</a:t>
             </a:fld>
             <a:endParaRPr lang="en-US"/>
           </a:p>
@@ -1283,7 +1509,7 @@
           <a:p>
             <a:fld id="{2A7CB402-B72D-3346-9EA5-354251120F9E}" type="datetimeFigureOut">
               <a:rPr lang="en-US" smtClean="0"/>
-              <a:t>4/10/2015</a:t>
+              <a:t>6/14/2015</a:t>
             </a:fld>
             <a:endParaRPr lang="en-US"/>
           </a:p>
@@ -1661,7 +1887,7 @@
           <a:p>
             <a:fld id="{2A7CB402-B72D-3346-9EA5-354251120F9E}" type="datetimeFigureOut">
               <a:rPr lang="en-US" smtClean="0"/>
-              <a:t>4/10/2015</a:t>
+              <a:t>6/14/2015</a:t>
             </a:fld>
             <a:endParaRPr lang="en-US"/>
           </a:p>
@@ -2177,7 +2403,7 @@
           <a:p>
             <a:fld id="{2A7CB402-B72D-3346-9EA5-354251120F9E}" type="datetimeFigureOut">
               <a:rPr lang="en-US" smtClean="0"/>
-              <a:t>4/10/2015</a:t>
+              <a:t>6/14/2015</a:t>
             </a:fld>
             <a:endParaRPr lang="en-US"/>
           </a:p>
@@ -2345,7 +2571,7 @@
           <a:p>
             <a:fld id="{2A7CB402-B72D-3346-9EA5-354251120F9E}" type="datetimeFigureOut">
               <a:rPr lang="en-US" smtClean="0"/>
-              <a:t>4/10/2015</a:t>
+              <a:t>6/14/2015</a:t>
             </a:fld>
             <a:endParaRPr lang="en-US"/>
           </a:p>
@@ -2475,7 +2701,7 @@
           <a:p>
             <a:fld id="{2A7CB402-B72D-3346-9EA5-354251120F9E}" type="datetimeFigureOut">
               <a:rPr lang="en-US" smtClean="0"/>
-              <a:t>4/10/2015</a:t>
+              <a:t>6/14/2015</a:t>
             </a:fld>
             <a:endParaRPr lang="en-US"/>
           </a:p>
@@ -2823,7 +3049,7 @@
           <a:p>
             <a:fld id="{2A7CB402-B72D-3346-9EA5-354251120F9E}" type="datetimeFigureOut">
               <a:rPr lang="en-US" smtClean="0"/>
-              <a:t>4/10/2015</a:t>
+              <a:t>6/14/2015</a:t>
             </a:fld>
             <a:endParaRPr lang="en-US"/>
           </a:p>
@@ -3061,7 +3287,7 @@
           <a:p>
             <a:fld id="{2A7CB402-B72D-3346-9EA5-354251120F9E}" type="datetimeFigureOut">
               <a:rPr lang="en-US" smtClean="0"/>
-              <a:t>4/10/2015</a:t>
+              <a:t>6/14/2015</a:t>
             </a:fld>
             <a:endParaRPr lang="en-US"/>
           </a:p>
@@ -3255,7 +3481,7 @@
           <a:p>
             <a:fld id="{2A7CB402-B72D-3346-9EA5-354251120F9E}" type="datetimeFigureOut">
               <a:rPr lang="en-US" smtClean="0"/>
-              <a:t>4/10/2015</a:t>
+              <a:t>6/14/2015</a:t>
             </a:fld>
             <a:endParaRPr lang="en-US"/>
           </a:p>
@@ -3576,6 +3802,571 @@
 </p:sldMaster>
 </file>
 
+<file path=ppt/slideMasters/slideMaster2.xml><?xml version="1.0" encoding="utf-8"?>
+<p:sldMaster xmlns:a="http://schemas.openxmlformats.org/drawingml/2006/main" xmlns:r="http://schemas.openxmlformats.org/officeDocument/2006/relationships" xmlns:p="http://schemas.openxmlformats.org/presentationml/2006/main">
+  <p:cSld>
+    <p:bg>
+      <p:bgRef idx="1001">
+        <a:schemeClr val="bg1"/>
+      </p:bgRef>
+    </p:bg>
+    <p:spTree>
+      <p:nvGrpSpPr>
+        <p:cNvPr id="1" name=""/>
+        <p:cNvGrpSpPr/>
+        <p:nvPr/>
+      </p:nvGrpSpPr>
+      <p:grpSpPr>
+        <a:xfrm>
+          <a:off x="0" y="0"/>
+          <a:ext cx="0" cy="0"/>
+          <a:chOff x="0" y="0"/>
+          <a:chExt cx="0" cy="0"/>
+        </a:xfrm>
+      </p:grpSpPr>
+      <p:sp>
+        <p:nvSpPr>
+          <p:cNvPr id="2" name="Title Placeholder 1"/>
+          <p:cNvSpPr>
+            <a:spLocks noGrp="1"/>
+          </p:cNvSpPr>
+          <p:nvPr>
+            <p:ph type="title"/>
+          </p:nvPr>
+        </p:nvSpPr>
+        <p:spPr>
+          <a:xfrm>
+            <a:off x="628650" y="365126"/>
+            <a:ext cx="7886700" cy="1325563"/>
+          </a:xfrm>
+          <a:prstGeom prst="rect">
+            <a:avLst/>
+          </a:prstGeom>
+        </p:spPr>
+        <p:txBody>
+          <a:bodyPr vert="horz" lIns="91440" tIns="45720" rIns="91440" bIns="45720" rtlCol="0" anchor="ctr">
+            <a:normAutofit/>
+          </a:bodyPr>
+          <a:lstStyle/>
+          <a:p>
+            <a:r>
+              <a:rPr lang="en-US" smtClean="0"/>
+              <a:t>Click to edit Master title style</a:t>
+            </a:r>
+            <a:endParaRPr lang="en-US" dirty="0"/>
+          </a:p>
+        </p:txBody>
+      </p:sp>
+      <p:sp>
+        <p:nvSpPr>
+          <p:cNvPr id="3" name="Text Placeholder 2"/>
+          <p:cNvSpPr>
+            <a:spLocks noGrp="1"/>
+          </p:cNvSpPr>
+          <p:nvPr>
+            <p:ph type="body" idx="1"/>
+          </p:nvPr>
+        </p:nvSpPr>
+        <p:spPr>
+          <a:xfrm>
+            <a:off x="628650" y="1825625"/>
+            <a:ext cx="7886700" cy="4351338"/>
+          </a:xfrm>
+          <a:prstGeom prst="rect">
+            <a:avLst/>
+          </a:prstGeom>
+        </p:spPr>
+        <p:txBody>
+          <a:bodyPr vert="horz" lIns="91440" tIns="45720" rIns="91440" bIns="45720" rtlCol="0">
+            <a:normAutofit/>
+          </a:bodyPr>
+          <a:lstStyle/>
+          <a:p>
+            <a:pPr lvl="0"/>
+            <a:r>
+              <a:rPr lang="en-US" smtClean="0"/>
+              <a:t>Click to edit Master text styles</a:t>
+            </a:r>
+          </a:p>
+          <a:p>
+            <a:pPr lvl="1"/>
+            <a:r>
+              <a:rPr lang="en-US" smtClean="0"/>
+              <a:t>Second level</a:t>
+            </a:r>
+          </a:p>
+          <a:p>
+            <a:pPr lvl="2"/>
+            <a:r>
+              <a:rPr lang="en-US" smtClean="0"/>
+              <a:t>Third level</a:t>
+            </a:r>
+          </a:p>
+          <a:p>
+            <a:pPr lvl="3"/>
+            <a:r>
+              <a:rPr lang="en-US" smtClean="0"/>
+              <a:t>Fourth level</a:t>
+            </a:r>
+          </a:p>
+          <a:p>
+            <a:pPr lvl="4"/>
+            <a:r>
+              <a:rPr lang="en-US" smtClean="0"/>
+              <a:t>Fifth level</a:t>
+            </a:r>
+            <a:endParaRPr lang="en-US" dirty="0"/>
+          </a:p>
+        </p:txBody>
+      </p:sp>
+      <p:sp>
+        <p:nvSpPr>
+          <p:cNvPr id="4" name="Date Placeholder 3"/>
+          <p:cNvSpPr>
+            <a:spLocks noGrp="1"/>
+          </p:cNvSpPr>
+          <p:nvPr>
+            <p:ph type="dt" sz="half" idx="2"/>
+          </p:nvPr>
+        </p:nvSpPr>
+        <p:spPr>
+          <a:xfrm>
+            <a:off x="628650" y="6356351"/>
+            <a:ext cx="2057400" cy="365125"/>
+          </a:xfrm>
+          <a:prstGeom prst="rect">
+            <a:avLst/>
+          </a:prstGeom>
+        </p:spPr>
+        <p:txBody>
+          <a:bodyPr vert="horz" lIns="91440" tIns="45720" rIns="91440" bIns="45720" rtlCol="0" anchor="ctr"/>
+          <a:lstStyle>
+            <a:lvl1pPr algn="l">
+              <a:defRPr sz="900">
+                <a:solidFill>
+                  <a:schemeClr val="tx1">
+                    <a:tint val="75000"/>
+                  </a:schemeClr>
+                </a:solidFill>
+              </a:defRPr>
+            </a:lvl1pPr>
+          </a:lstStyle>
+          <a:p>
+            <a:pPr defTabSz="685800"/>
+            <a:fld id="{4CFFEE8A-0C3B-4CE3-BDBE-3AB865C6E9B1}" type="datetimeFigureOut">
+              <a:rPr lang="en-US" smtClean="0">
+                <a:solidFill>
+                  <a:prstClr val="black">
+                    <a:tint val="75000"/>
+                  </a:prstClr>
+                </a:solidFill>
+              </a:rPr>
+              <a:pPr defTabSz="685800"/>
+              <a:t>6/14/2015</a:t>
+            </a:fld>
+            <a:endParaRPr lang="en-US">
+              <a:solidFill>
+                <a:prstClr val="black">
+                  <a:tint val="75000"/>
+                </a:prstClr>
+              </a:solidFill>
+            </a:endParaRPr>
+          </a:p>
+        </p:txBody>
+      </p:sp>
+      <p:sp>
+        <p:nvSpPr>
+          <p:cNvPr id="5" name="Footer Placeholder 4"/>
+          <p:cNvSpPr>
+            <a:spLocks noGrp="1"/>
+          </p:cNvSpPr>
+          <p:nvPr>
+            <p:ph type="ftr" sz="quarter" idx="3"/>
+          </p:nvPr>
+        </p:nvSpPr>
+        <p:spPr>
+          <a:xfrm>
+            <a:off x="3028950" y="6356351"/>
+            <a:ext cx="3086100" cy="365125"/>
+          </a:xfrm>
+          <a:prstGeom prst="rect">
+            <a:avLst/>
+          </a:prstGeom>
+        </p:spPr>
+        <p:txBody>
+          <a:bodyPr vert="horz" lIns="91440" tIns="45720" rIns="91440" bIns="45720" rtlCol="0" anchor="ctr"/>
+          <a:lstStyle>
+            <a:lvl1pPr algn="ctr">
+              <a:defRPr sz="900">
+                <a:solidFill>
+                  <a:schemeClr val="tx1">
+                    <a:tint val="75000"/>
+                  </a:schemeClr>
+                </a:solidFill>
+              </a:defRPr>
+            </a:lvl1pPr>
+          </a:lstStyle>
+          <a:p>
+            <a:pPr defTabSz="685800"/>
+            <a:endParaRPr lang="en-US">
+              <a:solidFill>
+                <a:prstClr val="black">
+                  <a:tint val="75000"/>
+                </a:prstClr>
+              </a:solidFill>
+            </a:endParaRPr>
+          </a:p>
+        </p:txBody>
+      </p:sp>
+      <p:sp>
+        <p:nvSpPr>
+          <p:cNvPr id="6" name="Slide Number Placeholder 5"/>
+          <p:cNvSpPr>
+            <a:spLocks noGrp="1"/>
+          </p:cNvSpPr>
+          <p:nvPr>
+            <p:ph type="sldNum" sz="quarter" idx="4"/>
+          </p:nvPr>
+        </p:nvSpPr>
+        <p:spPr>
+          <a:xfrm>
+            <a:off x="6457950" y="6356351"/>
+            <a:ext cx="2057400" cy="365125"/>
+          </a:xfrm>
+          <a:prstGeom prst="rect">
+            <a:avLst/>
+          </a:prstGeom>
+        </p:spPr>
+        <p:txBody>
+          <a:bodyPr vert="horz" lIns="91440" tIns="45720" rIns="91440" bIns="45720" rtlCol="0" anchor="ctr"/>
+          <a:lstStyle>
+            <a:lvl1pPr algn="r">
+              <a:defRPr sz="900">
+                <a:solidFill>
+                  <a:schemeClr val="tx1">
+                    <a:tint val="75000"/>
+                  </a:schemeClr>
+                </a:solidFill>
+              </a:defRPr>
+            </a:lvl1pPr>
+          </a:lstStyle>
+          <a:p>
+            <a:pPr defTabSz="685800"/>
+            <a:fld id="{E0DBC28C-C8D9-41EE-A049-76BA2ACCFAA1}" type="slidenum">
+              <a:rPr lang="en-US" smtClean="0">
+                <a:solidFill>
+                  <a:prstClr val="black">
+                    <a:tint val="75000"/>
+                  </a:prstClr>
+                </a:solidFill>
+              </a:rPr>
+              <a:pPr defTabSz="685800"/>
+              <a:t>‹#›</a:t>
+            </a:fld>
+            <a:endParaRPr lang="en-US">
+              <a:solidFill>
+                <a:prstClr val="black">
+                  <a:tint val="75000"/>
+                </a:prstClr>
+              </a:solidFill>
+            </a:endParaRPr>
+          </a:p>
+        </p:txBody>
+      </p:sp>
+    </p:spTree>
+    <p:extLst>
+      <p:ext uri="{BB962C8B-B14F-4D97-AF65-F5344CB8AC3E}">
+        <p14:creationId xmlns:p14="http://schemas.microsoft.com/office/powerpoint/2010/main" val="1597306094"/>
+      </p:ext>
+    </p:extLst>
+  </p:cSld>
+  <p:clrMap bg1="lt1" tx1="dk1" bg2="lt2" tx2="dk2" accent1="accent1" accent2="accent2" accent3="accent3" accent4="accent4" accent5="accent5" accent6="accent6" hlink="hlink" folHlink="folHlink"/>
+  <p:sldLayoutIdLst>
+    <p:sldLayoutId id="2147483661" r:id="rId1"/>
+  </p:sldLayoutIdLst>
+  <p:txStyles>
+    <p:titleStyle>
+      <a:lvl1pPr algn="l" defTabSz="685800" rtl="0" eaLnBrk="1" latinLnBrk="0" hangingPunct="1">
+        <a:lnSpc>
+          <a:spcPct val="90000"/>
+        </a:lnSpc>
+        <a:spcBef>
+          <a:spcPct val="0"/>
+        </a:spcBef>
+        <a:buNone/>
+        <a:defRPr sz="3300" kern="1200">
+          <a:solidFill>
+            <a:schemeClr val="tx1"/>
+          </a:solidFill>
+          <a:latin typeface="+mj-lt"/>
+          <a:ea typeface="+mj-ea"/>
+          <a:cs typeface="+mj-cs"/>
+        </a:defRPr>
+      </a:lvl1pPr>
+    </p:titleStyle>
+    <p:bodyStyle>
+      <a:lvl1pPr marL="171450" indent="-171450" algn="l" defTabSz="685800" rtl="0" eaLnBrk="1" latinLnBrk="0" hangingPunct="1">
+        <a:lnSpc>
+          <a:spcPct val="90000"/>
+        </a:lnSpc>
+        <a:spcBef>
+          <a:spcPts val="750"/>
+        </a:spcBef>
+        <a:buFont typeface="Arial" panose="020B0604020202020204" pitchFamily="34" charset="0"/>
+        <a:buChar char="•"/>
+        <a:defRPr sz="2100" kern="1200">
+          <a:solidFill>
+            <a:schemeClr val="tx1"/>
+          </a:solidFill>
+          <a:latin typeface="+mn-lt"/>
+          <a:ea typeface="+mn-ea"/>
+          <a:cs typeface="+mn-cs"/>
+        </a:defRPr>
+      </a:lvl1pPr>
+      <a:lvl2pPr marL="514350" indent="-171450" algn="l" defTabSz="685800" rtl="0" eaLnBrk="1" latinLnBrk="0" hangingPunct="1">
+        <a:lnSpc>
+          <a:spcPct val="90000"/>
+        </a:lnSpc>
+        <a:spcBef>
+          <a:spcPts val="375"/>
+        </a:spcBef>
+        <a:buFont typeface="Arial" panose="020B0604020202020204" pitchFamily="34" charset="0"/>
+        <a:buChar char="•"/>
+        <a:defRPr sz="1800" kern="1200">
+          <a:solidFill>
+            <a:schemeClr val="tx1"/>
+          </a:solidFill>
+          <a:latin typeface="+mn-lt"/>
+          <a:ea typeface="+mn-ea"/>
+          <a:cs typeface="+mn-cs"/>
+        </a:defRPr>
+      </a:lvl2pPr>
+      <a:lvl3pPr marL="857250" indent="-171450" algn="l" defTabSz="685800" rtl="0" eaLnBrk="1" latinLnBrk="0" hangingPunct="1">
+        <a:lnSpc>
+          <a:spcPct val="90000"/>
+        </a:lnSpc>
+        <a:spcBef>
+          <a:spcPts val="375"/>
+        </a:spcBef>
+        <a:buFont typeface="Arial" panose="020B0604020202020204" pitchFamily="34" charset="0"/>
+        <a:buChar char="•"/>
+        <a:defRPr sz="1500" kern="1200">
+          <a:solidFill>
+            <a:schemeClr val="tx1"/>
+          </a:solidFill>
+          <a:latin typeface="+mn-lt"/>
+          <a:ea typeface="+mn-ea"/>
+          <a:cs typeface="+mn-cs"/>
+        </a:defRPr>
+      </a:lvl3pPr>
+      <a:lvl4pPr marL="1200150" indent="-171450" algn="l" defTabSz="685800" rtl="0" eaLnBrk="1" latinLnBrk="0" hangingPunct="1">
+        <a:lnSpc>
+          <a:spcPct val="90000"/>
+        </a:lnSpc>
+        <a:spcBef>
+          <a:spcPts val="375"/>
+        </a:spcBef>
+        <a:buFont typeface="Arial" panose="020B0604020202020204" pitchFamily="34" charset="0"/>
+        <a:buChar char="•"/>
+        <a:defRPr sz="1350" kern="1200">
+          <a:solidFill>
+            <a:schemeClr val="tx1"/>
+          </a:solidFill>
+          <a:latin typeface="+mn-lt"/>
+          <a:ea typeface="+mn-ea"/>
+          <a:cs typeface="+mn-cs"/>
+        </a:defRPr>
+      </a:lvl4pPr>
+      <a:lvl5pPr marL="1543050" indent="-171450" algn="l" defTabSz="685800" rtl="0" eaLnBrk="1" latinLnBrk="0" hangingPunct="1">
+        <a:lnSpc>
+          <a:spcPct val="90000"/>
+        </a:lnSpc>
+        <a:spcBef>
+          <a:spcPts val="375"/>
+        </a:spcBef>
+        <a:buFont typeface="Arial" panose="020B0604020202020204" pitchFamily="34" charset="0"/>
+        <a:buChar char="•"/>
+        <a:defRPr sz="1350" kern="1200">
+          <a:solidFill>
+            <a:schemeClr val="tx1"/>
+          </a:solidFill>
+          <a:latin typeface="+mn-lt"/>
+          <a:ea typeface="+mn-ea"/>
+          <a:cs typeface="+mn-cs"/>
+        </a:defRPr>
+      </a:lvl5pPr>
+      <a:lvl6pPr marL="1885950" indent="-171450" algn="l" defTabSz="685800" rtl="0" eaLnBrk="1" latinLnBrk="0" hangingPunct="1">
+        <a:lnSpc>
+          <a:spcPct val="90000"/>
+        </a:lnSpc>
+        <a:spcBef>
+          <a:spcPts val="375"/>
+        </a:spcBef>
+        <a:buFont typeface="Arial" panose="020B0604020202020204" pitchFamily="34" charset="0"/>
+        <a:buChar char="•"/>
+        <a:defRPr sz="1350" kern="1200">
+          <a:solidFill>
+            <a:schemeClr val="tx1"/>
+          </a:solidFill>
+          <a:latin typeface="+mn-lt"/>
+          <a:ea typeface="+mn-ea"/>
+          <a:cs typeface="+mn-cs"/>
+        </a:defRPr>
+      </a:lvl6pPr>
+      <a:lvl7pPr marL="2228850" indent="-171450" algn="l" defTabSz="685800" rtl="0" eaLnBrk="1" latinLnBrk="0" hangingPunct="1">
+        <a:lnSpc>
+          <a:spcPct val="90000"/>
+        </a:lnSpc>
+        <a:spcBef>
+          <a:spcPts val="375"/>
+        </a:spcBef>
+        <a:buFont typeface="Arial" panose="020B0604020202020204" pitchFamily="34" charset="0"/>
+        <a:buChar char="•"/>
+        <a:defRPr sz="1350" kern="1200">
+          <a:solidFill>
+            <a:schemeClr val="tx1"/>
+          </a:solidFill>
+          <a:latin typeface="+mn-lt"/>
+          <a:ea typeface="+mn-ea"/>
+          <a:cs typeface="+mn-cs"/>
+        </a:defRPr>
+      </a:lvl7pPr>
+      <a:lvl8pPr marL="2571750" indent="-171450" algn="l" defTabSz="685800" rtl="0" eaLnBrk="1" latinLnBrk="0" hangingPunct="1">
+        <a:lnSpc>
+          <a:spcPct val="90000"/>
+        </a:lnSpc>
+        <a:spcBef>
+          <a:spcPts val="375"/>
+        </a:spcBef>
+        <a:buFont typeface="Arial" panose="020B0604020202020204" pitchFamily="34" charset="0"/>
+        <a:buChar char="•"/>
+        <a:defRPr sz="1350" kern="1200">
+          <a:solidFill>
+            <a:schemeClr val="tx1"/>
+          </a:solidFill>
+          <a:latin typeface="+mn-lt"/>
+          <a:ea typeface="+mn-ea"/>
+          <a:cs typeface="+mn-cs"/>
+        </a:defRPr>
+      </a:lvl8pPr>
+      <a:lvl9pPr marL="2914650" indent="-171450" algn="l" defTabSz="685800" rtl="0" eaLnBrk="1" latinLnBrk="0" hangingPunct="1">
+        <a:lnSpc>
+          <a:spcPct val="90000"/>
+        </a:lnSpc>
+        <a:spcBef>
+          <a:spcPts val="375"/>
+        </a:spcBef>
+        <a:buFont typeface="Arial" panose="020B0604020202020204" pitchFamily="34" charset="0"/>
+        <a:buChar char="•"/>
+        <a:defRPr sz="1350" kern="1200">
+          <a:solidFill>
+            <a:schemeClr val="tx1"/>
+          </a:solidFill>
+          <a:latin typeface="+mn-lt"/>
+          <a:ea typeface="+mn-ea"/>
+          <a:cs typeface="+mn-cs"/>
+        </a:defRPr>
+      </a:lvl9pPr>
+    </p:bodyStyle>
+    <p:otherStyle>
+      <a:defPPr>
+        <a:defRPr lang="en-US"/>
+      </a:defPPr>
+      <a:lvl1pPr marL="0" algn="l" defTabSz="685800" rtl="0" eaLnBrk="1" latinLnBrk="0" hangingPunct="1">
+        <a:defRPr sz="1350" kern="1200">
+          <a:solidFill>
+            <a:schemeClr val="tx1"/>
+          </a:solidFill>
+          <a:latin typeface="+mn-lt"/>
+          <a:ea typeface="+mn-ea"/>
+          <a:cs typeface="+mn-cs"/>
+        </a:defRPr>
+      </a:lvl1pPr>
+      <a:lvl2pPr marL="342900" algn="l" defTabSz="685800" rtl="0" eaLnBrk="1" latinLnBrk="0" hangingPunct="1">
+        <a:defRPr sz="1350" kern="1200">
+          <a:solidFill>
+            <a:schemeClr val="tx1"/>
+          </a:solidFill>
+          <a:latin typeface="+mn-lt"/>
+          <a:ea typeface="+mn-ea"/>
+          <a:cs typeface="+mn-cs"/>
+        </a:defRPr>
+      </a:lvl2pPr>
+      <a:lvl3pPr marL="685800" algn="l" defTabSz="685800" rtl="0" eaLnBrk="1" latinLnBrk="0" hangingPunct="1">
+        <a:defRPr sz="1350" kern="1200">
+          <a:solidFill>
+            <a:schemeClr val="tx1"/>
+          </a:solidFill>
+          <a:latin typeface="+mn-lt"/>
+          <a:ea typeface="+mn-ea"/>
+          <a:cs typeface="+mn-cs"/>
+        </a:defRPr>
+      </a:lvl3pPr>
+      <a:lvl4pPr marL="1028700" algn="l" defTabSz="685800" rtl="0" eaLnBrk="1" latinLnBrk="0" hangingPunct="1">
+        <a:defRPr sz="1350" kern="1200">
+          <a:solidFill>
+            <a:schemeClr val="tx1"/>
+          </a:solidFill>
+          <a:latin typeface="+mn-lt"/>
+          <a:ea typeface="+mn-ea"/>
+          <a:cs typeface="+mn-cs"/>
+        </a:defRPr>
+      </a:lvl4pPr>
+      <a:lvl5pPr marL="1371600" algn="l" defTabSz="685800" rtl="0" eaLnBrk="1" latinLnBrk="0" hangingPunct="1">
+        <a:defRPr sz="1350" kern="1200">
+          <a:solidFill>
+            <a:schemeClr val="tx1"/>
+          </a:solidFill>
+          <a:latin typeface="+mn-lt"/>
+          <a:ea typeface="+mn-ea"/>
+          <a:cs typeface="+mn-cs"/>
+        </a:defRPr>
+      </a:lvl5pPr>
+      <a:lvl6pPr marL="1714500" algn="l" defTabSz="685800" rtl="0" eaLnBrk="1" latinLnBrk="0" hangingPunct="1">
+        <a:defRPr sz="1350" kern="1200">
+          <a:solidFill>
+            <a:schemeClr val="tx1"/>
+          </a:solidFill>
+          <a:latin typeface="+mn-lt"/>
+          <a:ea typeface="+mn-ea"/>
+          <a:cs typeface="+mn-cs"/>
+        </a:defRPr>
+      </a:lvl6pPr>
+      <a:lvl7pPr marL="2057400" algn="l" defTabSz="685800" rtl="0" eaLnBrk="1" latinLnBrk="0" hangingPunct="1">
+        <a:defRPr sz="1350" kern="1200">
+          <a:solidFill>
+            <a:schemeClr val="tx1"/>
+          </a:solidFill>
+          <a:latin typeface="+mn-lt"/>
+          <a:ea typeface="+mn-ea"/>
+          <a:cs typeface="+mn-cs"/>
+        </a:defRPr>
+      </a:lvl7pPr>
+      <a:lvl8pPr marL="2400300" algn="l" defTabSz="685800" rtl="0" eaLnBrk="1" latinLnBrk="0" hangingPunct="1">
+        <a:defRPr sz="1350" kern="1200">
+          <a:solidFill>
+            <a:schemeClr val="tx1"/>
+          </a:solidFill>
+          <a:latin typeface="+mn-lt"/>
+          <a:ea typeface="+mn-ea"/>
+          <a:cs typeface="+mn-cs"/>
+        </a:defRPr>
+      </a:lvl8pPr>
+      <a:lvl9pPr marL="2743200" algn="l" defTabSz="685800" rtl="0" eaLnBrk="1" latinLnBrk="0" hangingPunct="1">
+        <a:defRPr sz="1350" kern="1200">
+          <a:solidFill>
+            <a:schemeClr val="tx1"/>
+          </a:solidFill>
+          <a:latin typeface="+mn-lt"/>
+          <a:ea typeface="+mn-ea"/>
+          <a:cs typeface="+mn-cs"/>
+        </a:defRPr>
+      </a:lvl9pPr>
+    </p:otherStyle>
+  </p:txStyles>
+</p:sldMaster>
+</file>
+
 <file path=ppt/slides/slide1.xml><?xml version="1.0" encoding="utf-8"?>
 <p:sld xmlns:a="http://schemas.openxmlformats.org/drawingml/2006/main" xmlns:r="http://schemas.openxmlformats.org/officeDocument/2006/relationships" xmlns:p="http://schemas.openxmlformats.org/presentationml/2006/main">
   <p:cSld>
@@ -3671,6 +4462,36 @@
 <file path=ppt/slides/slide2.xml><?xml version="1.0" encoding="utf-8"?>
 <p:sld xmlns:a="http://schemas.openxmlformats.org/drawingml/2006/main" xmlns:r="http://schemas.openxmlformats.org/officeDocument/2006/relationships" xmlns:p="http://schemas.openxmlformats.org/presentationml/2006/main">
   <p:cSld>
+    <p:bg>
+      <p:bgPr>
+        <a:gradFill flip="none" rotWithShape="1">
+          <a:gsLst>
+            <a:gs pos="0">
+              <a:schemeClr val="accent3">
+                <a:lumMod val="40000"/>
+                <a:lumOff val="60000"/>
+              </a:schemeClr>
+            </a:gs>
+            <a:gs pos="46000">
+              <a:schemeClr val="accent3">
+                <a:lumMod val="95000"/>
+                <a:lumOff val="5000"/>
+              </a:schemeClr>
+            </a:gs>
+            <a:gs pos="100000">
+              <a:schemeClr val="accent3">
+                <a:lumMod val="60000"/>
+              </a:schemeClr>
+            </a:gs>
+          </a:gsLst>
+          <a:path path="shape">
+            <a:fillToRect l="50000" t="50000" r="50000" b="50000"/>
+          </a:path>
+          <a:tileRect/>
+        </a:gradFill>
+        <a:effectLst/>
+      </p:bgPr>
+    </p:bg>
     <p:spTree>
       <p:nvGrpSpPr>
         <p:cNvPr id="1" name=""/>
@@ -3685,6 +4506,432 @@
           <a:chExt cx="0" cy="0"/>
         </a:xfrm>
       </p:grpSpPr>
+      <p:pic>
+        <p:nvPicPr>
+          <p:cNvPr id="41" name="Picture 40"/>
+          <p:cNvPicPr>
+            <a:picLocks noChangeAspect="1"/>
+          </p:cNvPicPr>
+          <p:nvPr/>
+        </p:nvPicPr>
+        <p:blipFill>
+          <a:blip r:embed="rId2">
+            <a:extLst>
+              <a:ext uri="{28A0092B-C50C-407E-A947-70E740481C1C}">
+                <a14:useLocalDpi xmlns:a14="http://schemas.microsoft.com/office/drawing/2010/main" val="0"/>
+              </a:ext>
+            </a:extLst>
+          </a:blip>
+          <a:stretch>
+            <a:fillRect/>
+          </a:stretch>
+        </p:blipFill>
+        <p:spPr>
+          <a:xfrm>
+            <a:off x="1022634" y="2358727"/>
+            <a:ext cx="6870700" cy="1782983"/>
+          </a:xfrm>
+          <a:prstGeom prst="rect">
+            <a:avLst/>
+          </a:prstGeom>
+        </p:spPr>
+      </p:pic>
+      <p:pic>
+        <p:nvPicPr>
+          <p:cNvPr id="11" name="Picture 10"/>
+          <p:cNvPicPr>
+            <a:picLocks noChangeAspect="1"/>
+          </p:cNvPicPr>
+          <p:nvPr/>
+        </p:nvPicPr>
+        <p:blipFill>
+          <a:blip r:embed="rId3" cstate="print">
+            <a:extLst>
+              <a:ext uri="{28A0092B-C50C-407E-A947-70E740481C1C}">
+                <a14:useLocalDpi xmlns:a14="http://schemas.microsoft.com/office/drawing/2010/main" val="0"/>
+              </a:ext>
+            </a:extLst>
+          </a:blip>
+          <a:stretch>
+            <a:fillRect/>
+          </a:stretch>
+        </p:blipFill>
+        <p:spPr>
+          <a:xfrm>
+            <a:off x="-4158307" y="2075721"/>
+            <a:ext cx="814304" cy="814304"/>
+          </a:xfrm>
+          <a:prstGeom prst="rect">
+            <a:avLst/>
+          </a:prstGeom>
+        </p:spPr>
+      </p:pic>
+      <p:sp>
+        <p:nvSpPr>
+          <p:cNvPr id="15" name="Rectangle 14"/>
+          <p:cNvSpPr/>
+          <p:nvPr/>
+        </p:nvSpPr>
+        <p:spPr>
+          <a:xfrm>
+            <a:off x="1022634" y="2363506"/>
+            <a:ext cx="6870700" cy="1797971"/>
+          </a:xfrm>
+          <a:prstGeom prst="rect">
+            <a:avLst/>
+          </a:prstGeom>
+          <a:solidFill>
+            <a:schemeClr val="tx1">
+              <a:alpha val="50000"/>
+            </a:schemeClr>
+          </a:solidFill>
+          <a:ln>
+            <a:solidFill>
+              <a:schemeClr val="bg1"/>
+            </a:solidFill>
+          </a:ln>
+        </p:spPr>
+        <p:style>
+          <a:lnRef idx="2">
+            <a:schemeClr val="dk1">
+              <a:shade val="50000"/>
+            </a:schemeClr>
+          </a:lnRef>
+          <a:fillRef idx="1">
+            <a:schemeClr val="dk1"/>
+          </a:fillRef>
+          <a:effectRef idx="0">
+            <a:schemeClr val="dk1"/>
+          </a:effectRef>
+          <a:fontRef idx="minor">
+            <a:schemeClr val="lt1"/>
+          </a:fontRef>
+        </p:style>
+        <p:txBody>
+          <a:bodyPr rtlCol="0" anchor="ctr"/>
+          <a:lstStyle/>
+          <a:p>
+            <a:pPr algn="ctr" defTabSz="685800"/>
+            <a:endParaRPr lang="en-US" sz="1350" dirty="0">
+              <a:solidFill>
+                <a:prstClr val="white"/>
+              </a:solidFill>
+            </a:endParaRPr>
+          </a:p>
+        </p:txBody>
+      </p:sp>
+      <p:pic>
+        <p:nvPicPr>
+          <p:cNvPr id="16" name="Picture 15"/>
+          <p:cNvPicPr>
+            <a:picLocks noChangeAspect="1"/>
+          </p:cNvPicPr>
+          <p:nvPr/>
+        </p:nvPicPr>
+        <p:blipFill rotWithShape="1">
+          <a:blip r:embed="rId4">
+            <a:extLst>
+              <a:ext uri="{28A0092B-C50C-407E-A947-70E740481C1C}">
+                <a14:useLocalDpi xmlns:a14="http://schemas.microsoft.com/office/drawing/2010/main" val="0"/>
+              </a:ext>
+            </a:extLst>
+          </a:blip>
+          <a:srcRect t="-10060" r="50156"/>
+          <a:stretch/>
+        </p:blipFill>
+        <p:spPr>
+          <a:xfrm>
+            <a:off x="1715949" y="2960053"/>
+            <a:ext cx="5416043" cy="755105"/>
+          </a:xfrm>
+          <a:prstGeom prst="rect">
+            <a:avLst/>
+          </a:prstGeom>
+        </p:spPr>
+      </p:pic>
+      <p:sp>
+        <p:nvSpPr>
+          <p:cNvPr id="23" name="TextBox 22"/>
+          <p:cNvSpPr txBox="1"/>
+          <p:nvPr/>
+        </p:nvSpPr>
+        <p:spPr>
+          <a:xfrm>
+            <a:off x="2355544" y="994676"/>
+            <a:ext cx="4428161" cy="1338828"/>
+          </a:xfrm>
+          <a:prstGeom prst="rect">
+            <a:avLst/>
+          </a:prstGeom>
+          <a:noFill/>
+        </p:spPr>
+        <p:txBody>
+          <a:bodyPr wrap="square" rtlCol="0">
+            <a:spAutoFit/>
+          </a:bodyPr>
+          <a:lstStyle/>
+          <a:p>
+            <a:pPr algn="ctr" defTabSz="685800"/>
+            <a:r>
+              <a:rPr lang="en-US" sz="2700" b="1" dirty="0">
+                <a:solidFill>
+                  <a:prstClr val="white"/>
+                </a:solidFill>
+              </a:rPr>
+              <a:t>Save the Date</a:t>
+            </a:r>
+          </a:p>
+          <a:p>
+            <a:pPr algn="ctr" defTabSz="685800"/>
+            <a:r>
+              <a:rPr lang="en-US" b="1" dirty="0">
+                <a:solidFill>
+                  <a:prstClr val="black"/>
+                </a:solidFill>
+              </a:rPr>
+              <a:t>Tuesday, August 11, 2015</a:t>
+            </a:r>
+          </a:p>
+          <a:p>
+            <a:pPr algn="ctr" defTabSz="685800"/>
+            <a:r>
+              <a:rPr lang="en-US" b="1" dirty="0">
+                <a:solidFill>
+                  <a:prstClr val="black"/>
+                </a:solidFill>
+              </a:rPr>
+              <a:t>8am-5pm</a:t>
+            </a:r>
+          </a:p>
+          <a:p>
+            <a:pPr algn="ctr" defTabSz="685800"/>
+            <a:r>
+              <a:rPr lang="en-US" b="1" dirty="0">
+                <a:solidFill>
+                  <a:prstClr val="black"/>
+                </a:solidFill>
+              </a:rPr>
+              <a:t>Studio Movie Grill City Center</a:t>
+            </a:r>
+          </a:p>
+        </p:txBody>
+      </p:sp>
+      <p:cxnSp>
+        <p:nvCxnSpPr>
+          <p:cNvPr id="26" name="Straight Connector 25"/>
+          <p:cNvCxnSpPr/>
+          <p:nvPr/>
+        </p:nvCxnSpPr>
+        <p:spPr>
+          <a:xfrm>
+            <a:off x="-980795" y="2363506"/>
+            <a:ext cx="0" cy="1470800"/>
+          </a:xfrm>
+          <a:prstGeom prst="line">
+            <a:avLst/>
+          </a:prstGeom>
+          <a:ln>
+            <a:solidFill>
+              <a:schemeClr val="bg1"/>
+            </a:solidFill>
+          </a:ln>
+        </p:spPr>
+        <p:style>
+          <a:lnRef idx="1">
+            <a:schemeClr val="accent1"/>
+          </a:lnRef>
+          <a:fillRef idx="0">
+            <a:schemeClr val="accent1"/>
+          </a:fillRef>
+          <a:effectRef idx="0">
+            <a:schemeClr val="accent1"/>
+          </a:effectRef>
+          <a:fontRef idx="minor">
+            <a:schemeClr val="tx1"/>
+          </a:fontRef>
+        </p:style>
+      </p:cxnSp>
+      <p:sp>
+        <p:nvSpPr>
+          <p:cNvPr id="31" name="TextBox 30">
+            <a:hlinkClick r:id="rId5"/>
+          </p:cNvPr>
+          <p:cNvSpPr txBox="1"/>
+          <p:nvPr/>
+        </p:nvSpPr>
+        <p:spPr>
+          <a:xfrm>
+            <a:off x="2259293" y="4176692"/>
+            <a:ext cx="4620665" cy="461665"/>
+          </a:xfrm>
+          <a:prstGeom prst="rect">
+            <a:avLst/>
+          </a:prstGeom>
+          <a:noFill/>
+        </p:spPr>
+        <p:txBody>
+          <a:bodyPr wrap="square" rtlCol="0">
+            <a:spAutoFit/>
+          </a:bodyPr>
+          <a:lstStyle/>
+          <a:p>
+            <a:pPr algn="ctr" defTabSz="685800"/>
+            <a:r>
+              <a:rPr lang="en-US" sz="2400" b="1" dirty="0">
+                <a:solidFill>
+                  <a:prstClr val="white"/>
+                </a:solidFill>
+              </a:rPr>
+              <a:t>Register now </a:t>
+            </a:r>
+            <a:r>
+              <a:rPr lang="en-US" sz="2400" b="1" dirty="0">
+                <a:solidFill>
+                  <a:prstClr val="black"/>
+                </a:solidFill>
+                <a:hlinkClick r:id="rId6"/>
+              </a:rPr>
+              <a:t>AgileDotNext.com </a:t>
+            </a:r>
+            <a:r>
+              <a:rPr lang="en-US" sz="2400" b="1" dirty="0">
+                <a:solidFill>
+                  <a:prstClr val="black"/>
+                </a:solidFill>
+              </a:rPr>
+              <a:t> </a:t>
+            </a:r>
+          </a:p>
+        </p:txBody>
+      </p:sp>
+      <p:sp>
+        <p:nvSpPr>
+          <p:cNvPr id="32" name="TextBox 31"/>
+          <p:cNvSpPr txBox="1"/>
+          <p:nvPr/>
+        </p:nvSpPr>
+        <p:spPr>
+          <a:xfrm>
+            <a:off x="2962701" y="4801567"/>
+            <a:ext cx="3213848" cy="646331"/>
+          </a:xfrm>
+          <a:prstGeom prst="rect">
+            <a:avLst/>
+          </a:prstGeom>
+          <a:noFill/>
+        </p:spPr>
+        <p:txBody>
+          <a:bodyPr wrap="square" rtlCol="0">
+            <a:spAutoFit/>
+          </a:bodyPr>
+          <a:lstStyle/>
+          <a:p>
+            <a:pPr algn="ctr" defTabSz="685800"/>
+            <a:r>
+              <a:rPr lang="en-US" b="1" dirty="0">
+                <a:solidFill>
+                  <a:prstClr val="white"/>
+                </a:solidFill>
+              </a:rPr>
+              <a:t>Get 10% off by entering</a:t>
+            </a:r>
+            <a:r>
+              <a:rPr lang="en-US" b="1" dirty="0">
+                <a:solidFill>
+                  <a:prstClr val="black"/>
+                </a:solidFill>
+              </a:rPr>
+              <a:t>  </a:t>
+            </a:r>
+            <a:r>
+              <a:rPr lang="en-US" b="1" i="1" u="sng" dirty="0">
+                <a:solidFill>
+                  <a:prstClr val="black"/>
+                </a:solidFill>
+              </a:rPr>
+              <a:t>IEfriends</a:t>
+            </a:r>
+          </a:p>
+        </p:txBody>
+      </p:sp>
+      <p:pic>
+        <p:nvPicPr>
+          <p:cNvPr id="1026" name="Picture 2" descr="http://agiledotnext.com/Content/supreme/image/improving_logo2.png"/>
+          <p:cNvPicPr>
+            <a:picLocks noChangeAspect="1" noChangeArrowheads="1"/>
+          </p:cNvPicPr>
+          <p:nvPr/>
+        </p:nvPicPr>
+        <p:blipFill>
+          <a:blip r:embed="rId7" cstate="print">
+            <a:extLst>
+              <a:ext uri="{28A0092B-C50C-407E-A947-70E740481C1C}">
+                <a14:useLocalDpi xmlns:a14="http://schemas.microsoft.com/office/drawing/2010/main" val="0"/>
+              </a:ext>
+            </a:extLst>
+          </a:blip>
+          <a:srcRect/>
+          <a:stretch>
+            <a:fillRect/>
+          </a:stretch>
+        </p:blipFill>
+        <p:spPr bwMode="auto">
+          <a:xfrm>
+            <a:off x="1182144" y="2482873"/>
+            <a:ext cx="1892273" cy="435224"/>
+          </a:xfrm>
+          <a:prstGeom prst="rect">
+            <a:avLst/>
+          </a:prstGeom>
+          <a:noFill/>
+          <a:extLst>
+            <a:ext uri="{909E8E84-426E-40DD-AFC4-6F175D3DCCD1}">
+              <a14:hiddenFill xmlns:a14="http://schemas.microsoft.com/office/drawing/2010/main">
+                <a:solidFill>
+                  <a:srgbClr val="FFFFFF"/>
+                </a:solidFill>
+              </a14:hiddenFill>
+            </a:ext>
+          </a:extLst>
+        </p:spPr>
+      </p:pic>
+    </p:spTree>
+    <p:extLst>
+      <p:ext uri="{BB962C8B-B14F-4D97-AF65-F5344CB8AC3E}">
+        <p14:creationId xmlns:p14="http://schemas.microsoft.com/office/powerpoint/2010/main" val="2627251381"/>
+      </p:ext>
+    </p:extLst>
+  </p:cSld>
+  <p:clrMapOvr>
+    <a:masterClrMapping/>
+  </p:clrMapOvr>
+  <p:timing>
+    <p:tnLst>
+      <p:par>
+        <p:cTn id="1" dur="indefinite" restart="never" nodeType="tmRoot"/>
+      </p:par>
+    </p:tnLst>
+  </p:timing>
+</p:sld>
+</file>
+
+<file path=ppt/slides/slide3.xml><?xml version="1.0" encoding="utf-8"?>
+<p:sld xmlns:a="http://schemas.openxmlformats.org/drawingml/2006/main" xmlns:r="http://schemas.openxmlformats.org/officeDocument/2006/relationships" xmlns:p="http://schemas.openxmlformats.org/presentationml/2006/main">
+  <p:cSld>
+    <p:spTree>
+      <p:nvGrpSpPr>
+        <p:cNvPr id="1" name=""/>
+        <p:cNvGrpSpPr/>
+        <p:nvPr/>
+      </p:nvGrpSpPr>
+      <p:grpSpPr>
+        <a:xfrm>
+          <a:off x="0" y="0"/>
+          <a:ext cx="0" cy="0"/>
+          <a:chOff x="0" y="0"/>
+          <a:chExt cx="0" cy="0"/>
+        </a:xfrm>
+      </p:grpSpPr>
       <p:sp>
         <p:nvSpPr>
           <p:cNvPr id="2" name="Title 1"/>
@@ -3742,7 +4989,7 @@
 </p:sld>
 </file>
 
-<file path=ppt/slides/slide3.xml><?xml version="1.0" encoding="utf-8"?>
+<file path=ppt/slides/slide4.xml><?xml version="1.0" encoding="utf-8"?>
 <p:sld xmlns:a="http://schemas.openxmlformats.org/drawingml/2006/main" xmlns:r="http://schemas.openxmlformats.org/officeDocument/2006/relationships" xmlns:p="http://schemas.openxmlformats.org/presentationml/2006/main">
   <p:cSld>
     <p:spTree>
@@ -4145,7 +5392,283 @@
 </a:theme>
 </file>
 
+<file path=ppt/theme/theme2.xml><?xml version="1.0" encoding="utf-8"?>
+<a:theme xmlns:a="http://schemas.openxmlformats.org/drawingml/2006/main" name="1_Office Theme">
+  <a:themeElements>
+    <a:clrScheme name="Office Theme">
+      <a:dk1>
+        <a:sysClr val="windowText" lastClr="000000"/>
+      </a:dk1>
+      <a:lt1>
+        <a:sysClr val="window" lastClr="FFFFFF"/>
+      </a:lt1>
+      <a:dk2>
+        <a:srgbClr val="44546A"/>
+      </a:dk2>
+      <a:lt2>
+        <a:srgbClr val="E7E6E6"/>
+      </a:lt2>
+      <a:accent1>
+        <a:srgbClr val="5B9BD5"/>
+      </a:accent1>
+      <a:accent2>
+        <a:srgbClr val="ED7D31"/>
+      </a:accent2>
+      <a:accent3>
+        <a:srgbClr val="A5A5A5"/>
+      </a:accent3>
+      <a:accent4>
+        <a:srgbClr val="FFC000"/>
+      </a:accent4>
+      <a:accent5>
+        <a:srgbClr val="4472C4"/>
+      </a:accent5>
+      <a:accent6>
+        <a:srgbClr val="70AD47"/>
+      </a:accent6>
+      <a:hlink>
+        <a:srgbClr val="0563C1"/>
+      </a:hlink>
+      <a:folHlink>
+        <a:srgbClr val="954F72"/>
+      </a:folHlink>
+    </a:clrScheme>
+    <a:fontScheme name="Office Theme">
+      <a:majorFont>
+        <a:latin typeface="Calibri Light" panose="020F0302020204030204"/>
+        <a:ea typeface=""/>
+        <a:cs typeface=""/>
+        <a:font script="Jpan" typeface="ＭＳ Ｐゴシック"/>
+        <a:font script="Hang" typeface="맑은 고딕"/>
+        <a:font script="Hans" typeface="宋体"/>
+        <a:font script="Hant" typeface="新細明體"/>
+        <a:font script="Arab" typeface="Times New Roman"/>
+        <a:font script="Hebr" typeface="Times New Roman"/>
+        <a:font script="Thai" typeface="Angsana New"/>
+        <a:font script="Ethi" typeface="Nyala"/>
+        <a:font script="Beng" typeface="Vrinda"/>
+        <a:font script="Gujr" typeface="Shruti"/>
+        <a:font script="Khmr" typeface="MoolBoran"/>
+        <a:font script="Knda" typeface="Tunga"/>
+        <a:font script="Guru" typeface="Raavi"/>
+        <a:font script="Cans" typeface="Euphemia"/>
+        <a:font script="Cher" typeface="Plantagenet Cherokee"/>
+        <a:font script="Yiii" typeface="Microsoft Yi Baiti"/>
+        <a:font script="Tibt" typeface="Microsoft Himalaya"/>
+        <a:font script="Thaa" typeface="MV Boli"/>
+        <a:font script="Deva" typeface="Mangal"/>
+        <a:font script="Telu" typeface="Gautami"/>
+        <a:font script="Taml" typeface="Latha"/>
+        <a:font script="Syrc" typeface="Estrangelo Edessa"/>
+        <a:font script="Orya" typeface="Kalinga"/>
+        <a:font script="Mlym" typeface="Kartika"/>
+        <a:font script="Laoo" typeface="DokChampa"/>
+        <a:font script="Sinh" typeface="Iskoola Pota"/>
+        <a:font script="Mong" typeface="Mongolian Baiti"/>
+        <a:font script="Viet" typeface="Times New Roman"/>
+        <a:font script="Uigh" typeface="Microsoft Uighur"/>
+        <a:font script="Geor" typeface="Sylfaen"/>
+      </a:majorFont>
+      <a:minorFont>
+        <a:latin typeface="Calibri" panose="020F0502020204030204"/>
+        <a:ea typeface=""/>
+        <a:cs typeface=""/>
+        <a:font script="Jpan" typeface="ＭＳ Ｐゴシック"/>
+        <a:font script="Hang" typeface="맑은 고딕"/>
+        <a:font script="Hans" typeface="宋体"/>
+        <a:font script="Hant" typeface="新細明體"/>
+        <a:font script="Arab" typeface="Arial"/>
+        <a:font script="Hebr" typeface="Arial"/>
+        <a:font script="Thai" typeface="Cordia New"/>
+        <a:font script="Ethi" typeface="Nyala"/>
+        <a:font script="Beng" typeface="Vrinda"/>
+        <a:font script="Gujr" typeface="Shruti"/>
+        <a:font script="Khmr" typeface="DaunPenh"/>
+        <a:font script="Knda" typeface="Tunga"/>
+        <a:font script="Guru" typeface="Raavi"/>
+        <a:font script="Cans" typeface="Euphemia"/>
+        <a:font script="Cher" typeface="Plantagenet Cherokee"/>
+        <a:font script="Yiii" typeface="Microsoft Yi Baiti"/>
+        <a:font script="Tibt" typeface="Microsoft Himalaya"/>
+        <a:font script="Thaa" typeface="MV Boli"/>
+        <a:font script="Deva" typeface="Mangal"/>
+        <a:font script="Telu" typeface="Gautami"/>
+        <a:font script="Taml" typeface="Latha"/>
+        <a:font script="Syrc" typeface="Estrangelo Edessa"/>
+        <a:font script="Orya" typeface="Kalinga"/>
+        <a:font script="Mlym" typeface="Kartika"/>
+        <a:font script="Laoo" typeface="DokChampa"/>
+        <a:font script="Sinh" typeface="Iskoola Pota"/>
+        <a:font script="Mong" typeface="Mongolian Baiti"/>
+        <a:font script="Viet" typeface="Arial"/>
+        <a:font script="Uigh" typeface="Microsoft Uighur"/>
+        <a:font script="Geor" typeface="Sylfaen"/>
+      </a:minorFont>
+    </a:fontScheme>
+    <a:fmtScheme name="Office Theme">
+      <a:fillStyleLst>
+        <a:solidFill>
+          <a:schemeClr val="phClr"/>
+        </a:solidFill>
+        <a:gradFill rotWithShape="1">
+          <a:gsLst>
+            <a:gs pos="0">
+              <a:schemeClr val="phClr">
+                <a:lumMod val="110000"/>
+                <a:satMod val="105000"/>
+                <a:tint val="67000"/>
+              </a:schemeClr>
+            </a:gs>
+            <a:gs pos="50000">
+              <a:schemeClr val="phClr">
+                <a:lumMod val="105000"/>
+                <a:satMod val="103000"/>
+                <a:tint val="73000"/>
+              </a:schemeClr>
+            </a:gs>
+            <a:gs pos="100000">
+              <a:schemeClr val="phClr">
+                <a:lumMod val="105000"/>
+                <a:satMod val="109000"/>
+                <a:tint val="81000"/>
+              </a:schemeClr>
+            </a:gs>
+          </a:gsLst>
+          <a:lin ang="5400000" scaled="0"/>
+        </a:gradFill>
+        <a:gradFill rotWithShape="1">
+          <a:gsLst>
+            <a:gs pos="0">
+              <a:schemeClr val="phClr">
+                <a:satMod val="103000"/>
+                <a:lumMod val="102000"/>
+                <a:tint val="94000"/>
+              </a:schemeClr>
+            </a:gs>
+            <a:gs pos="50000">
+              <a:schemeClr val="phClr">
+                <a:satMod val="110000"/>
+                <a:lumMod val="100000"/>
+                <a:shade val="100000"/>
+              </a:schemeClr>
+            </a:gs>
+            <a:gs pos="100000">
+              <a:schemeClr val="phClr">
+                <a:lumMod val="99000"/>
+                <a:satMod val="120000"/>
+                <a:shade val="78000"/>
+              </a:schemeClr>
+            </a:gs>
+          </a:gsLst>
+          <a:lin ang="5400000" scaled="0"/>
+        </a:gradFill>
+      </a:fillStyleLst>
+      <a:lnStyleLst>
+        <a:ln w="6350" cap="flat" cmpd="sng" algn="ctr">
+          <a:solidFill>
+            <a:schemeClr val="phClr"/>
+          </a:solidFill>
+          <a:prstDash val="solid"/>
+          <a:miter lim="800000"/>
+        </a:ln>
+        <a:ln w="12700" cap="flat" cmpd="sng" algn="ctr">
+          <a:solidFill>
+            <a:schemeClr val="phClr"/>
+          </a:solidFill>
+          <a:prstDash val="solid"/>
+          <a:miter lim="800000"/>
+        </a:ln>
+        <a:ln w="19050" cap="flat" cmpd="sng" algn="ctr">
+          <a:solidFill>
+            <a:schemeClr val="phClr"/>
+          </a:solidFill>
+          <a:prstDash val="solid"/>
+          <a:miter lim="800000"/>
+        </a:ln>
+      </a:lnStyleLst>
+      <a:effectStyleLst>
+        <a:effectStyle>
+          <a:effectLst/>
+        </a:effectStyle>
+        <a:effectStyle>
+          <a:effectLst/>
+        </a:effectStyle>
+        <a:effectStyle>
+          <a:effectLst>
+            <a:outerShdw blurRad="57150" dist="19050" dir="5400000" algn="ctr" rotWithShape="0">
+              <a:srgbClr val="000000">
+                <a:alpha val="63000"/>
+              </a:srgbClr>
+            </a:outerShdw>
+          </a:effectLst>
+        </a:effectStyle>
+      </a:effectStyleLst>
+      <a:bgFillStyleLst>
+        <a:solidFill>
+          <a:schemeClr val="phClr"/>
+        </a:solidFill>
+        <a:solidFill>
+          <a:schemeClr val="phClr">
+            <a:tint val="95000"/>
+            <a:satMod val="170000"/>
+          </a:schemeClr>
+        </a:solidFill>
+        <a:gradFill rotWithShape="1">
+          <a:gsLst>
+            <a:gs pos="0">
+              <a:schemeClr val="phClr">
+                <a:tint val="93000"/>
+                <a:satMod val="150000"/>
+                <a:shade val="98000"/>
+                <a:lumMod val="102000"/>
+              </a:schemeClr>
+            </a:gs>
+            <a:gs pos="50000">
+              <a:schemeClr val="phClr">
+                <a:tint val="98000"/>
+                <a:satMod val="130000"/>
+                <a:shade val="90000"/>
+                <a:lumMod val="103000"/>
+              </a:schemeClr>
+            </a:gs>
+            <a:gs pos="100000">
+              <a:schemeClr val="phClr">
+                <a:shade val="63000"/>
+                <a:satMod val="120000"/>
+              </a:schemeClr>
+            </a:gs>
+          </a:gsLst>
+          <a:lin ang="5400000" scaled="0"/>
+        </a:gradFill>
+      </a:bgFillStyleLst>
+    </a:fmtScheme>
+  </a:themeElements>
+  <a:objectDefaults/>
+  <a:extraClrSchemeLst/>
+  <a:extLst>
+    <a:ext uri="{05A4C25C-085E-4340-85A3-A5531E510DB2}">
+      <thm15:themeFamily xmlns:thm15="http://schemas.microsoft.com/office/thememl/2012/main" name="Office Theme" id="{62F939B6-93AF-4DB8-9C6B-D6C7DFDC589F}" vid="{4A3C46E8-61CC-4603-A589-7422A47A8E4A}"/>
+    </a:ext>
+  </a:extLst>
+</a:theme>
+</file>
+
 <file path=customXml/item1.xml><?xml version="1.0" encoding="utf-8"?>
+<p:properties xmlns:p="http://schemas.microsoft.com/office/2006/metadata/properties" xmlns:xsi="http://www.w3.org/2001/XMLSchema-instance" xmlns:pc="http://schemas.microsoft.com/office/infopath/2007/PartnerControls">
+  <documentManagement/>
+</p:properties>
+</file>
+
+<file path=customXml/item2.xml><?xml version="1.0" encoding="utf-8"?>
+<?mso-contentType ?>
+<FormTemplates xmlns="http://schemas.microsoft.com/sharepoint/v3/contenttype/forms">
+  <Display>DocumentLibraryForm</Display>
+  <Edit>DocumentLibraryForm</Edit>
+  <New>DocumentLibraryForm</New>
+</FormTemplates>
+</file>
+
+<file path=customXml/item3.xml><?xml version="1.0" encoding="utf-8"?>
 <ct:contentTypeSchema xmlns:ct="http://schemas.microsoft.com/office/2006/metadata/contentType" xmlns:ma="http://schemas.microsoft.com/office/2006/metadata/properties/metaAttributes" ct:_="" ma:_="" ma:contentTypeName="Document" ma:contentTypeID="0x010100D7398AE121397446B28901E5E849BF40" ma:contentTypeVersion="1" ma:contentTypeDescription="Create a new document." ma:contentTypeScope="" ma:versionID="a7e693a555462a2cb5a0a6921c4c327e">
   <xsd:schema xmlns:xsd="http://www.w3.org/2001/XMLSchema" xmlns:xs="http://www.w3.org/2001/XMLSchema" xmlns:p="http://schemas.microsoft.com/office/2006/metadata/properties" targetNamespace="http://schemas.microsoft.com/office/2006/metadata/properties" ma:root="true" ma:fieldsID="391dd5b7355e85894d95fdf891f88749">
     <xsd:element name="properties">
@@ -4259,38 +5782,7 @@
 </ct:contentTypeSchema>
 </file>
 
-<file path=customXml/item2.xml><?xml version="1.0" encoding="utf-8"?>
-<p:properties xmlns:p="http://schemas.microsoft.com/office/2006/metadata/properties" xmlns:xsi="http://www.w3.org/2001/XMLSchema-instance" xmlns:pc="http://schemas.microsoft.com/office/infopath/2007/PartnerControls">
-  <documentManagement/>
-</p:properties>
-</file>
-
-<file path=customXml/item3.xml><?xml version="1.0" encoding="utf-8"?>
-<?mso-contentType ?>
-<FormTemplates xmlns="http://schemas.microsoft.com/sharepoint/v3/contenttype/forms">
-  <Display>DocumentLibraryForm</Display>
-  <Edit>DocumentLibraryForm</Edit>
-  <New>DocumentLibraryForm</New>
-</FormTemplates>
-</file>
-
 <file path=customXml/itemProps1.xml><?xml version="1.0" encoding="utf-8"?>
-<ds:datastoreItem xmlns:ds="http://schemas.openxmlformats.org/officeDocument/2006/customXml" ds:itemID="{BC072F6F-04ED-4B85-B28F-4D6DE375C2E0}">
-  <ds:schemaRefs>
-    <ds:schemaRef ds:uri="http://schemas.microsoft.com/office/2006/metadata/contentType"/>
-    <ds:schemaRef ds:uri="http://schemas.microsoft.com/office/2006/metadata/properties/metaAttributes"/>
-    <ds:schemaRef ds:uri="http://www.w3.org/2001/XMLSchema"/>
-    <ds:schemaRef ds:uri="http://schemas.microsoft.com/office/2006/metadata/properties"/>
-    <ds:schemaRef ds:uri="http://schemas.openxmlformats.org/package/2006/metadata/core-properties"/>
-    <ds:schemaRef ds:uri="http://purl.org/dc/elements/1.1/"/>
-    <ds:schemaRef ds:uri="http://purl.org/dc/terms/"/>
-    <ds:schemaRef ds:uri="http://schemas.microsoft.com/internal/obd"/>
-    <ds:schemaRef ds:uri="http://schemas.microsoft.com/office/infopath/2007/PartnerControls"/>
-  </ds:schemaRefs>
-</ds:datastoreItem>
-</file>
-
-<file path=customXml/itemProps2.xml><?xml version="1.0" encoding="utf-8"?>
 <ds:datastoreItem xmlns:ds="http://schemas.openxmlformats.org/officeDocument/2006/customXml" ds:itemID="{A04551C0-1604-41A0-9B5C-A5F88AD2E0FE}">
   <ds:schemaRefs>
     <ds:schemaRef ds:uri="http://purl.org/dc/terms/"/>
@@ -4305,10 +5797,26 @@
 </ds:datastoreItem>
 </file>
 
-<file path=customXml/itemProps3.xml><?xml version="1.0" encoding="utf-8"?>
+<file path=customXml/itemProps2.xml><?xml version="1.0" encoding="utf-8"?>
 <ds:datastoreItem xmlns:ds="http://schemas.openxmlformats.org/officeDocument/2006/customXml" ds:itemID="{B857AB07-B2ED-439E-860F-4F56FB345D1B}">
   <ds:schemaRefs>
     <ds:schemaRef ds:uri="http://schemas.microsoft.com/sharepoint/v3/contenttype/forms"/>
   </ds:schemaRefs>
 </ds:datastoreItem>
+</file>
+
+<file path=customXml/itemProps3.xml><?xml version="1.0" encoding="utf-8"?>
+<ds:datastoreItem xmlns:ds="http://schemas.openxmlformats.org/officeDocument/2006/customXml" ds:itemID="{BC072F6F-04ED-4B85-B28F-4D6DE375C2E0}">
+  <ds:schemaRefs>
+    <ds:schemaRef ds:uri="http://schemas.microsoft.com/office/2006/metadata/contentType"/>
+    <ds:schemaRef ds:uri="http://schemas.microsoft.com/office/2006/metadata/properties/metaAttributes"/>
+    <ds:schemaRef ds:uri="http://www.w3.org/2001/XMLSchema"/>
+    <ds:schemaRef ds:uri="http://schemas.microsoft.com/office/2006/metadata/properties"/>
+    <ds:schemaRef ds:uri="http://schemas.openxmlformats.org/package/2006/metadata/core-properties"/>
+    <ds:schemaRef ds:uri="http://purl.org/dc/elements/1.1/"/>
+    <ds:schemaRef ds:uri="http://purl.org/dc/terms/"/>
+    <ds:schemaRef ds:uri="http://schemas.microsoft.com/internal/obd"/>
+    <ds:schemaRef ds:uri="http://schemas.microsoft.com/office/infopath/2007/PartnerControls"/>
+  </ds:schemaRefs>
+</ds:datastoreItem>
 </file>
</xml_diff>

<commit_message>
Working on presentation overview.
</commit_message>
<xml_diff>
--- a/Presentation/THasINKync.pptx
+++ b/Presentation/THasINKync.pptx
@@ -12,6 +12,7 @@
     <p:sldId id="259" r:id="rId9"/>
     <p:sldId id="257" r:id="rId10"/>
     <p:sldId id="258" r:id="rId11"/>
+    <p:sldId id="262" r:id="rId12"/>
   </p:sldIdLst>
   <p:sldSz cx="9144000" cy="6858000" type="screen4x3"/>
   <p:notesSz cx="6858000" cy="9144000"/>
@@ -5563,14 +5564,22 @@
           <a:lstStyle/>
           <a:p>
             <a:r>
+              <a:rPr lang="en-US" dirty="0" err="1" smtClean="0"/>
+              <a:t>Broism</a:t>
+            </a:r>
+            <a:r>
               <a:rPr lang="en-US" dirty="0" smtClean="0"/>
-              <a:t>What </a:t>
-            </a:r>
-            <a:r>
-              <a:rPr lang="en-US" smtClean="0"/>
-              <a:t>is Multi-Threading?</a:t>
-            </a:r>
-            <a:endParaRPr lang="en-US"/>
+              <a:t>: </a:t>
+            </a:r>
+            <a:r>
+              <a:rPr lang="en-US" dirty="0" err="1" smtClean="0"/>
+              <a:t>Bilbro</a:t>
+            </a:r>
+            <a:r>
+              <a:rPr lang="en-US" dirty="0" smtClean="0"/>
+              <a:t> Baggins</a:t>
+            </a:r>
+            <a:endParaRPr lang="en-US" dirty="0"/>
           </a:p>
         </p:txBody>
       </p:sp>
@@ -5589,7 +5598,38 @@
           <a:bodyPr/>
           <a:lstStyle/>
           <a:p>
-            <a:endParaRPr lang="en-US"/>
+            <a:pPr marL="0" indent="0">
+              <a:buNone/>
+            </a:pPr>
+            <a:r>
+              <a:rPr lang="en-US" b="1" dirty="0" err="1"/>
+              <a:t>Bilbro</a:t>
+            </a:r>
+            <a:r>
+              <a:rPr lang="en-US" b="1" dirty="0"/>
+              <a:t> </a:t>
+            </a:r>
+            <a:r>
+              <a:rPr lang="en-US" b="1" dirty="0" smtClean="0"/>
+              <a:t>Baggins</a:t>
+            </a:r>
+            <a:r>
+              <a:rPr lang="en-US" dirty="0" smtClean="0"/>
+              <a:t>:  Your bro who is obsessed with Lord of the Rings.  Example:  Joe has seen the twin towers like 5 times.  He’s such a </a:t>
+            </a:r>
+            <a:r>
+              <a:rPr lang="en-US" i="1" dirty="0" err="1" smtClean="0"/>
+              <a:t>Bilbro</a:t>
+            </a:r>
+            <a:r>
+              <a:rPr lang="en-US" i="1" dirty="0" smtClean="0"/>
+              <a:t> Baggins</a:t>
+            </a:r>
+            <a:r>
+              <a:rPr lang="en-US" dirty="0" smtClean="0"/>
+              <a:t>.</a:t>
+            </a:r>
+            <a:endParaRPr lang="en-US" dirty="0"/>
           </a:p>
         </p:txBody>
       </p:sp>
@@ -5597,6 +5637,90 @@
     <p:extLst>
       <p:ext uri="{BB962C8B-B14F-4D97-AF65-F5344CB8AC3E}">
         <p14:creationId xmlns:p14="http://schemas.microsoft.com/office/powerpoint/2010/main" val="263428660"/>
+      </p:ext>
+    </p:extLst>
+  </p:cSld>
+  <p:clrMapOvr>
+    <a:masterClrMapping/>
+  </p:clrMapOvr>
+</p:sld>
+</file>
+
+<file path=ppt/slides/slide7.xml><?xml version="1.0" encoding="utf-8"?>
+<p:sld xmlns:a="http://schemas.openxmlformats.org/drawingml/2006/main" xmlns:r="http://schemas.openxmlformats.org/officeDocument/2006/relationships" xmlns:p="http://schemas.openxmlformats.org/presentationml/2006/main">
+  <p:cSld>
+    <p:spTree>
+      <p:nvGrpSpPr>
+        <p:cNvPr id="1" name=""/>
+        <p:cNvGrpSpPr/>
+        <p:nvPr/>
+      </p:nvGrpSpPr>
+      <p:grpSpPr>
+        <a:xfrm>
+          <a:off x="0" y="0"/>
+          <a:ext cx="0" cy="0"/>
+          <a:chOff x="0" y="0"/>
+          <a:chExt cx="0" cy="0"/>
+        </a:xfrm>
+      </p:grpSpPr>
+      <p:sp>
+        <p:nvSpPr>
+          <p:cNvPr id="2" name="Title 1"/>
+          <p:cNvSpPr>
+            <a:spLocks noGrp="1"/>
+          </p:cNvSpPr>
+          <p:nvPr>
+            <p:ph type="title"/>
+          </p:nvPr>
+        </p:nvSpPr>
+        <p:spPr/>
+        <p:txBody>
+          <a:bodyPr>
+            <a:normAutofit fontScale="90000"/>
+          </a:bodyPr>
+          <a:lstStyle/>
+          <a:p>
+            <a:r>
+              <a:rPr lang="en-US" dirty="0" err="1" smtClean="0"/>
+              <a:t>Overiew</a:t>
+            </a:r>
+            <a:endParaRPr lang="en-US" dirty="0"/>
+          </a:p>
+        </p:txBody>
+      </p:sp>
+      <p:sp>
+        <p:nvSpPr>
+          <p:cNvPr id="3" name="Content Placeholder 2"/>
+          <p:cNvSpPr>
+            <a:spLocks noGrp="1"/>
+          </p:cNvSpPr>
+          <p:nvPr>
+            <p:ph idx="1"/>
+          </p:nvPr>
+        </p:nvSpPr>
+        <p:spPr/>
+        <p:txBody>
+          <a:bodyPr/>
+          <a:lstStyle/>
+          <a:p>
+            <a:r>
+              <a:rPr lang="en-US" dirty="0" smtClean="0"/>
+              <a:t>Lots </a:t>
+            </a:r>
+            <a:r>
+              <a:rPr lang="en-US" smtClean="0"/>
+              <a:t>of bad jokes (I can’t help it)</a:t>
+            </a:r>
+          </a:p>
+          <a:p>
+            <a:endParaRPr lang="en-US"/>
+          </a:p>
+        </p:txBody>
+      </p:sp>
+    </p:spTree>
+    <p:extLst>
+      <p:ext uri="{BB962C8B-B14F-4D97-AF65-F5344CB8AC3E}">
+        <p14:creationId xmlns:p14="http://schemas.microsoft.com/office/powerpoint/2010/main" val="2696668645"/>
       </p:ext>
     </p:extLst>
   </p:cSld>

</xml_diff>

<commit_message>
Finished slides up through Basics of Threading in .Net
</commit_message>
<xml_diff>
--- a/Presentation/THasINKync.pptx
+++ b/Presentation/THasINKync.pptx
@@ -13,6 +13,12 @@
     <p:sldId id="257" r:id="rId10"/>
     <p:sldId id="258" r:id="rId11"/>
     <p:sldId id="262" r:id="rId12"/>
+    <p:sldId id="263" r:id="rId13"/>
+    <p:sldId id="264" r:id="rId14"/>
+    <p:sldId id="265" r:id="rId15"/>
+    <p:sldId id="266" r:id="rId16"/>
+    <p:sldId id="267" r:id="rId17"/>
+    <p:sldId id="268" r:id="rId18"/>
   </p:sldIdLst>
   <p:sldSz cx="9144000" cy="6858000" type="screen4x3"/>
   <p:notesSz cx="6858000" cy="9144000"/>
@@ -4494,6 +4500,473 @@
 </p:sld>
 </file>
 
+<file path=ppt/slides/slide10.xml><?xml version="1.0" encoding="utf-8"?>
+<p:sld xmlns:a="http://schemas.openxmlformats.org/drawingml/2006/main" xmlns:r="http://schemas.openxmlformats.org/officeDocument/2006/relationships" xmlns:p="http://schemas.openxmlformats.org/presentationml/2006/main">
+  <p:cSld>
+    <p:spTree>
+      <p:nvGrpSpPr>
+        <p:cNvPr id="1" name=""/>
+        <p:cNvGrpSpPr/>
+        <p:nvPr/>
+      </p:nvGrpSpPr>
+      <p:grpSpPr>
+        <a:xfrm>
+          <a:off x="0" y="0"/>
+          <a:ext cx="0" cy="0"/>
+          <a:chOff x="0" y="0"/>
+          <a:chExt cx="0" cy="0"/>
+        </a:xfrm>
+      </p:grpSpPr>
+      <p:sp>
+        <p:nvSpPr>
+          <p:cNvPr id="2" name="Title 1"/>
+          <p:cNvSpPr>
+            <a:spLocks noGrp="1"/>
+          </p:cNvSpPr>
+          <p:nvPr>
+            <p:ph type="title"/>
+          </p:nvPr>
+        </p:nvSpPr>
+        <p:spPr/>
+        <p:txBody>
+          <a:bodyPr>
+            <a:normAutofit fontScale="90000"/>
+          </a:bodyPr>
+          <a:lstStyle/>
+          <a:p>
+            <a:r>
+              <a:rPr lang="en-US" dirty="0" smtClean="0"/>
+              <a:t>How to Begin</a:t>
+            </a:r>
+            <a:endParaRPr lang="en-US" dirty="0"/>
+          </a:p>
+        </p:txBody>
+      </p:sp>
+      <p:sp>
+        <p:nvSpPr>
+          <p:cNvPr id="3" name="Content Placeholder 2"/>
+          <p:cNvSpPr>
+            <a:spLocks noGrp="1"/>
+          </p:cNvSpPr>
+          <p:nvPr>
+            <p:ph idx="1"/>
+          </p:nvPr>
+        </p:nvSpPr>
+        <p:spPr/>
+        <p:txBody>
+          <a:bodyPr/>
+          <a:lstStyle/>
+          <a:p>
+            <a:r>
+              <a:rPr lang="en-US" dirty="0" smtClean="0"/>
+              <a:t>Understanding your application and what can be done in parallel </a:t>
+            </a:r>
+            <a:r>
+              <a:rPr lang="en-US" b="1" dirty="0" smtClean="0">
+                <a:solidFill>
+                  <a:srgbClr val="FF0000"/>
+                </a:solidFill>
+              </a:rPr>
+              <a:t>CANNOT be skipped</a:t>
+            </a:r>
+            <a:r>
+              <a:rPr lang="en-US" dirty="0" smtClean="0"/>
+              <a:t>.</a:t>
+            </a:r>
+          </a:p>
+          <a:p>
+            <a:r>
+              <a:rPr lang="en-US" dirty="0" smtClean="0"/>
+              <a:t>Look for potential parallelism across the application as a whole.</a:t>
+            </a:r>
+          </a:p>
+          <a:p>
+            <a:r>
+              <a:rPr lang="en-US" dirty="0" smtClean="0"/>
+              <a:t>Prepare your application for parallel execution my making structural changes.</a:t>
+            </a:r>
+          </a:p>
+          <a:p>
+            <a:r>
+              <a:rPr lang="en-US" dirty="0" smtClean="0"/>
+              <a:t>Sound vague?  Know </a:t>
+            </a:r>
+            <a:r>
+              <a:rPr lang="en-US" dirty="0"/>
+              <a:t>the patterns and the problems they solve!</a:t>
+            </a:r>
+          </a:p>
+          <a:p>
+            <a:endParaRPr lang="en-US" dirty="0"/>
+          </a:p>
+        </p:txBody>
+      </p:sp>
+    </p:spTree>
+    <p:extLst>
+      <p:ext uri="{BB962C8B-B14F-4D97-AF65-F5344CB8AC3E}">
+        <p14:creationId xmlns:p14="http://schemas.microsoft.com/office/powerpoint/2010/main" val="2846285021"/>
+      </p:ext>
+    </p:extLst>
+  </p:cSld>
+  <p:clrMapOvr>
+    <a:masterClrMapping/>
+  </p:clrMapOvr>
+</p:sld>
+</file>
+
+<file path=ppt/slides/slide11.xml><?xml version="1.0" encoding="utf-8"?>
+<p:sld xmlns:a="http://schemas.openxmlformats.org/drawingml/2006/main" xmlns:r="http://schemas.openxmlformats.org/officeDocument/2006/relationships" xmlns:p="http://schemas.openxmlformats.org/presentationml/2006/main">
+  <p:cSld>
+    <p:spTree>
+      <p:nvGrpSpPr>
+        <p:cNvPr id="1" name=""/>
+        <p:cNvGrpSpPr/>
+        <p:nvPr/>
+      </p:nvGrpSpPr>
+      <p:grpSpPr>
+        <a:xfrm>
+          <a:off x="0" y="0"/>
+          <a:ext cx="0" cy="0"/>
+          <a:chOff x="0" y="0"/>
+          <a:chExt cx="0" cy="0"/>
+        </a:xfrm>
+      </p:grpSpPr>
+      <p:sp>
+        <p:nvSpPr>
+          <p:cNvPr id="2" name="Title 1"/>
+          <p:cNvSpPr>
+            <a:spLocks noGrp="1"/>
+          </p:cNvSpPr>
+          <p:nvPr>
+            <p:ph type="title"/>
+          </p:nvPr>
+        </p:nvSpPr>
+        <p:spPr/>
+        <p:txBody>
+          <a:bodyPr>
+            <a:normAutofit fontScale="90000"/>
+          </a:bodyPr>
+          <a:lstStyle/>
+          <a:p>
+            <a:r>
+              <a:rPr lang="en-US" dirty="0" smtClean="0"/>
+              <a:t>Tips and Tricks</a:t>
+            </a:r>
+            <a:endParaRPr lang="en-US" dirty="0"/>
+          </a:p>
+        </p:txBody>
+      </p:sp>
+      <p:sp>
+        <p:nvSpPr>
+          <p:cNvPr id="3" name="Content Placeholder 2"/>
+          <p:cNvSpPr>
+            <a:spLocks noGrp="1"/>
+          </p:cNvSpPr>
+          <p:nvPr>
+            <p:ph idx="1"/>
+          </p:nvPr>
+        </p:nvSpPr>
+        <p:spPr/>
+        <p:txBody>
+          <a:bodyPr>
+            <a:normAutofit lnSpcReduction="10000"/>
+          </a:bodyPr>
+          <a:lstStyle/>
+          <a:p>
+            <a:r>
+              <a:rPr lang="en-US" dirty="0" smtClean="0"/>
+              <a:t>Locks are the “</a:t>
+            </a:r>
+            <a:r>
+              <a:rPr lang="en-US" dirty="0" err="1" smtClean="0"/>
+              <a:t>goto</a:t>
+            </a:r>
+            <a:r>
+              <a:rPr lang="en-US" dirty="0" smtClean="0"/>
+              <a:t>” statement of multi-threading.</a:t>
+            </a:r>
+          </a:p>
+          <a:p>
+            <a:r>
+              <a:rPr lang="en-US" dirty="0" smtClean="0"/>
+              <a:t>The code NEEDS to be correct.  If you aren’t certain, seek help.  This stuff is hard!</a:t>
+            </a:r>
+          </a:p>
+          <a:p>
+            <a:r>
+              <a:rPr lang="en-US" dirty="0" smtClean="0"/>
+              <a:t>Don’t share data among threads unless absolutely necessary.</a:t>
+            </a:r>
+          </a:p>
+          <a:p>
+            <a:r>
+              <a:rPr lang="en-US" dirty="0" smtClean="0"/>
+              <a:t>Try to use threads and locks as a last resort.  Try to raise the level of abstraction from threads to tasks.</a:t>
+            </a:r>
+            <a:endParaRPr lang="en-US" dirty="0"/>
+          </a:p>
+        </p:txBody>
+      </p:sp>
+    </p:spTree>
+    <p:extLst>
+      <p:ext uri="{BB962C8B-B14F-4D97-AF65-F5344CB8AC3E}">
+        <p14:creationId xmlns:p14="http://schemas.microsoft.com/office/powerpoint/2010/main" val="454309200"/>
+      </p:ext>
+    </p:extLst>
+  </p:cSld>
+  <p:clrMapOvr>
+    <a:masterClrMapping/>
+  </p:clrMapOvr>
+</p:sld>
+</file>
+
+<file path=ppt/slides/slide12.xml><?xml version="1.0" encoding="utf-8"?>
+<p:sld xmlns:a="http://schemas.openxmlformats.org/drawingml/2006/main" xmlns:r="http://schemas.openxmlformats.org/officeDocument/2006/relationships" xmlns:p="http://schemas.openxmlformats.org/presentationml/2006/main">
+  <p:cSld>
+    <p:spTree>
+      <p:nvGrpSpPr>
+        <p:cNvPr id="1" name=""/>
+        <p:cNvGrpSpPr/>
+        <p:nvPr/>
+      </p:nvGrpSpPr>
+      <p:grpSpPr>
+        <a:xfrm>
+          <a:off x="0" y="0"/>
+          <a:ext cx="0" cy="0"/>
+          <a:chOff x="0" y="0"/>
+          <a:chExt cx="0" cy="0"/>
+        </a:xfrm>
+      </p:grpSpPr>
+      <p:sp>
+        <p:nvSpPr>
+          <p:cNvPr id="2" name="Title 1"/>
+          <p:cNvSpPr>
+            <a:spLocks noGrp="1"/>
+          </p:cNvSpPr>
+          <p:nvPr>
+            <p:ph type="title"/>
+          </p:nvPr>
+        </p:nvSpPr>
+        <p:spPr/>
+        <p:txBody>
+          <a:bodyPr>
+            <a:normAutofit fontScale="90000"/>
+          </a:bodyPr>
+          <a:lstStyle/>
+          <a:p>
+            <a:r>
+              <a:rPr lang="en-US" dirty="0" smtClean="0"/>
+              <a:t>Lame Joke</a:t>
+            </a:r>
+            <a:endParaRPr lang="en-US" dirty="0"/>
+          </a:p>
+        </p:txBody>
+      </p:sp>
+      <p:sp>
+        <p:nvSpPr>
+          <p:cNvPr id="3" name="Content Placeholder 2"/>
+          <p:cNvSpPr>
+            <a:spLocks noGrp="1"/>
+          </p:cNvSpPr>
+          <p:nvPr>
+            <p:ph idx="1"/>
+          </p:nvPr>
+        </p:nvSpPr>
+        <p:spPr/>
+        <p:txBody>
+          <a:bodyPr/>
+          <a:lstStyle/>
+          <a:p>
+            <a:r>
+              <a:rPr lang="en-US" dirty="0" smtClean="0"/>
+              <a:t>An infinite number of mathematicians walk into a bar.</a:t>
+            </a:r>
+            <a:endParaRPr lang="en-US" dirty="0"/>
+          </a:p>
+        </p:txBody>
+      </p:sp>
+    </p:spTree>
+    <p:extLst>
+      <p:ext uri="{BB962C8B-B14F-4D97-AF65-F5344CB8AC3E}">
+        <p14:creationId xmlns:p14="http://schemas.microsoft.com/office/powerpoint/2010/main" val="705309734"/>
+      </p:ext>
+    </p:extLst>
+  </p:cSld>
+  <p:clrMapOvr>
+    <a:masterClrMapping/>
+  </p:clrMapOvr>
+</p:sld>
+</file>
+
+<file path=ppt/slides/slide13.xml><?xml version="1.0" encoding="utf-8"?>
+<p:sld xmlns:a="http://schemas.openxmlformats.org/drawingml/2006/main" xmlns:r="http://schemas.openxmlformats.org/officeDocument/2006/relationships" xmlns:p="http://schemas.openxmlformats.org/presentationml/2006/main">
+  <p:cSld>
+    <p:spTree>
+      <p:nvGrpSpPr>
+        <p:cNvPr id="1" name=""/>
+        <p:cNvGrpSpPr/>
+        <p:nvPr/>
+      </p:nvGrpSpPr>
+      <p:grpSpPr>
+        <a:xfrm>
+          <a:off x="0" y="0"/>
+          <a:ext cx="0" cy="0"/>
+          <a:chOff x="0" y="0"/>
+          <a:chExt cx="0" cy="0"/>
+        </a:xfrm>
+      </p:grpSpPr>
+      <p:sp>
+        <p:nvSpPr>
+          <p:cNvPr id="2" name="Title 1"/>
+          <p:cNvSpPr>
+            <a:spLocks noGrp="1"/>
+          </p:cNvSpPr>
+          <p:nvPr>
+            <p:ph type="title"/>
+          </p:nvPr>
+        </p:nvSpPr>
+        <p:spPr/>
+        <p:txBody>
+          <a:bodyPr>
+            <a:normAutofit fontScale="90000"/>
+          </a:bodyPr>
+          <a:lstStyle/>
+          <a:p>
+            <a:r>
+              <a:rPr lang="en-US" dirty="0" smtClean="0"/>
+              <a:t>Basics of Threading in </a:t>
+            </a:r>
+            <a:r>
+              <a:rPr lang="en-US" dirty="0" err="1" smtClean="0"/>
+              <a:t>.Net</a:t>
+            </a:r>
+            <a:endParaRPr lang="en-US" dirty="0"/>
+          </a:p>
+        </p:txBody>
+      </p:sp>
+      <p:sp>
+        <p:nvSpPr>
+          <p:cNvPr id="3" name="Content Placeholder 2"/>
+          <p:cNvSpPr>
+            <a:spLocks noGrp="1"/>
+          </p:cNvSpPr>
+          <p:nvPr>
+            <p:ph idx="1"/>
+          </p:nvPr>
+        </p:nvSpPr>
+        <p:spPr/>
+        <p:txBody>
+          <a:bodyPr>
+            <a:normAutofit fontScale="70000" lnSpcReduction="20000"/>
+          </a:bodyPr>
+          <a:lstStyle/>
+          <a:p>
+            <a:r>
+              <a:rPr lang="en-US" dirty="0" smtClean="0"/>
+              <a:t>Threading hello world</a:t>
+            </a:r>
+          </a:p>
+          <a:p>
+            <a:r>
+              <a:rPr lang="en-US" dirty="0" smtClean="0"/>
+              <a:t>Passing parameters to threads</a:t>
+            </a:r>
+          </a:p>
+          <a:p>
+            <a:r>
+              <a:rPr lang="en-US" dirty="0" smtClean="0"/>
+              <a:t>Data races and locking</a:t>
+            </a:r>
+          </a:p>
+          <a:p>
+            <a:r>
+              <a:rPr lang="en-US" dirty="0" smtClean="0"/>
+              <a:t>Deadlocks, waiting, and pulsing</a:t>
+            </a:r>
+          </a:p>
+          <a:p>
+            <a:r>
+              <a:rPr lang="en-US" dirty="0" smtClean="0"/>
+              <a:t>Wait handles</a:t>
+            </a:r>
+          </a:p>
+          <a:p>
+            <a:r>
+              <a:rPr lang="en-US" dirty="0" smtClean="0"/>
+              <a:t>Volatility, atomicity, and interlocking</a:t>
+            </a:r>
+          </a:p>
+          <a:p>
+            <a:r>
+              <a:rPr lang="en-US" dirty="0" smtClean="0"/>
+              <a:t>Using the </a:t>
+            </a:r>
+            <a:r>
+              <a:rPr lang="en-US" dirty="0" err="1" smtClean="0"/>
+              <a:t>ThreadPool</a:t>
+            </a:r>
+            <a:r>
+              <a:rPr lang="en-US" dirty="0" smtClean="0"/>
+              <a:t> and asynchronous methods.</a:t>
+            </a:r>
+          </a:p>
+          <a:p>
+            <a:r>
+              <a:rPr lang="en-US" dirty="0" smtClean="0"/>
+              <a:t>Shutting down workers</a:t>
+            </a:r>
+          </a:p>
+          <a:p>
+            <a:r>
+              <a:rPr lang="en-US" dirty="0" smtClean="0"/>
+              <a:t>Locking (and choosing what to lock on)</a:t>
+            </a:r>
+          </a:p>
+          <a:p>
+            <a:r>
+              <a:rPr lang="en-US" dirty="0" smtClean="0"/>
+              <a:t>Alternative approaches to monitors</a:t>
+            </a:r>
+          </a:p>
+          <a:p>
+            <a:r>
+              <a:rPr lang="en-US" dirty="0" smtClean="0"/>
+              <a:t>Thread-safety</a:t>
+            </a:r>
+          </a:p>
+          <a:p>
+            <a:r>
+              <a:rPr lang="en-US" dirty="0" smtClean="0"/>
+              <a:t>Aborting and interrupting threads</a:t>
+            </a:r>
+          </a:p>
+          <a:p>
+            <a:r>
+              <a:rPr lang="en-US" smtClean="0"/>
+              <a:t>Error handling</a:t>
+            </a:r>
+          </a:p>
+          <a:p>
+            <a:endParaRPr lang="en-US" dirty="0" smtClean="0"/>
+          </a:p>
+          <a:p>
+            <a:endParaRPr lang="en-US" dirty="0"/>
+          </a:p>
+        </p:txBody>
+      </p:sp>
+    </p:spTree>
+    <p:extLst>
+      <p:ext uri="{BB962C8B-B14F-4D97-AF65-F5344CB8AC3E}">
+        <p14:creationId xmlns:p14="http://schemas.microsoft.com/office/powerpoint/2010/main" val="960250843"/>
+      </p:ext>
+    </p:extLst>
+  </p:cSld>
+  <p:clrMapOvr>
+    <a:masterClrMapping/>
+  </p:clrMapOvr>
+</p:sld>
+</file>
+
 <file path=ppt/slides/slide2.xml><?xml version="1.0" encoding="utf-8"?>
 <p:sld xmlns:a="http://schemas.openxmlformats.org/drawingml/2006/main" xmlns:r="http://schemas.openxmlformats.org/officeDocument/2006/relationships" xmlns:p="http://schemas.openxmlformats.org/presentationml/2006/main">
   <p:cSld>
@@ -5681,7 +6154,7 @@
           <a:lstStyle/>
           <a:p>
             <a:r>
-              <a:rPr lang="en-US" smtClean="0"/>
+              <a:rPr lang="en-US" dirty="0" smtClean="0"/>
               <a:t>Overview</a:t>
             </a:r>
             <a:endParaRPr lang="en-US" dirty="0"/>
@@ -5700,13 +6173,87 @@
         </p:nvSpPr>
         <p:spPr/>
         <p:txBody>
-          <a:bodyPr/>
+          <a:bodyPr>
+            <a:normAutofit fontScale="92500" lnSpcReduction="20000"/>
+          </a:bodyPr>
           <a:lstStyle/>
           <a:p>
             <a:r>
               <a:rPr lang="en-US" dirty="0" smtClean="0"/>
-              <a:t>Lots of bad jokes (I can’t help it)</a:t>
-            </a:r>
+              <a:t>Lots of bad jokes (I can’t help it).</a:t>
+            </a:r>
+          </a:p>
+          <a:p>
+            <a:r>
+              <a:rPr lang="en-US" dirty="0" smtClean="0"/>
+              <a:t>When to use threads.</a:t>
+            </a:r>
+          </a:p>
+          <a:p>
+            <a:r>
+              <a:rPr lang="en-US" dirty="0" smtClean="0"/>
+              <a:t>Basics of multi-threading in </a:t>
+            </a:r>
+            <a:r>
+              <a:rPr lang="en-US" dirty="0" err="1" smtClean="0"/>
+              <a:t>.Net</a:t>
+            </a:r>
+            <a:endParaRPr lang="en-US" dirty="0" smtClean="0"/>
+          </a:p>
+          <a:p>
+            <a:r>
+              <a:rPr lang="en-US" dirty="0" smtClean="0"/>
+              <a:t>Multi-threaded programming patterns</a:t>
+            </a:r>
+          </a:p>
+          <a:p>
+            <a:r>
+              <a:rPr lang="en-US" dirty="0" smtClean="0"/>
+              <a:t>Parallel </a:t>
+            </a:r>
+            <a:r>
+              <a:rPr lang="en-US" dirty="0" err="1" smtClean="0"/>
+              <a:t>Linq</a:t>
+            </a:r>
+            <a:endParaRPr lang="en-US" dirty="0" smtClean="0"/>
+          </a:p>
+          <a:p>
+            <a:r>
+              <a:rPr lang="en-US" dirty="0" smtClean="0"/>
+              <a:t>Task Parallel Library</a:t>
+            </a:r>
+          </a:p>
+          <a:p>
+            <a:r>
+              <a:rPr lang="en-US" dirty="0" err="1" smtClean="0"/>
+              <a:t>Async</a:t>
+            </a:r>
+            <a:r>
+              <a:rPr lang="en-US" dirty="0" smtClean="0"/>
+              <a:t> Controllers (and why they matter)</a:t>
+            </a:r>
+          </a:p>
+          <a:p>
+            <a:r>
+              <a:rPr lang="en-US" dirty="0" smtClean="0"/>
+              <a:t>Writing tests for parallel code</a:t>
+            </a:r>
+            <a:r>
+              <a:rPr lang="en-US" dirty="0"/>
+              <a:t> (if time).</a:t>
+            </a:r>
+            <a:endParaRPr lang="en-US" dirty="0" smtClean="0"/>
+          </a:p>
+          <a:p>
+            <a:r>
+              <a:rPr lang="en-US" dirty="0" smtClean="0"/>
+              <a:t>F# Examples</a:t>
+            </a:r>
+            <a:r>
+              <a:rPr lang="en-US" dirty="0"/>
+              <a:t> (if time).</a:t>
+            </a:r>
+            <a:endParaRPr lang="en-US" dirty="0" smtClean="0"/>
           </a:p>
           <a:p>
             <a:endParaRPr lang="en-US" dirty="0"/>
@@ -5717,6 +6264,247 @@
     <p:extLst>
       <p:ext uri="{BB962C8B-B14F-4D97-AF65-F5344CB8AC3E}">
         <p14:creationId xmlns:p14="http://schemas.microsoft.com/office/powerpoint/2010/main" val="2696668645"/>
+      </p:ext>
+    </p:extLst>
+  </p:cSld>
+  <p:clrMapOvr>
+    <a:masterClrMapping/>
+  </p:clrMapOvr>
+</p:sld>
+</file>
+
+<file path=ppt/slides/slide8.xml><?xml version="1.0" encoding="utf-8"?>
+<p:sld xmlns:a="http://schemas.openxmlformats.org/drawingml/2006/main" xmlns:r="http://schemas.openxmlformats.org/officeDocument/2006/relationships" xmlns:p="http://schemas.openxmlformats.org/presentationml/2006/main">
+  <p:cSld>
+    <p:spTree>
+      <p:nvGrpSpPr>
+        <p:cNvPr id="1" name=""/>
+        <p:cNvGrpSpPr/>
+        <p:nvPr/>
+      </p:nvGrpSpPr>
+      <p:grpSpPr>
+        <a:xfrm>
+          <a:off x="0" y="0"/>
+          <a:ext cx="0" cy="0"/>
+          <a:chOff x="0" y="0"/>
+          <a:chExt cx="0" cy="0"/>
+        </a:xfrm>
+      </p:grpSpPr>
+      <p:sp>
+        <p:nvSpPr>
+          <p:cNvPr id="4" name="Title 3"/>
+          <p:cNvSpPr>
+            <a:spLocks noGrp="1"/>
+          </p:cNvSpPr>
+          <p:nvPr>
+            <p:ph type="title"/>
+          </p:nvPr>
+        </p:nvSpPr>
+        <p:spPr/>
+        <p:txBody>
+          <a:bodyPr>
+            <a:normAutofit fontScale="90000"/>
+          </a:bodyPr>
+          <a:lstStyle/>
+          <a:p>
+            <a:r>
+              <a:rPr lang="en-US" dirty="0" smtClean="0"/>
+              <a:t>When to Use Multi-threading</a:t>
+            </a:r>
+            <a:endParaRPr lang="en-US" dirty="0"/>
+          </a:p>
+        </p:txBody>
+      </p:sp>
+      <p:sp>
+        <p:nvSpPr>
+          <p:cNvPr id="9" name="Content Placeholder 8"/>
+          <p:cNvSpPr>
+            <a:spLocks noGrp="1"/>
+          </p:cNvSpPr>
+          <p:nvPr>
+            <p:ph idx="1"/>
+          </p:nvPr>
+        </p:nvSpPr>
+        <p:spPr/>
+        <p:txBody>
+          <a:bodyPr>
+            <a:normAutofit/>
+          </a:bodyPr>
+          <a:lstStyle/>
+          <a:p>
+            <a:r>
+              <a:rPr lang="en-US" dirty="0" smtClean="0"/>
+              <a:t>Application is CPU bound and not using all cores.  The task manager tells the story.</a:t>
+            </a:r>
+          </a:p>
+          <a:p>
+            <a:r>
+              <a:rPr lang="en-US" dirty="0" smtClean="0"/>
+              <a:t>Application is waiting on external resources that can be loaded in parallel.</a:t>
+            </a:r>
+          </a:p>
+          <a:p>
+            <a:r>
+              <a:rPr lang="en-US" dirty="0" smtClean="0"/>
+              <a:t>Application is CPU bound, but not using all processor cores.</a:t>
+            </a:r>
+          </a:p>
+          <a:p>
+            <a:r>
+              <a:rPr lang="en-US" dirty="0" smtClean="0"/>
+              <a:t>Only when the benefits outweigh the costs.</a:t>
+            </a:r>
+          </a:p>
+        </p:txBody>
+      </p:sp>
+    </p:spTree>
+    <p:extLst>
+      <p:ext uri="{BB962C8B-B14F-4D97-AF65-F5344CB8AC3E}">
+        <p14:creationId xmlns:p14="http://schemas.microsoft.com/office/powerpoint/2010/main" val="729225566"/>
+      </p:ext>
+    </p:extLst>
+  </p:cSld>
+  <p:clrMapOvr>
+    <a:masterClrMapping/>
+  </p:clrMapOvr>
+</p:sld>
+</file>
+
+<file path=ppt/slides/slide9.xml><?xml version="1.0" encoding="utf-8"?>
+<p:sld xmlns:a="http://schemas.openxmlformats.org/drawingml/2006/main" xmlns:r="http://schemas.openxmlformats.org/officeDocument/2006/relationships" xmlns:p="http://schemas.openxmlformats.org/presentationml/2006/main">
+  <p:cSld>
+    <p:spTree>
+      <p:nvGrpSpPr>
+        <p:cNvPr id="1" name=""/>
+        <p:cNvGrpSpPr/>
+        <p:nvPr/>
+      </p:nvGrpSpPr>
+      <p:grpSpPr>
+        <a:xfrm>
+          <a:off x="0" y="0"/>
+          <a:ext cx="0" cy="0"/>
+          <a:chOff x="0" y="0"/>
+          <a:chExt cx="0" cy="0"/>
+        </a:xfrm>
+      </p:grpSpPr>
+      <p:sp>
+        <p:nvSpPr>
+          <p:cNvPr id="2" name="Title 1"/>
+          <p:cNvSpPr>
+            <a:spLocks noGrp="1"/>
+          </p:cNvSpPr>
+          <p:nvPr>
+            <p:ph type="title"/>
+          </p:nvPr>
+        </p:nvSpPr>
+        <p:spPr/>
+        <p:txBody>
+          <a:bodyPr>
+            <a:normAutofit fontScale="90000"/>
+          </a:bodyPr>
+          <a:lstStyle/>
+          <a:p>
+            <a:r>
+              <a:rPr lang="en-US" dirty="0" smtClean="0"/>
+              <a:t>A Word of Caution</a:t>
+            </a:r>
+            <a:endParaRPr lang="en-US" dirty="0"/>
+          </a:p>
+        </p:txBody>
+      </p:sp>
+      <p:sp>
+        <p:nvSpPr>
+          <p:cNvPr id="3" name="Content Placeholder 2"/>
+          <p:cNvSpPr>
+            <a:spLocks noGrp="1"/>
+          </p:cNvSpPr>
+          <p:nvPr>
+            <p:ph idx="1"/>
+          </p:nvPr>
+        </p:nvSpPr>
+        <p:spPr/>
+        <p:txBody>
+          <a:bodyPr>
+            <a:normAutofit fontScale="92500" lnSpcReduction="20000"/>
+          </a:bodyPr>
+          <a:lstStyle/>
+          <a:p>
+            <a:r>
+              <a:rPr lang="en-US" dirty="0" smtClean="0"/>
+              <a:t>Can become a minefield of subtle and hard to reproduce defects.</a:t>
+            </a:r>
+          </a:p>
+          <a:p>
+            <a:r>
+              <a:rPr lang="en-US" dirty="0" smtClean="0"/>
+              <a:t>More computing sins are committed in the name of efficiency that for any other single reason, including blind stupidity</a:t>
+            </a:r>
+            <a:br>
+              <a:rPr lang="en-US" dirty="0" smtClean="0"/>
+            </a:br>
+            <a:r>
+              <a:rPr lang="en-US" dirty="0" smtClean="0"/>
+              <a:t>		– W.A. </a:t>
+            </a:r>
+            <a:r>
+              <a:rPr lang="en-US" dirty="0" err="1" smtClean="0"/>
+              <a:t>Wulf</a:t>
+            </a:r>
+            <a:endParaRPr lang="en-US" dirty="0" smtClean="0"/>
+          </a:p>
+          <a:p>
+            <a:r>
+              <a:rPr lang="en-US" dirty="0" smtClean="0"/>
+              <a:t>Premature optimization is the root of all evil</a:t>
+            </a:r>
+            <a:br>
+              <a:rPr lang="en-US" dirty="0" smtClean="0"/>
+            </a:br>
+            <a:r>
+              <a:rPr lang="en-US" dirty="0" smtClean="0"/>
+              <a:t>		– Donald </a:t>
+            </a:r>
+            <a:r>
+              <a:rPr lang="en-US" dirty="0" err="1" smtClean="0"/>
+              <a:t>Kuth</a:t>
+            </a:r>
+            <a:endParaRPr lang="en-US" dirty="0" smtClean="0"/>
+          </a:p>
+          <a:p>
+            <a:r>
+              <a:rPr lang="en-US" dirty="0" smtClean="0"/>
+              <a:t>Jackson’s Rules of Optimization</a:t>
+            </a:r>
+          </a:p>
+          <a:p>
+            <a:pPr lvl="1"/>
+            <a:r>
+              <a:rPr lang="en-US" dirty="0" smtClean="0"/>
+              <a:t>Don’t do it.</a:t>
+            </a:r>
+          </a:p>
+          <a:p>
+            <a:pPr lvl="1"/>
+            <a:r>
+              <a:rPr lang="en-US" dirty="0" smtClean="0"/>
+              <a:t>(For experts only): Don’t do it </a:t>
+            </a:r>
+            <a:r>
+              <a:rPr lang="en-US" i="1" dirty="0" smtClean="0"/>
+              <a:t>yet</a:t>
+            </a:r>
+            <a:r>
+              <a:rPr lang="en-US" dirty="0" smtClean="0"/>
+              <a:t>.</a:t>
+            </a:r>
+            <a:endParaRPr lang="en-US" dirty="0"/>
+          </a:p>
+        </p:txBody>
+      </p:sp>
+    </p:spTree>
+    <p:extLst>
+      <p:ext uri="{BB962C8B-B14F-4D97-AF65-F5344CB8AC3E}">
+        <p14:creationId xmlns:p14="http://schemas.microsoft.com/office/powerpoint/2010/main" val="266457984"/>
       </p:ext>
     </p:extLst>
   </p:cSld>

</xml_diff>

<commit_message>
Added incrementing count projects.
</commit_message>
<xml_diff>
--- a/Presentation/THasINKync.pptx
+++ b/Presentation/THasINKync.pptx
@@ -354,7 +354,7 @@
           <a:p>
             <a:fld id="{2A7CB402-B72D-3346-9EA5-354251120F9E}" type="datetimeFigureOut">
               <a:rPr lang="en-US" smtClean="0"/>
-              <a:t>6/14/2015</a:t>
+              <a:t>6/15/2015</a:t>
             </a:fld>
             <a:endParaRPr lang="en-US"/>
           </a:p>
@@ -571,7 +571,7 @@
           <a:p>
             <a:fld id="{2A7CB402-B72D-3346-9EA5-354251120F9E}" type="datetimeFigureOut">
               <a:rPr lang="en-US" smtClean="0"/>
-              <a:t>6/14/2015</a:t>
+              <a:t>6/15/2015</a:t>
             </a:fld>
             <a:endParaRPr lang="en-US"/>
           </a:p>
@@ -732,7 +732,7 @@
           <a:p>
             <a:fld id="{2A7CB402-B72D-3346-9EA5-354251120F9E}" type="datetimeFigureOut">
               <a:rPr lang="en-US" smtClean="0"/>
-              <a:t>6/14/2015</a:t>
+              <a:t>6/15/2015</a:t>
             </a:fld>
             <a:endParaRPr lang="en-US"/>
           </a:p>
@@ -912,7 +912,7 @@
                 </a:solidFill>
               </a:rPr>
               <a:pPr/>
-              <a:t>6/14/2015</a:t>
+              <a:t>6/15/2015</a:t>
             </a:fld>
             <a:endParaRPr lang="en-US">
               <a:solidFill>
@@ -1179,7 +1179,7 @@
           <a:p>
             <a:fld id="{2A7CB402-B72D-3346-9EA5-354251120F9E}" type="datetimeFigureOut">
               <a:rPr lang="en-US" smtClean="0"/>
-              <a:t>6/14/2015</a:t>
+              <a:t>6/15/2015</a:t>
             </a:fld>
             <a:endParaRPr lang="en-US"/>
           </a:p>
@@ -1518,7 +1518,7 @@
           <a:p>
             <a:fld id="{2A7CB402-B72D-3346-9EA5-354251120F9E}" type="datetimeFigureOut">
               <a:rPr lang="en-US" smtClean="0"/>
-              <a:t>6/14/2015</a:t>
+              <a:t>6/15/2015</a:t>
             </a:fld>
             <a:endParaRPr lang="en-US"/>
           </a:p>
@@ -1896,7 +1896,7 @@
           <a:p>
             <a:fld id="{2A7CB402-B72D-3346-9EA5-354251120F9E}" type="datetimeFigureOut">
               <a:rPr lang="en-US" smtClean="0"/>
-              <a:t>6/14/2015</a:t>
+              <a:t>6/15/2015</a:t>
             </a:fld>
             <a:endParaRPr lang="en-US"/>
           </a:p>
@@ -2412,7 +2412,7 @@
           <a:p>
             <a:fld id="{2A7CB402-B72D-3346-9EA5-354251120F9E}" type="datetimeFigureOut">
               <a:rPr lang="en-US" smtClean="0"/>
-              <a:t>6/14/2015</a:t>
+              <a:t>6/15/2015</a:t>
             </a:fld>
             <a:endParaRPr lang="en-US"/>
           </a:p>
@@ -2580,7 +2580,7 @@
           <a:p>
             <a:fld id="{2A7CB402-B72D-3346-9EA5-354251120F9E}" type="datetimeFigureOut">
               <a:rPr lang="en-US" smtClean="0"/>
-              <a:t>6/14/2015</a:t>
+              <a:t>6/15/2015</a:t>
             </a:fld>
             <a:endParaRPr lang="en-US"/>
           </a:p>
@@ -2710,7 +2710,7 @@
           <a:p>
             <a:fld id="{2A7CB402-B72D-3346-9EA5-354251120F9E}" type="datetimeFigureOut">
               <a:rPr lang="en-US" smtClean="0"/>
-              <a:t>6/14/2015</a:t>
+              <a:t>6/15/2015</a:t>
             </a:fld>
             <a:endParaRPr lang="en-US"/>
           </a:p>
@@ -3058,7 +3058,7 @@
           <a:p>
             <a:fld id="{2A7CB402-B72D-3346-9EA5-354251120F9E}" type="datetimeFigureOut">
               <a:rPr lang="en-US" smtClean="0"/>
-              <a:t>6/14/2015</a:t>
+              <a:t>6/15/2015</a:t>
             </a:fld>
             <a:endParaRPr lang="en-US"/>
           </a:p>
@@ -3296,7 +3296,7 @@
           <a:p>
             <a:fld id="{2A7CB402-B72D-3346-9EA5-354251120F9E}" type="datetimeFigureOut">
               <a:rPr lang="en-US" smtClean="0"/>
-              <a:t>6/14/2015</a:t>
+              <a:t>6/15/2015</a:t>
             </a:fld>
             <a:endParaRPr lang="en-US"/>
           </a:p>
@@ -3490,7 +3490,7 @@
           <a:p>
             <a:fld id="{2A7CB402-B72D-3346-9EA5-354251120F9E}" type="datetimeFigureOut">
               <a:rPr lang="en-US" smtClean="0"/>
-              <a:t>6/14/2015</a:t>
+              <a:t>6/15/2015</a:t>
             </a:fld>
             <a:endParaRPr lang="en-US"/>
           </a:p>
@@ -3971,7 +3971,7 @@
                 </a:solidFill>
               </a:rPr>
               <a:pPr defTabSz="685800"/>
-              <a:t>6/14/2015</a:t>
+              <a:t>6/15/2015</a:t>
             </a:fld>
             <a:endParaRPr lang="en-US">
               <a:solidFill>
@@ -4466,11 +4466,7 @@
           <a:p>
             <a:r>
               <a:rPr lang="en-US" dirty="0" smtClean="0"/>
-              <a:t>Multi-Threaded </a:t>
-            </a:r>
-            <a:r>
-              <a:rPr lang="en-US" dirty="0" smtClean="0"/>
-              <a:t>Programming in </a:t>
+              <a:t>Multi-Threaded Programming in </a:t>
             </a:r>
             <a:r>
               <a:rPr lang="en-US" dirty="0" err="1" smtClean="0"/>
@@ -5214,35 +5210,19 @@
           <a:p>
             <a:r>
               <a:rPr lang="en-US" sz="2800" dirty="0" smtClean="0"/>
-              <a:t>Principal </a:t>
-            </a:r>
+              <a:t>Principal Consultant with Improving Enterprises</a:t>
+            </a:r>
+          </a:p>
+          <a:p>
             <a:r>
               <a:rPr lang="en-US" sz="2800" dirty="0" smtClean="0"/>
-              <a:t>Consultant with Improving Enterprises</a:t>
+              <a:t>We’re hiring (Attitude and Aptitude)</a:t>
             </a:r>
           </a:p>
           <a:p>
             <a:r>
               <a:rPr lang="en-US" sz="2800" dirty="0" smtClean="0"/>
-              <a:t>We’re </a:t>
-            </a:r>
-            <a:r>
-              <a:rPr lang="en-US" sz="2800" dirty="0" smtClean="0"/>
-              <a:t>hiring </a:t>
-            </a:r>
-            <a:r>
-              <a:rPr lang="en-US" sz="2800" dirty="0" smtClean="0"/>
-              <a:t>(Attitude and Aptitude)</a:t>
-            </a:r>
-          </a:p>
-          <a:p>
-            <a:r>
-              <a:rPr lang="en-US" sz="2800" dirty="0" smtClean="0"/>
-              <a:t>You should </a:t>
-            </a:r>
-            <a:r>
-              <a:rPr lang="en-US" sz="2800" dirty="0" smtClean="0"/>
-              <a:t>totally call me, bro:  </a:t>
+              <a:t>You should totally call me, bro:  </a:t>
             </a:r>
             <a:r>
               <a:rPr lang="en-US" sz="2800" b="1" dirty="0" smtClean="0"/>
@@ -5925,7 +5905,6 @@
               <a:rPr lang="en-US" dirty="0" smtClean="0"/>
               <a:t>It has a logo.  Here it is!!!  </a:t>
             </a:r>
-            <a:endParaRPr lang="en-US" dirty="0" smtClean="0"/>
           </a:p>
           <a:p>
             <a:endParaRPr lang="en-US" dirty="0" smtClean="0"/>
@@ -6425,13 +6404,27 @@
         <p:spPr/>
         <p:txBody>
           <a:bodyPr>
-            <a:normAutofit fontScale="92500" lnSpcReduction="20000"/>
+            <a:normAutofit fontScale="85000" lnSpcReduction="20000"/>
           </a:bodyPr>
           <a:lstStyle/>
           <a:p>
             <a:r>
               <a:rPr lang="en-US" dirty="0" smtClean="0"/>
-              <a:t>Can become a minefield of subtle and hard to reproduce defects.</a:t>
+              <a:t>I’m not </a:t>
+            </a:r>
+            <a:r>
+              <a:rPr lang="en-US" smtClean="0"/>
+              <a:t>an expert.</a:t>
+            </a:r>
+          </a:p>
+          <a:p>
+            <a:r>
+              <a:rPr lang="en-US" dirty="0" smtClean="0"/>
+              <a:t>Can </a:t>
+            </a:r>
+            <a:r>
+              <a:rPr lang="en-US" dirty="0" smtClean="0"/>
+              <a:t>become a minefield of subtle and hard to reproduce defects.</a:t>
             </a:r>
           </a:p>
           <a:p>
@@ -7101,18 +7094,18 @@
 </file>
 
 <file path=customXml/item1.xml><?xml version="1.0" encoding="utf-8"?>
+<p:properties xmlns:p="http://schemas.microsoft.com/office/2006/metadata/properties" xmlns:xsi="http://www.w3.org/2001/XMLSchema-instance" xmlns:pc="http://schemas.microsoft.com/office/infopath/2007/PartnerControls">
+  <documentManagement/>
+</p:properties>
+</file>
+
+<file path=customXml/item2.xml><?xml version="1.0" encoding="utf-8"?>
 <?mso-contentType ?>
 <FormTemplates xmlns="http://schemas.microsoft.com/sharepoint/v3/contenttype/forms">
   <Display>DocumentLibraryForm</Display>
   <Edit>DocumentLibraryForm</Edit>
   <New>DocumentLibraryForm</New>
 </FormTemplates>
-</file>
-
-<file path=customXml/item2.xml><?xml version="1.0" encoding="utf-8"?>
-<p:properties xmlns:p="http://schemas.microsoft.com/office/2006/metadata/properties" xmlns:xsi="http://www.w3.org/2001/XMLSchema-instance" xmlns:pc="http://schemas.microsoft.com/office/infopath/2007/PartnerControls">
-  <documentManagement/>
-</p:properties>
 </file>
 
 <file path=customXml/item3.xml><?xml version="1.0" encoding="utf-8"?>
@@ -7230,14 +7223,6 @@
 </file>
 
 <file path=customXml/itemProps1.xml><?xml version="1.0" encoding="utf-8"?>
-<ds:datastoreItem xmlns:ds="http://schemas.openxmlformats.org/officeDocument/2006/customXml" ds:itemID="{B857AB07-B2ED-439E-860F-4F56FB345D1B}">
-  <ds:schemaRefs>
-    <ds:schemaRef ds:uri="http://schemas.microsoft.com/sharepoint/v3/contenttype/forms"/>
-  </ds:schemaRefs>
-</ds:datastoreItem>
-</file>
-
-<file path=customXml/itemProps2.xml><?xml version="1.0" encoding="utf-8"?>
 <ds:datastoreItem xmlns:ds="http://schemas.openxmlformats.org/officeDocument/2006/customXml" ds:itemID="{A04551C0-1604-41A0-9B5C-A5F88AD2E0FE}">
   <ds:schemaRefs>
     <ds:schemaRef ds:uri="http://purl.org/dc/terms/"/>
@@ -7248,6 +7233,14 @@
     <ds:schemaRef ds:uri="http://schemas.microsoft.com/office/2006/metadata/properties"/>
     <ds:schemaRef ds:uri="http://www.w3.org/XML/1998/namespace"/>
     <ds:schemaRef ds:uri="http://purl.org/dc/dcmitype/"/>
+  </ds:schemaRefs>
+</ds:datastoreItem>
+</file>
+
+<file path=customXml/itemProps2.xml><?xml version="1.0" encoding="utf-8"?>
+<ds:datastoreItem xmlns:ds="http://schemas.openxmlformats.org/officeDocument/2006/customXml" ds:itemID="{B857AB07-B2ED-439E-860F-4F56FB345D1B}">
+  <ds:schemaRefs>
+    <ds:schemaRef ds:uri="http://schemas.microsoft.com/sharepoint/v3/contenttype/forms"/>
   </ds:schemaRefs>
 </ds:datastoreItem>
 </file>

</xml_diff>

<commit_message>
Finished deadlocks, waiting, and pulsing.
</commit_message>
<xml_diff>
--- a/Presentation/THasINKync.pptx
+++ b/Presentation/THasINKync.pptx
@@ -4898,12 +4898,12 @@
               <a:t>Using the </a:t>
             </a:r>
             <a:r>
-              <a:rPr lang="en-US" dirty="0" err="1" smtClean="0"/>
-              <a:t>ThreadPool</a:t>
-            </a:r>
-            <a:r>
-              <a:rPr lang="en-US" dirty="0" smtClean="0"/>
-              <a:t> and asynchronous methods.</a:t>
+              <a:rPr lang="en-US" smtClean="0"/>
+              <a:t>thread pool and </a:t>
+            </a:r>
+            <a:r>
+              <a:rPr lang="en-US" dirty="0" smtClean="0"/>
+              <a:t>asynchronous methods.</a:t>
             </a:r>
           </a:p>
           <a:p>
@@ -7090,6 +7090,21 @@
 </file>
 
 <file path=customXml/item1.xml><?xml version="1.0" encoding="utf-8"?>
+<p:properties xmlns:p="http://schemas.microsoft.com/office/2006/metadata/properties" xmlns:xsi="http://www.w3.org/2001/XMLSchema-instance" xmlns:pc="http://schemas.microsoft.com/office/infopath/2007/PartnerControls">
+  <documentManagement/>
+</p:properties>
+</file>
+
+<file path=customXml/item2.xml><?xml version="1.0" encoding="utf-8"?>
+<?mso-contentType ?>
+<FormTemplates xmlns="http://schemas.microsoft.com/sharepoint/v3/contenttype/forms">
+  <Display>DocumentLibraryForm</Display>
+  <Edit>DocumentLibraryForm</Edit>
+  <New>DocumentLibraryForm</New>
+</FormTemplates>
+</file>
+
+<file path=customXml/item3.xml><?xml version="1.0" encoding="utf-8"?>
 <ct:contentTypeSchema xmlns:ct="http://schemas.microsoft.com/office/2006/metadata/contentType" xmlns:ma="http://schemas.microsoft.com/office/2006/metadata/properties/metaAttributes" ct:_="" ma:_="" ma:contentTypeName="Document" ma:contentTypeID="0x010100D7398AE121397446B28901E5E849BF40" ma:contentTypeVersion="1" ma:contentTypeDescription="Create a new document." ma:contentTypeScope="" ma:versionID="a7e693a555462a2cb5a0a6921c4c327e">
   <xsd:schema xmlns:xsd="http://www.w3.org/2001/XMLSchema" xmlns:xs="http://www.w3.org/2001/XMLSchema" xmlns:p="http://schemas.microsoft.com/office/2006/metadata/properties" targetNamespace="http://schemas.microsoft.com/office/2006/metadata/properties" ma:root="true" ma:fieldsID="391dd5b7355e85894d95fdf891f88749">
     <xsd:element name="properties">
@@ -7203,22 +7218,30 @@
 </ct:contentTypeSchema>
 </file>
 
-<file path=customXml/item2.xml><?xml version="1.0" encoding="utf-8"?>
-<?mso-contentType ?>
-<FormTemplates xmlns="http://schemas.microsoft.com/sharepoint/v3/contenttype/forms">
-  <Display>DocumentLibraryForm</Display>
-  <Edit>DocumentLibraryForm</Edit>
-  <New>DocumentLibraryForm</New>
-</FormTemplates>
+<file path=customXml/itemProps1.xml><?xml version="1.0" encoding="utf-8"?>
+<ds:datastoreItem xmlns:ds="http://schemas.openxmlformats.org/officeDocument/2006/customXml" ds:itemID="{A04551C0-1604-41A0-9B5C-A5F88AD2E0FE}">
+  <ds:schemaRefs>
+    <ds:schemaRef ds:uri="http://purl.org/dc/terms/"/>
+    <ds:schemaRef ds:uri="http://schemas.openxmlformats.org/package/2006/metadata/core-properties"/>
+    <ds:schemaRef ds:uri="http://schemas.microsoft.com/office/2006/documentManagement/types"/>
+    <ds:schemaRef ds:uri="http://schemas.microsoft.com/office/infopath/2007/PartnerControls"/>
+    <ds:schemaRef ds:uri="http://purl.org/dc/elements/1.1/"/>
+    <ds:schemaRef ds:uri="http://schemas.microsoft.com/office/2006/metadata/properties"/>
+    <ds:schemaRef ds:uri="http://www.w3.org/XML/1998/namespace"/>
+    <ds:schemaRef ds:uri="http://purl.org/dc/dcmitype/"/>
+  </ds:schemaRefs>
+</ds:datastoreItem>
 </file>
 
-<file path=customXml/item3.xml><?xml version="1.0" encoding="utf-8"?>
-<p:properties xmlns:p="http://schemas.microsoft.com/office/2006/metadata/properties" xmlns:xsi="http://www.w3.org/2001/XMLSchema-instance" xmlns:pc="http://schemas.microsoft.com/office/infopath/2007/PartnerControls">
-  <documentManagement/>
-</p:properties>
+<file path=customXml/itemProps2.xml><?xml version="1.0" encoding="utf-8"?>
+<ds:datastoreItem xmlns:ds="http://schemas.openxmlformats.org/officeDocument/2006/customXml" ds:itemID="{B857AB07-B2ED-439E-860F-4F56FB345D1B}">
+  <ds:schemaRefs>
+    <ds:schemaRef ds:uri="http://schemas.microsoft.com/sharepoint/v3/contenttype/forms"/>
+  </ds:schemaRefs>
+</ds:datastoreItem>
 </file>
 
-<file path=customXml/itemProps1.xml><?xml version="1.0" encoding="utf-8"?>
+<file path=customXml/itemProps3.xml><?xml version="1.0" encoding="utf-8"?>
 <ds:datastoreItem xmlns:ds="http://schemas.openxmlformats.org/officeDocument/2006/customXml" ds:itemID="{BC072F6F-04ED-4B85-B28F-4D6DE375C2E0}">
   <ds:schemaRefs>
     <ds:schemaRef ds:uri="http://schemas.microsoft.com/office/2006/metadata/contentType"/>
@@ -7232,27 +7255,4 @@
     <ds:schemaRef ds:uri="http://schemas.microsoft.com/office/infopath/2007/PartnerControls"/>
   </ds:schemaRefs>
 </ds:datastoreItem>
-</file>
-
-<file path=customXml/itemProps2.xml><?xml version="1.0" encoding="utf-8"?>
-<ds:datastoreItem xmlns:ds="http://schemas.openxmlformats.org/officeDocument/2006/customXml" ds:itemID="{B857AB07-B2ED-439E-860F-4F56FB345D1B}">
-  <ds:schemaRefs>
-    <ds:schemaRef ds:uri="http://schemas.microsoft.com/sharepoint/v3/contenttype/forms"/>
-  </ds:schemaRefs>
-</ds:datastoreItem>
-</file>
-
-<file path=customXml/itemProps3.xml><?xml version="1.0" encoding="utf-8"?>
-<ds:datastoreItem xmlns:ds="http://schemas.openxmlformats.org/officeDocument/2006/customXml" ds:itemID="{A04551C0-1604-41A0-9B5C-A5F88AD2E0FE}">
-  <ds:schemaRefs>
-    <ds:schemaRef ds:uri="http://purl.org/dc/terms/"/>
-    <ds:schemaRef ds:uri="http://schemas.openxmlformats.org/package/2006/metadata/core-properties"/>
-    <ds:schemaRef ds:uri="http://schemas.microsoft.com/office/2006/documentManagement/types"/>
-    <ds:schemaRef ds:uri="http://schemas.microsoft.com/office/infopath/2007/PartnerControls"/>
-    <ds:schemaRef ds:uri="http://purl.org/dc/elements/1.1/"/>
-    <ds:schemaRef ds:uri="http://schemas.microsoft.com/office/2006/metadata/properties"/>
-    <ds:schemaRef ds:uri="http://www.w3.org/XML/1998/namespace"/>
-    <ds:schemaRef ds:uri="http://purl.org/dc/dcmitype/"/>
-  </ds:schemaRefs>
-</ds:datastoreItem>
 </file>
</xml_diff>

<commit_message>
Finished threadpool and async methods.
</commit_message>
<xml_diff>
--- a/Presentation/THasINKync.pptx
+++ b/Presentation/THasINKync.pptx
@@ -4888,7 +4888,11 @@
           </a:p>
           <a:p>
             <a:r>
-              <a:rPr lang="en-US" dirty="0" smtClean="0"/>
+              <a:rPr lang="en-US" b="1" dirty="0" smtClean="0">
+                <a:solidFill>
+                  <a:srgbClr val="FF0000"/>
+                </a:solidFill>
+              </a:rPr>
               <a:t>Volatility, atomicity, and interlocking</a:t>
             </a:r>
           </a:p>
@@ -4898,7 +4902,7 @@
               <a:t>Using the </a:t>
             </a:r>
             <a:r>
-              <a:rPr lang="en-US" smtClean="0"/>
+              <a:rPr lang="en-US" dirty="0" smtClean="0"/>
               <a:t>thread pool and </a:t>
             </a:r>
             <a:r>

</xml_diff>

<commit_message>
Finalized presentation and code examples.
</commit_message>
<xml_diff>
--- a/Presentation/THasINKync.pptx
+++ b/Presentation/THasINKync.pptx
@@ -4470,18 +4470,213 @@
           </a:xfrm>
         </p:spPr>
         <p:txBody>
-          <a:bodyPr/>
+          <a:bodyPr>
+            <a:normAutofit/>
+          </a:bodyPr>
           <a:lstStyle/>
           <a:p>
             <a:r>
-              <a:rPr lang="en-US" dirty="0" smtClean="0"/>
-              <a:t>Multi-Threaded Programming in </a:t>
+              <a:rPr lang="en-US" smtClean="0"/>
+              <a:t>Multi-threaded </a:t>
+            </a:r>
+            <a:r>
+              <a:rPr lang="en-US" dirty="0" smtClean="0"/>
+              <a:t>Programming in </a:t>
             </a:r>
             <a:r>
               <a:rPr lang="en-US" dirty="0" err="1" smtClean="0"/>
-              <a:t>.Net</a:t>
-            </a:r>
-            <a:endParaRPr lang="en-US" dirty="0"/>
+              <a:t>.</a:t>
+            </a:r>
+            <a:r>
+              <a:rPr lang="en-US" dirty="0" err="1" smtClean="0"/>
+              <a:t>Net</a:t>
+            </a:r>
+            <a:endParaRPr lang="en-US" dirty="0" smtClean="0"/>
+          </a:p>
+        </p:txBody>
+      </p:sp>
+      <p:sp>
+        <p:nvSpPr>
+          <p:cNvPr id="4" name="Subtitle 6"/>
+          <p:cNvSpPr txBox="1">
+            <a:spLocks/>
+          </p:cNvSpPr>
+          <p:nvPr/>
+        </p:nvSpPr>
+        <p:spPr>
+          <a:xfrm>
+            <a:off x="685800" y="4200525"/>
+            <a:ext cx="8092440" cy="583142"/>
+          </a:xfrm>
+          <a:prstGeom prst="rect">
+            <a:avLst/>
+          </a:prstGeom>
+        </p:spPr>
+        <p:txBody>
+          <a:bodyPr vert="horz" lIns="91440" tIns="45720" rIns="91440" bIns="45720" rtlCol="0">
+            <a:normAutofit/>
+          </a:bodyPr>
+          <a:lstStyle>
+            <a:lvl1pPr marL="365760" indent="0" algn="l" defTabSz="457200" rtl="0" eaLnBrk="1" latinLnBrk="0" hangingPunct="1">
+              <a:spcBef>
+                <a:spcPct val="20000"/>
+              </a:spcBef>
+              <a:buFont typeface="Arial"/>
+              <a:buNone/>
+              <a:defRPr sz="3200" kern="1200">
+                <a:solidFill>
+                  <a:schemeClr val="tx1">
+                    <a:tint val="75000"/>
+                  </a:schemeClr>
+                </a:solidFill>
+                <a:latin typeface="+mn-lt"/>
+                <a:ea typeface="+mn-ea"/>
+                <a:cs typeface="+mn-cs"/>
+              </a:defRPr>
+            </a:lvl1pPr>
+            <a:lvl2pPr marL="457200" indent="0" algn="ctr" defTabSz="457200" rtl="0" eaLnBrk="1" latinLnBrk="0" hangingPunct="1">
+              <a:spcBef>
+                <a:spcPct val="20000"/>
+              </a:spcBef>
+              <a:buFont typeface="Arial"/>
+              <a:buNone/>
+              <a:defRPr sz="2800" kern="1200">
+                <a:solidFill>
+                  <a:schemeClr val="tx1">
+                    <a:tint val="75000"/>
+                  </a:schemeClr>
+                </a:solidFill>
+                <a:latin typeface="+mn-lt"/>
+                <a:ea typeface="+mn-ea"/>
+                <a:cs typeface="+mn-cs"/>
+              </a:defRPr>
+            </a:lvl2pPr>
+            <a:lvl3pPr marL="914400" indent="0" algn="ctr" defTabSz="457200" rtl="0" eaLnBrk="1" latinLnBrk="0" hangingPunct="1">
+              <a:spcBef>
+                <a:spcPct val="20000"/>
+              </a:spcBef>
+              <a:buFont typeface="Arial"/>
+              <a:buNone/>
+              <a:defRPr sz="2400" kern="1200">
+                <a:solidFill>
+                  <a:schemeClr val="tx1">
+                    <a:tint val="75000"/>
+                  </a:schemeClr>
+                </a:solidFill>
+                <a:latin typeface="+mn-lt"/>
+                <a:ea typeface="+mn-ea"/>
+                <a:cs typeface="+mn-cs"/>
+              </a:defRPr>
+            </a:lvl3pPr>
+            <a:lvl4pPr marL="1371600" indent="0" algn="ctr" defTabSz="457200" rtl="0" eaLnBrk="1" latinLnBrk="0" hangingPunct="1">
+              <a:spcBef>
+                <a:spcPct val="20000"/>
+              </a:spcBef>
+              <a:buFont typeface="Arial"/>
+              <a:buNone/>
+              <a:defRPr sz="2000" kern="1200">
+                <a:solidFill>
+                  <a:schemeClr val="tx1">
+                    <a:tint val="75000"/>
+                  </a:schemeClr>
+                </a:solidFill>
+                <a:latin typeface="+mn-lt"/>
+                <a:ea typeface="+mn-ea"/>
+                <a:cs typeface="+mn-cs"/>
+              </a:defRPr>
+            </a:lvl4pPr>
+            <a:lvl5pPr marL="1828800" indent="0" algn="ctr" defTabSz="457200" rtl="0" eaLnBrk="1" latinLnBrk="0" hangingPunct="1">
+              <a:spcBef>
+                <a:spcPct val="20000"/>
+              </a:spcBef>
+              <a:buFont typeface="Arial"/>
+              <a:buNone/>
+              <a:defRPr sz="2000" kern="1200">
+                <a:solidFill>
+                  <a:schemeClr val="tx1">
+                    <a:tint val="75000"/>
+                  </a:schemeClr>
+                </a:solidFill>
+                <a:latin typeface="+mn-lt"/>
+                <a:ea typeface="+mn-ea"/>
+                <a:cs typeface="+mn-cs"/>
+              </a:defRPr>
+            </a:lvl5pPr>
+            <a:lvl6pPr marL="2286000" indent="0" algn="ctr" defTabSz="457200" rtl="0" eaLnBrk="1" latinLnBrk="0" hangingPunct="1">
+              <a:spcBef>
+                <a:spcPct val="20000"/>
+              </a:spcBef>
+              <a:buFont typeface="Arial"/>
+              <a:buNone/>
+              <a:defRPr sz="2000" kern="1200">
+                <a:solidFill>
+                  <a:schemeClr val="tx1">
+                    <a:tint val="75000"/>
+                  </a:schemeClr>
+                </a:solidFill>
+                <a:latin typeface="+mn-lt"/>
+                <a:ea typeface="+mn-ea"/>
+                <a:cs typeface="+mn-cs"/>
+              </a:defRPr>
+            </a:lvl6pPr>
+            <a:lvl7pPr marL="2743200" indent="0" algn="ctr" defTabSz="457200" rtl="0" eaLnBrk="1" latinLnBrk="0" hangingPunct="1">
+              <a:spcBef>
+                <a:spcPct val="20000"/>
+              </a:spcBef>
+              <a:buFont typeface="Arial"/>
+              <a:buNone/>
+              <a:defRPr sz="2000" kern="1200">
+                <a:solidFill>
+                  <a:schemeClr val="tx1">
+                    <a:tint val="75000"/>
+                  </a:schemeClr>
+                </a:solidFill>
+                <a:latin typeface="+mn-lt"/>
+                <a:ea typeface="+mn-ea"/>
+                <a:cs typeface="+mn-cs"/>
+              </a:defRPr>
+            </a:lvl7pPr>
+            <a:lvl8pPr marL="3200400" indent="0" algn="ctr" defTabSz="457200" rtl="0" eaLnBrk="1" latinLnBrk="0" hangingPunct="1">
+              <a:spcBef>
+                <a:spcPct val="20000"/>
+              </a:spcBef>
+              <a:buFont typeface="Arial"/>
+              <a:buNone/>
+              <a:defRPr sz="2000" kern="1200">
+                <a:solidFill>
+                  <a:schemeClr val="tx1">
+                    <a:tint val="75000"/>
+                  </a:schemeClr>
+                </a:solidFill>
+                <a:latin typeface="+mn-lt"/>
+                <a:ea typeface="+mn-ea"/>
+                <a:cs typeface="+mn-cs"/>
+              </a:defRPr>
+            </a:lvl8pPr>
+            <a:lvl9pPr marL="3657600" indent="0" algn="ctr" defTabSz="457200" rtl="0" eaLnBrk="1" latinLnBrk="0" hangingPunct="1">
+              <a:spcBef>
+                <a:spcPct val="20000"/>
+              </a:spcBef>
+              <a:buFont typeface="Arial"/>
+              <a:buNone/>
+              <a:defRPr sz="2000" kern="1200">
+                <a:solidFill>
+                  <a:schemeClr val="tx1">
+                    <a:tint val="75000"/>
+                  </a:schemeClr>
+                </a:solidFill>
+                <a:latin typeface="+mn-lt"/>
+                <a:ea typeface="+mn-ea"/>
+                <a:cs typeface="+mn-cs"/>
+              </a:defRPr>
+            </a:lvl9pPr>
+          </a:lstStyle>
+          <a:p>
+            <a:r>
+              <a:rPr lang="en-US" sz="2400" dirty="0" smtClean="0"/>
+              <a:t>Eric Burcham – Improving Enterprises</a:t>
+            </a:r>
+            <a:endParaRPr lang="en-US" sz="2400" dirty="0" smtClean="0"/>
           </a:p>
         </p:txBody>
       </p:sp>
@@ -4583,6 +4778,13 @@
   <p:clrMapOvr>
     <a:masterClrMapping/>
   </p:clrMapOvr>
+  <p:timing>
+    <p:tnLst>
+      <p:par>
+        <p:cTn id="1" dur="indefinite" restart="never" nodeType="tmRoot"/>
+      </p:par>
+    </p:tnLst>
+  </p:timing>
 </p:sld>
 </file>
 
@@ -4641,17 +4843,13 @@
         <p:spPr/>
         <p:txBody>
           <a:bodyPr>
-            <a:normAutofit fontScale="85000" lnSpcReduction="20000"/>
+            <a:normAutofit fontScale="70000" lnSpcReduction="20000"/>
           </a:bodyPr>
           <a:lstStyle/>
           <a:p>
             <a:r>
               <a:rPr lang="en-US" dirty="0" smtClean="0"/>
-              <a:t>I’m not </a:t>
-            </a:r>
-            <a:r>
-              <a:rPr lang="en-US" smtClean="0"/>
-              <a:t>an expert.</a:t>
+              <a:t>I’m not an expert.</a:t>
             </a:r>
           </a:p>
           <a:p>
@@ -4724,6 +4922,20 @@
               <a:t>.</a:t>
             </a:r>
             <a:endParaRPr lang="en-US" dirty="0"/>
+          </a:p>
+          <a:p>
+            <a:r>
+              <a:rPr lang="en-US" dirty="0" smtClean="0"/>
+              <a:t>Eric’s Rule of Optimization</a:t>
+            </a:r>
+          </a:p>
+          <a:p>
+            <a:pPr lvl="1"/>
+            <a:r>
+              <a:rPr lang="en-US" dirty="0" smtClean="0"/>
+              <a:t>Do whatever the heck you want!</a:t>
+            </a:r>
+            <a:endParaRPr lang="en-US" dirty="0" smtClean="0"/>
           </a:p>
         </p:txBody>
       </p:sp>
@@ -4737,6 +4949,13 @@
   <p:clrMapOvr>
     <a:masterClrMapping/>
   </p:clrMapOvr>
+  <p:timing>
+    <p:tnLst>
+      <p:par>
+        <p:cTn id="1" dur="indefinite" restart="never" nodeType="tmRoot"/>
+      </p:par>
+    </p:tnLst>
+  </p:timing>
 </p:sld>
 </file>
 
@@ -4824,6 +5043,13 @@
   <p:clrMapOvr>
     <a:masterClrMapping/>
   </p:clrMapOvr>
+  <p:timing>
+    <p:tnLst>
+      <p:par>
+        <p:cTn id="1" dur="indefinite" restart="never" nodeType="tmRoot"/>
+      </p:par>
+    </p:tnLst>
+  </p:timing>
 </p:sld>
 </file>
 
@@ -5743,6 +5969,13 @@
   <p:clrMapOvr>
     <a:masterClrMapping/>
   </p:clrMapOvr>
+  <p:timing>
+    <p:tnLst>
+      <p:par>
+        <p:cTn id="1" dur="indefinite" restart="never" nodeType="tmRoot"/>
+      </p:par>
+    </p:tnLst>
+  </p:timing>
 </p:sld>
 </file>
 
@@ -6842,6 +7075,13 @@
   <p:clrMapOvr>
     <a:masterClrMapping/>
   </p:clrMapOvr>
+  <p:timing>
+    <p:tnLst>
+      <p:par>
+        <p:cTn id="1" dur="indefinite" restart="never" nodeType="tmRoot"/>
+      </p:par>
+    </p:tnLst>
+  </p:timing>
 </p:sld>
 </file>
 
@@ -6959,6 +7199,13 @@
   <p:clrMapOvr>
     <a:masterClrMapping/>
   </p:clrMapOvr>
+  <p:timing>
+    <p:tnLst>
+      <p:par>
+        <p:cTn id="1" dur="indefinite" restart="never" nodeType="tmRoot"/>
+      </p:par>
+    </p:tnLst>
+  </p:timing>
 </p:sld>
 </file>
 
@@ -7113,6 +7360,13 @@
   <p:clrMapOvr>
     <a:masterClrMapping/>
   </p:clrMapOvr>
+  <p:timing>
+    <p:tnLst>
+      <p:par>
+        <p:cTn id="1" dur="indefinite" restart="never" nodeType="tmRoot"/>
+      </p:par>
+    </p:tnLst>
+  </p:timing>
 </p:sld>
 </file>
 
@@ -7194,6 +7448,13 @@
   <p:clrMapOvr>
     <a:masterClrMapping/>
   </p:clrMapOvr>
+  <p:timing>
+    <p:tnLst>
+      <p:par>
+        <p:cTn id="1" dur="indefinite" restart="never" nodeType="tmRoot"/>
+      </p:par>
+    </p:tnLst>
+  </p:timing>
 </p:sld>
 </file>
 
@@ -7291,6 +7552,13 @@
   <p:clrMapOvr>
     <a:masterClrMapping/>
   </p:clrMapOvr>
+  <p:timing>
+    <p:tnLst>
+      <p:par>
+        <p:cTn id="1" dur="indefinite" restart="never" nodeType="tmRoot"/>
+      </p:par>
+    </p:tnLst>
+  </p:timing>
 </p:sld>
 </file>
 
@@ -7881,18 +8149,18 @@
 </file>
 
 <file path=customXml/item1.xml><?xml version="1.0" encoding="utf-8"?>
+<p:properties xmlns:p="http://schemas.microsoft.com/office/2006/metadata/properties" xmlns:xsi="http://www.w3.org/2001/XMLSchema-instance" xmlns:pc="http://schemas.microsoft.com/office/infopath/2007/PartnerControls">
+  <documentManagement/>
+</p:properties>
+</file>
+
+<file path=customXml/item2.xml><?xml version="1.0" encoding="utf-8"?>
 <?mso-contentType ?>
 <FormTemplates xmlns="http://schemas.microsoft.com/sharepoint/v3/contenttype/forms">
   <Display>DocumentLibraryForm</Display>
   <Edit>DocumentLibraryForm</Edit>
   <New>DocumentLibraryForm</New>
 </FormTemplates>
-</file>
-
-<file path=customXml/item2.xml><?xml version="1.0" encoding="utf-8"?>
-<p:properties xmlns:p="http://schemas.microsoft.com/office/2006/metadata/properties" xmlns:xsi="http://www.w3.org/2001/XMLSchema-instance" xmlns:pc="http://schemas.microsoft.com/office/infopath/2007/PartnerControls">
-  <documentManagement/>
-</p:properties>
 </file>
 
 <file path=customXml/item3.xml><?xml version="1.0" encoding="utf-8"?>
@@ -8010,14 +8278,6 @@
 </file>
 
 <file path=customXml/itemProps1.xml><?xml version="1.0" encoding="utf-8"?>
-<ds:datastoreItem xmlns:ds="http://schemas.openxmlformats.org/officeDocument/2006/customXml" ds:itemID="{B857AB07-B2ED-439E-860F-4F56FB345D1B}">
-  <ds:schemaRefs>
-    <ds:schemaRef ds:uri="http://schemas.microsoft.com/sharepoint/v3/contenttype/forms"/>
-  </ds:schemaRefs>
-</ds:datastoreItem>
-</file>
-
-<file path=customXml/itemProps2.xml><?xml version="1.0" encoding="utf-8"?>
 <ds:datastoreItem xmlns:ds="http://schemas.openxmlformats.org/officeDocument/2006/customXml" ds:itemID="{A04551C0-1604-41A0-9B5C-A5F88AD2E0FE}">
   <ds:schemaRefs>
     <ds:schemaRef ds:uri="http://purl.org/dc/terms/"/>
@@ -8028,6 +8288,14 @@
     <ds:schemaRef ds:uri="http://schemas.microsoft.com/office/2006/metadata/properties"/>
     <ds:schemaRef ds:uri="http://www.w3.org/XML/1998/namespace"/>
     <ds:schemaRef ds:uri="http://purl.org/dc/dcmitype/"/>
+  </ds:schemaRefs>
+</ds:datastoreItem>
+</file>
+
+<file path=customXml/itemProps2.xml><?xml version="1.0" encoding="utf-8"?>
+<ds:datastoreItem xmlns:ds="http://schemas.openxmlformats.org/officeDocument/2006/customXml" ds:itemID="{B857AB07-B2ED-439E-860F-4F56FB345D1B}">
+  <ds:schemaRefs>
+    <ds:schemaRef ds:uri="http://schemas.microsoft.com/sharepoint/v3/contenttype/forms"/>
   </ds:schemaRefs>
 </ds:datastoreItem>
 </file>

</xml_diff>

<commit_message>
Updates to front page of presentation.
</commit_message>
<xml_diff>
--- a/Presentation/THasINKync.pptx
+++ b/Presentation/THasINKync.pptx
@@ -143,7 +143,7 @@
   </p:defaultTextStyle>
   <p:extLst>
     <p:ext uri="{EFAFB233-063F-42B5-8137-9DF3F51BA10A}">
-      <p15:sldGuideLst xmlns:p15="http://schemas.microsoft.com/office/powerpoint/2012/main" xmlns="">
+      <p15:sldGuideLst xmlns="" xmlns:p15="http://schemas.microsoft.com/office/powerpoint/2012/main">
         <p15:guide id="1" orient="horz" pos="1620" userDrawn="1">
           <p15:clr>
             <a:srgbClr val="A4A3A4"/>
@@ -2538,14 +2538,35 @@
           <a:avLst/>
         </a:prstGeom>
       </dgm:spPr>
+      <dgm:t>
+        <a:bodyPr/>
+        <a:lstStyle/>
+        <a:p>
+          <a:endParaRPr lang="en-US"/>
+        </a:p>
+      </dgm:t>
     </dgm:pt>
     <dgm:pt modelId="{6F3F6FFB-3805-400E-92AC-42AFFB8E29D5}" type="pres">
       <dgm:prSet presAssocID="{CD4930DB-9E16-45D7-A941-F04564052566}" presName="sibTrans" presStyleLbl="sibTrans2D1" presStyleIdx="0" presStyleCnt="2"/>
       <dgm:spPr/>
+      <dgm:t>
+        <a:bodyPr/>
+        <a:lstStyle/>
+        <a:p>
+          <a:endParaRPr lang="en-US"/>
+        </a:p>
+      </dgm:t>
     </dgm:pt>
     <dgm:pt modelId="{47F289B9-F621-4F9E-8974-46D12DF866E8}" type="pres">
       <dgm:prSet presAssocID="{CD4930DB-9E16-45D7-A941-F04564052566}" presName="connectorText" presStyleLbl="sibTrans2D1" presStyleIdx="0" presStyleCnt="2"/>
       <dgm:spPr/>
+      <dgm:t>
+        <a:bodyPr/>
+        <a:lstStyle/>
+        <a:p>
+          <a:endParaRPr lang="en-US"/>
+        </a:p>
+      </dgm:t>
     </dgm:pt>
     <dgm:pt modelId="{25EF5F4E-FB50-4FF9-B013-E9D8AA82EDC7}" type="pres">
       <dgm:prSet presAssocID="{664EDF7A-82D5-4C7B-89B3-4A4AD215C312}" presName="node" presStyleLbl="node1" presStyleIdx="1" presStyleCnt="3" custLinFactX="-100000" custLinFactNeighborX="-119411">
@@ -2565,10 +2586,24 @@
     <dgm:pt modelId="{1BBC6809-A424-46A5-9C8A-0973516973CB}" type="pres">
       <dgm:prSet presAssocID="{03F2437C-3AC3-466B-8CE8-45A94526F7CB}" presName="sibTrans" presStyleLbl="sibTrans2D1" presStyleIdx="1" presStyleCnt="2"/>
       <dgm:spPr/>
+      <dgm:t>
+        <a:bodyPr/>
+        <a:lstStyle/>
+        <a:p>
+          <a:endParaRPr lang="en-US"/>
+        </a:p>
+      </dgm:t>
     </dgm:pt>
     <dgm:pt modelId="{E0F59919-461D-496A-B5ED-D8473DB1C6E6}" type="pres">
       <dgm:prSet presAssocID="{03F2437C-3AC3-466B-8CE8-45A94526F7CB}" presName="connectorText" presStyleLbl="sibTrans2D1" presStyleIdx="1" presStyleCnt="2"/>
       <dgm:spPr/>
+      <dgm:t>
+        <a:bodyPr/>
+        <a:lstStyle/>
+        <a:p>
+          <a:endParaRPr lang="en-US"/>
+        </a:p>
+      </dgm:t>
     </dgm:pt>
     <dgm:pt modelId="{A72FF043-F390-4BC5-BCF5-E6F82BAB33C5}" type="pres">
       <dgm:prSet presAssocID="{10BA4DF9-3977-40F3-9350-4127133758CE}" presName="node" presStyleLbl="node1" presStyleIdx="2" presStyleCnt="3" custLinFactX="-100000" custLinFactNeighborX="-119411">
@@ -2577,20 +2612,27 @@
         </dgm:presLayoutVars>
       </dgm:prSet>
       <dgm:spPr/>
+      <dgm:t>
+        <a:bodyPr/>
+        <a:lstStyle/>
+        <a:p>
+          <a:endParaRPr lang="en-US"/>
+        </a:p>
+      </dgm:t>
     </dgm:pt>
   </dgm:ptLst>
   <dgm:cxnLst>
+    <dgm:cxn modelId="{845BDCBB-27C8-4427-8CA6-4C7991233A69}" type="presOf" srcId="{10BA4DF9-3977-40F3-9350-4127133758CE}" destId="{A72FF043-F390-4BC5-BCF5-E6F82BAB33C5}" srcOrd="0" destOrd="0" presId="urn:microsoft.com/office/officeart/2005/8/layout/process2"/>
     <dgm:cxn modelId="{4A3A3F1E-54F0-41C0-BABD-E9679DAE7385}" type="presOf" srcId="{6B5AC9DC-9294-405D-A9B8-81899C5DC61F}" destId="{D22E5A64-7745-4CC9-B911-2AB09810F2F9}" srcOrd="0" destOrd="0" presId="urn:microsoft.com/office/officeart/2005/8/layout/process2"/>
+    <dgm:cxn modelId="{DB3C8DC5-9C02-4DE5-A85F-96524C655785}" type="presOf" srcId="{03F2437C-3AC3-466B-8CE8-45A94526F7CB}" destId="{E0F59919-461D-496A-B5ED-D8473DB1C6E6}" srcOrd="1" destOrd="0" presId="urn:microsoft.com/office/officeart/2005/8/layout/process2"/>
+    <dgm:cxn modelId="{0617395C-E2B4-4D65-B990-27AFA2A19D35}" type="presOf" srcId="{CD4930DB-9E16-45D7-A941-F04564052566}" destId="{47F289B9-F621-4F9E-8974-46D12DF866E8}" srcOrd="1" destOrd="0" presId="urn:microsoft.com/office/officeart/2005/8/layout/process2"/>
+    <dgm:cxn modelId="{8712A26B-C7F9-4D75-9F14-8E516CF6D931}" type="presOf" srcId="{03F2437C-3AC3-466B-8CE8-45A94526F7CB}" destId="{1BBC6809-A424-46A5-9C8A-0973516973CB}" srcOrd="0" destOrd="0" presId="urn:microsoft.com/office/officeart/2005/8/layout/process2"/>
+    <dgm:cxn modelId="{F26E437C-5FCE-402A-A9CD-5DB337C731D2}" type="presOf" srcId="{CD4930DB-9E16-45D7-A941-F04564052566}" destId="{6F3F6FFB-3805-400E-92AC-42AFFB8E29D5}" srcOrd="0" destOrd="0" presId="urn:microsoft.com/office/officeart/2005/8/layout/process2"/>
+    <dgm:cxn modelId="{FEB706FB-E2F1-4DBA-9C0A-FE7702D7481C}" srcId="{6B5AC9DC-9294-405D-A9B8-81899C5DC61F}" destId="{C4DD3DF8-75E8-43F8-8108-B0919A499FA8}" srcOrd="0" destOrd="0" parTransId="{BF04CA19-25D0-47E3-AC5A-9BBCBD319A23}" sibTransId="{CD4930DB-9E16-45D7-A941-F04564052566}"/>
+    <dgm:cxn modelId="{69839572-67B4-42FB-86E2-32F6F5D98D95}" srcId="{6B5AC9DC-9294-405D-A9B8-81899C5DC61F}" destId="{664EDF7A-82D5-4C7B-89B3-4A4AD215C312}" srcOrd="1" destOrd="0" parTransId="{E4EF8D5A-724A-4C3C-A443-ABD241C60D39}" sibTransId="{03F2437C-3AC3-466B-8CE8-45A94526F7CB}"/>
+    <dgm:cxn modelId="{9C10E671-FD41-4715-87D9-887A68F82ECD}" srcId="{6B5AC9DC-9294-405D-A9B8-81899C5DC61F}" destId="{10BA4DF9-3977-40F3-9350-4127133758CE}" srcOrd="2" destOrd="0" parTransId="{9151ACCC-5E0B-45CF-8232-339C6CA2F4BA}" sibTransId="{6BACF364-D3A9-4A22-B6EF-51CAE35A2960}"/>
     <dgm:cxn modelId="{F777CD59-121F-4CE7-968B-9F2BFB91D522}" type="presOf" srcId="{C4DD3DF8-75E8-43F8-8108-B0919A499FA8}" destId="{B88EDF4C-4C3E-43DA-8D4C-21268F4ED6EF}" srcOrd="0" destOrd="0" presId="urn:microsoft.com/office/officeart/2005/8/layout/process2"/>
-    <dgm:cxn modelId="{F26E437C-5FCE-402A-A9CD-5DB337C731D2}" type="presOf" srcId="{CD4930DB-9E16-45D7-A941-F04564052566}" destId="{6F3F6FFB-3805-400E-92AC-42AFFB8E29D5}" srcOrd="0" destOrd="0" presId="urn:microsoft.com/office/officeart/2005/8/layout/process2"/>
-    <dgm:cxn modelId="{9C10E671-FD41-4715-87D9-887A68F82ECD}" srcId="{6B5AC9DC-9294-405D-A9B8-81899C5DC61F}" destId="{10BA4DF9-3977-40F3-9350-4127133758CE}" srcOrd="2" destOrd="0" parTransId="{9151ACCC-5E0B-45CF-8232-339C6CA2F4BA}" sibTransId="{6BACF364-D3A9-4A22-B6EF-51CAE35A2960}"/>
-    <dgm:cxn modelId="{8712A26B-C7F9-4D75-9F14-8E516CF6D931}" type="presOf" srcId="{03F2437C-3AC3-466B-8CE8-45A94526F7CB}" destId="{1BBC6809-A424-46A5-9C8A-0973516973CB}" srcOrd="0" destOrd="0" presId="urn:microsoft.com/office/officeart/2005/8/layout/process2"/>
-    <dgm:cxn modelId="{845BDCBB-27C8-4427-8CA6-4C7991233A69}" type="presOf" srcId="{10BA4DF9-3977-40F3-9350-4127133758CE}" destId="{A72FF043-F390-4BC5-BCF5-E6F82BAB33C5}" srcOrd="0" destOrd="0" presId="urn:microsoft.com/office/officeart/2005/8/layout/process2"/>
-    <dgm:cxn modelId="{FEB706FB-E2F1-4DBA-9C0A-FE7702D7481C}" srcId="{6B5AC9DC-9294-405D-A9B8-81899C5DC61F}" destId="{C4DD3DF8-75E8-43F8-8108-B0919A499FA8}" srcOrd="0" destOrd="0" parTransId="{BF04CA19-25D0-47E3-AC5A-9BBCBD319A23}" sibTransId="{CD4930DB-9E16-45D7-A941-F04564052566}"/>
-    <dgm:cxn modelId="{0617395C-E2B4-4D65-B990-27AFA2A19D35}" type="presOf" srcId="{CD4930DB-9E16-45D7-A941-F04564052566}" destId="{47F289B9-F621-4F9E-8974-46D12DF866E8}" srcOrd="1" destOrd="0" presId="urn:microsoft.com/office/officeart/2005/8/layout/process2"/>
-    <dgm:cxn modelId="{DB3C8DC5-9C02-4DE5-A85F-96524C655785}" type="presOf" srcId="{03F2437C-3AC3-466B-8CE8-45A94526F7CB}" destId="{E0F59919-461D-496A-B5ED-D8473DB1C6E6}" srcOrd="1" destOrd="0" presId="urn:microsoft.com/office/officeart/2005/8/layout/process2"/>
     <dgm:cxn modelId="{DC29A7DF-2A50-49DB-AADD-23222C107F55}" type="presOf" srcId="{664EDF7A-82D5-4C7B-89B3-4A4AD215C312}" destId="{25EF5F4E-FB50-4FF9-B013-E9D8AA82EDC7}" srcOrd="0" destOrd="0" presId="urn:microsoft.com/office/officeart/2005/8/layout/process2"/>
-    <dgm:cxn modelId="{69839572-67B4-42FB-86E2-32F6F5D98D95}" srcId="{6B5AC9DC-9294-405D-A9B8-81899C5DC61F}" destId="{664EDF7A-82D5-4C7B-89B3-4A4AD215C312}" srcOrd="1" destOrd="0" parTransId="{E4EF8D5A-724A-4C3C-A443-ABD241C60D39}" sibTransId="{03F2437C-3AC3-466B-8CE8-45A94526F7CB}"/>
     <dgm:cxn modelId="{28E3880C-5ABA-4A10-81FA-567F5CC3DBFF}" type="presParOf" srcId="{D22E5A64-7745-4CC9-B911-2AB09810F2F9}" destId="{B88EDF4C-4C3E-43DA-8D4C-21268F4ED6EF}" srcOrd="0" destOrd="0" presId="urn:microsoft.com/office/officeart/2005/8/layout/process2"/>
     <dgm:cxn modelId="{F415ED4C-9C43-4687-B0D7-73C3E096B854}" type="presParOf" srcId="{D22E5A64-7745-4CC9-B911-2AB09810F2F9}" destId="{6F3F6FFB-3805-400E-92AC-42AFFB8E29D5}" srcOrd="1" destOrd="0" presId="urn:microsoft.com/office/officeart/2005/8/layout/process2"/>
     <dgm:cxn modelId="{5645C679-72EC-4478-ACAB-4D0449C111AD}" type="presParOf" srcId="{6F3F6FFB-3805-400E-92AC-42AFFB8E29D5}" destId="{47F289B9-F621-4F9E-8974-46D12DF866E8}" srcOrd="0" destOrd="0" presId="urn:microsoft.com/office/officeart/2005/8/layout/process2"/>
@@ -2746,14 +2788,35 @@
           <a:avLst/>
         </a:prstGeom>
       </dgm:spPr>
+      <dgm:t>
+        <a:bodyPr/>
+        <a:lstStyle/>
+        <a:p>
+          <a:endParaRPr lang="en-US"/>
+        </a:p>
+      </dgm:t>
     </dgm:pt>
     <dgm:pt modelId="{6F3F6FFB-3805-400E-92AC-42AFFB8E29D5}" type="pres">
       <dgm:prSet presAssocID="{CD4930DB-9E16-45D7-A941-F04564052566}" presName="sibTrans" presStyleLbl="sibTrans2D1" presStyleIdx="0" presStyleCnt="2"/>
       <dgm:spPr/>
+      <dgm:t>
+        <a:bodyPr/>
+        <a:lstStyle/>
+        <a:p>
+          <a:endParaRPr lang="en-US"/>
+        </a:p>
+      </dgm:t>
     </dgm:pt>
     <dgm:pt modelId="{47F289B9-F621-4F9E-8974-46D12DF866E8}" type="pres">
       <dgm:prSet presAssocID="{CD4930DB-9E16-45D7-A941-F04564052566}" presName="connectorText" presStyleLbl="sibTrans2D1" presStyleIdx="0" presStyleCnt="2"/>
       <dgm:spPr/>
+      <dgm:t>
+        <a:bodyPr/>
+        <a:lstStyle/>
+        <a:p>
+          <a:endParaRPr lang="en-US"/>
+        </a:p>
+      </dgm:t>
     </dgm:pt>
     <dgm:pt modelId="{25EF5F4E-FB50-4FF9-B013-E9D8AA82EDC7}" type="pres">
       <dgm:prSet presAssocID="{664EDF7A-82D5-4C7B-89B3-4A4AD215C312}" presName="node" presStyleLbl="node1" presStyleIdx="1" presStyleCnt="3" custLinFactX="-100000" custLinFactNeighborX="-119411">
@@ -2773,10 +2836,24 @@
     <dgm:pt modelId="{1BBC6809-A424-46A5-9C8A-0973516973CB}" type="pres">
       <dgm:prSet presAssocID="{03F2437C-3AC3-466B-8CE8-45A94526F7CB}" presName="sibTrans" presStyleLbl="sibTrans2D1" presStyleIdx="1" presStyleCnt="2"/>
       <dgm:spPr/>
+      <dgm:t>
+        <a:bodyPr/>
+        <a:lstStyle/>
+        <a:p>
+          <a:endParaRPr lang="en-US"/>
+        </a:p>
+      </dgm:t>
     </dgm:pt>
     <dgm:pt modelId="{E0F59919-461D-496A-B5ED-D8473DB1C6E6}" type="pres">
       <dgm:prSet presAssocID="{03F2437C-3AC3-466B-8CE8-45A94526F7CB}" presName="connectorText" presStyleLbl="sibTrans2D1" presStyleIdx="1" presStyleCnt="2"/>
       <dgm:spPr/>
+      <dgm:t>
+        <a:bodyPr/>
+        <a:lstStyle/>
+        <a:p>
+          <a:endParaRPr lang="en-US"/>
+        </a:p>
+      </dgm:t>
     </dgm:pt>
     <dgm:pt modelId="{A72FF043-F390-4BC5-BCF5-E6F82BAB33C5}" type="pres">
       <dgm:prSet presAssocID="{10BA4DF9-3977-40F3-9350-4127133758CE}" presName="node" presStyleLbl="node1" presStyleIdx="2" presStyleCnt="3" custLinFactX="-100000" custLinFactNeighborX="-119411">
@@ -2785,6 +2862,13 @@
         </dgm:presLayoutVars>
       </dgm:prSet>
       <dgm:spPr/>
+      <dgm:t>
+        <a:bodyPr/>
+        <a:lstStyle/>
+        <a:p>
+          <a:endParaRPr lang="en-US"/>
+        </a:p>
+      </dgm:t>
     </dgm:pt>
   </dgm:ptLst>
   <dgm:cxnLst>
@@ -2954,14 +3038,35 @@
           <a:avLst/>
         </a:prstGeom>
       </dgm:spPr>
+      <dgm:t>
+        <a:bodyPr/>
+        <a:lstStyle/>
+        <a:p>
+          <a:endParaRPr lang="en-US"/>
+        </a:p>
+      </dgm:t>
     </dgm:pt>
     <dgm:pt modelId="{6F3F6FFB-3805-400E-92AC-42AFFB8E29D5}" type="pres">
       <dgm:prSet presAssocID="{CD4930DB-9E16-45D7-A941-F04564052566}" presName="sibTrans" presStyleLbl="sibTrans2D1" presStyleIdx="0" presStyleCnt="2"/>
       <dgm:spPr/>
+      <dgm:t>
+        <a:bodyPr/>
+        <a:lstStyle/>
+        <a:p>
+          <a:endParaRPr lang="en-US"/>
+        </a:p>
+      </dgm:t>
     </dgm:pt>
     <dgm:pt modelId="{47F289B9-F621-4F9E-8974-46D12DF866E8}" type="pres">
       <dgm:prSet presAssocID="{CD4930DB-9E16-45D7-A941-F04564052566}" presName="connectorText" presStyleLbl="sibTrans2D1" presStyleIdx="0" presStyleCnt="2"/>
       <dgm:spPr/>
+      <dgm:t>
+        <a:bodyPr/>
+        <a:lstStyle/>
+        <a:p>
+          <a:endParaRPr lang="en-US"/>
+        </a:p>
+      </dgm:t>
     </dgm:pt>
     <dgm:pt modelId="{25EF5F4E-FB50-4FF9-B013-E9D8AA82EDC7}" type="pres">
       <dgm:prSet presAssocID="{664EDF7A-82D5-4C7B-89B3-4A4AD215C312}" presName="node" presStyleLbl="node1" presStyleIdx="1" presStyleCnt="3" custLinFactX="-100000" custLinFactNeighborX="-119411">
@@ -2981,10 +3086,24 @@
     <dgm:pt modelId="{1BBC6809-A424-46A5-9C8A-0973516973CB}" type="pres">
       <dgm:prSet presAssocID="{03F2437C-3AC3-466B-8CE8-45A94526F7CB}" presName="sibTrans" presStyleLbl="sibTrans2D1" presStyleIdx="1" presStyleCnt="2"/>
       <dgm:spPr/>
+      <dgm:t>
+        <a:bodyPr/>
+        <a:lstStyle/>
+        <a:p>
+          <a:endParaRPr lang="en-US"/>
+        </a:p>
+      </dgm:t>
     </dgm:pt>
     <dgm:pt modelId="{E0F59919-461D-496A-B5ED-D8473DB1C6E6}" type="pres">
       <dgm:prSet presAssocID="{03F2437C-3AC3-466B-8CE8-45A94526F7CB}" presName="connectorText" presStyleLbl="sibTrans2D1" presStyleIdx="1" presStyleCnt="2"/>
       <dgm:spPr/>
+      <dgm:t>
+        <a:bodyPr/>
+        <a:lstStyle/>
+        <a:p>
+          <a:endParaRPr lang="en-US"/>
+        </a:p>
+      </dgm:t>
     </dgm:pt>
     <dgm:pt modelId="{A72FF043-F390-4BC5-BCF5-E6F82BAB33C5}" type="pres">
       <dgm:prSet presAssocID="{10BA4DF9-3977-40F3-9350-4127133758CE}" presName="node" presStyleLbl="node1" presStyleIdx="2" presStyleCnt="3" custLinFactX="-100000" custLinFactNeighborX="-119411">
@@ -2993,20 +3112,27 @@
         </dgm:presLayoutVars>
       </dgm:prSet>
       <dgm:spPr/>
+      <dgm:t>
+        <a:bodyPr/>
+        <a:lstStyle/>
+        <a:p>
+          <a:endParaRPr lang="en-US"/>
+        </a:p>
+      </dgm:t>
     </dgm:pt>
   </dgm:ptLst>
   <dgm:cxnLst>
+    <dgm:cxn modelId="{4951206D-BC5E-4D48-94D0-6726F09A9B06}" type="presOf" srcId="{10BA4DF9-3977-40F3-9350-4127133758CE}" destId="{A72FF043-F390-4BC5-BCF5-E6F82BAB33C5}" srcOrd="0" destOrd="0" presId="urn:microsoft.com/office/officeart/2005/8/layout/process2"/>
+    <dgm:cxn modelId="{BABAD666-8674-47CF-9655-DFE7AA1FC12B}" type="presOf" srcId="{6B5AC9DC-9294-405D-A9B8-81899C5DC61F}" destId="{D22E5A64-7745-4CC9-B911-2AB09810F2F9}" srcOrd="0" destOrd="0" presId="urn:microsoft.com/office/officeart/2005/8/layout/process2"/>
+    <dgm:cxn modelId="{6EE5B4CF-9AD7-4B0A-A972-CD0FCD8DFB44}" type="presOf" srcId="{664EDF7A-82D5-4C7B-89B3-4A4AD215C312}" destId="{25EF5F4E-FB50-4FF9-B013-E9D8AA82EDC7}" srcOrd="0" destOrd="0" presId="urn:microsoft.com/office/officeart/2005/8/layout/process2"/>
+    <dgm:cxn modelId="{FEB706FB-E2F1-4DBA-9C0A-FE7702D7481C}" srcId="{6B5AC9DC-9294-405D-A9B8-81899C5DC61F}" destId="{C4DD3DF8-75E8-43F8-8108-B0919A499FA8}" srcOrd="0" destOrd="0" parTransId="{BF04CA19-25D0-47E3-AC5A-9BBCBD319A23}" sibTransId="{CD4930DB-9E16-45D7-A941-F04564052566}"/>
+    <dgm:cxn modelId="{69839572-67B4-42FB-86E2-32F6F5D98D95}" srcId="{6B5AC9DC-9294-405D-A9B8-81899C5DC61F}" destId="{664EDF7A-82D5-4C7B-89B3-4A4AD215C312}" srcOrd="1" destOrd="0" parTransId="{E4EF8D5A-724A-4C3C-A443-ABD241C60D39}" sibTransId="{03F2437C-3AC3-466B-8CE8-45A94526F7CB}"/>
+    <dgm:cxn modelId="{9C10E671-FD41-4715-87D9-887A68F82ECD}" srcId="{6B5AC9DC-9294-405D-A9B8-81899C5DC61F}" destId="{10BA4DF9-3977-40F3-9350-4127133758CE}" srcOrd="2" destOrd="0" parTransId="{9151ACCC-5E0B-45CF-8232-339C6CA2F4BA}" sibTransId="{6BACF364-D3A9-4A22-B6EF-51CAE35A2960}"/>
+    <dgm:cxn modelId="{FDCFFD06-CF29-405A-8E5A-3E3D134BA163}" type="presOf" srcId="{CD4930DB-9E16-45D7-A941-F04564052566}" destId="{6F3F6FFB-3805-400E-92AC-42AFFB8E29D5}" srcOrd="0" destOrd="0" presId="urn:microsoft.com/office/officeart/2005/8/layout/process2"/>
+    <dgm:cxn modelId="{30F9F952-42BA-44FE-9F7F-1ADCF5DD9937}" type="presOf" srcId="{03F2437C-3AC3-466B-8CE8-45A94526F7CB}" destId="{1BBC6809-A424-46A5-9C8A-0973516973CB}" srcOrd="0" destOrd="0" presId="urn:microsoft.com/office/officeart/2005/8/layout/process2"/>
+    <dgm:cxn modelId="{6F1DD139-7C23-48F0-9247-B21ED1CA576E}" type="presOf" srcId="{CD4930DB-9E16-45D7-A941-F04564052566}" destId="{47F289B9-F621-4F9E-8974-46D12DF866E8}" srcOrd="1" destOrd="0" presId="urn:microsoft.com/office/officeart/2005/8/layout/process2"/>
     <dgm:cxn modelId="{9FE9001C-F68E-455D-B6BA-3987D83F8D4D}" type="presOf" srcId="{C4DD3DF8-75E8-43F8-8108-B0919A499FA8}" destId="{B88EDF4C-4C3E-43DA-8D4C-21268F4ED6EF}" srcOrd="0" destOrd="0" presId="urn:microsoft.com/office/officeart/2005/8/layout/process2"/>
-    <dgm:cxn modelId="{6EE5B4CF-9AD7-4B0A-A972-CD0FCD8DFB44}" type="presOf" srcId="{664EDF7A-82D5-4C7B-89B3-4A4AD215C312}" destId="{25EF5F4E-FB50-4FF9-B013-E9D8AA82EDC7}" srcOrd="0" destOrd="0" presId="urn:microsoft.com/office/officeart/2005/8/layout/process2"/>
-    <dgm:cxn modelId="{FDCFFD06-CF29-405A-8E5A-3E3D134BA163}" type="presOf" srcId="{CD4930DB-9E16-45D7-A941-F04564052566}" destId="{6F3F6FFB-3805-400E-92AC-42AFFB8E29D5}" srcOrd="0" destOrd="0" presId="urn:microsoft.com/office/officeart/2005/8/layout/process2"/>
-    <dgm:cxn modelId="{4951206D-BC5E-4D48-94D0-6726F09A9B06}" type="presOf" srcId="{10BA4DF9-3977-40F3-9350-4127133758CE}" destId="{A72FF043-F390-4BC5-BCF5-E6F82BAB33C5}" srcOrd="0" destOrd="0" presId="urn:microsoft.com/office/officeart/2005/8/layout/process2"/>
-    <dgm:cxn modelId="{9C10E671-FD41-4715-87D9-887A68F82ECD}" srcId="{6B5AC9DC-9294-405D-A9B8-81899C5DC61F}" destId="{10BA4DF9-3977-40F3-9350-4127133758CE}" srcOrd="2" destOrd="0" parTransId="{9151ACCC-5E0B-45CF-8232-339C6CA2F4BA}" sibTransId="{6BACF364-D3A9-4A22-B6EF-51CAE35A2960}"/>
-    <dgm:cxn modelId="{6F1DD139-7C23-48F0-9247-B21ED1CA576E}" type="presOf" srcId="{CD4930DB-9E16-45D7-A941-F04564052566}" destId="{47F289B9-F621-4F9E-8974-46D12DF866E8}" srcOrd="1" destOrd="0" presId="urn:microsoft.com/office/officeart/2005/8/layout/process2"/>
-    <dgm:cxn modelId="{FEB706FB-E2F1-4DBA-9C0A-FE7702D7481C}" srcId="{6B5AC9DC-9294-405D-A9B8-81899C5DC61F}" destId="{C4DD3DF8-75E8-43F8-8108-B0919A499FA8}" srcOrd="0" destOrd="0" parTransId="{BF04CA19-25D0-47E3-AC5A-9BBCBD319A23}" sibTransId="{CD4930DB-9E16-45D7-A941-F04564052566}"/>
-    <dgm:cxn modelId="{BABAD666-8674-47CF-9655-DFE7AA1FC12B}" type="presOf" srcId="{6B5AC9DC-9294-405D-A9B8-81899C5DC61F}" destId="{D22E5A64-7745-4CC9-B911-2AB09810F2F9}" srcOrd="0" destOrd="0" presId="urn:microsoft.com/office/officeart/2005/8/layout/process2"/>
-    <dgm:cxn modelId="{30F9F952-42BA-44FE-9F7F-1ADCF5DD9937}" type="presOf" srcId="{03F2437C-3AC3-466B-8CE8-45A94526F7CB}" destId="{1BBC6809-A424-46A5-9C8A-0973516973CB}" srcOrd="0" destOrd="0" presId="urn:microsoft.com/office/officeart/2005/8/layout/process2"/>
     <dgm:cxn modelId="{1780A82C-BF4A-4308-B182-8031C80B5E3C}" type="presOf" srcId="{03F2437C-3AC3-466B-8CE8-45A94526F7CB}" destId="{E0F59919-461D-496A-B5ED-D8473DB1C6E6}" srcOrd="1" destOrd="0" presId="urn:microsoft.com/office/officeart/2005/8/layout/process2"/>
-    <dgm:cxn modelId="{69839572-67B4-42FB-86E2-32F6F5D98D95}" srcId="{6B5AC9DC-9294-405D-A9B8-81899C5DC61F}" destId="{664EDF7A-82D5-4C7B-89B3-4A4AD215C312}" srcOrd="1" destOrd="0" parTransId="{E4EF8D5A-724A-4C3C-A443-ABD241C60D39}" sibTransId="{03F2437C-3AC3-466B-8CE8-45A94526F7CB}"/>
     <dgm:cxn modelId="{B314F7B1-B4F7-4646-8C08-7B17335E3A59}" type="presParOf" srcId="{D22E5A64-7745-4CC9-B911-2AB09810F2F9}" destId="{B88EDF4C-4C3E-43DA-8D4C-21268F4ED6EF}" srcOrd="0" destOrd="0" presId="urn:microsoft.com/office/officeart/2005/8/layout/process2"/>
     <dgm:cxn modelId="{0E2F60C4-2FC1-4C6A-94C9-9A7835DE7D37}" type="presParOf" srcId="{D22E5A64-7745-4CC9-B911-2AB09810F2F9}" destId="{6F3F6FFB-3805-400E-92AC-42AFFB8E29D5}" srcOrd="1" destOrd="0" presId="urn:microsoft.com/office/officeart/2005/8/layout/process2"/>
     <dgm:cxn modelId="{347BA163-663B-4285-A6FE-3DAD72DD0658}" type="presParOf" srcId="{6F3F6FFB-3805-400E-92AC-42AFFB8E29D5}" destId="{47F289B9-F621-4F9E-8974-46D12DF866E8}" srcOrd="0" destOrd="0" presId="urn:microsoft.com/office/officeart/2005/8/layout/process2"/>
@@ -3033,379 +3159,6 @@
       <dsp:cNvGrpSpPr/>
     </dsp:nvGrpSpPr>
     <dsp:grpSpPr/>
-    <dsp:sp modelId="{B88EDF4C-4C3E-43DA-8D4C-21268F4ED6EF}">
-      <dsp:nvSpPr>
-        <dsp:cNvPr id="0" name=""/>
-        <dsp:cNvSpPr/>
-      </dsp:nvSpPr>
-      <dsp:spPr>
-        <a:xfrm>
-          <a:off x="0" y="0"/>
-          <a:ext cx="1442986" cy="801658"/>
-        </a:xfrm>
-        <a:prstGeom prst="flowChartMultidocument">
-          <a:avLst/>
-        </a:prstGeom>
-        <a:solidFill>
-          <a:schemeClr val="accent1">
-            <a:hueOff val="0"/>
-            <a:satOff val="0"/>
-            <a:lumOff val="0"/>
-            <a:alphaOff val="0"/>
-          </a:schemeClr>
-        </a:solidFill>
-        <a:ln w="25400" cap="flat" cmpd="sng" algn="ctr">
-          <a:solidFill>
-            <a:schemeClr val="lt1">
-              <a:hueOff val="0"/>
-              <a:satOff val="0"/>
-              <a:lumOff val="0"/>
-              <a:alphaOff val="0"/>
-            </a:schemeClr>
-          </a:solidFill>
-          <a:prstDash val="solid"/>
-        </a:ln>
-        <a:effectLst/>
-      </dsp:spPr>
-      <dsp:style>
-        <a:lnRef idx="2">
-          <a:scrgbClr r="0" g="0" b="0"/>
-        </a:lnRef>
-        <a:fillRef idx="1">
-          <a:scrgbClr r="0" g="0" b="0"/>
-        </a:fillRef>
-        <a:effectRef idx="0">
-          <a:scrgbClr r="0" g="0" b="0"/>
-        </a:effectRef>
-        <a:fontRef idx="minor">
-          <a:schemeClr val="lt1"/>
-        </a:fontRef>
-      </dsp:style>
-      <dsp:txBody>
-        <a:bodyPr spcFirstLastPara="0" vert="horz" wrap="square" lIns="68580" tIns="68580" rIns="68580" bIns="68580" numCol="1" spcCol="1270" anchor="ctr" anchorCtr="0">
-          <a:noAutofit/>
-        </a:bodyPr>
-        <a:lstStyle/>
-        <a:p>
-          <a:pPr lvl="0" algn="ctr" defTabSz="800100">
-            <a:lnSpc>
-              <a:spcPct val="90000"/>
-            </a:lnSpc>
-            <a:spcBef>
-              <a:spcPct val="0"/>
-            </a:spcBef>
-            <a:spcAft>
-              <a:spcPct val="35000"/>
-            </a:spcAft>
-          </a:pPr>
-          <a:r>
-            <a:rPr lang="en-US" sz="1800" kern="1200" dirty="0" smtClean="0"/>
-            <a:t>…</a:t>
-          </a:r>
-          <a:endParaRPr lang="en-US" sz="1800" kern="1200" dirty="0"/>
-        </a:p>
-      </dsp:txBody>
-      <dsp:txXfrm>
-        <a:off x="0" y="136393"/>
-        <a:ext cx="1242237" cy="634906"/>
-      </dsp:txXfrm>
-    </dsp:sp>
-    <dsp:sp modelId="{6F3F6FFB-3805-400E-92AC-42AFFB8E29D5}">
-      <dsp:nvSpPr>
-        <dsp:cNvPr id="0" name=""/>
-        <dsp:cNvSpPr/>
-      </dsp:nvSpPr>
-      <dsp:spPr>
-        <a:xfrm rot="5400000">
-          <a:off x="571182" y="821700"/>
-          <a:ext cx="300622" cy="360746"/>
-        </a:xfrm>
-        <a:prstGeom prst="rightArrow">
-          <a:avLst>
-            <a:gd name="adj1" fmla="val 60000"/>
-            <a:gd name="adj2" fmla="val 50000"/>
-          </a:avLst>
-        </a:prstGeom>
-        <a:solidFill>
-          <a:schemeClr val="accent1">
-            <a:tint val="60000"/>
-            <a:hueOff val="0"/>
-            <a:satOff val="0"/>
-            <a:lumOff val="0"/>
-            <a:alphaOff val="0"/>
-          </a:schemeClr>
-        </a:solidFill>
-        <a:ln>
-          <a:noFill/>
-        </a:ln>
-        <a:effectLst/>
-      </dsp:spPr>
-      <dsp:style>
-        <a:lnRef idx="0">
-          <a:scrgbClr r="0" g="0" b="0"/>
-        </a:lnRef>
-        <a:fillRef idx="1">
-          <a:scrgbClr r="0" g="0" b="0"/>
-        </a:fillRef>
-        <a:effectRef idx="0">
-          <a:scrgbClr r="0" g="0" b="0"/>
-        </a:effectRef>
-        <a:fontRef idx="minor">
-          <a:schemeClr val="lt1"/>
-        </a:fontRef>
-      </dsp:style>
-      <dsp:txBody>
-        <a:bodyPr spcFirstLastPara="0" vert="horz" wrap="square" lIns="0" tIns="0" rIns="0" bIns="0" numCol="1" spcCol="1270" anchor="ctr" anchorCtr="0">
-          <a:noAutofit/>
-        </a:bodyPr>
-        <a:lstStyle/>
-        <a:p>
-          <a:pPr lvl="0" algn="ctr" defTabSz="622300">
-            <a:lnSpc>
-              <a:spcPct val="90000"/>
-            </a:lnSpc>
-            <a:spcBef>
-              <a:spcPct val="0"/>
-            </a:spcBef>
-            <a:spcAft>
-              <a:spcPct val="35000"/>
-            </a:spcAft>
-          </a:pPr>
-          <a:endParaRPr lang="en-US" sz="1400" kern="1200"/>
-        </a:p>
-      </dsp:txBody>
-      <dsp:txXfrm rot="-5400000">
-        <a:off x="613270" y="851762"/>
-        <a:ext cx="216448" cy="210435"/>
-      </dsp:txXfrm>
-    </dsp:sp>
-    <dsp:sp modelId="{25EF5F4E-FB50-4FF9-B013-E9D8AA82EDC7}">
-      <dsp:nvSpPr>
-        <dsp:cNvPr id="0" name=""/>
-        <dsp:cNvSpPr/>
-      </dsp:nvSpPr>
-      <dsp:spPr>
-        <a:xfrm>
-          <a:off x="0" y="1202488"/>
-          <a:ext cx="1442986" cy="801658"/>
-        </a:xfrm>
-        <a:prstGeom prst="roundRect">
-          <a:avLst>
-            <a:gd name="adj" fmla="val 10000"/>
-          </a:avLst>
-        </a:prstGeom>
-        <a:solidFill>
-          <a:schemeClr val="accent1">
-            <a:hueOff val="0"/>
-            <a:satOff val="0"/>
-            <a:lumOff val="0"/>
-            <a:alphaOff val="0"/>
-          </a:schemeClr>
-        </a:solidFill>
-        <a:ln w="25400" cap="flat" cmpd="sng" algn="ctr">
-          <a:solidFill>
-            <a:schemeClr val="lt1">
-              <a:hueOff val="0"/>
-              <a:satOff val="0"/>
-              <a:lumOff val="0"/>
-              <a:alphaOff val="0"/>
-            </a:schemeClr>
-          </a:solidFill>
-          <a:prstDash val="solid"/>
-        </a:ln>
-        <a:effectLst/>
-      </dsp:spPr>
-      <dsp:style>
-        <a:lnRef idx="2">
-          <a:scrgbClr r="0" g="0" b="0"/>
-        </a:lnRef>
-        <a:fillRef idx="1">
-          <a:scrgbClr r="0" g="0" b="0"/>
-        </a:fillRef>
-        <a:effectRef idx="0">
-          <a:scrgbClr r="0" g="0" b="0"/>
-        </a:effectRef>
-        <a:fontRef idx="minor">
-          <a:schemeClr val="lt1"/>
-        </a:fontRef>
-      </dsp:style>
-      <dsp:txBody>
-        <a:bodyPr spcFirstLastPara="0" vert="horz" wrap="square" lIns="68580" tIns="68580" rIns="68580" bIns="68580" numCol="1" spcCol="1270" anchor="ctr" anchorCtr="0">
-          <a:noAutofit/>
-        </a:bodyPr>
-        <a:lstStyle/>
-        <a:p>
-          <a:pPr lvl="0" algn="ctr" defTabSz="800100">
-            <a:lnSpc>
-              <a:spcPct val="90000"/>
-            </a:lnSpc>
-            <a:spcBef>
-              <a:spcPct val="0"/>
-            </a:spcBef>
-            <a:spcAft>
-              <a:spcPct val="35000"/>
-            </a:spcAft>
-          </a:pPr>
-          <a:r>
-            <a:rPr lang="en-US" sz="1800" kern="1200" dirty="0" smtClean="0"/>
-            <a:t>Accumulate Into Subtotal</a:t>
-          </a:r>
-          <a:endParaRPr lang="en-US" sz="1800" kern="1200" dirty="0"/>
-        </a:p>
-      </dsp:txBody>
-      <dsp:txXfrm>
-        <a:off x="23480" y="1225968"/>
-        <a:ext cx="1396026" cy="754698"/>
-      </dsp:txXfrm>
-    </dsp:sp>
-    <dsp:sp modelId="{1BBC6809-A424-46A5-9C8A-0973516973CB}">
-      <dsp:nvSpPr>
-        <dsp:cNvPr id="0" name=""/>
-        <dsp:cNvSpPr/>
-      </dsp:nvSpPr>
-      <dsp:spPr>
-        <a:xfrm rot="5400000">
-          <a:off x="571182" y="2024188"/>
-          <a:ext cx="300622" cy="360746"/>
-        </a:xfrm>
-        <a:prstGeom prst="rightArrow">
-          <a:avLst>
-            <a:gd name="adj1" fmla="val 60000"/>
-            <a:gd name="adj2" fmla="val 50000"/>
-          </a:avLst>
-        </a:prstGeom>
-        <a:solidFill>
-          <a:schemeClr val="accent1">
-            <a:tint val="60000"/>
-            <a:hueOff val="0"/>
-            <a:satOff val="0"/>
-            <a:lumOff val="0"/>
-            <a:alphaOff val="0"/>
-          </a:schemeClr>
-        </a:solidFill>
-        <a:ln>
-          <a:noFill/>
-        </a:ln>
-        <a:effectLst/>
-      </dsp:spPr>
-      <dsp:style>
-        <a:lnRef idx="0">
-          <a:scrgbClr r="0" g="0" b="0"/>
-        </a:lnRef>
-        <a:fillRef idx="1">
-          <a:scrgbClr r="0" g="0" b="0"/>
-        </a:fillRef>
-        <a:effectRef idx="0">
-          <a:scrgbClr r="0" g="0" b="0"/>
-        </a:effectRef>
-        <a:fontRef idx="minor">
-          <a:schemeClr val="lt1"/>
-        </a:fontRef>
-      </dsp:style>
-      <dsp:txBody>
-        <a:bodyPr spcFirstLastPara="0" vert="horz" wrap="square" lIns="0" tIns="0" rIns="0" bIns="0" numCol="1" spcCol="1270" anchor="ctr" anchorCtr="0">
-          <a:noAutofit/>
-        </a:bodyPr>
-        <a:lstStyle/>
-        <a:p>
-          <a:pPr lvl="0" algn="ctr" defTabSz="622300">
-            <a:lnSpc>
-              <a:spcPct val="90000"/>
-            </a:lnSpc>
-            <a:spcBef>
-              <a:spcPct val="0"/>
-            </a:spcBef>
-            <a:spcAft>
-              <a:spcPct val="35000"/>
-            </a:spcAft>
-          </a:pPr>
-          <a:endParaRPr lang="en-US" sz="1400" kern="1200"/>
-        </a:p>
-      </dsp:txBody>
-      <dsp:txXfrm rot="-5400000">
-        <a:off x="613270" y="2054250"/>
-        <a:ext cx="216448" cy="210435"/>
-      </dsp:txXfrm>
-    </dsp:sp>
-    <dsp:sp modelId="{A72FF043-F390-4BC5-BCF5-E6F82BAB33C5}">
-      <dsp:nvSpPr>
-        <dsp:cNvPr id="0" name=""/>
-        <dsp:cNvSpPr/>
-      </dsp:nvSpPr>
-      <dsp:spPr>
-        <a:xfrm>
-          <a:off x="0" y="2404976"/>
-          <a:ext cx="1442986" cy="801658"/>
-        </a:xfrm>
-        <a:prstGeom prst="roundRect">
-          <a:avLst>
-            <a:gd name="adj" fmla="val 10000"/>
-          </a:avLst>
-        </a:prstGeom>
-        <a:solidFill>
-          <a:schemeClr val="accent1">
-            <a:hueOff val="0"/>
-            <a:satOff val="0"/>
-            <a:lumOff val="0"/>
-            <a:alphaOff val="0"/>
-          </a:schemeClr>
-        </a:solidFill>
-        <a:ln w="25400" cap="flat" cmpd="sng" algn="ctr">
-          <a:solidFill>
-            <a:schemeClr val="lt1">
-              <a:hueOff val="0"/>
-              <a:satOff val="0"/>
-              <a:lumOff val="0"/>
-              <a:alphaOff val="0"/>
-            </a:schemeClr>
-          </a:solidFill>
-          <a:prstDash val="solid"/>
-        </a:ln>
-        <a:effectLst/>
-      </dsp:spPr>
-      <dsp:style>
-        <a:lnRef idx="2">
-          <a:scrgbClr r="0" g="0" b="0"/>
-        </a:lnRef>
-        <a:fillRef idx="1">
-          <a:scrgbClr r="0" g="0" b="0"/>
-        </a:fillRef>
-        <a:effectRef idx="0">
-          <a:scrgbClr r="0" g="0" b="0"/>
-        </a:effectRef>
-        <a:fontRef idx="minor">
-          <a:schemeClr val="lt1"/>
-        </a:fontRef>
-      </dsp:style>
-      <dsp:txBody>
-        <a:bodyPr spcFirstLastPara="0" vert="horz" wrap="square" lIns="68580" tIns="68580" rIns="68580" bIns="68580" numCol="1" spcCol="1270" anchor="ctr" anchorCtr="0">
-          <a:noAutofit/>
-        </a:bodyPr>
-        <a:lstStyle/>
-        <a:p>
-          <a:pPr lvl="0" algn="ctr" defTabSz="800100">
-            <a:lnSpc>
-              <a:spcPct val="90000"/>
-            </a:lnSpc>
-            <a:spcBef>
-              <a:spcPct val="0"/>
-            </a:spcBef>
-            <a:spcAft>
-              <a:spcPct val="35000"/>
-            </a:spcAft>
-          </a:pPr>
-          <a:r>
-            <a:rPr lang="en-US" sz="1800" kern="1200" dirty="0" smtClean="0"/>
-            <a:t>Add Subtotal to Result</a:t>
-          </a:r>
-          <a:endParaRPr lang="en-US" sz="1800" kern="1200" dirty="0"/>
-        </a:p>
-      </dsp:txBody>
-      <dsp:txXfrm>
-        <a:off x="23480" y="2428456"/>
-        <a:ext cx="1396026" cy="754698"/>
-      </dsp:txXfrm>
-    </dsp:sp>
   </dsp:spTree>
 </dsp:drawing>
 </file>
@@ -3418,379 +3171,6 @@
       <dsp:cNvGrpSpPr/>
     </dsp:nvGrpSpPr>
     <dsp:grpSpPr/>
-    <dsp:sp modelId="{B88EDF4C-4C3E-43DA-8D4C-21268F4ED6EF}">
-      <dsp:nvSpPr>
-        <dsp:cNvPr id="0" name=""/>
-        <dsp:cNvSpPr/>
-      </dsp:nvSpPr>
-      <dsp:spPr>
-        <a:xfrm>
-          <a:off x="0" y="0"/>
-          <a:ext cx="1442986" cy="801658"/>
-        </a:xfrm>
-        <a:prstGeom prst="flowChartMultidocument">
-          <a:avLst/>
-        </a:prstGeom>
-        <a:solidFill>
-          <a:schemeClr val="accent1">
-            <a:hueOff val="0"/>
-            <a:satOff val="0"/>
-            <a:lumOff val="0"/>
-            <a:alphaOff val="0"/>
-          </a:schemeClr>
-        </a:solidFill>
-        <a:ln w="25400" cap="flat" cmpd="sng" algn="ctr">
-          <a:solidFill>
-            <a:schemeClr val="lt1">
-              <a:hueOff val="0"/>
-              <a:satOff val="0"/>
-              <a:lumOff val="0"/>
-              <a:alphaOff val="0"/>
-            </a:schemeClr>
-          </a:solidFill>
-          <a:prstDash val="solid"/>
-        </a:ln>
-        <a:effectLst/>
-      </dsp:spPr>
-      <dsp:style>
-        <a:lnRef idx="2">
-          <a:scrgbClr r="0" g="0" b="0"/>
-        </a:lnRef>
-        <a:fillRef idx="1">
-          <a:scrgbClr r="0" g="0" b="0"/>
-        </a:fillRef>
-        <a:effectRef idx="0">
-          <a:scrgbClr r="0" g="0" b="0"/>
-        </a:effectRef>
-        <a:fontRef idx="minor">
-          <a:schemeClr val="lt1"/>
-        </a:fontRef>
-      </dsp:style>
-      <dsp:txBody>
-        <a:bodyPr spcFirstLastPara="0" vert="horz" wrap="square" lIns="68580" tIns="68580" rIns="68580" bIns="68580" numCol="1" spcCol="1270" anchor="ctr" anchorCtr="0">
-          <a:noAutofit/>
-        </a:bodyPr>
-        <a:lstStyle/>
-        <a:p>
-          <a:pPr lvl="0" algn="ctr" defTabSz="800100">
-            <a:lnSpc>
-              <a:spcPct val="90000"/>
-            </a:lnSpc>
-            <a:spcBef>
-              <a:spcPct val="0"/>
-            </a:spcBef>
-            <a:spcAft>
-              <a:spcPct val="35000"/>
-            </a:spcAft>
-          </a:pPr>
-          <a:r>
-            <a:rPr lang="en-US" sz="1800" kern="1200" dirty="0" smtClean="0"/>
-            <a:t>…</a:t>
-          </a:r>
-          <a:endParaRPr lang="en-US" sz="1800" kern="1200" dirty="0"/>
-        </a:p>
-      </dsp:txBody>
-      <dsp:txXfrm>
-        <a:off x="0" y="136393"/>
-        <a:ext cx="1242237" cy="634906"/>
-      </dsp:txXfrm>
-    </dsp:sp>
-    <dsp:sp modelId="{6F3F6FFB-3805-400E-92AC-42AFFB8E29D5}">
-      <dsp:nvSpPr>
-        <dsp:cNvPr id="0" name=""/>
-        <dsp:cNvSpPr/>
-      </dsp:nvSpPr>
-      <dsp:spPr>
-        <a:xfrm rot="5400000">
-          <a:off x="571182" y="821700"/>
-          <a:ext cx="300622" cy="360746"/>
-        </a:xfrm>
-        <a:prstGeom prst="rightArrow">
-          <a:avLst>
-            <a:gd name="adj1" fmla="val 60000"/>
-            <a:gd name="adj2" fmla="val 50000"/>
-          </a:avLst>
-        </a:prstGeom>
-        <a:solidFill>
-          <a:schemeClr val="accent1">
-            <a:tint val="60000"/>
-            <a:hueOff val="0"/>
-            <a:satOff val="0"/>
-            <a:lumOff val="0"/>
-            <a:alphaOff val="0"/>
-          </a:schemeClr>
-        </a:solidFill>
-        <a:ln>
-          <a:noFill/>
-        </a:ln>
-        <a:effectLst/>
-      </dsp:spPr>
-      <dsp:style>
-        <a:lnRef idx="0">
-          <a:scrgbClr r="0" g="0" b="0"/>
-        </a:lnRef>
-        <a:fillRef idx="1">
-          <a:scrgbClr r="0" g="0" b="0"/>
-        </a:fillRef>
-        <a:effectRef idx="0">
-          <a:scrgbClr r="0" g="0" b="0"/>
-        </a:effectRef>
-        <a:fontRef idx="minor">
-          <a:schemeClr val="lt1"/>
-        </a:fontRef>
-      </dsp:style>
-      <dsp:txBody>
-        <a:bodyPr spcFirstLastPara="0" vert="horz" wrap="square" lIns="0" tIns="0" rIns="0" bIns="0" numCol="1" spcCol="1270" anchor="ctr" anchorCtr="0">
-          <a:noAutofit/>
-        </a:bodyPr>
-        <a:lstStyle/>
-        <a:p>
-          <a:pPr lvl="0" algn="ctr" defTabSz="622300">
-            <a:lnSpc>
-              <a:spcPct val="90000"/>
-            </a:lnSpc>
-            <a:spcBef>
-              <a:spcPct val="0"/>
-            </a:spcBef>
-            <a:spcAft>
-              <a:spcPct val="35000"/>
-            </a:spcAft>
-          </a:pPr>
-          <a:endParaRPr lang="en-US" sz="1400" kern="1200"/>
-        </a:p>
-      </dsp:txBody>
-      <dsp:txXfrm rot="-5400000">
-        <a:off x="613270" y="851762"/>
-        <a:ext cx="216448" cy="210435"/>
-      </dsp:txXfrm>
-    </dsp:sp>
-    <dsp:sp modelId="{25EF5F4E-FB50-4FF9-B013-E9D8AA82EDC7}">
-      <dsp:nvSpPr>
-        <dsp:cNvPr id="0" name=""/>
-        <dsp:cNvSpPr/>
-      </dsp:nvSpPr>
-      <dsp:spPr>
-        <a:xfrm>
-          <a:off x="0" y="1202488"/>
-          <a:ext cx="1442986" cy="801658"/>
-        </a:xfrm>
-        <a:prstGeom prst="roundRect">
-          <a:avLst>
-            <a:gd name="adj" fmla="val 10000"/>
-          </a:avLst>
-        </a:prstGeom>
-        <a:solidFill>
-          <a:schemeClr val="accent1">
-            <a:hueOff val="0"/>
-            <a:satOff val="0"/>
-            <a:lumOff val="0"/>
-            <a:alphaOff val="0"/>
-          </a:schemeClr>
-        </a:solidFill>
-        <a:ln w="25400" cap="flat" cmpd="sng" algn="ctr">
-          <a:solidFill>
-            <a:schemeClr val="lt1">
-              <a:hueOff val="0"/>
-              <a:satOff val="0"/>
-              <a:lumOff val="0"/>
-              <a:alphaOff val="0"/>
-            </a:schemeClr>
-          </a:solidFill>
-          <a:prstDash val="solid"/>
-        </a:ln>
-        <a:effectLst/>
-      </dsp:spPr>
-      <dsp:style>
-        <a:lnRef idx="2">
-          <a:scrgbClr r="0" g="0" b="0"/>
-        </a:lnRef>
-        <a:fillRef idx="1">
-          <a:scrgbClr r="0" g="0" b="0"/>
-        </a:fillRef>
-        <a:effectRef idx="0">
-          <a:scrgbClr r="0" g="0" b="0"/>
-        </a:effectRef>
-        <a:fontRef idx="minor">
-          <a:schemeClr val="lt1"/>
-        </a:fontRef>
-      </dsp:style>
-      <dsp:txBody>
-        <a:bodyPr spcFirstLastPara="0" vert="horz" wrap="square" lIns="68580" tIns="68580" rIns="68580" bIns="68580" numCol="1" spcCol="1270" anchor="ctr" anchorCtr="0">
-          <a:noAutofit/>
-        </a:bodyPr>
-        <a:lstStyle/>
-        <a:p>
-          <a:pPr lvl="0" algn="ctr" defTabSz="800100">
-            <a:lnSpc>
-              <a:spcPct val="90000"/>
-            </a:lnSpc>
-            <a:spcBef>
-              <a:spcPct val="0"/>
-            </a:spcBef>
-            <a:spcAft>
-              <a:spcPct val="35000"/>
-            </a:spcAft>
-          </a:pPr>
-          <a:r>
-            <a:rPr lang="en-US" sz="1800" kern="1200" dirty="0" smtClean="0"/>
-            <a:t>Accumulate Into Subtotal</a:t>
-          </a:r>
-          <a:endParaRPr lang="en-US" sz="1800" kern="1200" dirty="0"/>
-        </a:p>
-      </dsp:txBody>
-      <dsp:txXfrm>
-        <a:off x="23480" y="1225968"/>
-        <a:ext cx="1396026" cy="754698"/>
-      </dsp:txXfrm>
-    </dsp:sp>
-    <dsp:sp modelId="{1BBC6809-A424-46A5-9C8A-0973516973CB}">
-      <dsp:nvSpPr>
-        <dsp:cNvPr id="0" name=""/>
-        <dsp:cNvSpPr/>
-      </dsp:nvSpPr>
-      <dsp:spPr>
-        <a:xfrm rot="5400000">
-          <a:off x="571182" y="2024188"/>
-          <a:ext cx="300622" cy="360746"/>
-        </a:xfrm>
-        <a:prstGeom prst="rightArrow">
-          <a:avLst>
-            <a:gd name="adj1" fmla="val 60000"/>
-            <a:gd name="adj2" fmla="val 50000"/>
-          </a:avLst>
-        </a:prstGeom>
-        <a:solidFill>
-          <a:schemeClr val="accent1">
-            <a:tint val="60000"/>
-            <a:hueOff val="0"/>
-            <a:satOff val="0"/>
-            <a:lumOff val="0"/>
-            <a:alphaOff val="0"/>
-          </a:schemeClr>
-        </a:solidFill>
-        <a:ln>
-          <a:noFill/>
-        </a:ln>
-        <a:effectLst/>
-      </dsp:spPr>
-      <dsp:style>
-        <a:lnRef idx="0">
-          <a:scrgbClr r="0" g="0" b="0"/>
-        </a:lnRef>
-        <a:fillRef idx="1">
-          <a:scrgbClr r="0" g="0" b="0"/>
-        </a:fillRef>
-        <a:effectRef idx="0">
-          <a:scrgbClr r="0" g="0" b="0"/>
-        </a:effectRef>
-        <a:fontRef idx="minor">
-          <a:schemeClr val="lt1"/>
-        </a:fontRef>
-      </dsp:style>
-      <dsp:txBody>
-        <a:bodyPr spcFirstLastPara="0" vert="horz" wrap="square" lIns="0" tIns="0" rIns="0" bIns="0" numCol="1" spcCol="1270" anchor="ctr" anchorCtr="0">
-          <a:noAutofit/>
-        </a:bodyPr>
-        <a:lstStyle/>
-        <a:p>
-          <a:pPr lvl="0" algn="ctr" defTabSz="622300">
-            <a:lnSpc>
-              <a:spcPct val="90000"/>
-            </a:lnSpc>
-            <a:spcBef>
-              <a:spcPct val="0"/>
-            </a:spcBef>
-            <a:spcAft>
-              <a:spcPct val="35000"/>
-            </a:spcAft>
-          </a:pPr>
-          <a:endParaRPr lang="en-US" sz="1400" kern="1200"/>
-        </a:p>
-      </dsp:txBody>
-      <dsp:txXfrm rot="-5400000">
-        <a:off x="613270" y="2054250"/>
-        <a:ext cx="216448" cy="210435"/>
-      </dsp:txXfrm>
-    </dsp:sp>
-    <dsp:sp modelId="{A72FF043-F390-4BC5-BCF5-E6F82BAB33C5}">
-      <dsp:nvSpPr>
-        <dsp:cNvPr id="0" name=""/>
-        <dsp:cNvSpPr/>
-      </dsp:nvSpPr>
-      <dsp:spPr>
-        <a:xfrm>
-          <a:off x="0" y="2404976"/>
-          <a:ext cx="1442986" cy="801658"/>
-        </a:xfrm>
-        <a:prstGeom prst="roundRect">
-          <a:avLst>
-            <a:gd name="adj" fmla="val 10000"/>
-          </a:avLst>
-        </a:prstGeom>
-        <a:solidFill>
-          <a:schemeClr val="accent1">
-            <a:hueOff val="0"/>
-            <a:satOff val="0"/>
-            <a:lumOff val="0"/>
-            <a:alphaOff val="0"/>
-          </a:schemeClr>
-        </a:solidFill>
-        <a:ln w="25400" cap="flat" cmpd="sng" algn="ctr">
-          <a:solidFill>
-            <a:schemeClr val="lt1">
-              <a:hueOff val="0"/>
-              <a:satOff val="0"/>
-              <a:lumOff val="0"/>
-              <a:alphaOff val="0"/>
-            </a:schemeClr>
-          </a:solidFill>
-          <a:prstDash val="solid"/>
-        </a:ln>
-        <a:effectLst/>
-      </dsp:spPr>
-      <dsp:style>
-        <a:lnRef idx="2">
-          <a:scrgbClr r="0" g="0" b="0"/>
-        </a:lnRef>
-        <a:fillRef idx="1">
-          <a:scrgbClr r="0" g="0" b="0"/>
-        </a:fillRef>
-        <a:effectRef idx="0">
-          <a:scrgbClr r="0" g="0" b="0"/>
-        </a:effectRef>
-        <a:fontRef idx="minor">
-          <a:schemeClr val="lt1"/>
-        </a:fontRef>
-      </dsp:style>
-      <dsp:txBody>
-        <a:bodyPr spcFirstLastPara="0" vert="horz" wrap="square" lIns="68580" tIns="68580" rIns="68580" bIns="68580" numCol="1" spcCol="1270" anchor="ctr" anchorCtr="0">
-          <a:noAutofit/>
-        </a:bodyPr>
-        <a:lstStyle/>
-        <a:p>
-          <a:pPr lvl="0" algn="ctr" defTabSz="800100">
-            <a:lnSpc>
-              <a:spcPct val="90000"/>
-            </a:lnSpc>
-            <a:spcBef>
-              <a:spcPct val="0"/>
-            </a:spcBef>
-            <a:spcAft>
-              <a:spcPct val="35000"/>
-            </a:spcAft>
-          </a:pPr>
-          <a:r>
-            <a:rPr lang="en-US" sz="1800" kern="1200" dirty="0" smtClean="0"/>
-            <a:t>Add Subtotal to Result</a:t>
-          </a:r>
-          <a:endParaRPr lang="en-US" sz="1800" kern="1200" dirty="0"/>
-        </a:p>
-      </dsp:txBody>
-      <dsp:txXfrm>
-        <a:off x="23480" y="2428456"/>
-        <a:ext cx="1396026" cy="754698"/>
-      </dsp:txXfrm>
-    </dsp:sp>
   </dsp:spTree>
 </dsp:drawing>
 </file>
@@ -3803,379 +3183,6 @@
       <dsp:cNvGrpSpPr/>
     </dsp:nvGrpSpPr>
     <dsp:grpSpPr/>
-    <dsp:sp modelId="{B88EDF4C-4C3E-43DA-8D4C-21268F4ED6EF}">
-      <dsp:nvSpPr>
-        <dsp:cNvPr id="0" name=""/>
-        <dsp:cNvSpPr/>
-      </dsp:nvSpPr>
-      <dsp:spPr>
-        <a:xfrm>
-          <a:off x="0" y="0"/>
-          <a:ext cx="1442986" cy="801658"/>
-        </a:xfrm>
-        <a:prstGeom prst="flowChartMultidocument">
-          <a:avLst/>
-        </a:prstGeom>
-        <a:solidFill>
-          <a:schemeClr val="accent1">
-            <a:hueOff val="0"/>
-            <a:satOff val="0"/>
-            <a:lumOff val="0"/>
-            <a:alphaOff val="0"/>
-          </a:schemeClr>
-        </a:solidFill>
-        <a:ln w="25400" cap="flat" cmpd="sng" algn="ctr">
-          <a:solidFill>
-            <a:schemeClr val="lt1">
-              <a:hueOff val="0"/>
-              <a:satOff val="0"/>
-              <a:lumOff val="0"/>
-              <a:alphaOff val="0"/>
-            </a:schemeClr>
-          </a:solidFill>
-          <a:prstDash val="solid"/>
-        </a:ln>
-        <a:effectLst/>
-      </dsp:spPr>
-      <dsp:style>
-        <a:lnRef idx="2">
-          <a:scrgbClr r="0" g="0" b="0"/>
-        </a:lnRef>
-        <a:fillRef idx="1">
-          <a:scrgbClr r="0" g="0" b="0"/>
-        </a:fillRef>
-        <a:effectRef idx="0">
-          <a:scrgbClr r="0" g="0" b="0"/>
-        </a:effectRef>
-        <a:fontRef idx="minor">
-          <a:schemeClr val="lt1"/>
-        </a:fontRef>
-      </dsp:style>
-      <dsp:txBody>
-        <a:bodyPr spcFirstLastPara="0" vert="horz" wrap="square" lIns="68580" tIns="68580" rIns="68580" bIns="68580" numCol="1" spcCol="1270" anchor="ctr" anchorCtr="0">
-          <a:noAutofit/>
-        </a:bodyPr>
-        <a:lstStyle/>
-        <a:p>
-          <a:pPr lvl="0" algn="ctr" defTabSz="800100">
-            <a:lnSpc>
-              <a:spcPct val="90000"/>
-            </a:lnSpc>
-            <a:spcBef>
-              <a:spcPct val="0"/>
-            </a:spcBef>
-            <a:spcAft>
-              <a:spcPct val="35000"/>
-            </a:spcAft>
-          </a:pPr>
-          <a:r>
-            <a:rPr lang="en-US" sz="1800" kern="1200" dirty="0" smtClean="0"/>
-            <a:t>…</a:t>
-          </a:r>
-          <a:endParaRPr lang="en-US" sz="1800" kern="1200" dirty="0"/>
-        </a:p>
-      </dsp:txBody>
-      <dsp:txXfrm>
-        <a:off x="0" y="136393"/>
-        <a:ext cx="1242237" cy="634906"/>
-      </dsp:txXfrm>
-    </dsp:sp>
-    <dsp:sp modelId="{6F3F6FFB-3805-400E-92AC-42AFFB8E29D5}">
-      <dsp:nvSpPr>
-        <dsp:cNvPr id="0" name=""/>
-        <dsp:cNvSpPr/>
-      </dsp:nvSpPr>
-      <dsp:spPr>
-        <a:xfrm rot="5400000">
-          <a:off x="571182" y="821700"/>
-          <a:ext cx="300622" cy="360746"/>
-        </a:xfrm>
-        <a:prstGeom prst="rightArrow">
-          <a:avLst>
-            <a:gd name="adj1" fmla="val 60000"/>
-            <a:gd name="adj2" fmla="val 50000"/>
-          </a:avLst>
-        </a:prstGeom>
-        <a:solidFill>
-          <a:schemeClr val="accent1">
-            <a:tint val="60000"/>
-            <a:hueOff val="0"/>
-            <a:satOff val="0"/>
-            <a:lumOff val="0"/>
-            <a:alphaOff val="0"/>
-          </a:schemeClr>
-        </a:solidFill>
-        <a:ln>
-          <a:noFill/>
-        </a:ln>
-        <a:effectLst/>
-      </dsp:spPr>
-      <dsp:style>
-        <a:lnRef idx="0">
-          <a:scrgbClr r="0" g="0" b="0"/>
-        </a:lnRef>
-        <a:fillRef idx="1">
-          <a:scrgbClr r="0" g="0" b="0"/>
-        </a:fillRef>
-        <a:effectRef idx="0">
-          <a:scrgbClr r="0" g="0" b="0"/>
-        </a:effectRef>
-        <a:fontRef idx="minor">
-          <a:schemeClr val="lt1"/>
-        </a:fontRef>
-      </dsp:style>
-      <dsp:txBody>
-        <a:bodyPr spcFirstLastPara="0" vert="horz" wrap="square" lIns="0" tIns="0" rIns="0" bIns="0" numCol="1" spcCol="1270" anchor="ctr" anchorCtr="0">
-          <a:noAutofit/>
-        </a:bodyPr>
-        <a:lstStyle/>
-        <a:p>
-          <a:pPr lvl="0" algn="ctr" defTabSz="622300">
-            <a:lnSpc>
-              <a:spcPct val="90000"/>
-            </a:lnSpc>
-            <a:spcBef>
-              <a:spcPct val="0"/>
-            </a:spcBef>
-            <a:spcAft>
-              <a:spcPct val="35000"/>
-            </a:spcAft>
-          </a:pPr>
-          <a:endParaRPr lang="en-US" sz="1400" kern="1200"/>
-        </a:p>
-      </dsp:txBody>
-      <dsp:txXfrm rot="-5400000">
-        <a:off x="613270" y="851762"/>
-        <a:ext cx="216448" cy="210435"/>
-      </dsp:txXfrm>
-    </dsp:sp>
-    <dsp:sp modelId="{25EF5F4E-FB50-4FF9-B013-E9D8AA82EDC7}">
-      <dsp:nvSpPr>
-        <dsp:cNvPr id="0" name=""/>
-        <dsp:cNvSpPr/>
-      </dsp:nvSpPr>
-      <dsp:spPr>
-        <a:xfrm>
-          <a:off x="0" y="1202488"/>
-          <a:ext cx="1442986" cy="801658"/>
-        </a:xfrm>
-        <a:prstGeom prst="roundRect">
-          <a:avLst>
-            <a:gd name="adj" fmla="val 10000"/>
-          </a:avLst>
-        </a:prstGeom>
-        <a:solidFill>
-          <a:schemeClr val="accent1">
-            <a:hueOff val="0"/>
-            <a:satOff val="0"/>
-            <a:lumOff val="0"/>
-            <a:alphaOff val="0"/>
-          </a:schemeClr>
-        </a:solidFill>
-        <a:ln w="25400" cap="flat" cmpd="sng" algn="ctr">
-          <a:solidFill>
-            <a:schemeClr val="lt1">
-              <a:hueOff val="0"/>
-              <a:satOff val="0"/>
-              <a:lumOff val="0"/>
-              <a:alphaOff val="0"/>
-            </a:schemeClr>
-          </a:solidFill>
-          <a:prstDash val="solid"/>
-        </a:ln>
-        <a:effectLst/>
-      </dsp:spPr>
-      <dsp:style>
-        <a:lnRef idx="2">
-          <a:scrgbClr r="0" g="0" b="0"/>
-        </a:lnRef>
-        <a:fillRef idx="1">
-          <a:scrgbClr r="0" g="0" b="0"/>
-        </a:fillRef>
-        <a:effectRef idx="0">
-          <a:scrgbClr r="0" g="0" b="0"/>
-        </a:effectRef>
-        <a:fontRef idx="minor">
-          <a:schemeClr val="lt1"/>
-        </a:fontRef>
-      </dsp:style>
-      <dsp:txBody>
-        <a:bodyPr spcFirstLastPara="0" vert="horz" wrap="square" lIns="68580" tIns="68580" rIns="68580" bIns="68580" numCol="1" spcCol="1270" anchor="ctr" anchorCtr="0">
-          <a:noAutofit/>
-        </a:bodyPr>
-        <a:lstStyle/>
-        <a:p>
-          <a:pPr lvl="0" algn="ctr" defTabSz="800100">
-            <a:lnSpc>
-              <a:spcPct val="90000"/>
-            </a:lnSpc>
-            <a:spcBef>
-              <a:spcPct val="0"/>
-            </a:spcBef>
-            <a:spcAft>
-              <a:spcPct val="35000"/>
-            </a:spcAft>
-          </a:pPr>
-          <a:r>
-            <a:rPr lang="en-US" sz="1800" kern="1200" dirty="0" smtClean="0"/>
-            <a:t>Accumulate Into Subtotal</a:t>
-          </a:r>
-          <a:endParaRPr lang="en-US" sz="1800" kern="1200" dirty="0"/>
-        </a:p>
-      </dsp:txBody>
-      <dsp:txXfrm>
-        <a:off x="23480" y="1225968"/>
-        <a:ext cx="1396026" cy="754698"/>
-      </dsp:txXfrm>
-    </dsp:sp>
-    <dsp:sp modelId="{1BBC6809-A424-46A5-9C8A-0973516973CB}">
-      <dsp:nvSpPr>
-        <dsp:cNvPr id="0" name=""/>
-        <dsp:cNvSpPr/>
-      </dsp:nvSpPr>
-      <dsp:spPr>
-        <a:xfrm rot="5400000">
-          <a:off x="571182" y="2024188"/>
-          <a:ext cx="300622" cy="360746"/>
-        </a:xfrm>
-        <a:prstGeom prst="rightArrow">
-          <a:avLst>
-            <a:gd name="adj1" fmla="val 60000"/>
-            <a:gd name="adj2" fmla="val 50000"/>
-          </a:avLst>
-        </a:prstGeom>
-        <a:solidFill>
-          <a:schemeClr val="accent1">
-            <a:tint val="60000"/>
-            <a:hueOff val="0"/>
-            <a:satOff val="0"/>
-            <a:lumOff val="0"/>
-            <a:alphaOff val="0"/>
-          </a:schemeClr>
-        </a:solidFill>
-        <a:ln>
-          <a:noFill/>
-        </a:ln>
-        <a:effectLst/>
-      </dsp:spPr>
-      <dsp:style>
-        <a:lnRef idx="0">
-          <a:scrgbClr r="0" g="0" b="0"/>
-        </a:lnRef>
-        <a:fillRef idx="1">
-          <a:scrgbClr r="0" g="0" b="0"/>
-        </a:fillRef>
-        <a:effectRef idx="0">
-          <a:scrgbClr r="0" g="0" b="0"/>
-        </a:effectRef>
-        <a:fontRef idx="minor">
-          <a:schemeClr val="lt1"/>
-        </a:fontRef>
-      </dsp:style>
-      <dsp:txBody>
-        <a:bodyPr spcFirstLastPara="0" vert="horz" wrap="square" lIns="0" tIns="0" rIns="0" bIns="0" numCol="1" spcCol="1270" anchor="ctr" anchorCtr="0">
-          <a:noAutofit/>
-        </a:bodyPr>
-        <a:lstStyle/>
-        <a:p>
-          <a:pPr lvl="0" algn="ctr" defTabSz="622300">
-            <a:lnSpc>
-              <a:spcPct val="90000"/>
-            </a:lnSpc>
-            <a:spcBef>
-              <a:spcPct val="0"/>
-            </a:spcBef>
-            <a:spcAft>
-              <a:spcPct val="35000"/>
-            </a:spcAft>
-          </a:pPr>
-          <a:endParaRPr lang="en-US" sz="1400" kern="1200"/>
-        </a:p>
-      </dsp:txBody>
-      <dsp:txXfrm rot="-5400000">
-        <a:off x="613270" y="2054250"/>
-        <a:ext cx="216448" cy="210435"/>
-      </dsp:txXfrm>
-    </dsp:sp>
-    <dsp:sp modelId="{A72FF043-F390-4BC5-BCF5-E6F82BAB33C5}">
-      <dsp:nvSpPr>
-        <dsp:cNvPr id="0" name=""/>
-        <dsp:cNvSpPr/>
-      </dsp:nvSpPr>
-      <dsp:spPr>
-        <a:xfrm>
-          <a:off x="0" y="2404976"/>
-          <a:ext cx="1442986" cy="801658"/>
-        </a:xfrm>
-        <a:prstGeom prst="roundRect">
-          <a:avLst>
-            <a:gd name="adj" fmla="val 10000"/>
-          </a:avLst>
-        </a:prstGeom>
-        <a:solidFill>
-          <a:schemeClr val="accent1">
-            <a:hueOff val="0"/>
-            <a:satOff val="0"/>
-            <a:lumOff val="0"/>
-            <a:alphaOff val="0"/>
-          </a:schemeClr>
-        </a:solidFill>
-        <a:ln w="25400" cap="flat" cmpd="sng" algn="ctr">
-          <a:solidFill>
-            <a:schemeClr val="lt1">
-              <a:hueOff val="0"/>
-              <a:satOff val="0"/>
-              <a:lumOff val="0"/>
-              <a:alphaOff val="0"/>
-            </a:schemeClr>
-          </a:solidFill>
-          <a:prstDash val="solid"/>
-        </a:ln>
-        <a:effectLst/>
-      </dsp:spPr>
-      <dsp:style>
-        <a:lnRef idx="2">
-          <a:scrgbClr r="0" g="0" b="0"/>
-        </a:lnRef>
-        <a:fillRef idx="1">
-          <a:scrgbClr r="0" g="0" b="0"/>
-        </a:fillRef>
-        <a:effectRef idx="0">
-          <a:scrgbClr r="0" g="0" b="0"/>
-        </a:effectRef>
-        <a:fontRef idx="minor">
-          <a:schemeClr val="lt1"/>
-        </a:fontRef>
-      </dsp:style>
-      <dsp:txBody>
-        <a:bodyPr spcFirstLastPara="0" vert="horz" wrap="square" lIns="68580" tIns="68580" rIns="68580" bIns="68580" numCol="1" spcCol="1270" anchor="ctr" anchorCtr="0">
-          <a:noAutofit/>
-        </a:bodyPr>
-        <a:lstStyle/>
-        <a:p>
-          <a:pPr lvl="0" algn="ctr" defTabSz="800100">
-            <a:lnSpc>
-              <a:spcPct val="90000"/>
-            </a:lnSpc>
-            <a:spcBef>
-              <a:spcPct val="0"/>
-            </a:spcBef>
-            <a:spcAft>
-              <a:spcPct val="35000"/>
-            </a:spcAft>
-          </a:pPr>
-          <a:r>
-            <a:rPr lang="en-US" sz="1800" kern="1200" dirty="0" smtClean="0"/>
-            <a:t>Add Subtotal to Result</a:t>
-          </a:r>
-          <a:endParaRPr lang="en-US" sz="1800" kern="1200" dirty="0"/>
-        </a:p>
-      </dsp:txBody>
-      <dsp:txXfrm>
-        <a:off x="23480" y="2428456"/>
-        <a:ext cx="1396026" cy="754698"/>
-      </dsp:txXfrm>
-    </dsp:sp>
   </dsp:spTree>
 </dsp:drawing>
 </file>
@@ -14433,9 +13440,16 @@
             <p:ph type="ctrTitle"/>
           </p:nvPr>
         </p:nvSpPr>
-        <p:spPr/>
-        <p:txBody>
-          <a:bodyPr/>
+        <p:spPr>
+          <a:xfrm>
+            <a:off x="685800" y="1597820"/>
+            <a:ext cx="7772400" cy="780815"/>
+          </a:xfrm>
+        </p:spPr>
+        <p:txBody>
+          <a:bodyPr>
+            <a:normAutofit/>
+          </a:bodyPr>
           <a:lstStyle/>
           <a:p>
             <a:r>
@@ -14493,9 +13507,19 @@
                   </a:schemeClr>
                 </a:solidFill>
               </a:rPr>
-              <a:t>Thanks Curtissimo!</a:t>
-            </a:r>
-            <a:endParaRPr lang="en-US" dirty="0"/>
+              <a:t>Thanks Curtissimo</a:t>
+            </a:r>
+            <a:r>
+              <a:rPr lang="en-US" sz="1200" b="1" dirty="0" smtClean="0">
+                <a:solidFill>
+                  <a:schemeClr val="accent1">
+                    <a:lumMod val="75000"/>
+                  </a:schemeClr>
+                </a:solidFill>
+              </a:rPr>
+              <a:t>!</a:t>
+            </a:r>
+            <a:endParaRPr lang="en-US" sz="5300" dirty="0"/>
           </a:p>
         </p:txBody>
       </p:sp>
@@ -14511,7 +13535,7 @@
         </p:nvSpPr>
         <p:spPr>
           <a:xfrm>
-            <a:off x="1657350" y="2713037"/>
+            <a:off x="665334" y="2581565"/>
             <a:ext cx="6069330" cy="437357"/>
           </a:xfrm>
         </p:spPr>
@@ -14522,18 +13546,35 @@
           <a:lstStyle/>
           <a:p>
             <a:r>
-              <a:rPr lang="en-US" smtClean="0"/>
-              <a:t>Multi-threaded </a:t>
-            </a:r>
-            <a:r>
-              <a:rPr lang="en-US" dirty="0" smtClean="0"/>
-              <a:t>Programming in </a:t>
-            </a:r>
-            <a:r>
-              <a:rPr lang="en-US" dirty="0" err="1" smtClean="0"/>
+              <a:rPr lang="en-US" dirty="0" smtClean="0">
+                <a:solidFill>
+                  <a:schemeClr val="tx1">
+                    <a:lumMod val="75000"/>
+                    <a:lumOff val="25000"/>
+                  </a:schemeClr>
+                </a:solidFill>
+              </a:rPr>
+              <a:t>Multi-threaded Programming in </a:t>
+            </a:r>
+            <a:r>
+              <a:rPr lang="en-US" dirty="0" err="1" smtClean="0">
+                <a:solidFill>
+                  <a:schemeClr val="tx1">
+                    <a:lumMod val="75000"/>
+                    <a:lumOff val="25000"/>
+                  </a:schemeClr>
+                </a:solidFill>
+              </a:rPr>
               <a:t>.Net</a:t>
             </a:r>
-            <a:endParaRPr lang="en-US" dirty="0" smtClean="0"/>
+            <a:endParaRPr lang="en-US" dirty="0" smtClean="0">
+              <a:solidFill>
+                <a:schemeClr val="tx1">
+                  <a:lumMod val="75000"/>
+                  <a:lumOff val="25000"/>
+                </a:schemeClr>
+              </a:solidFill>
+            </a:endParaRPr>
           </a:p>
         </p:txBody>
       </p:sp>
@@ -14547,7 +13588,7 @@
         </p:nvSpPr>
         <p:spPr>
           <a:xfrm>
-            <a:off x="1657350" y="3150394"/>
+            <a:off x="665334" y="3018922"/>
             <a:ext cx="6069330" cy="437357"/>
           </a:xfrm>
           <a:prstGeom prst="rect">
@@ -14715,9 +13756,62 @@
           </a:lstStyle>
           <a:p>
             <a:r>
-              <a:rPr lang="en-US" sz="1800" dirty="0"/>
+              <a:rPr lang="en-US" sz="1800" dirty="0">
+                <a:solidFill>
+                  <a:schemeClr val="tx1">
+                    <a:lumMod val="50000"/>
+                    <a:lumOff val="50000"/>
+                  </a:schemeClr>
+                </a:solidFill>
+              </a:rPr>
               <a:t>Eric Burcham – Improving Enterprises</a:t>
             </a:r>
+          </a:p>
+        </p:txBody>
+      </p:sp>
+      <p:sp>
+        <p:nvSpPr>
+          <p:cNvPr id="2" name="Rectangle 1"/>
+          <p:cNvSpPr/>
+          <p:nvPr/>
+        </p:nvSpPr>
+        <p:spPr>
+          <a:xfrm>
+            <a:off x="959225" y="3641606"/>
+            <a:ext cx="6780306" cy="369332"/>
+          </a:xfrm>
+          <a:prstGeom prst="rect">
+            <a:avLst/>
+          </a:prstGeom>
+        </p:spPr>
+        <p:txBody>
+          <a:bodyPr wrap="square">
+            <a:spAutoFit/>
+          </a:bodyPr>
+          <a:lstStyle/>
+          <a:p>
+            <a:r>
+              <a:rPr lang="en-US" b="1" dirty="0">
+                <a:solidFill>
+                  <a:schemeClr val="accent1">
+                    <a:lumMod val="75000"/>
+                  </a:schemeClr>
+                </a:solidFill>
+              </a:rPr>
+              <a:t>Source at: </a:t>
+            </a:r>
+            <a:r>
+              <a:rPr lang="en-US" b="1" dirty="0">
+                <a:solidFill>
+                  <a:schemeClr val="accent1">
+                    <a:lumMod val="75000"/>
+                  </a:schemeClr>
+                </a:solidFill>
+                <a:hlinkClick r:id="rId2"/>
+              </a:rPr>
+              <a:t>http://github.com/ericburcham/THasyINKnc/</a:t>
+            </a:r>
+            <a:endParaRPr lang="en-US" dirty="0"/>
           </a:p>
         </p:txBody>
       </p:sp>
@@ -17287,11 +16381,7 @@
             </a:r>
             <a:r>
               <a:rPr lang="en-US" dirty="0" smtClean="0"/>
-              <a:t>&gt;.Average() can </a:t>
-            </a:r>
-            <a:r>
-              <a:rPr lang="en-US" dirty="0" smtClean="0"/>
-              <a:t>be made parallel.</a:t>
+              <a:t>&gt;.Average() can be made parallel.</a:t>
             </a:r>
           </a:p>
           <a:p>
@@ -18801,7 +17891,6 @@
               <a:rPr lang="en-US" dirty="0"/>
               <a:t>c</a:t>
             </a:r>
-            <a:endParaRPr lang="en-US" dirty="0"/>
           </a:p>
         </p:txBody>
       </p:sp>
@@ -18860,7 +17949,6 @@
               <a:rPr lang="en-US" dirty="0"/>
               <a:t>d</a:t>
             </a:r>
-            <a:endParaRPr lang="en-US" dirty="0"/>
           </a:p>
         </p:txBody>
       </p:sp>
@@ -21597,7 +20685,7 @@
   <a:extraClrSchemeLst/>
   <a:extLst>
     <a:ext uri="{05A4C25C-085E-4340-85A3-A5531E510DB2}">
-      <thm15:themeFamily xmlns:thm15="http://schemas.microsoft.com/office/thememl/2012/main" xmlns="" name="2013 Improving ppt template [Read-Only]" id="{9CD52372-1ABB-429C-AE8B-5116A847D281}" vid="{C9E045ED-5E7D-45F0-ABC2-8913C89F506A}"/>
+      <thm15:themeFamily xmlns="" xmlns:thm15="http://schemas.microsoft.com/office/thememl/2012/main" name="2013 Improving ppt template [Read-Only]" id="{9CD52372-1ABB-429C-AE8B-5116A847D281}" vid="{C9E045ED-5E7D-45F0-ABC2-8913C89F506A}"/>
     </a:ext>
   </a:extLst>
 </a:theme>
@@ -21858,16 +20946,19 @@
   <a:extraClrSchemeLst/>
   <a:extLst>
     <a:ext uri="{05A4C25C-085E-4340-85A3-A5531E510DB2}">
-      <thm15:themeFamily xmlns:thm15="http://schemas.microsoft.com/office/thememl/2012/main" xmlns="" name="Office Theme" id="{62F939B6-93AF-4DB8-9C6B-D6C7DFDC589F}" vid="{4A3C46E8-61CC-4603-A589-7422A47A8E4A}"/>
+      <thm15:themeFamily xmlns="" xmlns:thm15="http://schemas.microsoft.com/office/thememl/2012/main" name="Office Theme" id="{62F939B6-93AF-4DB8-9C6B-D6C7DFDC589F}" vid="{4A3C46E8-61CC-4603-A589-7422A47A8E4A}"/>
     </a:ext>
   </a:extLst>
 </a:theme>
 </file>
 
 <file path=customXml/item1.xml><?xml version="1.0" encoding="utf-8"?>
-<p:properties xmlns:p="http://schemas.microsoft.com/office/2006/metadata/properties" xmlns:xsi="http://www.w3.org/2001/XMLSchema-instance" xmlns:pc="http://schemas.microsoft.com/office/infopath/2007/PartnerControls">
-  <documentManagement/>
-</p:properties>
+<?mso-contentType ?>
+<FormTemplates xmlns="http://schemas.microsoft.com/sharepoint/v3/contenttype/forms">
+  <Display>DocumentLibraryForm</Display>
+  <Edit>DocumentLibraryForm</Edit>
+  <New>DocumentLibraryForm</New>
+</FormTemplates>
 </file>
 
 <file path=customXml/item2.xml><?xml version="1.0" encoding="utf-8"?>
@@ -21985,25 +21076,15 @@
 </file>
 
 <file path=customXml/item3.xml><?xml version="1.0" encoding="utf-8"?>
-<?mso-contentType ?>
-<FormTemplates xmlns="http://schemas.microsoft.com/sharepoint/v3/contenttype/forms">
-  <Display>DocumentLibraryForm</Display>
-  <Edit>DocumentLibraryForm</Edit>
-  <New>DocumentLibraryForm</New>
-</FormTemplates>
+<p:properties xmlns:p="http://schemas.microsoft.com/office/2006/metadata/properties" xmlns:xsi="http://www.w3.org/2001/XMLSchema-instance" xmlns:pc="http://schemas.microsoft.com/office/infopath/2007/PartnerControls">
+  <documentManagement/>
+</p:properties>
 </file>
 
 <file path=customXml/itemProps1.xml><?xml version="1.0" encoding="utf-8"?>
-<ds:datastoreItem xmlns:ds="http://schemas.openxmlformats.org/officeDocument/2006/customXml" ds:itemID="{A04551C0-1604-41A0-9B5C-A5F88AD2E0FE}">
+<ds:datastoreItem xmlns:ds="http://schemas.openxmlformats.org/officeDocument/2006/customXml" ds:itemID="{B857AB07-B2ED-439E-860F-4F56FB345D1B}">
   <ds:schemaRefs>
-    <ds:schemaRef ds:uri="http://schemas.microsoft.com/office/infopath/2007/PartnerControls"/>
-    <ds:schemaRef ds:uri="http://purl.org/dc/elements/1.1/"/>
-    <ds:schemaRef ds:uri="http://schemas.microsoft.com/office/2006/metadata/properties"/>
-    <ds:schemaRef ds:uri="http://purl.org/dc/terms/"/>
-    <ds:schemaRef ds:uri="http://schemas.openxmlformats.org/package/2006/metadata/core-properties"/>
-    <ds:schemaRef ds:uri="http://schemas.microsoft.com/office/2006/documentManagement/types"/>
-    <ds:schemaRef ds:uri="http://www.w3.org/XML/1998/namespace"/>
-    <ds:schemaRef ds:uri="http://purl.org/dc/dcmitype/"/>
+    <ds:schemaRef ds:uri="http://schemas.microsoft.com/sharepoint/v3/contenttype/forms"/>
   </ds:schemaRefs>
 </ds:datastoreItem>
 </file>
@@ -22025,9 +21106,16 @@
 </file>
 
 <file path=customXml/itemProps3.xml><?xml version="1.0" encoding="utf-8"?>
-<ds:datastoreItem xmlns:ds="http://schemas.openxmlformats.org/officeDocument/2006/customXml" ds:itemID="{B857AB07-B2ED-439E-860F-4F56FB345D1B}">
+<ds:datastoreItem xmlns:ds="http://schemas.openxmlformats.org/officeDocument/2006/customXml" ds:itemID="{A04551C0-1604-41A0-9B5C-A5F88AD2E0FE}">
   <ds:schemaRefs>
-    <ds:schemaRef ds:uri="http://schemas.microsoft.com/sharepoint/v3/contenttype/forms"/>
+    <ds:schemaRef ds:uri="http://schemas.microsoft.com/office/infopath/2007/PartnerControls"/>
+    <ds:schemaRef ds:uri="http://purl.org/dc/elements/1.1/"/>
+    <ds:schemaRef ds:uri="http://schemas.microsoft.com/office/2006/metadata/properties"/>
+    <ds:schemaRef ds:uri="http://purl.org/dc/terms/"/>
+    <ds:schemaRef ds:uri="http://schemas.openxmlformats.org/package/2006/metadata/core-properties"/>
+    <ds:schemaRef ds:uri="http://schemas.microsoft.com/office/2006/documentManagement/types"/>
+    <ds:schemaRef ds:uri="http://www.w3.org/XML/1998/namespace"/>
+    <ds:schemaRef ds:uri="http://purl.org/dc/dcmitype/"/>
   </ds:schemaRefs>
 </ds:datastoreItem>
 </file>
</xml_diff>

<commit_message>
Added 'we're hiring' slide to end of presentation.
</commit_message>
<xml_diff>
--- a/Presentation/THasINKync.pptx
+++ b/Presentation/THasINKync.pptx
@@ -43,6 +43,8 @@
     <p:sldId id="292" r:id="rId40"/>
     <p:sldId id="289" r:id="rId41"/>
     <p:sldId id="276" r:id="rId42"/>
+    <p:sldId id="294" r:id="rId43"/>
+    <p:sldId id="293" r:id="rId44"/>
   </p:sldIdLst>
   <p:sldSz cx="9144000" cy="5143500" type="screen16x9"/>
   <p:notesSz cx="6858000" cy="9144000"/>
@@ -143,7 +145,7 @@
   </p:defaultTextStyle>
   <p:extLst>
     <p:ext uri="{EFAFB233-063F-42B5-8137-9DF3F51BA10A}">
-      <p15:sldGuideLst xmlns="" xmlns:p15="http://schemas.microsoft.com/office/powerpoint/2012/main">
+      <p15:sldGuideLst xmlns:p15="http://schemas.microsoft.com/office/powerpoint/2012/main">
         <p15:guide id="1" orient="horz" pos="1620" userDrawn="1">
           <p15:clr>
             <a:srgbClr val="A4A3A4"/>
@@ -13507,17 +13509,7 @@
                   </a:schemeClr>
                 </a:solidFill>
               </a:rPr>
-              <a:t>Thanks Curtissimo</a:t>
-            </a:r>
-            <a:r>
-              <a:rPr lang="en-US" sz="1200" b="1" dirty="0" smtClean="0">
-                <a:solidFill>
-                  <a:schemeClr val="accent1">
-                    <a:lumMod val="75000"/>
-                  </a:schemeClr>
-                </a:solidFill>
-              </a:rPr>
-              <a:t>!</a:t>
+              <a:t>Thanks Curtissimo!</a:t>
             </a:r>
             <a:endParaRPr lang="en-US" sz="5300" dirty="0"/>
           </a:p>
@@ -19299,6 +19291,231 @@
 </p:sld>
 </file>
 
+<file path=ppt/slides/slide38.xml><?xml version="1.0" encoding="utf-8"?>
+<p:sld xmlns:a="http://schemas.openxmlformats.org/drawingml/2006/main" xmlns:r="http://schemas.openxmlformats.org/officeDocument/2006/relationships" xmlns:p="http://schemas.openxmlformats.org/presentationml/2006/main">
+  <p:cSld>
+    <p:spTree>
+      <p:nvGrpSpPr>
+        <p:cNvPr id="1" name=""/>
+        <p:cNvGrpSpPr/>
+        <p:nvPr/>
+      </p:nvGrpSpPr>
+      <p:grpSpPr>
+        <a:xfrm>
+          <a:off x="0" y="0"/>
+          <a:ext cx="0" cy="0"/>
+          <a:chOff x="0" y="0"/>
+          <a:chExt cx="0" cy="0"/>
+        </a:xfrm>
+      </p:grpSpPr>
+      <p:sp>
+        <p:nvSpPr>
+          <p:cNvPr id="2" name="Title 1"/>
+          <p:cNvSpPr>
+            <a:spLocks noGrp="1"/>
+          </p:cNvSpPr>
+          <p:nvPr>
+            <p:ph type="title"/>
+          </p:nvPr>
+        </p:nvSpPr>
+        <p:spPr/>
+        <p:txBody>
+          <a:bodyPr>
+            <a:normAutofit fontScale="90000"/>
+          </a:bodyPr>
+          <a:lstStyle/>
+          <a:p>
+            <a:r>
+              <a:rPr lang="en-US" dirty="0" smtClean="0"/>
+              <a:t>Questions And Answers</a:t>
+            </a:r>
+            <a:endParaRPr lang="en-US" dirty="0"/>
+          </a:p>
+        </p:txBody>
+      </p:sp>
+      <p:sp>
+        <p:nvSpPr>
+          <p:cNvPr id="3" name="Content Placeholder 2"/>
+          <p:cNvSpPr>
+            <a:spLocks noGrp="1"/>
+          </p:cNvSpPr>
+          <p:nvPr>
+            <p:ph idx="1"/>
+          </p:nvPr>
+        </p:nvSpPr>
+        <p:spPr/>
+        <p:txBody>
+          <a:bodyPr/>
+          <a:lstStyle/>
+          <a:p>
+            <a:r>
+              <a:rPr lang="en-US" dirty="0" smtClean="0"/>
+              <a:t>You line ‘</a:t>
+            </a:r>
+            <a:r>
+              <a:rPr lang="en-US" dirty="0" err="1" smtClean="0"/>
+              <a:t>em</a:t>
+            </a:r>
+            <a:r>
+              <a:rPr lang="en-US" dirty="0" smtClean="0"/>
+              <a:t> up.</a:t>
+            </a:r>
+          </a:p>
+          <a:p>
+            <a:r>
+              <a:rPr lang="en-US" dirty="0" smtClean="0"/>
+              <a:t>I’ll knock ‘</a:t>
+            </a:r>
+            <a:r>
+              <a:rPr lang="en-US" dirty="0" err="1" smtClean="0"/>
+              <a:t>em</a:t>
+            </a:r>
+            <a:r>
+              <a:rPr lang="en-US" dirty="0" smtClean="0"/>
+              <a:t> down.</a:t>
+            </a:r>
+          </a:p>
+          <a:p>
+            <a:r>
+              <a:rPr lang="en-US" b="1" dirty="0" smtClean="0">
+                <a:solidFill>
+                  <a:srgbClr val="FF0000"/>
+                </a:solidFill>
+              </a:rPr>
+              <a:t>If I say something dumb and you know better, SPEAK UP!</a:t>
+            </a:r>
+          </a:p>
+        </p:txBody>
+      </p:sp>
+    </p:spTree>
+    <p:extLst>
+      <p:ext uri="{BB962C8B-B14F-4D97-AF65-F5344CB8AC3E}">
+        <p14:creationId xmlns:p14="http://schemas.microsoft.com/office/powerpoint/2010/main" val="3412954014"/>
+      </p:ext>
+    </p:extLst>
+  </p:cSld>
+  <p:clrMapOvr>
+    <a:masterClrMapping/>
+  </p:clrMapOvr>
+</p:sld>
+</file>
+
+<file path=ppt/slides/slide39.xml><?xml version="1.0" encoding="utf-8"?>
+<p:sld xmlns:a="http://schemas.openxmlformats.org/drawingml/2006/main" xmlns:r="http://schemas.openxmlformats.org/officeDocument/2006/relationships" xmlns:p="http://schemas.openxmlformats.org/presentationml/2006/main">
+  <p:cSld>
+    <p:spTree>
+      <p:nvGrpSpPr>
+        <p:cNvPr id="1" name=""/>
+        <p:cNvGrpSpPr/>
+        <p:nvPr/>
+      </p:nvGrpSpPr>
+      <p:grpSpPr>
+        <a:xfrm>
+          <a:off x="0" y="0"/>
+          <a:ext cx="0" cy="0"/>
+          <a:chOff x="0" y="0"/>
+          <a:chExt cx="0" cy="0"/>
+        </a:xfrm>
+      </p:grpSpPr>
+      <p:sp>
+        <p:nvSpPr>
+          <p:cNvPr id="2" name="Title 1"/>
+          <p:cNvSpPr>
+            <a:spLocks noGrp="1"/>
+          </p:cNvSpPr>
+          <p:nvPr>
+            <p:ph type="title"/>
+          </p:nvPr>
+        </p:nvSpPr>
+        <p:spPr/>
+        <p:txBody>
+          <a:bodyPr>
+            <a:normAutofit fontScale="90000"/>
+          </a:bodyPr>
+          <a:lstStyle/>
+          <a:p>
+            <a:r>
+              <a:rPr lang="en-US" dirty="0" smtClean="0"/>
+              <a:t>We’re Hiring</a:t>
+            </a:r>
+            <a:endParaRPr lang="en-US" dirty="0"/>
+          </a:p>
+        </p:txBody>
+      </p:sp>
+      <p:sp>
+        <p:nvSpPr>
+          <p:cNvPr id="3" name="Content Placeholder 2"/>
+          <p:cNvSpPr>
+            <a:spLocks noGrp="1"/>
+          </p:cNvSpPr>
+          <p:nvPr>
+            <p:ph idx="1"/>
+          </p:nvPr>
+        </p:nvSpPr>
+        <p:spPr/>
+        <p:txBody>
+          <a:bodyPr/>
+          <a:lstStyle/>
+          <a:p>
+            <a:r>
+              <a:rPr lang="en-US" dirty="0" smtClean="0"/>
+              <a:t>Senior </a:t>
+            </a:r>
+            <a:r>
+              <a:rPr lang="en-US" dirty="0" err="1" smtClean="0"/>
+              <a:t>.Net</a:t>
+            </a:r>
+            <a:r>
+              <a:rPr lang="en-US" dirty="0" smtClean="0"/>
+              <a:t> Developer</a:t>
+            </a:r>
+          </a:p>
+          <a:p>
+            <a:r>
+              <a:rPr lang="en-US" dirty="0" smtClean="0"/>
+              <a:t>Business Development Manager</a:t>
+            </a:r>
+          </a:p>
+          <a:p>
+            <a:r>
+              <a:rPr lang="en-US" dirty="0" smtClean="0"/>
+              <a:t>Program Manager</a:t>
+            </a:r>
+          </a:p>
+          <a:p>
+            <a:endParaRPr lang="en-US" dirty="0"/>
+          </a:p>
+          <a:p>
+            <a:pPr marL="0" indent="0">
+              <a:buNone/>
+            </a:pPr>
+            <a:r>
+              <a:rPr lang="en-US" sz="2000" dirty="0" smtClean="0"/>
+              <a:t>Email Valerie Carmona:  </a:t>
+            </a:r>
+            <a:r>
+              <a:rPr lang="en-US" sz="2000" dirty="0" smtClean="0">
+                <a:hlinkClick r:id="rId2"/>
+              </a:rPr>
+              <a:t>Valerie.Carmona@improvingenterprises.com</a:t>
+            </a:r>
+            <a:endParaRPr lang="en-US" dirty="0"/>
+          </a:p>
+        </p:txBody>
+      </p:sp>
+    </p:spTree>
+    <p:extLst>
+      <p:ext uri="{BB962C8B-B14F-4D97-AF65-F5344CB8AC3E}">
+        <p14:creationId xmlns:p14="http://schemas.microsoft.com/office/powerpoint/2010/main" val="1126961835"/>
+      </p:ext>
+    </p:extLst>
+  </p:cSld>
+  <p:clrMapOvr>
+    <a:masterClrMapping/>
+  </p:clrMapOvr>
+</p:sld>
+</file>
+
 <file path=ppt/slides/slide4.xml><?xml version="1.0" encoding="utf-8"?>
 <p:sld xmlns:a="http://schemas.openxmlformats.org/drawingml/2006/main" xmlns:r="http://schemas.openxmlformats.org/officeDocument/2006/relationships" xmlns:p="http://schemas.openxmlformats.org/presentationml/2006/main">
   <p:cSld>
@@ -20685,7 +20902,7 @@
   <a:extraClrSchemeLst/>
   <a:extLst>
     <a:ext uri="{05A4C25C-085E-4340-85A3-A5531E510DB2}">
-      <thm15:themeFamily xmlns="" xmlns:thm15="http://schemas.microsoft.com/office/thememl/2012/main" name="2013 Improving ppt template [Read-Only]" id="{9CD52372-1ABB-429C-AE8B-5116A847D281}" vid="{C9E045ED-5E7D-45F0-ABC2-8913C89F506A}"/>
+      <thm15:themeFamily xmlns:thm15="http://schemas.microsoft.com/office/thememl/2012/main" name="2013 Improving ppt template [Read-Only]" id="{9CD52372-1ABB-429C-AE8B-5116A847D281}" vid="{C9E045ED-5E7D-45F0-ABC2-8913C89F506A}"/>
     </a:ext>
   </a:extLst>
 </a:theme>
@@ -20946,19 +21163,16 @@
   <a:extraClrSchemeLst/>
   <a:extLst>
     <a:ext uri="{05A4C25C-085E-4340-85A3-A5531E510DB2}">
-      <thm15:themeFamily xmlns="" xmlns:thm15="http://schemas.microsoft.com/office/thememl/2012/main" name="Office Theme" id="{62F939B6-93AF-4DB8-9C6B-D6C7DFDC589F}" vid="{4A3C46E8-61CC-4603-A589-7422A47A8E4A}"/>
+      <thm15:themeFamily xmlns:thm15="http://schemas.microsoft.com/office/thememl/2012/main" name="Office Theme" id="{62F939B6-93AF-4DB8-9C6B-D6C7DFDC589F}" vid="{4A3C46E8-61CC-4603-A589-7422A47A8E4A}"/>
     </a:ext>
   </a:extLst>
 </a:theme>
 </file>
 
 <file path=customXml/item1.xml><?xml version="1.0" encoding="utf-8"?>
-<?mso-contentType ?>
-<FormTemplates xmlns="http://schemas.microsoft.com/sharepoint/v3/contenttype/forms">
-  <Display>DocumentLibraryForm</Display>
-  <Edit>DocumentLibraryForm</Edit>
-  <New>DocumentLibraryForm</New>
-</FormTemplates>
+<p:properties xmlns:p="http://schemas.microsoft.com/office/2006/metadata/properties" xmlns:xsi="http://www.w3.org/2001/XMLSchema-instance" xmlns:pc="http://schemas.microsoft.com/office/infopath/2007/PartnerControls">
+  <documentManagement/>
+</p:properties>
 </file>
 
 <file path=customXml/item2.xml><?xml version="1.0" encoding="utf-8"?>
@@ -21076,15 +21290,25 @@
 </file>
 
 <file path=customXml/item3.xml><?xml version="1.0" encoding="utf-8"?>
-<p:properties xmlns:p="http://schemas.microsoft.com/office/2006/metadata/properties" xmlns:xsi="http://www.w3.org/2001/XMLSchema-instance" xmlns:pc="http://schemas.microsoft.com/office/infopath/2007/PartnerControls">
-  <documentManagement/>
-</p:properties>
+<?mso-contentType ?>
+<FormTemplates xmlns="http://schemas.microsoft.com/sharepoint/v3/contenttype/forms">
+  <Display>DocumentLibraryForm</Display>
+  <Edit>DocumentLibraryForm</Edit>
+  <New>DocumentLibraryForm</New>
+</FormTemplates>
 </file>
 
 <file path=customXml/itemProps1.xml><?xml version="1.0" encoding="utf-8"?>
-<ds:datastoreItem xmlns:ds="http://schemas.openxmlformats.org/officeDocument/2006/customXml" ds:itemID="{B857AB07-B2ED-439E-860F-4F56FB345D1B}">
+<ds:datastoreItem xmlns:ds="http://schemas.openxmlformats.org/officeDocument/2006/customXml" ds:itemID="{A04551C0-1604-41A0-9B5C-A5F88AD2E0FE}">
   <ds:schemaRefs>
-    <ds:schemaRef ds:uri="http://schemas.microsoft.com/sharepoint/v3/contenttype/forms"/>
+    <ds:schemaRef ds:uri="http://schemas.microsoft.com/office/infopath/2007/PartnerControls"/>
+    <ds:schemaRef ds:uri="http://purl.org/dc/elements/1.1/"/>
+    <ds:schemaRef ds:uri="http://schemas.microsoft.com/office/2006/metadata/properties"/>
+    <ds:schemaRef ds:uri="http://purl.org/dc/terms/"/>
+    <ds:schemaRef ds:uri="http://schemas.openxmlformats.org/package/2006/metadata/core-properties"/>
+    <ds:schemaRef ds:uri="http://schemas.microsoft.com/office/2006/documentManagement/types"/>
+    <ds:schemaRef ds:uri="http://www.w3.org/XML/1998/namespace"/>
+    <ds:schemaRef ds:uri="http://purl.org/dc/dcmitype/"/>
   </ds:schemaRefs>
 </ds:datastoreItem>
 </file>
@@ -21106,16 +21330,9 @@
 </file>
 
 <file path=customXml/itemProps3.xml><?xml version="1.0" encoding="utf-8"?>
-<ds:datastoreItem xmlns:ds="http://schemas.openxmlformats.org/officeDocument/2006/customXml" ds:itemID="{A04551C0-1604-41A0-9B5C-A5F88AD2E0FE}">
+<ds:datastoreItem xmlns:ds="http://schemas.openxmlformats.org/officeDocument/2006/customXml" ds:itemID="{B857AB07-B2ED-439E-860F-4F56FB345D1B}">
   <ds:schemaRefs>
-    <ds:schemaRef ds:uri="http://schemas.microsoft.com/office/infopath/2007/PartnerControls"/>
-    <ds:schemaRef ds:uri="http://purl.org/dc/elements/1.1/"/>
-    <ds:schemaRef ds:uri="http://schemas.microsoft.com/office/2006/metadata/properties"/>
-    <ds:schemaRef ds:uri="http://purl.org/dc/terms/"/>
-    <ds:schemaRef ds:uri="http://schemas.openxmlformats.org/package/2006/metadata/core-properties"/>
-    <ds:schemaRef ds:uri="http://schemas.microsoft.com/office/2006/documentManagement/types"/>
-    <ds:schemaRef ds:uri="http://www.w3.org/XML/1998/namespace"/>
-    <ds:schemaRef ds:uri="http://purl.org/dc/dcmitype/"/>
+    <ds:schemaRef ds:uri="http://schemas.microsoft.com/sharepoint/v3/contenttype/forms"/>
   </ds:schemaRefs>
 </ds:datastoreItem>
 </file>
</xml_diff>

<commit_message>
Added Just for Fun page.
</commit_message>
<xml_diff>
--- a/Presentation/THasINKync.pptx
+++ b/Presentation/THasINKync.pptx
@@ -7,44 +7,45 @@
   </p:sldMasterIdLst>
   <p:sldIdLst>
     <p:sldId id="256" r:id="rId6"/>
-    <p:sldId id="260" r:id="rId7"/>
-    <p:sldId id="261" r:id="rId8"/>
-    <p:sldId id="259" r:id="rId9"/>
-    <p:sldId id="257" r:id="rId10"/>
-    <p:sldId id="258" r:id="rId11"/>
-    <p:sldId id="262" r:id="rId12"/>
-    <p:sldId id="269" r:id="rId13"/>
-    <p:sldId id="263" r:id="rId14"/>
-    <p:sldId id="270" r:id="rId15"/>
-    <p:sldId id="264" r:id="rId16"/>
-    <p:sldId id="271" r:id="rId17"/>
-    <p:sldId id="265" r:id="rId18"/>
-    <p:sldId id="272" r:id="rId19"/>
-    <p:sldId id="266" r:id="rId20"/>
-    <p:sldId id="267" r:id="rId21"/>
-    <p:sldId id="268" r:id="rId22"/>
-    <p:sldId id="273" r:id="rId23"/>
-    <p:sldId id="274" r:id="rId24"/>
-    <p:sldId id="278" r:id="rId25"/>
-    <p:sldId id="290" r:id="rId26"/>
-    <p:sldId id="275" r:id="rId27"/>
-    <p:sldId id="279" r:id="rId28"/>
-    <p:sldId id="281" r:id="rId29"/>
-    <p:sldId id="291" r:id="rId30"/>
-    <p:sldId id="277" r:id="rId31"/>
-    <p:sldId id="280" r:id="rId32"/>
-    <p:sldId id="282" r:id="rId33"/>
-    <p:sldId id="287" r:id="rId34"/>
-    <p:sldId id="283" r:id="rId35"/>
-    <p:sldId id="284" r:id="rId36"/>
-    <p:sldId id="288" r:id="rId37"/>
-    <p:sldId id="285" r:id="rId38"/>
-    <p:sldId id="286" r:id="rId39"/>
-    <p:sldId id="292" r:id="rId40"/>
-    <p:sldId id="289" r:id="rId41"/>
-    <p:sldId id="276" r:id="rId42"/>
-    <p:sldId id="294" r:id="rId43"/>
-    <p:sldId id="293" r:id="rId44"/>
+    <p:sldId id="295" r:id="rId7"/>
+    <p:sldId id="260" r:id="rId8"/>
+    <p:sldId id="261" r:id="rId9"/>
+    <p:sldId id="259" r:id="rId10"/>
+    <p:sldId id="257" r:id="rId11"/>
+    <p:sldId id="258" r:id="rId12"/>
+    <p:sldId id="262" r:id="rId13"/>
+    <p:sldId id="269" r:id="rId14"/>
+    <p:sldId id="263" r:id="rId15"/>
+    <p:sldId id="270" r:id="rId16"/>
+    <p:sldId id="264" r:id="rId17"/>
+    <p:sldId id="271" r:id="rId18"/>
+    <p:sldId id="265" r:id="rId19"/>
+    <p:sldId id="272" r:id="rId20"/>
+    <p:sldId id="266" r:id="rId21"/>
+    <p:sldId id="267" r:id="rId22"/>
+    <p:sldId id="268" r:id="rId23"/>
+    <p:sldId id="273" r:id="rId24"/>
+    <p:sldId id="274" r:id="rId25"/>
+    <p:sldId id="278" r:id="rId26"/>
+    <p:sldId id="290" r:id="rId27"/>
+    <p:sldId id="275" r:id="rId28"/>
+    <p:sldId id="279" r:id="rId29"/>
+    <p:sldId id="281" r:id="rId30"/>
+    <p:sldId id="291" r:id="rId31"/>
+    <p:sldId id="277" r:id="rId32"/>
+    <p:sldId id="280" r:id="rId33"/>
+    <p:sldId id="282" r:id="rId34"/>
+    <p:sldId id="287" r:id="rId35"/>
+    <p:sldId id="283" r:id="rId36"/>
+    <p:sldId id="284" r:id="rId37"/>
+    <p:sldId id="288" r:id="rId38"/>
+    <p:sldId id="285" r:id="rId39"/>
+    <p:sldId id="286" r:id="rId40"/>
+    <p:sldId id="292" r:id="rId41"/>
+    <p:sldId id="289" r:id="rId42"/>
+    <p:sldId id="276" r:id="rId43"/>
+    <p:sldId id="294" r:id="rId44"/>
+    <p:sldId id="293" r:id="rId45"/>
   </p:sldIdLst>
   <p:sldSz cx="9144000" cy="5143500" type="screen16x9"/>
   <p:notesSz cx="6858000" cy="9144000"/>
@@ -145,7 +146,7 @@
   </p:defaultTextStyle>
   <p:extLst>
     <p:ext uri="{EFAFB233-063F-42B5-8137-9DF3F51BA10A}">
-      <p15:sldGuideLst xmlns:p15="http://schemas.microsoft.com/office/powerpoint/2012/main">
+      <p15:sldGuideLst xmlns:p15="http://schemas.microsoft.com/office/powerpoint/2012/main" xmlns="">
         <p15:guide id="1" orient="horz" pos="1620" userDrawn="1">
           <p15:clr>
             <a:srgbClr val="A4A3A4"/>
@@ -13846,7 +13847,7 @@
       </p:grpSpPr>
       <p:sp>
         <p:nvSpPr>
-          <p:cNvPr id="2" name="Title 1"/>
+          <p:cNvPr id="4" name="Title 3"/>
           <p:cNvSpPr>
             <a:spLocks noGrp="1"/>
           </p:cNvSpPr>
@@ -13863,7 +13864,7 @@
           <a:p>
             <a:r>
               <a:rPr lang="en-US" dirty="0" smtClean="0"/>
-              <a:t>Lame Joke</a:t>
+              <a:t>When to Use Multi-threading</a:t>
             </a:r>
             <a:endParaRPr lang="en-US" dirty="0"/>
           </a:p>
@@ -13871,7 +13872,7 @@
       </p:sp>
       <p:sp>
         <p:nvSpPr>
-          <p:cNvPr id="3" name="Content Placeholder 2"/>
+          <p:cNvPr id="9" name="Content Placeholder 8"/>
           <p:cNvSpPr>
             <a:spLocks noGrp="1"/>
           </p:cNvSpPr>
@@ -13881,24 +13882,34 @@
         </p:nvSpPr>
         <p:spPr/>
         <p:txBody>
-          <a:bodyPr/>
+          <a:bodyPr>
+            <a:normAutofit/>
+          </a:bodyPr>
           <a:lstStyle/>
           <a:p>
-            <a:pPr marL="0" indent="0">
-              <a:buNone/>
-            </a:pPr>
             <a:r>
               <a:rPr lang="en-US" dirty="0" smtClean="0"/>
-              <a:t>Sixteen sodium atoms walk into a bar, followed by Batman.</a:t>
-            </a:r>
-            <a:endParaRPr lang="en-US" dirty="0"/>
+              <a:t>Application is CPU bound and not using all cores.  The task manager tells the story.</a:t>
+            </a:r>
+          </a:p>
+          <a:p>
+            <a:r>
+              <a:rPr lang="en-US" dirty="0" smtClean="0"/>
+              <a:t>Application is waiting on external resources that can be loaded in parallel.</a:t>
+            </a:r>
+          </a:p>
+          <a:p>
+            <a:r>
+              <a:rPr lang="en-US" dirty="0" smtClean="0"/>
+              <a:t>Only when the benefits outweigh the costs.</a:t>
+            </a:r>
           </a:p>
         </p:txBody>
       </p:sp>
     </p:spTree>
     <p:extLst>
       <p:ext uri="{BB962C8B-B14F-4D97-AF65-F5344CB8AC3E}">
-        <p14:creationId xmlns:p14="http://schemas.microsoft.com/office/powerpoint/2010/main" val="3353674203"/>
+        <p14:creationId xmlns:p14="http://schemas.microsoft.com/office/powerpoint/2010/main" val="729225566"/>
       </p:ext>
     </p:extLst>
   </p:cSld>
@@ -13951,7 +13962,7 @@
           <a:p>
             <a:r>
               <a:rPr lang="en-US" dirty="0" smtClean="0"/>
-              <a:t>A Word of Caution</a:t>
+              <a:t>Lame Joke</a:t>
             </a:r>
             <a:endParaRPr lang="en-US" dirty="0"/>
           </a:p>
@@ -13969,106 +13980,24 @@
         </p:nvSpPr>
         <p:spPr/>
         <p:txBody>
-          <a:bodyPr>
-            <a:normAutofit fontScale="77500" lnSpcReduction="20000"/>
-          </a:bodyPr>
+          <a:bodyPr/>
           <a:lstStyle/>
           <a:p>
+            <a:pPr marL="0" indent="0">
+              <a:buNone/>
+            </a:pPr>
             <a:r>
               <a:rPr lang="en-US" dirty="0" smtClean="0"/>
-              <a:t>I’m not an expert.</a:t>
-            </a:r>
-          </a:p>
-          <a:p>
-            <a:r>
-              <a:rPr lang="en-US" dirty="0" smtClean="0"/>
-              <a:t>Can become a minefield of subtle and hard to reproduce defects.</a:t>
-            </a:r>
-          </a:p>
-          <a:p>
-            <a:r>
-              <a:rPr lang="en-US" dirty="0" smtClean="0"/>
-              <a:t>More computing sins are committed in the name of efficiency that for any other single reason, including blind stupidity</a:t>
-            </a:r>
-            <a:br>
-              <a:rPr lang="en-US" dirty="0" smtClean="0"/>
-            </a:br>
-            <a:r>
-              <a:rPr lang="en-US" dirty="0" smtClean="0"/>
-              <a:t>		– W.A. </a:t>
-            </a:r>
-            <a:r>
-              <a:rPr lang="en-US" dirty="0" err="1" smtClean="0"/>
-              <a:t>Wulf</a:t>
-            </a:r>
-            <a:endParaRPr lang="en-US" dirty="0" smtClean="0"/>
-          </a:p>
-          <a:p>
-            <a:r>
-              <a:rPr lang="en-US" dirty="0" smtClean="0"/>
-              <a:t>Premature optimization is the root of all evil</a:t>
-            </a:r>
-            <a:br>
-              <a:rPr lang="en-US" dirty="0" smtClean="0"/>
-            </a:br>
-            <a:r>
-              <a:rPr lang="en-US" dirty="0" smtClean="0"/>
-              <a:t>		– Donald </a:t>
-            </a:r>
-            <a:r>
-              <a:rPr lang="en-US" dirty="0" err="1" smtClean="0"/>
-              <a:t>Kuth</a:t>
-            </a:r>
-            <a:endParaRPr lang="en-US" dirty="0" smtClean="0"/>
-          </a:p>
-          <a:p>
-            <a:r>
-              <a:rPr lang="en-US" dirty="0" smtClean="0"/>
-              <a:t>Jackson’s Rules of Optimization</a:t>
-            </a:r>
-          </a:p>
-          <a:p>
-            <a:pPr lvl="1"/>
-            <a:r>
-              <a:rPr lang="en-US" dirty="0" smtClean="0"/>
-              <a:t>Don’t do it.</a:t>
-            </a:r>
-          </a:p>
-          <a:p>
-            <a:pPr lvl="1"/>
-            <a:r>
-              <a:rPr lang="en-US" dirty="0" smtClean="0"/>
-              <a:t>(For experts only): Don’t do it </a:t>
-            </a:r>
-            <a:r>
-              <a:rPr lang="en-US" i="1" dirty="0" smtClean="0"/>
-              <a:t>yet</a:t>
-            </a:r>
-            <a:r>
-              <a:rPr lang="en-US" dirty="0" smtClean="0"/>
-              <a:t>.</a:t>
+              <a:t>Sixteen sodium atoms walk into a bar, followed by Batman.</a:t>
             </a:r>
             <a:endParaRPr lang="en-US" dirty="0"/>
-          </a:p>
-          <a:p>
-            <a:r>
-              <a:rPr lang="en-US" dirty="0" smtClean="0"/>
-              <a:t>Eric’s Rule of Optimization</a:t>
-            </a:r>
-          </a:p>
-          <a:p>
-            <a:pPr lvl="1"/>
-            <a:r>
-              <a:rPr lang="en-US" dirty="0" smtClean="0"/>
-              <a:t>Do whatever the heck you want!</a:t>
-            </a:r>
           </a:p>
         </p:txBody>
       </p:sp>
     </p:spTree>
     <p:extLst>
       <p:ext uri="{BB962C8B-B14F-4D97-AF65-F5344CB8AC3E}">
-        <p14:creationId xmlns:p14="http://schemas.microsoft.com/office/powerpoint/2010/main" val="266457984"/>
+        <p14:creationId xmlns:p14="http://schemas.microsoft.com/office/powerpoint/2010/main" val="3353674203"/>
       </p:ext>
     </p:extLst>
   </p:cSld>
@@ -14121,7 +14050,7 @@
           <a:p>
             <a:r>
               <a:rPr lang="en-US" dirty="0" smtClean="0"/>
-              <a:t>Lame Joke</a:t>
+              <a:t>A Word of Caution</a:t>
             </a:r>
             <a:endParaRPr lang="en-US" dirty="0"/>
           </a:p>
@@ -14140,29 +14069,105 @@
         <p:spPr/>
         <p:txBody>
           <a:bodyPr>
-            <a:normAutofit/>
+            <a:normAutofit fontScale="77500" lnSpcReduction="20000"/>
           </a:bodyPr>
           <a:lstStyle/>
           <a:p>
-            <a:pPr marL="0" indent="0">
-              <a:buNone/>
-            </a:pPr>
-            <a:r>
-              <a:rPr lang="en-US" dirty="0"/>
-              <a:t>What’s the difference between an etymologist and an </a:t>
-            </a:r>
             <a:r>
               <a:rPr lang="en-US" dirty="0" smtClean="0"/>
-              <a:t>entomologist?</a:t>
+              <a:t>I’m not an expert.</a:t>
+            </a:r>
+          </a:p>
+          <a:p>
+            <a:r>
+              <a:rPr lang="en-US" dirty="0" smtClean="0"/>
+              <a:t>Can become a minefield of subtle and hard to reproduce defects.</a:t>
+            </a:r>
+          </a:p>
+          <a:p>
+            <a:r>
+              <a:rPr lang="en-US" dirty="0" smtClean="0"/>
+              <a:t>More computing sins are committed in the name of efficiency that for any other single reason, including blind stupidity</a:t>
+            </a:r>
+            <a:br>
+              <a:rPr lang="en-US" dirty="0" smtClean="0"/>
+            </a:br>
+            <a:r>
+              <a:rPr lang="en-US" dirty="0" smtClean="0"/>
+              <a:t>		– W.A. </a:t>
+            </a:r>
+            <a:r>
+              <a:rPr lang="en-US" dirty="0" err="1" smtClean="0"/>
+              <a:t>Wulf</a:t>
+            </a:r>
+            <a:endParaRPr lang="en-US" dirty="0" smtClean="0"/>
+          </a:p>
+          <a:p>
+            <a:r>
+              <a:rPr lang="en-US" dirty="0" smtClean="0"/>
+              <a:t>Premature optimization is the root of all evil</a:t>
+            </a:r>
+            <a:br>
+              <a:rPr lang="en-US" dirty="0" smtClean="0"/>
+            </a:br>
+            <a:r>
+              <a:rPr lang="en-US" dirty="0" smtClean="0"/>
+              <a:t>		– Donald </a:t>
+            </a:r>
+            <a:r>
+              <a:rPr lang="en-US" dirty="0" err="1" smtClean="0"/>
+              <a:t>Kuth</a:t>
+            </a:r>
+            <a:endParaRPr lang="en-US" dirty="0" smtClean="0"/>
+          </a:p>
+          <a:p>
+            <a:r>
+              <a:rPr lang="en-US" dirty="0" smtClean="0"/>
+              <a:t>Jackson’s Rules of Optimization</a:t>
+            </a:r>
+          </a:p>
+          <a:p>
+            <a:pPr lvl="1"/>
+            <a:r>
+              <a:rPr lang="en-US" dirty="0" smtClean="0"/>
+              <a:t>Don’t do it.</a:t>
+            </a:r>
+          </a:p>
+          <a:p>
+            <a:pPr lvl="1"/>
+            <a:r>
+              <a:rPr lang="en-US" dirty="0" smtClean="0"/>
+              <a:t>(For experts only): Don’t do it </a:t>
+            </a:r>
+            <a:r>
+              <a:rPr lang="en-US" i="1" dirty="0" smtClean="0"/>
+              <a:t>yet</a:t>
+            </a:r>
+            <a:r>
+              <a:rPr lang="en-US" dirty="0" smtClean="0"/>
+              <a:t>.</a:t>
             </a:r>
             <a:endParaRPr lang="en-US" dirty="0"/>
+          </a:p>
+          <a:p>
+            <a:r>
+              <a:rPr lang="en-US" dirty="0" smtClean="0"/>
+              <a:t>Eric’s Rule of Optimization</a:t>
+            </a:r>
+          </a:p>
+          <a:p>
+            <a:pPr lvl="1"/>
+            <a:r>
+              <a:rPr lang="en-US" dirty="0" smtClean="0"/>
+              <a:t>Do whatever the heck you want!</a:t>
+            </a:r>
           </a:p>
         </p:txBody>
       </p:sp>
     </p:spTree>
     <p:extLst>
       <p:ext uri="{BB962C8B-B14F-4D97-AF65-F5344CB8AC3E}">
-        <p14:creationId xmlns:p14="http://schemas.microsoft.com/office/powerpoint/2010/main" val="1260671292"/>
+        <p14:creationId xmlns:p14="http://schemas.microsoft.com/office/powerpoint/2010/main" val="266457984"/>
       </p:ext>
     </p:extLst>
   </p:cSld>
@@ -14215,7 +14220,7 @@
           <a:p>
             <a:r>
               <a:rPr lang="en-US" dirty="0" smtClean="0"/>
-              <a:t>How to Begin</a:t>
+              <a:t>Lame Joke</a:t>
             </a:r>
             <a:endParaRPr lang="en-US" dirty="0"/>
           </a:p>
@@ -14233,49 +14238,22 @@
         </p:nvSpPr>
         <p:spPr/>
         <p:txBody>
-          <a:bodyPr/>
+          <a:bodyPr>
+            <a:normAutofit/>
+          </a:bodyPr>
           <a:lstStyle/>
           <a:p>
+            <a:pPr marL="0" indent="0">
+              <a:buNone/>
+            </a:pPr>
+            <a:r>
+              <a:rPr lang="en-US" dirty="0"/>
+              <a:t>What’s the difference between an etymologist and an </a:t>
+            </a:r>
             <a:r>
               <a:rPr lang="en-US" dirty="0" smtClean="0"/>
-              <a:t>Understanding your application and what can be done in parallel </a:t>
-            </a:r>
-            <a:r>
-              <a:rPr lang="en-US" b="1" dirty="0" smtClean="0">
-                <a:solidFill>
-                  <a:srgbClr val="FF0000"/>
-                </a:solidFill>
-              </a:rPr>
-              <a:t>CANNOT be skipped</a:t>
-            </a:r>
-            <a:r>
-              <a:rPr lang="en-US" dirty="0" smtClean="0"/>
-              <a:t>.</a:t>
-            </a:r>
-          </a:p>
-          <a:p>
-            <a:r>
-              <a:rPr lang="en-US" dirty="0" smtClean="0"/>
-              <a:t>Look for potential parallelism across the application as a whole.</a:t>
-            </a:r>
-          </a:p>
-          <a:p>
-            <a:r>
-              <a:rPr lang="en-US" dirty="0" smtClean="0"/>
-              <a:t>Prepare your application for parallel execution my making structural changes.</a:t>
-            </a:r>
-          </a:p>
-          <a:p>
-            <a:r>
-              <a:rPr lang="en-US" dirty="0" smtClean="0"/>
-              <a:t>Sound vague?  Know </a:t>
-            </a:r>
-            <a:r>
-              <a:rPr lang="en-US" dirty="0"/>
-              <a:t>the patterns and the problems they solve!</a:t>
-            </a:r>
-          </a:p>
-          <a:p>
+              <a:t>entomologist?</a:t>
+            </a:r>
             <a:endParaRPr lang="en-US" dirty="0"/>
           </a:p>
         </p:txBody>
@@ -14283,7 +14261,7 @@
     </p:spTree>
     <p:extLst>
       <p:ext uri="{BB962C8B-B14F-4D97-AF65-F5344CB8AC3E}">
-        <p14:creationId xmlns:p14="http://schemas.microsoft.com/office/powerpoint/2010/main" val="2846285021"/>
+        <p14:creationId xmlns:p14="http://schemas.microsoft.com/office/powerpoint/2010/main" val="1260671292"/>
       </p:ext>
     </p:extLst>
   </p:cSld>
@@ -14336,7 +14314,7 @@
           <a:p>
             <a:r>
               <a:rPr lang="en-US" dirty="0" smtClean="0"/>
-              <a:t>Lame Joke</a:t>
+              <a:t>How to Begin</a:t>
             </a:r>
             <a:endParaRPr lang="en-US" dirty="0"/>
           </a:p>
@@ -14354,18 +14332,49 @@
         </p:nvSpPr>
         <p:spPr/>
         <p:txBody>
-          <a:bodyPr>
-            <a:normAutofit/>
-          </a:bodyPr>
+          <a:bodyPr/>
           <a:lstStyle/>
           <a:p>
-            <a:pPr marL="0" indent="0">
-              <a:buNone/>
-            </a:pPr>
             <a:r>
               <a:rPr lang="en-US" dirty="0" smtClean="0"/>
-              <a:t>There are only two types of people in this world…</a:t>
-            </a:r>
+              <a:t>Understanding your application and what can be done in parallel </a:t>
+            </a:r>
+            <a:r>
+              <a:rPr lang="en-US" b="1" dirty="0" smtClean="0">
+                <a:solidFill>
+                  <a:srgbClr val="FF0000"/>
+                </a:solidFill>
+              </a:rPr>
+              <a:t>CANNOT be skipped</a:t>
+            </a:r>
+            <a:r>
+              <a:rPr lang="en-US" dirty="0" smtClean="0"/>
+              <a:t>.</a:t>
+            </a:r>
+          </a:p>
+          <a:p>
+            <a:r>
+              <a:rPr lang="en-US" dirty="0" smtClean="0"/>
+              <a:t>Look for potential parallelism across the application as a whole.</a:t>
+            </a:r>
+          </a:p>
+          <a:p>
+            <a:r>
+              <a:rPr lang="en-US" dirty="0" smtClean="0"/>
+              <a:t>Prepare your application for parallel execution my making structural changes.</a:t>
+            </a:r>
+          </a:p>
+          <a:p>
+            <a:r>
+              <a:rPr lang="en-US" dirty="0" smtClean="0"/>
+              <a:t>Sound vague?  Know </a:t>
+            </a:r>
+            <a:r>
+              <a:rPr lang="en-US" dirty="0"/>
+              <a:t>the patterns and the problems they solve!</a:t>
+            </a:r>
+          </a:p>
+          <a:p>
             <a:endParaRPr lang="en-US" dirty="0"/>
           </a:p>
         </p:txBody>
@@ -14373,7 +14382,7 @@
     </p:spTree>
     <p:extLst>
       <p:ext uri="{BB962C8B-B14F-4D97-AF65-F5344CB8AC3E}">
-        <p14:creationId xmlns:p14="http://schemas.microsoft.com/office/powerpoint/2010/main" val="2076512389"/>
+        <p14:creationId xmlns:p14="http://schemas.microsoft.com/office/powerpoint/2010/main" val="2846285021"/>
       </p:ext>
     </p:extLst>
   </p:cSld>
@@ -14426,7 +14435,7 @@
           <a:p>
             <a:r>
               <a:rPr lang="en-US" dirty="0" smtClean="0"/>
-              <a:t>Tips and Tricks</a:t>
+              <a:t>Lame Joke</a:t>
             </a:r>
             <a:endParaRPr lang="en-US" dirty="0"/>
           </a:p>
@@ -14449,35 +14458,12 @@
           </a:bodyPr>
           <a:lstStyle/>
           <a:p>
+            <a:pPr marL="0" indent="0">
+              <a:buNone/>
+            </a:pPr>
             <a:r>
               <a:rPr lang="en-US" dirty="0" smtClean="0"/>
-              <a:t>Locks are the “</a:t>
-            </a:r>
-            <a:r>
-              <a:rPr lang="en-US" dirty="0" err="1" smtClean="0"/>
-              <a:t>goto</a:t>
-            </a:r>
-            <a:r>
-              <a:rPr lang="en-US" dirty="0" smtClean="0"/>
-              <a:t>” statement of multi-threading.</a:t>
-            </a:r>
-          </a:p>
-          <a:p>
-            <a:r>
-              <a:rPr lang="en-US" dirty="0" smtClean="0"/>
-              <a:t>The code NEEDS to be correct.  If you aren’t certain, seek help.  This stuff is hard!</a:t>
-            </a:r>
-          </a:p>
-          <a:p>
-            <a:r>
-              <a:rPr lang="en-US" dirty="0" smtClean="0"/>
-              <a:t>Don’t share data among threads unless absolutely necessary.</a:t>
-            </a:r>
-          </a:p>
-          <a:p>
-            <a:r>
-              <a:rPr lang="en-US" dirty="0" smtClean="0"/>
-              <a:t>Try to use threads and locks as a last resort.  Try to raise the level of abstraction from threads to tasks.</a:t>
+              <a:t>There are only two types of people in this world…</a:t>
             </a:r>
             <a:endParaRPr lang="en-US" dirty="0"/>
           </a:p>
@@ -14486,7 +14472,7 @@
     </p:spTree>
     <p:extLst>
       <p:ext uri="{BB962C8B-B14F-4D97-AF65-F5344CB8AC3E}">
-        <p14:creationId xmlns:p14="http://schemas.microsoft.com/office/powerpoint/2010/main" val="454309200"/>
+        <p14:creationId xmlns:p14="http://schemas.microsoft.com/office/powerpoint/2010/main" val="2076512389"/>
       </p:ext>
     </p:extLst>
   </p:cSld>
@@ -14539,7 +14525,7 @@
           <a:p>
             <a:r>
               <a:rPr lang="en-US" dirty="0" smtClean="0"/>
-              <a:t>Lame Joke</a:t>
+              <a:t>Tips and Tricks</a:t>
             </a:r>
             <a:endParaRPr lang="en-US" dirty="0"/>
           </a:p>
@@ -14557,15 +14543,40 @@
         </p:nvSpPr>
         <p:spPr/>
         <p:txBody>
-          <a:bodyPr/>
+          <a:bodyPr>
+            <a:normAutofit/>
+          </a:bodyPr>
           <a:lstStyle/>
           <a:p>
-            <a:pPr marL="0" indent="0">
-              <a:buNone/>
-            </a:pPr>
             <a:r>
               <a:rPr lang="en-US" dirty="0" smtClean="0"/>
-              <a:t>An infinite number of mathematicians walk into a bar.</a:t>
+              <a:t>Locks are the “</a:t>
+            </a:r>
+            <a:r>
+              <a:rPr lang="en-US" dirty="0" err="1" smtClean="0"/>
+              <a:t>goto</a:t>
+            </a:r>
+            <a:r>
+              <a:rPr lang="en-US" dirty="0" smtClean="0"/>
+              <a:t>” statement of multi-threading.</a:t>
+            </a:r>
+          </a:p>
+          <a:p>
+            <a:r>
+              <a:rPr lang="en-US" dirty="0" smtClean="0"/>
+              <a:t>The code NEEDS to be correct.  If you aren’t certain, seek help.  This stuff is hard!</a:t>
+            </a:r>
+          </a:p>
+          <a:p>
+            <a:r>
+              <a:rPr lang="en-US" dirty="0" smtClean="0"/>
+              <a:t>Don’t share data among threads unless absolutely necessary.</a:t>
+            </a:r>
+          </a:p>
+          <a:p>
+            <a:r>
+              <a:rPr lang="en-US" dirty="0" smtClean="0"/>
+              <a:t>Try to use threads and locks as a last resort.  Try to raise the level of abstraction from threads to tasks.</a:t>
             </a:r>
             <a:endParaRPr lang="en-US" dirty="0"/>
           </a:p>
@@ -14574,7 +14585,7 @@
     </p:spTree>
     <p:extLst>
       <p:ext uri="{BB962C8B-B14F-4D97-AF65-F5344CB8AC3E}">
-        <p14:creationId xmlns:p14="http://schemas.microsoft.com/office/powerpoint/2010/main" val="705309734"/>
+        <p14:creationId xmlns:p14="http://schemas.microsoft.com/office/powerpoint/2010/main" val="454309200"/>
       </p:ext>
     </p:extLst>
   </p:cSld>
@@ -14627,11 +14638,7 @@
           <a:p>
             <a:r>
               <a:rPr lang="en-US" dirty="0" smtClean="0"/>
-              <a:t>Basics of Threading in </a:t>
-            </a:r>
-            <a:r>
-              <a:rPr lang="en-US" dirty="0" err="1" smtClean="0"/>
-              <a:t>.Net</a:t>
+              <a:t>Lame Joke</a:t>
             </a:r>
             <a:endParaRPr lang="en-US" dirty="0"/>
           </a:p>
@@ -14647,190 +14654,18 @@
             <p:ph idx="1"/>
           </p:nvPr>
         </p:nvSpPr>
-        <p:spPr>
-          <a:xfrm>
-            <a:off x="457200" y="1212507"/>
-            <a:ext cx="8229600" cy="3394472"/>
-          </a:xfrm>
-        </p:spPr>
-        <p:txBody>
-          <a:bodyPr>
-            <a:normAutofit fontScale="55000" lnSpcReduction="20000"/>
-          </a:bodyPr>
+        <p:spPr/>
+        <p:txBody>
+          <a:bodyPr/>
           <a:lstStyle/>
           <a:p>
+            <a:pPr marL="0" indent="0">
+              <a:buNone/>
+            </a:pPr>
             <a:r>
               <a:rPr lang="en-US" dirty="0" smtClean="0"/>
-              <a:t>Threading hello world</a:t>
-            </a:r>
-          </a:p>
-          <a:p>
-            <a:r>
-              <a:rPr lang="en-US" dirty="0" smtClean="0"/>
-              <a:t>Passing parameters to threads</a:t>
-            </a:r>
-          </a:p>
-          <a:p>
-            <a:r>
-              <a:rPr lang="en-US" dirty="0" smtClean="0"/>
-              <a:t>Data races and locking</a:t>
-            </a:r>
-          </a:p>
-          <a:p>
-            <a:r>
-              <a:rPr lang="en-US" dirty="0" smtClean="0"/>
-              <a:t>Deadlocks, waiting, and pulsing</a:t>
-            </a:r>
-          </a:p>
-          <a:p>
-            <a:r>
-              <a:rPr lang="en-US" dirty="0"/>
-              <a:t>Wait handles, Reset Events, and </a:t>
-            </a:r>
-            <a:r>
-              <a:rPr lang="en-US" dirty="0" err="1"/>
-              <a:t>Mutexes</a:t>
-            </a:r>
-            <a:endParaRPr lang="en-US" dirty="0"/>
-          </a:p>
-          <a:p>
-            <a:r>
-              <a:rPr lang="en-US" dirty="0" smtClean="0"/>
-              <a:t>Using the thread pool and asynchronous methods.</a:t>
-            </a:r>
-          </a:p>
-          <a:p>
-            <a:r>
-              <a:rPr lang="en-US" dirty="0" smtClean="0"/>
-              <a:t>Shutting down workers</a:t>
-            </a:r>
-          </a:p>
-          <a:p>
-            <a:r>
-              <a:rPr lang="en-US" b="1" dirty="0">
-                <a:solidFill>
-                  <a:srgbClr val="FF0000"/>
-                </a:solidFill>
-              </a:rPr>
-              <a:t>Volatility, atomicity, and interlocking</a:t>
-            </a:r>
-          </a:p>
-          <a:p>
-            <a:r>
-              <a:rPr lang="en-US" b="1" dirty="0" smtClean="0">
-                <a:solidFill>
-                  <a:srgbClr val="FF0000"/>
-                </a:solidFill>
-              </a:rPr>
-              <a:t>Locking (and choosing what to lock on)</a:t>
-            </a:r>
-          </a:p>
-          <a:p>
-            <a:r>
-              <a:rPr lang="en-US" b="1" dirty="0" smtClean="0">
-                <a:solidFill>
-                  <a:srgbClr val="FF0000"/>
-                </a:solidFill>
-              </a:rPr>
-              <a:t>Alternative approaches to monitors</a:t>
-            </a:r>
-          </a:p>
-          <a:p>
-            <a:r>
-              <a:rPr lang="en-US" b="1" dirty="0" smtClean="0">
-                <a:solidFill>
-                  <a:srgbClr val="FF0000"/>
-                </a:solidFill>
-              </a:rPr>
-              <a:t>Thread-safety</a:t>
-            </a:r>
-          </a:p>
-          <a:p>
-            <a:r>
-              <a:rPr lang="en-US" b="1" dirty="0" smtClean="0">
-                <a:solidFill>
-                  <a:srgbClr val="FF0000"/>
-                </a:solidFill>
-              </a:rPr>
-              <a:t>Aborting and interrupting threads</a:t>
-            </a:r>
-          </a:p>
-          <a:p>
-            <a:r>
-              <a:rPr lang="en-US" b="1" dirty="0" smtClean="0">
-                <a:solidFill>
-                  <a:srgbClr val="FF0000"/>
-                </a:solidFill>
-              </a:rPr>
-              <a:t>Error handling</a:t>
-            </a:r>
-          </a:p>
-          <a:p>
-            <a:r>
-              <a:rPr lang="en-US" b="1" dirty="0" smtClean="0">
-                <a:solidFill>
-                  <a:srgbClr val="FF0000"/>
-                </a:solidFill>
-              </a:rPr>
-              <a:t>Testing Parallel Code</a:t>
-            </a:r>
-          </a:p>
-          <a:p>
-            <a:r>
-              <a:rPr lang="en-US" b="1" dirty="0" smtClean="0">
-                <a:solidFill>
-                  <a:srgbClr val="FF0000"/>
-                </a:solidFill>
-              </a:rPr>
-              <a:t>F# Examples</a:t>
-            </a:r>
-          </a:p>
-          <a:p>
-            <a:r>
-              <a:rPr lang="en-US" b="1" dirty="0" smtClean="0">
-                <a:solidFill>
-                  <a:srgbClr val="FF0000"/>
-                </a:solidFill>
-              </a:rPr>
-              <a:t>GPU (</a:t>
-            </a:r>
-            <a:r>
-              <a:rPr lang="en-US" b="1" dirty="0" err="1" smtClean="0">
-                <a:solidFill>
-                  <a:srgbClr val="FF0000"/>
-                </a:solidFill>
-              </a:rPr>
-              <a:t>Cuda</a:t>
-            </a:r>
-            <a:r>
-              <a:rPr lang="en-US" b="1" dirty="0" smtClean="0">
-                <a:solidFill>
-                  <a:srgbClr val="FF0000"/>
-                </a:solidFill>
-              </a:rPr>
-              <a:t> / </a:t>
-            </a:r>
-            <a:r>
-              <a:rPr lang="en-US" b="1" dirty="0" err="1" smtClean="0">
-                <a:solidFill>
-                  <a:srgbClr val="FF0000"/>
-                </a:solidFill>
-              </a:rPr>
-              <a:t>OpenCL</a:t>
-            </a:r>
-            <a:r>
-              <a:rPr lang="en-US" b="1" dirty="0" smtClean="0">
-                <a:solidFill>
-                  <a:srgbClr val="FF0000"/>
-                </a:solidFill>
-              </a:rPr>
-              <a:t>) Examples</a:t>
-            </a:r>
-          </a:p>
-          <a:p>
-            <a:endParaRPr lang="en-US" dirty="0" smtClean="0"/>
-          </a:p>
-          <a:p>
+              <a:t>An infinite number of mathematicians walk into a bar.</a:t>
+            </a:r>
             <a:endParaRPr lang="en-US" dirty="0"/>
           </a:p>
         </p:txBody>
@@ -14838,7 +14673,7 @@
     </p:spTree>
     <p:extLst>
       <p:ext uri="{BB962C8B-B14F-4D97-AF65-F5344CB8AC3E}">
-        <p14:creationId xmlns:p14="http://schemas.microsoft.com/office/powerpoint/2010/main" val="960250843"/>
+        <p14:creationId xmlns:p14="http://schemas.microsoft.com/office/powerpoint/2010/main" val="705309734"/>
       </p:ext>
     </p:extLst>
   </p:cSld>
@@ -14891,7 +14726,11 @@
           <a:p>
             <a:r>
               <a:rPr lang="en-US" dirty="0" smtClean="0"/>
-              <a:t>Lame Joke</a:t>
+              <a:t>Basics of Threading in </a:t>
+            </a:r>
+            <a:r>
+              <a:rPr lang="en-US" dirty="0" err="1" smtClean="0"/>
+              <a:t>.Net</a:t>
             </a:r>
             <a:endParaRPr lang="en-US" dirty="0"/>
           </a:p>
@@ -14907,24 +14746,190 @@
             <p:ph idx="1"/>
           </p:nvPr>
         </p:nvSpPr>
-        <p:spPr/>
+        <p:spPr>
+          <a:xfrm>
+            <a:off x="457200" y="1212507"/>
+            <a:ext cx="8229600" cy="3394472"/>
+          </a:xfrm>
+        </p:spPr>
         <p:txBody>
           <a:bodyPr>
-            <a:normAutofit/>
+            <a:normAutofit fontScale="55000" lnSpcReduction="20000"/>
           </a:bodyPr>
           <a:lstStyle/>
           <a:p>
-            <a:pPr marL="0" indent="0">
-              <a:buNone/>
-            </a:pPr>
+            <a:r>
+              <a:rPr lang="en-US" dirty="0" smtClean="0"/>
+              <a:t>Threading hello world</a:t>
+            </a:r>
+          </a:p>
+          <a:p>
+            <a:r>
+              <a:rPr lang="en-US" dirty="0" smtClean="0"/>
+              <a:t>Passing parameters to threads</a:t>
+            </a:r>
+          </a:p>
+          <a:p>
+            <a:r>
+              <a:rPr lang="en-US" dirty="0" smtClean="0"/>
+              <a:t>Data races and locking</a:t>
+            </a:r>
+          </a:p>
+          <a:p>
+            <a:r>
+              <a:rPr lang="en-US" dirty="0" smtClean="0"/>
+              <a:t>Deadlocks, waiting, and pulsing</a:t>
+            </a:r>
+          </a:p>
+          <a:p>
             <a:r>
               <a:rPr lang="en-US" dirty="0"/>
-              <a:t>An MIT linguistics professor was lecturing his class the other </a:t>
-            </a:r>
+              <a:t>Wait handles, Reset Events, and </a:t>
+            </a:r>
+            <a:r>
+              <a:rPr lang="en-US" dirty="0" err="1"/>
+              <a:t>Mutexes</a:t>
+            </a:r>
+            <a:endParaRPr lang="en-US" dirty="0"/>
+          </a:p>
+          <a:p>
             <a:r>
               <a:rPr lang="en-US" dirty="0" smtClean="0"/>
-              <a:t>day…</a:t>
-            </a:r>
+              <a:t>Using the thread pool and asynchronous methods.</a:t>
+            </a:r>
+          </a:p>
+          <a:p>
+            <a:r>
+              <a:rPr lang="en-US" dirty="0" smtClean="0"/>
+              <a:t>Shutting down workers</a:t>
+            </a:r>
+          </a:p>
+          <a:p>
+            <a:r>
+              <a:rPr lang="en-US" b="1" dirty="0">
+                <a:solidFill>
+                  <a:srgbClr val="FF0000"/>
+                </a:solidFill>
+              </a:rPr>
+              <a:t>Volatility, atomicity, and interlocking</a:t>
+            </a:r>
+          </a:p>
+          <a:p>
+            <a:r>
+              <a:rPr lang="en-US" b="1" dirty="0" smtClean="0">
+                <a:solidFill>
+                  <a:srgbClr val="FF0000"/>
+                </a:solidFill>
+              </a:rPr>
+              <a:t>Locking (and choosing what to lock on)</a:t>
+            </a:r>
+          </a:p>
+          <a:p>
+            <a:r>
+              <a:rPr lang="en-US" b="1" dirty="0" smtClean="0">
+                <a:solidFill>
+                  <a:srgbClr val="FF0000"/>
+                </a:solidFill>
+              </a:rPr>
+              <a:t>Alternative approaches to monitors</a:t>
+            </a:r>
+          </a:p>
+          <a:p>
+            <a:r>
+              <a:rPr lang="en-US" b="1" dirty="0" smtClean="0">
+                <a:solidFill>
+                  <a:srgbClr val="FF0000"/>
+                </a:solidFill>
+              </a:rPr>
+              <a:t>Thread-safety</a:t>
+            </a:r>
+          </a:p>
+          <a:p>
+            <a:r>
+              <a:rPr lang="en-US" b="1" dirty="0" smtClean="0">
+                <a:solidFill>
+                  <a:srgbClr val="FF0000"/>
+                </a:solidFill>
+              </a:rPr>
+              <a:t>Aborting and interrupting threads</a:t>
+            </a:r>
+          </a:p>
+          <a:p>
+            <a:r>
+              <a:rPr lang="en-US" b="1" dirty="0" smtClean="0">
+                <a:solidFill>
+                  <a:srgbClr val="FF0000"/>
+                </a:solidFill>
+              </a:rPr>
+              <a:t>Error handling</a:t>
+            </a:r>
+          </a:p>
+          <a:p>
+            <a:r>
+              <a:rPr lang="en-US" b="1" dirty="0" smtClean="0">
+                <a:solidFill>
+                  <a:srgbClr val="FF0000"/>
+                </a:solidFill>
+              </a:rPr>
+              <a:t>Testing Parallel Code</a:t>
+            </a:r>
+          </a:p>
+          <a:p>
+            <a:r>
+              <a:rPr lang="en-US" b="1" dirty="0" smtClean="0">
+                <a:solidFill>
+                  <a:srgbClr val="FF0000"/>
+                </a:solidFill>
+              </a:rPr>
+              <a:t>F# Examples</a:t>
+            </a:r>
+          </a:p>
+          <a:p>
+            <a:r>
+              <a:rPr lang="en-US" b="1" dirty="0" smtClean="0">
+                <a:solidFill>
+                  <a:srgbClr val="FF0000"/>
+                </a:solidFill>
+              </a:rPr>
+              <a:t>GPU (</a:t>
+            </a:r>
+            <a:r>
+              <a:rPr lang="en-US" b="1" dirty="0" err="1" smtClean="0">
+                <a:solidFill>
+                  <a:srgbClr val="FF0000"/>
+                </a:solidFill>
+              </a:rPr>
+              <a:t>Cuda</a:t>
+            </a:r>
+            <a:r>
+              <a:rPr lang="en-US" b="1" dirty="0" smtClean="0">
+                <a:solidFill>
+                  <a:srgbClr val="FF0000"/>
+                </a:solidFill>
+              </a:rPr>
+              <a:t> / </a:t>
+            </a:r>
+            <a:r>
+              <a:rPr lang="en-US" b="1" dirty="0" err="1" smtClean="0">
+                <a:solidFill>
+                  <a:srgbClr val="FF0000"/>
+                </a:solidFill>
+              </a:rPr>
+              <a:t>OpenCL</a:t>
+            </a:r>
+            <a:r>
+              <a:rPr lang="en-US" b="1" dirty="0" smtClean="0">
+                <a:solidFill>
+                  <a:srgbClr val="FF0000"/>
+                </a:solidFill>
+              </a:rPr>
+              <a:t>) Examples</a:t>
+            </a:r>
+          </a:p>
+          <a:p>
+            <a:endParaRPr lang="en-US" dirty="0" smtClean="0"/>
+          </a:p>
+          <a:p>
             <a:endParaRPr lang="en-US" dirty="0"/>
           </a:p>
         </p:txBody>
@@ -14932,7 +14937,7 @@
     </p:spTree>
     <p:extLst>
       <p:ext uri="{BB962C8B-B14F-4D97-AF65-F5344CB8AC3E}">
-        <p14:creationId xmlns:p14="http://schemas.microsoft.com/office/powerpoint/2010/main" val="2481591714"/>
+        <p14:creationId xmlns:p14="http://schemas.microsoft.com/office/powerpoint/2010/main" val="960250843"/>
       </p:ext>
     </p:extLst>
   </p:cSld>
@@ -14985,7 +14990,7 @@
           <a:p>
             <a:r>
               <a:rPr lang="en-US" dirty="0" smtClean="0"/>
-              <a:t>Parallel Design Patterns</a:t>
+              <a:t>Lame Joke</a:t>
             </a:r>
             <a:endParaRPr lang="en-US" dirty="0"/>
           </a:p>
@@ -15003,44 +15008,30 @@
         </p:nvSpPr>
         <p:spPr/>
         <p:txBody>
-          <a:bodyPr/>
+          <a:bodyPr>
+            <a:normAutofit/>
+          </a:bodyPr>
           <a:lstStyle/>
           <a:p>
+            <a:pPr marL="0" indent="0">
+              <a:buNone/>
+            </a:pPr>
+            <a:r>
+              <a:rPr lang="en-US" dirty="0"/>
+              <a:t>An MIT linguistics professor was lecturing his class the other </a:t>
+            </a:r>
             <a:r>
               <a:rPr lang="en-US" dirty="0" smtClean="0"/>
-              <a:t>Parallel Loops</a:t>
-            </a:r>
-          </a:p>
-          <a:p>
-            <a:r>
-              <a:rPr lang="en-US" dirty="0" smtClean="0"/>
-              <a:t>Parallel Tasks</a:t>
-            </a:r>
-          </a:p>
-          <a:p>
-            <a:r>
-              <a:rPr lang="en-US" dirty="0" smtClean="0"/>
-              <a:t>Parallel Aggregation</a:t>
-            </a:r>
-          </a:p>
-          <a:p>
-            <a:r>
-              <a:rPr lang="en-US" dirty="0" smtClean="0"/>
-              <a:t>Futures (Task Graph)</a:t>
-            </a:r>
-          </a:p>
-          <a:p>
-            <a:r>
-              <a:rPr lang="en-US" dirty="0" smtClean="0"/>
-              <a:t>Pipelines</a:t>
-            </a:r>
+              <a:t>day…</a:t>
+            </a:r>
+            <a:endParaRPr lang="en-US" dirty="0"/>
           </a:p>
         </p:txBody>
       </p:sp>
     </p:spTree>
     <p:extLst>
       <p:ext uri="{BB962C8B-B14F-4D97-AF65-F5344CB8AC3E}">
-        <p14:creationId xmlns:p14="http://schemas.microsoft.com/office/powerpoint/2010/main" val="1197900658"/>
+        <p14:creationId xmlns:p14="http://schemas.microsoft.com/office/powerpoint/2010/main" val="2481591714"/>
       </p:ext>
     </p:extLst>
   </p:cSld>
@@ -15092,167 +15083,23 @@
           <a:lstStyle/>
           <a:p>
             <a:r>
-              <a:rPr lang="en-US" smtClean="0"/>
-              <a:t>Eric Burcham</a:t>
+              <a:rPr lang="en-US" dirty="0" smtClean="0"/>
+              <a:t>Just For Fun…</a:t>
             </a:r>
             <a:endParaRPr lang="en-US" dirty="0"/>
-          </a:p>
-        </p:txBody>
-      </p:sp>
-      <p:sp>
-        <p:nvSpPr>
-          <p:cNvPr id="3" name="Content Placeholder 2"/>
-          <p:cNvSpPr>
-            <a:spLocks noGrp="1"/>
-          </p:cNvSpPr>
-          <p:nvPr>
-            <p:ph idx="1"/>
-          </p:nvPr>
-        </p:nvSpPr>
-        <p:spPr>
-          <a:xfrm>
-            <a:off x="1485900" y="835819"/>
-            <a:ext cx="6172200" cy="3758804"/>
-          </a:xfrm>
-        </p:spPr>
-        <p:txBody>
-          <a:bodyPr>
-            <a:normAutofit fontScale="85000" lnSpcReduction="20000"/>
-          </a:bodyPr>
-          <a:lstStyle/>
-          <a:p>
-            <a:pPr marL="0" indent="0">
-              <a:buNone/>
-            </a:pPr>
-            <a:r>
-              <a:rPr lang="en-US" b="1" dirty="0" smtClean="0"/>
-              <a:t>Likes</a:t>
-            </a:r>
-          </a:p>
-          <a:p>
-            <a:pPr>
-              <a:buFont typeface="Arial" panose="020B0604020202020204" pitchFamily="34" charset="0"/>
-              <a:buChar char="•"/>
-            </a:pPr>
-            <a:r>
-              <a:rPr lang="en-US" dirty="0" smtClean="0"/>
-              <a:t>Dogs</a:t>
-            </a:r>
-          </a:p>
-          <a:p>
-            <a:pPr>
-              <a:buFont typeface="Arial" panose="020B0604020202020204" pitchFamily="34" charset="0"/>
-              <a:buChar char="•"/>
-            </a:pPr>
-            <a:r>
-              <a:rPr lang="en-US" dirty="0" smtClean="0"/>
-              <a:t>Most people</a:t>
-            </a:r>
-          </a:p>
-          <a:p>
-            <a:pPr>
-              <a:buFont typeface="Arial" panose="020B0604020202020204" pitchFamily="34" charset="0"/>
-              <a:buChar char="•"/>
-            </a:pPr>
-            <a:r>
-              <a:rPr lang="en-US" dirty="0" smtClean="0"/>
-              <a:t>Telling bad jokes</a:t>
-            </a:r>
-          </a:p>
-          <a:p>
-            <a:pPr>
-              <a:buFont typeface="Arial" panose="020B0604020202020204" pitchFamily="34" charset="0"/>
-              <a:buChar char="•"/>
-            </a:pPr>
-            <a:r>
-              <a:rPr lang="en-US" dirty="0" smtClean="0"/>
-              <a:t>The words “bro” and “totally.”  I’m not kidding.</a:t>
-            </a:r>
-          </a:p>
-          <a:p>
-            <a:pPr>
-              <a:buFont typeface="Arial" panose="020B0604020202020204" pitchFamily="34" charset="0"/>
-              <a:buChar char="•"/>
-            </a:pPr>
-            <a:r>
-              <a:rPr lang="en-US" dirty="0"/>
-              <a:t>¡ɹ0x0q ɹn0ʎ 9u!ʞɔ@ɥ</a:t>
-            </a:r>
-          </a:p>
-          <a:p>
-            <a:pPr marL="0" indent="0">
-              <a:buNone/>
-            </a:pPr>
-            <a:endParaRPr lang="en-US" b="1" dirty="0" smtClean="0"/>
-          </a:p>
-          <a:p>
-            <a:pPr marL="0" indent="0">
-              <a:buNone/>
-            </a:pPr>
-            <a:r>
-              <a:rPr lang="en-US" b="1" dirty="0" smtClean="0"/>
-              <a:t>Dislikes</a:t>
-            </a:r>
-          </a:p>
-          <a:p>
-            <a:pPr>
-              <a:buFont typeface="Arial" panose="020B0604020202020204" pitchFamily="34" charset="0"/>
-              <a:buChar char="•"/>
-            </a:pPr>
-            <a:r>
-              <a:rPr lang="en-US" dirty="0" smtClean="0"/>
-              <a:t>Dog hair</a:t>
-            </a:r>
-          </a:p>
-          <a:p>
-            <a:pPr>
-              <a:buFont typeface="Arial" panose="020B0604020202020204" pitchFamily="34" charset="0"/>
-              <a:buChar char="•"/>
-            </a:pPr>
-            <a:r>
-              <a:rPr lang="en-US" dirty="0" smtClean="0"/>
-              <a:t>A few people</a:t>
-            </a:r>
-          </a:p>
-          <a:p>
-            <a:pPr>
-              <a:buFont typeface="Arial" panose="020B0604020202020204" pitchFamily="34" charset="0"/>
-              <a:buChar char="•"/>
-            </a:pPr>
-            <a:r>
-              <a:rPr lang="en-US" dirty="0" smtClean="0"/>
-              <a:t>Telling jokes that don’t work (Happens a LOT)</a:t>
-            </a:r>
-          </a:p>
-          <a:p>
-            <a:pPr>
-              <a:buFont typeface="Arial" panose="020B0604020202020204" pitchFamily="34" charset="0"/>
-              <a:buChar char="•"/>
-            </a:pPr>
-            <a:r>
-              <a:rPr lang="en-US" dirty="0" smtClean="0"/>
-              <a:t>Making lists of stuff</a:t>
-            </a:r>
           </a:p>
         </p:txBody>
       </p:sp>
     </p:spTree>
     <p:extLst>
       <p:ext uri="{BB962C8B-B14F-4D97-AF65-F5344CB8AC3E}">
-        <p14:creationId xmlns:p14="http://schemas.microsoft.com/office/powerpoint/2010/main" val="2708422358"/>
+        <p14:creationId xmlns:p14="http://schemas.microsoft.com/office/powerpoint/2010/main" val="4015215728"/>
       </p:ext>
     </p:extLst>
   </p:cSld>
   <p:clrMapOvr>
     <a:masterClrMapping/>
   </p:clrMapOvr>
-  <p:timing>
-    <p:tnLst>
-      <p:par>
-        <p:cTn id="1" dur="indefinite" restart="never" nodeType="tmRoot"/>
-      </p:par>
-    </p:tnLst>
-  </p:timing>
 </p:sld>
 </file>
 
@@ -15292,7 +15139,7 @@
           <a:p>
             <a:r>
               <a:rPr lang="en-US" dirty="0" smtClean="0"/>
-              <a:t>Parallel Loops</a:t>
+              <a:t>Parallel Design Patterns</a:t>
             </a:r>
             <a:endParaRPr lang="en-US" dirty="0"/>
           </a:p>
@@ -15315,30 +15162,52 @@
           <a:p>
             <a:r>
               <a:rPr lang="en-US" dirty="0" smtClean="0"/>
-              <a:t>Perform the same independent operation on each element of a collection or for a fixed number of iterations.</a:t>
+              <a:t>Parallel Loops</a:t>
             </a:r>
           </a:p>
           <a:p>
             <a:r>
               <a:rPr lang="en-US" dirty="0" smtClean="0"/>
-              <a:t>Steps are independent if they don’t write to memory locations, files, or other resources that are used by other steps.</a:t>
-            </a:r>
-          </a:p>
-          <a:p>
-            <a:endParaRPr lang="en-US" dirty="0"/>
+              <a:t>Parallel Tasks</a:t>
+            </a:r>
+          </a:p>
+          <a:p>
+            <a:r>
+              <a:rPr lang="en-US" dirty="0" smtClean="0"/>
+              <a:t>Parallel Aggregation</a:t>
+            </a:r>
+          </a:p>
+          <a:p>
+            <a:r>
+              <a:rPr lang="en-US" dirty="0" smtClean="0"/>
+              <a:t>Futures (Task Graph)</a:t>
+            </a:r>
+          </a:p>
+          <a:p>
+            <a:r>
+              <a:rPr lang="en-US" dirty="0" smtClean="0"/>
+              <a:t>Pipelines</a:t>
+            </a:r>
           </a:p>
         </p:txBody>
       </p:sp>
     </p:spTree>
     <p:extLst>
       <p:ext uri="{BB962C8B-B14F-4D97-AF65-F5344CB8AC3E}">
-        <p14:creationId xmlns:p14="http://schemas.microsoft.com/office/powerpoint/2010/main" val="2861235052"/>
+        <p14:creationId xmlns:p14="http://schemas.microsoft.com/office/powerpoint/2010/main" val="1197900658"/>
       </p:ext>
     </p:extLst>
   </p:cSld>
   <p:clrMapOvr>
     <a:masterClrMapping/>
   </p:clrMapOvr>
+  <p:timing>
+    <p:tnLst>
+      <p:par>
+        <p:cTn id="1" dur="indefinite" restart="never" nodeType="tmRoot"/>
+      </p:par>
+    </p:tnLst>
+  </p:timing>
 </p:sld>
 </file>
 
@@ -15378,7 +15247,7 @@
           <a:p>
             <a:r>
               <a:rPr lang="en-US" dirty="0" smtClean="0"/>
-              <a:t>Anti-Patterns</a:t>
+              <a:t>Parallel Loops</a:t>
             </a:r>
             <a:endParaRPr lang="en-US" dirty="0"/>
           </a:p>
@@ -15400,43 +15269,17 @@
           <a:lstStyle/>
           <a:p>
             <a:r>
-              <a:rPr lang="en-US" b="1" dirty="0" smtClean="0"/>
-              <a:t>Step size != 1</a:t>
-            </a:r>
-            <a:r>
               <a:rPr lang="en-US" dirty="0" smtClean="0"/>
-              <a:t>:  Often indicates data-dependency.</a:t>
-            </a:r>
-          </a:p>
-          <a:p>
-            <a:r>
-              <a:rPr lang="en-US" b="1" dirty="0" smtClean="0"/>
-              <a:t>Hidden loop body dependencies</a:t>
-            </a:r>
+              <a:t>Perform the same independent operation on each element of a collection or for a fixed number of iterations.</a:t>
+            </a:r>
+          </a:p>
+          <a:p>
             <a:r>
               <a:rPr lang="en-US" dirty="0" smtClean="0"/>
-              <a:t>:  Don’t try to share instances that are not thread-safe, for example.  Random is a culprit in one of my examples.</a:t>
-            </a:r>
-          </a:p>
-          <a:p>
-            <a:r>
-              <a:rPr lang="en-US" b="1" dirty="0" smtClean="0"/>
-              <a:t>Small loop bodies with few iterations</a:t>
-            </a:r>
-            <a:r>
-              <a:rPr lang="en-US" dirty="0" smtClean="0"/>
-              <a:t>:  You won’t get enough performance improvement to justify the complexity.</a:t>
-            </a:r>
-          </a:p>
-          <a:p>
-            <a:r>
-              <a:rPr lang="en-US" b="1" dirty="0" smtClean="0"/>
-              <a:t>Processor over/under subscription</a:t>
-            </a:r>
-            <a:r>
-              <a:rPr lang="en-US" dirty="0" smtClean="0"/>
-              <a:t>:  Having many more or fewer threads running than available underutilized cores.</a:t>
-            </a:r>
+              <a:t>Steps are independent if they don’t write to memory locations, files, or other resources that are used by other steps.</a:t>
+            </a:r>
+          </a:p>
+          <a:p>
             <a:endParaRPr lang="en-US" dirty="0"/>
           </a:p>
         </p:txBody>
@@ -15444,7 +15287,7 @@
     </p:spTree>
     <p:extLst>
       <p:ext uri="{BB962C8B-B14F-4D97-AF65-F5344CB8AC3E}">
-        <p14:creationId xmlns:p14="http://schemas.microsoft.com/office/powerpoint/2010/main" val="2880399272"/>
+        <p14:creationId xmlns:p14="http://schemas.microsoft.com/office/powerpoint/2010/main" val="2861235052"/>
       </p:ext>
     </p:extLst>
   </p:cSld>
@@ -15490,6 +15333,118 @@
           <a:p>
             <a:r>
               <a:rPr lang="en-US" dirty="0" smtClean="0"/>
+              <a:t>Anti-Patterns</a:t>
+            </a:r>
+            <a:endParaRPr lang="en-US" dirty="0"/>
+          </a:p>
+        </p:txBody>
+      </p:sp>
+      <p:sp>
+        <p:nvSpPr>
+          <p:cNvPr id="3" name="Content Placeholder 2"/>
+          <p:cNvSpPr>
+            <a:spLocks noGrp="1"/>
+          </p:cNvSpPr>
+          <p:nvPr>
+            <p:ph idx="1"/>
+          </p:nvPr>
+        </p:nvSpPr>
+        <p:spPr/>
+        <p:txBody>
+          <a:bodyPr/>
+          <a:lstStyle/>
+          <a:p>
+            <a:r>
+              <a:rPr lang="en-US" b="1" dirty="0" smtClean="0"/>
+              <a:t>Step size != 1</a:t>
+            </a:r>
+            <a:r>
+              <a:rPr lang="en-US" dirty="0" smtClean="0"/>
+              <a:t>:  Often indicates data-dependency.</a:t>
+            </a:r>
+          </a:p>
+          <a:p>
+            <a:r>
+              <a:rPr lang="en-US" b="1" dirty="0" smtClean="0"/>
+              <a:t>Hidden loop body dependencies</a:t>
+            </a:r>
+            <a:r>
+              <a:rPr lang="en-US" dirty="0" smtClean="0"/>
+              <a:t>:  Don’t try to share instances that are not thread-safe, for example.  Random is a culprit in one of my examples.</a:t>
+            </a:r>
+          </a:p>
+          <a:p>
+            <a:r>
+              <a:rPr lang="en-US" b="1" dirty="0" smtClean="0"/>
+              <a:t>Small loop bodies with few iterations</a:t>
+            </a:r>
+            <a:r>
+              <a:rPr lang="en-US" dirty="0" smtClean="0"/>
+              <a:t>:  You won’t get enough performance improvement to justify the complexity.</a:t>
+            </a:r>
+          </a:p>
+          <a:p>
+            <a:r>
+              <a:rPr lang="en-US" b="1" dirty="0" smtClean="0"/>
+              <a:t>Processor over/under subscription</a:t>
+            </a:r>
+            <a:r>
+              <a:rPr lang="en-US" dirty="0" smtClean="0"/>
+              <a:t>:  Having many more or fewer threads running than available underutilized cores.</a:t>
+            </a:r>
+            <a:endParaRPr lang="en-US" dirty="0"/>
+          </a:p>
+        </p:txBody>
+      </p:sp>
+    </p:spTree>
+    <p:extLst>
+      <p:ext uri="{BB962C8B-B14F-4D97-AF65-F5344CB8AC3E}">
+        <p14:creationId xmlns:p14="http://schemas.microsoft.com/office/powerpoint/2010/main" val="2880399272"/>
+      </p:ext>
+    </p:extLst>
+  </p:cSld>
+  <p:clrMapOvr>
+    <a:masterClrMapping/>
+  </p:clrMapOvr>
+</p:sld>
+</file>
+
+<file path=ppt/slides/slide23.xml><?xml version="1.0" encoding="utf-8"?>
+<p:sld xmlns:a="http://schemas.openxmlformats.org/drawingml/2006/main" xmlns:r="http://schemas.openxmlformats.org/officeDocument/2006/relationships" xmlns:p="http://schemas.openxmlformats.org/presentationml/2006/main">
+  <p:cSld>
+    <p:spTree>
+      <p:nvGrpSpPr>
+        <p:cNvPr id="1" name=""/>
+        <p:cNvGrpSpPr/>
+        <p:nvPr/>
+      </p:nvGrpSpPr>
+      <p:grpSpPr>
+        <a:xfrm>
+          <a:off x="0" y="0"/>
+          <a:ext cx="0" cy="0"/>
+          <a:chOff x="0" y="0"/>
+          <a:chExt cx="0" cy="0"/>
+        </a:xfrm>
+      </p:grpSpPr>
+      <p:sp>
+        <p:nvSpPr>
+          <p:cNvPr id="2" name="Title 1"/>
+          <p:cNvSpPr>
+            <a:spLocks noGrp="1"/>
+          </p:cNvSpPr>
+          <p:nvPr>
+            <p:ph type="title"/>
+          </p:nvPr>
+        </p:nvSpPr>
+        <p:spPr/>
+        <p:txBody>
+          <a:bodyPr>
+            <a:normAutofit fontScale="90000"/>
+          </a:bodyPr>
+          <a:lstStyle/>
+          <a:p>
+            <a:r>
+              <a:rPr lang="en-US" dirty="0" smtClean="0"/>
               <a:t>Lame Joke</a:t>
             </a:r>
             <a:endParaRPr lang="en-US" dirty="0"/>
@@ -15544,7 +15499,7 @@
 </p:sld>
 </file>
 
-<file path=ppt/slides/slide23.xml><?xml version="1.0" encoding="utf-8"?>
+<file path=ppt/slides/slide24.xml><?xml version="1.0" encoding="utf-8"?>
 <p:sld xmlns:a="http://schemas.openxmlformats.org/drawingml/2006/main" xmlns:r="http://schemas.openxmlformats.org/officeDocument/2006/relationships" xmlns:p="http://schemas.openxmlformats.org/presentationml/2006/main">
   <p:cSld>
     <p:spTree>
@@ -15640,7 +15595,7 @@
 </p:sld>
 </file>
 
-<file path=ppt/slides/slide24.xml><?xml version="1.0" encoding="utf-8"?>
+<file path=ppt/slides/slide25.xml><?xml version="1.0" encoding="utf-8"?>
 <p:sld xmlns:a="http://schemas.openxmlformats.org/drawingml/2006/main" xmlns:r="http://schemas.openxmlformats.org/officeDocument/2006/relationships" xmlns:p="http://schemas.openxmlformats.org/presentationml/2006/main">
   <p:cSld>
     <p:spTree>
@@ -16092,7 +16047,7 @@
 </p:sld>
 </file>
 
-<file path=ppt/slides/slide25.xml><?xml version="1.0" encoding="utf-8"?>
+<file path=ppt/slides/slide26.xml><?xml version="1.0" encoding="utf-8"?>
 <p:sld xmlns:a="http://schemas.openxmlformats.org/drawingml/2006/main" xmlns:r="http://schemas.openxmlformats.org/officeDocument/2006/relationships" xmlns:p="http://schemas.openxmlformats.org/presentationml/2006/main">
   <p:cSld>
     <p:spTree>
@@ -16200,7 +16155,7 @@
 </p:sld>
 </file>
 
-<file path=ppt/slides/slide26.xml><?xml version="1.0" encoding="utf-8"?>
+<file path=ppt/slides/slide27.xml><?xml version="1.0" encoding="utf-8"?>
 <p:sld xmlns:a="http://schemas.openxmlformats.org/drawingml/2006/main" xmlns:r="http://schemas.openxmlformats.org/officeDocument/2006/relationships" xmlns:p="http://schemas.openxmlformats.org/presentationml/2006/main">
   <p:cSld>
     <p:spTree>
@@ -16290,7 +16245,7 @@
 </p:sld>
 </file>
 
-<file path=ppt/slides/slide27.xml><?xml version="1.0" encoding="utf-8"?>
+<file path=ppt/slides/slide28.xml><?xml version="1.0" encoding="utf-8"?>
 <p:sld xmlns:a="http://schemas.openxmlformats.org/drawingml/2006/main" xmlns:r="http://schemas.openxmlformats.org/officeDocument/2006/relationships" xmlns:p="http://schemas.openxmlformats.org/presentationml/2006/main">
   <p:cSld>
     <p:spTree>
@@ -16444,7 +16399,7 @@
 </p:sld>
 </file>
 
-<file path=ppt/slides/slide28.xml><?xml version="1.0" encoding="utf-8"?>
+<file path=ppt/slides/slide29.xml><?xml version="1.0" encoding="utf-8"?>
 <p:sld xmlns:a="http://schemas.openxmlformats.org/drawingml/2006/main" xmlns:r="http://schemas.openxmlformats.org/officeDocument/2006/relationships" xmlns:p="http://schemas.openxmlformats.org/presentationml/2006/main">
   <p:cSld>
     <p:spTree>
@@ -16901,95 +16856,6 @@
 </p:sld>
 </file>
 
-<file path=ppt/slides/slide29.xml><?xml version="1.0" encoding="utf-8"?>
-<p:sld xmlns:a="http://schemas.openxmlformats.org/drawingml/2006/main" xmlns:r="http://schemas.openxmlformats.org/officeDocument/2006/relationships" xmlns:p="http://schemas.openxmlformats.org/presentationml/2006/main">
-  <p:cSld>
-    <p:spTree>
-      <p:nvGrpSpPr>
-        <p:cNvPr id="1" name=""/>
-        <p:cNvGrpSpPr/>
-        <p:nvPr/>
-      </p:nvGrpSpPr>
-      <p:grpSpPr>
-        <a:xfrm>
-          <a:off x="0" y="0"/>
-          <a:ext cx="0" cy="0"/>
-          <a:chOff x="0" y="0"/>
-          <a:chExt cx="0" cy="0"/>
-        </a:xfrm>
-      </p:grpSpPr>
-      <p:sp>
-        <p:nvSpPr>
-          <p:cNvPr id="2" name="Title 1"/>
-          <p:cNvSpPr>
-            <a:spLocks noGrp="1"/>
-          </p:cNvSpPr>
-          <p:nvPr>
-            <p:ph type="title"/>
-          </p:nvPr>
-        </p:nvSpPr>
-        <p:spPr/>
-        <p:txBody>
-          <a:bodyPr>
-            <a:normAutofit fontScale="90000"/>
-          </a:bodyPr>
-          <a:lstStyle/>
-          <a:p>
-            <a:r>
-              <a:rPr lang="en-US" dirty="0" smtClean="0"/>
-              <a:t>Lame Joke</a:t>
-            </a:r>
-            <a:endParaRPr lang="en-US" dirty="0"/>
-          </a:p>
-        </p:txBody>
-      </p:sp>
-      <p:sp>
-        <p:nvSpPr>
-          <p:cNvPr id="3" name="Content Placeholder 2"/>
-          <p:cNvSpPr>
-            <a:spLocks noGrp="1"/>
-          </p:cNvSpPr>
-          <p:nvPr>
-            <p:ph idx="1"/>
-          </p:nvPr>
-        </p:nvSpPr>
-        <p:spPr/>
-        <p:txBody>
-          <a:bodyPr/>
-          <a:lstStyle/>
-          <a:p>
-            <a:pPr marL="0" indent="0">
-              <a:buNone/>
-            </a:pPr>
-            <a:r>
-              <a:rPr lang="en-US" b="1" dirty="0"/>
-              <a:t>Audience Participation</a:t>
-            </a:r>
-            <a:r>
-              <a:rPr lang="en-US" dirty="0"/>
-              <a:t>:  Mr. Devlin Liles</a:t>
-            </a:r>
-            <a:r>
-              <a:rPr lang="en-US" dirty="0" smtClean="0"/>
-              <a:t>.</a:t>
-            </a:r>
-            <a:endParaRPr lang="en-US" dirty="0"/>
-          </a:p>
-        </p:txBody>
-      </p:sp>
-    </p:spTree>
-    <p:extLst>
-      <p:ext uri="{BB962C8B-B14F-4D97-AF65-F5344CB8AC3E}">
-        <p14:creationId xmlns:p14="http://schemas.microsoft.com/office/powerpoint/2010/main" val="2718485294"/>
-      </p:ext>
-    </p:extLst>
-  </p:cSld>
-  <p:clrMapOvr>
-    <a:masterClrMapping/>
-  </p:clrMapOvr>
-</p:sld>
-</file>
-
 <file path=ppt/slides/slide3.xml><?xml version="1.0" encoding="utf-8"?>
 <p:sld xmlns:a="http://schemas.openxmlformats.org/drawingml/2006/main" xmlns:r="http://schemas.openxmlformats.org/officeDocument/2006/relationships" xmlns:p="http://schemas.openxmlformats.org/presentationml/2006/main">
   <p:cSld>
@@ -17025,8 +16891,8 @@
           <a:lstStyle/>
           <a:p>
             <a:r>
-              <a:rPr lang="en-US" dirty="0" smtClean="0"/>
-              <a:t>I’m an Improver</a:t>
+              <a:rPr lang="en-US" smtClean="0"/>
+              <a:t>Eric Burcham</a:t>
             </a:r>
             <a:endParaRPr lang="en-US" dirty="0"/>
           </a:p>
@@ -17043,141 +16909,128 @@
           </p:nvPr>
         </p:nvSpPr>
         <p:spPr>
-          <a:ln>
-            <a:noFill/>
-          </a:ln>
+          <a:xfrm>
+            <a:off x="1485900" y="835819"/>
+            <a:ext cx="6172200" cy="3758804"/>
+          </a:xfrm>
         </p:spPr>
         <p:txBody>
           <a:bodyPr>
-            <a:normAutofit/>
+            <a:normAutofit fontScale="85000" lnSpcReduction="20000"/>
           </a:bodyPr>
           <a:lstStyle/>
           <a:p>
-            <a:r>
-              <a:rPr lang="en-US" sz="2100" dirty="0"/>
-              <a:t>Principal Consultant with Improving Enterprises</a:t>
-            </a:r>
-          </a:p>
-          <a:p>
-            <a:r>
-              <a:rPr lang="en-US" sz="2100" dirty="0"/>
-              <a:t>We’re hiring (Attitude and Aptitude)</a:t>
-            </a:r>
-          </a:p>
-          <a:p>
-            <a:r>
-              <a:rPr lang="en-US" sz="2100" dirty="0"/>
-              <a:t>You should totally call me, bro:  </a:t>
-            </a:r>
-            <a:r>
-              <a:rPr lang="en-US" sz="2100" b="1" dirty="0"/>
-              <a:t>214-578-9217</a:t>
-            </a:r>
-          </a:p>
-          <a:p>
-            <a:r>
-              <a:rPr lang="en-US" sz="2100" dirty="0"/>
-              <a:t>Or email: </a:t>
-            </a:r>
-            <a:r>
-              <a:rPr lang="en-US" sz="2100" b="1" dirty="0" smtClean="0">
-                <a:hlinkClick r:id="rId2"/>
-              </a:rPr>
-              <a:t>eric.burcham@improvingenterprises.com</a:t>
-            </a:r>
-            <a:endParaRPr lang="en-US" sz="2100" b="1" dirty="0"/>
-          </a:p>
-          <a:p>
-            <a:r>
-              <a:rPr lang="en-US" sz="2100" dirty="0"/>
-              <a:t>We have a website: </a:t>
-            </a:r>
-            <a:r>
-              <a:rPr lang="en-US" sz="2100" b="1" dirty="0">
-                <a:hlinkClick r:id="rId3"/>
-              </a:rPr>
-              <a:t>www.improvingenterprises.com</a:t>
-            </a:r>
-            <a:endParaRPr lang="en-US" sz="2100" b="1" dirty="0"/>
-          </a:p>
-          <a:p>
-            <a:endParaRPr lang="en-US" sz="2100" dirty="0"/>
-          </a:p>
-        </p:txBody>
-      </p:sp>
-      <p:pic>
-        <p:nvPicPr>
-          <p:cNvPr id="4" name="Picture 3"/>
-          <p:cNvPicPr>
-            <a:picLocks noChangeAspect="1"/>
-          </p:cNvPicPr>
-          <p:nvPr/>
-        </p:nvPicPr>
-        <p:blipFill>
-          <a:blip r:embed="rId4"/>
-          <a:stretch>
-            <a:fillRect/>
-          </a:stretch>
-        </p:blipFill>
-        <p:spPr>
-          <a:xfrm>
-            <a:off x="4989871" y="3483058"/>
-            <a:ext cx="2668231" cy="1111565"/>
-          </a:xfrm>
-          <a:prstGeom prst="rect">
-            <a:avLst/>
-          </a:prstGeom>
-          <a:ln>
-            <a:solidFill>
-              <a:schemeClr val="tx1"/>
-            </a:solidFill>
-          </a:ln>
-          <a:effectLst>
-            <a:outerShdw blurRad="50800" dist="38100" dir="2700000" algn="tl" rotWithShape="0">
-              <a:prstClr val="black">
-                <a:alpha val="40000"/>
-              </a:prstClr>
-            </a:outerShdw>
-          </a:effectLst>
-        </p:spPr>
-      </p:pic>
-      <p:sp>
-        <p:nvSpPr>
-          <p:cNvPr id="6" name="Right Arrow 5"/>
-          <p:cNvSpPr/>
-          <p:nvPr/>
-        </p:nvSpPr>
-        <p:spPr>
-          <a:xfrm>
-            <a:off x="1859993" y="3483058"/>
-            <a:ext cx="2925927" cy="1111565"/>
-          </a:xfrm>
-          <a:prstGeom prst="rightArrow">
-            <a:avLst/>
-          </a:prstGeom>
-        </p:spPr>
-        <p:style>
-          <a:lnRef idx="1">
-            <a:schemeClr val="accent2"/>
-          </a:lnRef>
-          <a:fillRef idx="3">
-            <a:schemeClr val="accent2"/>
-          </a:fillRef>
-          <a:effectRef idx="2">
-            <a:schemeClr val="accent2"/>
-          </a:effectRef>
-          <a:fontRef idx="minor">
-            <a:schemeClr val="lt1"/>
-          </a:fontRef>
-        </p:style>
-        <p:txBody>
-          <a:bodyPr rtlCol="0" anchor="ctr"/>
-          <a:lstStyle/>
-          <a:p>
-            <a:pPr algn="ctr"/>
-            <a:r>
-              <a:rPr lang="en-US" sz="1350" dirty="0"/>
-              <a:t>Go Now!!!</a:t>
+            <a:pPr marL="0" indent="0">
+              <a:buNone/>
+            </a:pPr>
+            <a:r>
+              <a:rPr lang="en-US" b="1" dirty="0" smtClean="0"/>
+              <a:t>Likes</a:t>
+            </a:r>
+          </a:p>
+          <a:p>
+            <a:pPr>
+              <a:buFont typeface="Arial" panose="020B0604020202020204" pitchFamily="34" charset="0"/>
+              <a:buChar char="•"/>
+            </a:pPr>
+            <a:r>
+              <a:rPr lang="en-US" dirty="0" smtClean="0"/>
+              <a:t>Dogs</a:t>
+            </a:r>
+          </a:p>
+          <a:p>
+            <a:pPr>
+              <a:buFont typeface="Arial" panose="020B0604020202020204" pitchFamily="34" charset="0"/>
+              <a:buChar char="•"/>
+            </a:pPr>
+            <a:r>
+              <a:rPr lang="en-US" dirty="0" smtClean="0"/>
+              <a:t>Most people</a:t>
+            </a:r>
+          </a:p>
+          <a:p>
+            <a:pPr>
+              <a:buFont typeface="Arial" panose="020B0604020202020204" pitchFamily="34" charset="0"/>
+              <a:buChar char="•"/>
+            </a:pPr>
+            <a:r>
+              <a:rPr lang="en-US" dirty="0" smtClean="0"/>
+              <a:t>Telling bad jokes</a:t>
+            </a:r>
+          </a:p>
+          <a:p>
+            <a:pPr>
+              <a:buFont typeface="Arial" panose="020B0604020202020204" pitchFamily="34" charset="0"/>
+              <a:buChar char="•"/>
+            </a:pPr>
+            <a:r>
+              <a:rPr lang="en-US" dirty="0" smtClean="0"/>
+              <a:t>The words “bro” and “totally.”  I’m not kidding.</a:t>
+            </a:r>
+          </a:p>
+          <a:p>
+            <a:pPr>
+              <a:buFont typeface="Arial" panose="020B0604020202020204" pitchFamily="34" charset="0"/>
+              <a:buChar char="•"/>
+            </a:pPr>
+            <a:r>
+              <a:rPr lang="en-US" dirty="0"/>
+              <a:t>¡ɹ0x0q ɹn0ʎ 9u!ʞɔ@ɥ</a:t>
+            </a:r>
+          </a:p>
+          <a:p>
+            <a:pPr marL="0" indent="0">
+              <a:buNone/>
+            </a:pPr>
+            <a:endParaRPr lang="en-US" b="1" dirty="0" smtClean="0"/>
+          </a:p>
+          <a:p>
+            <a:pPr marL="0" indent="0">
+              <a:buNone/>
+            </a:pPr>
+            <a:r>
+              <a:rPr lang="en-US" b="1" dirty="0" smtClean="0"/>
+              <a:t>Dislikes</a:t>
+            </a:r>
+          </a:p>
+          <a:p>
+            <a:pPr>
+              <a:buFont typeface="Arial" panose="020B0604020202020204" pitchFamily="34" charset="0"/>
+              <a:buChar char="•"/>
+            </a:pPr>
+            <a:r>
+              <a:rPr lang="en-US" dirty="0" smtClean="0"/>
+              <a:t>Dog hair</a:t>
+            </a:r>
+          </a:p>
+          <a:p>
+            <a:pPr>
+              <a:buFont typeface="Arial" panose="020B0604020202020204" pitchFamily="34" charset="0"/>
+              <a:buChar char="•"/>
+            </a:pPr>
+            <a:r>
+              <a:rPr lang="en-US" dirty="0" smtClean="0"/>
+              <a:t>A few people</a:t>
+            </a:r>
+          </a:p>
+          <a:p>
+            <a:pPr>
+              <a:buFont typeface="Arial" panose="020B0604020202020204" pitchFamily="34" charset="0"/>
+              <a:buChar char="•"/>
+            </a:pPr>
+            <a:r>
+              <a:rPr lang="en-US" dirty="0" smtClean="0"/>
+              <a:t>Telling jokes that don’t work (Happens a LOT)</a:t>
+            </a:r>
+          </a:p>
+          <a:p>
+            <a:pPr>
+              <a:buFont typeface="Arial" panose="020B0604020202020204" pitchFamily="34" charset="0"/>
+              <a:buChar char="•"/>
+            </a:pPr>
+            <a:r>
+              <a:rPr lang="en-US" dirty="0" smtClean="0"/>
+              <a:t>Making lists of stuff</a:t>
             </a:r>
           </a:p>
         </p:txBody>
@@ -17185,7 +17038,7 @@
     </p:spTree>
     <p:extLst>
       <p:ext uri="{BB962C8B-B14F-4D97-AF65-F5344CB8AC3E}">
-        <p14:creationId xmlns:p14="http://schemas.microsoft.com/office/powerpoint/2010/main" val="3475792369"/>
+        <p14:creationId xmlns:p14="http://schemas.microsoft.com/office/powerpoint/2010/main" val="2708422358"/>
       </p:ext>
     </p:extLst>
   </p:cSld>
@@ -17238,6 +17091,95 @@
           <a:p>
             <a:r>
               <a:rPr lang="en-US" dirty="0" smtClean="0"/>
+              <a:t>Lame Joke</a:t>
+            </a:r>
+            <a:endParaRPr lang="en-US" dirty="0"/>
+          </a:p>
+        </p:txBody>
+      </p:sp>
+      <p:sp>
+        <p:nvSpPr>
+          <p:cNvPr id="3" name="Content Placeholder 2"/>
+          <p:cNvSpPr>
+            <a:spLocks noGrp="1"/>
+          </p:cNvSpPr>
+          <p:nvPr>
+            <p:ph idx="1"/>
+          </p:nvPr>
+        </p:nvSpPr>
+        <p:spPr/>
+        <p:txBody>
+          <a:bodyPr/>
+          <a:lstStyle/>
+          <a:p>
+            <a:pPr marL="0" indent="0">
+              <a:buNone/>
+            </a:pPr>
+            <a:r>
+              <a:rPr lang="en-US" b="1" dirty="0"/>
+              <a:t>Audience Participation</a:t>
+            </a:r>
+            <a:r>
+              <a:rPr lang="en-US" dirty="0"/>
+              <a:t>:  Mr. Devlin Liles</a:t>
+            </a:r>
+            <a:r>
+              <a:rPr lang="en-US" dirty="0" smtClean="0"/>
+              <a:t>.</a:t>
+            </a:r>
+            <a:endParaRPr lang="en-US" dirty="0"/>
+          </a:p>
+        </p:txBody>
+      </p:sp>
+    </p:spTree>
+    <p:extLst>
+      <p:ext uri="{BB962C8B-B14F-4D97-AF65-F5344CB8AC3E}">
+        <p14:creationId xmlns:p14="http://schemas.microsoft.com/office/powerpoint/2010/main" val="2718485294"/>
+      </p:ext>
+    </p:extLst>
+  </p:cSld>
+  <p:clrMapOvr>
+    <a:masterClrMapping/>
+  </p:clrMapOvr>
+</p:sld>
+</file>
+
+<file path=ppt/slides/slide31.xml><?xml version="1.0" encoding="utf-8"?>
+<p:sld xmlns:a="http://schemas.openxmlformats.org/drawingml/2006/main" xmlns:r="http://schemas.openxmlformats.org/officeDocument/2006/relationships" xmlns:p="http://schemas.openxmlformats.org/presentationml/2006/main">
+  <p:cSld>
+    <p:spTree>
+      <p:nvGrpSpPr>
+        <p:cNvPr id="1" name=""/>
+        <p:cNvGrpSpPr/>
+        <p:nvPr/>
+      </p:nvGrpSpPr>
+      <p:grpSpPr>
+        <a:xfrm>
+          <a:off x="0" y="0"/>
+          <a:ext cx="0" cy="0"/>
+          <a:chOff x="0" y="0"/>
+          <a:chExt cx="0" cy="0"/>
+        </a:xfrm>
+      </p:grpSpPr>
+      <p:sp>
+        <p:nvSpPr>
+          <p:cNvPr id="2" name="Title 1"/>
+          <p:cNvSpPr>
+            <a:spLocks noGrp="1"/>
+          </p:cNvSpPr>
+          <p:nvPr>
+            <p:ph type="title"/>
+          </p:nvPr>
+        </p:nvSpPr>
+        <p:spPr/>
+        <p:txBody>
+          <a:bodyPr>
+            <a:normAutofit fontScale="90000"/>
+          </a:bodyPr>
+          <a:lstStyle/>
+          <a:p>
+            <a:r>
+              <a:rPr lang="en-US" dirty="0" smtClean="0"/>
               <a:t>Futures (Task Graph)</a:t>
             </a:r>
             <a:endParaRPr lang="en-US" dirty="0"/>
@@ -17315,7 +17257,7 @@
 </p:sld>
 </file>
 
-<file path=ppt/slides/slide31.xml><?xml version="1.0" encoding="utf-8"?>
+<file path=ppt/slides/slide32.xml><?xml version="1.0" encoding="utf-8"?>
 <p:sld xmlns:a="http://schemas.openxmlformats.org/drawingml/2006/main" xmlns:r="http://schemas.openxmlformats.org/officeDocument/2006/relationships" xmlns:p="http://schemas.openxmlformats.org/presentationml/2006/main">
   <p:cSld>
     <p:spTree>
@@ -18032,93 +17974,6 @@
 </p:sld>
 </file>
 
-<file path=ppt/slides/slide32.xml><?xml version="1.0" encoding="utf-8"?>
-<p:sld xmlns:a="http://schemas.openxmlformats.org/drawingml/2006/main" xmlns:r="http://schemas.openxmlformats.org/officeDocument/2006/relationships" xmlns:p="http://schemas.openxmlformats.org/presentationml/2006/main">
-  <p:cSld>
-    <p:spTree>
-      <p:nvGrpSpPr>
-        <p:cNvPr id="1" name=""/>
-        <p:cNvGrpSpPr/>
-        <p:nvPr/>
-      </p:nvGrpSpPr>
-      <p:grpSpPr>
-        <a:xfrm>
-          <a:off x="0" y="0"/>
-          <a:ext cx="0" cy="0"/>
-          <a:chOff x="0" y="0"/>
-          <a:chExt cx="0" cy="0"/>
-        </a:xfrm>
-      </p:grpSpPr>
-      <p:sp>
-        <p:nvSpPr>
-          <p:cNvPr id="2" name="Title 1"/>
-          <p:cNvSpPr>
-            <a:spLocks noGrp="1"/>
-          </p:cNvSpPr>
-          <p:nvPr>
-            <p:ph type="title"/>
-          </p:nvPr>
-        </p:nvSpPr>
-        <p:spPr/>
-        <p:txBody>
-          <a:bodyPr>
-            <a:normAutofit fontScale="90000"/>
-          </a:bodyPr>
-          <a:lstStyle/>
-          <a:p>
-            <a:r>
-              <a:rPr lang="en-US" dirty="0" smtClean="0"/>
-              <a:t>Lame Joke</a:t>
-            </a:r>
-            <a:endParaRPr lang="en-US" dirty="0"/>
-          </a:p>
-        </p:txBody>
-      </p:sp>
-      <p:sp>
-        <p:nvSpPr>
-          <p:cNvPr id="3" name="Content Placeholder 2"/>
-          <p:cNvSpPr>
-            <a:spLocks noGrp="1"/>
-          </p:cNvSpPr>
-          <p:nvPr>
-            <p:ph idx="1"/>
-          </p:nvPr>
-        </p:nvSpPr>
-        <p:spPr/>
-        <p:txBody>
-          <a:bodyPr/>
-          <a:lstStyle/>
-          <a:p>
-            <a:pPr marL="0" indent="0">
-              <a:buNone/>
-            </a:pPr>
-            <a:r>
-              <a:rPr lang="en-US" b="1" dirty="0"/>
-              <a:t>Audience Participation</a:t>
-            </a:r>
-            <a:r>
-              <a:rPr lang="en-US" dirty="0"/>
-              <a:t>:  Mr. Curtis Schlak.</a:t>
-            </a:r>
-          </a:p>
-          <a:p>
-            <a:endParaRPr lang="en-US" dirty="0"/>
-          </a:p>
-        </p:txBody>
-      </p:sp>
-    </p:spTree>
-    <p:extLst>
-      <p:ext uri="{BB962C8B-B14F-4D97-AF65-F5344CB8AC3E}">
-        <p14:creationId xmlns:p14="http://schemas.microsoft.com/office/powerpoint/2010/main" val="3112344474"/>
-      </p:ext>
-    </p:extLst>
-  </p:cSld>
-  <p:clrMapOvr>
-    <a:masterClrMapping/>
-  </p:clrMapOvr>
-</p:sld>
-</file>
-
 <file path=ppt/slides/slide33.xml><?xml version="1.0" encoding="utf-8"?>
 <p:sld xmlns:a="http://schemas.openxmlformats.org/drawingml/2006/main" xmlns:r="http://schemas.openxmlformats.org/officeDocument/2006/relationships" xmlns:p="http://schemas.openxmlformats.org/presentationml/2006/main">
   <p:cSld>
@@ -18155,6 +18010,93 @@
           <a:p>
             <a:r>
               <a:rPr lang="en-US" dirty="0" smtClean="0"/>
+              <a:t>Lame Joke</a:t>
+            </a:r>
+            <a:endParaRPr lang="en-US" dirty="0"/>
+          </a:p>
+        </p:txBody>
+      </p:sp>
+      <p:sp>
+        <p:nvSpPr>
+          <p:cNvPr id="3" name="Content Placeholder 2"/>
+          <p:cNvSpPr>
+            <a:spLocks noGrp="1"/>
+          </p:cNvSpPr>
+          <p:nvPr>
+            <p:ph idx="1"/>
+          </p:nvPr>
+        </p:nvSpPr>
+        <p:spPr/>
+        <p:txBody>
+          <a:bodyPr/>
+          <a:lstStyle/>
+          <a:p>
+            <a:pPr marL="0" indent="0">
+              <a:buNone/>
+            </a:pPr>
+            <a:r>
+              <a:rPr lang="en-US" b="1" dirty="0"/>
+              <a:t>Audience Participation</a:t>
+            </a:r>
+            <a:r>
+              <a:rPr lang="en-US" dirty="0"/>
+              <a:t>:  Mr. Curtis Schlak.</a:t>
+            </a:r>
+          </a:p>
+          <a:p>
+            <a:endParaRPr lang="en-US" dirty="0"/>
+          </a:p>
+        </p:txBody>
+      </p:sp>
+    </p:spTree>
+    <p:extLst>
+      <p:ext uri="{BB962C8B-B14F-4D97-AF65-F5344CB8AC3E}">
+        <p14:creationId xmlns:p14="http://schemas.microsoft.com/office/powerpoint/2010/main" val="3112344474"/>
+      </p:ext>
+    </p:extLst>
+  </p:cSld>
+  <p:clrMapOvr>
+    <a:masterClrMapping/>
+  </p:clrMapOvr>
+</p:sld>
+</file>
+
+<file path=ppt/slides/slide34.xml><?xml version="1.0" encoding="utf-8"?>
+<p:sld xmlns:a="http://schemas.openxmlformats.org/drawingml/2006/main" xmlns:r="http://schemas.openxmlformats.org/officeDocument/2006/relationships" xmlns:p="http://schemas.openxmlformats.org/presentationml/2006/main">
+  <p:cSld>
+    <p:spTree>
+      <p:nvGrpSpPr>
+        <p:cNvPr id="1" name=""/>
+        <p:cNvGrpSpPr/>
+        <p:nvPr/>
+      </p:nvGrpSpPr>
+      <p:grpSpPr>
+        <a:xfrm>
+          <a:off x="0" y="0"/>
+          <a:ext cx="0" cy="0"/>
+          <a:chOff x="0" y="0"/>
+          <a:chExt cx="0" cy="0"/>
+        </a:xfrm>
+      </p:grpSpPr>
+      <p:sp>
+        <p:nvSpPr>
+          <p:cNvPr id="2" name="Title 1"/>
+          <p:cNvSpPr>
+            <a:spLocks noGrp="1"/>
+          </p:cNvSpPr>
+          <p:nvPr>
+            <p:ph type="title"/>
+          </p:nvPr>
+        </p:nvSpPr>
+        <p:spPr/>
+        <p:txBody>
+          <a:bodyPr>
+            <a:normAutofit fontScale="90000"/>
+          </a:bodyPr>
+          <a:lstStyle/>
+          <a:p>
+            <a:r>
+              <a:rPr lang="en-US" dirty="0" smtClean="0"/>
               <a:t>Pipelines</a:t>
             </a:r>
             <a:endParaRPr lang="en-US" dirty="0"/>
@@ -18215,7 +18157,7 @@
 </p:sld>
 </file>
 
-<file path=ppt/slides/slide34.xml><?xml version="1.0" encoding="utf-8"?>
+<file path=ppt/slides/slide35.xml><?xml version="1.0" encoding="utf-8"?>
 <p:sld xmlns:a="http://schemas.openxmlformats.org/drawingml/2006/main" xmlns:r="http://schemas.openxmlformats.org/officeDocument/2006/relationships" xmlns:p="http://schemas.openxmlformats.org/presentationml/2006/main">
   <p:cSld>
     <p:spTree>
@@ -18963,152 +18905,6 @@
 </p:sld>
 </file>
 
-<file path=ppt/slides/slide35.xml><?xml version="1.0" encoding="utf-8"?>
-<p:sld xmlns:a="http://schemas.openxmlformats.org/drawingml/2006/main" xmlns:r="http://schemas.openxmlformats.org/officeDocument/2006/relationships" xmlns:p="http://schemas.openxmlformats.org/presentationml/2006/main">
-  <p:cSld>
-    <p:spTree>
-      <p:nvGrpSpPr>
-        <p:cNvPr id="1" name=""/>
-        <p:cNvGrpSpPr/>
-        <p:nvPr/>
-      </p:nvGrpSpPr>
-      <p:grpSpPr>
-        <a:xfrm>
-          <a:off x="0" y="0"/>
-          <a:ext cx="0" cy="0"/>
-          <a:chOff x="0" y="0"/>
-          <a:chExt cx="0" cy="0"/>
-        </a:xfrm>
-      </p:grpSpPr>
-      <p:sp>
-        <p:nvSpPr>
-          <p:cNvPr id="2" name="Title 1"/>
-          <p:cNvSpPr>
-            <a:spLocks noGrp="1"/>
-          </p:cNvSpPr>
-          <p:nvPr>
-            <p:ph type="title"/>
-          </p:nvPr>
-        </p:nvSpPr>
-        <p:spPr/>
-        <p:txBody>
-          <a:bodyPr>
-            <a:normAutofit fontScale="90000"/>
-          </a:bodyPr>
-          <a:lstStyle/>
-          <a:p>
-            <a:r>
-              <a:rPr lang="en-US" dirty="0" smtClean="0"/>
-              <a:t>Anti-Patterns</a:t>
-            </a:r>
-            <a:endParaRPr lang="en-US" dirty="0"/>
-          </a:p>
-        </p:txBody>
-      </p:sp>
-      <p:sp>
-        <p:nvSpPr>
-          <p:cNvPr id="3" name="Content Placeholder 2"/>
-          <p:cNvSpPr>
-            <a:spLocks noGrp="1"/>
-          </p:cNvSpPr>
-          <p:nvPr>
-            <p:ph idx="1"/>
-          </p:nvPr>
-        </p:nvSpPr>
-        <p:spPr/>
-        <p:txBody>
-          <a:bodyPr>
-            <a:normAutofit fontScale="85000" lnSpcReduction="20000"/>
-          </a:bodyPr>
-          <a:lstStyle/>
-          <a:p>
-            <a:r>
-              <a:rPr lang="en-US" b="1" dirty="0" smtClean="0"/>
-              <a:t>Thread starvation</a:t>
-            </a:r>
-            <a:r>
-              <a:rPr lang="en-US" dirty="0" smtClean="0"/>
-              <a:t>:  If there are not enough threads to run all pipeline tasks, the blocking collections can fill and block indefinitely.</a:t>
-            </a:r>
-          </a:p>
-          <a:p>
-            <a:r>
-              <a:rPr lang="en-US" b="1" dirty="0" smtClean="0"/>
-              <a:t>Infinite blocking collection waits</a:t>
-            </a:r>
-            <a:r>
-              <a:rPr lang="en-US" dirty="0" smtClean="0"/>
-              <a:t>:  If a pipeline task throws an exception, it will no longer take values from its input blocking collection.  If the input collection is full, the task that fills it will block.  Be sure to cancel pipelines if you anticipate this situation.</a:t>
-            </a:r>
-          </a:p>
-          <a:p>
-            <a:r>
-              <a:rPr lang="en-US" b="1" dirty="0" smtClean="0"/>
-              <a:t>Forgetting </a:t>
-            </a:r>
-            <a:r>
-              <a:rPr lang="en-US" b="1" dirty="0" err="1" smtClean="0"/>
-              <a:t>GetConsumingEnumerable</a:t>
-            </a:r>
-            <a:r>
-              <a:rPr lang="en-US" b="1" dirty="0" smtClean="0"/>
-              <a:t>()</a:t>
-            </a:r>
-            <a:r>
-              <a:rPr lang="en-US" dirty="0" smtClean="0"/>
-              <a:t>:  Blocking collections implement </a:t>
-            </a:r>
-            <a:r>
-              <a:rPr lang="en-US" dirty="0" err="1" smtClean="0"/>
-              <a:t>IEnumerable</a:t>
-            </a:r>
-            <a:r>
-              <a:rPr lang="en-US" dirty="0" smtClean="0"/>
-              <a:t>&lt;T&gt;, so this is easy to forget.  If you forget, the enumeration will be a snapshot and won’t consume from the collection.</a:t>
-            </a:r>
-          </a:p>
-          <a:p>
-            <a:r>
-              <a:rPr lang="en-US" b="1" dirty="0" smtClean="0"/>
-              <a:t>Using other flavors of </a:t>
-            </a:r>
-            <a:r>
-              <a:rPr lang="en-US" b="1" dirty="0" err="1" smtClean="0"/>
-              <a:t>IProducerConsumerCollection</a:t>
-            </a:r>
-            <a:r>
-              <a:rPr lang="en-US" b="1" dirty="0" smtClean="0"/>
-              <a:t> for your blocking collections</a:t>
-            </a:r>
-            <a:r>
-              <a:rPr lang="en-US" dirty="0" smtClean="0"/>
-              <a:t>:  </a:t>
-            </a:r>
-            <a:r>
-              <a:rPr lang="en-US" dirty="0" err="1" smtClean="0"/>
-              <a:t>ConcurrentStack</a:t>
-            </a:r>
-            <a:r>
-              <a:rPr lang="en-US" dirty="0" smtClean="0"/>
-              <a:t> may never consume the earliest entries, for examples.</a:t>
-            </a:r>
-            <a:endParaRPr lang="en-US" dirty="0"/>
-          </a:p>
-        </p:txBody>
-      </p:sp>
-    </p:spTree>
-    <p:extLst>
-      <p:ext uri="{BB962C8B-B14F-4D97-AF65-F5344CB8AC3E}">
-        <p14:creationId xmlns:p14="http://schemas.microsoft.com/office/powerpoint/2010/main" val="1549961303"/>
-      </p:ext>
-    </p:extLst>
-  </p:cSld>
-  <p:clrMapOvr>
-    <a:masterClrMapping/>
-  </p:clrMapOvr>
-</p:sld>
-</file>
-
 <file path=ppt/slides/slide36.xml><?xml version="1.0" encoding="utf-8"?>
 <p:sld xmlns:a="http://schemas.openxmlformats.org/drawingml/2006/main" xmlns:r="http://schemas.openxmlformats.org/officeDocument/2006/relationships" xmlns:p="http://schemas.openxmlformats.org/presentationml/2006/main">
   <p:cSld>
@@ -19145,7 +18941,7 @@
           <a:p>
             <a:r>
               <a:rPr lang="en-US" dirty="0" smtClean="0"/>
-              <a:t>Lame Joke</a:t>
+              <a:t>Anti-Patterns</a:t>
             </a:r>
             <a:endParaRPr lang="en-US" dirty="0"/>
           </a:p>
@@ -19163,16 +18959,80 @@
         </p:nvSpPr>
         <p:spPr/>
         <p:txBody>
-          <a:bodyPr/>
+          <a:bodyPr>
+            <a:normAutofit fontScale="85000" lnSpcReduction="20000"/>
+          </a:bodyPr>
           <a:lstStyle/>
           <a:p>
             <a:r>
-              <a:rPr lang="en-US" dirty="0"/>
-              <a:t>Audience Participation</a:t>
+              <a:rPr lang="en-US" b="1" dirty="0" smtClean="0"/>
+              <a:t>Thread starvation</a:t>
             </a:r>
             <a:r>
               <a:rPr lang="en-US" dirty="0" smtClean="0"/>
-              <a:t>!</a:t>
+              <a:t>:  If there are not enough threads to run all pipeline tasks, the blocking collections can fill and block indefinitely.</a:t>
+            </a:r>
+          </a:p>
+          <a:p>
+            <a:r>
+              <a:rPr lang="en-US" b="1" dirty="0" smtClean="0"/>
+              <a:t>Infinite blocking collection waits</a:t>
+            </a:r>
+            <a:r>
+              <a:rPr lang="en-US" dirty="0" smtClean="0"/>
+              <a:t>:  If a pipeline task throws an exception, it will no longer take values from its input blocking collection.  If the input collection is full, the task that fills it will block.  Be sure to cancel pipelines if you anticipate this situation.</a:t>
+            </a:r>
+          </a:p>
+          <a:p>
+            <a:r>
+              <a:rPr lang="en-US" b="1" dirty="0" smtClean="0"/>
+              <a:t>Forgetting </a:t>
+            </a:r>
+            <a:r>
+              <a:rPr lang="en-US" b="1" dirty="0" err="1" smtClean="0"/>
+              <a:t>GetConsumingEnumerable</a:t>
+            </a:r>
+            <a:r>
+              <a:rPr lang="en-US" b="1" dirty="0" smtClean="0"/>
+              <a:t>()</a:t>
+            </a:r>
+            <a:r>
+              <a:rPr lang="en-US" dirty="0" smtClean="0"/>
+              <a:t>:  Blocking collections implement </a:t>
+            </a:r>
+            <a:r>
+              <a:rPr lang="en-US" dirty="0" err="1" smtClean="0"/>
+              <a:t>IEnumerable</a:t>
+            </a:r>
+            <a:r>
+              <a:rPr lang="en-US" dirty="0" smtClean="0"/>
+              <a:t>&lt;T&gt;, so this is easy to forget.  If you forget, the enumeration will be a snapshot and won’t consume from the collection.</a:t>
+            </a:r>
+          </a:p>
+          <a:p>
+            <a:r>
+              <a:rPr lang="en-US" b="1" dirty="0" smtClean="0"/>
+              <a:t>Using other flavors of </a:t>
+            </a:r>
+            <a:r>
+              <a:rPr lang="en-US" b="1" dirty="0" err="1" smtClean="0"/>
+              <a:t>IProducerConsumerCollection</a:t>
+            </a:r>
+            <a:r>
+              <a:rPr lang="en-US" b="1" dirty="0" smtClean="0"/>
+              <a:t> for your blocking collections</a:t>
+            </a:r>
+            <a:r>
+              <a:rPr lang="en-US" dirty="0" smtClean="0"/>
+              <a:t>:  </a:t>
+            </a:r>
+            <a:r>
+              <a:rPr lang="en-US" dirty="0" err="1" smtClean="0"/>
+              <a:t>ConcurrentStack</a:t>
+            </a:r>
+            <a:r>
+              <a:rPr lang="en-US" dirty="0" smtClean="0"/>
+              <a:t> may never consume the earliest entries, for examples.</a:t>
             </a:r>
             <a:endParaRPr lang="en-US" dirty="0"/>
           </a:p>
@@ -19181,7 +19041,7 @@
     </p:spTree>
     <p:extLst>
       <p:ext uri="{BB962C8B-B14F-4D97-AF65-F5344CB8AC3E}">
-        <p14:creationId xmlns:p14="http://schemas.microsoft.com/office/powerpoint/2010/main" val="3112344474"/>
+        <p14:creationId xmlns:p14="http://schemas.microsoft.com/office/powerpoint/2010/main" val="1549961303"/>
       </p:ext>
     </p:extLst>
   </p:cSld>
@@ -19227,6 +19087,88 @@
           <a:p>
             <a:r>
               <a:rPr lang="en-US" dirty="0" smtClean="0"/>
+              <a:t>Lame Joke</a:t>
+            </a:r>
+            <a:endParaRPr lang="en-US" dirty="0"/>
+          </a:p>
+        </p:txBody>
+      </p:sp>
+      <p:sp>
+        <p:nvSpPr>
+          <p:cNvPr id="3" name="Content Placeholder 2"/>
+          <p:cNvSpPr>
+            <a:spLocks noGrp="1"/>
+          </p:cNvSpPr>
+          <p:nvPr>
+            <p:ph idx="1"/>
+          </p:nvPr>
+        </p:nvSpPr>
+        <p:spPr/>
+        <p:txBody>
+          <a:bodyPr/>
+          <a:lstStyle/>
+          <a:p>
+            <a:r>
+              <a:rPr lang="en-US" dirty="0"/>
+              <a:t>Audience Participation</a:t>
+            </a:r>
+            <a:r>
+              <a:rPr lang="en-US" dirty="0" smtClean="0"/>
+              <a:t>!</a:t>
+            </a:r>
+            <a:endParaRPr lang="en-US" dirty="0"/>
+          </a:p>
+        </p:txBody>
+      </p:sp>
+    </p:spTree>
+    <p:extLst>
+      <p:ext uri="{BB962C8B-B14F-4D97-AF65-F5344CB8AC3E}">
+        <p14:creationId xmlns:p14="http://schemas.microsoft.com/office/powerpoint/2010/main" val="3112344474"/>
+      </p:ext>
+    </p:extLst>
+  </p:cSld>
+  <p:clrMapOvr>
+    <a:masterClrMapping/>
+  </p:clrMapOvr>
+</p:sld>
+</file>
+
+<file path=ppt/slides/slide38.xml><?xml version="1.0" encoding="utf-8"?>
+<p:sld xmlns:a="http://schemas.openxmlformats.org/drawingml/2006/main" xmlns:r="http://schemas.openxmlformats.org/officeDocument/2006/relationships" xmlns:p="http://schemas.openxmlformats.org/presentationml/2006/main">
+  <p:cSld>
+    <p:spTree>
+      <p:nvGrpSpPr>
+        <p:cNvPr id="1" name=""/>
+        <p:cNvGrpSpPr/>
+        <p:nvPr/>
+      </p:nvGrpSpPr>
+      <p:grpSpPr>
+        <a:xfrm>
+          <a:off x="0" y="0"/>
+          <a:ext cx="0" cy="0"/>
+          <a:chOff x="0" y="0"/>
+          <a:chExt cx="0" cy="0"/>
+        </a:xfrm>
+      </p:grpSpPr>
+      <p:sp>
+        <p:nvSpPr>
+          <p:cNvPr id="2" name="Title 1"/>
+          <p:cNvSpPr>
+            <a:spLocks noGrp="1"/>
+          </p:cNvSpPr>
+          <p:nvPr>
+            <p:ph type="title"/>
+          </p:nvPr>
+        </p:nvSpPr>
+        <p:spPr/>
+        <p:txBody>
+          <a:bodyPr>
+            <a:normAutofit fontScale="90000"/>
+          </a:bodyPr>
+          <a:lstStyle/>
+          <a:p>
+            <a:r>
+              <a:rPr lang="en-US" dirty="0" smtClean="0"/>
               <a:t>Other Examples</a:t>
             </a:r>
             <a:endParaRPr lang="en-US" dirty="0"/>
@@ -19291,115 +19233,6 @@
 </p:sld>
 </file>
 
-<file path=ppt/slides/slide38.xml><?xml version="1.0" encoding="utf-8"?>
-<p:sld xmlns:a="http://schemas.openxmlformats.org/drawingml/2006/main" xmlns:r="http://schemas.openxmlformats.org/officeDocument/2006/relationships" xmlns:p="http://schemas.openxmlformats.org/presentationml/2006/main">
-  <p:cSld>
-    <p:spTree>
-      <p:nvGrpSpPr>
-        <p:cNvPr id="1" name=""/>
-        <p:cNvGrpSpPr/>
-        <p:nvPr/>
-      </p:nvGrpSpPr>
-      <p:grpSpPr>
-        <a:xfrm>
-          <a:off x="0" y="0"/>
-          <a:ext cx="0" cy="0"/>
-          <a:chOff x="0" y="0"/>
-          <a:chExt cx="0" cy="0"/>
-        </a:xfrm>
-      </p:grpSpPr>
-      <p:sp>
-        <p:nvSpPr>
-          <p:cNvPr id="2" name="Title 1"/>
-          <p:cNvSpPr>
-            <a:spLocks noGrp="1"/>
-          </p:cNvSpPr>
-          <p:nvPr>
-            <p:ph type="title"/>
-          </p:nvPr>
-        </p:nvSpPr>
-        <p:spPr/>
-        <p:txBody>
-          <a:bodyPr>
-            <a:normAutofit fontScale="90000"/>
-          </a:bodyPr>
-          <a:lstStyle/>
-          <a:p>
-            <a:r>
-              <a:rPr lang="en-US" dirty="0" smtClean="0"/>
-              <a:t>Questions And Answers</a:t>
-            </a:r>
-            <a:endParaRPr lang="en-US" dirty="0"/>
-          </a:p>
-        </p:txBody>
-      </p:sp>
-      <p:sp>
-        <p:nvSpPr>
-          <p:cNvPr id="3" name="Content Placeholder 2"/>
-          <p:cNvSpPr>
-            <a:spLocks noGrp="1"/>
-          </p:cNvSpPr>
-          <p:nvPr>
-            <p:ph idx="1"/>
-          </p:nvPr>
-        </p:nvSpPr>
-        <p:spPr/>
-        <p:txBody>
-          <a:bodyPr/>
-          <a:lstStyle/>
-          <a:p>
-            <a:r>
-              <a:rPr lang="en-US" dirty="0" smtClean="0"/>
-              <a:t>You line ‘</a:t>
-            </a:r>
-            <a:r>
-              <a:rPr lang="en-US" dirty="0" err="1" smtClean="0"/>
-              <a:t>em</a:t>
-            </a:r>
-            <a:r>
-              <a:rPr lang="en-US" dirty="0" smtClean="0"/>
-              <a:t> up.</a:t>
-            </a:r>
-          </a:p>
-          <a:p>
-            <a:r>
-              <a:rPr lang="en-US" dirty="0" smtClean="0"/>
-              <a:t>I’ll knock ‘</a:t>
-            </a:r>
-            <a:r>
-              <a:rPr lang="en-US" dirty="0" err="1" smtClean="0"/>
-              <a:t>em</a:t>
-            </a:r>
-            <a:r>
-              <a:rPr lang="en-US" dirty="0" smtClean="0"/>
-              <a:t> down.</a:t>
-            </a:r>
-          </a:p>
-          <a:p>
-            <a:r>
-              <a:rPr lang="en-US" b="1" dirty="0" smtClean="0">
-                <a:solidFill>
-                  <a:srgbClr val="FF0000"/>
-                </a:solidFill>
-              </a:rPr>
-              <a:t>If I say something dumb and you know better, SPEAK UP!</a:t>
-            </a:r>
-          </a:p>
-        </p:txBody>
-      </p:sp>
-    </p:spTree>
-    <p:extLst>
-      <p:ext uri="{BB962C8B-B14F-4D97-AF65-F5344CB8AC3E}">
-        <p14:creationId xmlns:p14="http://schemas.microsoft.com/office/powerpoint/2010/main" val="3412954014"/>
-      </p:ext>
-    </p:extLst>
-  </p:cSld>
-  <p:clrMapOvr>
-    <a:masterClrMapping/>
-  </p:clrMapOvr>
-</p:sld>
-</file>
-
 <file path=ppt/slides/slide39.xml><?xml version="1.0" encoding="utf-8"?>
 <p:sld xmlns:a="http://schemas.openxmlformats.org/drawingml/2006/main" xmlns:r="http://schemas.openxmlformats.org/officeDocument/2006/relationships" xmlns:p="http://schemas.openxmlformats.org/presentationml/2006/main">
   <p:cSld>
@@ -19436,6 +19269,327 @@
           <a:p>
             <a:r>
               <a:rPr lang="en-US" dirty="0" smtClean="0"/>
+              <a:t>Questions And Answers</a:t>
+            </a:r>
+            <a:endParaRPr lang="en-US" dirty="0"/>
+          </a:p>
+        </p:txBody>
+      </p:sp>
+      <p:sp>
+        <p:nvSpPr>
+          <p:cNvPr id="3" name="Content Placeholder 2"/>
+          <p:cNvSpPr>
+            <a:spLocks noGrp="1"/>
+          </p:cNvSpPr>
+          <p:nvPr>
+            <p:ph idx="1"/>
+          </p:nvPr>
+        </p:nvSpPr>
+        <p:spPr/>
+        <p:txBody>
+          <a:bodyPr/>
+          <a:lstStyle/>
+          <a:p>
+            <a:r>
+              <a:rPr lang="en-US" dirty="0" smtClean="0"/>
+              <a:t>You line ‘</a:t>
+            </a:r>
+            <a:r>
+              <a:rPr lang="en-US" dirty="0" err="1" smtClean="0"/>
+              <a:t>em</a:t>
+            </a:r>
+            <a:r>
+              <a:rPr lang="en-US" dirty="0" smtClean="0"/>
+              <a:t> up.</a:t>
+            </a:r>
+          </a:p>
+          <a:p>
+            <a:r>
+              <a:rPr lang="en-US" dirty="0" smtClean="0"/>
+              <a:t>I’ll knock ‘</a:t>
+            </a:r>
+            <a:r>
+              <a:rPr lang="en-US" dirty="0" err="1" smtClean="0"/>
+              <a:t>em</a:t>
+            </a:r>
+            <a:r>
+              <a:rPr lang="en-US" dirty="0" smtClean="0"/>
+              <a:t> down.</a:t>
+            </a:r>
+          </a:p>
+          <a:p>
+            <a:r>
+              <a:rPr lang="en-US" b="1" dirty="0" smtClean="0">
+                <a:solidFill>
+                  <a:srgbClr val="FF0000"/>
+                </a:solidFill>
+              </a:rPr>
+              <a:t>If I say something dumb and you know better, SPEAK UP!</a:t>
+            </a:r>
+          </a:p>
+        </p:txBody>
+      </p:sp>
+    </p:spTree>
+    <p:extLst>
+      <p:ext uri="{BB962C8B-B14F-4D97-AF65-F5344CB8AC3E}">
+        <p14:creationId xmlns:p14="http://schemas.microsoft.com/office/powerpoint/2010/main" val="3412954014"/>
+      </p:ext>
+    </p:extLst>
+  </p:cSld>
+  <p:clrMapOvr>
+    <a:masterClrMapping/>
+  </p:clrMapOvr>
+</p:sld>
+</file>
+
+<file path=ppt/slides/slide4.xml><?xml version="1.0" encoding="utf-8"?>
+<p:sld xmlns:a="http://schemas.openxmlformats.org/drawingml/2006/main" xmlns:r="http://schemas.openxmlformats.org/officeDocument/2006/relationships" xmlns:p="http://schemas.openxmlformats.org/presentationml/2006/main">
+  <p:cSld>
+    <p:spTree>
+      <p:nvGrpSpPr>
+        <p:cNvPr id="1" name=""/>
+        <p:cNvGrpSpPr/>
+        <p:nvPr/>
+      </p:nvGrpSpPr>
+      <p:grpSpPr>
+        <a:xfrm>
+          <a:off x="0" y="0"/>
+          <a:ext cx="0" cy="0"/>
+          <a:chOff x="0" y="0"/>
+          <a:chExt cx="0" cy="0"/>
+        </a:xfrm>
+      </p:grpSpPr>
+      <p:sp>
+        <p:nvSpPr>
+          <p:cNvPr id="2" name="Title 1"/>
+          <p:cNvSpPr>
+            <a:spLocks noGrp="1"/>
+          </p:cNvSpPr>
+          <p:nvPr>
+            <p:ph type="title"/>
+          </p:nvPr>
+        </p:nvSpPr>
+        <p:spPr/>
+        <p:txBody>
+          <a:bodyPr>
+            <a:normAutofit fontScale="90000"/>
+          </a:bodyPr>
+          <a:lstStyle/>
+          <a:p>
+            <a:r>
+              <a:rPr lang="en-US" dirty="0" smtClean="0"/>
+              <a:t>I’m an Improver</a:t>
+            </a:r>
+            <a:endParaRPr lang="en-US" dirty="0"/>
+          </a:p>
+        </p:txBody>
+      </p:sp>
+      <p:sp>
+        <p:nvSpPr>
+          <p:cNvPr id="3" name="Content Placeholder 2"/>
+          <p:cNvSpPr>
+            <a:spLocks noGrp="1"/>
+          </p:cNvSpPr>
+          <p:nvPr>
+            <p:ph idx="1"/>
+          </p:nvPr>
+        </p:nvSpPr>
+        <p:spPr>
+          <a:ln>
+            <a:noFill/>
+          </a:ln>
+        </p:spPr>
+        <p:txBody>
+          <a:bodyPr>
+            <a:normAutofit/>
+          </a:bodyPr>
+          <a:lstStyle/>
+          <a:p>
+            <a:r>
+              <a:rPr lang="en-US" sz="2100" dirty="0"/>
+              <a:t>Principal Consultant with Improving Enterprises</a:t>
+            </a:r>
+          </a:p>
+          <a:p>
+            <a:r>
+              <a:rPr lang="en-US" sz="2100" dirty="0"/>
+              <a:t>We’re hiring (Attitude and Aptitude)</a:t>
+            </a:r>
+          </a:p>
+          <a:p>
+            <a:r>
+              <a:rPr lang="en-US" sz="2100" dirty="0"/>
+              <a:t>You should totally call me, bro:  </a:t>
+            </a:r>
+            <a:r>
+              <a:rPr lang="en-US" sz="2100" b="1" dirty="0"/>
+              <a:t>214-578-9217</a:t>
+            </a:r>
+          </a:p>
+          <a:p>
+            <a:r>
+              <a:rPr lang="en-US" sz="2100" dirty="0"/>
+              <a:t>Or email: </a:t>
+            </a:r>
+            <a:r>
+              <a:rPr lang="en-US" sz="2100" b="1" dirty="0" smtClean="0">
+                <a:hlinkClick r:id="rId2"/>
+              </a:rPr>
+              <a:t>eric.burcham@improvingenterprises.com</a:t>
+            </a:r>
+            <a:endParaRPr lang="en-US" sz="2100" b="1" dirty="0"/>
+          </a:p>
+          <a:p>
+            <a:r>
+              <a:rPr lang="en-US" sz="2100" dirty="0"/>
+              <a:t>We have a website: </a:t>
+            </a:r>
+            <a:r>
+              <a:rPr lang="en-US" sz="2100" b="1" dirty="0">
+                <a:hlinkClick r:id="rId3"/>
+              </a:rPr>
+              <a:t>www.improvingenterprises.com</a:t>
+            </a:r>
+            <a:endParaRPr lang="en-US" sz="2100" b="1" dirty="0"/>
+          </a:p>
+          <a:p>
+            <a:endParaRPr lang="en-US" sz="2100" dirty="0"/>
+          </a:p>
+        </p:txBody>
+      </p:sp>
+      <p:pic>
+        <p:nvPicPr>
+          <p:cNvPr id="4" name="Picture 3"/>
+          <p:cNvPicPr>
+            <a:picLocks noChangeAspect="1"/>
+          </p:cNvPicPr>
+          <p:nvPr/>
+        </p:nvPicPr>
+        <p:blipFill>
+          <a:blip r:embed="rId4"/>
+          <a:stretch>
+            <a:fillRect/>
+          </a:stretch>
+        </p:blipFill>
+        <p:spPr>
+          <a:xfrm>
+            <a:off x="4989871" y="3483058"/>
+            <a:ext cx="2668231" cy="1111565"/>
+          </a:xfrm>
+          <a:prstGeom prst="rect">
+            <a:avLst/>
+          </a:prstGeom>
+          <a:ln>
+            <a:solidFill>
+              <a:schemeClr val="tx1"/>
+            </a:solidFill>
+          </a:ln>
+          <a:effectLst>
+            <a:outerShdw blurRad="50800" dist="38100" dir="2700000" algn="tl" rotWithShape="0">
+              <a:prstClr val="black">
+                <a:alpha val="40000"/>
+              </a:prstClr>
+            </a:outerShdw>
+          </a:effectLst>
+        </p:spPr>
+      </p:pic>
+      <p:sp>
+        <p:nvSpPr>
+          <p:cNvPr id="6" name="Right Arrow 5"/>
+          <p:cNvSpPr/>
+          <p:nvPr/>
+        </p:nvSpPr>
+        <p:spPr>
+          <a:xfrm>
+            <a:off x="1859993" y="3483058"/>
+            <a:ext cx="2925927" cy="1111565"/>
+          </a:xfrm>
+          <a:prstGeom prst="rightArrow">
+            <a:avLst/>
+          </a:prstGeom>
+        </p:spPr>
+        <p:style>
+          <a:lnRef idx="1">
+            <a:schemeClr val="accent2"/>
+          </a:lnRef>
+          <a:fillRef idx="3">
+            <a:schemeClr val="accent2"/>
+          </a:fillRef>
+          <a:effectRef idx="2">
+            <a:schemeClr val="accent2"/>
+          </a:effectRef>
+          <a:fontRef idx="minor">
+            <a:schemeClr val="lt1"/>
+          </a:fontRef>
+        </p:style>
+        <p:txBody>
+          <a:bodyPr rtlCol="0" anchor="ctr"/>
+          <a:lstStyle/>
+          <a:p>
+            <a:pPr algn="ctr"/>
+            <a:r>
+              <a:rPr lang="en-US" sz="1350" dirty="0"/>
+              <a:t>Go Now!!!</a:t>
+            </a:r>
+          </a:p>
+        </p:txBody>
+      </p:sp>
+    </p:spTree>
+    <p:extLst>
+      <p:ext uri="{BB962C8B-B14F-4D97-AF65-F5344CB8AC3E}">
+        <p14:creationId xmlns:p14="http://schemas.microsoft.com/office/powerpoint/2010/main" val="3475792369"/>
+      </p:ext>
+    </p:extLst>
+  </p:cSld>
+  <p:clrMapOvr>
+    <a:masterClrMapping/>
+  </p:clrMapOvr>
+  <p:timing>
+    <p:tnLst>
+      <p:par>
+        <p:cTn id="1" dur="indefinite" restart="never" nodeType="tmRoot"/>
+      </p:par>
+    </p:tnLst>
+  </p:timing>
+</p:sld>
+</file>
+
+<file path=ppt/slides/slide40.xml><?xml version="1.0" encoding="utf-8"?>
+<p:sld xmlns:a="http://schemas.openxmlformats.org/drawingml/2006/main" xmlns:r="http://schemas.openxmlformats.org/officeDocument/2006/relationships" xmlns:p="http://schemas.openxmlformats.org/presentationml/2006/main">
+  <p:cSld>
+    <p:spTree>
+      <p:nvGrpSpPr>
+        <p:cNvPr id="1" name=""/>
+        <p:cNvGrpSpPr/>
+        <p:nvPr/>
+      </p:nvGrpSpPr>
+      <p:grpSpPr>
+        <a:xfrm>
+          <a:off x="0" y="0"/>
+          <a:ext cx="0" cy="0"/>
+          <a:chOff x="0" y="0"/>
+          <a:chExt cx="0" cy="0"/>
+        </a:xfrm>
+      </p:grpSpPr>
+      <p:sp>
+        <p:nvSpPr>
+          <p:cNvPr id="2" name="Title 1"/>
+          <p:cNvSpPr>
+            <a:spLocks noGrp="1"/>
+          </p:cNvSpPr>
+          <p:nvPr>
+            <p:ph type="title"/>
+          </p:nvPr>
+        </p:nvSpPr>
+        <p:spPr/>
+        <p:txBody>
+          <a:bodyPr>
+            <a:normAutofit fontScale="90000"/>
+          </a:bodyPr>
+          <a:lstStyle/>
+          <a:p>
+            <a:r>
+              <a:rPr lang="en-US" dirty="0" smtClean="0"/>
               <a:t>We’re Hiring</a:t>
             </a:r>
             <a:endParaRPr lang="en-US" dirty="0"/>
@@ -19516,7 +19670,7 @@
 </p:sld>
 </file>
 
-<file path=ppt/slides/slide4.xml><?xml version="1.0" encoding="utf-8"?>
+<file path=ppt/slides/slide5.xml><?xml version="1.0" encoding="utf-8"?>
 <p:sld xmlns:a="http://schemas.openxmlformats.org/drawingml/2006/main" xmlns:r="http://schemas.openxmlformats.org/officeDocument/2006/relationships" xmlns:p="http://schemas.openxmlformats.org/presentationml/2006/main">
   <p:cSld>
     <p:bg>
@@ -19972,7 +20126,7 @@
 </p:sld>
 </file>
 
-<file path=ppt/slides/slide5.xml><?xml version="1.0" encoding="utf-8"?>
+<file path=ppt/slides/slide6.xml><?xml version="1.0" encoding="utf-8"?>
 <p:sld xmlns:a="http://schemas.openxmlformats.org/drawingml/2006/main" xmlns:r="http://schemas.openxmlformats.org/officeDocument/2006/relationships" xmlns:p="http://schemas.openxmlformats.org/presentationml/2006/main">
   <p:cSld>
     <p:spTree>
@@ -20134,130 +20288,6 @@
 </p:sld>
 </file>
 
-<file path=ppt/slides/slide6.xml><?xml version="1.0" encoding="utf-8"?>
-<p:sld xmlns:a="http://schemas.openxmlformats.org/drawingml/2006/main" xmlns:r="http://schemas.openxmlformats.org/officeDocument/2006/relationships" xmlns:p="http://schemas.openxmlformats.org/presentationml/2006/main">
-  <p:cSld>
-    <p:spTree>
-      <p:nvGrpSpPr>
-        <p:cNvPr id="1" name=""/>
-        <p:cNvGrpSpPr/>
-        <p:nvPr/>
-      </p:nvGrpSpPr>
-      <p:grpSpPr>
-        <a:xfrm>
-          <a:off x="0" y="0"/>
-          <a:ext cx="0" cy="0"/>
-          <a:chOff x="0" y="0"/>
-          <a:chExt cx="0" cy="0"/>
-        </a:xfrm>
-      </p:grpSpPr>
-      <p:sp>
-        <p:nvSpPr>
-          <p:cNvPr id="2" name="Title 1"/>
-          <p:cNvSpPr>
-            <a:spLocks noGrp="1"/>
-          </p:cNvSpPr>
-          <p:nvPr>
-            <p:ph type="title"/>
-          </p:nvPr>
-        </p:nvSpPr>
-        <p:spPr/>
-        <p:txBody>
-          <a:bodyPr>
-            <a:normAutofit fontScale="90000"/>
-          </a:bodyPr>
-          <a:lstStyle/>
-          <a:p>
-            <a:r>
-              <a:rPr lang="en-US" dirty="0" err="1" smtClean="0"/>
-              <a:t>Broism</a:t>
-            </a:r>
-            <a:r>
-              <a:rPr lang="en-US" dirty="0" smtClean="0"/>
-              <a:t>: </a:t>
-            </a:r>
-            <a:r>
-              <a:rPr lang="en-US" dirty="0" err="1" smtClean="0"/>
-              <a:t>Bilbro</a:t>
-            </a:r>
-            <a:r>
-              <a:rPr lang="en-US" dirty="0" smtClean="0"/>
-              <a:t> Baggins</a:t>
-            </a:r>
-            <a:endParaRPr lang="en-US" dirty="0"/>
-          </a:p>
-        </p:txBody>
-      </p:sp>
-      <p:sp>
-        <p:nvSpPr>
-          <p:cNvPr id="3" name="Content Placeholder 2"/>
-          <p:cNvSpPr>
-            <a:spLocks noGrp="1"/>
-          </p:cNvSpPr>
-          <p:nvPr>
-            <p:ph idx="1"/>
-          </p:nvPr>
-        </p:nvSpPr>
-        <p:spPr/>
-        <p:txBody>
-          <a:bodyPr/>
-          <a:lstStyle/>
-          <a:p>
-            <a:pPr marL="0" indent="0">
-              <a:buNone/>
-            </a:pPr>
-            <a:r>
-              <a:rPr lang="en-US" b="1" dirty="0" err="1"/>
-              <a:t>Bilbro</a:t>
-            </a:r>
-            <a:r>
-              <a:rPr lang="en-US" b="1" dirty="0"/>
-              <a:t> </a:t>
-            </a:r>
-            <a:r>
-              <a:rPr lang="en-US" b="1" dirty="0" smtClean="0"/>
-              <a:t>Baggins</a:t>
-            </a:r>
-            <a:r>
-              <a:rPr lang="en-US" dirty="0" smtClean="0"/>
-              <a:t>:  Your bro who is obsessed with Lord of the Rings.  Example:  Joe has seen the twin towers like 5 times.  He’s such a </a:t>
-            </a:r>
-            <a:r>
-              <a:rPr lang="en-US" i="1" dirty="0" err="1" smtClean="0"/>
-              <a:t>Bilbro</a:t>
-            </a:r>
-            <a:r>
-              <a:rPr lang="en-US" i="1" dirty="0" smtClean="0"/>
-              <a:t> Baggins</a:t>
-            </a:r>
-            <a:r>
-              <a:rPr lang="en-US" dirty="0" smtClean="0"/>
-              <a:t>.</a:t>
-            </a:r>
-            <a:endParaRPr lang="en-US" dirty="0"/>
-          </a:p>
-        </p:txBody>
-      </p:sp>
-    </p:spTree>
-    <p:extLst>
-      <p:ext uri="{BB962C8B-B14F-4D97-AF65-F5344CB8AC3E}">
-        <p14:creationId xmlns:p14="http://schemas.microsoft.com/office/powerpoint/2010/main" val="263428660"/>
-      </p:ext>
-    </p:extLst>
-  </p:cSld>
-  <p:clrMapOvr>
-    <a:masterClrMapping/>
-  </p:clrMapOvr>
-  <p:timing>
-    <p:tnLst>
-      <p:par>
-        <p:cTn id="1" dur="indefinite" restart="never" nodeType="tmRoot"/>
-      </p:par>
-    </p:tnLst>
-  </p:timing>
-</p:sld>
-</file>
-
 <file path=ppt/slides/slide7.xml><?xml version="1.0" encoding="utf-8"?>
 <p:sld xmlns:a="http://schemas.openxmlformats.org/drawingml/2006/main" xmlns:r="http://schemas.openxmlformats.org/officeDocument/2006/relationships" xmlns:p="http://schemas.openxmlformats.org/presentationml/2006/main">
   <p:cSld>
@@ -20293,8 +20323,20 @@
           <a:lstStyle/>
           <a:p>
             <a:r>
+              <a:rPr lang="en-US" dirty="0" err="1" smtClean="0"/>
+              <a:t>Broism</a:t>
+            </a:r>
+            <a:r>
               <a:rPr lang="en-US" dirty="0" smtClean="0"/>
-              <a:t>Overview</a:t>
+              <a:t>: </a:t>
+            </a:r>
+            <a:r>
+              <a:rPr lang="en-US" dirty="0" err="1" smtClean="0"/>
+              <a:t>Bilbro</a:t>
+            </a:r>
+            <a:r>
+              <a:rPr lang="en-US" dirty="0" smtClean="0"/>
+              <a:t> Baggins</a:t>
             </a:r>
             <a:endParaRPr lang="en-US" dirty="0"/>
           </a:p>
@@ -20312,67 +20354,40 @@
         </p:nvSpPr>
         <p:spPr/>
         <p:txBody>
-          <a:bodyPr>
-            <a:normAutofit/>
-          </a:bodyPr>
+          <a:bodyPr/>
           <a:lstStyle/>
           <a:p>
+            <a:pPr marL="0" indent="0">
+              <a:buNone/>
+            </a:pPr>
+            <a:r>
+              <a:rPr lang="en-US" b="1" dirty="0" err="1"/>
+              <a:t>Bilbro</a:t>
+            </a:r>
+            <a:r>
+              <a:rPr lang="en-US" b="1" dirty="0"/>
+              <a:t> </a:t>
+            </a:r>
+            <a:r>
+              <a:rPr lang="en-US" b="1" dirty="0" smtClean="0"/>
+              <a:t>Baggins</a:t>
+            </a:r>
             <a:r>
               <a:rPr lang="en-US" dirty="0" smtClean="0"/>
-              <a:t>Lots of bad jokes (I can’t help it).</a:t>
-            </a:r>
-          </a:p>
-          <a:p>
+              <a:t>:  Your bro who is obsessed with Lord of the Rings.  Example:  Joe has seen the twin towers like 5 times.  He’s such a </a:t>
+            </a:r>
+            <a:r>
+              <a:rPr lang="en-US" i="1" dirty="0" err="1" smtClean="0"/>
+              <a:t>Bilbro</a:t>
+            </a:r>
+            <a:r>
+              <a:rPr lang="en-US" i="1" dirty="0" smtClean="0"/>
+              <a:t> Baggins</a:t>
+            </a:r>
             <a:r>
               <a:rPr lang="en-US" dirty="0" smtClean="0"/>
-              <a:t>When to use threads.</a:t>
-            </a:r>
-          </a:p>
-          <a:p>
-            <a:r>
-              <a:rPr lang="en-US" dirty="0" smtClean="0"/>
-              <a:t>Basics of multi-threading in </a:t>
-            </a:r>
-            <a:r>
-              <a:rPr lang="en-US" dirty="0" err="1" smtClean="0"/>
-              <a:t>.Net</a:t>
-            </a:r>
-            <a:endParaRPr lang="en-US" dirty="0" smtClean="0"/>
-          </a:p>
-          <a:p>
-            <a:r>
-              <a:rPr lang="en-US" dirty="0" smtClean="0"/>
-              <a:t>Multi-threaded programming patterns</a:t>
-            </a:r>
-          </a:p>
-          <a:p>
-            <a:r>
-              <a:rPr lang="en-US" dirty="0" smtClean="0"/>
-              <a:t>Parallel </a:t>
-            </a:r>
-            <a:r>
-              <a:rPr lang="en-US" dirty="0" err="1" smtClean="0"/>
-              <a:t>Linq</a:t>
-            </a:r>
-            <a:endParaRPr lang="en-US" dirty="0" smtClean="0"/>
-          </a:p>
-          <a:p>
-            <a:r>
-              <a:rPr lang="en-US" dirty="0" smtClean="0"/>
-              <a:t>Task Parallel Library</a:t>
-            </a:r>
-          </a:p>
-          <a:p>
-            <a:r>
-              <a:rPr lang="en-US" dirty="0" err="1" smtClean="0"/>
-              <a:t>Async</a:t>
-            </a:r>
-            <a:r>
-              <a:rPr lang="en-US" dirty="0" smtClean="0"/>
-              <a:t> Controllers (and why they matter)</a:t>
-            </a:r>
-          </a:p>
-          <a:p>
+              <a:t>.</a:t>
+            </a:r>
             <a:endParaRPr lang="en-US" dirty="0"/>
           </a:p>
         </p:txBody>
@@ -20380,7 +20395,7 @@
     </p:spTree>
     <p:extLst>
       <p:ext uri="{BB962C8B-B14F-4D97-AF65-F5344CB8AC3E}">
-        <p14:creationId xmlns:p14="http://schemas.microsoft.com/office/powerpoint/2010/main" val="2696668645"/>
+        <p14:creationId xmlns:p14="http://schemas.microsoft.com/office/powerpoint/2010/main" val="263428660"/>
       </p:ext>
     </p:extLst>
   </p:cSld>
@@ -20433,7 +20448,7 @@
           <a:p>
             <a:r>
               <a:rPr lang="en-US" dirty="0" smtClean="0"/>
-              <a:t>Lame Joke</a:t>
+              <a:t>Overview</a:t>
             </a:r>
             <a:endParaRPr lang="en-US" dirty="0"/>
           </a:p>
@@ -20451,16 +20466,67 @@
         </p:nvSpPr>
         <p:spPr/>
         <p:txBody>
-          <a:bodyPr/>
+          <a:bodyPr>
+            <a:normAutofit/>
+          </a:bodyPr>
           <a:lstStyle/>
           <a:p>
-            <a:pPr marL="0" indent="0">
-              <a:buNone/>
-            </a:pPr>
             <a:r>
               <a:rPr lang="en-US" dirty="0" smtClean="0"/>
-              <a:t>Why is it so hard to explain puns to kleptomaniacs?</a:t>
-            </a:r>
+              <a:t>Lots of bad jokes (I can’t help it).</a:t>
+            </a:r>
+          </a:p>
+          <a:p>
+            <a:r>
+              <a:rPr lang="en-US" dirty="0" smtClean="0"/>
+              <a:t>When to use threads.</a:t>
+            </a:r>
+          </a:p>
+          <a:p>
+            <a:r>
+              <a:rPr lang="en-US" dirty="0" smtClean="0"/>
+              <a:t>Basics of multi-threading in </a:t>
+            </a:r>
+            <a:r>
+              <a:rPr lang="en-US" dirty="0" err="1" smtClean="0"/>
+              <a:t>.Net</a:t>
+            </a:r>
+            <a:endParaRPr lang="en-US" dirty="0" smtClean="0"/>
+          </a:p>
+          <a:p>
+            <a:r>
+              <a:rPr lang="en-US" dirty="0" smtClean="0"/>
+              <a:t>Multi-threaded programming patterns</a:t>
+            </a:r>
+          </a:p>
+          <a:p>
+            <a:r>
+              <a:rPr lang="en-US" dirty="0" smtClean="0"/>
+              <a:t>Parallel </a:t>
+            </a:r>
+            <a:r>
+              <a:rPr lang="en-US" dirty="0" err="1" smtClean="0"/>
+              <a:t>Linq</a:t>
+            </a:r>
+            <a:endParaRPr lang="en-US" dirty="0" smtClean="0"/>
+          </a:p>
+          <a:p>
+            <a:r>
+              <a:rPr lang="en-US" dirty="0" smtClean="0"/>
+              <a:t>Task Parallel Library</a:t>
+            </a:r>
+          </a:p>
+          <a:p>
+            <a:r>
+              <a:rPr lang="en-US" dirty="0" err="1" smtClean="0"/>
+              <a:t>Async</a:t>
+            </a:r>
+            <a:r>
+              <a:rPr lang="en-US" dirty="0" smtClean="0"/>
+              <a:t> Controllers (and why they matter)</a:t>
+            </a:r>
+          </a:p>
+          <a:p>
             <a:endParaRPr lang="en-US" dirty="0"/>
           </a:p>
         </p:txBody>
@@ -20468,7 +20534,7 @@
     </p:spTree>
     <p:extLst>
       <p:ext uri="{BB962C8B-B14F-4D97-AF65-F5344CB8AC3E}">
-        <p14:creationId xmlns:p14="http://schemas.microsoft.com/office/powerpoint/2010/main" val="1553533057"/>
+        <p14:creationId xmlns:p14="http://schemas.microsoft.com/office/powerpoint/2010/main" val="2696668645"/>
       </p:ext>
     </p:extLst>
   </p:cSld>
@@ -20504,7 +20570,7 @@
       </p:grpSpPr>
       <p:sp>
         <p:nvSpPr>
-          <p:cNvPr id="4" name="Title 3"/>
+          <p:cNvPr id="2" name="Title 1"/>
           <p:cNvSpPr>
             <a:spLocks noGrp="1"/>
           </p:cNvSpPr>
@@ -20521,7 +20587,7 @@
           <a:p>
             <a:r>
               <a:rPr lang="en-US" dirty="0" smtClean="0"/>
-              <a:t>When to Use Multi-threading</a:t>
+              <a:t>Lame Joke</a:t>
             </a:r>
             <a:endParaRPr lang="en-US" dirty="0"/>
           </a:p>
@@ -20529,7 +20595,7 @@
       </p:sp>
       <p:sp>
         <p:nvSpPr>
-          <p:cNvPr id="9" name="Content Placeholder 8"/>
+          <p:cNvPr id="3" name="Content Placeholder 2"/>
           <p:cNvSpPr>
             <a:spLocks noGrp="1"/>
           </p:cNvSpPr>
@@ -20539,34 +20605,24 @@
         </p:nvSpPr>
         <p:spPr/>
         <p:txBody>
-          <a:bodyPr>
-            <a:normAutofit/>
-          </a:bodyPr>
+          <a:bodyPr/>
           <a:lstStyle/>
           <a:p>
+            <a:pPr marL="0" indent="0">
+              <a:buNone/>
+            </a:pPr>
             <a:r>
               <a:rPr lang="en-US" dirty="0" smtClean="0"/>
-              <a:t>Application is CPU bound and not using all cores.  The task manager tells the story.</a:t>
-            </a:r>
-          </a:p>
-          <a:p>
-            <a:r>
-              <a:rPr lang="en-US" dirty="0" smtClean="0"/>
-              <a:t>Application is waiting on external resources that can be loaded in parallel.</a:t>
-            </a:r>
-          </a:p>
-          <a:p>
-            <a:r>
-              <a:rPr lang="en-US" dirty="0" smtClean="0"/>
-              <a:t>Only when the benefits outweigh the costs.</a:t>
-            </a:r>
+              <a:t>Why is it so hard to explain puns to kleptomaniacs?</a:t>
+            </a:r>
+            <a:endParaRPr lang="en-US" dirty="0"/>
           </a:p>
         </p:txBody>
       </p:sp>
     </p:spTree>
     <p:extLst>
       <p:ext uri="{BB962C8B-B14F-4D97-AF65-F5344CB8AC3E}">
-        <p14:creationId xmlns:p14="http://schemas.microsoft.com/office/powerpoint/2010/main" val="729225566"/>
+        <p14:creationId xmlns:p14="http://schemas.microsoft.com/office/powerpoint/2010/main" val="1553533057"/>
       </p:ext>
     </p:extLst>
   </p:cSld>
@@ -20902,7 +20958,7 @@
   <a:extraClrSchemeLst/>
   <a:extLst>
     <a:ext uri="{05A4C25C-085E-4340-85A3-A5531E510DB2}">
-      <thm15:themeFamily xmlns:thm15="http://schemas.microsoft.com/office/thememl/2012/main" name="2013 Improving ppt template [Read-Only]" id="{9CD52372-1ABB-429C-AE8B-5116A847D281}" vid="{C9E045ED-5E7D-45F0-ABC2-8913C89F506A}"/>
+      <thm15:themeFamily xmlns:thm15="http://schemas.microsoft.com/office/thememl/2012/main" xmlns="" name="2013 Improving ppt template [Read-Only]" id="{9CD52372-1ABB-429C-AE8B-5116A847D281}" vid="{C9E045ED-5E7D-45F0-ABC2-8913C89F506A}"/>
     </a:ext>
   </a:extLst>
 </a:theme>
@@ -21163,16 +21219,19 @@
   <a:extraClrSchemeLst/>
   <a:extLst>
     <a:ext uri="{05A4C25C-085E-4340-85A3-A5531E510DB2}">
-      <thm15:themeFamily xmlns:thm15="http://schemas.microsoft.com/office/thememl/2012/main" name="Office Theme" id="{62F939B6-93AF-4DB8-9C6B-D6C7DFDC589F}" vid="{4A3C46E8-61CC-4603-A589-7422A47A8E4A}"/>
+      <thm15:themeFamily xmlns:thm15="http://schemas.microsoft.com/office/thememl/2012/main" xmlns="" name="Office Theme" id="{62F939B6-93AF-4DB8-9C6B-D6C7DFDC589F}" vid="{4A3C46E8-61CC-4603-A589-7422A47A8E4A}"/>
     </a:ext>
   </a:extLst>
 </a:theme>
 </file>
 
 <file path=customXml/item1.xml><?xml version="1.0" encoding="utf-8"?>
-<p:properties xmlns:p="http://schemas.microsoft.com/office/2006/metadata/properties" xmlns:xsi="http://www.w3.org/2001/XMLSchema-instance" xmlns:pc="http://schemas.microsoft.com/office/infopath/2007/PartnerControls">
-  <documentManagement/>
-</p:properties>
+<?mso-contentType ?>
+<FormTemplates xmlns="http://schemas.microsoft.com/sharepoint/v3/contenttype/forms">
+  <Display>DocumentLibraryForm</Display>
+  <Edit>DocumentLibraryForm</Edit>
+  <New>DocumentLibraryForm</New>
+</FormTemplates>
 </file>
 
 <file path=customXml/item2.xml><?xml version="1.0" encoding="utf-8"?>
@@ -21290,25 +21349,15 @@
 </file>
 
 <file path=customXml/item3.xml><?xml version="1.0" encoding="utf-8"?>
-<?mso-contentType ?>
-<FormTemplates xmlns="http://schemas.microsoft.com/sharepoint/v3/contenttype/forms">
-  <Display>DocumentLibraryForm</Display>
-  <Edit>DocumentLibraryForm</Edit>
-  <New>DocumentLibraryForm</New>
-</FormTemplates>
+<p:properties xmlns:p="http://schemas.microsoft.com/office/2006/metadata/properties" xmlns:xsi="http://www.w3.org/2001/XMLSchema-instance" xmlns:pc="http://schemas.microsoft.com/office/infopath/2007/PartnerControls">
+  <documentManagement/>
+</p:properties>
 </file>
 
 <file path=customXml/itemProps1.xml><?xml version="1.0" encoding="utf-8"?>
-<ds:datastoreItem xmlns:ds="http://schemas.openxmlformats.org/officeDocument/2006/customXml" ds:itemID="{A04551C0-1604-41A0-9B5C-A5F88AD2E0FE}">
+<ds:datastoreItem xmlns:ds="http://schemas.openxmlformats.org/officeDocument/2006/customXml" ds:itemID="{B857AB07-B2ED-439E-860F-4F56FB345D1B}">
   <ds:schemaRefs>
-    <ds:schemaRef ds:uri="http://schemas.microsoft.com/office/infopath/2007/PartnerControls"/>
-    <ds:schemaRef ds:uri="http://purl.org/dc/elements/1.1/"/>
-    <ds:schemaRef ds:uri="http://schemas.microsoft.com/office/2006/metadata/properties"/>
-    <ds:schemaRef ds:uri="http://purl.org/dc/terms/"/>
-    <ds:schemaRef ds:uri="http://schemas.openxmlformats.org/package/2006/metadata/core-properties"/>
-    <ds:schemaRef ds:uri="http://schemas.microsoft.com/office/2006/documentManagement/types"/>
-    <ds:schemaRef ds:uri="http://www.w3.org/XML/1998/namespace"/>
-    <ds:schemaRef ds:uri="http://purl.org/dc/dcmitype/"/>
+    <ds:schemaRef ds:uri="http://schemas.microsoft.com/sharepoint/v3/contenttype/forms"/>
   </ds:schemaRefs>
 </ds:datastoreItem>
 </file>
@@ -21330,9 +21379,16 @@
 </file>
 
 <file path=customXml/itemProps3.xml><?xml version="1.0" encoding="utf-8"?>
-<ds:datastoreItem xmlns:ds="http://schemas.openxmlformats.org/officeDocument/2006/customXml" ds:itemID="{B857AB07-B2ED-439E-860F-4F56FB345D1B}">
+<ds:datastoreItem xmlns:ds="http://schemas.openxmlformats.org/officeDocument/2006/customXml" ds:itemID="{A04551C0-1604-41A0-9B5C-A5F88AD2E0FE}">
   <ds:schemaRefs>
-    <ds:schemaRef ds:uri="http://schemas.microsoft.com/sharepoint/v3/contenttype/forms"/>
+    <ds:schemaRef ds:uri="http://schemas.microsoft.com/office/infopath/2007/PartnerControls"/>
+    <ds:schemaRef ds:uri="http://purl.org/dc/elements/1.1/"/>
+    <ds:schemaRef ds:uri="http://schemas.microsoft.com/office/2006/metadata/properties"/>
+    <ds:schemaRef ds:uri="http://purl.org/dc/terms/"/>
+    <ds:schemaRef ds:uri="http://schemas.openxmlformats.org/package/2006/metadata/core-properties"/>
+    <ds:schemaRef ds:uri="http://schemas.microsoft.com/office/2006/documentManagement/types"/>
+    <ds:schemaRef ds:uri="http://www.w3.org/XML/1998/namespace"/>
+    <ds:schemaRef ds:uri="http://purl.org/dc/dcmitype/"/>
   </ds:schemaRefs>
 </ds:datastoreItem>
 </file>
</xml_diff>

<commit_message>
Added TBird example to warm-up slide...
</commit_message>
<xml_diff>
--- a/Presentation/THasINKync.pptx
+++ b/Presentation/THasINKync.pptx
@@ -146,7 +146,7 @@
   </p:defaultTextStyle>
   <p:extLst>
     <p:ext uri="{EFAFB233-063F-42B5-8137-9DF3F51BA10A}">
-      <p15:sldGuideLst xmlns:p15="http://schemas.microsoft.com/office/powerpoint/2012/main" xmlns="">
+      <p15:sldGuideLst xmlns:p15="http://schemas.microsoft.com/office/powerpoint/2012/main">
         <p15:guide id="1" orient="horz" pos="1620" userDrawn="1">
           <p15:clr>
             <a:srgbClr val="A4A3A4"/>
@@ -15084,7 +15084,1705 @@
           <a:p>
             <a:r>
               <a:rPr lang="en-US" dirty="0" smtClean="0"/>
-              <a:t>Just For Fun…</a:t>
+              <a:t>Warm Up Your Internal Compiler…</a:t>
+            </a:r>
+            <a:endParaRPr lang="en-US" dirty="0"/>
+          </a:p>
+        </p:txBody>
+      </p:sp>
+      <p:sp>
+        <p:nvSpPr>
+          <p:cNvPr id="6" name="Rectangle 3"/>
+          <p:cNvSpPr>
+            <a:spLocks noChangeArrowheads="1"/>
+          </p:cNvSpPr>
+          <p:nvPr/>
+        </p:nvSpPr>
+        <p:spPr bwMode="auto">
+          <a:xfrm>
+            <a:off x="0" y="2233791"/>
+            <a:ext cx="184731" cy="584775"/>
+          </a:xfrm>
+          <a:prstGeom prst="rect">
+            <a:avLst/>
+          </a:prstGeom>
+          <a:solidFill>
+            <a:srgbClr val="FFFFFF"/>
+          </a:solidFill>
+          <a:ln>
+            <a:noFill/>
+          </a:ln>
+          <a:effectLst/>
+          <a:extLst>
+            <a:ext uri="{91240B29-F687-4F45-9708-019B960494DF}">
+              <a14:hiddenLine xmlns:a14="http://schemas.microsoft.com/office/drawing/2010/main" w="9525">
+                <a:solidFill>
+                  <a:schemeClr val="tx1"/>
+                </a:solidFill>
+                <a:miter lim="800000"/>
+                <a:headEnd/>
+                <a:tailEnd/>
+              </a14:hiddenLine>
+            </a:ext>
+            <a:ext uri="{AF507438-7753-43E0-B8FC-AC1667EBCBE1}">
+              <a14:hiddenEffects xmlns:a14="http://schemas.microsoft.com/office/drawing/2010/main">
+                <a:effectLst>
+                  <a:outerShdw dist="35921" dir="2700000" algn="ctr" rotWithShape="0">
+                    <a:schemeClr val="bg2"/>
+                  </a:outerShdw>
+                </a:effectLst>
+              </a14:hiddenEffects>
+            </a:ext>
+          </a:extLst>
+        </p:spPr>
+        <p:txBody>
+          <a:bodyPr vert="horz" wrap="none" lIns="91440" tIns="45720" rIns="91440" bIns="45720" numCol="1" anchor="ctr" anchorCtr="0" compatLnSpc="1">
+            <a:prstTxWarp prst="textNoShape">
+              <a:avLst/>
+            </a:prstTxWarp>
+            <a:spAutoFit/>
+          </a:bodyPr>
+          <a:lstStyle/>
+          <a:p>
+            <a:pPr marL="0" marR="0" lvl="0" indent="0" algn="l" defTabSz="914400" rtl="0" eaLnBrk="0" fontAlgn="base" latinLnBrk="0" hangingPunct="0">
+              <a:lnSpc>
+                <a:spcPct val="100000"/>
+              </a:lnSpc>
+              <a:spcBef>
+                <a:spcPct val="0"/>
+              </a:spcBef>
+              <a:spcAft>
+                <a:spcPct val="0"/>
+              </a:spcAft>
+              <a:buClrTx/>
+              <a:buSzTx/>
+              <a:buFontTx/>
+              <a:buNone/>
+              <a:tabLst/>
+            </a:pPr>
+            <a:endParaRPr kumimoji="0" lang="en-US" altLang="en-US" sz="3200" b="0" i="0" u="none" strike="noStrike" cap="none" normalizeH="0" baseline="0" dirty="0" smtClean="0">
+              <a:ln>
+                <a:noFill/>
+              </a:ln>
+              <a:solidFill>
+                <a:schemeClr val="tx1"/>
+              </a:solidFill>
+              <a:effectLst/>
+              <a:latin typeface="Arial" panose="020B0604020202020204" pitchFamily="34" charset="0"/>
+            </a:endParaRPr>
+          </a:p>
+        </p:txBody>
+      </p:sp>
+      <p:sp>
+        <p:nvSpPr>
+          <p:cNvPr id="7" name="Rectangle 4"/>
+          <p:cNvSpPr>
+            <a:spLocks noChangeArrowheads="1"/>
+          </p:cNvSpPr>
+          <p:nvPr/>
+        </p:nvSpPr>
+        <p:spPr bwMode="auto">
+          <a:xfrm>
+            <a:off x="0" y="540690"/>
+            <a:ext cx="4942379" cy="4154984"/>
+          </a:xfrm>
+          <a:prstGeom prst="rect">
+            <a:avLst/>
+          </a:prstGeom>
+          <a:solidFill>
+            <a:srgbClr val="FFFFFF"/>
+          </a:solidFill>
+          <a:ln>
+            <a:noFill/>
+          </a:ln>
+          <a:effectLst/>
+          <a:extLst>
+            <a:ext uri="{91240B29-F687-4F45-9708-019B960494DF}">
+              <a14:hiddenLine xmlns:a14="http://schemas.microsoft.com/office/drawing/2010/main" w="9525">
+                <a:solidFill>
+                  <a:schemeClr val="tx1"/>
+                </a:solidFill>
+                <a:miter lim="800000"/>
+                <a:headEnd/>
+                <a:tailEnd/>
+              </a14:hiddenLine>
+            </a:ext>
+            <a:ext uri="{AF507438-7753-43E0-B8FC-AC1667EBCBE1}">
+              <a14:hiddenEffects xmlns:a14="http://schemas.microsoft.com/office/drawing/2010/main">
+                <a:effectLst>
+                  <a:outerShdw dist="35921" dir="2700000" algn="ctr" rotWithShape="0">
+                    <a:schemeClr val="bg2"/>
+                  </a:outerShdw>
+                </a:effectLst>
+              </a14:hiddenEffects>
+            </a:ext>
+          </a:extLst>
+        </p:spPr>
+        <p:txBody>
+          <a:bodyPr vert="horz" wrap="none" lIns="91440" tIns="45720" rIns="91440" bIns="45720" numCol="1" anchor="ctr" anchorCtr="0" compatLnSpc="1">
+            <a:prstTxWarp prst="textNoShape">
+              <a:avLst/>
+            </a:prstTxWarp>
+            <a:spAutoFit/>
+          </a:bodyPr>
+          <a:lstStyle/>
+          <a:p>
+            <a:pPr marL="0" marR="0" lvl="0" indent="0" algn="l" defTabSz="914400" rtl="0" eaLnBrk="0" fontAlgn="base" latinLnBrk="0" hangingPunct="0">
+              <a:lnSpc>
+                <a:spcPct val="100000"/>
+              </a:lnSpc>
+              <a:spcBef>
+                <a:spcPct val="0"/>
+              </a:spcBef>
+              <a:spcAft>
+                <a:spcPct val="0"/>
+              </a:spcAft>
+              <a:buClrTx/>
+              <a:buSzTx/>
+              <a:buFontTx/>
+              <a:buNone/>
+              <a:tabLst/>
+            </a:pPr>
+            <a:r>
+              <a:rPr kumimoji="0" lang="en-US" altLang="en-US" sz="1100" b="1" i="0" u="none" strike="noStrike" cap="none" normalizeH="0" baseline="0" dirty="0" smtClean="0">
+                <a:ln>
+                  <a:noFill/>
+                </a:ln>
+                <a:solidFill>
+                  <a:srgbClr val="000080"/>
+                </a:solidFill>
+                <a:effectLst/>
+                <a:latin typeface="Courier New" panose="02070309020205020404" pitchFamily="49" charset="0"/>
+                <a:cs typeface="Courier New" panose="02070309020205020404" pitchFamily="49" charset="0"/>
+              </a:rPr>
+              <a:t>case class </a:t>
+            </a:r>
+            <a:r>
+              <a:rPr kumimoji="0" lang="en-US" altLang="en-US" sz="1100" b="0" i="0" u="none" strike="noStrike" cap="none" normalizeH="0" baseline="0" dirty="0" smtClean="0">
+                <a:ln>
+                  <a:noFill/>
+                </a:ln>
+                <a:solidFill>
+                  <a:srgbClr val="000000"/>
+                </a:solidFill>
+                <a:effectLst/>
+                <a:latin typeface="Courier New" panose="02070309020205020404" pitchFamily="49" charset="0"/>
+                <a:cs typeface="Courier New" panose="02070309020205020404" pitchFamily="49" charset="0"/>
+              </a:rPr>
+              <a:t>She(){</a:t>
+            </a:r>
+            <a:br>
+              <a:rPr kumimoji="0" lang="en-US" altLang="en-US" sz="1100" b="0" i="0" u="none" strike="noStrike" cap="none" normalizeH="0" baseline="0" dirty="0" smtClean="0">
+                <a:ln>
+                  <a:noFill/>
+                </a:ln>
+                <a:solidFill>
+                  <a:srgbClr val="000000"/>
+                </a:solidFill>
+                <a:effectLst/>
+                <a:latin typeface="Courier New" panose="02070309020205020404" pitchFamily="49" charset="0"/>
+                <a:cs typeface="Courier New" panose="02070309020205020404" pitchFamily="49" charset="0"/>
+              </a:rPr>
+            </a:br>
+            <a:r>
+              <a:rPr kumimoji="0" lang="en-US" altLang="en-US" sz="1100" b="0" i="0" u="none" strike="noStrike" cap="none" normalizeH="0" baseline="0" dirty="0" smtClean="0">
+                <a:ln>
+                  <a:noFill/>
+                </a:ln>
+                <a:solidFill>
+                  <a:srgbClr val="000000"/>
+                </a:solidFill>
+                <a:effectLst/>
+                <a:latin typeface="Courier New" panose="02070309020205020404" pitchFamily="49" charset="0"/>
+                <a:cs typeface="Courier New" panose="02070309020205020404" pitchFamily="49" charset="0"/>
+              </a:rPr>
+              <a:t>  </a:t>
+            </a:r>
+            <a:r>
+              <a:rPr kumimoji="0" lang="en-US" altLang="en-US" sz="1100" b="1" i="0" u="none" strike="noStrike" cap="none" normalizeH="0" baseline="0" dirty="0" err="1" smtClean="0">
+                <a:ln>
+                  <a:noFill/>
+                </a:ln>
+                <a:solidFill>
+                  <a:srgbClr val="000080"/>
+                </a:solidFill>
+                <a:effectLst/>
+                <a:latin typeface="Courier New" panose="02070309020205020404" pitchFamily="49" charset="0"/>
+                <a:cs typeface="Courier New" panose="02070309020205020404" pitchFamily="49" charset="0"/>
+              </a:rPr>
+              <a:t>def</a:t>
+            </a:r>
+            <a:r>
+              <a:rPr kumimoji="0" lang="en-US" altLang="en-US" sz="1100" b="1" i="0" u="none" strike="noStrike" cap="none" normalizeH="0" baseline="0" dirty="0" smtClean="0">
+                <a:ln>
+                  <a:noFill/>
+                </a:ln>
+                <a:solidFill>
+                  <a:srgbClr val="000080"/>
+                </a:solidFill>
+                <a:effectLst/>
+                <a:latin typeface="Courier New" panose="02070309020205020404" pitchFamily="49" charset="0"/>
+                <a:cs typeface="Courier New" panose="02070309020205020404" pitchFamily="49" charset="0"/>
+              </a:rPr>
+              <a:t> </a:t>
+            </a:r>
+            <a:r>
+              <a:rPr kumimoji="0" lang="en-US" altLang="en-US" sz="1100" b="0" i="0" u="none" strike="noStrike" cap="none" normalizeH="0" baseline="0" dirty="0" smtClean="0">
+                <a:ln>
+                  <a:noFill/>
+                </a:ln>
+                <a:solidFill>
+                  <a:srgbClr val="000000"/>
+                </a:solidFill>
+                <a:effectLst/>
+                <a:latin typeface="Courier New" panose="02070309020205020404" pitchFamily="49" charset="0"/>
+                <a:cs typeface="Courier New" panose="02070309020205020404" pitchFamily="49" charset="0"/>
+              </a:rPr>
+              <a:t>have(f: =&gt; </a:t>
+            </a:r>
+            <a:r>
+              <a:rPr kumimoji="0" lang="en-US" altLang="en-US" sz="1100" b="0" i="0" u="none" strike="noStrike" cap="none" normalizeH="0" baseline="0" dirty="0" smtClean="0">
+                <a:ln>
+                  <a:noFill/>
+                </a:ln>
+                <a:solidFill>
+                  <a:srgbClr val="CC7832"/>
+                </a:solidFill>
+                <a:effectLst/>
+                <a:latin typeface="Courier New" panose="02070309020205020404" pitchFamily="49" charset="0"/>
+                <a:cs typeface="Courier New" panose="02070309020205020404" pitchFamily="49" charset="0"/>
+              </a:rPr>
+              <a:t>Unit</a:t>
+            </a:r>
+            <a:r>
+              <a:rPr kumimoji="0" lang="en-US" altLang="en-US" sz="1100" b="0" i="0" u="none" strike="noStrike" cap="none" normalizeH="0" baseline="0" dirty="0" smtClean="0">
+                <a:ln>
+                  <a:noFill/>
+                </a:ln>
+                <a:solidFill>
+                  <a:srgbClr val="000000"/>
+                </a:solidFill>
+                <a:effectLst/>
+                <a:latin typeface="Courier New" panose="02070309020205020404" pitchFamily="49" charset="0"/>
+                <a:cs typeface="Courier New" panose="02070309020205020404" pitchFamily="49" charset="0"/>
+              </a:rPr>
+              <a:t>) = </a:t>
+            </a:r>
+            <a:r>
+              <a:rPr kumimoji="0" lang="en-US" altLang="en-US" sz="1100" b="1" i="0" u="none" strike="noStrike" cap="none" normalizeH="0" baseline="0" dirty="0" smtClean="0">
+                <a:ln>
+                  <a:noFill/>
+                </a:ln>
+                <a:solidFill>
+                  <a:srgbClr val="000080"/>
+                </a:solidFill>
+                <a:effectLst/>
+                <a:latin typeface="Courier New" panose="02070309020205020404" pitchFamily="49" charset="0"/>
+                <a:cs typeface="Courier New" panose="02070309020205020404" pitchFamily="49" charset="0"/>
+              </a:rPr>
+              <a:t>new </a:t>
+            </a:r>
+            <a:r>
+              <a:rPr kumimoji="0" lang="en-US" altLang="en-US" sz="1100" b="0" i="0" u="none" strike="noStrike" cap="none" normalizeH="0" baseline="0" dirty="0" smtClean="0">
+                <a:ln>
+                  <a:noFill/>
+                </a:ln>
+                <a:solidFill>
+                  <a:srgbClr val="000000"/>
+                </a:solidFill>
+                <a:effectLst/>
+                <a:latin typeface="Courier New" panose="02070309020205020404" pitchFamily="49" charset="0"/>
+                <a:cs typeface="Courier New" panose="02070309020205020404" pitchFamily="49" charset="0"/>
+              </a:rPr>
+              <a:t>{</a:t>
+            </a:r>
+            <a:br>
+              <a:rPr kumimoji="0" lang="en-US" altLang="en-US" sz="1100" b="0" i="0" u="none" strike="noStrike" cap="none" normalizeH="0" baseline="0" dirty="0" smtClean="0">
+                <a:ln>
+                  <a:noFill/>
+                </a:ln>
+                <a:solidFill>
+                  <a:srgbClr val="000000"/>
+                </a:solidFill>
+                <a:effectLst/>
+                <a:latin typeface="Courier New" panose="02070309020205020404" pitchFamily="49" charset="0"/>
+                <a:cs typeface="Courier New" panose="02070309020205020404" pitchFamily="49" charset="0"/>
+              </a:rPr>
+            </a:br>
+            <a:r>
+              <a:rPr kumimoji="0" lang="en-US" altLang="en-US" sz="1100" b="0" i="0" u="none" strike="noStrike" cap="none" normalizeH="0" baseline="0" dirty="0" smtClean="0">
+                <a:ln>
+                  <a:noFill/>
+                </a:ln>
+                <a:solidFill>
+                  <a:srgbClr val="000000"/>
+                </a:solidFill>
+                <a:effectLst/>
+                <a:latin typeface="Courier New" panose="02070309020205020404" pitchFamily="49" charset="0"/>
+                <a:cs typeface="Courier New" panose="02070309020205020404" pitchFamily="49" charset="0"/>
+              </a:rPr>
+              <a:t>    </a:t>
+            </a:r>
+            <a:r>
+              <a:rPr kumimoji="0" lang="en-US" altLang="en-US" sz="1100" b="1" i="0" u="none" strike="noStrike" cap="none" normalizeH="0" baseline="0" dirty="0" err="1" smtClean="0">
+                <a:ln>
+                  <a:noFill/>
+                </a:ln>
+                <a:solidFill>
+                  <a:srgbClr val="000080"/>
+                </a:solidFill>
+                <a:effectLst/>
+                <a:latin typeface="Courier New" panose="02070309020205020404" pitchFamily="49" charset="0"/>
+                <a:cs typeface="Courier New" panose="02070309020205020404" pitchFamily="49" charset="0"/>
+              </a:rPr>
+              <a:t>def</a:t>
+            </a:r>
+            <a:r>
+              <a:rPr kumimoji="0" lang="en-US" altLang="en-US" sz="1100" b="1" i="0" u="none" strike="noStrike" cap="none" normalizeH="0" baseline="0" dirty="0" smtClean="0">
+                <a:ln>
+                  <a:noFill/>
+                </a:ln>
+                <a:solidFill>
+                  <a:srgbClr val="000080"/>
+                </a:solidFill>
+                <a:effectLst/>
+                <a:latin typeface="Courier New" panose="02070309020205020404" pitchFamily="49" charset="0"/>
+                <a:cs typeface="Courier New" panose="02070309020205020404" pitchFamily="49" charset="0"/>
+              </a:rPr>
+              <a:t> </a:t>
+            </a:r>
+            <a:r>
+              <a:rPr kumimoji="0" lang="en-US" altLang="en-US" sz="1100" b="0" i="0" u="none" strike="noStrike" cap="none" normalizeH="0" baseline="0" dirty="0" err="1" smtClean="0">
+                <a:ln>
+                  <a:noFill/>
+                </a:ln>
+                <a:solidFill>
+                  <a:srgbClr val="000000"/>
+                </a:solidFill>
+                <a:effectLst/>
+                <a:latin typeface="Courier New" panose="02070309020205020404" pitchFamily="49" charset="0"/>
+                <a:cs typeface="Courier New" panose="02070309020205020404" pitchFamily="49" charset="0"/>
+              </a:rPr>
+              <a:t>til</a:t>
+            </a:r>
+            <a:r>
+              <a:rPr kumimoji="0" lang="en-US" altLang="en-US" sz="1100" b="0" i="0" u="none" strike="noStrike" cap="none" normalizeH="0" baseline="0" dirty="0" smtClean="0">
+                <a:ln>
+                  <a:noFill/>
+                </a:ln>
+                <a:solidFill>
+                  <a:srgbClr val="000000"/>
+                </a:solidFill>
+                <a:effectLst/>
+                <a:latin typeface="Courier New" panose="02070309020205020404" pitchFamily="49" charset="0"/>
+                <a:cs typeface="Courier New" panose="02070309020205020404" pitchFamily="49" charset="0"/>
+              </a:rPr>
+              <a:t>(c: =&gt; </a:t>
+            </a:r>
+            <a:r>
+              <a:rPr kumimoji="0" lang="en-US" altLang="en-US" sz="1100" b="0" i="0" u="none" strike="noStrike" cap="none" normalizeH="0" baseline="0" dirty="0" smtClean="0">
+                <a:ln>
+                  <a:noFill/>
+                </a:ln>
+                <a:solidFill>
+                  <a:srgbClr val="CC7832"/>
+                </a:solidFill>
+                <a:effectLst/>
+                <a:latin typeface="Courier New" panose="02070309020205020404" pitchFamily="49" charset="0"/>
+                <a:cs typeface="Courier New" panose="02070309020205020404" pitchFamily="49" charset="0"/>
+              </a:rPr>
+              <a:t>Boolean</a:t>
+            </a:r>
+            <a:r>
+              <a:rPr kumimoji="0" lang="en-US" altLang="en-US" sz="1100" b="0" i="0" u="none" strike="noStrike" cap="none" normalizeH="0" baseline="0" dirty="0" smtClean="0">
+                <a:ln>
+                  <a:noFill/>
+                </a:ln>
+                <a:solidFill>
+                  <a:srgbClr val="000000"/>
+                </a:solidFill>
+                <a:effectLst/>
+                <a:latin typeface="Courier New" panose="02070309020205020404" pitchFamily="49" charset="0"/>
+                <a:cs typeface="Courier New" panose="02070309020205020404" pitchFamily="49" charset="0"/>
+              </a:rPr>
+              <a:t>) = {</a:t>
+            </a:r>
+            <a:r>
+              <a:rPr kumimoji="0" lang="en-US" altLang="en-US" sz="1100" b="1" i="0" u="none" strike="noStrike" cap="none" normalizeH="0" baseline="0" dirty="0" smtClean="0">
+                <a:ln>
+                  <a:noFill/>
+                </a:ln>
+                <a:solidFill>
+                  <a:srgbClr val="000080"/>
+                </a:solidFill>
+                <a:effectLst/>
+                <a:latin typeface="Courier New" panose="02070309020205020404" pitchFamily="49" charset="0"/>
+                <a:cs typeface="Courier New" panose="02070309020205020404" pitchFamily="49" charset="0"/>
+              </a:rPr>
+              <a:t>do</a:t>
+            </a:r>
+            <a:r>
+              <a:rPr kumimoji="0" lang="en-US" altLang="en-US" sz="1100" b="0" i="0" u="none" strike="noStrike" cap="none" normalizeH="0" baseline="0" dirty="0" smtClean="0">
+                <a:ln>
+                  <a:noFill/>
+                </a:ln>
+                <a:solidFill>
+                  <a:srgbClr val="000000"/>
+                </a:solidFill>
+                <a:effectLst/>
+                <a:latin typeface="Courier New" panose="02070309020205020404" pitchFamily="49" charset="0"/>
+                <a:cs typeface="Courier New" panose="02070309020205020404" pitchFamily="49" charset="0"/>
+              </a:rPr>
+              <a:t>{f} </a:t>
+            </a:r>
+            <a:r>
+              <a:rPr kumimoji="0" lang="en-US" altLang="en-US" sz="1100" b="1" i="0" u="none" strike="noStrike" cap="none" normalizeH="0" baseline="0" dirty="0" smtClean="0">
+                <a:ln>
+                  <a:noFill/>
+                </a:ln>
+                <a:solidFill>
+                  <a:srgbClr val="000080"/>
+                </a:solidFill>
+                <a:effectLst/>
+                <a:latin typeface="Courier New" panose="02070309020205020404" pitchFamily="49" charset="0"/>
+                <a:cs typeface="Courier New" panose="02070309020205020404" pitchFamily="49" charset="0"/>
+              </a:rPr>
+              <a:t>while </a:t>
+            </a:r>
+            <a:r>
+              <a:rPr kumimoji="0" lang="en-US" altLang="en-US" sz="1100" b="0" i="0" u="none" strike="noStrike" cap="none" normalizeH="0" baseline="0" dirty="0" smtClean="0">
+                <a:ln>
+                  <a:noFill/>
+                </a:ln>
+                <a:solidFill>
+                  <a:srgbClr val="000000"/>
+                </a:solidFill>
+                <a:effectLst/>
+                <a:latin typeface="Courier New" panose="02070309020205020404" pitchFamily="49" charset="0"/>
+                <a:cs typeface="Courier New" panose="02070309020205020404" pitchFamily="49" charset="0"/>
+              </a:rPr>
+              <a:t>(!c)}</a:t>
+            </a:r>
+            <a:br>
+              <a:rPr kumimoji="0" lang="en-US" altLang="en-US" sz="1100" b="0" i="0" u="none" strike="noStrike" cap="none" normalizeH="0" baseline="0" dirty="0" smtClean="0">
+                <a:ln>
+                  <a:noFill/>
+                </a:ln>
+                <a:solidFill>
+                  <a:srgbClr val="000000"/>
+                </a:solidFill>
+                <a:effectLst/>
+                <a:latin typeface="Courier New" panose="02070309020205020404" pitchFamily="49" charset="0"/>
+                <a:cs typeface="Courier New" panose="02070309020205020404" pitchFamily="49" charset="0"/>
+              </a:rPr>
+            </a:br>
+            <a:r>
+              <a:rPr kumimoji="0" lang="en-US" altLang="en-US" sz="1100" b="0" i="0" u="none" strike="noStrike" cap="none" normalizeH="0" baseline="0" dirty="0" smtClean="0">
+                <a:ln>
+                  <a:noFill/>
+                </a:ln>
+                <a:solidFill>
+                  <a:srgbClr val="000000"/>
+                </a:solidFill>
+                <a:effectLst/>
+                <a:latin typeface="Courier New" panose="02070309020205020404" pitchFamily="49" charset="0"/>
+                <a:cs typeface="Courier New" panose="02070309020205020404" pitchFamily="49" charset="0"/>
+              </a:rPr>
+              <a:t>  }</a:t>
+            </a:r>
+            <a:br>
+              <a:rPr kumimoji="0" lang="en-US" altLang="en-US" sz="1100" b="0" i="0" u="none" strike="noStrike" cap="none" normalizeH="0" baseline="0" dirty="0" smtClean="0">
+                <a:ln>
+                  <a:noFill/>
+                </a:ln>
+                <a:solidFill>
+                  <a:srgbClr val="000000"/>
+                </a:solidFill>
+                <a:effectLst/>
+                <a:latin typeface="Courier New" panose="02070309020205020404" pitchFamily="49" charset="0"/>
+                <a:cs typeface="Courier New" panose="02070309020205020404" pitchFamily="49" charset="0"/>
+              </a:rPr>
+            </a:br>
+            <a:r>
+              <a:rPr kumimoji="0" lang="en-US" altLang="en-US" sz="1100" b="0" i="0" u="none" strike="noStrike" cap="none" normalizeH="0" baseline="0" dirty="0" smtClean="0">
+                <a:ln>
+                  <a:noFill/>
+                </a:ln>
+                <a:solidFill>
+                  <a:srgbClr val="000000"/>
+                </a:solidFill>
+                <a:effectLst/>
+                <a:latin typeface="Courier New" panose="02070309020205020404" pitchFamily="49" charset="0"/>
+                <a:cs typeface="Courier New" panose="02070309020205020404" pitchFamily="49" charset="0"/>
+              </a:rPr>
+              <a:t>}</a:t>
+            </a:r>
+            <a:br>
+              <a:rPr kumimoji="0" lang="en-US" altLang="en-US" sz="1100" b="0" i="0" u="none" strike="noStrike" cap="none" normalizeH="0" baseline="0" dirty="0" smtClean="0">
+                <a:ln>
+                  <a:noFill/>
+                </a:ln>
+                <a:solidFill>
+                  <a:srgbClr val="000000"/>
+                </a:solidFill>
+                <a:effectLst/>
+                <a:latin typeface="Courier New" panose="02070309020205020404" pitchFamily="49" charset="0"/>
+                <a:cs typeface="Courier New" panose="02070309020205020404" pitchFamily="49" charset="0"/>
+              </a:rPr>
+            </a:br>
+            <a:r>
+              <a:rPr kumimoji="0" lang="en-US" altLang="en-US" sz="1100" b="0" i="0" u="none" strike="noStrike" cap="none" normalizeH="0" baseline="0" dirty="0" smtClean="0">
+                <a:ln>
+                  <a:noFill/>
+                </a:ln>
+                <a:solidFill>
+                  <a:srgbClr val="000000"/>
+                </a:solidFill>
+                <a:effectLst/>
+                <a:latin typeface="Courier New" panose="02070309020205020404" pitchFamily="49" charset="0"/>
+                <a:cs typeface="Courier New" panose="02070309020205020404" pitchFamily="49" charset="0"/>
+              </a:rPr>
+              <a:t/>
+            </a:r>
+            <a:br>
+              <a:rPr kumimoji="0" lang="en-US" altLang="en-US" sz="1100" b="0" i="0" u="none" strike="noStrike" cap="none" normalizeH="0" baseline="0" dirty="0" smtClean="0">
+                <a:ln>
+                  <a:noFill/>
+                </a:ln>
+                <a:solidFill>
+                  <a:srgbClr val="000000"/>
+                </a:solidFill>
+                <a:effectLst/>
+                <a:latin typeface="Courier New" panose="02070309020205020404" pitchFamily="49" charset="0"/>
+                <a:cs typeface="Courier New" panose="02070309020205020404" pitchFamily="49" charset="0"/>
+              </a:rPr>
+            </a:br>
+            <a:r>
+              <a:rPr kumimoji="0" lang="en-US" altLang="en-US" sz="1100" b="1" i="0" u="none" strike="noStrike" cap="none" normalizeH="0" baseline="0" dirty="0" smtClean="0">
+                <a:ln>
+                  <a:noFill/>
+                </a:ln>
+                <a:solidFill>
+                  <a:srgbClr val="000080"/>
+                </a:solidFill>
+                <a:effectLst/>
+                <a:latin typeface="Courier New" panose="02070309020205020404" pitchFamily="49" charset="0"/>
+                <a:cs typeface="Courier New" panose="02070309020205020404" pitchFamily="49" charset="0"/>
+              </a:rPr>
+              <a:t>case class </a:t>
+            </a:r>
+            <a:r>
+              <a:rPr kumimoji="0" lang="en-US" altLang="en-US" sz="1100" b="0" i="0" u="none" strike="noStrike" cap="none" normalizeH="0" baseline="0" dirty="0" err="1" smtClean="0">
+                <a:ln>
+                  <a:noFill/>
+                </a:ln>
+                <a:solidFill>
+                  <a:srgbClr val="000000"/>
+                </a:solidFill>
+                <a:effectLst/>
+                <a:latin typeface="Courier New" panose="02070309020205020404" pitchFamily="49" charset="0"/>
+                <a:cs typeface="Courier New" panose="02070309020205020404" pitchFamily="49" charset="0"/>
+              </a:rPr>
+              <a:t>TBird</a:t>
+            </a:r>
+            <a:r>
+              <a:rPr kumimoji="0" lang="en-US" altLang="en-US" sz="1100" b="0" i="0" u="none" strike="noStrike" cap="none" normalizeH="0" baseline="0" dirty="0" smtClean="0">
+                <a:ln>
+                  <a:noFill/>
+                </a:ln>
+                <a:solidFill>
+                  <a:srgbClr val="000000"/>
+                </a:solidFill>
+                <a:effectLst/>
+                <a:latin typeface="Courier New" panose="02070309020205020404" pitchFamily="49" charset="0"/>
+                <a:cs typeface="Courier New" panose="02070309020205020404" pitchFamily="49" charset="0"/>
+              </a:rPr>
+              <a:t>(){</a:t>
+            </a:r>
+            <a:br>
+              <a:rPr kumimoji="0" lang="en-US" altLang="en-US" sz="1100" b="0" i="0" u="none" strike="noStrike" cap="none" normalizeH="0" baseline="0" dirty="0" smtClean="0">
+                <a:ln>
+                  <a:noFill/>
+                </a:ln>
+                <a:solidFill>
+                  <a:srgbClr val="000000"/>
+                </a:solidFill>
+                <a:effectLst/>
+                <a:latin typeface="Courier New" panose="02070309020205020404" pitchFamily="49" charset="0"/>
+                <a:cs typeface="Courier New" panose="02070309020205020404" pitchFamily="49" charset="0"/>
+              </a:rPr>
+            </a:br>
+            <a:r>
+              <a:rPr kumimoji="0" lang="en-US" altLang="en-US" sz="1100" b="0" i="0" u="none" strike="noStrike" cap="none" normalizeH="0" baseline="0" dirty="0" smtClean="0">
+                <a:ln>
+                  <a:noFill/>
+                </a:ln>
+                <a:solidFill>
+                  <a:srgbClr val="000000"/>
+                </a:solidFill>
+                <a:effectLst/>
+                <a:latin typeface="Courier New" panose="02070309020205020404" pitchFamily="49" charset="0"/>
+                <a:cs typeface="Courier New" panose="02070309020205020404" pitchFamily="49" charset="0"/>
+              </a:rPr>
+              <a:t/>
+            </a:r>
+            <a:br>
+              <a:rPr kumimoji="0" lang="en-US" altLang="en-US" sz="1100" b="0" i="0" u="none" strike="noStrike" cap="none" normalizeH="0" baseline="0" dirty="0" smtClean="0">
+                <a:ln>
+                  <a:noFill/>
+                </a:ln>
+                <a:solidFill>
+                  <a:srgbClr val="000000"/>
+                </a:solidFill>
+                <a:effectLst/>
+                <a:latin typeface="Courier New" panose="02070309020205020404" pitchFamily="49" charset="0"/>
+                <a:cs typeface="Courier New" panose="02070309020205020404" pitchFamily="49" charset="0"/>
+              </a:rPr>
+            </a:br>
+            <a:r>
+              <a:rPr kumimoji="0" lang="en-US" altLang="en-US" sz="1100" b="0" i="0" u="none" strike="noStrike" cap="none" normalizeH="0" baseline="0" dirty="0" smtClean="0">
+                <a:ln>
+                  <a:noFill/>
+                </a:ln>
+                <a:solidFill>
+                  <a:srgbClr val="000000"/>
+                </a:solidFill>
+                <a:effectLst/>
+                <a:latin typeface="Courier New" panose="02070309020205020404" pitchFamily="49" charset="0"/>
+                <a:cs typeface="Courier New" panose="02070309020205020404" pitchFamily="49" charset="0"/>
+              </a:rPr>
+              <a:t>}</a:t>
+            </a:r>
+            <a:br>
+              <a:rPr kumimoji="0" lang="en-US" altLang="en-US" sz="1100" b="0" i="0" u="none" strike="noStrike" cap="none" normalizeH="0" baseline="0" dirty="0" smtClean="0">
+                <a:ln>
+                  <a:noFill/>
+                </a:ln>
+                <a:solidFill>
+                  <a:srgbClr val="000000"/>
+                </a:solidFill>
+                <a:effectLst/>
+                <a:latin typeface="Courier New" panose="02070309020205020404" pitchFamily="49" charset="0"/>
+                <a:cs typeface="Courier New" panose="02070309020205020404" pitchFamily="49" charset="0"/>
+              </a:rPr>
+            </a:br>
+            <a:r>
+              <a:rPr kumimoji="0" lang="en-US" altLang="en-US" sz="1100" b="0" i="0" u="none" strike="noStrike" cap="none" normalizeH="0" baseline="0" dirty="0" smtClean="0">
+                <a:ln>
+                  <a:noFill/>
+                </a:ln>
+                <a:solidFill>
+                  <a:srgbClr val="000000"/>
+                </a:solidFill>
+                <a:effectLst/>
+                <a:latin typeface="Courier New" panose="02070309020205020404" pitchFamily="49" charset="0"/>
+                <a:cs typeface="Courier New" panose="02070309020205020404" pitchFamily="49" charset="0"/>
+              </a:rPr>
+              <a:t/>
+            </a:r>
+            <a:br>
+              <a:rPr kumimoji="0" lang="en-US" altLang="en-US" sz="1100" b="0" i="0" u="none" strike="noStrike" cap="none" normalizeH="0" baseline="0" dirty="0" smtClean="0">
+                <a:ln>
+                  <a:noFill/>
+                </a:ln>
+                <a:solidFill>
+                  <a:srgbClr val="000000"/>
+                </a:solidFill>
+                <a:effectLst/>
+                <a:latin typeface="Courier New" panose="02070309020205020404" pitchFamily="49" charset="0"/>
+                <a:cs typeface="Courier New" panose="02070309020205020404" pitchFamily="49" charset="0"/>
+              </a:rPr>
+            </a:br>
+            <a:r>
+              <a:rPr kumimoji="0" lang="en-US" altLang="en-US" sz="1100" b="1" i="0" u="none" strike="noStrike" cap="none" normalizeH="0" baseline="0" dirty="0" smtClean="0">
+                <a:ln>
+                  <a:noFill/>
+                </a:ln>
+                <a:solidFill>
+                  <a:srgbClr val="000080"/>
+                </a:solidFill>
+                <a:effectLst/>
+                <a:latin typeface="Courier New" panose="02070309020205020404" pitchFamily="49" charset="0"/>
+                <a:cs typeface="Courier New" panose="02070309020205020404" pitchFamily="49" charset="0"/>
+              </a:rPr>
+              <a:t>case class </a:t>
+            </a:r>
+            <a:r>
+              <a:rPr kumimoji="0" lang="en-US" altLang="en-US" sz="1100" b="0" i="0" u="none" strike="noStrike" cap="none" normalizeH="0" baseline="0" dirty="0" smtClean="0">
+                <a:ln>
+                  <a:noFill/>
+                </a:ln>
+                <a:solidFill>
+                  <a:srgbClr val="000000"/>
+                </a:solidFill>
+                <a:effectLst/>
+                <a:latin typeface="Courier New" panose="02070309020205020404" pitchFamily="49" charset="0"/>
+                <a:cs typeface="Courier New" panose="02070309020205020404" pitchFamily="49" charset="0"/>
+              </a:rPr>
+              <a:t>Daddy(){</a:t>
+            </a:r>
+            <a:br>
+              <a:rPr kumimoji="0" lang="en-US" altLang="en-US" sz="1100" b="0" i="0" u="none" strike="noStrike" cap="none" normalizeH="0" baseline="0" dirty="0" smtClean="0">
+                <a:ln>
+                  <a:noFill/>
+                </a:ln>
+                <a:solidFill>
+                  <a:srgbClr val="000000"/>
+                </a:solidFill>
+                <a:effectLst/>
+                <a:latin typeface="Courier New" panose="02070309020205020404" pitchFamily="49" charset="0"/>
+                <a:cs typeface="Courier New" panose="02070309020205020404" pitchFamily="49" charset="0"/>
+              </a:rPr>
+            </a:br>
+            <a:r>
+              <a:rPr kumimoji="0" lang="en-US" altLang="en-US" sz="1100" b="0" i="0" u="none" strike="noStrike" cap="none" normalizeH="0" baseline="0" dirty="0" smtClean="0">
+                <a:ln>
+                  <a:noFill/>
+                </a:ln>
+                <a:solidFill>
+                  <a:srgbClr val="000000"/>
+                </a:solidFill>
+                <a:effectLst/>
+                <a:latin typeface="Courier New" panose="02070309020205020404" pitchFamily="49" charset="0"/>
+                <a:cs typeface="Courier New" panose="02070309020205020404" pitchFamily="49" charset="0"/>
+              </a:rPr>
+              <a:t>  </a:t>
+            </a:r>
+            <a:r>
+              <a:rPr kumimoji="0" lang="en-US" altLang="en-US" sz="1100" b="1" i="0" u="none" strike="noStrike" cap="none" normalizeH="0" baseline="0" dirty="0" err="1" smtClean="0">
+                <a:ln>
+                  <a:noFill/>
+                </a:ln>
+                <a:solidFill>
+                  <a:srgbClr val="000080"/>
+                </a:solidFill>
+                <a:effectLst/>
+                <a:latin typeface="Courier New" panose="02070309020205020404" pitchFamily="49" charset="0"/>
+                <a:cs typeface="Courier New" panose="02070309020205020404" pitchFamily="49" charset="0"/>
+              </a:rPr>
+              <a:t>def</a:t>
+            </a:r>
+            <a:r>
+              <a:rPr kumimoji="0" lang="en-US" altLang="en-US" sz="1100" b="1" i="0" u="none" strike="noStrike" cap="none" normalizeH="0" baseline="0" dirty="0" smtClean="0">
+                <a:ln>
+                  <a:noFill/>
+                </a:ln>
+                <a:solidFill>
+                  <a:srgbClr val="000080"/>
+                </a:solidFill>
+                <a:effectLst/>
+                <a:latin typeface="Courier New" panose="02070309020205020404" pitchFamily="49" charset="0"/>
+                <a:cs typeface="Courier New" panose="02070309020205020404" pitchFamily="49" charset="0"/>
+              </a:rPr>
+              <a:t> </a:t>
+            </a:r>
+            <a:r>
+              <a:rPr kumimoji="0" lang="en-US" altLang="en-US" sz="1100" b="0" i="0" u="none" strike="noStrike" cap="none" normalizeH="0" baseline="0" dirty="0" err="1" smtClean="0">
+                <a:ln>
+                  <a:noFill/>
+                </a:ln>
+                <a:solidFill>
+                  <a:srgbClr val="000000"/>
+                </a:solidFill>
+                <a:effectLst/>
+                <a:latin typeface="Courier New" panose="02070309020205020404" pitchFamily="49" charset="0"/>
+                <a:cs typeface="Courier New" panose="02070309020205020404" pitchFamily="49" charset="0"/>
+              </a:rPr>
+              <a:t>takeAway</a:t>
+            </a:r>
+            <a:r>
+              <a:rPr kumimoji="0" lang="en-US" altLang="en-US" sz="1100" b="0" i="0" u="none" strike="noStrike" cap="none" normalizeH="0" baseline="0" dirty="0" smtClean="0">
+                <a:ln>
+                  <a:noFill/>
+                </a:ln>
+                <a:solidFill>
+                  <a:srgbClr val="000000"/>
+                </a:solidFill>
+                <a:effectLst/>
+                <a:latin typeface="Courier New" panose="02070309020205020404" pitchFamily="49" charset="0"/>
+                <a:cs typeface="Courier New" panose="02070309020205020404" pitchFamily="49" charset="0"/>
+              </a:rPr>
+              <a:t>(t: </a:t>
+            </a:r>
+            <a:r>
+              <a:rPr kumimoji="0" lang="en-US" altLang="en-US" sz="1100" b="0" i="0" u="none" strike="noStrike" cap="none" normalizeH="0" baseline="0" dirty="0" err="1" smtClean="0">
+                <a:ln>
+                  <a:noFill/>
+                </a:ln>
+                <a:solidFill>
+                  <a:srgbClr val="000000"/>
+                </a:solidFill>
+                <a:effectLst/>
+                <a:latin typeface="Courier New" panose="02070309020205020404" pitchFamily="49" charset="0"/>
+                <a:cs typeface="Courier New" panose="02070309020205020404" pitchFamily="49" charset="0"/>
+              </a:rPr>
+              <a:t>TBird</a:t>
+            </a:r>
+            <a:r>
+              <a:rPr kumimoji="0" lang="en-US" altLang="en-US" sz="1100" b="0" i="0" u="none" strike="noStrike" cap="none" normalizeH="0" baseline="0" dirty="0" smtClean="0">
+                <a:ln>
+                  <a:noFill/>
+                </a:ln>
+                <a:solidFill>
+                  <a:srgbClr val="000000"/>
+                </a:solidFill>
+                <a:effectLst/>
+                <a:latin typeface="Courier New" panose="02070309020205020404" pitchFamily="49" charset="0"/>
+                <a:cs typeface="Courier New" panose="02070309020205020404" pitchFamily="49" charset="0"/>
+              </a:rPr>
+              <a:t>) = {</a:t>
+            </a:r>
+            <a:br>
+              <a:rPr kumimoji="0" lang="en-US" altLang="en-US" sz="1100" b="0" i="0" u="none" strike="noStrike" cap="none" normalizeH="0" baseline="0" dirty="0" smtClean="0">
+                <a:ln>
+                  <a:noFill/>
+                </a:ln>
+                <a:solidFill>
+                  <a:srgbClr val="000000"/>
+                </a:solidFill>
+                <a:effectLst/>
+                <a:latin typeface="Courier New" panose="02070309020205020404" pitchFamily="49" charset="0"/>
+                <a:cs typeface="Courier New" panose="02070309020205020404" pitchFamily="49" charset="0"/>
+              </a:rPr>
+            </a:br>
+            <a:r>
+              <a:rPr kumimoji="0" lang="en-US" altLang="en-US" sz="1100" b="0" i="0" u="none" strike="noStrike" cap="none" normalizeH="0" baseline="0" dirty="0" smtClean="0">
+                <a:ln>
+                  <a:noFill/>
+                </a:ln>
+                <a:solidFill>
+                  <a:srgbClr val="000000"/>
+                </a:solidFill>
+                <a:effectLst/>
+                <a:latin typeface="Courier New" panose="02070309020205020404" pitchFamily="49" charset="0"/>
+                <a:cs typeface="Courier New" panose="02070309020205020404" pitchFamily="49" charset="0"/>
+              </a:rPr>
+              <a:t>    </a:t>
+            </a:r>
+            <a:r>
+              <a:rPr kumimoji="0" lang="en-US" altLang="en-US" sz="1100" b="0" i="1" u="none" strike="noStrike" cap="none" normalizeH="0" baseline="0" dirty="0" err="1" smtClean="0">
+                <a:ln>
+                  <a:noFill/>
+                </a:ln>
+                <a:solidFill>
+                  <a:srgbClr val="000000"/>
+                </a:solidFill>
+                <a:effectLst/>
+                <a:latin typeface="Courier New" panose="02070309020205020404" pitchFamily="49" charset="0"/>
+                <a:cs typeface="Courier New" panose="02070309020205020404" pitchFamily="49" charset="0"/>
+              </a:rPr>
+              <a:t>println</a:t>
+            </a:r>
+            <a:r>
+              <a:rPr kumimoji="0" lang="en-US" altLang="en-US" sz="1100" b="0" i="0" u="none" strike="noStrike" cap="none" normalizeH="0" baseline="0" dirty="0" smtClean="0">
+                <a:ln>
+                  <a:noFill/>
+                </a:ln>
+                <a:solidFill>
+                  <a:srgbClr val="000000"/>
+                </a:solidFill>
+                <a:effectLst/>
+                <a:latin typeface="Courier New" panose="02070309020205020404" pitchFamily="49" charset="0"/>
+                <a:cs typeface="Courier New" panose="02070309020205020404" pitchFamily="49" charset="0"/>
+              </a:rPr>
+              <a:t>(</a:t>
+            </a:r>
+            <a:r>
+              <a:rPr kumimoji="0" lang="en-US" altLang="en-US" sz="1100" b="1" i="0" u="none" strike="noStrike" cap="none" normalizeH="0" baseline="0" dirty="0" smtClean="0">
+                <a:ln>
+                  <a:noFill/>
+                </a:ln>
+                <a:solidFill>
+                  <a:srgbClr val="008000"/>
+                </a:solidFill>
+                <a:effectLst/>
+                <a:latin typeface="Courier New" panose="02070309020205020404" pitchFamily="49" charset="0"/>
+                <a:cs typeface="Courier New" panose="02070309020205020404" pitchFamily="49" charset="0"/>
+              </a:rPr>
+              <a:t>"Daddy took the T-Bird away."</a:t>
+            </a:r>
+            <a:r>
+              <a:rPr kumimoji="0" lang="en-US" altLang="en-US" sz="1100" b="0" i="0" u="none" strike="noStrike" cap="none" normalizeH="0" baseline="0" dirty="0" smtClean="0">
+                <a:ln>
+                  <a:noFill/>
+                </a:ln>
+                <a:solidFill>
+                  <a:srgbClr val="000000"/>
+                </a:solidFill>
+                <a:effectLst/>
+                <a:latin typeface="Courier New" panose="02070309020205020404" pitchFamily="49" charset="0"/>
+                <a:cs typeface="Courier New" panose="02070309020205020404" pitchFamily="49" charset="0"/>
+              </a:rPr>
+              <a:t>)</a:t>
+            </a:r>
+            <a:br>
+              <a:rPr kumimoji="0" lang="en-US" altLang="en-US" sz="1100" b="0" i="0" u="none" strike="noStrike" cap="none" normalizeH="0" baseline="0" dirty="0" smtClean="0">
+                <a:ln>
+                  <a:noFill/>
+                </a:ln>
+                <a:solidFill>
+                  <a:srgbClr val="000000"/>
+                </a:solidFill>
+                <a:effectLst/>
+                <a:latin typeface="Courier New" panose="02070309020205020404" pitchFamily="49" charset="0"/>
+                <a:cs typeface="Courier New" panose="02070309020205020404" pitchFamily="49" charset="0"/>
+              </a:rPr>
+            </a:br>
+            <a:r>
+              <a:rPr kumimoji="0" lang="en-US" altLang="en-US" sz="1100" b="0" i="0" u="none" strike="noStrike" cap="none" normalizeH="0" baseline="0" dirty="0" smtClean="0">
+                <a:ln>
+                  <a:noFill/>
+                </a:ln>
+                <a:solidFill>
+                  <a:srgbClr val="000000"/>
+                </a:solidFill>
+                <a:effectLst/>
+                <a:latin typeface="Courier New" panose="02070309020205020404" pitchFamily="49" charset="0"/>
+                <a:cs typeface="Courier New" panose="02070309020205020404" pitchFamily="49" charset="0"/>
+              </a:rPr>
+              <a:t>    </a:t>
+            </a:r>
+            <a:r>
+              <a:rPr kumimoji="0" lang="en-US" altLang="en-US" sz="1100" b="1" i="0" u="none" strike="noStrike" cap="none" normalizeH="0" baseline="0" dirty="0" smtClean="0">
+                <a:ln>
+                  <a:noFill/>
+                </a:ln>
+                <a:solidFill>
+                  <a:srgbClr val="000080"/>
+                </a:solidFill>
+                <a:effectLst/>
+                <a:latin typeface="Courier New" panose="02070309020205020404" pitchFamily="49" charset="0"/>
+                <a:cs typeface="Courier New" panose="02070309020205020404" pitchFamily="49" charset="0"/>
+              </a:rPr>
+              <a:t>true</a:t>
+            </a:r>
+            <a:br>
+              <a:rPr kumimoji="0" lang="en-US" altLang="en-US" sz="1100" b="1" i="0" u="none" strike="noStrike" cap="none" normalizeH="0" baseline="0" dirty="0" smtClean="0">
+                <a:ln>
+                  <a:noFill/>
+                </a:ln>
+                <a:solidFill>
+                  <a:srgbClr val="000080"/>
+                </a:solidFill>
+                <a:effectLst/>
+                <a:latin typeface="Courier New" panose="02070309020205020404" pitchFamily="49" charset="0"/>
+                <a:cs typeface="Courier New" panose="02070309020205020404" pitchFamily="49" charset="0"/>
+              </a:rPr>
+            </a:br>
+            <a:r>
+              <a:rPr kumimoji="0" lang="en-US" altLang="en-US" sz="1100" b="1" i="0" u="none" strike="noStrike" cap="none" normalizeH="0" baseline="0" dirty="0" smtClean="0">
+                <a:ln>
+                  <a:noFill/>
+                </a:ln>
+                <a:solidFill>
+                  <a:srgbClr val="000080"/>
+                </a:solidFill>
+                <a:effectLst/>
+                <a:latin typeface="Courier New" panose="02070309020205020404" pitchFamily="49" charset="0"/>
+                <a:cs typeface="Courier New" panose="02070309020205020404" pitchFamily="49" charset="0"/>
+              </a:rPr>
+              <a:t>  </a:t>
+            </a:r>
+            <a:r>
+              <a:rPr kumimoji="0" lang="en-US" altLang="en-US" sz="1100" b="0" i="0" u="none" strike="noStrike" cap="none" normalizeH="0" baseline="0" dirty="0" smtClean="0">
+                <a:ln>
+                  <a:noFill/>
+                </a:ln>
+                <a:solidFill>
+                  <a:srgbClr val="000000"/>
+                </a:solidFill>
+                <a:effectLst/>
+                <a:latin typeface="Courier New" panose="02070309020205020404" pitchFamily="49" charset="0"/>
+                <a:cs typeface="Courier New" panose="02070309020205020404" pitchFamily="49" charset="0"/>
+              </a:rPr>
+              <a:t>}</a:t>
+            </a:r>
+            <a:br>
+              <a:rPr kumimoji="0" lang="en-US" altLang="en-US" sz="1100" b="0" i="0" u="none" strike="noStrike" cap="none" normalizeH="0" baseline="0" dirty="0" smtClean="0">
+                <a:ln>
+                  <a:noFill/>
+                </a:ln>
+                <a:solidFill>
+                  <a:srgbClr val="000000"/>
+                </a:solidFill>
+                <a:effectLst/>
+                <a:latin typeface="Courier New" panose="02070309020205020404" pitchFamily="49" charset="0"/>
+                <a:cs typeface="Courier New" panose="02070309020205020404" pitchFamily="49" charset="0"/>
+              </a:rPr>
+            </a:br>
+            <a:r>
+              <a:rPr kumimoji="0" lang="en-US" altLang="en-US" sz="1100" b="0" i="0" u="none" strike="noStrike" cap="none" normalizeH="0" baseline="0" dirty="0" smtClean="0">
+                <a:ln>
+                  <a:noFill/>
+                </a:ln>
+                <a:solidFill>
+                  <a:srgbClr val="000000"/>
+                </a:solidFill>
+                <a:effectLst/>
+                <a:latin typeface="Courier New" panose="02070309020205020404" pitchFamily="49" charset="0"/>
+                <a:cs typeface="Courier New" panose="02070309020205020404" pitchFamily="49" charset="0"/>
+              </a:rPr>
+              <a:t>}</a:t>
+            </a:r>
+            <a:br>
+              <a:rPr kumimoji="0" lang="en-US" altLang="en-US" sz="1100" b="0" i="0" u="none" strike="noStrike" cap="none" normalizeH="0" baseline="0" dirty="0" smtClean="0">
+                <a:ln>
+                  <a:noFill/>
+                </a:ln>
+                <a:solidFill>
+                  <a:srgbClr val="000000"/>
+                </a:solidFill>
+                <a:effectLst/>
+                <a:latin typeface="Courier New" panose="02070309020205020404" pitchFamily="49" charset="0"/>
+                <a:cs typeface="Courier New" panose="02070309020205020404" pitchFamily="49" charset="0"/>
+              </a:rPr>
+            </a:br>
+            <a:r>
+              <a:rPr kumimoji="0" lang="en-US" altLang="en-US" sz="1100" b="0" i="0" u="none" strike="noStrike" cap="none" normalizeH="0" baseline="0" dirty="0" smtClean="0">
+                <a:ln>
+                  <a:noFill/>
+                </a:ln>
+                <a:solidFill>
+                  <a:srgbClr val="000000"/>
+                </a:solidFill>
+                <a:effectLst/>
+                <a:latin typeface="Courier New" panose="02070309020205020404" pitchFamily="49" charset="0"/>
+                <a:cs typeface="Courier New" panose="02070309020205020404" pitchFamily="49" charset="0"/>
+              </a:rPr>
+              <a:t/>
+            </a:r>
+            <a:br>
+              <a:rPr kumimoji="0" lang="en-US" altLang="en-US" sz="1100" b="0" i="0" u="none" strike="noStrike" cap="none" normalizeH="0" baseline="0" dirty="0" smtClean="0">
+                <a:ln>
+                  <a:noFill/>
+                </a:ln>
+                <a:solidFill>
+                  <a:srgbClr val="000000"/>
+                </a:solidFill>
+                <a:effectLst/>
+                <a:latin typeface="Courier New" panose="02070309020205020404" pitchFamily="49" charset="0"/>
+                <a:cs typeface="Courier New" panose="02070309020205020404" pitchFamily="49" charset="0"/>
+              </a:rPr>
+            </a:br>
+            <a:r>
+              <a:rPr kumimoji="0" lang="en-US" altLang="en-US" sz="1100" b="1" i="0" u="none" strike="noStrike" cap="none" normalizeH="0" baseline="0" dirty="0" smtClean="0">
+                <a:ln>
+                  <a:noFill/>
+                </a:ln>
+                <a:solidFill>
+                  <a:srgbClr val="000080"/>
+                </a:solidFill>
+                <a:effectLst/>
+                <a:latin typeface="Courier New" panose="02070309020205020404" pitchFamily="49" charset="0"/>
+                <a:cs typeface="Courier New" panose="02070309020205020404" pitchFamily="49" charset="0"/>
+              </a:rPr>
+              <a:t>object </a:t>
+            </a:r>
+            <a:r>
+              <a:rPr kumimoji="0" lang="en-US" altLang="en-US" sz="1100" b="0" i="0" u="none" strike="noStrike" cap="none" normalizeH="0" baseline="0" dirty="0" smtClean="0">
+                <a:ln>
+                  <a:noFill/>
+                </a:ln>
+                <a:solidFill>
+                  <a:srgbClr val="000000"/>
+                </a:solidFill>
+                <a:effectLst/>
+                <a:latin typeface="Courier New" panose="02070309020205020404" pitchFamily="49" charset="0"/>
+                <a:cs typeface="Courier New" panose="02070309020205020404" pitchFamily="49" charset="0"/>
+              </a:rPr>
+              <a:t>Solution {</a:t>
+            </a:r>
+            <a:br>
+              <a:rPr kumimoji="0" lang="en-US" altLang="en-US" sz="1100" b="0" i="0" u="none" strike="noStrike" cap="none" normalizeH="0" baseline="0" dirty="0" smtClean="0">
+                <a:ln>
+                  <a:noFill/>
+                </a:ln>
+                <a:solidFill>
+                  <a:srgbClr val="000000"/>
+                </a:solidFill>
+                <a:effectLst/>
+                <a:latin typeface="Courier New" panose="02070309020205020404" pitchFamily="49" charset="0"/>
+                <a:cs typeface="Courier New" panose="02070309020205020404" pitchFamily="49" charset="0"/>
+              </a:rPr>
+            </a:br>
+            <a:r>
+              <a:rPr kumimoji="0" lang="en-US" altLang="en-US" sz="1100" b="0" i="0" u="none" strike="noStrike" cap="none" normalizeH="0" baseline="0" dirty="0" smtClean="0">
+                <a:ln>
+                  <a:noFill/>
+                </a:ln>
+                <a:solidFill>
+                  <a:srgbClr val="000000"/>
+                </a:solidFill>
+                <a:effectLst/>
+                <a:latin typeface="Courier New" panose="02070309020205020404" pitchFamily="49" charset="0"/>
+                <a:cs typeface="Courier New" panose="02070309020205020404" pitchFamily="49" charset="0"/>
+              </a:rPr>
+              <a:t>  </a:t>
+            </a:r>
+            <a:r>
+              <a:rPr kumimoji="0" lang="en-US" altLang="en-US" sz="1100" b="1" i="0" u="none" strike="noStrike" cap="none" normalizeH="0" baseline="0" dirty="0" err="1" smtClean="0">
+                <a:ln>
+                  <a:noFill/>
+                </a:ln>
+                <a:solidFill>
+                  <a:srgbClr val="000080"/>
+                </a:solidFill>
+                <a:effectLst/>
+                <a:latin typeface="Courier New" panose="02070309020205020404" pitchFamily="49" charset="0"/>
+                <a:cs typeface="Courier New" panose="02070309020205020404" pitchFamily="49" charset="0"/>
+              </a:rPr>
+              <a:t>def</a:t>
+            </a:r>
+            <a:r>
+              <a:rPr kumimoji="0" lang="en-US" altLang="en-US" sz="1100" b="1" i="0" u="none" strike="noStrike" cap="none" normalizeH="0" baseline="0" dirty="0" smtClean="0">
+                <a:ln>
+                  <a:noFill/>
+                </a:ln>
+                <a:solidFill>
+                  <a:srgbClr val="000080"/>
+                </a:solidFill>
+                <a:effectLst/>
+                <a:latin typeface="Courier New" panose="02070309020205020404" pitchFamily="49" charset="0"/>
+                <a:cs typeface="Courier New" panose="02070309020205020404" pitchFamily="49" charset="0"/>
+              </a:rPr>
+              <a:t> </a:t>
+            </a:r>
+            <a:r>
+              <a:rPr kumimoji="0" lang="en-US" altLang="en-US" sz="1100" b="0" i="0" u="none" strike="noStrike" cap="none" normalizeH="0" baseline="0" dirty="0" smtClean="0">
+                <a:ln>
+                  <a:noFill/>
+                </a:ln>
+                <a:solidFill>
+                  <a:srgbClr val="000000"/>
+                </a:solidFill>
+                <a:effectLst/>
+                <a:latin typeface="Courier New" panose="02070309020205020404" pitchFamily="49" charset="0"/>
+                <a:cs typeface="Courier New" panose="02070309020205020404" pitchFamily="49" charset="0"/>
+              </a:rPr>
+              <a:t>main(</a:t>
+            </a:r>
+            <a:r>
+              <a:rPr kumimoji="0" lang="en-US" altLang="en-US" sz="1100" b="0" i="0" u="none" strike="noStrike" cap="none" normalizeH="0" baseline="0" dirty="0" err="1" smtClean="0">
+                <a:ln>
+                  <a:noFill/>
+                </a:ln>
+                <a:solidFill>
+                  <a:srgbClr val="000000"/>
+                </a:solidFill>
+                <a:effectLst/>
+                <a:latin typeface="Courier New" panose="02070309020205020404" pitchFamily="49" charset="0"/>
+                <a:cs typeface="Courier New" panose="02070309020205020404" pitchFamily="49" charset="0"/>
+              </a:rPr>
+              <a:t>args</a:t>
+            </a:r>
+            <a:r>
+              <a:rPr kumimoji="0" lang="en-US" altLang="en-US" sz="1100" b="0" i="0" u="none" strike="noStrike" cap="none" normalizeH="0" baseline="0" dirty="0" smtClean="0">
+                <a:ln>
+                  <a:noFill/>
+                </a:ln>
+                <a:solidFill>
+                  <a:srgbClr val="000000"/>
+                </a:solidFill>
+                <a:effectLst/>
+                <a:latin typeface="Courier New" panose="02070309020205020404" pitchFamily="49" charset="0"/>
+                <a:cs typeface="Courier New" panose="02070309020205020404" pitchFamily="49" charset="0"/>
+              </a:rPr>
+              <a:t>: Array[</a:t>
+            </a:r>
+            <a:r>
+              <a:rPr kumimoji="0" lang="en-US" altLang="en-US" sz="1100" b="0" i="0" u="none" strike="noStrike" cap="none" normalizeH="0" baseline="0" dirty="0" smtClean="0">
+                <a:ln>
+                  <a:noFill/>
+                </a:ln>
+                <a:solidFill>
+                  <a:srgbClr val="20999D"/>
+                </a:solidFill>
+                <a:effectLst/>
+                <a:latin typeface="Courier New" panose="02070309020205020404" pitchFamily="49" charset="0"/>
+                <a:cs typeface="Courier New" panose="02070309020205020404" pitchFamily="49" charset="0"/>
+              </a:rPr>
+              <a:t>String</a:t>
+            </a:r>
+            <a:r>
+              <a:rPr kumimoji="0" lang="en-US" altLang="en-US" sz="1100" b="0" i="0" u="none" strike="noStrike" cap="none" normalizeH="0" baseline="0" dirty="0" smtClean="0">
+                <a:ln>
+                  <a:noFill/>
+                </a:ln>
+                <a:solidFill>
+                  <a:srgbClr val="000000"/>
+                </a:solidFill>
+                <a:effectLst/>
+                <a:latin typeface="Courier New" panose="02070309020205020404" pitchFamily="49" charset="0"/>
+                <a:cs typeface="Courier New" panose="02070309020205020404" pitchFamily="49" charset="0"/>
+              </a:rPr>
+              <a:t>]) {</a:t>
+            </a:r>
+            <a:br>
+              <a:rPr kumimoji="0" lang="en-US" altLang="en-US" sz="1100" b="0" i="0" u="none" strike="noStrike" cap="none" normalizeH="0" baseline="0" dirty="0" smtClean="0">
+                <a:ln>
+                  <a:noFill/>
+                </a:ln>
+                <a:solidFill>
+                  <a:srgbClr val="000000"/>
+                </a:solidFill>
+                <a:effectLst/>
+                <a:latin typeface="Courier New" panose="02070309020205020404" pitchFamily="49" charset="0"/>
+                <a:cs typeface="Courier New" panose="02070309020205020404" pitchFamily="49" charset="0"/>
+              </a:rPr>
+            </a:br>
+            <a:r>
+              <a:rPr kumimoji="0" lang="en-US" altLang="en-US" sz="1100" b="0" i="0" u="none" strike="noStrike" cap="none" normalizeH="0" baseline="0" dirty="0" smtClean="0">
+                <a:ln>
+                  <a:noFill/>
+                </a:ln>
+                <a:solidFill>
+                  <a:srgbClr val="000000"/>
+                </a:solidFill>
+                <a:effectLst/>
+                <a:latin typeface="Courier New" panose="02070309020205020404" pitchFamily="49" charset="0"/>
+                <a:cs typeface="Courier New" panose="02070309020205020404" pitchFamily="49" charset="0"/>
+              </a:rPr>
+              <a:t>    </a:t>
+            </a:r>
+            <a:r>
+              <a:rPr kumimoji="0" lang="en-US" altLang="en-US" sz="1100" b="1" i="0" u="none" strike="noStrike" cap="none" normalizeH="0" baseline="0" dirty="0" err="1" smtClean="0">
+                <a:ln>
+                  <a:noFill/>
+                </a:ln>
+                <a:solidFill>
+                  <a:srgbClr val="000080"/>
+                </a:solidFill>
+                <a:effectLst/>
+                <a:latin typeface="Courier New" panose="02070309020205020404" pitchFamily="49" charset="0"/>
+                <a:cs typeface="Courier New" panose="02070309020205020404" pitchFamily="49" charset="0"/>
+              </a:rPr>
+              <a:t>val</a:t>
+            </a:r>
+            <a:r>
+              <a:rPr kumimoji="0" lang="en-US" altLang="en-US" sz="1100" b="1" i="0" u="none" strike="noStrike" cap="none" normalizeH="0" baseline="0" dirty="0" smtClean="0">
+                <a:ln>
+                  <a:noFill/>
+                </a:ln>
+                <a:solidFill>
+                  <a:srgbClr val="000080"/>
+                </a:solidFill>
+                <a:effectLst/>
+                <a:latin typeface="Courier New" panose="02070309020205020404" pitchFamily="49" charset="0"/>
+                <a:cs typeface="Courier New" panose="02070309020205020404" pitchFamily="49" charset="0"/>
+              </a:rPr>
+              <a:t> </a:t>
+            </a:r>
+            <a:r>
+              <a:rPr kumimoji="0" lang="en-US" altLang="en-US" sz="1100" b="0" i="0" u="none" strike="noStrike" cap="none" normalizeH="0" baseline="0" dirty="0" err="1" smtClean="0">
+                <a:ln>
+                  <a:noFill/>
+                </a:ln>
+                <a:solidFill>
+                  <a:srgbClr val="000000"/>
+                </a:solidFill>
+                <a:effectLst/>
+                <a:latin typeface="Courier New" panose="02070309020205020404" pitchFamily="49" charset="0"/>
+                <a:cs typeface="Courier New" panose="02070309020205020404" pitchFamily="49" charset="0"/>
+              </a:rPr>
+              <a:t>funFunFun</a:t>
+            </a:r>
+            <a:r>
+              <a:rPr kumimoji="0" lang="en-US" altLang="en-US" sz="1100" b="0" i="0" u="none" strike="noStrike" cap="none" normalizeH="0" baseline="0" dirty="0" smtClean="0">
+                <a:ln>
+                  <a:noFill/>
+                </a:ln>
+                <a:solidFill>
+                  <a:srgbClr val="000000"/>
+                </a:solidFill>
+                <a:effectLst/>
+                <a:latin typeface="Courier New" panose="02070309020205020404" pitchFamily="49" charset="0"/>
+                <a:cs typeface="Courier New" panose="02070309020205020404" pitchFamily="49" charset="0"/>
+              </a:rPr>
+              <a:t> = {</a:t>
+            </a:r>
+            <a:r>
+              <a:rPr kumimoji="0" lang="en-US" altLang="en-US" sz="1100" b="0" i="1" u="none" strike="noStrike" cap="none" normalizeH="0" baseline="0" dirty="0" err="1" smtClean="0">
+                <a:ln>
+                  <a:noFill/>
+                </a:ln>
+                <a:solidFill>
+                  <a:srgbClr val="000000"/>
+                </a:solidFill>
+                <a:effectLst/>
+                <a:latin typeface="Courier New" panose="02070309020205020404" pitchFamily="49" charset="0"/>
+                <a:cs typeface="Courier New" panose="02070309020205020404" pitchFamily="49" charset="0"/>
+              </a:rPr>
+              <a:t>println</a:t>
+            </a:r>
+            <a:r>
+              <a:rPr kumimoji="0" lang="en-US" altLang="en-US" sz="1100" b="0" i="0" u="none" strike="noStrike" cap="none" normalizeH="0" baseline="0" dirty="0" smtClean="0">
+                <a:ln>
+                  <a:noFill/>
+                </a:ln>
+                <a:solidFill>
+                  <a:srgbClr val="000000"/>
+                </a:solidFill>
+                <a:effectLst/>
+                <a:latin typeface="Courier New" panose="02070309020205020404" pitchFamily="49" charset="0"/>
+                <a:cs typeface="Courier New" panose="02070309020205020404" pitchFamily="49" charset="0"/>
+              </a:rPr>
+              <a:t>(</a:t>
+            </a:r>
+            <a:r>
+              <a:rPr kumimoji="0" lang="en-US" altLang="en-US" sz="1100" b="1" i="0" u="none" strike="noStrike" cap="none" normalizeH="0" baseline="0" dirty="0" smtClean="0">
+                <a:ln>
+                  <a:noFill/>
+                </a:ln>
+                <a:solidFill>
+                  <a:srgbClr val="008000"/>
+                </a:solidFill>
+                <a:effectLst/>
+                <a:latin typeface="Courier New" panose="02070309020205020404" pitchFamily="49" charset="0"/>
+                <a:cs typeface="Courier New" panose="02070309020205020404" pitchFamily="49" charset="0"/>
+              </a:rPr>
+              <a:t>"Fun! Fun! Fun!"</a:t>
+            </a:r>
+            <a:r>
+              <a:rPr kumimoji="0" lang="en-US" altLang="en-US" sz="1100" b="0" i="0" u="none" strike="noStrike" cap="none" normalizeH="0" baseline="0" dirty="0" smtClean="0">
+                <a:ln>
+                  <a:noFill/>
+                </a:ln>
+                <a:solidFill>
+                  <a:srgbClr val="000000"/>
+                </a:solidFill>
+                <a:effectLst/>
+                <a:latin typeface="Courier New" panose="02070309020205020404" pitchFamily="49" charset="0"/>
+                <a:cs typeface="Courier New" panose="02070309020205020404" pitchFamily="49" charset="0"/>
+              </a:rPr>
+              <a:t>)}</a:t>
+            </a:r>
+            <a:br>
+              <a:rPr kumimoji="0" lang="en-US" altLang="en-US" sz="1100" b="0" i="0" u="none" strike="noStrike" cap="none" normalizeH="0" baseline="0" dirty="0" smtClean="0">
+                <a:ln>
+                  <a:noFill/>
+                </a:ln>
+                <a:solidFill>
+                  <a:srgbClr val="000000"/>
+                </a:solidFill>
+                <a:effectLst/>
+                <a:latin typeface="Courier New" panose="02070309020205020404" pitchFamily="49" charset="0"/>
+                <a:cs typeface="Courier New" panose="02070309020205020404" pitchFamily="49" charset="0"/>
+              </a:rPr>
+            </a:br>
+            <a:r>
+              <a:rPr kumimoji="0" lang="en-US" altLang="en-US" sz="1100" b="0" i="0" u="none" strike="noStrike" cap="none" normalizeH="0" baseline="0" dirty="0" smtClean="0">
+                <a:ln>
+                  <a:noFill/>
+                </a:ln>
+                <a:solidFill>
+                  <a:srgbClr val="000000"/>
+                </a:solidFill>
+                <a:effectLst/>
+                <a:latin typeface="Courier New" panose="02070309020205020404" pitchFamily="49" charset="0"/>
+                <a:cs typeface="Courier New" panose="02070309020205020404" pitchFamily="49" charset="0"/>
+              </a:rPr>
+              <a:t/>
+            </a:r>
+            <a:br>
+              <a:rPr kumimoji="0" lang="en-US" altLang="en-US" sz="1100" b="0" i="0" u="none" strike="noStrike" cap="none" normalizeH="0" baseline="0" dirty="0" smtClean="0">
+                <a:ln>
+                  <a:noFill/>
+                </a:ln>
+                <a:solidFill>
+                  <a:srgbClr val="000000"/>
+                </a:solidFill>
+                <a:effectLst/>
+                <a:latin typeface="Courier New" panose="02070309020205020404" pitchFamily="49" charset="0"/>
+                <a:cs typeface="Courier New" panose="02070309020205020404" pitchFamily="49" charset="0"/>
+              </a:rPr>
+            </a:br>
+            <a:r>
+              <a:rPr kumimoji="0" lang="en-US" altLang="en-US" sz="1100" b="0" i="0" u="none" strike="noStrike" cap="none" normalizeH="0" baseline="0" dirty="0" smtClean="0">
+                <a:ln>
+                  <a:noFill/>
+                </a:ln>
+                <a:solidFill>
+                  <a:srgbClr val="000000"/>
+                </a:solidFill>
+                <a:effectLst/>
+                <a:latin typeface="Courier New" panose="02070309020205020404" pitchFamily="49" charset="0"/>
+                <a:cs typeface="Courier New" panose="02070309020205020404" pitchFamily="49" charset="0"/>
+              </a:rPr>
+              <a:t>    </a:t>
+            </a:r>
+            <a:r>
+              <a:rPr kumimoji="0" lang="en-US" altLang="en-US" sz="1100" b="0" i="1" u="none" strike="noStrike" cap="none" normalizeH="0" baseline="0" dirty="0" smtClean="0">
+                <a:ln>
+                  <a:noFill/>
+                </a:ln>
+                <a:solidFill>
+                  <a:srgbClr val="000000"/>
+                </a:solidFill>
+                <a:effectLst/>
+                <a:latin typeface="Courier New" panose="02070309020205020404" pitchFamily="49" charset="0"/>
+                <a:cs typeface="Courier New" panose="02070309020205020404" pitchFamily="49" charset="0"/>
+              </a:rPr>
+              <a:t>She</a:t>
+            </a:r>
+            <a:r>
+              <a:rPr kumimoji="0" lang="en-US" altLang="en-US" sz="1100" b="0" i="0" u="none" strike="noStrike" cap="none" normalizeH="0" baseline="0" dirty="0" smtClean="0">
+                <a:ln>
+                  <a:noFill/>
+                </a:ln>
+                <a:solidFill>
+                  <a:srgbClr val="000000"/>
+                </a:solidFill>
+                <a:effectLst/>
+                <a:latin typeface="Courier New" panose="02070309020205020404" pitchFamily="49" charset="0"/>
+                <a:cs typeface="Courier New" panose="02070309020205020404" pitchFamily="49" charset="0"/>
+              </a:rPr>
+              <a:t>() have(</a:t>
+            </a:r>
+            <a:r>
+              <a:rPr kumimoji="0" lang="en-US" altLang="en-US" sz="1100" b="0" i="0" u="none" strike="noStrike" cap="none" normalizeH="0" baseline="0" dirty="0" err="1" smtClean="0">
+                <a:ln>
+                  <a:noFill/>
+                </a:ln>
+                <a:solidFill>
+                  <a:srgbClr val="000000"/>
+                </a:solidFill>
+                <a:effectLst/>
+                <a:latin typeface="Courier New" panose="02070309020205020404" pitchFamily="49" charset="0"/>
+                <a:cs typeface="Courier New" panose="02070309020205020404" pitchFamily="49" charset="0"/>
+              </a:rPr>
+              <a:t>funFunFun</a:t>
+            </a:r>
+            <a:r>
+              <a:rPr kumimoji="0" lang="en-US" altLang="en-US" sz="1100" b="0" i="0" u="none" strike="noStrike" cap="none" normalizeH="0" baseline="0" dirty="0" smtClean="0">
+                <a:ln>
+                  <a:noFill/>
+                </a:ln>
+                <a:solidFill>
+                  <a:srgbClr val="000000"/>
+                </a:solidFill>
+                <a:effectLst/>
+                <a:latin typeface="Courier New" panose="02070309020205020404" pitchFamily="49" charset="0"/>
+                <a:cs typeface="Courier New" panose="02070309020205020404" pitchFamily="49" charset="0"/>
+              </a:rPr>
+              <a:t>) </a:t>
+            </a:r>
+            <a:r>
+              <a:rPr kumimoji="0" lang="en-US" altLang="en-US" sz="1100" b="0" i="0" u="none" strike="noStrike" cap="none" normalizeH="0" baseline="0" dirty="0" err="1" smtClean="0">
+                <a:ln>
+                  <a:noFill/>
+                </a:ln>
+                <a:solidFill>
+                  <a:srgbClr val="000000"/>
+                </a:solidFill>
+                <a:effectLst/>
+                <a:latin typeface="Courier New" panose="02070309020205020404" pitchFamily="49" charset="0"/>
+                <a:cs typeface="Courier New" panose="02070309020205020404" pitchFamily="49" charset="0"/>
+              </a:rPr>
+              <a:t>til</a:t>
+            </a:r>
+            <a:r>
+              <a:rPr kumimoji="0" lang="en-US" altLang="en-US" sz="1100" b="0" i="0" u="none" strike="noStrike" cap="none" normalizeH="0" baseline="0" dirty="0" smtClean="0">
+                <a:ln>
+                  <a:noFill/>
+                </a:ln>
+                <a:solidFill>
+                  <a:srgbClr val="000000"/>
+                </a:solidFill>
+                <a:effectLst/>
+                <a:latin typeface="Courier New" panose="02070309020205020404" pitchFamily="49" charset="0"/>
+                <a:cs typeface="Courier New" panose="02070309020205020404" pitchFamily="49" charset="0"/>
+              </a:rPr>
+              <a:t>(</a:t>
+            </a:r>
+            <a:r>
+              <a:rPr kumimoji="0" lang="en-US" altLang="en-US" sz="1100" b="0" i="1" u="none" strike="noStrike" cap="none" normalizeH="0" baseline="0" dirty="0" smtClean="0">
+                <a:ln>
+                  <a:noFill/>
+                </a:ln>
+                <a:solidFill>
+                  <a:srgbClr val="000000"/>
+                </a:solidFill>
+                <a:effectLst/>
+                <a:latin typeface="Courier New" panose="02070309020205020404" pitchFamily="49" charset="0"/>
+                <a:cs typeface="Courier New" panose="02070309020205020404" pitchFamily="49" charset="0"/>
+              </a:rPr>
+              <a:t>Daddy</a:t>
+            </a:r>
+            <a:r>
+              <a:rPr kumimoji="0" lang="en-US" altLang="en-US" sz="1100" b="0" i="0" u="none" strike="noStrike" cap="none" normalizeH="0" baseline="0" dirty="0" smtClean="0">
+                <a:ln>
+                  <a:noFill/>
+                </a:ln>
+                <a:solidFill>
+                  <a:srgbClr val="000000"/>
+                </a:solidFill>
+                <a:effectLst/>
+                <a:latin typeface="Courier New" panose="02070309020205020404" pitchFamily="49" charset="0"/>
+                <a:cs typeface="Courier New" panose="02070309020205020404" pitchFamily="49" charset="0"/>
+              </a:rPr>
+              <a:t>() </a:t>
+            </a:r>
+            <a:r>
+              <a:rPr kumimoji="0" lang="en-US" altLang="en-US" sz="1100" b="0" i="0" u="none" strike="noStrike" cap="none" normalizeH="0" baseline="0" dirty="0" err="1" smtClean="0">
+                <a:ln>
+                  <a:noFill/>
+                </a:ln>
+                <a:solidFill>
+                  <a:srgbClr val="000000"/>
+                </a:solidFill>
+                <a:effectLst/>
+                <a:latin typeface="Courier New" panose="02070309020205020404" pitchFamily="49" charset="0"/>
+                <a:cs typeface="Courier New" panose="02070309020205020404" pitchFamily="49" charset="0"/>
+              </a:rPr>
+              <a:t>takeAway</a:t>
+            </a:r>
+            <a:r>
+              <a:rPr kumimoji="0" lang="en-US" altLang="en-US" sz="1100" b="0" i="0" u="none" strike="noStrike" cap="none" normalizeH="0" baseline="0" dirty="0" smtClean="0">
+                <a:ln>
+                  <a:noFill/>
+                </a:ln>
+                <a:solidFill>
+                  <a:srgbClr val="000000"/>
+                </a:solidFill>
+                <a:effectLst/>
+                <a:latin typeface="Courier New" panose="02070309020205020404" pitchFamily="49" charset="0"/>
+                <a:cs typeface="Courier New" panose="02070309020205020404" pitchFamily="49" charset="0"/>
+              </a:rPr>
+              <a:t>(</a:t>
+            </a:r>
+            <a:r>
+              <a:rPr kumimoji="0" lang="en-US" altLang="en-US" sz="1100" b="0" i="1" u="none" strike="noStrike" cap="none" normalizeH="0" baseline="0" dirty="0" err="1" smtClean="0">
+                <a:ln>
+                  <a:noFill/>
+                </a:ln>
+                <a:solidFill>
+                  <a:srgbClr val="000000"/>
+                </a:solidFill>
+                <a:effectLst/>
+                <a:latin typeface="Courier New" panose="02070309020205020404" pitchFamily="49" charset="0"/>
+                <a:cs typeface="Courier New" panose="02070309020205020404" pitchFamily="49" charset="0"/>
+              </a:rPr>
+              <a:t>TBird</a:t>
+            </a:r>
+            <a:r>
+              <a:rPr kumimoji="0" lang="en-US" altLang="en-US" sz="1100" b="0" i="0" u="none" strike="noStrike" cap="none" normalizeH="0" baseline="0" dirty="0" smtClean="0">
+                <a:ln>
+                  <a:noFill/>
+                </a:ln>
+                <a:solidFill>
+                  <a:srgbClr val="000000"/>
+                </a:solidFill>
+                <a:effectLst/>
+                <a:latin typeface="Courier New" panose="02070309020205020404" pitchFamily="49" charset="0"/>
+                <a:cs typeface="Courier New" panose="02070309020205020404" pitchFamily="49" charset="0"/>
+              </a:rPr>
+              <a:t>()))</a:t>
+            </a:r>
+            <a:br>
+              <a:rPr kumimoji="0" lang="en-US" altLang="en-US" sz="1100" b="0" i="0" u="none" strike="noStrike" cap="none" normalizeH="0" baseline="0" dirty="0" smtClean="0">
+                <a:ln>
+                  <a:noFill/>
+                </a:ln>
+                <a:solidFill>
+                  <a:srgbClr val="000000"/>
+                </a:solidFill>
+                <a:effectLst/>
+                <a:latin typeface="Courier New" panose="02070309020205020404" pitchFamily="49" charset="0"/>
+                <a:cs typeface="Courier New" panose="02070309020205020404" pitchFamily="49" charset="0"/>
+              </a:rPr>
+            </a:br>
+            <a:r>
+              <a:rPr kumimoji="0" lang="en-US" altLang="en-US" sz="1100" b="0" i="0" u="none" strike="noStrike" cap="none" normalizeH="0" baseline="0" dirty="0" smtClean="0">
+                <a:ln>
+                  <a:noFill/>
+                </a:ln>
+                <a:solidFill>
+                  <a:srgbClr val="000000"/>
+                </a:solidFill>
+                <a:effectLst/>
+                <a:latin typeface="Courier New" panose="02070309020205020404" pitchFamily="49" charset="0"/>
+                <a:cs typeface="Courier New" panose="02070309020205020404" pitchFamily="49" charset="0"/>
+              </a:rPr>
+              <a:t>  }</a:t>
+            </a:r>
+            <a:br>
+              <a:rPr kumimoji="0" lang="en-US" altLang="en-US" sz="1100" b="0" i="0" u="none" strike="noStrike" cap="none" normalizeH="0" baseline="0" dirty="0" smtClean="0">
+                <a:ln>
+                  <a:noFill/>
+                </a:ln>
+                <a:solidFill>
+                  <a:srgbClr val="000000"/>
+                </a:solidFill>
+                <a:effectLst/>
+                <a:latin typeface="Courier New" panose="02070309020205020404" pitchFamily="49" charset="0"/>
+                <a:cs typeface="Courier New" panose="02070309020205020404" pitchFamily="49" charset="0"/>
+              </a:rPr>
+            </a:br>
+            <a:r>
+              <a:rPr kumimoji="0" lang="en-US" altLang="en-US" sz="1100" b="0" i="0" u="none" strike="noStrike" cap="none" normalizeH="0" baseline="0" dirty="0" smtClean="0">
+                <a:ln>
+                  <a:noFill/>
+                </a:ln>
+                <a:solidFill>
+                  <a:srgbClr val="000000"/>
+                </a:solidFill>
+                <a:effectLst/>
+                <a:latin typeface="Courier New" panose="02070309020205020404" pitchFamily="49" charset="0"/>
+                <a:cs typeface="Courier New" panose="02070309020205020404" pitchFamily="49" charset="0"/>
+              </a:rPr>
+              <a:t>}</a:t>
+            </a:r>
+            <a:endParaRPr kumimoji="0" lang="en-US" altLang="en-US" sz="2800" b="0" i="0" u="none" strike="noStrike" cap="none" normalizeH="0" baseline="0" dirty="0" smtClean="0">
+              <a:ln>
+                <a:noFill/>
+              </a:ln>
+              <a:solidFill>
+                <a:schemeClr val="tx1"/>
+              </a:solidFill>
+              <a:effectLst/>
+              <a:latin typeface="Arial" panose="020B0604020202020204" pitchFamily="34" charset="0"/>
+            </a:endParaRPr>
+          </a:p>
+        </p:txBody>
+      </p:sp>
+      <p:sp>
+        <p:nvSpPr>
+          <p:cNvPr id="8" name="TextBox 7"/>
+          <p:cNvSpPr txBox="1"/>
+          <p:nvPr/>
+        </p:nvSpPr>
+        <p:spPr>
+          <a:xfrm>
+            <a:off x="4942379" y="541020"/>
+            <a:ext cx="2747099" cy="646331"/>
+          </a:xfrm>
+          <a:prstGeom prst="rect">
+            <a:avLst/>
+          </a:prstGeom>
+          <a:noFill/>
+        </p:spPr>
+        <p:txBody>
+          <a:bodyPr wrap="none" rtlCol="0">
+            <a:spAutoFit/>
+          </a:bodyPr>
+          <a:lstStyle/>
+          <a:p>
+            <a:r>
+              <a:rPr lang="en-US" dirty="0" smtClean="0"/>
+              <a:t>Check </a:t>
+            </a:r>
+            <a:r>
+              <a:rPr lang="en-US" dirty="0"/>
+              <a:t>out Scala…</a:t>
+            </a:r>
+            <a:br>
+              <a:rPr lang="en-US" dirty="0"/>
+            </a:br>
+            <a:r>
+              <a:rPr lang="en-US" dirty="0">
+                <a:hlinkClick r:id="rId2"/>
+              </a:rPr>
+              <a:t>http://www.scala-lang.org/</a:t>
             </a:r>
             <a:endParaRPr lang="en-US" dirty="0"/>
           </a:p>
@@ -15100,6 +16798,13 @@
   <p:clrMapOvr>
     <a:masterClrMapping/>
   </p:clrMapOvr>
+  <p:timing>
+    <p:tnLst>
+      <p:par>
+        <p:cTn id="1" dur="indefinite" restart="never" nodeType="tmRoot"/>
+      </p:par>
+    </p:tnLst>
+  </p:timing>
 </p:sld>
 </file>
 
@@ -20958,7 +22663,7 @@
   <a:extraClrSchemeLst/>
   <a:extLst>
     <a:ext uri="{05A4C25C-085E-4340-85A3-A5531E510DB2}">
-      <thm15:themeFamily xmlns:thm15="http://schemas.microsoft.com/office/thememl/2012/main" xmlns="" name="2013 Improving ppt template [Read-Only]" id="{9CD52372-1ABB-429C-AE8B-5116A847D281}" vid="{C9E045ED-5E7D-45F0-ABC2-8913C89F506A}"/>
+      <thm15:themeFamily xmlns:thm15="http://schemas.microsoft.com/office/thememl/2012/main" name="2013 Improving ppt template [Read-Only]" id="{9CD52372-1ABB-429C-AE8B-5116A847D281}" vid="{C9E045ED-5E7D-45F0-ABC2-8913C89F506A}"/>
     </a:ext>
   </a:extLst>
 </a:theme>
@@ -21219,19 +22924,16 @@
   <a:extraClrSchemeLst/>
   <a:extLst>
     <a:ext uri="{05A4C25C-085E-4340-85A3-A5531E510DB2}">
-      <thm15:themeFamily xmlns:thm15="http://schemas.microsoft.com/office/thememl/2012/main" xmlns="" name="Office Theme" id="{62F939B6-93AF-4DB8-9C6B-D6C7DFDC589F}" vid="{4A3C46E8-61CC-4603-A589-7422A47A8E4A}"/>
+      <thm15:themeFamily xmlns:thm15="http://schemas.microsoft.com/office/thememl/2012/main" name="Office Theme" id="{62F939B6-93AF-4DB8-9C6B-D6C7DFDC589F}" vid="{4A3C46E8-61CC-4603-A589-7422A47A8E4A}"/>
     </a:ext>
   </a:extLst>
 </a:theme>
 </file>
 
 <file path=customXml/item1.xml><?xml version="1.0" encoding="utf-8"?>
-<?mso-contentType ?>
-<FormTemplates xmlns="http://schemas.microsoft.com/sharepoint/v3/contenttype/forms">
-  <Display>DocumentLibraryForm</Display>
-  <Edit>DocumentLibraryForm</Edit>
-  <New>DocumentLibraryForm</New>
-</FormTemplates>
+<p:properties xmlns:p="http://schemas.microsoft.com/office/2006/metadata/properties" xmlns:xsi="http://www.w3.org/2001/XMLSchema-instance" xmlns:pc="http://schemas.microsoft.com/office/infopath/2007/PartnerControls">
+  <documentManagement/>
+</p:properties>
 </file>
 
 <file path=customXml/item2.xml><?xml version="1.0" encoding="utf-8"?>
@@ -21349,15 +23051,25 @@
 </file>
 
 <file path=customXml/item3.xml><?xml version="1.0" encoding="utf-8"?>
-<p:properties xmlns:p="http://schemas.microsoft.com/office/2006/metadata/properties" xmlns:xsi="http://www.w3.org/2001/XMLSchema-instance" xmlns:pc="http://schemas.microsoft.com/office/infopath/2007/PartnerControls">
-  <documentManagement/>
-</p:properties>
+<?mso-contentType ?>
+<FormTemplates xmlns="http://schemas.microsoft.com/sharepoint/v3/contenttype/forms">
+  <Display>DocumentLibraryForm</Display>
+  <Edit>DocumentLibraryForm</Edit>
+  <New>DocumentLibraryForm</New>
+</FormTemplates>
 </file>
 
 <file path=customXml/itemProps1.xml><?xml version="1.0" encoding="utf-8"?>
-<ds:datastoreItem xmlns:ds="http://schemas.openxmlformats.org/officeDocument/2006/customXml" ds:itemID="{B857AB07-B2ED-439E-860F-4F56FB345D1B}">
+<ds:datastoreItem xmlns:ds="http://schemas.openxmlformats.org/officeDocument/2006/customXml" ds:itemID="{A04551C0-1604-41A0-9B5C-A5F88AD2E0FE}">
   <ds:schemaRefs>
-    <ds:schemaRef ds:uri="http://schemas.microsoft.com/sharepoint/v3/contenttype/forms"/>
+    <ds:schemaRef ds:uri="http://schemas.microsoft.com/office/infopath/2007/PartnerControls"/>
+    <ds:schemaRef ds:uri="http://purl.org/dc/elements/1.1/"/>
+    <ds:schemaRef ds:uri="http://schemas.microsoft.com/office/2006/metadata/properties"/>
+    <ds:schemaRef ds:uri="http://purl.org/dc/terms/"/>
+    <ds:schemaRef ds:uri="http://schemas.openxmlformats.org/package/2006/metadata/core-properties"/>
+    <ds:schemaRef ds:uri="http://schemas.microsoft.com/office/2006/documentManagement/types"/>
+    <ds:schemaRef ds:uri="http://www.w3.org/XML/1998/namespace"/>
+    <ds:schemaRef ds:uri="http://purl.org/dc/dcmitype/"/>
   </ds:schemaRefs>
 </ds:datastoreItem>
 </file>
@@ -21379,16 +23091,9 @@
 </file>
 
 <file path=customXml/itemProps3.xml><?xml version="1.0" encoding="utf-8"?>
-<ds:datastoreItem xmlns:ds="http://schemas.openxmlformats.org/officeDocument/2006/customXml" ds:itemID="{A04551C0-1604-41A0-9B5C-A5F88AD2E0FE}">
+<ds:datastoreItem xmlns:ds="http://schemas.openxmlformats.org/officeDocument/2006/customXml" ds:itemID="{B857AB07-B2ED-439E-860F-4F56FB345D1B}">
   <ds:schemaRefs>
-    <ds:schemaRef ds:uri="http://schemas.microsoft.com/office/infopath/2007/PartnerControls"/>
-    <ds:schemaRef ds:uri="http://purl.org/dc/elements/1.1/"/>
-    <ds:schemaRef ds:uri="http://schemas.microsoft.com/office/2006/metadata/properties"/>
-    <ds:schemaRef ds:uri="http://purl.org/dc/terms/"/>
-    <ds:schemaRef ds:uri="http://schemas.openxmlformats.org/package/2006/metadata/core-properties"/>
-    <ds:schemaRef ds:uri="http://schemas.microsoft.com/office/2006/documentManagement/types"/>
-    <ds:schemaRef ds:uri="http://www.w3.org/XML/1998/namespace"/>
-    <ds:schemaRef ds:uri="http://purl.org/dc/dcmitype/"/>
+    <ds:schemaRef ds:uri="http://schemas.microsoft.com/sharepoint/v3/contenttype/forms"/>
   </ds:schemaRefs>
 </ds:datastoreItem>
 </file>
</xml_diff>

<commit_message>
Put slides in order...
</commit_message>
<xml_diff>
--- a/Presentation/THasINKync.pptx
+++ b/Presentation/THasINKync.pptx
@@ -7,14 +7,14 @@
   </p:sldMasterIdLst>
   <p:sldIdLst>
     <p:sldId id="256" r:id="rId6"/>
-    <p:sldId id="295" r:id="rId7"/>
-    <p:sldId id="260" r:id="rId8"/>
-    <p:sldId id="261" r:id="rId9"/>
-    <p:sldId id="259" r:id="rId10"/>
-    <p:sldId id="257" r:id="rId11"/>
-    <p:sldId id="258" r:id="rId12"/>
-    <p:sldId id="262" r:id="rId13"/>
-    <p:sldId id="269" r:id="rId14"/>
+    <p:sldId id="260" r:id="rId7"/>
+    <p:sldId id="261" r:id="rId8"/>
+    <p:sldId id="259" r:id="rId9"/>
+    <p:sldId id="257" r:id="rId10"/>
+    <p:sldId id="258" r:id="rId11"/>
+    <p:sldId id="262" r:id="rId12"/>
+    <p:sldId id="269" r:id="rId13"/>
+    <p:sldId id="295" r:id="rId14"/>
     <p:sldId id="263" r:id="rId15"/>
     <p:sldId id="270" r:id="rId16"/>
     <p:sldId id="264" r:id="rId17"/>
@@ -15083,8 +15083,8 @@
           <a:lstStyle/>
           <a:p>
             <a:r>
-              <a:rPr lang="en-US" dirty="0" smtClean="0"/>
-              <a:t>Warm Up Your Internal Compiler…</a:t>
+              <a:rPr lang="en-US" smtClean="0"/>
+              <a:t>Eric Burcham</a:t>
             </a:r>
             <a:endParaRPr lang="en-US" dirty="0"/>
           </a:p>
@@ -15092,1706 +15092,145 @@
       </p:sp>
       <p:sp>
         <p:nvSpPr>
-          <p:cNvPr id="6" name="Rectangle 3"/>
+          <p:cNvPr id="3" name="Content Placeholder 2"/>
           <p:cNvSpPr>
-            <a:spLocks noChangeArrowheads="1"/>
+            <a:spLocks noGrp="1"/>
           </p:cNvSpPr>
-          <p:nvPr/>
-        </p:nvSpPr>
-        <p:spPr bwMode="auto">
-          <a:xfrm>
-            <a:off x="0" y="2233791"/>
-            <a:ext cx="184731" cy="584775"/>
-          </a:xfrm>
-          <a:prstGeom prst="rect">
-            <a:avLst/>
-          </a:prstGeom>
-          <a:solidFill>
-            <a:srgbClr val="FFFFFF"/>
-          </a:solidFill>
-          <a:ln>
-            <a:noFill/>
-          </a:ln>
-          <a:effectLst/>
-          <a:extLst>
-            <a:ext uri="{91240B29-F687-4F45-9708-019B960494DF}">
-              <a14:hiddenLine xmlns:a14="http://schemas.microsoft.com/office/drawing/2010/main" w="9525">
-                <a:solidFill>
-                  <a:schemeClr val="tx1"/>
-                </a:solidFill>
-                <a:miter lim="800000"/>
-                <a:headEnd/>
-                <a:tailEnd/>
-              </a14:hiddenLine>
-            </a:ext>
-            <a:ext uri="{AF507438-7753-43E0-B8FC-AC1667EBCBE1}">
-              <a14:hiddenEffects xmlns:a14="http://schemas.microsoft.com/office/drawing/2010/main">
-                <a:effectLst>
-                  <a:outerShdw dist="35921" dir="2700000" algn="ctr" rotWithShape="0">
-                    <a:schemeClr val="bg2"/>
-                  </a:outerShdw>
-                </a:effectLst>
-              </a14:hiddenEffects>
-            </a:ext>
-          </a:extLst>
-        </p:spPr>
-        <p:txBody>
-          <a:bodyPr vert="horz" wrap="none" lIns="91440" tIns="45720" rIns="91440" bIns="45720" numCol="1" anchor="ctr" anchorCtr="0" compatLnSpc="1">
-            <a:prstTxWarp prst="textNoShape">
-              <a:avLst/>
-            </a:prstTxWarp>
-            <a:spAutoFit/>
-          </a:bodyPr>
-          <a:lstStyle/>
-          <a:p>
-            <a:pPr marL="0" marR="0" lvl="0" indent="0" algn="l" defTabSz="914400" rtl="0" eaLnBrk="0" fontAlgn="base" latinLnBrk="0" hangingPunct="0">
-              <a:lnSpc>
-                <a:spcPct val="100000"/>
-              </a:lnSpc>
-              <a:spcBef>
-                <a:spcPct val="0"/>
-              </a:spcBef>
-              <a:spcAft>
-                <a:spcPct val="0"/>
-              </a:spcAft>
-              <a:buClrTx/>
-              <a:buSzTx/>
-              <a:buFontTx/>
-              <a:buNone/>
-              <a:tabLst/>
-            </a:pPr>
-            <a:endParaRPr kumimoji="0" lang="en-US" altLang="en-US" sz="3200" b="0" i="0" u="none" strike="noStrike" cap="none" normalizeH="0" baseline="0" dirty="0" smtClean="0">
-              <a:ln>
-                <a:noFill/>
-              </a:ln>
-              <a:solidFill>
-                <a:schemeClr val="tx1"/>
-              </a:solidFill>
-              <a:effectLst/>
-              <a:latin typeface="Arial" panose="020B0604020202020204" pitchFamily="34" charset="0"/>
-            </a:endParaRPr>
-          </a:p>
-        </p:txBody>
-      </p:sp>
-      <p:sp>
-        <p:nvSpPr>
-          <p:cNvPr id="7" name="Rectangle 4"/>
-          <p:cNvSpPr>
-            <a:spLocks noChangeArrowheads="1"/>
-          </p:cNvSpPr>
-          <p:nvPr/>
-        </p:nvSpPr>
-        <p:spPr bwMode="auto">
-          <a:xfrm>
-            <a:off x="0" y="540690"/>
-            <a:ext cx="4942379" cy="4154984"/>
-          </a:xfrm>
-          <a:prstGeom prst="rect">
-            <a:avLst/>
-          </a:prstGeom>
-          <a:solidFill>
-            <a:srgbClr val="FFFFFF"/>
-          </a:solidFill>
-          <a:ln>
-            <a:noFill/>
-          </a:ln>
-          <a:effectLst/>
-          <a:extLst>
-            <a:ext uri="{91240B29-F687-4F45-9708-019B960494DF}">
-              <a14:hiddenLine xmlns:a14="http://schemas.microsoft.com/office/drawing/2010/main" w="9525">
-                <a:solidFill>
-                  <a:schemeClr val="tx1"/>
-                </a:solidFill>
-                <a:miter lim="800000"/>
-                <a:headEnd/>
-                <a:tailEnd/>
-              </a14:hiddenLine>
-            </a:ext>
-            <a:ext uri="{AF507438-7753-43E0-B8FC-AC1667EBCBE1}">
-              <a14:hiddenEffects xmlns:a14="http://schemas.microsoft.com/office/drawing/2010/main">
-                <a:effectLst>
-                  <a:outerShdw dist="35921" dir="2700000" algn="ctr" rotWithShape="0">
-                    <a:schemeClr val="bg2"/>
-                  </a:outerShdw>
-                </a:effectLst>
-              </a14:hiddenEffects>
-            </a:ext>
-          </a:extLst>
-        </p:spPr>
-        <p:txBody>
-          <a:bodyPr vert="horz" wrap="none" lIns="91440" tIns="45720" rIns="91440" bIns="45720" numCol="1" anchor="ctr" anchorCtr="0" compatLnSpc="1">
-            <a:prstTxWarp prst="textNoShape">
-              <a:avLst/>
-            </a:prstTxWarp>
-            <a:spAutoFit/>
-          </a:bodyPr>
-          <a:lstStyle/>
-          <a:p>
-            <a:pPr marL="0" marR="0" lvl="0" indent="0" algn="l" defTabSz="914400" rtl="0" eaLnBrk="0" fontAlgn="base" latinLnBrk="0" hangingPunct="0">
-              <a:lnSpc>
-                <a:spcPct val="100000"/>
-              </a:lnSpc>
-              <a:spcBef>
-                <a:spcPct val="0"/>
-              </a:spcBef>
-              <a:spcAft>
-                <a:spcPct val="0"/>
-              </a:spcAft>
-              <a:buClrTx/>
-              <a:buSzTx/>
-              <a:buFontTx/>
-              <a:buNone/>
-              <a:tabLst/>
-            </a:pPr>
-            <a:r>
-              <a:rPr kumimoji="0" lang="en-US" altLang="en-US" sz="1100" b="1" i="0" u="none" strike="noStrike" cap="none" normalizeH="0" baseline="0" dirty="0" smtClean="0">
-                <a:ln>
-                  <a:noFill/>
-                </a:ln>
-                <a:solidFill>
-                  <a:srgbClr val="000080"/>
-                </a:solidFill>
-                <a:effectLst/>
-                <a:latin typeface="Courier New" panose="02070309020205020404" pitchFamily="49" charset="0"/>
-                <a:cs typeface="Courier New" panose="02070309020205020404" pitchFamily="49" charset="0"/>
-              </a:rPr>
-              <a:t>case class </a:t>
-            </a:r>
-            <a:r>
-              <a:rPr kumimoji="0" lang="en-US" altLang="en-US" sz="1100" b="0" i="0" u="none" strike="noStrike" cap="none" normalizeH="0" baseline="0" dirty="0" smtClean="0">
-                <a:ln>
-                  <a:noFill/>
-                </a:ln>
-                <a:solidFill>
-                  <a:srgbClr val="000000"/>
-                </a:solidFill>
-                <a:effectLst/>
-                <a:latin typeface="Courier New" panose="02070309020205020404" pitchFamily="49" charset="0"/>
-                <a:cs typeface="Courier New" panose="02070309020205020404" pitchFamily="49" charset="0"/>
-              </a:rPr>
-              <a:t>She(){</a:t>
-            </a:r>
-            <a:br>
-              <a:rPr kumimoji="0" lang="en-US" altLang="en-US" sz="1100" b="0" i="0" u="none" strike="noStrike" cap="none" normalizeH="0" baseline="0" dirty="0" smtClean="0">
-                <a:ln>
-                  <a:noFill/>
-                </a:ln>
-                <a:solidFill>
-                  <a:srgbClr val="000000"/>
-                </a:solidFill>
-                <a:effectLst/>
-                <a:latin typeface="Courier New" panose="02070309020205020404" pitchFamily="49" charset="0"/>
-                <a:cs typeface="Courier New" panose="02070309020205020404" pitchFamily="49" charset="0"/>
-              </a:rPr>
-            </a:br>
-            <a:r>
-              <a:rPr kumimoji="0" lang="en-US" altLang="en-US" sz="1100" b="0" i="0" u="none" strike="noStrike" cap="none" normalizeH="0" baseline="0" dirty="0" smtClean="0">
-                <a:ln>
-                  <a:noFill/>
-                </a:ln>
-                <a:solidFill>
-                  <a:srgbClr val="000000"/>
-                </a:solidFill>
-                <a:effectLst/>
-                <a:latin typeface="Courier New" panose="02070309020205020404" pitchFamily="49" charset="0"/>
-                <a:cs typeface="Courier New" panose="02070309020205020404" pitchFamily="49" charset="0"/>
-              </a:rPr>
-              <a:t>  </a:t>
-            </a:r>
-            <a:r>
-              <a:rPr kumimoji="0" lang="en-US" altLang="en-US" sz="1100" b="1" i="0" u="none" strike="noStrike" cap="none" normalizeH="0" baseline="0" dirty="0" err="1" smtClean="0">
-                <a:ln>
-                  <a:noFill/>
-                </a:ln>
-                <a:solidFill>
-                  <a:srgbClr val="000080"/>
-                </a:solidFill>
-                <a:effectLst/>
-                <a:latin typeface="Courier New" panose="02070309020205020404" pitchFamily="49" charset="0"/>
-                <a:cs typeface="Courier New" panose="02070309020205020404" pitchFamily="49" charset="0"/>
-              </a:rPr>
-              <a:t>def</a:t>
-            </a:r>
-            <a:r>
-              <a:rPr kumimoji="0" lang="en-US" altLang="en-US" sz="1100" b="1" i="0" u="none" strike="noStrike" cap="none" normalizeH="0" baseline="0" dirty="0" smtClean="0">
-                <a:ln>
-                  <a:noFill/>
-                </a:ln>
-                <a:solidFill>
-                  <a:srgbClr val="000080"/>
-                </a:solidFill>
-                <a:effectLst/>
-                <a:latin typeface="Courier New" panose="02070309020205020404" pitchFamily="49" charset="0"/>
-                <a:cs typeface="Courier New" panose="02070309020205020404" pitchFamily="49" charset="0"/>
-              </a:rPr>
-              <a:t> </a:t>
-            </a:r>
-            <a:r>
-              <a:rPr kumimoji="0" lang="en-US" altLang="en-US" sz="1100" b="0" i="0" u="none" strike="noStrike" cap="none" normalizeH="0" baseline="0" dirty="0" smtClean="0">
-                <a:ln>
-                  <a:noFill/>
-                </a:ln>
-                <a:solidFill>
-                  <a:srgbClr val="000000"/>
-                </a:solidFill>
-                <a:effectLst/>
-                <a:latin typeface="Courier New" panose="02070309020205020404" pitchFamily="49" charset="0"/>
-                <a:cs typeface="Courier New" panose="02070309020205020404" pitchFamily="49" charset="0"/>
-              </a:rPr>
-              <a:t>have(f: =&gt; </a:t>
-            </a:r>
-            <a:r>
-              <a:rPr kumimoji="0" lang="en-US" altLang="en-US" sz="1100" b="0" i="0" u="none" strike="noStrike" cap="none" normalizeH="0" baseline="0" dirty="0" smtClean="0">
-                <a:ln>
-                  <a:noFill/>
-                </a:ln>
-                <a:solidFill>
-                  <a:srgbClr val="CC7832"/>
-                </a:solidFill>
-                <a:effectLst/>
-                <a:latin typeface="Courier New" panose="02070309020205020404" pitchFamily="49" charset="0"/>
-                <a:cs typeface="Courier New" panose="02070309020205020404" pitchFamily="49" charset="0"/>
-              </a:rPr>
-              <a:t>Unit</a:t>
-            </a:r>
-            <a:r>
-              <a:rPr kumimoji="0" lang="en-US" altLang="en-US" sz="1100" b="0" i="0" u="none" strike="noStrike" cap="none" normalizeH="0" baseline="0" dirty="0" smtClean="0">
-                <a:ln>
-                  <a:noFill/>
-                </a:ln>
-                <a:solidFill>
-                  <a:srgbClr val="000000"/>
-                </a:solidFill>
-                <a:effectLst/>
-                <a:latin typeface="Courier New" panose="02070309020205020404" pitchFamily="49" charset="0"/>
-                <a:cs typeface="Courier New" panose="02070309020205020404" pitchFamily="49" charset="0"/>
-              </a:rPr>
-              <a:t>) = </a:t>
-            </a:r>
-            <a:r>
-              <a:rPr kumimoji="0" lang="en-US" altLang="en-US" sz="1100" b="1" i="0" u="none" strike="noStrike" cap="none" normalizeH="0" baseline="0" dirty="0" smtClean="0">
-                <a:ln>
-                  <a:noFill/>
-                </a:ln>
-                <a:solidFill>
-                  <a:srgbClr val="000080"/>
-                </a:solidFill>
-                <a:effectLst/>
-                <a:latin typeface="Courier New" panose="02070309020205020404" pitchFamily="49" charset="0"/>
-                <a:cs typeface="Courier New" panose="02070309020205020404" pitchFamily="49" charset="0"/>
-              </a:rPr>
-              <a:t>new </a:t>
-            </a:r>
-            <a:r>
-              <a:rPr kumimoji="0" lang="en-US" altLang="en-US" sz="1100" b="0" i="0" u="none" strike="noStrike" cap="none" normalizeH="0" baseline="0" dirty="0" smtClean="0">
-                <a:ln>
-                  <a:noFill/>
-                </a:ln>
-                <a:solidFill>
-                  <a:srgbClr val="000000"/>
-                </a:solidFill>
-                <a:effectLst/>
-                <a:latin typeface="Courier New" panose="02070309020205020404" pitchFamily="49" charset="0"/>
-                <a:cs typeface="Courier New" panose="02070309020205020404" pitchFamily="49" charset="0"/>
-              </a:rPr>
-              <a:t>{</a:t>
-            </a:r>
-            <a:br>
-              <a:rPr kumimoji="0" lang="en-US" altLang="en-US" sz="1100" b="0" i="0" u="none" strike="noStrike" cap="none" normalizeH="0" baseline="0" dirty="0" smtClean="0">
-                <a:ln>
-                  <a:noFill/>
-                </a:ln>
-                <a:solidFill>
-                  <a:srgbClr val="000000"/>
-                </a:solidFill>
-                <a:effectLst/>
-                <a:latin typeface="Courier New" panose="02070309020205020404" pitchFamily="49" charset="0"/>
-                <a:cs typeface="Courier New" panose="02070309020205020404" pitchFamily="49" charset="0"/>
-              </a:rPr>
-            </a:br>
-            <a:r>
-              <a:rPr kumimoji="0" lang="en-US" altLang="en-US" sz="1100" b="0" i="0" u="none" strike="noStrike" cap="none" normalizeH="0" baseline="0" dirty="0" smtClean="0">
-                <a:ln>
-                  <a:noFill/>
-                </a:ln>
-                <a:solidFill>
-                  <a:srgbClr val="000000"/>
-                </a:solidFill>
-                <a:effectLst/>
-                <a:latin typeface="Courier New" panose="02070309020205020404" pitchFamily="49" charset="0"/>
-                <a:cs typeface="Courier New" panose="02070309020205020404" pitchFamily="49" charset="0"/>
-              </a:rPr>
-              <a:t>    </a:t>
-            </a:r>
-            <a:r>
-              <a:rPr kumimoji="0" lang="en-US" altLang="en-US" sz="1100" b="1" i="0" u="none" strike="noStrike" cap="none" normalizeH="0" baseline="0" dirty="0" err="1" smtClean="0">
-                <a:ln>
-                  <a:noFill/>
-                </a:ln>
-                <a:solidFill>
-                  <a:srgbClr val="000080"/>
-                </a:solidFill>
-                <a:effectLst/>
-                <a:latin typeface="Courier New" panose="02070309020205020404" pitchFamily="49" charset="0"/>
-                <a:cs typeface="Courier New" panose="02070309020205020404" pitchFamily="49" charset="0"/>
-              </a:rPr>
-              <a:t>def</a:t>
-            </a:r>
-            <a:r>
-              <a:rPr kumimoji="0" lang="en-US" altLang="en-US" sz="1100" b="1" i="0" u="none" strike="noStrike" cap="none" normalizeH="0" baseline="0" dirty="0" smtClean="0">
-                <a:ln>
-                  <a:noFill/>
-                </a:ln>
-                <a:solidFill>
-                  <a:srgbClr val="000080"/>
-                </a:solidFill>
-                <a:effectLst/>
-                <a:latin typeface="Courier New" panose="02070309020205020404" pitchFamily="49" charset="0"/>
-                <a:cs typeface="Courier New" panose="02070309020205020404" pitchFamily="49" charset="0"/>
-              </a:rPr>
-              <a:t> </a:t>
-            </a:r>
-            <a:r>
-              <a:rPr kumimoji="0" lang="en-US" altLang="en-US" sz="1100" b="0" i="0" u="none" strike="noStrike" cap="none" normalizeH="0" baseline="0" dirty="0" err="1" smtClean="0">
-                <a:ln>
-                  <a:noFill/>
-                </a:ln>
-                <a:solidFill>
-                  <a:srgbClr val="000000"/>
-                </a:solidFill>
-                <a:effectLst/>
-                <a:latin typeface="Courier New" panose="02070309020205020404" pitchFamily="49" charset="0"/>
-                <a:cs typeface="Courier New" panose="02070309020205020404" pitchFamily="49" charset="0"/>
-              </a:rPr>
-              <a:t>til</a:t>
-            </a:r>
-            <a:r>
-              <a:rPr kumimoji="0" lang="en-US" altLang="en-US" sz="1100" b="0" i="0" u="none" strike="noStrike" cap="none" normalizeH="0" baseline="0" dirty="0" smtClean="0">
-                <a:ln>
-                  <a:noFill/>
-                </a:ln>
-                <a:solidFill>
-                  <a:srgbClr val="000000"/>
-                </a:solidFill>
-                <a:effectLst/>
-                <a:latin typeface="Courier New" panose="02070309020205020404" pitchFamily="49" charset="0"/>
-                <a:cs typeface="Courier New" panose="02070309020205020404" pitchFamily="49" charset="0"/>
-              </a:rPr>
-              <a:t>(c: =&gt; </a:t>
-            </a:r>
-            <a:r>
-              <a:rPr kumimoji="0" lang="en-US" altLang="en-US" sz="1100" b="0" i="0" u="none" strike="noStrike" cap="none" normalizeH="0" baseline="0" dirty="0" smtClean="0">
-                <a:ln>
-                  <a:noFill/>
-                </a:ln>
-                <a:solidFill>
-                  <a:srgbClr val="CC7832"/>
-                </a:solidFill>
-                <a:effectLst/>
-                <a:latin typeface="Courier New" panose="02070309020205020404" pitchFamily="49" charset="0"/>
-                <a:cs typeface="Courier New" panose="02070309020205020404" pitchFamily="49" charset="0"/>
-              </a:rPr>
-              <a:t>Boolean</a:t>
-            </a:r>
-            <a:r>
-              <a:rPr kumimoji="0" lang="en-US" altLang="en-US" sz="1100" b="0" i="0" u="none" strike="noStrike" cap="none" normalizeH="0" baseline="0" dirty="0" smtClean="0">
-                <a:ln>
-                  <a:noFill/>
-                </a:ln>
-                <a:solidFill>
-                  <a:srgbClr val="000000"/>
-                </a:solidFill>
-                <a:effectLst/>
-                <a:latin typeface="Courier New" panose="02070309020205020404" pitchFamily="49" charset="0"/>
-                <a:cs typeface="Courier New" panose="02070309020205020404" pitchFamily="49" charset="0"/>
-              </a:rPr>
-              <a:t>) = {</a:t>
-            </a:r>
-            <a:r>
-              <a:rPr kumimoji="0" lang="en-US" altLang="en-US" sz="1100" b="1" i="0" u="none" strike="noStrike" cap="none" normalizeH="0" baseline="0" dirty="0" smtClean="0">
-                <a:ln>
-                  <a:noFill/>
-                </a:ln>
-                <a:solidFill>
-                  <a:srgbClr val="000080"/>
-                </a:solidFill>
-                <a:effectLst/>
-                <a:latin typeface="Courier New" panose="02070309020205020404" pitchFamily="49" charset="0"/>
-                <a:cs typeface="Courier New" panose="02070309020205020404" pitchFamily="49" charset="0"/>
-              </a:rPr>
-              <a:t>do</a:t>
-            </a:r>
-            <a:r>
-              <a:rPr kumimoji="0" lang="en-US" altLang="en-US" sz="1100" b="0" i="0" u="none" strike="noStrike" cap="none" normalizeH="0" baseline="0" dirty="0" smtClean="0">
-                <a:ln>
-                  <a:noFill/>
-                </a:ln>
-                <a:solidFill>
-                  <a:srgbClr val="000000"/>
-                </a:solidFill>
-                <a:effectLst/>
-                <a:latin typeface="Courier New" panose="02070309020205020404" pitchFamily="49" charset="0"/>
-                <a:cs typeface="Courier New" panose="02070309020205020404" pitchFamily="49" charset="0"/>
-              </a:rPr>
-              <a:t>{f} </a:t>
-            </a:r>
-            <a:r>
-              <a:rPr kumimoji="0" lang="en-US" altLang="en-US" sz="1100" b="1" i="0" u="none" strike="noStrike" cap="none" normalizeH="0" baseline="0" dirty="0" smtClean="0">
-                <a:ln>
-                  <a:noFill/>
-                </a:ln>
-                <a:solidFill>
-                  <a:srgbClr val="000080"/>
-                </a:solidFill>
-                <a:effectLst/>
-                <a:latin typeface="Courier New" panose="02070309020205020404" pitchFamily="49" charset="0"/>
-                <a:cs typeface="Courier New" panose="02070309020205020404" pitchFamily="49" charset="0"/>
-              </a:rPr>
-              <a:t>while </a:t>
-            </a:r>
-            <a:r>
-              <a:rPr kumimoji="0" lang="en-US" altLang="en-US" sz="1100" b="0" i="0" u="none" strike="noStrike" cap="none" normalizeH="0" baseline="0" dirty="0" smtClean="0">
-                <a:ln>
-                  <a:noFill/>
-                </a:ln>
-                <a:solidFill>
-                  <a:srgbClr val="000000"/>
-                </a:solidFill>
-                <a:effectLst/>
-                <a:latin typeface="Courier New" panose="02070309020205020404" pitchFamily="49" charset="0"/>
-                <a:cs typeface="Courier New" panose="02070309020205020404" pitchFamily="49" charset="0"/>
-              </a:rPr>
-              <a:t>(!c)}</a:t>
-            </a:r>
-            <a:br>
-              <a:rPr kumimoji="0" lang="en-US" altLang="en-US" sz="1100" b="0" i="0" u="none" strike="noStrike" cap="none" normalizeH="0" baseline="0" dirty="0" smtClean="0">
-                <a:ln>
-                  <a:noFill/>
-                </a:ln>
-                <a:solidFill>
-                  <a:srgbClr val="000000"/>
-                </a:solidFill>
-                <a:effectLst/>
-                <a:latin typeface="Courier New" panose="02070309020205020404" pitchFamily="49" charset="0"/>
-                <a:cs typeface="Courier New" panose="02070309020205020404" pitchFamily="49" charset="0"/>
-              </a:rPr>
-            </a:br>
-            <a:r>
-              <a:rPr kumimoji="0" lang="en-US" altLang="en-US" sz="1100" b="0" i="0" u="none" strike="noStrike" cap="none" normalizeH="0" baseline="0" dirty="0" smtClean="0">
-                <a:ln>
-                  <a:noFill/>
-                </a:ln>
-                <a:solidFill>
-                  <a:srgbClr val="000000"/>
-                </a:solidFill>
-                <a:effectLst/>
-                <a:latin typeface="Courier New" panose="02070309020205020404" pitchFamily="49" charset="0"/>
-                <a:cs typeface="Courier New" panose="02070309020205020404" pitchFamily="49" charset="0"/>
-              </a:rPr>
-              <a:t>  }</a:t>
-            </a:r>
-            <a:br>
-              <a:rPr kumimoji="0" lang="en-US" altLang="en-US" sz="1100" b="0" i="0" u="none" strike="noStrike" cap="none" normalizeH="0" baseline="0" dirty="0" smtClean="0">
-                <a:ln>
-                  <a:noFill/>
-                </a:ln>
-                <a:solidFill>
-                  <a:srgbClr val="000000"/>
-                </a:solidFill>
-                <a:effectLst/>
-                <a:latin typeface="Courier New" panose="02070309020205020404" pitchFamily="49" charset="0"/>
-                <a:cs typeface="Courier New" panose="02070309020205020404" pitchFamily="49" charset="0"/>
-              </a:rPr>
-            </a:br>
-            <a:r>
-              <a:rPr kumimoji="0" lang="en-US" altLang="en-US" sz="1100" b="0" i="0" u="none" strike="noStrike" cap="none" normalizeH="0" baseline="0" dirty="0" smtClean="0">
-                <a:ln>
-                  <a:noFill/>
-                </a:ln>
-                <a:solidFill>
-                  <a:srgbClr val="000000"/>
-                </a:solidFill>
-                <a:effectLst/>
-                <a:latin typeface="Courier New" panose="02070309020205020404" pitchFamily="49" charset="0"/>
-                <a:cs typeface="Courier New" panose="02070309020205020404" pitchFamily="49" charset="0"/>
-              </a:rPr>
-              <a:t>}</a:t>
-            </a:r>
-            <a:br>
-              <a:rPr kumimoji="0" lang="en-US" altLang="en-US" sz="1100" b="0" i="0" u="none" strike="noStrike" cap="none" normalizeH="0" baseline="0" dirty="0" smtClean="0">
-                <a:ln>
-                  <a:noFill/>
-                </a:ln>
-                <a:solidFill>
-                  <a:srgbClr val="000000"/>
-                </a:solidFill>
-                <a:effectLst/>
-                <a:latin typeface="Courier New" panose="02070309020205020404" pitchFamily="49" charset="0"/>
-                <a:cs typeface="Courier New" panose="02070309020205020404" pitchFamily="49" charset="0"/>
-              </a:rPr>
-            </a:br>
-            <a:r>
-              <a:rPr kumimoji="0" lang="en-US" altLang="en-US" sz="1100" b="0" i="0" u="none" strike="noStrike" cap="none" normalizeH="0" baseline="0" dirty="0" smtClean="0">
-                <a:ln>
-                  <a:noFill/>
-                </a:ln>
-                <a:solidFill>
-                  <a:srgbClr val="000000"/>
-                </a:solidFill>
-                <a:effectLst/>
-                <a:latin typeface="Courier New" panose="02070309020205020404" pitchFamily="49" charset="0"/>
-                <a:cs typeface="Courier New" panose="02070309020205020404" pitchFamily="49" charset="0"/>
-              </a:rPr>
-              <a:t/>
-            </a:r>
-            <a:br>
-              <a:rPr kumimoji="0" lang="en-US" altLang="en-US" sz="1100" b="0" i="0" u="none" strike="noStrike" cap="none" normalizeH="0" baseline="0" dirty="0" smtClean="0">
-                <a:ln>
-                  <a:noFill/>
-                </a:ln>
-                <a:solidFill>
-                  <a:srgbClr val="000000"/>
-                </a:solidFill>
-                <a:effectLst/>
-                <a:latin typeface="Courier New" panose="02070309020205020404" pitchFamily="49" charset="0"/>
-                <a:cs typeface="Courier New" panose="02070309020205020404" pitchFamily="49" charset="0"/>
-              </a:rPr>
-            </a:br>
-            <a:r>
-              <a:rPr kumimoji="0" lang="en-US" altLang="en-US" sz="1100" b="1" i="0" u="none" strike="noStrike" cap="none" normalizeH="0" baseline="0" dirty="0" smtClean="0">
-                <a:ln>
-                  <a:noFill/>
-                </a:ln>
-                <a:solidFill>
-                  <a:srgbClr val="000080"/>
-                </a:solidFill>
-                <a:effectLst/>
-                <a:latin typeface="Courier New" panose="02070309020205020404" pitchFamily="49" charset="0"/>
-                <a:cs typeface="Courier New" panose="02070309020205020404" pitchFamily="49" charset="0"/>
-              </a:rPr>
-              <a:t>case class </a:t>
-            </a:r>
-            <a:r>
-              <a:rPr kumimoji="0" lang="en-US" altLang="en-US" sz="1100" b="0" i="0" u="none" strike="noStrike" cap="none" normalizeH="0" baseline="0" dirty="0" err="1" smtClean="0">
-                <a:ln>
-                  <a:noFill/>
-                </a:ln>
-                <a:solidFill>
-                  <a:srgbClr val="000000"/>
-                </a:solidFill>
-                <a:effectLst/>
-                <a:latin typeface="Courier New" panose="02070309020205020404" pitchFamily="49" charset="0"/>
-                <a:cs typeface="Courier New" panose="02070309020205020404" pitchFamily="49" charset="0"/>
-              </a:rPr>
-              <a:t>TBird</a:t>
-            </a:r>
-            <a:r>
-              <a:rPr kumimoji="0" lang="en-US" altLang="en-US" sz="1100" b="0" i="0" u="none" strike="noStrike" cap="none" normalizeH="0" baseline="0" dirty="0" smtClean="0">
-                <a:ln>
-                  <a:noFill/>
-                </a:ln>
-                <a:solidFill>
-                  <a:srgbClr val="000000"/>
-                </a:solidFill>
-                <a:effectLst/>
-                <a:latin typeface="Courier New" panose="02070309020205020404" pitchFamily="49" charset="0"/>
-                <a:cs typeface="Courier New" panose="02070309020205020404" pitchFamily="49" charset="0"/>
-              </a:rPr>
-              <a:t>(){</a:t>
-            </a:r>
-            <a:br>
-              <a:rPr kumimoji="0" lang="en-US" altLang="en-US" sz="1100" b="0" i="0" u="none" strike="noStrike" cap="none" normalizeH="0" baseline="0" dirty="0" smtClean="0">
-                <a:ln>
-                  <a:noFill/>
-                </a:ln>
-                <a:solidFill>
-                  <a:srgbClr val="000000"/>
-                </a:solidFill>
-                <a:effectLst/>
-                <a:latin typeface="Courier New" panose="02070309020205020404" pitchFamily="49" charset="0"/>
-                <a:cs typeface="Courier New" panose="02070309020205020404" pitchFamily="49" charset="0"/>
-              </a:rPr>
-            </a:br>
-            <a:r>
-              <a:rPr kumimoji="0" lang="en-US" altLang="en-US" sz="1100" b="0" i="0" u="none" strike="noStrike" cap="none" normalizeH="0" baseline="0" dirty="0" smtClean="0">
-                <a:ln>
-                  <a:noFill/>
-                </a:ln>
-                <a:solidFill>
-                  <a:srgbClr val="000000"/>
-                </a:solidFill>
-                <a:effectLst/>
-                <a:latin typeface="Courier New" panose="02070309020205020404" pitchFamily="49" charset="0"/>
-                <a:cs typeface="Courier New" panose="02070309020205020404" pitchFamily="49" charset="0"/>
-              </a:rPr>
-              <a:t/>
-            </a:r>
-            <a:br>
-              <a:rPr kumimoji="0" lang="en-US" altLang="en-US" sz="1100" b="0" i="0" u="none" strike="noStrike" cap="none" normalizeH="0" baseline="0" dirty="0" smtClean="0">
-                <a:ln>
-                  <a:noFill/>
-                </a:ln>
-                <a:solidFill>
-                  <a:srgbClr val="000000"/>
-                </a:solidFill>
-                <a:effectLst/>
-                <a:latin typeface="Courier New" panose="02070309020205020404" pitchFamily="49" charset="0"/>
-                <a:cs typeface="Courier New" panose="02070309020205020404" pitchFamily="49" charset="0"/>
-              </a:rPr>
-            </a:br>
-            <a:r>
-              <a:rPr kumimoji="0" lang="en-US" altLang="en-US" sz="1100" b="0" i="0" u="none" strike="noStrike" cap="none" normalizeH="0" baseline="0" dirty="0" smtClean="0">
-                <a:ln>
-                  <a:noFill/>
-                </a:ln>
-                <a:solidFill>
-                  <a:srgbClr val="000000"/>
-                </a:solidFill>
-                <a:effectLst/>
-                <a:latin typeface="Courier New" panose="02070309020205020404" pitchFamily="49" charset="0"/>
-                <a:cs typeface="Courier New" panose="02070309020205020404" pitchFamily="49" charset="0"/>
-              </a:rPr>
-              <a:t>}</a:t>
-            </a:r>
-            <a:br>
-              <a:rPr kumimoji="0" lang="en-US" altLang="en-US" sz="1100" b="0" i="0" u="none" strike="noStrike" cap="none" normalizeH="0" baseline="0" dirty="0" smtClean="0">
-                <a:ln>
-                  <a:noFill/>
-                </a:ln>
-                <a:solidFill>
-                  <a:srgbClr val="000000"/>
-                </a:solidFill>
-                <a:effectLst/>
-                <a:latin typeface="Courier New" panose="02070309020205020404" pitchFamily="49" charset="0"/>
-                <a:cs typeface="Courier New" panose="02070309020205020404" pitchFamily="49" charset="0"/>
-              </a:rPr>
-            </a:br>
-            <a:r>
-              <a:rPr kumimoji="0" lang="en-US" altLang="en-US" sz="1100" b="0" i="0" u="none" strike="noStrike" cap="none" normalizeH="0" baseline="0" dirty="0" smtClean="0">
-                <a:ln>
-                  <a:noFill/>
-                </a:ln>
-                <a:solidFill>
-                  <a:srgbClr val="000000"/>
-                </a:solidFill>
-                <a:effectLst/>
-                <a:latin typeface="Courier New" panose="02070309020205020404" pitchFamily="49" charset="0"/>
-                <a:cs typeface="Courier New" panose="02070309020205020404" pitchFamily="49" charset="0"/>
-              </a:rPr>
-              <a:t/>
-            </a:r>
-            <a:br>
-              <a:rPr kumimoji="0" lang="en-US" altLang="en-US" sz="1100" b="0" i="0" u="none" strike="noStrike" cap="none" normalizeH="0" baseline="0" dirty="0" smtClean="0">
-                <a:ln>
-                  <a:noFill/>
-                </a:ln>
-                <a:solidFill>
-                  <a:srgbClr val="000000"/>
-                </a:solidFill>
-                <a:effectLst/>
-                <a:latin typeface="Courier New" panose="02070309020205020404" pitchFamily="49" charset="0"/>
-                <a:cs typeface="Courier New" panose="02070309020205020404" pitchFamily="49" charset="0"/>
-              </a:rPr>
-            </a:br>
-            <a:r>
-              <a:rPr kumimoji="0" lang="en-US" altLang="en-US" sz="1100" b="1" i="0" u="none" strike="noStrike" cap="none" normalizeH="0" baseline="0" dirty="0" smtClean="0">
-                <a:ln>
-                  <a:noFill/>
-                </a:ln>
-                <a:solidFill>
-                  <a:srgbClr val="000080"/>
-                </a:solidFill>
-                <a:effectLst/>
-                <a:latin typeface="Courier New" panose="02070309020205020404" pitchFamily="49" charset="0"/>
-                <a:cs typeface="Courier New" panose="02070309020205020404" pitchFamily="49" charset="0"/>
-              </a:rPr>
-              <a:t>case class </a:t>
-            </a:r>
-            <a:r>
-              <a:rPr kumimoji="0" lang="en-US" altLang="en-US" sz="1100" b="0" i="0" u="none" strike="noStrike" cap="none" normalizeH="0" baseline="0" dirty="0" smtClean="0">
-                <a:ln>
-                  <a:noFill/>
-                </a:ln>
-                <a:solidFill>
-                  <a:srgbClr val="000000"/>
-                </a:solidFill>
-                <a:effectLst/>
-                <a:latin typeface="Courier New" panose="02070309020205020404" pitchFamily="49" charset="0"/>
-                <a:cs typeface="Courier New" panose="02070309020205020404" pitchFamily="49" charset="0"/>
-              </a:rPr>
-              <a:t>Daddy(){</a:t>
-            </a:r>
-            <a:br>
-              <a:rPr kumimoji="0" lang="en-US" altLang="en-US" sz="1100" b="0" i="0" u="none" strike="noStrike" cap="none" normalizeH="0" baseline="0" dirty="0" smtClean="0">
-                <a:ln>
-                  <a:noFill/>
-                </a:ln>
-                <a:solidFill>
-                  <a:srgbClr val="000000"/>
-                </a:solidFill>
-                <a:effectLst/>
-                <a:latin typeface="Courier New" panose="02070309020205020404" pitchFamily="49" charset="0"/>
-                <a:cs typeface="Courier New" panose="02070309020205020404" pitchFamily="49" charset="0"/>
-              </a:rPr>
-            </a:br>
-            <a:r>
-              <a:rPr kumimoji="0" lang="en-US" altLang="en-US" sz="1100" b="0" i="0" u="none" strike="noStrike" cap="none" normalizeH="0" baseline="0" dirty="0" smtClean="0">
-                <a:ln>
-                  <a:noFill/>
-                </a:ln>
-                <a:solidFill>
-                  <a:srgbClr val="000000"/>
-                </a:solidFill>
-                <a:effectLst/>
-                <a:latin typeface="Courier New" panose="02070309020205020404" pitchFamily="49" charset="0"/>
-                <a:cs typeface="Courier New" panose="02070309020205020404" pitchFamily="49" charset="0"/>
-              </a:rPr>
-              <a:t>  </a:t>
-            </a:r>
-            <a:r>
-              <a:rPr kumimoji="0" lang="en-US" altLang="en-US" sz="1100" b="1" i="0" u="none" strike="noStrike" cap="none" normalizeH="0" baseline="0" dirty="0" err="1" smtClean="0">
-                <a:ln>
-                  <a:noFill/>
-                </a:ln>
-                <a:solidFill>
-                  <a:srgbClr val="000080"/>
-                </a:solidFill>
-                <a:effectLst/>
-                <a:latin typeface="Courier New" panose="02070309020205020404" pitchFamily="49" charset="0"/>
-                <a:cs typeface="Courier New" panose="02070309020205020404" pitchFamily="49" charset="0"/>
-              </a:rPr>
-              <a:t>def</a:t>
-            </a:r>
-            <a:r>
-              <a:rPr kumimoji="0" lang="en-US" altLang="en-US" sz="1100" b="1" i="0" u="none" strike="noStrike" cap="none" normalizeH="0" baseline="0" dirty="0" smtClean="0">
-                <a:ln>
-                  <a:noFill/>
-                </a:ln>
-                <a:solidFill>
-                  <a:srgbClr val="000080"/>
-                </a:solidFill>
-                <a:effectLst/>
-                <a:latin typeface="Courier New" panose="02070309020205020404" pitchFamily="49" charset="0"/>
-                <a:cs typeface="Courier New" panose="02070309020205020404" pitchFamily="49" charset="0"/>
-              </a:rPr>
-              <a:t> </a:t>
-            </a:r>
-            <a:r>
-              <a:rPr kumimoji="0" lang="en-US" altLang="en-US" sz="1100" b="0" i="0" u="none" strike="noStrike" cap="none" normalizeH="0" baseline="0" dirty="0" err="1" smtClean="0">
-                <a:ln>
-                  <a:noFill/>
-                </a:ln>
-                <a:solidFill>
-                  <a:srgbClr val="000000"/>
-                </a:solidFill>
-                <a:effectLst/>
-                <a:latin typeface="Courier New" panose="02070309020205020404" pitchFamily="49" charset="0"/>
-                <a:cs typeface="Courier New" panose="02070309020205020404" pitchFamily="49" charset="0"/>
-              </a:rPr>
-              <a:t>takeAway</a:t>
-            </a:r>
-            <a:r>
-              <a:rPr kumimoji="0" lang="en-US" altLang="en-US" sz="1100" b="0" i="0" u="none" strike="noStrike" cap="none" normalizeH="0" baseline="0" dirty="0" smtClean="0">
-                <a:ln>
-                  <a:noFill/>
-                </a:ln>
-                <a:solidFill>
-                  <a:srgbClr val="000000"/>
-                </a:solidFill>
-                <a:effectLst/>
-                <a:latin typeface="Courier New" panose="02070309020205020404" pitchFamily="49" charset="0"/>
-                <a:cs typeface="Courier New" panose="02070309020205020404" pitchFamily="49" charset="0"/>
-              </a:rPr>
-              <a:t>(t: </a:t>
-            </a:r>
-            <a:r>
-              <a:rPr kumimoji="0" lang="en-US" altLang="en-US" sz="1100" b="0" i="0" u="none" strike="noStrike" cap="none" normalizeH="0" baseline="0" dirty="0" err="1" smtClean="0">
-                <a:ln>
-                  <a:noFill/>
-                </a:ln>
-                <a:solidFill>
-                  <a:srgbClr val="000000"/>
-                </a:solidFill>
-                <a:effectLst/>
-                <a:latin typeface="Courier New" panose="02070309020205020404" pitchFamily="49" charset="0"/>
-                <a:cs typeface="Courier New" panose="02070309020205020404" pitchFamily="49" charset="0"/>
-              </a:rPr>
-              <a:t>TBird</a:t>
-            </a:r>
-            <a:r>
-              <a:rPr kumimoji="0" lang="en-US" altLang="en-US" sz="1100" b="0" i="0" u="none" strike="noStrike" cap="none" normalizeH="0" baseline="0" dirty="0" smtClean="0">
-                <a:ln>
-                  <a:noFill/>
-                </a:ln>
-                <a:solidFill>
-                  <a:srgbClr val="000000"/>
-                </a:solidFill>
-                <a:effectLst/>
-                <a:latin typeface="Courier New" panose="02070309020205020404" pitchFamily="49" charset="0"/>
-                <a:cs typeface="Courier New" panose="02070309020205020404" pitchFamily="49" charset="0"/>
-              </a:rPr>
-              <a:t>) = {</a:t>
-            </a:r>
-            <a:br>
-              <a:rPr kumimoji="0" lang="en-US" altLang="en-US" sz="1100" b="0" i="0" u="none" strike="noStrike" cap="none" normalizeH="0" baseline="0" dirty="0" smtClean="0">
-                <a:ln>
-                  <a:noFill/>
-                </a:ln>
-                <a:solidFill>
-                  <a:srgbClr val="000000"/>
-                </a:solidFill>
-                <a:effectLst/>
-                <a:latin typeface="Courier New" panose="02070309020205020404" pitchFamily="49" charset="0"/>
-                <a:cs typeface="Courier New" panose="02070309020205020404" pitchFamily="49" charset="0"/>
-              </a:rPr>
-            </a:br>
-            <a:r>
-              <a:rPr kumimoji="0" lang="en-US" altLang="en-US" sz="1100" b="0" i="0" u="none" strike="noStrike" cap="none" normalizeH="0" baseline="0" dirty="0" smtClean="0">
-                <a:ln>
-                  <a:noFill/>
-                </a:ln>
-                <a:solidFill>
-                  <a:srgbClr val="000000"/>
-                </a:solidFill>
-                <a:effectLst/>
-                <a:latin typeface="Courier New" panose="02070309020205020404" pitchFamily="49" charset="0"/>
-                <a:cs typeface="Courier New" panose="02070309020205020404" pitchFamily="49" charset="0"/>
-              </a:rPr>
-              <a:t>    </a:t>
-            </a:r>
-            <a:r>
-              <a:rPr kumimoji="0" lang="en-US" altLang="en-US" sz="1100" b="0" i="1" u="none" strike="noStrike" cap="none" normalizeH="0" baseline="0" dirty="0" err="1" smtClean="0">
-                <a:ln>
-                  <a:noFill/>
-                </a:ln>
-                <a:solidFill>
-                  <a:srgbClr val="000000"/>
-                </a:solidFill>
-                <a:effectLst/>
-                <a:latin typeface="Courier New" panose="02070309020205020404" pitchFamily="49" charset="0"/>
-                <a:cs typeface="Courier New" panose="02070309020205020404" pitchFamily="49" charset="0"/>
-              </a:rPr>
-              <a:t>println</a:t>
-            </a:r>
-            <a:r>
-              <a:rPr kumimoji="0" lang="en-US" altLang="en-US" sz="1100" b="0" i="0" u="none" strike="noStrike" cap="none" normalizeH="0" baseline="0" dirty="0" smtClean="0">
-                <a:ln>
-                  <a:noFill/>
-                </a:ln>
-                <a:solidFill>
-                  <a:srgbClr val="000000"/>
-                </a:solidFill>
-                <a:effectLst/>
-                <a:latin typeface="Courier New" panose="02070309020205020404" pitchFamily="49" charset="0"/>
-                <a:cs typeface="Courier New" panose="02070309020205020404" pitchFamily="49" charset="0"/>
-              </a:rPr>
-              <a:t>(</a:t>
-            </a:r>
-            <a:r>
-              <a:rPr kumimoji="0" lang="en-US" altLang="en-US" sz="1100" b="1" i="0" u="none" strike="noStrike" cap="none" normalizeH="0" baseline="0" dirty="0" smtClean="0">
-                <a:ln>
-                  <a:noFill/>
-                </a:ln>
-                <a:solidFill>
-                  <a:srgbClr val="008000"/>
-                </a:solidFill>
-                <a:effectLst/>
-                <a:latin typeface="Courier New" panose="02070309020205020404" pitchFamily="49" charset="0"/>
-                <a:cs typeface="Courier New" panose="02070309020205020404" pitchFamily="49" charset="0"/>
-              </a:rPr>
-              <a:t>"Daddy took the T-Bird away."</a:t>
-            </a:r>
-            <a:r>
-              <a:rPr kumimoji="0" lang="en-US" altLang="en-US" sz="1100" b="0" i="0" u="none" strike="noStrike" cap="none" normalizeH="0" baseline="0" dirty="0" smtClean="0">
-                <a:ln>
-                  <a:noFill/>
-                </a:ln>
-                <a:solidFill>
-                  <a:srgbClr val="000000"/>
-                </a:solidFill>
-                <a:effectLst/>
-                <a:latin typeface="Courier New" panose="02070309020205020404" pitchFamily="49" charset="0"/>
-                <a:cs typeface="Courier New" panose="02070309020205020404" pitchFamily="49" charset="0"/>
-              </a:rPr>
-              <a:t>)</a:t>
-            </a:r>
-            <a:br>
-              <a:rPr kumimoji="0" lang="en-US" altLang="en-US" sz="1100" b="0" i="0" u="none" strike="noStrike" cap="none" normalizeH="0" baseline="0" dirty="0" smtClean="0">
-                <a:ln>
-                  <a:noFill/>
-                </a:ln>
-                <a:solidFill>
-                  <a:srgbClr val="000000"/>
-                </a:solidFill>
-                <a:effectLst/>
-                <a:latin typeface="Courier New" panose="02070309020205020404" pitchFamily="49" charset="0"/>
-                <a:cs typeface="Courier New" panose="02070309020205020404" pitchFamily="49" charset="0"/>
-              </a:rPr>
-            </a:br>
-            <a:r>
-              <a:rPr kumimoji="0" lang="en-US" altLang="en-US" sz="1100" b="0" i="0" u="none" strike="noStrike" cap="none" normalizeH="0" baseline="0" dirty="0" smtClean="0">
-                <a:ln>
-                  <a:noFill/>
-                </a:ln>
-                <a:solidFill>
-                  <a:srgbClr val="000000"/>
-                </a:solidFill>
-                <a:effectLst/>
-                <a:latin typeface="Courier New" panose="02070309020205020404" pitchFamily="49" charset="0"/>
-                <a:cs typeface="Courier New" panose="02070309020205020404" pitchFamily="49" charset="0"/>
-              </a:rPr>
-              <a:t>    </a:t>
-            </a:r>
-            <a:r>
-              <a:rPr kumimoji="0" lang="en-US" altLang="en-US" sz="1100" b="1" i="0" u="none" strike="noStrike" cap="none" normalizeH="0" baseline="0" dirty="0" smtClean="0">
-                <a:ln>
-                  <a:noFill/>
-                </a:ln>
-                <a:solidFill>
-                  <a:srgbClr val="000080"/>
-                </a:solidFill>
-                <a:effectLst/>
-                <a:latin typeface="Courier New" panose="02070309020205020404" pitchFamily="49" charset="0"/>
-                <a:cs typeface="Courier New" panose="02070309020205020404" pitchFamily="49" charset="0"/>
-              </a:rPr>
-              <a:t>true</a:t>
-            </a:r>
-            <a:br>
-              <a:rPr kumimoji="0" lang="en-US" altLang="en-US" sz="1100" b="1" i="0" u="none" strike="noStrike" cap="none" normalizeH="0" baseline="0" dirty="0" smtClean="0">
-                <a:ln>
-                  <a:noFill/>
-                </a:ln>
-                <a:solidFill>
-                  <a:srgbClr val="000080"/>
-                </a:solidFill>
-                <a:effectLst/>
-                <a:latin typeface="Courier New" panose="02070309020205020404" pitchFamily="49" charset="0"/>
-                <a:cs typeface="Courier New" panose="02070309020205020404" pitchFamily="49" charset="0"/>
-              </a:rPr>
-            </a:br>
-            <a:r>
-              <a:rPr kumimoji="0" lang="en-US" altLang="en-US" sz="1100" b="1" i="0" u="none" strike="noStrike" cap="none" normalizeH="0" baseline="0" dirty="0" smtClean="0">
-                <a:ln>
-                  <a:noFill/>
-                </a:ln>
-                <a:solidFill>
-                  <a:srgbClr val="000080"/>
-                </a:solidFill>
-                <a:effectLst/>
-                <a:latin typeface="Courier New" panose="02070309020205020404" pitchFamily="49" charset="0"/>
-                <a:cs typeface="Courier New" panose="02070309020205020404" pitchFamily="49" charset="0"/>
-              </a:rPr>
-              <a:t>  </a:t>
-            </a:r>
-            <a:r>
-              <a:rPr kumimoji="0" lang="en-US" altLang="en-US" sz="1100" b="0" i="0" u="none" strike="noStrike" cap="none" normalizeH="0" baseline="0" dirty="0" smtClean="0">
-                <a:ln>
-                  <a:noFill/>
-                </a:ln>
-                <a:solidFill>
-                  <a:srgbClr val="000000"/>
-                </a:solidFill>
-                <a:effectLst/>
-                <a:latin typeface="Courier New" panose="02070309020205020404" pitchFamily="49" charset="0"/>
-                <a:cs typeface="Courier New" panose="02070309020205020404" pitchFamily="49" charset="0"/>
-              </a:rPr>
-              <a:t>}</a:t>
-            </a:r>
-            <a:br>
-              <a:rPr kumimoji="0" lang="en-US" altLang="en-US" sz="1100" b="0" i="0" u="none" strike="noStrike" cap="none" normalizeH="0" baseline="0" dirty="0" smtClean="0">
-                <a:ln>
-                  <a:noFill/>
-                </a:ln>
-                <a:solidFill>
-                  <a:srgbClr val="000000"/>
-                </a:solidFill>
-                <a:effectLst/>
-                <a:latin typeface="Courier New" panose="02070309020205020404" pitchFamily="49" charset="0"/>
-                <a:cs typeface="Courier New" panose="02070309020205020404" pitchFamily="49" charset="0"/>
-              </a:rPr>
-            </a:br>
-            <a:r>
-              <a:rPr kumimoji="0" lang="en-US" altLang="en-US" sz="1100" b="0" i="0" u="none" strike="noStrike" cap="none" normalizeH="0" baseline="0" dirty="0" smtClean="0">
-                <a:ln>
-                  <a:noFill/>
-                </a:ln>
-                <a:solidFill>
-                  <a:srgbClr val="000000"/>
-                </a:solidFill>
-                <a:effectLst/>
-                <a:latin typeface="Courier New" panose="02070309020205020404" pitchFamily="49" charset="0"/>
-                <a:cs typeface="Courier New" panose="02070309020205020404" pitchFamily="49" charset="0"/>
-              </a:rPr>
-              <a:t>}</a:t>
-            </a:r>
-            <a:br>
-              <a:rPr kumimoji="0" lang="en-US" altLang="en-US" sz="1100" b="0" i="0" u="none" strike="noStrike" cap="none" normalizeH="0" baseline="0" dirty="0" smtClean="0">
-                <a:ln>
-                  <a:noFill/>
-                </a:ln>
-                <a:solidFill>
-                  <a:srgbClr val="000000"/>
-                </a:solidFill>
-                <a:effectLst/>
-                <a:latin typeface="Courier New" panose="02070309020205020404" pitchFamily="49" charset="0"/>
-                <a:cs typeface="Courier New" panose="02070309020205020404" pitchFamily="49" charset="0"/>
-              </a:rPr>
-            </a:br>
-            <a:r>
-              <a:rPr kumimoji="0" lang="en-US" altLang="en-US" sz="1100" b="0" i="0" u="none" strike="noStrike" cap="none" normalizeH="0" baseline="0" dirty="0" smtClean="0">
-                <a:ln>
-                  <a:noFill/>
-                </a:ln>
-                <a:solidFill>
-                  <a:srgbClr val="000000"/>
-                </a:solidFill>
-                <a:effectLst/>
-                <a:latin typeface="Courier New" panose="02070309020205020404" pitchFamily="49" charset="0"/>
-                <a:cs typeface="Courier New" panose="02070309020205020404" pitchFamily="49" charset="0"/>
-              </a:rPr>
-              <a:t/>
-            </a:r>
-            <a:br>
-              <a:rPr kumimoji="0" lang="en-US" altLang="en-US" sz="1100" b="0" i="0" u="none" strike="noStrike" cap="none" normalizeH="0" baseline="0" dirty="0" smtClean="0">
-                <a:ln>
-                  <a:noFill/>
-                </a:ln>
-                <a:solidFill>
-                  <a:srgbClr val="000000"/>
-                </a:solidFill>
-                <a:effectLst/>
-                <a:latin typeface="Courier New" panose="02070309020205020404" pitchFamily="49" charset="0"/>
-                <a:cs typeface="Courier New" panose="02070309020205020404" pitchFamily="49" charset="0"/>
-              </a:rPr>
-            </a:br>
-            <a:r>
-              <a:rPr kumimoji="0" lang="en-US" altLang="en-US" sz="1100" b="1" i="0" u="none" strike="noStrike" cap="none" normalizeH="0" baseline="0" dirty="0" smtClean="0">
-                <a:ln>
-                  <a:noFill/>
-                </a:ln>
-                <a:solidFill>
-                  <a:srgbClr val="000080"/>
-                </a:solidFill>
-                <a:effectLst/>
-                <a:latin typeface="Courier New" panose="02070309020205020404" pitchFamily="49" charset="0"/>
-                <a:cs typeface="Courier New" panose="02070309020205020404" pitchFamily="49" charset="0"/>
-              </a:rPr>
-              <a:t>object </a:t>
-            </a:r>
-            <a:r>
-              <a:rPr kumimoji="0" lang="en-US" altLang="en-US" sz="1100" b="0" i="0" u="none" strike="noStrike" cap="none" normalizeH="0" baseline="0" dirty="0" smtClean="0">
-                <a:ln>
-                  <a:noFill/>
-                </a:ln>
-                <a:solidFill>
-                  <a:srgbClr val="000000"/>
-                </a:solidFill>
-                <a:effectLst/>
-                <a:latin typeface="Courier New" panose="02070309020205020404" pitchFamily="49" charset="0"/>
-                <a:cs typeface="Courier New" panose="02070309020205020404" pitchFamily="49" charset="0"/>
-              </a:rPr>
-              <a:t>Solution {</a:t>
-            </a:r>
-            <a:br>
-              <a:rPr kumimoji="0" lang="en-US" altLang="en-US" sz="1100" b="0" i="0" u="none" strike="noStrike" cap="none" normalizeH="0" baseline="0" dirty="0" smtClean="0">
-                <a:ln>
-                  <a:noFill/>
-                </a:ln>
-                <a:solidFill>
-                  <a:srgbClr val="000000"/>
-                </a:solidFill>
-                <a:effectLst/>
-                <a:latin typeface="Courier New" panose="02070309020205020404" pitchFamily="49" charset="0"/>
-                <a:cs typeface="Courier New" panose="02070309020205020404" pitchFamily="49" charset="0"/>
-              </a:rPr>
-            </a:br>
-            <a:r>
-              <a:rPr kumimoji="0" lang="en-US" altLang="en-US" sz="1100" b="0" i="0" u="none" strike="noStrike" cap="none" normalizeH="0" baseline="0" dirty="0" smtClean="0">
-                <a:ln>
-                  <a:noFill/>
-                </a:ln>
-                <a:solidFill>
-                  <a:srgbClr val="000000"/>
-                </a:solidFill>
-                <a:effectLst/>
-                <a:latin typeface="Courier New" panose="02070309020205020404" pitchFamily="49" charset="0"/>
-                <a:cs typeface="Courier New" panose="02070309020205020404" pitchFamily="49" charset="0"/>
-              </a:rPr>
-              <a:t>  </a:t>
-            </a:r>
-            <a:r>
-              <a:rPr kumimoji="0" lang="en-US" altLang="en-US" sz="1100" b="1" i="0" u="none" strike="noStrike" cap="none" normalizeH="0" baseline="0" dirty="0" err="1" smtClean="0">
-                <a:ln>
-                  <a:noFill/>
-                </a:ln>
-                <a:solidFill>
-                  <a:srgbClr val="000080"/>
-                </a:solidFill>
-                <a:effectLst/>
-                <a:latin typeface="Courier New" panose="02070309020205020404" pitchFamily="49" charset="0"/>
-                <a:cs typeface="Courier New" panose="02070309020205020404" pitchFamily="49" charset="0"/>
-              </a:rPr>
-              <a:t>def</a:t>
-            </a:r>
-            <a:r>
-              <a:rPr kumimoji="0" lang="en-US" altLang="en-US" sz="1100" b="1" i="0" u="none" strike="noStrike" cap="none" normalizeH="0" baseline="0" dirty="0" smtClean="0">
-                <a:ln>
-                  <a:noFill/>
-                </a:ln>
-                <a:solidFill>
-                  <a:srgbClr val="000080"/>
-                </a:solidFill>
-                <a:effectLst/>
-                <a:latin typeface="Courier New" panose="02070309020205020404" pitchFamily="49" charset="0"/>
-                <a:cs typeface="Courier New" panose="02070309020205020404" pitchFamily="49" charset="0"/>
-              </a:rPr>
-              <a:t> </a:t>
-            </a:r>
-            <a:r>
-              <a:rPr kumimoji="0" lang="en-US" altLang="en-US" sz="1100" b="0" i="0" u="none" strike="noStrike" cap="none" normalizeH="0" baseline="0" dirty="0" smtClean="0">
-                <a:ln>
-                  <a:noFill/>
-                </a:ln>
-                <a:solidFill>
-                  <a:srgbClr val="000000"/>
-                </a:solidFill>
-                <a:effectLst/>
-                <a:latin typeface="Courier New" panose="02070309020205020404" pitchFamily="49" charset="0"/>
-                <a:cs typeface="Courier New" panose="02070309020205020404" pitchFamily="49" charset="0"/>
-              </a:rPr>
-              <a:t>main(</a:t>
-            </a:r>
-            <a:r>
-              <a:rPr kumimoji="0" lang="en-US" altLang="en-US" sz="1100" b="0" i="0" u="none" strike="noStrike" cap="none" normalizeH="0" baseline="0" dirty="0" err="1" smtClean="0">
-                <a:ln>
-                  <a:noFill/>
-                </a:ln>
-                <a:solidFill>
-                  <a:srgbClr val="000000"/>
-                </a:solidFill>
-                <a:effectLst/>
-                <a:latin typeface="Courier New" panose="02070309020205020404" pitchFamily="49" charset="0"/>
-                <a:cs typeface="Courier New" panose="02070309020205020404" pitchFamily="49" charset="0"/>
-              </a:rPr>
-              <a:t>args</a:t>
-            </a:r>
-            <a:r>
-              <a:rPr kumimoji="0" lang="en-US" altLang="en-US" sz="1100" b="0" i="0" u="none" strike="noStrike" cap="none" normalizeH="0" baseline="0" dirty="0" smtClean="0">
-                <a:ln>
-                  <a:noFill/>
-                </a:ln>
-                <a:solidFill>
-                  <a:srgbClr val="000000"/>
-                </a:solidFill>
-                <a:effectLst/>
-                <a:latin typeface="Courier New" panose="02070309020205020404" pitchFamily="49" charset="0"/>
-                <a:cs typeface="Courier New" panose="02070309020205020404" pitchFamily="49" charset="0"/>
-              </a:rPr>
-              <a:t>: Array[</a:t>
-            </a:r>
-            <a:r>
-              <a:rPr kumimoji="0" lang="en-US" altLang="en-US" sz="1100" b="0" i="0" u="none" strike="noStrike" cap="none" normalizeH="0" baseline="0" dirty="0" smtClean="0">
-                <a:ln>
-                  <a:noFill/>
-                </a:ln>
-                <a:solidFill>
-                  <a:srgbClr val="20999D"/>
-                </a:solidFill>
-                <a:effectLst/>
-                <a:latin typeface="Courier New" panose="02070309020205020404" pitchFamily="49" charset="0"/>
-                <a:cs typeface="Courier New" panose="02070309020205020404" pitchFamily="49" charset="0"/>
-              </a:rPr>
-              <a:t>String</a:t>
-            </a:r>
-            <a:r>
-              <a:rPr kumimoji="0" lang="en-US" altLang="en-US" sz="1100" b="0" i="0" u="none" strike="noStrike" cap="none" normalizeH="0" baseline="0" dirty="0" smtClean="0">
-                <a:ln>
-                  <a:noFill/>
-                </a:ln>
-                <a:solidFill>
-                  <a:srgbClr val="000000"/>
-                </a:solidFill>
-                <a:effectLst/>
-                <a:latin typeface="Courier New" panose="02070309020205020404" pitchFamily="49" charset="0"/>
-                <a:cs typeface="Courier New" panose="02070309020205020404" pitchFamily="49" charset="0"/>
-              </a:rPr>
-              <a:t>]) {</a:t>
-            </a:r>
-            <a:br>
-              <a:rPr kumimoji="0" lang="en-US" altLang="en-US" sz="1100" b="0" i="0" u="none" strike="noStrike" cap="none" normalizeH="0" baseline="0" dirty="0" smtClean="0">
-                <a:ln>
-                  <a:noFill/>
-                </a:ln>
-                <a:solidFill>
-                  <a:srgbClr val="000000"/>
-                </a:solidFill>
-                <a:effectLst/>
-                <a:latin typeface="Courier New" panose="02070309020205020404" pitchFamily="49" charset="0"/>
-                <a:cs typeface="Courier New" panose="02070309020205020404" pitchFamily="49" charset="0"/>
-              </a:rPr>
-            </a:br>
-            <a:r>
-              <a:rPr kumimoji="0" lang="en-US" altLang="en-US" sz="1100" b="0" i="0" u="none" strike="noStrike" cap="none" normalizeH="0" baseline="0" dirty="0" smtClean="0">
-                <a:ln>
-                  <a:noFill/>
-                </a:ln>
-                <a:solidFill>
-                  <a:srgbClr val="000000"/>
-                </a:solidFill>
-                <a:effectLst/>
-                <a:latin typeface="Courier New" panose="02070309020205020404" pitchFamily="49" charset="0"/>
-                <a:cs typeface="Courier New" panose="02070309020205020404" pitchFamily="49" charset="0"/>
-              </a:rPr>
-              <a:t>    </a:t>
-            </a:r>
-            <a:r>
-              <a:rPr kumimoji="0" lang="en-US" altLang="en-US" sz="1100" b="1" i="0" u="none" strike="noStrike" cap="none" normalizeH="0" baseline="0" dirty="0" err="1" smtClean="0">
-                <a:ln>
-                  <a:noFill/>
-                </a:ln>
-                <a:solidFill>
-                  <a:srgbClr val="000080"/>
-                </a:solidFill>
-                <a:effectLst/>
-                <a:latin typeface="Courier New" panose="02070309020205020404" pitchFamily="49" charset="0"/>
-                <a:cs typeface="Courier New" panose="02070309020205020404" pitchFamily="49" charset="0"/>
-              </a:rPr>
-              <a:t>val</a:t>
-            </a:r>
-            <a:r>
-              <a:rPr kumimoji="0" lang="en-US" altLang="en-US" sz="1100" b="1" i="0" u="none" strike="noStrike" cap="none" normalizeH="0" baseline="0" dirty="0" smtClean="0">
-                <a:ln>
-                  <a:noFill/>
-                </a:ln>
-                <a:solidFill>
-                  <a:srgbClr val="000080"/>
-                </a:solidFill>
-                <a:effectLst/>
-                <a:latin typeface="Courier New" panose="02070309020205020404" pitchFamily="49" charset="0"/>
-                <a:cs typeface="Courier New" panose="02070309020205020404" pitchFamily="49" charset="0"/>
-              </a:rPr>
-              <a:t> </a:t>
-            </a:r>
-            <a:r>
-              <a:rPr kumimoji="0" lang="en-US" altLang="en-US" sz="1100" b="0" i="0" u="none" strike="noStrike" cap="none" normalizeH="0" baseline="0" dirty="0" err="1" smtClean="0">
-                <a:ln>
-                  <a:noFill/>
-                </a:ln>
-                <a:solidFill>
-                  <a:srgbClr val="000000"/>
-                </a:solidFill>
-                <a:effectLst/>
-                <a:latin typeface="Courier New" panose="02070309020205020404" pitchFamily="49" charset="0"/>
-                <a:cs typeface="Courier New" panose="02070309020205020404" pitchFamily="49" charset="0"/>
-              </a:rPr>
-              <a:t>funFunFun</a:t>
-            </a:r>
-            <a:r>
-              <a:rPr kumimoji="0" lang="en-US" altLang="en-US" sz="1100" b="0" i="0" u="none" strike="noStrike" cap="none" normalizeH="0" baseline="0" dirty="0" smtClean="0">
-                <a:ln>
-                  <a:noFill/>
-                </a:ln>
-                <a:solidFill>
-                  <a:srgbClr val="000000"/>
-                </a:solidFill>
-                <a:effectLst/>
-                <a:latin typeface="Courier New" panose="02070309020205020404" pitchFamily="49" charset="0"/>
-                <a:cs typeface="Courier New" panose="02070309020205020404" pitchFamily="49" charset="0"/>
-              </a:rPr>
-              <a:t> = {</a:t>
-            </a:r>
-            <a:r>
-              <a:rPr kumimoji="0" lang="en-US" altLang="en-US" sz="1100" b="0" i="1" u="none" strike="noStrike" cap="none" normalizeH="0" baseline="0" dirty="0" err="1" smtClean="0">
-                <a:ln>
-                  <a:noFill/>
-                </a:ln>
-                <a:solidFill>
-                  <a:srgbClr val="000000"/>
-                </a:solidFill>
-                <a:effectLst/>
-                <a:latin typeface="Courier New" panose="02070309020205020404" pitchFamily="49" charset="0"/>
-                <a:cs typeface="Courier New" panose="02070309020205020404" pitchFamily="49" charset="0"/>
-              </a:rPr>
-              <a:t>println</a:t>
-            </a:r>
-            <a:r>
-              <a:rPr kumimoji="0" lang="en-US" altLang="en-US" sz="1100" b="0" i="0" u="none" strike="noStrike" cap="none" normalizeH="0" baseline="0" dirty="0" smtClean="0">
-                <a:ln>
-                  <a:noFill/>
-                </a:ln>
-                <a:solidFill>
-                  <a:srgbClr val="000000"/>
-                </a:solidFill>
-                <a:effectLst/>
-                <a:latin typeface="Courier New" panose="02070309020205020404" pitchFamily="49" charset="0"/>
-                <a:cs typeface="Courier New" panose="02070309020205020404" pitchFamily="49" charset="0"/>
-              </a:rPr>
-              <a:t>(</a:t>
-            </a:r>
-            <a:r>
-              <a:rPr kumimoji="0" lang="en-US" altLang="en-US" sz="1100" b="1" i="0" u="none" strike="noStrike" cap="none" normalizeH="0" baseline="0" dirty="0" smtClean="0">
-                <a:ln>
-                  <a:noFill/>
-                </a:ln>
-                <a:solidFill>
-                  <a:srgbClr val="008000"/>
-                </a:solidFill>
-                <a:effectLst/>
-                <a:latin typeface="Courier New" panose="02070309020205020404" pitchFamily="49" charset="0"/>
-                <a:cs typeface="Courier New" panose="02070309020205020404" pitchFamily="49" charset="0"/>
-              </a:rPr>
-              <a:t>"Fun! Fun! Fun!"</a:t>
-            </a:r>
-            <a:r>
-              <a:rPr kumimoji="0" lang="en-US" altLang="en-US" sz="1100" b="0" i="0" u="none" strike="noStrike" cap="none" normalizeH="0" baseline="0" dirty="0" smtClean="0">
-                <a:ln>
-                  <a:noFill/>
-                </a:ln>
-                <a:solidFill>
-                  <a:srgbClr val="000000"/>
-                </a:solidFill>
-                <a:effectLst/>
-                <a:latin typeface="Courier New" panose="02070309020205020404" pitchFamily="49" charset="0"/>
-                <a:cs typeface="Courier New" panose="02070309020205020404" pitchFamily="49" charset="0"/>
-              </a:rPr>
-              <a:t>)}</a:t>
-            </a:r>
-            <a:br>
-              <a:rPr kumimoji="0" lang="en-US" altLang="en-US" sz="1100" b="0" i="0" u="none" strike="noStrike" cap="none" normalizeH="0" baseline="0" dirty="0" smtClean="0">
-                <a:ln>
-                  <a:noFill/>
-                </a:ln>
-                <a:solidFill>
-                  <a:srgbClr val="000000"/>
-                </a:solidFill>
-                <a:effectLst/>
-                <a:latin typeface="Courier New" panose="02070309020205020404" pitchFamily="49" charset="0"/>
-                <a:cs typeface="Courier New" panose="02070309020205020404" pitchFamily="49" charset="0"/>
-              </a:rPr>
-            </a:br>
-            <a:r>
-              <a:rPr kumimoji="0" lang="en-US" altLang="en-US" sz="1100" b="0" i="0" u="none" strike="noStrike" cap="none" normalizeH="0" baseline="0" dirty="0" smtClean="0">
-                <a:ln>
-                  <a:noFill/>
-                </a:ln>
-                <a:solidFill>
-                  <a:srgbClr val="000000"/>
-                </a:solidFill>
-                <a:effectLst/>
-                <a:latin typeface="Courier New" panose="02070309020205020404" pitchFamily="49" charset="0"/>
-                <a:cs typeface="Courier New" panose="02070309020205020404" pitchFamily="49" charset="0"/>
-              </a:rPr>
-              <a:t/>
-            </a:r>
-            <a:br>
-              <a:rPr kumimoji="0" lang="en-US" altLang="en-US" sz="1100" b="0" i="0" u="none" strike="noStrike" cap="none" normalizeH="0" baseline="0" dirty="0" smtClean="0">
-                <a:ln>
-                  <a:noFill/>
-                </a:ln>
-                <a:solidFill>
-                  <a:srgbClr val="000000"/>
-                </a:solidFill>
-                <a:effectLst/>
-                <a:latin typeface="Courier New" panose="02070309020205020404" pitchFamily="49" charset="0"/>
-                <a:cs typeface="Courier New" panose="02070309020205020404" pitchFamily="49" charset="0"/>
-              </a:rPr>
-            </a:br>
-            <a:r>
-              <a:rPr kumimoji="0" lang="en-US" altLang="en-US" sz="1100" b="0" i="0" u="none" strike="noStrike" cap="none" normalizeH="0" baseline="0" dirty="0" smtClean="0">
-                <a:ln>
-                  <a:noFill/>
-                </a:ln>
-                <a:solidFill>
-                  <a:srgbClr val="000000"/>
-                </a:solidFill>
-                <a:effectLst/>
-                <a:latin typeface="Courier New" panose="02070309020205020404" pitchFamily="49" charset="0"/>
-                <a:cs typeface="Courier New" panose="02070309020205020404" pitchFamily="49" charset="0"/>
-              </a:rPr>
-              <a:t>    </a:t>
-            </a:r>
-            <a:r>
-              <a:rPr kumimoji="0" lang="en-US" altLang="en-US" sz="1100" b="0" i="1" u="none" strike="noStrike" cap="none" normalizeH="0" baseline="0" dirty="0" smtClean="0">
-                <a:ln>
-                  <a:noFill/>
-                </a:ln>
-                <a:solidFill>
-                  <a:srgbClr val="000000"/>
-                </a:solidFill>
-                <a:effectLst/>
-                <a:latin typeface="Courier New" panose="02070309020205020404" pitchFamily="49" charset="0"/>
-                <a:cs typeface="Courier New" panose="02070309020205020404" pitchFamily="49" charset="0"/>
-              </a:rPr>
-              <a:t>She</a:t>
-            </a:r>
-            <a:r>
-              <a:rPr kumimoji="0" lang="en-US" altLang="en-US" sz="1100" b="0" i="0" u="none" strike="noStrike" cap="none" normalizeH="0" baseline="0" dirty="0" smtClean="0">
-                <a:ln>
-                  <a:noFill/>
-                </a:ln>
-                <a:solidFill>
-                  <a:srgbClr val="000000"/>
-                </a:solidFill>
-                <a:effectLst/>
-                <a:latin typeface="Courier New" panose="02070309020205020404" pitchFamily="49" charset="0"/>
-                <a:cs typeface="Courier New" panose="02070309020205020404" pitchFamily="49" charset="0"/>
-              </a:rPr>
-              <a:t>() have(</a:t>
-            </a:r>
-            <a:r>
-              <a:rPr kumimoji="0" lang="en-US" altLang="en-US" sz="1100" b="0" i="0" u="none" strike="noStrike" cap="none" normalizeH="0" baseline="0" dirty="0" err="1" smtClean="0">
-                <a:ln>
-                  <a:noFill/>
-                </a:ln>
-                <a:solidFill>
-                  <a:srgbClr val="000000"/>
-                </a:solidFill>
-                <a:effectLst/>
-                <a:latin typeface="Courier New" panose="02070309020205020404" pitchFamily="49" charset="0"/>
-                <a:cs typeface="Courier New" panose="02070309020205020404" pitchFamily="49" charset="0"/>
-              </a:rPr>
-              <a:t>funFunFun</a:t>
-            </a:r>
-            <a:r>
-              <a:rPr kumimoji="0" lang="en-US" altLang="en-US" sz="1100" b="0" i="0" u="none" strike="noStrike" cap="none" normalizeH="0" baseline="0" dirty="0" smtClean="0">
-                <a:ln>
-                  <a:noFill/>
-                </a:ln>
-                <a:solidFill>
-                  <a:srgbClr val="000000"/>
-                </a:solidFill>
-                <a:effectLst/>
-                <a:latin typeface="Courier New" panose="02070309020205020404" pitchFamily="49" charset="0"/>
-                <a:cs typeface="Courier New" panose="02070309020205020404" pitchFamily="49" charset="0"/>
-              </a:rPr>
-              <a:t>) </a:t>
-            </a:r>
-            <a:r>
-              <a:rPr kumimoji="0" lang="en-US" altLang="en-US" sz="1100" b="0" i="0" u="none" strike="noStrike" cap="none" normalizeH="0" baseline="0" dirty="0" err="1" smtClean="0">
-                <a:ln>
-                  <a:noFill/>
-                </a:ln>
-                <a:solidFill>
-                  <a:srgbClr val="000000"/>
-                </a:solidFill>
-                <a:effectLst/>
-                <a:latin typeface="Courier New" panose="02070309020205020404" pitchFamily="49" charset="0"/>
-                <a:cs typeface="Courier New" panose="02070309020205020404" pitchFamily="49" charset="0"/>
-              </a:rPr>
-              <a:t>til</a:t>
-            </a:r>
-            <a:r>
-              <a:rPr kumimoji="0" lang="en-US" altLang="en-US" sz="1100" b="0" i="0" u="none" strike="noStrike" cap="none" normalizeH="0" baseline="0" dirty="0" smtClean="0">
-                <a:ln>
-                  <a:noFill/>
-                </a:ln>
-                <a:solidFill>
-                  <a:srgbClr val="000000"/>
-                </a:solidFill>
-                <a:effectLst/>
-                <a:latin typeface="Courier New" panose="02070309020205020404" pitchFamily="49" charset="0"/>
-                <a:cs typeface="Courier New" panose="02070309020205020404" pitchFamily="49" charset="0"/>
-              </a:rPr>
-              <a:t>(</a:t>
-            </a:r>
-            <a:r>
-              <a:rPr kumimoji="0" lang="en-US" altLang="en-US" sz="1100" b="0" i="1" u="none" strike="noStrike" cap="none" normalizeH="0" baseline="0" dirty="0" smtClean="0">
-                <a:ln>
-                  <a:noFill/>
-                </a:ln>
-                <a:solidFill>
-                  <a:srgbClr val="000000"/>
-                </a:solidFill>
-                <a:effectLst/>
-                <a:latin typeface="Courier New" panose="02070309020205020404" pitchFamily="49" charset="0"/>
-                <a:cs typeface="Courier New" panose="02070309020205020404" pitchFamily="49" charset="0"/>
-              </a:rPr>
-              <a:t>Daddy</a:t>
-            </a:r>
-            <a:r>
-              <a:rPr kumimoji="0" lang="en-US" altLang="en-US" sz="1100" b="0" i="0" u="none" strike="noStrike" cap="none" normalizeH="0" baseline="0" dirty="0" smtClean="0">
-                <a:ln>
-                  <a:noFill/>
-                </a:ln>
-                <a:solidFill>
-                  <a:srgbClr val="000000"/>
-                </a:solidFill>
-                <a:effectLst/>
-                <a:latin typeface="Courier New" panose="02070309020205020404" pitchFamily="49" charset="0"/>
-                <a:cs typeface="Courier New" panose="02070309020205020404" pitchFamily="49" charset="0"/>
-              </a:rPr>
-              <a:t>() </a:t>
-            </a:r>
-            <a:r>
-              <a:rPr kumimoji="0" lang="en-US" altLang="en-US" sz="1100" b="0" i="0" u="none" strike="noStrike" cap="none" normalizeH="0" baseline="0" dirty="0" err="1" smtClean="0">
-                <a:ln>
-                  <a:noFill/>
-                </a:ln>
-                <a:solidFill>
-                  <a:srgbClr val="000000"/>
-                </a:solidFill>
-                <a:effectLst/>
-                <a:latin typeface="Courier New" panose="02070309020205020404" pitchFamily="49" charset="0"/>
-                <a:cs typeface="Courier New" panose="02070309020205020404" pitchFamily="49" charset="0"/>
-              </a:rPr>
-              <a:t>takeAway</a:t>
-            </a:r>
-            <a:r>
-              <a:rPr kumimoji="0" lang="en-US" altLang="en-US" sz="1100" b="0" i="0" u="none" strike="noStrike" cap="none" normalizeH="0" baseline="0" dirty="0" smtClean="0">
-                <a:ln>
-                  <a:noFill/>
-                </a:ln>
-                <a:solidFill>
-                  <a:srgbClr val="000000"/>
-                </a:solidFill>
-                <a:effectLst/>
-                <a:latin typeface="Courier New" panose="02070309020205020404" pitchFamily="49" charset="0"/>
-                <a:cs typeface="Courier New" panose="02070309020205020404" pitchFamily="49" charset="0"/>
-              </a:rPr>
-              <a:t>(</a:t>
-            </a:r>
-            <a:r>
-              <a:rPr kumimoji="0" lang="en-US" altLang="en-US" sz="1100" b="0" i="1" u="none" strike="noStrike" cap="none" normalizeH="0" baseline="0" dirty="0" err="1" smtClean="0">
-                <a:ln>
-                  <a:noFill/>
-                </a:ln>
-                <a:solidFill>
-                  <a:srgbClr val="000000"/>
-                </a:solidFill>
-                <a:effectLst/>
-                <a:latin typeface="Courier New" panose="02070309020205020404" pitchFamily="49" charset="0"/>
-                <a:cs typeface="Courier New" panose="02070309020205020404" pitchFamily="49" charset="0"/>
-              </a:rPr>
-              <a:t>TBird</a:t>
-            </a:r>
-            <a:r>
-              <a:rPr kumimoji="0" lang="en-US" altLang="en-US" sz="1100" b="0" i="0" u="none" strike="noStrike" cap="none" normalizeH="0" baseline="0" dirty="0" smtClean="0">
-                <a:ln>
-                  <a:noFill/>
-                </a:ln>
-                <a:solidFill>
-                  <a:srgbClr val="000000"/>
-                </a:solidFill>
-                <a:effectLst/>
-                <a:latin typeface="Courier New" panose="02070309020205020404" pitchFamily="49" charset="0"/>
-                <a:cs typeface="Courier New" panose="02070309020205020404" pitchFamily="49" charset="0"/>
-              </a:rPr>
-              <a:t>()))</a:t>
-            </a:r>
-            <a:br>
-              <a:rPr kumimoji="0" lang="en-US" altLang="en-US" sz="1100" b="0" i="0" u="none" strike="noStrike" cap="none" normalizeH="0" baseline="0" dirty="0" smtClean="0">
-                <a:ln>
-                  <a:noFill/>
-                </a:ln>
-                <a:solidFill>
-                  <a:srgbClr val="000000"/>
-                </a:solidFill>
-                <a:effectLst/>
-                <a:latin typeface="Courier New" panose="02070309020205020404" pitchFamily="49" charset="0"/>
-                <a:cs typeface="Courier New" panose="02070309020205020404" pitchFamily="49" charset="0"/>
-              </a:rPr>
-            </a:br>
-            <a:r>
-              <a:rPr kumimoji="0" lang="en-US" altLang="en-US" sz="1100" b="0" i="0" u="none" strike="noStrike" cap="none" normalizeH="0" baseline="0" dirty="0" smtClean="0">
-                <a:ln>
-                  <a:noFill/>
-                </a:ln>
-                <a:solidFill>
-                  <a:srgbClr val="000000"/>
-                </a:solidFill>
-                <a:effectLst/>
-                <a:latin typeface="Courier New" panose="02070309020205020404" pitchFamily="49" charset="0"/>
-                <a:cs typeface="Courier New" panose="02070309020205020404" pitchFamily="49" charset="0"/>
-              </a:rPr>
-              <a:t>  }</a:t>
-            </a:r>
-            <a:br>
-              <a:rPr kumimoji="0" lang="en-US" altLang="en-US" sz="1100" b="0" i="0" u="none" strike="noStrike" cap="none" normalizeH="0" baseline="0" dirty="0" smtClean="0">
-                <a:ln>
-                  <a:noFill/>
-                </a:ln>
-                <a:solidFill>
-                  <a:srgbClr val="000000"/>
-                </a:solidFill>
-                <a:effectLst/>
-                <a:latin typeface="Courier New" panose="02070309020205020404" pitchFamily="49" charset="0"/>
-                <a:cs typeface="Courier New" panose="02070309020205020404" pitchFamily="49" charset="0"/>
-              </a:rPr>
-            </a:br>
-            <a:r>
-              <a:rPr kumimoji="0" lang="en-US" altLang="en-US" sz="1100" b="0" i="0" u="none" strike="noStrike" cap="none" normalizeH="0" baseline="0" dirty="0" smtClean="0">
-                <a:ln>
-                  <a:noFill/>
-                </a:ln>
-                <a:solidFill>
-                  <a:srgbClr val="000000"/>
-                </a:solidFill>
-                <a:effectLst/>
-                <a:latin typeface="Courier New" panose="02070309020205020404" pitchFamily="49" charset="0"/>
-                <a:cs typeface="Courier New" panose="02070309020205020404" pitchFamily="49" charset="0"/>
-              </a:rPr>
-              <a:t>}</a:t>
-            </a:r>
-            <a:endParaRPr kumimoji="0" lang="en-US" altLang="en-US" sz="2800" b="0" i="0" u="none" strike="noStrike" cap="none" normalizeH="0" baseline="0" dirty="0" smtClean="0">
-              <a:ln>
-                <a:noFill/>
-              </a:ln>
-              <a:solidFill>
-                <a:schemeClr val="tx1"/>
-              </a:solidFill>
-              <a:effectLst/>
-              <a:latin typeface="Arial" panose="020B0604020202020204" pitchFamily="34" charset="0"/>
-            </a:endParaRPr>
-          </a:p>
-        </p:txBody>
-      </p:sp>
-      <p:sp>
-        <p:nvSpPr>
-          <p:cNvPr id="8" name="TextBox 7"/>
-          <p:cNvSpPr txBox="1"/>
-          <p:nvPr/>
+          <p:nvPr>
+            <p:ph idx="1"/>
+          </p:nvPr>
         </p:nvSpPr>
         <p:spPr>
           <a:xfrm>
-            <a:off x="4942379" y="541020"/>
-            <a:ext cx="2747099" cy="646331"/>
+            <a:off x="1485900" y="835819"/>
+            <a:ext cx="6172200" cy="3758804"/>
           </a:xfrm>
-          <a:prstGeom prst="rect">
-            <a:avLst/>
-          </a:prstGeom>
-          <a:noFill/>
         </p:spPr>
         <p:txBody>
-          <a:bodyPr wrap="none" rtlCol="0">
-            <a:spAutoFit/>
+          <a:bodyPr>
+            <a:normAutofit fontScale="85000" lnSpcReduction="20000"/>
           </a:bodyPr>
           <a:lstStyle/>
           <a:p>
+            <a:pPr marL="0" indent="0">
+              <a:buNone/>
+            </a:pPr>
+            <a:r>
+              <a:rPr lang="en-US" b="1" dirty="0" smtClean="0"/>
+              <a:t>Likes</a:t>
+            </a:r>
+          </a:p>
+          <a:p>
+            <a:pPr>
+              <a:buFont typeface="Arial" panose="020B0604020202020204" pitchFamily="34" charset="0"/>
+              <a:buChar char="•"/>
+            </a:pPr>
             <a:r>
               <a:rPr lang="en-US" dirty="0" smtClean="0"/>
-              <a:t>Check </a:t>
-            </a:r>
+              <a:t>Dogs</a:t>
+            </a:r>
+          </a:p>
+          <a:p>
+            <a:pPr>
+              <a:buFont typeface="Arial" panose="020B0604020202020204" pitchFamily="34" charset="0"/>
+              <a:buChar char="•"/>
+            </a:pPr>
+            <a:r>
+              <a:rPr lang="en-US" dirty="0" smtClean="0"/>
+              <a:t>Most people</a:t>
+            </a:r>
+          </a:p>
+          <a:p>
+            <a:pPr>
+              <a:buFont typeface="Arial" panose="020B0604020202020204" pitchFamily="34" charset="0"/>
+              <a:buChar char="•"/>
+            </a:pPr>
+            <a:r>
+              <a:rPr lang="en-US" dirty="0" smtClean="0"/>
+              <a:t>Telling bad jokes</a:t>
+            </a:r>
+          </a:p>
+          <a:p>
+            <a:pPr>
+              <a:buFont typeface="Arial" panose="020B0604020202020204" pitchFamily="34" charset="0"/>
+              <a:buChar char="•"/>
+            </a:pPr>
+            <a:r>
+              <a:rPr lang="en-US" dirty="0" smtClean="0"/>
+              <a:t>The words “bro” and “totally.”  I’m not kidding.</a:t>
+            </a:r>
+          </a:p>
+          <a:p>
+            <a:pPr>
+              <a:buFont typeface="Arial" panose="020B0604020202020204" pitchFamily="34" charset="0"/>
+              <a:buChar char="•"/>
+            </a:pPr>
             <a:r>
               <a:rPr lang="en-US" dirty="0"/>
-              <a:t>out Scala…</a:t>
-            </a:r>
-            <a:br>
-              <a:rPr lang="en-US" dirty="0"/>
-            </a:br>
-            <a:r>
-              <a:rPr lang="en-US" dirty="0">
-                <a:hlinkClick r:id="rId2"/>
-              </a:rPr>
-              <a:t>http://www.scala-lang.org/</a:t>
-            </a:r>
-            <a:endParaRPr lang="en-US" dirty="0"/>
+              <a:t>¡ɹ0x0q ɹn0ʎ 9u!ʞɔ@ɥ</a:t>
+            </a:r>
+          </a:p>
+          <a:p>
+            <a:pPr marL="0" indent="0">
+              <a:buNone/>
+            </a:pPr>
+            <a:endParaRPr lang="en-US" b="1" dirty="0" smtClean="0"/>
+          </a:p>
+          <a:p>
+            <a:pPr marL="0" indent="0">
+              <a:buNone/>
+            </a:pPr>
+            <a:r>
+              <a:rPr lang="en-US" b="1" dirty="0" smtClean="0"/>
+              <a:t>Dislikes</a:t>
+            </a:r>
+          </a:p>
+          <a:p>
+            <a:pPr>
+              <a:buFont typeface="Arial" panose="020B0604020202020204" pitchFamily="34" charset="0"/>
+              <a:buChar char="•"/>
+            </a:pPr>
+            <a:r>
+              <a:rPr lang="en-US" dirty="0" smtClean="0"/>
+              <a:t>Dog hair</a:t>
+            </a:r>
+          </a:p>
+          <a:p>
+            <a:pPr>
+              <a:buFont typeface="Arial" panose="020B0604020202020204" pitchFamily="34" charset="0"/>
+              <a:buChar char="•"/>
+            </a:pPr>
+            <a:r>
+              <a:rPr lang="en-US" dirty="0" smtClean="0"/>
+              <a:t>A few people</a:t>
+            </a:r>
+          </a:p>
+          <a:p>
+            <a:pPr>
+              <a:buFont typeface="Arial" panose="020B0604020202020204" pitchFamily="34" charset="0"/>
+              <a:buChar char="•"/>
+            </a:pPr>
+            <a:r>
+              <a:rPr lang="en-US" dirty="0" smtClean="0"/>
+              <a:t>Telling jokes that don’t work (Happens a LOT)</a:t>
+            </a:r>
+          </a:p>
+          <a:p>
+            <a:pPr>
+              <a:buFont typeface="Arial" panose="020B0604020202020204" pitchFamily="34" charset="0"/>
+              <a:buChar char="•"/>
+            </a:pPr>
+            <a:r>
+              <a:rPr lang="en-US" dirty="0" smtClean="0"/>
+              <a:t>Making lists of stuff</a:t>
+            </a:r>
           </a:p>
         </p:txBody>
       </p:sp>
     </p:spTree>
     <p:extLst>
       <p:ext uri="{BB962C8B-B14F-4D97-AF65-F5344CB8AC3E}">
-        <p14:creationId xmlns:p14="http://schemas.microsoft.com/office/powerpoint/2010/main" val="4015215728"/>
+        <p14:creationId xmlns:p14="http://schemas.microsoft.com/office/powerpoint/2010/main" val="2708422358"/>
       </p:ext>
     </p:extLst>
   </p:cSld>
@@ -18596,8 +17035,8 @@
           <a:lstStyle/>
           <a:p>
             <a:r>
-              <a:rPr lang="en-US" smtClean="0"/>
-              <a:t>Eric Burcham</a:t>
+              <a:rPr lang="en-US" dirty="0" smtClean="0"/>
+              <a:t>I’m an Improver</a:t>
             </a:r>
             <a:endParaRPr lang="en-US" dirty="0"/>
           </a:p>
@@ -18614,128 +17053,141 @@
           </p:nvPr>
         </p:nvSpPr>
         <p:spPr>
-          <a:xfrm>
-            <a:off x="1485900" y="835819"/>
-            <a:ext cx="6172200" cy="3758804"/>
-          </a:xfrm>
+          <a:ln>
+            <a:noFill/>
+          </a:ln>
         </p:spPr>
         <p:txBody>
           <a:bodyPr>
-            <a:normAutofit fontScale="85000" lnSpcReduction="20000"/>
+            <a:normAutofit/>
           </a:bodyPr>
           <a:lstStyle/>
           <a:p>
-            <a:pPr marL="0" indent="0">
-              <a:buNone/>
-            </a:pPr>
-            <a:r>
-              <a:rPr lang="en-US" b="1" dirty="0" smtClean="0"/>
-              <a:t>Likes</a:t>
-            </a:r>
-          </a:p>
-          <a:p>
-            <a:pPr>
-              <a:buFont typeface="Arial" panose="020B0604020202020204" pitchFamily="34" charset="0"/>
-              <a:buChar char="•"/>
-            </a:pPr>
-            <a:r>
-              <a:rPr lang="en-US" dirty="0" smtClean="0"/>
-              <a:t>Dogs</a:t>
-            </a:r>
-          </a:p>
-          <a:p>
-            <a:pPr>
-              <a:buFont typeface="Arial" panose="020B0604020202020204" pitchFamily="34" charset="0"/>
-              <a:buChar char="•"/>
-            </a:pPr>
-            <a:r>
-              <a:rPr lang="en-US" dirty="0" smtClean="0"/>
-              <a:t>Most people</a:t>
-            </a:r>
-          </a:p>
-          <a:p>
-            <a:pPr>
-              <a:buFont typeface="Arial" panose="020B0604020202020204" pitchFamily="34" charset="0"/>
-              <a:buChar char="•"/>
-            </a:pPr>
-            <a:r>
-              <a:rPr lang="en-US" dirty="0" smtClean="0"/>
-              <a:t>Telling bad jokes</a:t>
-            </a:r>
-          </a:p>
-          <a:p>
-            <a:pPr>
-              <a:buFont typeface="Arial" panose="020B0604020202020204" pitchFamily="34" charset="0"/>
-              <a:buChar char="•"/>
-            </a:pPr>
-            <a:r>
-              <a:rPr lang="en-US" dirty="0" smtClean="0"/>
-              <a:t>The words “bro” and “totally.”  I’m not kidding.</a:t>
-            </a:r>
-          </a:p>
-          <a:p>
-            <a:pPr>
-              <a:buFont typeface="Arial" panose="020B0604020202020204" pitchFamily="34" charset="0"/>
-              <a:buChar char="•"/>
-            </a:pPr>
-            <a:r>
-              <a:rPr lang="en-US" dirty="0"/>
-              <a:t>¡ɹ0x0q ɹn0ʎ 9u!ʞɔ@ɥ</a:t>
-            </a:r>
-          </a:p>
-          <a:p>
-            <a:pPr marL="0" indent="0">
-              <a:buNone/>
-            </a:pPr>
-            <a:endParaRPr lang="en-US" b="1" dirty="0" smtClean="0"/>
-          </a:p>
-          <a:p>
-            <a:pPr marL="0" indent="0">
-              <a:buNone/>
-            </a:pPr>
-            <a:r>
-              <a:rPr lang="en-US" b="1" dirty="0" smtClean="0"/>
-              <a:t>Dislikes</a:t>
-            </a:r>
-          </a:p>
-          <a:p>
-            <a:pPr>
-              <a:buFont typeface="Arial" panose="020B0604020202020204" pitchFamily="34" charset="0"/>
-              <a:buChar char="•"/>
-            </a:pPr>
-            <a:r>
-              <a:rPr lang="en-US" dirty="0" smtClean="0"/>
-              <a:t>Dog hair</a:t>
-            </a:r>
-          </a:p>
-          <a:p>
-            <a:pPr>
-              <a:buFont typeface="Arial" panose="020B0604020202020204" pitchFamily="34" charset="0"/>
-              <a:buChar char="•"/>
-            </a:pPr>
-            <a:r>
-              <a:rPr lang="en-US" dirty="0" smtClean="0"/>
-              <a:t>A few people</a:t>
-            </a:r>
-          </a:p>
-          <a:p>
-            <a:pPr>
-              <a:buFont typeface="Arial" panose="020B0604020202020204" pitchFamily="34" charset="0"/>
-              <a:buChar char="•"/>
-            </a:pPr>
-            <a:r>
-              <a:rPr lang="en-US" dirty="0" smtClean="0"/>
-              <a:t>Telling jokes that don’t work (Happens a LOT)</a:t>
-            </a:r>
-          </a:p>
-          <a:p>
-            <a:pPr>
-              <a:buFont typeface="Arial" panose="020B0604020202020204" pitchFamily="34" charset="0"/>
-              <a:buChar char="•"/>
-            </a:pPr>
-            <a:r>
-              <a:rPr lang="en-US" dirty="0" smtClean="0"/>
-              <a:t>Making lists of stuff</a:t>
+            <a:r>
+              <a:rPr lang="en-US" sz="2100" dirty="0"/>
+              <a:t>Principal Consultant with Improving Enterprises</a:t>
+            </a:r>
+          </a:p>
+          <a:p>
+            <a:r>
+              <a:rPr lang="en-US" sz="2100" dirty="0"/>
+              <a:t>We’re hiring (Attitude and Aptitude)</a:t>
+            </a:r>
+          </a:p>
+          <a:p>
+            <a:r>
+              <a:rPr lang="en-US" sz="2100" dirty="0"/>
+              <a:t>You should totally call me, bro:  </a:t>
+            </a:r>
+            <a:r>
+              <a:rPr lang="en-US" sz="2100" b="1" dirty="0"/>
+              <a:t>214-578-9217</a:t>
+            </a:r>
+          </a:p>
+          <a:p>
+            <a:r>
+              <a:rPr lang="en-US" sz="2100" dirty="0"/>
+              <a:t>Or email: </a:t>
+            </a:r>
+            <a:r>
+              <a:rPr lang="en-US" sz="2100" b="1" dirty="0" smtClean="0">
+                <a:hlinkClick r:id="rId2"/>
+              </a:rPr>
+              <a:t>eric.burcham@improvingenterprises.com</a:t>
+            </a:r>
+            <a:endParaRPr lang="en-US" sz="2100" b="1" dirty="0"/>
+          </a:p>
+          <a:p>
+            <a:r>
+              <a:rPr lang="en-US" sz="2100" dirty="0"/>
+              <a:t>We have a website: </a:t>
+            </a:r>
+            <a:r>
+              <a:rPr lang="en-US" sz="2100" b="1" dirty="0">
+                <a:hlinkClick r:id="rId3"/>
+              </a:rPr>
+              <a:t>www.improvingenterprises.com</a:t>
+            </a:r>
+            <a:endParaRPr lang="en-US" sz="2100" b="1" dirty="0"/>
+          </a:p>
+          <a:p>
+            <a:endParaRPr lang="en-US" sz="2100" dirty="0"/>
+          </a:p>
+        </p:txBody>
+      </p:sp>
+      <p:pic>
+        <p:nvPicPr>
+          <p:cNvPr id="4" name="Picture 3"/>
+          <p:cNvPicPr>
+            <a:picLocks noChangeAspect="1"/>
+          </p:cNvPicPr>
+          <p:nvPr/>
+        </p:nvPicPr>
+        <p:blipFill>
+          <a:blip r:embed="rId4"/>
+          <a:stretch>
+            <a:fillRect/>
+          </a:stretch>
+        </p:blipFill>
+        <p:spPr>
+          <a:xfrm>
+            <a:off x="4989871" y="3483058"/>
+            <a:ext cx="2668231" cy="1111565"/>
+          </a:xfrm>
+          <a:prstGeom prst="rect">
+            <a:avLst/>
+          </a:prstGeom>
+          <a:ln>
+            <a:solidFill>
+              <a:schemeClr val="tx1"/>
+            </a:solidFill>
+          </a:ln>
+          <a:effectLst>
+            <a:outerShdw blurRad="50800" dist="38100" dir="2700000" algn="tl" rotWithShape="0">
+              <a:prstClr val="black">
+                <a:alpha val="40000"/>
+              </a:prstClr>
+            </a:outerShdw>
+          </a:effectLst>
+        </p:spPr>
+      </p:pic>
+      <p:sp>
+        <p:nvSpPr>
+          <p:cNvPr id="6" name="Right Arrow 5"/>
+          <p:cNvSpPr/>
+          <p:nvPr/>
+        </p:nvSpPr>
+        <p:spPr>
+          <a:xfrm>
+            <a:off x="1859993" y="3483058"/>
+            <a:ext cx="2925927" cy="1111565"/>
+          </a:xfrm>
+          <a:prstGeom prst="rightArrow">
+            <a:avLst/>
+          </a:prstGeom>
+        </p:spPr>
+        <p:style>
+          <a:lnRef idx="1">
+            <a:schemeClr val="accent2"/>
+          </a:lnRef>
+          <a:fillRef idx="3">
+            <a:schemeClr val="accent2"/>
+          </a:fillRef>
+          <a:effectRef idx="2">
+            <a:schemeClr val="accent2"/>
+          </a:effectRef>
+          <a:fontRef idx="minor">
+            <a:schemeClr val="lt1"/>
+          </a:fontRef>
+        </p:style>
+        <p:txBody>
+          <a:bodyPr rtlCol="0" anchor="ctr"/>
+          <a:lstStyle/>
+          <a:p>
+            <a:pPr algn="ctr"/>
+            <a:r>
+              <a:rPr lang="en-US" sz="1350" dirty="0"/>
+              <a:t>Go Now!!!</a:t>
             </a:r>
           </a:p>
         </p:txBody>
@@ -18743,7 +17195,7 @@
     </p:spTree>
     <p:extLst>
       <p:ext uri="{BB962C8B-B14F-4D97-AF65-F5344CB8AC3E}">
-        <p14:creationId xmlns:p14="http://schemas.microsoft.com/office/powerpoint/2010/main" val="2708422358"/>
+        <p14:creationId xmlns:p14="http://schemas.microsoft.com/office/powerpoint/2010/main" val="3475792369"/>
       </p:ext>
     </p:extLst>
   </p:cSld>
@@ -21050,334 +19502,6 @@
 <file path=ppt/slides/slide4.xml><?xml version="1.0" encoding="utf-8"?>
 <p:sld xmlns:a="http://schemas.openxmlformats.org/drawingml/2006/main" xmlns:r="http://schemas.openxmlformats.org/officeDocument/2006/relationships" xmlns:p="http://schemas.openxmlformats.org/presentationml/2006/main">
   <p:cSld>
-    <p:spTree>
-      <p:nvGrpSpPr>
-        <p:cNvPr id="1" name=""/>
-        <p:cNvGrpSpPr/>
-        <p:nvPr/>
-      </p:nvGrpSpPr>
-      <p:grpSpPr>
-        <a:xfrm>
-          <a:off x="0" y="0"/>
-          <a:ext cx="0" cy="0"/>
-          <a:chOff x="0" y="0"/>
-          <a:chExt cx="0" cy="0"/>
-        </a:xfrm>
-      </p:grpSpPr>
-      <p:sp>
-        <p:nvSpPr>
-          <p:cNvPr id="2" name="Title 1"/>
-          <p:cNvSpPr>
-            <a:spLocks noGrp="1"/>
-          </p:cNvSpPr>
-          <p:nvPr>
-            <p:ph type="title"/>
-          </p:nvPr>
-        </p:nvSpPr>
-        <p:spPr/>
-        <p:txBody>
-          <a:bodyPr>
-            <a:normAutofit fontScale="90000"/>
-          </a:bodyPr>
-          <a:lstStyle/>
-          <a:p>
-            <a:r>
-              <a:rPr lang="en-US" dirty="0" smtClean="0"/>
-              <a:t>I’m an Improver</a:t>
-            </a:r>
-            <a:endParaRPr lang="en-US" dirty="0"/>
-          </a:p>
-        </p:txBody>
-      </p:sp>
-      <p:sp>
-        <p:nvSpPr>
-          <p:cNvPr id="3" name="Content Placeholder 2"/>
-          <p:cNvSpPr>
-            <a:spLocks noGrp="1"/>
-          </p:cNvSpPr>
-          <p:nvPr>
-            <p:ph idx="1"/>
-          </p:nvPr>
-        </p:nvSpPr>
-        <p:spPr>
-          <a:ln>
-            <a:noFill/>
-          </a:ln>
-        </p:spPr>
-        <p:txBody>
-          <a:bodyPr>
-            <a:normAutofit/>
-          </a:bodyPr>
-          <a:lstStyle/>
-          <a:p>
-            <a:r>
-              <a:rPr lang="en-US" sz="2100" dirty="0"/>
-              <a:t>Principal Consultant with Improving Enterprises</a:t>
-            </a:r>
-          </a:p>
-          <a:p>
-            <a:r>
-              <a:rPr lang="en-US" sz="2100" dirty="0"/>
-              <a:t>We’re hiring (Attitude and Aptitude)</a:t>
-            </a:r>
-          </a:p>
-          <a:p>
-            <a:r>
-              <a:rPr lang="en-US" sz="2100" dirty="0"/>
-              <a:t>You should totally call me, bro:  </a:t>
-            </a:r>
-            <a:r>
-              <a:rPr lang="en-US" sz="2100" b="1" dirty="0"/>
-              <a:t>214-578-9217</a:t>
-            </a:r>
-          </a:p>
-          <a:p>
-            <a:r>
-              <a:rPr lang="en-US" sz="2100" dirty="0"/>
-              <a:t>Or email: </a:t>
-            </a:r>
-            <a:r>
-              <a:rPr lang="en-US" sz="2100" b="1" dirty="0" smtClean="0">
-                <a:hlinkClick r:id="rId2"/>
-              </a:rPr>
-              <a:t>eric.burcham@improvingenterprises.com</a:t>
-            </a:r>
-            <a:endParaRPr lang="en-US" sz="2100" b="1" dirty="0"/>
-          </a:p>
-          <a:p>
-            <a:r>
-              <a:rPr lang="en-US" sz="2100" dirty="0"/>
-              <a:t>We have a website: </a:t>
-            </a:r>
-            <a:r>
-              <a:rPr lang="en-US" sz="2100" b="1" dirty="0">
-                <a:hlinkClick r:id="rId3"/>
-              </a:rPr>
-              <a:t>www.improvingenterprises.com</a:t>
-            </a:r>
-            <a:endParaRPr lang="en-US" sz="2100" b="1" dirty="0"/>
-          </a:p>
-          <a:p>
-            <a:endParaRPr lang="en-US" sz="2100" dirty="0"/>
-          </a:p>
-        </p:txBody>
-      </p:sp>
-      <p:pic>
-        <p:nvPicPr>
-          <p:cNvPr id="4" name="Picture 3"/>
-          <p:cNvPicPr>
-            <a:picLocks noChangeAspect="1"/>
-          </p:cNvPicPr>
-          <p:nvPr/>
-        </p:nvPicPr>
-        <p:blipFill>
-          <a:blip r:embed="rId4"/>
-          <a:stretch>
-            <a:fillRect/>
-          </a:stretch>
-        </p:blipFill>
-        <p:spPr>
-          <a:xfrm>
-            <a:off x="4989871" y="3483058"/>
-            <a:ext cx="2668231" cy="1111565"/>
-          </a:xfrm>
-          <a:prstGeom prst="rect">
-            <a:avLst/>
-          </a:prstGeom>
-          <a:ln>
-            <a:solidFill>
-              <a:schemeClr val="tx1"/>
-            </a:solidFill>
-          </a:ln>
-          <a:effectLst>
-            <a:outerShdw blurRad="50800" dist="38100" dir="2700000" algn="tl" rotWithShape="0">
-              <a:prstClr val="black">
-                <a:alpha val="40000"/>
-              </a:prstClr>
-            </a:outerShdw>
-          </a:effectLst>
-        </p:spPr>
-      </p:pic>
-      <p:sp>
-        <p:nvSpPr>
-          <p:cNvPr id="6" name="Right Arrow 5"/>
-          <p:cNvSpPr/>
-          <p:nvPr/>
-        </p:nvSpPr>
-        <p:spPr>
-          <a:xfrm>
-            <a:off x="1859993" y="3483058"/>
-            <a:ext cx="2925927" cy="1111565"/>
-          </a:xfrm>
-          <a:prstGeom prst="rightArrow">
-            <a:avLst/>
-          </a:prstGeom>
-        </p:spPr>
-        <p:style>
-          <a:lnRef idx="1">
-            <a:schemeClr val="accent2"/>
-          </a:lnRef>
-          <a:fillRef idx="3">
-            <a:schemeClr val="accent2"/>
-          </a:fillRef>
-          <a:effectRef idx="2">
-            <a:schemeClr val="accent2"/>
-          </a:effectRef>
-          <a:fontRef idx="minor">
-            <a:schemeClr val="lt1"/>
-          </a:fontRef>
-        </p:style>
-        <p:txBody>
-          <a:bodyPr rtlCol="0" anchor="ctr"/>
-          <a:lstStyle/>
-          <a:p>
-            <a:pPr algn="ctr"/>
-            <a:r>
-              <a:rPr lang="en-US" sz="1350" dirty="0"/>
-              <a:t>Go Now!!!</a:t>
-            </a:r>
-          </a:p>
-        </p:txBody>
-      </p:sp>
-    </p:spTree>
-    <p:extLst>
-      <p:ext uri="{BB962C8B-B14F-4D97-AF65-F5344CB8AC3E}">
-        <p14:creationId xmlns:p14="http://schemas.microsoft.com/office/powerpoint/2010/main" val="3475792369"/>
-      </p:ext>
-    </p:extLst>
-  </p:cSld>
-  <p:clrMapOvr>
-    <a:masterClrMapping/>
-  </p:clrMapOvr>
-  <p:timing>
-    <p:tnLst>
-      <p:par>
-        <p:cTn id="1" dur="indefinite" restart="never" nodeType="tmRoot"/>
-      </p:par>
-    </p:tnLst>
-  </p:timing>
-</p:sld>
-</file>
-
-<file path=ppt/slides/slide40.xml><?xml version="1.0" encoding="utf-8"?>
-<p:sld xmlns:a="http://schemas.openxmlformats.org/drawingml/2006/main" xmlns:r="http://schemas.openxmlformats.org/officeDocument/2006/relationships" xmlns:p="http://schemas.openxmlformats.org/presentationml/2006/main">
-  <p:cSld>
-    <p:spTree>
-      <p:nvGrpSpPr>
-        <p:cNvPr id="1" name=""/>
-        <p:cNvGrpSpPr/>
-        <p:nvPr/>
-      </p:nvGrpSpPr>
-      <p:grpSpPr>
-        <a:xfrm>
-          <a:off x="0" y="0"/>
-          <a:ext cx="0" cy="0"/>
-          <a:chOff x="0" y="0"/>
-          <a:chExt cx="0" cy="0"/>
-        </a:xfrm>
-      </p:grpSpPr>
-      <p:sp>
-        <p:nvSpPr>
-          <p:cNvPr id="2" name="Title 1"/>
-          <p:cNvSpPr>
-            <a:spLocks noGrp="1"/>
-          </p:cNvSpPr>
-          <p:nvPr>
-            <p:ph type="title"/>
-          </p:nvPr>
-        </p:nvSpPr>
-        <p:spPr/>
-        <p:txBody>
-          <a:bodyPr>
-            <a:normAutofit fontScale="90000"/>
-          </a:bodyPr>
-          <a:lstStyle/>
-          <a:p>
-            <a:r>
-              <a:rPr lang="en-US" dirty="0" smtClean="0"/>
-              <a:t>We’re Hiring</a:t>
-            </a:r>
-            <a:endParaRPr lang="en-US" dirty="0"/>
-          </a:p>
-        </p:txBody>
-      </p:sp>
-      <p:sp>
-        <p:nvSpPr>
-          <p:cNvPr id="3" name="Content Placeholder 2"/>
-          <p:cNvSpPr>
-            <a:spLocks noGrp="1"/>
-          </p:cNvSpPr>
-          <p:nvPr>
-            <p:ph idx="1"/>
-          </p:nvPr>
-        </p:nvSpPr>
-        <p:spPr/>
-        <p:txBody>
-          <a:bodyPr/>
-          <a:lstStyle/>
-          <a:p>
-            <a:r>
-              <a:rPr lang="en-US" dirty="0" smtClean="0"/>
-              <a:t>Senior </a:t>
-            </a:r>
-            <a:r>
-              <a:rPr lang="en-US" dirty="0" err="1" smtClean="0"/>
-              <a:t>.Net</a:t>
-            </a:r>
-            <a:r>
-              <a:rPr lang="en-US" dirty="0" smtClean="0"/>
-              <a:t> Developer</a:t>
-            </a:r>
-          </a:p>
-          <a:p>
-            <a:r>
-              <a:rPr lang="en-US" dirty="0" smtClean="0"/>
-              <a:t>Business Development Manager</a:t>
-            </a:r>
-          </a:p>
-          <a:p>
-            <a:r>
-              <a:rPr lang="en-US" dirty="0" smtClean="0"/>
-              <a:t>Program Manager</a:t>
-            </a:r>
-          </a:p>
-          <a:p>
-            <a:endParaRPr lang="en-US" dirty="0"/>
-          </a:p>
-          <a:p>
-            <a:pPr marL="0" indent="0">
-              <a:buNone/>
-            </a:pPr>
-            <a:r>
-              <a:rPr lang="en-US" sz="2000" dirty="0" smtClean="0"/>
-              <a:t>Email Valerie Carmona:  </a:t>
-            </a:r>
-            <a:r>
-              <a:rPr lang="en-US" sz="2000" dirty="0" smtClean="0">
-                <a:hlinkClick r:id="rId2"/>
-              </a:rPr>
-              <a:t>Valerie.Carmona@improvingenterprises.com</a:t>
-            </a:r>
-            <a:endParaRPr lang="en-US" dirty="0"/>
-          </a:p>
-        </p:txBody>
-      </p:sp>
-    </p:spTree>
-    <p:extLst>
-      <p:ext uri="{BB962C8B-B14F-4D97-AF65-F5344CB8AC3E}">
-        <p14:creationId xmlns:p14="http://schemas.microsoft.com/office/powerpoint/2010/main" val="1126961835"/>
-      </p:ext>
-    </p:extLst>
-  </p:cSld>
-  <p:clrMapOvr>
-    <a:masterClrMapping/>
-  </p:clrMapOvr>
-</p:sld>
-</file>
-
-<file path=ppt/slides/slide5.xml><?xml version="1.0" encoding="utf-8"?>
-<p:sld xmlns:a="http://schemas.openxmlformats.org/drawingml/2006/main" xmlns:r="http://schemas.openxmlformats.org/officeDocument/2006/relationships" xmlns:p="http://schemas.openxmlformats.org/presentationml/2006/main">
-  <p:cSld>
     <p:bg>
       <p:bgPr>
         <a:gradFill flip="none" rotWithShape="1">
@@ -21831,7 +19955,123 @@
 </p:sld>
 </file>
 
-<file path=ppt/slides/slide6.xml><?xml version="1.0" encoding="utf-8"?>
+<file path=ppt/slides/slide40.xml><?xml version="1.0" encoding="utf-8"?>
+<p:sld xmlns:a="http://schemas.openxmlformats.org/drawingml/2006/main" xmlns:r="http://schemas.openxmlformats.org/officeDocument/2006/relationships" xmlns:p="http://schemas.openxmlformats.org/presentationml/2006/main">
+  <p:cSld>
+    <p:spTree>
+      <p:nvGrpSpPr>
+        <p:cNvPr id="1" name=""/>
+        <p:cNvGrpSpPr/>
+        <p:nvPr/>
+      </p:nvGrpSpPr>
+      <p:grpSpPr>
+        <a:xfrm>
+          <a:off x="0" y="0"/>
+          <a:ext cx="0" cy="0"/>
+          <a:chOff x="0" y="0"/>
+          <a:chExt cx="0" cy="0"/>
+        </a:xfrm>
+      </p:grpSpPr>
+      <p:sp>
+        <p:nvSpPr>
+          <p:cNvPr id="2" name="Title 1"/>
+          <p:cNvSpPr>
+            <a:spLocks noGrp="1"/>
+          </p:cNvSpPr>
+          <p:nvPr>
+            <p:ph type="title"/>
+          </p:nvPr>
+        </p:nvSpPr>
+        <p:spPr/>
+        <p:txBody>
+          <a:bodyPr>
+            <a:normAutofit fontScale="90000"/>
+          </a:bodyPr>
+          <a:lstStyle/>
+          <a:p>
+            <a:r>
+              <a:rPr lang="en-US" dirty="0" smtClean="0"/>
+              <a:t>We’re Hiring</a:t>
+            </a:r>
+            <a:endParaRPr lang="en-US" dirty="0"/>
+          </a:p>
+        </p:txBody>
+      </p:sp>
+      <p:sp>
+        <p:nvSpPr>
+          <p:cNvPr id="3" name="Content Placeholder 2"/>
+          <p:cNvSpPr>
+            <a:spLocks noGrp="1"/>
+          </p:cNvSpPr>
+          <p:nvPr>
+            <p:ph idx="1"/>
+          </p:nvPr>
+        </p:nvSpPr>
+        <p:spPr/>
+        <p:txBody>
+          <a:bodyPr/>
+          <a:lstStyle/>
+          <a:p>
+            <a:r>
+              <a:rPr lang="en-US" dirty="0" smtClean="0"/>
+              <a:t>Senior </a:t>
+            </a:r>
+            <a:r>
+              <a:rPr lang="en-US" dirty="0" err="1" smtClean="0"/>
+              <a:t>.Net</a:t>
+            </a:r>
+            <a:r>
+              <a:rPr lang="en-US" dirty="0" smtClean="0"/>
+              <a:t> Developer</a:t>
+            </a:r>
+          </a:p>
+          <a:p>
+            <a:r>
+              <a:rPr lang="en-US" dirty="0" smtClean="0"/>
+              <a:t>Business Development Manager</a:t>
+            </a:r>
+          </a:p>
+          <a:p>
+            <a:r>
+              <a:rPr lang="en-US" dirty="0" smtClean="0"/>
+              <a:t>Program Manager</a:t>
+            </a:r>
+          </a:p>
+          <a:p>
+            <a:endParaRPr lang="en-US" dirty="0"/>
+          </a:p>
+          <a:p>
+            <a:pPr marL="0" indent="0">
+              <a:buNone/>
+            </a:pPr>
+            <a:r>
+              <a:rPr lang="en-US" sz="2000" dirty="0" smtClean="0"/>
+              <a:t>Email Valerie Carmona:  </a:t>
+            </a:r>
+            <a:r>
+              <a:rPr lang="en-US" sz="2000" dirty="0" smtClean="0">
+                <a:hlinkClick r:id="rId2"/>
+              </a:rPr>
+              <a:t>Valerie.Carmona@improvingenterprises.com</a:t>
+            </a:r>
+            <a:endParaRPr lang="en-US" dirty="0"/>
+          </a:p>
+        </p:txBody>
+      </p:sp>
+    </p:spTree>
+    <p:extLst>
+      <p:ext uri="{BB962C8B-B14F-4D97-AF65-F5344CB8AC3E}">
+        <p14:creationId xmlns:p14="http://schemas.microsoft.com/office/powerpoint/2010/main" val="1126961835"/>
+      </p:ext>
+    </p:extLst>
+  </p:cSld>
+  <p:clrMapOvr>
+    <a:masterClrMapping/>
+  </p:clrMapOvr>
+</p:sld>
+</file>
+
+<file path=ppt/slides/slide5.xml><?xml version="1.0" encoding="utf-8"?>
 <p:sld xmlns:a="http://schemas.openxmlformats.org/drawingml/2006/main" xmlns:r="http://schemas.openxmlformats.org/officeDocument/2006/relationships" xmlns:p="http://schemas.openxmlformats.org/presentationml/2006/main">
   <p:cSld>
     <p:spTree>
@@ -21993,6 +20233,130 @@
 </p:sld>
 </file>
 
+<file path=ppt/slides/slide6.xml><?xml version="1.0" encoding="utf-8"?>
+<p:sld xmlns:a="http://schemas.openxmlformats.org/drawingml/2006/main" xmlns:r="http://schemas.openxmlformats.org/officeDocument/2006/relationships" xmlns:p="http://schemas.openxmlformats.org/presentationml/2006/main">
+  <p:cSld>
+    <p:spTree>
+      <p:nvGrpSpPr>
+        <p:cNvPr id="1" name=""/>
+        <p:cNvGrpSpPr/>
+        <p:nvPr/>
+      </p:nvGrpSpPr>
+      <p:grpSpPr>
+        <a:xfrm>
+          <a:off x="0" y="0"/>
+          <a:ext cx="0" cy="0"/>
+          <a:chOff x="0" y="0"/>
+          <a:chExt cx="0" cy="0"/>
+        </a:xfrm>
+      </p:grpSpPr>
+      <p:sp>
+        <p:nvSpPr>
+          <p:cNvPr id="2" name="Title 1"/>
+          <p:cNvSpPr>
+            <a:spLocks noGrp="1"/>
+          </p:cNvSpPr>
+          <p:nvPr>
+            <p:ph type="title"/>
+          </p:nvPr>
+        </p:nvSpPr>
+        <p:spPr/>
+        <p:txBody>
+          <a:bodyPr>
+            <a:normAutofit fontScale="90000"/>
+          </a:bodyPr>
+          <a:lstStyle/>
+          <a:p>
+            <a:r>
+              <a:rPr lang="en-US" dirty="0" err="1" smtClean="0"/>
+              <a:t>Broism</a:t>
+            </a:r>
+            <a:r>
+              <a:rPr lang="en-US" dirty="0" smtClean="0"/>
+              <a:t>: </a:t>
+            </a:r>
+            <a:r>
+              <a:rPr lang="en-US" dirty="0" err="1" smtClean="0"/>
+              <a:t>Bilbro</a:t>
+            </a:r>
+            <a:r>
+              <a:rPr lang="en-US" dirty="0" smtClean="0"/>
+              <a:t> Baggins</a:t>
+            </a:r>
+            <a:endParaRPr lang="en-US" dirty="0"/>
+          </a:p>
+        </p:txBody>
+      </p:sp>
+      <p:sp>
+        <p:nvSpPr>
+          <p:cNvPr id="3" name="Content Placeholder 2"/>
+          <p:cNvSpPr>
+            <a:spLocks noGrp="1"/>
+          </p:cNvSpPr>
+          <p:nvPr>
+            <p:ph idx="1"/>
+          </p:nvPr>
+        </p:nvSpPr>
+        <p:spPr/>
+        <p:txBody>
+          <a:bodyPr/>
+          <a:lstStyle/>
+          <a:p>
+            <a:pPr marL="0" indent="0">
+              <a:buNone/>
+            </a:pPr>
+            <a:r>
+              <a:rPr lang="en-US" b="1" dirty="0" err="1"/>
+              <a:t>Bilbro</a:t>
+            </a:r>
+            <a:r>
+              <a:rPr lang="en-US" b="1" dirty="0"/>
+              <a:t> </a:t>
+            </a:r>
+            <a:r>
+              <a:rPr lang="en-US" b="1" dirty="0" smtClean="0"/>
+              <a:t>Baggins</a:t>
+            </a:r>
+            <a:r>
+              <a:rPr lang="en-US" dirty="0" smtClean="0"/>
+              <a:t>:  Your bro who is obsessed with Lord of the Rings.  Example:  Joe has seen the twin towers like 5 times.  He’s such a </a:t>
+            </a:r>
+            <a:r>
+              <a:rPr lang="en-US" i="1" dirty="0" err="1" smtClean="0"/>
+              <a:t>Bilbro</a:t>
+            </a:r>
+            <a:r>
+              <a:rPr lang="en-US" i="1" dirty="0" smtClean="0"/>
+              <a:t> Baggins</a:t>
+            </a:r>
+            <a:r>
+              <a:rPr lang="en-US" dirty="0" smtClean="0"/>
+              <a:t>.</a:t>
+            </a:r>
+            <a:endParaRPr lang="en-US" dirty="0"/>
+          </a:p>
+        </p:txBody>
+      </p:sp>
+    </p:spTree>
+    <p:extLst>
+      <p:ext uri="{BB962C8B-B14F-4D97-AF65-F5344CB8AC3E}">
+        <p14:creationId xmlns:p14="http://schemas.microsoft.com/office/powerpoint/2010/main" val="263428660"/>
+      </p:ext>
+    </p:extLst>
+  </p:cSld>
+  <p:clrMapOvr>
+    <a:masterClrMapping/>
+  </p:clrMapOvr>
+  <p:timing>
+    <p:tnLst>
+      <p:par>
+        <p:cTn id="1" dur="indefinite" restart="never" nodeType="tmRoot"/>
+      </p:par>
+    </p:tnLst>
+  </p:timing>
+</p:sld>
+</file>
+
 <file path=ppt/slides/slide7.xml><?xml version="1.0" encoding="utf-8"?>
 <p:sld xmlns:a="http://schemas.openxmlformats.org/drawingml/2006/main" xmlns:r="http://schemas.openxmlformats.org/officeDocument/2006/relationships" xmlns:p="http://schemas.openxmlformats.org/presentationml/2006/main">
   <p:cSld>
@@ -22028,20 +20392,8 @@
           <a:lstStyle/>
           <a:p>
             <a:r>
-              <a:rPr lang="en-US" dirty="0" err="1" smtClean="0"/>
-              <a:t>Broism</a:t>
-            </a:r>
-            <a:r>
               <a:rPr lang="en-US" dirty="0" smtClean="0"/>
-              <a:t>: </a:t>
-            </a:r>
-            <a:r>
-              <a:rPr lang="en-US" dirty="0" err="1" smtClean="0"/>
-              <a:t>Bilbro</a:t>
-            </a:r>
-            <a:r>
-              <a:rPr lang="en-US" dirty="0" smtClean="0"/>
-              <a:t> Baggins</a:t>
+              <a:t>Overview</a:t>
             </a:r>
             <a:endParaRPr lang="en-US" dirty="0"/>
           </a:p>
@@ -22059,40 +20411,67 @@
         </p:nvSpPr>
         <p:spPr/>
         <p:txBody>
-          <a:bodyPr/>
+          <a:bodyPr>
+            <a:normAutofit/>
+          </a:bodyPr>
           <a:lstStyle/>
           <a:p>
-            <a:pPr marL="0" indent="0">
-              <a:buNone/>
-            </a:pPr>
-            <a:r>
-              <a:rPr lang="en-US" b="1" dirty="0" err="1"/>
-              <a:t>Bilbro</a:t>
-            </a:r>
-            <a:r>
-              <a:rPr lang="en-US" b="1" dirty="0"/>
-              <a:t> </a:t>
-            </a:r>
-            <a:r>
-              <a:rPr lang="en-US" b="1" dirty="0" smtClean="0"/>
-              <a:t>Baggins</a:t>
-            </a:r>
             <a:r>
               <a:rPr lang="en-US" dirty="0" smtClean="0"/>
-              <a:t>:  Your bro who is obsessed with Lord of the Rings.  Example:  Joe has seen the twin towers like 5 times.  He’s such a </a:t>
-            </a:r>
-            <a:r>
-              <a:rPr lang="en-US" i="1" dirty="0" err="1" smtClean="0"/>
-              <a:t>Bilbro</a:t>
-            </a:r>
-            <a:r>
-              <a:rPr lang="en-US" i="1" dirty="0" smtClean="0"/>
-              <a:t> Baggins</a:t>
-            </a:r>
+              <a:t>Lots of bad jokes (I can’t help it).</a:t>
+            </a:r>
+          </a:p>
+          <a:p>
             <a:r>
               <a:rPr lang="en-US" dirty="0" smtClean="0"/>
-              <a:t>.</a:t>
-            </a:r>
+              <a:t>When to use threads.</a:t>
+            </a:r>
+          </a:p>
+          <a:p>
+            <a:r>
+              <a:rPr lang="en-US" dirty="0" smtClean="0"/>
+              <a:t>Basics of multi-threading in </a:t>
+            </a:r>
+            <a:r>
+              <a:rPr lang="en-US" dirty="0" err="1" smtClean="0"/>
+              <a:t>.Net</a:t>
+            </a:r>
+            <a:endParaRPr lang="en-US" dirty="0" smtClean="0"/>
+          </a:p>
+          <a:p>
+            <a:r>
+              <a:rPr lang="en-US" dirty="0" smtClean="0"/>
+              <a:t>Multi-threaded programming patterns</a:t>
+            </a:r>
+          </a:p>
+          <a:p>
+            <a:r>
+              <a:rPr lang="en-US" dirty="0" smtClean="0"/>
+              <a:t>Parallel </a:t>
+            </a:r>
+            <a:r>
+              <a:rPr lang="en-US" dirty="0" err="1" smtClean="0"/>
+              <a:t>Linq</a:t>
+            </a:r>
+            <a:endParaRPr lang="en-US" dirty="0" smtClean="0"/>
+          </a:p>
+          <a:p>
+            <a:r>
+              <a:rPr lang="en-US" dirty="0" smtClean="0"/>
+              <a:t>Task Parallel Library</a:t>
+            </a:r>
+          </a:p>
+          <a:p>
+            <a:r>
+              <a:rPr lang="en-US" dirty="0" err="1" smtClean="0"/>
+              <a:t>Async</a:t>
+            </a:r>
+            <a:r>
+              <a:rPr lang="en-US" dirty="0" smtClean="0"/>
+              <a:t> Controllers (and why they matter)</a:t>
+            </a:r>
+          </a:p>
+          <a:p>
             <a:endParaRPr lang="en-US" dirty="0"/>
           </a:p>
         </p:txBody>
@@ -22100,7 +20479,7 @@
     </p:spTree>
     <p:extLst>
       <p:ext uri="{BB962C8B-B14F-4D97-AF65-F5344CB8AC3E}">
-        <p14:creationId xmlns:p14="http://schemas.microsoft.com/office/powerpoint/2010/main" val="263428660"/>
+        <p14:creationId xmlns:p14="http://schemas.microsoft.com/office/powerpoint/2010/main" val="2696668645"/>
       </p:ext>
     </p:extLst>
   </p:cSld>
@@ -22153,7 +20532,7 @@
           <a:p>
             <a:r>
               <a:rPr lang="en-US" dirty="0" smtClean="0"/>
-              <a:t>Overview</a:t>
+              <a:t>Lame Joke</a:t>
             </a:r>
             <a:endParaRPr lang="en-US" dirty="0"/>
           </a:p>
@@ -22171,67 +20550,16 @@
         </p:nvSpPr>
         <p:spPr/>
         <p:txBody>
-          <a:bodyPr>
-            <a:normAutofit/>
-          </a:bodyPr>
+          <a:bodyPr/>
           <a:lstStyle/>
           <a:p>
+            <a:pPr marL="0" indent="0">
+              <a:buNone/>
+            </a:pPr>
             <a:r>
               <a:rPr lang="en-US" dirty="0" smtClean="0"/>
-              <a:t>Lots of bad jokes (I can’t help it).</a:t>
-            </a:r>
-          </a:p>
-          <a:p>
-            <a:r>
-              <a:rPr lang="en-US" dirty="0" smtClean="0"/>
-              <a:t>When to use threads.</a:t>
-            </a:r>
-          </a:p>
-          <a:p>
-            <a:r>
-              <a:rPr lang="en-US" dirty="0" smtClean="0"/>
-              <a:t>Basics of multi-threading in </a:t>
-            </a:r>
-            <a:r>
-              <a:rPr lang="en-US" dirty="0" err="1" smtClean="0"/>
-              <a:t>.Net</a:t>
-            </a:r>
-            <a:endParaRPr lang="en-US" dirty="0" smtClean="0"/>
-          </a:p>
-          <a:p>
-            <a:r>
-              <a:rPr lang="en-US" dirty="0" smtClean="0"/>
-              <a:t>Multi-threaded programming patterns</a:t>
-            </a:r>
-          </a:p>
-          <a:p>
-            <a:r>
-              <a:rPr lang="en-US" dirty="0" smtClean="0"/>
-              <a:t>Parallel </a:t>
-            </a:r>
-            <a:r>
-              <a:rPr lang="en-US" dirty="0" err="1" smtClean="0"/>
-              <a:t>Linq</a:t>
-            </a:r>
-            <a:endParaRPr lang="en-US" dirty="0" smtClean="0"/>
-          </a:p>
-          <a:p>
-            <a:r>
-              <a:rPr lang="en-US" dirty="0" smtClean="0"/>
-              <a:t>Task Parallel Library</a:t>
-            </a:r>
-          </a:p>
-          <a:p>
-            <a:r>
-              <a:rPr lang="en-US" dirty="0" err="1" smtClean="0"/>
-              <a:t>Async</a:t>
-            </a:r>
-            <a:r>
-              <a:rPr lang="en-US" dirty="0" smtClean="0"/>
-              <a:t> Controllers (and why they matter)</a:t>
-            </a:r>
-          </a:p>
-          <a:p>
+              <a:t>Why is it so hard to explain puns to kleptomaniacs?</a:t>
+            </a:r>
             <a:endParaRPr lang="en-US" dirty="0"/>
           </a:p>
         </p:txBody>
@@ -22239,7 +20567,7 @@
     </p:spTree>
     <p:extLst>
       <p:ext uri="{BB962C8B-B14F-4D97-AF65-F5344CB8AC3E}">
-        <p14:creationId xmlns:p14="http://schemas.microsoft.com/office/powerpoint/2010/main" val="2696668645"/>
+        <p14:creationId xmlns:p14="http://schemas.microsoft.com/office/powerpoint/2010/main" val="1553533057"/>
       </p:ext>
     </p:extLst>
   </p:cSld>
@@ -22292,7 +20620,7 @@
           <a:p>
             <a:r>
               <a:rPr lang="en-US" dirty="0" smtClean="0"/>
-              <a:t>Lame Joke</a:t>
+              <a:t>Warm Up Your Internal Compiler…</a:t>
             </a:r>
             <a:endParaRPr lang="en-US" dirty="0"/>
           </a:p>
@@ -22300,25 +20628,1697 @@
       </p:sp>
       <p:sp>
         <p:nvSpPr>
-          <p:cNvPr id="3" name="Content Placeholder 2"/>
+          <p:cNvPr id="6" name="Rectangle 3"/>
           <p:cNvSpPr>
-            <a:spLocks noGrp="1"/>
+            <a:spLocks noChangeArrowheads="1"/>
           </p:cNvSpPr>
-          <p:nvPr>
-            <p:ph idx="1"/>
-          </p:nvPr>
+          <p:nvPr/>
         </p:nvSpPr>
-        <p:spPr/>
+        <p:spPr bwMode="auto">
+          <a:xfrm>
+            <a:off x="0" y="2233791"/>
+            <a:ext cx="184731" cy="584775"/>
+          </a:xfrm>
+          <a:prstGeom prst="rect">
+            <a:avLst/>
+          </a:prstGeom>
+          <a:solidFill>
+            <a:srgbClr val="FFFFFF"/>
+          </a:solidFill>
+          <a:ln>
+            <a:noFill/>
+          </a:ln>
+          <a:effectLst/>
+          <a:extLst>
+            <a:ext uri="{91240B29-F687-4F45-9708-019B960494DF}">
+              <a14:hiddenLine xmlns:a14="http://schemas.microsoft.com/office/drawing/2010/main" w="9525">
+                <a:solidFill>
+                  <a:schemeClr val="tx1"/>
+                </a:solidFill>
+                <a:miter lim="800000"/>
+                <a:headEnd/>
+                <a:tailEnd/>
+              </a14:hiddenLine>
+            </a:ext>
+            <a:ext uri="{AF507438-7753-43E0-B8FC-AC1667EBCBE1}">
+              <a14:hiddenEffects xmlns:a14="http://schemas.microsoft.com/office/drawing/2010/main">
+                <a:effectLst>
+                  <a:outerShdw dist="35921" dir="2700000" algn="ctr" rotWithShape="0">
+                    <a:schemeClr val="bg2"/>
+                  </a:outerShdw>
+                </a:effectLst>
+              </a14:hiddenEffects>
+            </a:ext>
+          </a:extLst>
+        </p:spPr>
         <p:txBody>
-          <a:bodyPr/>
+          <a:bodyPr vert="horz" wrap="none" lIns="91440" tIns="45720" rIns="91440" bIns="45720" numCol="1" anchor="ctr" anchorCtr="0" compatLnSpc="1">
+            <a:prstTxWarp prst="textNoShape">
+              <a:avLst/>
+            </a:prstTxWarp>
+            <a:spAutoFit/>
+          </a:bodyPr>
           <a:lstStyle/>
           <a:p>
-            <a:pPr marL="0" indent="0">
+            <a:pPr marL="0" marR="0" lvl="0" indent="0" algn="l" defTabSz="914400" rtl="0" eaLnBrk="0" fontAlgn="base" latinLnBrk="0" hangingPunct="0">
+              <a:lnSpc>
+                <a:spcPct val="100000"/>
+              </a:lnSpc>
+              <a:spcBef>
+                <a:spcPct val="0"/>
+              </a:spcBef>
+              <a:spcAft>
+                <a:spcPct val="0"/>
+              </a:spcAft>
+              <a:buClrTx/>
+              <a:buSzTx/>
+              <a:buFontTx/>
               <a:buNone/>
+              <a:tabLst/>
             </a:pPr>
+            <a:endParaRPr kumimoji="0" lang="en-US" altLang="en-US" sz="3200" b="0" i="0" u="none" strike="noStrike" cap="none" normalizeH="0" baseline="0" dirty="0" smtClean="0">
+              <a:ln>
+                <a:noFill/>
+              </a:ln>
+              <a:solidFill>
+                <a:schemeClr val="tx1"/>
+              </a:solidFill>
+              <a:effectLst/>
+              <a:latin typeface="Arial" panose="020B0604020202020204" pitchFamily="34" charset="0"/>
+            </a:endParaRPr>
+          </a:p>
+        </p:txBody>
+      </p:sp>
+      <p:sp>
+        <p:nvSpPr>
+          <p:cNvPr id="7" name="Rectangle 4"/>
+          <p:cNvSpPr>
+            <a:spLocks noChangeArrowheads="1"/>
+          </p:cNvSpPr>
+          <p:nvPr/>
+        </p:nvSpPr>
+        <p:spPr bwMode="auto">
+          <a:xfrm>
+            <a:off x="0" y="540690"/>
+            <a:ext cx="4942379" cy="4154984"/>
+          </a:xfrm>
+          <a:prstGeom prst="rect">
+            <a:avLst/>
+          </a:prstGeom>
+          <a:solidFill>
+            <a:srgbClr val="FFFFFF"/>
+          </a:solidFill>
+          <a:ln>
+            <a:noFill/>
+          </a:ln>
+          <a:effectLst/>
+          <a:extLst>
+            <a:ext uri="{91240B29-F687-4F45-9708-019B960494DF}">
+              <a14:hiddenLine xmlns:a14="http://schemas.microsoft.com/office/drawing/2010/main" w="9525">
+                <a:solidFill>
+                  <a:schemeClr val="tx1"/>
+                </a:solidFill>
+                <a:miter lim="800000"/>
+                <a:headEnd/>
+                <a:tailEnd/>
+              </a14:hiddenLine>
+            </a:ext>
+            <a:ext uri="{AF507438-7753-43E0-B8FC-AC1667EBCBE1}">
+              <a14:hiddenEffects xmlns:a14="http://schemas.microsoft.com/office/drawing/2010/main">
+                <a:effectLst>
+                  <a:outerShdw dist="35921" dir="2700000" algn="ctr" rotWithShape="0">
+                    <a:schemeClr val="bg2"/>
+                  </a:outerShdw>
+                </a:effectLst>
+              </a14:hiddenEffects>
+            </a:ext>
+          </a:extLst>
+        </p:spPr>
+        <p:txBody>
+          <a:bodyPr vert="horz" wrap="none" lIns="91440" tIns="45720" rIns="91440" bIns="45720" numCol="1" anchor="ctr" anchorCtr="0" compatLnSpc="1">
+            <a:prstTxWarp prst="textNoShape">
+              <a:avLst/>
+            </a:prstTxWarp>
+            <a:spAutoFit/>
+          </a:bodyPr>
+          <a:lstStyle/>
+          <a:p>
+            <a:pPr marL="0" marR="0" lvl="0" indent="0" algn="l" defTabSz="914400" rtl="0" eaLnBrk="0" fontAlgn="base" latinLnBrk="0" hangingPunct="0">
+              <a:lnSpc>
+                <a:spcPct val="100000"/>
+              </a:lnSpc>
+              <a:spcBef>
+                <a:spcPct val="0"/>
+              </a:spcBef>
+              <a:spcAft>
+                <a:spcPct val="0"/>
+              </a:spcAft>
+              <a:buClrTx/>
+              <a:buSzTx/>
+              <a:buFontTx/>
+              <a:buNone/>
+              <a:tabLst/>
+            </a:pPr>
+            <a:r>
+              <a:rPr kumimoji="0" lang="en-US" altLang="en-US" sz="1100" b="1" i="0" u="none" strike="noStrike" cap="none" normalizeH="0" baseline="0" dirty="0" smtClean="0">
+                <a:ln>
+                  <a:noFill/>
+                </a:ln>
+                <a:solidFill>
+                  <a:srgbClr val="000080"/>
+                </a:solidFill>
+                <a:effectLst/>
+                <a:latin typeface="Courier New" panose="02070309020205020404" pitchFamily="49" charset="0"/>
+                <a:cs typeface="Courier New" panose="02070309020205020404" pitchFamily="49" charset="0"/>
+              </a:rPr>
+              <a:t>case class </a:t>
+            </a:r>
+            <a:r>
+              <a:rPr kumimoji="0" lang="en-US" altLang="en-US" sz="1100" b="0" i="0" u="none" strike="noStrike" cap="none" normalizeH="0" baseline="0" dirty="0" smtClean="0">
+                <a:ln>
+                  <a:noFill/>
+                </a:ln>
+                <a:solidFill>
+                  <a:srgbClr val="000000"/>
+                </a:solidFill>
+                <a:effectLst/>
+                <a:latin typeface="Courier New" panose="02070309020205020404" pitchFamily="49" charset="0"/>
+                <a:cs typeface="Courier New" panose="02070309020205020404" pitchFamily="49" charset="0"/>
+              </a:rPr>
+              <a:t>She(){</a:t>
+            </a:r>
+            <a:br>
+              <a:rPr kumimoji="0" lang="en-US" altLang="en-US" sz="1100" b="0" i="0" u="none" strike="noStrike" cap="none" normalizeH="0" baseline="0" dirty="0" smtClean="0">
+                <a:ln>
+                  <a:noFill/>
+                </a:ln>
+                <a:solidFill>
+                  <a:srgbClr val="000000"/>
+                </a:solidFill>
+                <a:effectLst/>
+                <a:latin typeface="Courier New" panose="02070309020205020404" pitchFamily="49" charset="0"/>
+                <a:cs typeface="Courier New" panose="02070309020205020404" pitchFamily="49" charset="0"/>
+              </a:rPr>
+            </a:br>
+            <a:r>
+              <a:rPr kumimoji="0" lang="en-US" altLang="en-US" sz="1100" b="0" i="0" u="none" strike="noStrike" cap="none" normalizeH="0" baseline="0" dirty="0" smtClean="0">
+                <a:ln>
+                  <a:noFill/>
+                </a:ln>
+                <a:solidFill>
+                  <a:srgbClr val="000000"/>
+                </a:solidFill>
+                <a:effectLst/>
+                <a:latin typeface="Courier New" panose="02070309020205020404" pitchFamily="49" charset="0"/>
+                <a:cs typeface="Courier New" panose="02070309020205020404" pitchFamily="49" charset="0"/>
+              </a:rPr>
+              <a:t>  </a:t>
+            </a:r>
+            <a:r>
+              <a:rPr kumimoji="0" lang="en-US" altLang="en-US" sz="1100" b="1" i="0" u="none" strike="noStrike" cap="none" normalizeH="0" baseline="0" dirty="0" err="1" smtClean="0">
+                <a:ln>
+                  <a:noFill/>
+                </a:ln>
+                <a:solidFill>
+                  <a:srgbClr val="000080"/>
+                </a:solidFill>
+                <a:effectLst/>
+                <a:latin typeface="Courier New" panose="02070309020205020404" pitchFamily="49" charset="0"/>
+                <a:cs typeface="Courier New" panose="02070309020205020404" pitchFamily="49" charset="0"/>
+              </a:rPr>
+              <a:t>def</a:t>
+            </a:r>
+            <a:r>
+              <a:rPr kumimoji="0" lang="en-US" altLang="en-US" sz="1100" b="1" i="0" u="none" strike="noStrike" cap="none" normalizeH="0" baseline="0" dirty="0" smtClean="0">
+                <a:ln>
+                  <a:noFill/>
+                </a:ln>
+                <a:solidFill>
+                  <a:srgbClr val="000080"/>
+                </a:solidFill>
+                <a:effectLst/>
+                <a:latin typeface="Courier New" panose="02070309020205020404" pitchFamily="49" charset="0"/>
+                <a:cs typeface="Courier New" panose="02070309020205020404" pitchFamily="49" charset="0"/>
+              </a:rPr>
+              <a:t> </a:t>
+            </a:r>
+            <a:r>
+              <a:rPr kumimoji="0" lang="en-US" altLang="en-US" sz="1100" b="0" i="0" u="none" strike="noStrike" cap="none" normalizeH="0" baseline="0" dirty="0" smtClean="0">
+                <a:ln>
+                  <a:noFill/>
+                </a:ln>
+                <a:solidFill>
+                  <a:srgbClr val="000000"/>
+                </a:solidFill>
+                <a:effectLst/>
+                <a:latin typeface="Courier New" panose="02070309020205020404" pitchFamily="49" charset="0"/>
+                <a:cs typeface="Courier New" panose="02070309020205020404" pitchFamily="49" charset="0"/>
+              </a:rPr>
+              <a:t>have(f: =&gt; </a:t>
+            </a:r>
+            <a:r>
+              <a:rPr kumimoji="0" lang="en-US" altLang="en-US" sz="1100" b="0" i="0" u="none" strike="noStrike" cap="none" normalizeH="0" baseline="0" dirty="0" smtClean="0">
+                <a:ln>
+                  <a:noFill/>
+                </a:ln>
+                <a:solidFill>
+                  <a:srgbClr val="CC7832"/>
+                </a:solidFill>
+                <a:effectLst/>
+                <a:latin typeface="Courier New" panose="02070309020205020404" pitchFamily="49" charset="0"/>
+                <a:cs typeface="Courier New" panose="02070309020205020404" pitchFamily="49" charset="0"/>
+              </a:rPr>
+              <a:t>Unit</a:t>
+            </a:r>
+            <a:r>
+              <a:rPr kumimoji="0" lang="en-US" altLang="en-US" sz="1100" b="0" i="0" u="none" strike="noStrike" cap="none" normalizeH="0" baseline="0" dirty="0" smtClean="0">
+                <a:ln>
+                  <a:noFill/>
+                </a:ln>
+                <a:solidFill>
+                  <a:srgbClr val="000000"/>
+                </a:solidFill>
+                <a:effectLst/>
+                <a:latin typeface="Courier New" panose="02070309020205020404" pitchFamily="49" charset="0"/>
+                <a:cs typeface="Courier New" panose="02070309020205020404" pitchFamily="49" charset="0"/>
+              </a:rPr>
+              <a:t>) = </a:t>
+            </a:r>
+            <a:r>
+              <a:rPr kumimoji="0" lang="en-US" altLang="en-US" sz="1100" b="1" i="0" u="none" strike="noStrike" cap="none" normalizeH="0" baseline="0" dirty="0" smtClean="0">
+                <a:ln>
+                  <a:noFill/>
+                </a:ln>
+                <a:solidFill>
+                  <a:srgbClr val="000080"/>
+                </a:solidFill>
+                <a:effectLst/>
+                <a:latin typeface="Courier New" panose="02070309020205020404" pitchFamily="49" charset="0"/>
+                <a:cs typeface="Courier New" panose="02070309020205020404" pitchFamily="49" charset="0"/>
+              </a:rPr>
+              <a:t>new </a:t>
+            </a:r>
+            <a:r>
+              <a:rPr kumimoji="0" lang="en-US" altLang="en-US" sz="1100" b="0" i="0" u="none" strike="noStrike" cap="none" normalizeH="0" baseline="0" dirty="0" smtClean="0">
+                <a:ln>
+                  <a:noFill/>
+                </a:ln>
+                <a:solidFill>
+                  <a:srgbClr val="000000"/>
+                </a:solidFill>
+                <a:effectLst/>
+                <a:latin typeface="Courier New" panose="02070309020205020404" pitchFamily="49" charset="0"/>
+                <a:cs typeface="Courier New" panose="02070309020205020404" pitchFamily="49" charset="0"/>
+              </a:rPr>
+              <a:t>{</a:t>
+            </a:r>
+            <a:br>
+              <a:rPr kumimoji="0" lang="en-US" altLang="en-US" sz="1100" b="0" i="0" u="none" strike="noStrike" cap="none" normalizeH="0" baseline="0" dirty="0" smtClean="0">
+                <a:ln>
+                  <a:noFill/>
+                </a:ln>
+                <a:solidFill>
+                  <a:srgbClr val="000000"/>
+                </a:solidFill>
+                <a:effectLst/>
+                <a:latin typeface="Courier New" panose="02070309020205020404" pitchFamily="49" charset="0"/>
+                <a:cs typeface="Courier New" panose="02070309020205020404" pitchFamily="49" charset="0"/>
+              </a:rPr>
+            </a:br>
+            <a:r>
+              <a:rPr kumimoji="0" lang="en-US" altLang="en-US" sz="1100" b="0" i="0" u="none" strike="noStrike" cap="none" normalizeH="0" baseline="0" dirty="0" smtClean="0">
+                <a:ln>
+                  <a:noFill/>
+                </a:ln>
+                <a:solidFill>
+                  <a:srgbClr val="000000"/>
+                </a:solidFill>
+                <a:effectLst/>
+                <a:latin typeface="Courier New" panose="02070309020205020404" pitchFamily="49" charset="0"/>
+                <a:cs typeface="Courier New" panose="02070309020205020404" pitchFamily="49" charset="0"/>
+              </a:rPr>
+              <a:t>    </a:t>
+            </a:r>
+            <a:r>
+              <a:rPr kumimoji="0" lang="en-US" altLang="en-US" sz="1100" b="1" i="0" u="none" strike="noStrike" cap="none" normalizeH="0" baseline="0" dirty="0" err="1" smtClean="0">
+                <a:ln>
+                  <a:noFill/>
+                </a:ln>
+                <a:solidFill>
+                  <a:srgbClr val="000080"/>
+                </a:solidFill>
+                <a:effectLst/>
+                <a:latin typeface="Courier New" panose="02070309020205020404" pitchFamily="49" charset="0"/>
+                <a:cs typeface="Courier New" panose="02070309020205020404" pitchFamily="49" charset="0"/>
+              </a:rPr>
+              <a:t>def</a:t>
+            </a:r>
+            <a:r>
+              <a:rPr kumimoji="0" lang="en-US" altLang="en-US" sz="1100" b="1" i="0" u="none" strike="noStrike" cap="none" normalizeH="0" baseline="0" dirty="0" smtClean="0">
+                <a:ln>
+                  <a:noFill/>
+                </a:ln>
+                <a:solidFill>
+                  <a:srgbClr val="000080"/>
+                </a:solidFill>
+                <a:effectLst/>
+                <a:latin typeface="Courier New" panose="02070309020205020404" pitchFamily="49" charset="0"/>
+                <a:cs typeface="Courier New" panose="02070309020205020404" pitchFamily="49" charset="0"/>
+              </a:rPr>
+              <a:t> </a:t>
+            </a:r>
+            <a:r>
+              <a:rPr kumimoji="0" lang="en-US" altLang="en-US" sz="1100" b="0" i="0" u="none" strike="noStrike" cap="none" normalizeH="0" baseline="0" dirty="0" err="1" smtClean="0">
+                <a:ln>
+                  <a:noFill/>
+                </a:ln>
+                <a:solidFill>
+                  <a:srgbClr val="000000"/>
+                </a:solidFill>
+                <a:effectLst/>
+                <a:latin typeface="Courier New" panose="02070309020205020404" pitchFamily="49" charset="0"/>
+                <a:cs typeface="Courier New" panose="02070309020205020404" pitchFamily="49" charset="0"/>
+              </a:rPr>
+              <a:t>til</a:t>
+            </a:r>
+            <a:r>
+              <a:rPr kumimoji="0" lang="en-US" altLang="en-US" sz="1100" b="0" i="0" u="none" strike="noStrike" cap="none" normalizeH="0" baseline="0" dirty="0" smtClean="0">
+                <a:ln>
+                  <a:noFill/>
+                </a:ln>
+                <a:solidFill>
+                  <a:srgbClr val="000000"/>
+                </a:solidFill>
+                <a:effectLst/>
+                <a:latin typeface="Courier New" panose="02070309020205020404" pitchFamily="49" charset="0"/>
+                <a:cs typeface="Courier New" panose="02070309020205020404" pitchFamily="49" charset="0"/>
+              </a:rPr>
+              <a:t>(c: =&gt; </a:t>
+            </a:r>
+            <a:r>
+              <a:rPr kumimoji="0" lang="en-US" altLang="en-US" sz="1100" b="0" i="0" u="none" strike="noStrike" cap="none" normalizeH="0" baseline="0" dirty="0" smtClean="0">
+                <a:ln>
+                  <a:noFill/>
+                </a:ln>
+                <a:solidFill>
+                  <a:srgbClr val="CC7832"/>
+                </a:solidFill>
+                <a:effectLst/>
+                <a:latin typeface="Courier New" panose="02070309020205020404" pitchFamily="49" charset="0"/>
+                <a:cs typeface="Courier New" panose="02070309020205020404" pitchFamily="49" charset="0"/>
+              </a:rPr>
+              <a:t>Boolean</a:t>
+            </a:r>
+            <a:r>
+              <a:rPr kumimoji="0" lang="en-US" altLang="en-US" sz="1100" b="0" i="0" u="none" strike="noStrike" cap="none" normalizeH="0" baseline="0" dirty="0" smtClean="0">
+                <a:ln>
+                  <a:noFill/>
+                </a:ln>
+                <a:solidFill>
+                  <a:srgbClr val="000000"/>
+                </a:solidFill>
+                <a:effectLst/>
+                <a:latin typeface="Courier New" panose="02070309020205020404" pitchFamily="49" charset="0"/>
+                <a:cs typeface="Courier New" panose="02070309020205020404" pitchFamily="49" charset="0"/>
+              </a:rPr>
+              <a:t>) = {</a:t>
+            </a:r>
+            <a:r>
+              <a:rPr kumimoji="0" lang="en-US" altLang="en-US" sz="1100" b="1" i="0" u="none" strike="noStrike" cap="none" normalizeH="0" baseline="0" dirty="0" smtClean="0">
+                <a:ln>
+                  <a:noFill/>
+                </a:ln>
+                <a:solidFill>
+                  <a:srgbClr val="000080"/>
+                </a:solidFill>
+                <a:effectLst/>
+                <a:latin typeface="Courier New" panose="02070309020205020404" pitchFamily="49" charset="0"/>
+                <a:cs typeface="Courier New" panose="02070309020205020404" pitchFamily="49" charset="0"/>
+              </a:rPr>
+              <a:t>do</a:t>
+            </a:r>
+            <a:r>
+              <a:rPr kumimoji="0" lang="en-US" altLang="en-US" sz="1100" b="0" i="0" u="none" strike="noStrike" cap="none" normalizeH="0" baseline="0" dirty="0" smtClean="0">
+                <a:ln>
+                  <a:noFill/>
+                </a:ln>
+                <a:solidFill>
+                  <a:srgbClr val="000000"/>
+                </a:solidFill>
+                <a:effectLst/>
+                <a:latin typeface="Courier New" panose="02070309020205020404" pitchFamily="49" charset="0"/>
+                <a:cs typeface="Courier New" panose="02070309020205020404" pitchFamily="49" charset="0"/>
+              </a:rPr>
+              <a:t>{f} </a:t>
+            </a:r>
+            <a:r>
+              <a:rPr kumimoji="0" lang="en-US" altLang="en-US" sz="1100" b="1" i="0" u="none" strike="noStrike" cap="none" normalizeH="0" baseline="0" dirty="0" smtClean="0">
+                <a:ln>
+                  <a:noFill/>
+                </a:ln>
+                <a:solidFill>
+                  <a:srgbClr val="000080"/>
+                </a:solidFill>
+                <a:effectLst/>
+                <a:latin typeface="Courier New" panose="02070309020205020404" pitchFamily="49" charset="0"/>
+                <a:cs typeface="Courier New" panose="02070309020205020404" pitchFamily="49" charset="0"/>
+              </a:rPr>
+              <a:t>while </a:t>
+            </a:r>
+            <a:r>
+              <a:rPr kumimoji="0" lang="en-US" altLang="en-US" sz="1100" b="0" i="0" u="none" strike="noStrike" cap="none" normalizeH="0" baseline="0" dirty="0" smtClean="0">
+                <a:ln>
+                  <a:noFill/>
+                </a:ln>
+                <a:solidFill>
+                  <a:srgbClr val="000000"/>
+                </a:solidFill>
+                <a:effectLst/>
+                <a:latin typeface="Courier New" panose="02070309020205020404" pitchFamily="49" charset="0"/>
+                <a:cs typeface="Courier New" panose="02070309020205020404" pitchFamily="49" charset="0"/>
+              </a:rPr>
+              <a:t>(!c)}</a:t>
+            </a:r>
+            <a:br>
+              <a:rPr kumimoji="0" lang="en-US" altLang="en-US" sz="1100" b="0" i="0" u="none" strike="noStrike" cap="none" normalizeH="0" baseline="0" dirty="0" smtClean="0">
+                <a:ln>
+                  <a:noFill/>
+                </a:ln>
+                <a:solidFill>
+                  <a:srgbClr val="000000"/>
+                </a:solidFill>
+                <a:effectLst/>
+                <a:latin typeface="Courier New" panose="02070309020205020404" pitchFamily="49" charset="0"/>
+                <a:cs typeface="Courier New" panose="02070309020205020404" pitchFamily="49" charset="0"/>
+              </a:rPr>
+            </a:br>
+            <a:r>
+              <a:rPr kumimoji="0" lang="en-US" altLang="en-US" sz="1100" b="0" i="0" u="none" strike="noStrike" cap="none" normalizeH="0" baseline="0" dirty="0" smtClean="0">
+                <a:ln>
+                  <a:noFill/>
+                </a:ln>
+                <a:solidFill>
+                  <a:srgbClr val="000000"/>
+                </a:solidFill>
+                <a:effectLst/>
+                <a:latin typeface="Courier New" panose="02070309020205020404" pitchFamily="49" charset="0"/>
+                <a:cs typeface="Courier New" panose="02070309020205020404" pitchFamily="49" charset="0"/>
+              </a:rPr>
+              <a:t>  }</a:t>
+            </a:r>
+            <a:br>
+              <a:rPr kumimoji="0" lang="en-US" altLang="en-US" sz="1100" b="0" i="0" u="none" strike="noStrike" cap="none" normalizeH="0" baseline="0" dirty="0" smtClean="0">
+                <a:ln>
+                  <a:noFill/>
+                </a:ln>
+                <a:solidFill>
+                  <a:srgbClr val="000000"/>
+                </a:solidFill>
+                <a:effectLst/>
+                <a:latin typeface="Courier New" panose="02070309020205020404" pitchFamily="49" charset="0"/>
+                <a:cs typeface="Courier New" panose="02070309020205020404" pitchFamily="49" charset="0"/>
+              </a:rPr>
+            </a:br>
+            <a:r>
+              <a:rPr kumimoji="0" lang="en-US" altLang="en-US" sz="1100" b="0" i="0" u="none" strike="noStrike" cap="none" normalizeH="0" baseline="0" dirty="0" smtClean="0">
+                <a:ln>
+                  <a:noFill/>
+                </a:ln>
+                <a:solidFill>
+                  <a:srgbClr val="000000"/>
+                </a:solidFill>
+                <a:effectLst/>
+                <a:latin typeface="Courier New" panose="02070309020205020404" pitchFamily="49" charset="0"/>
+                <a:cs typeface="Courier New" panose="02070309020205020404" pitchFamily="49" charset="0"/>
+              </a:rPr>
+              <a:t>}</a:t>
+            </a:r>
+            <a:br>
+              <a:rPr kumimoji="0" lang="en-US" altLang="en-US" sz="1100" b="0" i="0" u="none" strike="noStrike" cap="none" normalizeH="0" baseline="0" dirty="0" smtClean="0">
+                <a:ln>
+                  <a:noFill/>
+                </a:ln>
+                <a:solidFill>
+                  <a:srgbClr val="000000"/>
+                </a:solidFill>
+                <a:effectLst/>
+                <a:latin typeface="Courier New" panose="02070309020205020404" pitchFamily="49" charset="0"/>
+                <a:cs typeface="Courier New" panose="02070309020205020404" pitchFamily="49" charset="0"/>
+              </a:rPr>
+            </a:br>
+            <a:r>
+              <a:rPr kumimoji="0" lang="en-US" altLang="en-US" sz="1100" b="0" i="0" u="none" strike="noStrike" cap="none" normalizeH="0" baseline="0" dirty="0" smtClean="0">
+                <a:ln>
+                  <a:noFill/>
+                </a:ln>
+                <a:solidFill>
+                  <a:srgbClr val="000000"/>
+                </a:solidFill>
+                <a:effectLst/>
+                <a:latin typeface="Courier New" panose="02070309020205020404" pitchFamily="49" charset="0"/>
+                <a:cs typeface="Courier New" panose="02070309020205020404" pitchFamily="49" charset="0"/>
+              </a:rPr>
+              <a:t/>
+            </a:r>
+            <a:br>
+              <a:rPr kumimoji="0" lang="en-US" altLang="en-US" sz="1100" b="0" i="0" u="none" strike="noStrike" cap="none" normalizeH="0" baseline="0" dirty="0" smtClean="0">
+                <a:ln>
+                  <a:noFill/>
+                </a:ln>
+                <a:solidFill>
+                  <a:srgbClr val="000000"/>
+                </a:solidFill>
+                <a:effectLst/>
+                <a:latin typeface="Courier New" panose="02070309020205020404" pitchFamily="49" charset="0"/>
+                <a:cs typeface="Courier New" panose="02070309020205020404" pitchFamily="49" charset="0"/>
+              </a:rPr>
+            </a:br>
+            <a:r>
+              <a:rPr kumimoji="0" lang="en-US" altLang="en-US" sz="1100" b="1" i="0" u="none" strike="noStrike" cap="none" normalizeH="0" baseline="0" dirty="0" smtClean="0">
+                <a:ln>
+                  <a:noFill/>
+                </a:ln>
+                <a:solidFill>
+                  <a:srgbClr val="000080"/>
+                </a:solidFill>
+                <a:effectLst/>
+                <a:latin typeface="Courier New" panose="02070309020205020404" pitchFamily="49" charset="0"/>
+                <a:cs typeface="Courier New" panose="02070309020205020404" pitchFamily="49" charset="0"/>
+              </a:rPr>
+              <a:t>case class </a:t>
+            </a:r>
+            <a:r>
+              <a:rPr kumimoji="0" lang="en-US" altLang="en-US" sz="1100" b="0" i="0" u="none" strike="noStrike" cap="none" normalizeH="0" baseline="0" dirty="0" err="1" smtClean="0">
+                <a:ln>
+                  <a:noFill/>
+                </a:ln>
+                <a:solidFill>
+                  <a:srgbClr val="000000"/>
+                </a:solidFill>
+                <a:effectLst/>
+                <a:latin typeface="Courier New" panose="02070309020205020404" pitchFamily="49" charset="0"/>
+                <a:cs typeface="Courier New" panose="02070309020205020404" pitchFamily="49" charset="0"/>
+              </a:rPr>
+              <a:t>TBird</a:t>
+            </a:r>
+            <a:r>
+              <a:rPr kumimoji="0" lang="en-US" altLang="en-US" sz="1100" b="0" i="0" u="none" strike="noStrike" cap="none" normalizeH="0" baseline="0" dirty="0" smtClean="0">
+                <a:ln>
+                  <a:noFill/>
+                </a:ln>
+                <a:solidFill>
+                  <a:srgbClr val="000000"/>
+                </a:solidFill>
+                <a:effectLst/>
+                <a:latin typeface="Courier New" panose="02070309020205020404" pitchFamily="49" charset="0"/>
+                <a:cs typeface="Courier New" panose="02070309020205020404" pitchFamily="49" charset="0"/>
+              </a:rPr>
+              <a:t>(){</a:t>
+            </a:r>
+            <a:br>
+              <a:rPr kumimoji="0" lang="en-US" altLang="en-US" sz="1100" b="0" i="0" u="none" strike="noStrike" cap="none" normalizeH="0" baseline="0" dirty="0" smtClean="0">
+                <a:ln>
+                  <a:noFill/>
+                </a:ln>
+                <a:solidFill>
+                  <a:srgbClr val="000000"/>
+                </a:solidFill>
+                <a:effectLst/>
+                <a:latin typeface="Courier New" panose="02070309020205020404" pitchFamily="49" charset="0"/>
+                <a:cs typeface="Courier New" panose="02070309020205020404" pitchFamily="49" charset="0"/>
+              </a:rPr>
+            </a:br>
+            <a:r>
+              <a:rPr kumimoji="0" lang="en-US" altLang="en-US" sz="1100" b="0" i="0" u="none" strike="noStrike" cap="none" normalizeH="0" baseline="0" dirty="0" smtClean="0">
+                <a:ln>
+                  <a:noFill/>
+                </a:ln>
+                <a:solidFill>
+                  <a:srgbClr val="000000"/>
+                </a:solidFill>
+                <a:effectLst/>
+                <a:latin typeface="Courier New" panose="02070309020205020404" pitchFamily="49" charset="0"/>
+                <a:cs typeface="Courier New" panose="02070309020205020404" pitchFamily="49" charset="0"/>
+              </a:rPr>
+              <a:t/>
+            </a:r>
+            <a:br>
+              <a:rPr kumimoji="0" lang="en-US" altLang="en-US" sz="1100" b="0" i="0" u="none" strike="noStrike" cap="none" normalizeH="0" baseline="0" dirty="0" smtClean="0">
+                <a:ln>
+                  <a:noFill/>
+                </a:ln>
+                <a:solidFill>
+                  <a:srgbClr val="000000"/>
+                </a:solidFill>
+                <a:effectLst/>
+                <a:latin typeface="Courier New" panose="02070309020205020404" pitchFamily="49" charset="0"/>
+                <a:cs typeface="Courier New" panose="02070309020205020404" pitchFamily="49" charset="0"/>
+              </a:rPr>
+            </a:br>
+            <a:r>
+              <a:rPr kumimoji="0" lang="en-US" altLang="en-US" sz="1100" b="0" i="0" u="none" strike="noStrike" cap="none" normalizeH="0" baseline="0" dirty="0" smtClean="0">
+                <a:ln>
+                  <a:noFill/>
+                </a:ln>
+                <a:solidFill>
+                  <a:srgbClr val="000000"/>
+                </a:solidFill>
+                <a:effectLst/>
+                <a:latin typeface="Courier New" panose="02070309020205020404" pitchFamily="49" charset="0"/>
+                <a:cs typeface="Courier New" panose="02070309020205020404" pitchFamily="49" charset="0"/>
+              </a:rPr>
+              <a:t>}</a:t>
+            </a:r>
+            <a:br>
+              <a:rPr kumimoji="0" lang="en-US" altLang="en-US" sz="1100" b="0" i="0" u="none" strike="noStrike" cap="none" normalizeH="0" baseline="0" dirty="0" smtClean="0">
+                <a:ln>
+                  <a:noFill/>
+                </a:ln>
+                <a:solidFill>
+                  <a:srgbClr val="000000"/>
+                </a:solidFill>
+                <a:effectLst/>
+                <a:latin typeface="Courier New" panose="02070309020205020404" pitchFamily="49" charset="0"/>
+                <a:cs typeface="Courier New" panose="02070309020205020404" pitchFamily="49" charset="0"/>
+              </a:rPr>
+            </a:br>
+            <a:r>
+              <a:rPr kumimoji="0" lang="en-US" altLang="en-US" sz="1100" b="0" i="0" u="none" strike="noStrike" cap="none" normalizeH="0" baseline="0" dirty="0" smtClean="0">
+                <a:ln>
+                  <a:noFill/>
+                </a:ln>
+                <a:solidFill>
+                  <a:srgbClr val="000000"/>
+                </a:solidFill>
+                <a:effectLst/>
+                <a:latin typeface="Courier New" panose="02070309020205020404" pitchFamily="49" charset="0"/>
+                <a:cs typeface="Courier New" panose="02070309020205020404" pitchFamily="49" charset="0"/>
+              </a:rPr>
+              <a:t/>
+            </a:r>
+            <a:br>
+              <a:rPr kumimoji="0" lang="en-US" altLang="en-US" sz="1100" b="0" i="0" u="none" strike="noStrike" cap="none" normalizeH="0" baseline="0" dirty="0" smtClean="0">
+                <a:ln>
+                  <a:noFill/>
+                </a:ln>
+                <a:solidFill>
+                  <a:srgbClr val="000000"/>
+                </a:solidFill>
+                <a:effectLst/>
+                <a:latin typeface="Courier New" panose="02070309020205020404" pitchFamily="49" charset="0"/>
+                <a:cs typeface="Courier New" panose="02070309020205020404" pitchFamily="49" charset="0"/>
+              </a:rPr>
+            </a:br>
+            <a:r>
+              <a:rPr kumimoji="0" lang="en-US" altLang="en-US" sz="1100" b="1" i="0" u="none" strike="noStrike" cap="none" normalizeH="0" baseline="0" dirty="0" smtClean="0">
+                <a:ln>
+                  <a:noFill/>
+                </a:ln>
+                <a:solidFill>
+                  <a:srgbClr val="000080"/>
+                </a:solidFill>
+                <a:effectLst/>
+                <a:latin typeface="Courier New" panose="02070309020205020404" pitchFamily="49" charset="0"/>
+                <a:cs typeface="Courier New" panose="02070309020205020404" pitchFamily="49" charset="0"/>
+              </a:rPr>
+              <a:t>case class </a:t>
+            </a:r>
+            <a:r>
+              <a:rPr kumimoji="0" lang="en-US" altLang="en-US" sz="1100" b="0" i="0" u="none" strike="noStrike" cap="none" normalizeH="0" baseline="0" dirty="0" smtClean="0">
+                <a:ln>
+                  <a:noFill/>
+                </a:ln>
+                <a:solidFill>
+                  <a:srgbClr val="000000"/>
+                </a:solidFill>
+                <a:effectLst/>
+                <a:latin typeface="Courier New" panose="02070309020205020404" pitchFamily="49" charset="0"/>
+                <a:cs typeface="Courier New" panose="02070309020205020404" pitchFamily="49" charset="0"/>
+              </a:rPr>
+              <a:t>Daddy(){</a:t>
+            </a:r>
+            <a:br>
+              <a:rPr kumimoji="0" lang="en-US" altLang="en-US" sz="1100" b="0" i="0" u="none" strike="noStrike" cap="none" normalizeH="0" baseline="0" dirty="0" smtClean="0">
+                <a:ln>
+                  <a:noFill/>
+                </a:ln>
+                <a:solidFill>
+                  <a:srgbClr val="000000"/>
+                </a:solidFill>
+                <a:effectLst/>
+                <a:latin typeface="Courier New" panose="02070309020205020404" pitchFamily="49" charset="0"/>
+                <a:cs typeface="Courier New" panose="02070309020205020404" pitchFamily="49" charset="0"/>
+              </a:rPr>
+            </a:br>
+            <a:r>
+              <a:rPr kumimoji="0" lang="en-US" altLang="en-US" sz="1100" b="0" i="0" u="none" strike="noStrike" cap="none" normalizeH="0" baseline="0" dirty="0" smtClean="0">
+                <a:ln>
+                  <a:noFill/>
+                </a:ln>
+                <a:solidFill>
+                  <a:srgbClr val="000000"/>
+                </a:solidFill>
+                <a:effectLst/>
+                <a:latin typeface="Courier New" panose="02070309020205020404" pitchFamily="49" charset="0"/>
+                <a:cs typeface="Courier New" panose="02070309020205020404" pitchFamily="49" charset="0"/>
+              </a:rPr>
+              <a:t>  </a:t>
+            </a:r>
+            <a:r>
+              <a:rPr kumimoji="0" lang="en-US" altLang="en-US" sz="1100" b="1" i="0" u="none" strike="noStrike" cap="none" normalizeH="0" baseline="0" dirty="0" err="1" smtClean="0">
+                <a:ln>
+                  <a:noFill/>
+                </a:ln>
+                <a:solidFill>
+                  <a:srgbClr val="000080"/>
+                </a:solidFill>
+                <a:effectLst/>
+                <a:latin typeface="Courier New" panose="02070309020205020404" pitchFamily="49" charset="0"/>
+                <a:cs typeface="Courier New" panose="02070309020205020404" pitchFamily="49" charset="0"/>
+              </a:rPr>
+              <a:t>def</a:t>
+            </a:r>
+            <a:r>
+              <a:rPr kumimoji="0" lang="en-US" altLang="en-US" sz="1100" b="1" i="0" u="none" strike="noStrike" cap="none" normalizeH="0" baseline="0" dirty="0" smtClean="0">
+                <a:ln>
+                  <a:noFill/>
+                </a:ln>
+                <a:solidFill>
+                  <a:srgbClr val="000080"/>
+                </a:solidFill>
+                <a:effectLst/>
+                <a:latin typeface="Courier New" panose="02070309020205020404" pitchFamily="49" charset="0"/>
+                <a:cs typeface="Courier New" panose="02070309020205020404" pitchFamily="49" charset="0"/>
+              </a:rPr>
+              <a:t> </a:t>
+            </a:r>
+            <a:r>
+              <a:rPr kumimoji="0" lang="en-US" altLang="en-US" sz="1100" b="0" i="0" u="none" strike="noStrike" cap="none" normalizeH="0" baseline="0" dirty="0" err="1" smtClean="0">
+                <a:ln>
+                  <a:noFill/>
+                </a:ln>
+                <a:solidFill>
+                  <a:srgbClr val="000000"/>
+                </a:solidFill>
+                <a:effectLst/>
+                <a:latin typeface="Courier New" panose="02070309020205020404" pitchFamily="49" charset="0"/>
+                <a:cs typeface="Courier New" panose="02070309020205020404" pitchFamily="49" charset="0"/>
+              </a:rPr>
+              <a:t>takeAway</a:t>
+            </a:r>
+            <a:r>
+              <a:rPr kumimoji="0" lang="en-US" altLang="en-US" sz="1100" b="0" i="0" u="none" strike="noStrike" cap="none" normalizeH="0" baseline="0" dirty="0" smtClean="0">
+                <a:ln>
+                  <a:noFill/>
+                </a:ln>
+                <a:solidFill>
+                  <a:srgbClr val="000000"/>
+                </a:solidFill>
+                <a:effectLst/>
+                <a:latin typeface="Courier New" panose="02070309020205020404" pitchFamily="49" charset="0"/>
+                <a:cs typeface="Courier New" panose="02070309020205020404" pitchFamily="49" charset="0"/>
+              </a:rPr>
+              <a:t>(t: </a:t>
+            </a:r>
+            <a:r>
+              <a:rPr kumimoji="0" lang="en-US" altLang="en-US" sz="1100" b="0" i="0" u="none" strike="noStrike" cap="none" normalizeH="0" baseline="0" dirty="0" err="1" smtClean="0">
+                <a:ln>
+                  <a:noFill/>
+                </a:ln>
+                <a:solidFill>
+                  <a:srgbClr val="000000"/>
+                </a:solidFill>
+                <a:effectLst/>
+                <a:latin typeface="Courier New" panose="02070309020205020404" pitchFamily="49" charset="0"/>
+                <a:cs typeface="Courier New" panose="02070309020205020404" pitchFamily="49" charset="0"/>
+              </a:rPr>
+              <a:t>TBird</a:t>
+            </a:r>
+            <a:r>
+              <a:rPr kumimoji="0" lang="en-US" altLang="en-US" sz="1100" b="0" i="0" u="none" strike="noStrike" cap="none" normalizeH="0" baseline="0" dirty="0" smtClean="0">
+                <a:ln>
+                  <a:noFill/>
+                </a:ln>
+                <a:solidFill>
+                  <a:srgbClr val="000000"/>
+                </a:solidFill>
+                <a:effectLst/>
+                <a:latin typeface="Courier New" panose="02070309020205020404" pitchFamily="49" charset="0"/>
+                <a:cs typeface="Courier New" panose="02070309020205020404" pitchFamily="49" charset="0"/>
+              </a:rPr>
+              <a:t>) = {</a:t>
+            </a:r>
+            <a:br>
+              <a:rPr kumimoji="0" lang="en-US" altLang="en-US" sz="1100" b="0" i="0" u="none" strike="noStrike" cap="none" normalizeH="0" baseline="0" dirty="0" smtClean="0">
+                <a:ln>
+                  <a:noFill/>
+                </a:ln>
+                <a:solidFill>
+                  <a:srgbClr val="000000"/>
+                </a:solidFill>
+                <a:effectLst/>
+                <a:latin typeface="Courier New" panose="02070309020205020404" pitchFamily="49" charset="0"/>
+                <a:cs typeface="Courier New" panose="02070309020205020404" pitchFamily="49" charset="0"/>
+              </a:rPr>
+            </a:br>
+            <a:r>
+              <a:rPr kumimoji="0" lang="en-US" altLang="en-US" sz="1100" b="0" i="0" u="none" strike="noStrike" cap="none" normalizeH="0" baseline="0" dirty="0" smtClean="0">
+                <a:ln>
+                  <a:noFill/>
+                </a:ln>
+                <a:solidFill>
+                  <a:srgbClr val="000000"/>
+                </a:solidFill>
+                <a:effectLst/>
+                <a:latin typeface="Courier New" panose="02070309020205020404" pitchFamily="49" charset="0"/>
+                <a:cs typeface="Courier New" panose="02070309020205020404" pitchFamily="49" charset="0"/>
+              </a:rPr>
+              <a:t>    </a:t>
+            </a:r>
+            <a:r>
+              <a:rPr kumimoji="0" lang="en-US" altLang="en-US" sz="1100" b="0" i="1" u="none" strike="noStrike" cap="none" normalizeH="0" baseline="0" dirty="0" err="1" smtClean="0">
+                <a:ln>
+                  <a:noFill/>
+                </a:ln>
+                <a:solidFill>
+                  <a:srgbClr val="000000"/>
+                </a:solidFill>
+                <a:effectLst/>
+                <a:latin typeface="Courier New" panose="02070309020205020404" pitchFamily="49" charset="0"/>
+                <a:cs typeface="Courier New" panose="02070309020205020404" pitchFamily="49" charset="0"/>
+              </a:rPr>
+              <a:t>println</a:t>
+            </a:r>
+            <a:r>
+              <a:rPr kumimoji="0" lang="en-US" altLang="en-US" sz="1100" b="0" i="0" u="none" strike="noStrike" cap="none" normalizeH="0" baseline="0" dirty="0" smtClean="0">
+                <a:ln>
+                  <a:noFill/>
+                </a:ln>
+                <a:solidFill>
+                  <a:srgbClr val="000000"/>
+                </a:solidFill>
+                <a:effectLst/>
+                <a:latin typeface="Courier New" panose="02070309020205020404" pitchFamily="49" charset="0"/>
+                <a:cs typeface="Courier New" panose="02070309020205020404" pitchFamily="49" charset="0"/>
+              </a:rPr>
+              <a:t>(</a:t>
+            </a:r>
+            <a:r>
+              <a:rPr kumimoji="0" lang="en-US" altLang="en-US" sz="1100" b="1" i="0" u="none" strike="noStrike" cap="none" normalizeH="0" baseline="0" dirty="0" smtClean="0">
+                <a:ln>
+                  <a:noFill/>
+                </a:ln>
+                <a:solidFill>
+                  <a:srgbClr val="008000"/>
+                </a:solidFill>
+                <a:effectLst/>
+                <a:latin typeface="Courier New" panose="02070309020205020404" pitchFamily="49" charset="0"/>
+                <a:cs typeface="Courier New" panose="02070309020205020404" pitchFamily="49" charset="0"/>
+              </a:rPr>
+              <a:t>"Daddy took the T-Bird away."</a:t>
+            </a:r>
+            <a:r>
+              <a:rPr kumimoji="0" lang="en-US" altLang="en-US" sz="1100" b="0" i="0" u="none" strike="noStrike" cap="none" normalizeH="0" baseline="0" dirty="0" smtClean="0">
+                <a:ln>
+                  <a:noFill/>
+                </a:ln>
+                <a:solidFill>
+                  <a:srgbClr val="000000"/>
+                </a:solidFill>
+                <a:effectLst/>
+                <a:latin typeface="Courier New" panose="02070309020205020404" pitchFamily="49" charset="0"/>
+                <a:cs typeface="Courier New" panose="02070309020205020404" pitchFamily="49" charset="0"/>
+              </a:rPr>
+              <a:t>)</a:t>
+            </a:r>
+            <a:br>
+              <a:rPr kumimoji="0" lang="en-US" altLang="en-US" sz="1100" b="0" i="0" u="none" strike="noStrike" cap="none" normalizeH="0" baseline="0" dirty="0" smtClean="0">
+                <a:ln>
+                  <a:noFill/>
+                </a:ln>
+                <a:solidFill>
+                  <a:srgbClr val="000000"/>
+                </a:solidFill>
+                <a:effectLst/>
+                <a:latin typeface="Courier New" panose="02070309020205020404" pitchFamily="49" charset="0"/>
+                <a:cs typeface="Courier New" panose="02070309020205020404" pitchFamily="49" charset="0"/>
+              </a:rPr>
+            </a:br>
+            <a:r>
+              <a:rPr kumimoji="0" lang="en-US" altLang="en-US" sz="1100" b="0" i="0" u="none" strike="noStrike" cap="none" normalizeH="0" baseline="0" dirty="0" smtClean="0">
+                <a:ln>
+                  <a:noFill/>
+                </a:ln>
+                <a:solidFill>
+                  <a:srgbClr val="000000"/>
+                </a:solidFill>
+                <a:effectLst/>
+                <a:latin typeface="Courier New" panose="02070309020205020404" pitchFamily="49" charset="0"/>
+                <a:cs typeface="Courier New" panose="02070309020205020404" pitchFamily="49" charset="0"/>
+              </a:rPr>
+              <a:t>    </a:t>
+            </a:r>
+            <a:r>
+              <a:rPr kumimoji="0" lang="en-US" altLang="en-US" sz="1100" b="1" i="0" u="none" strike="noStrike" cap="none" normalizeH="0" baseline="0" dirty="0" smtClean="0">
+                <a:ln>
+                  <a:noFill/>
+                </a:ln>
+                <a:solidFill>
+                  <a:srgbClr val="000080"/>
+                </a:solidFill>
+                <a:effectLst/>
+                <a:latin typeface="Courier New" panose="02070309020205020404" pitchFamily="49" charset="0"/>
+                <a:cs typeface="Courier New" panose="02070309020205020404" pitchFamily="49" charset="0"/>
+              </a:rPr>
+              <a:t>true</a:t>
+            </a:r>
+            <a:br>
+              <a:rPr kumimoji="0" lang="en-US" altLang="en-US" sz="1100" b="1" i="0" u="none" strike="noStrike" cap="none" normalizeH="0" baseline="0" dirty="0" smtClean="0">
+                <a:ln>
+                  <a:noFill/>
+                </a:ln>
+                <a:solidFill>
+                  <a:srgbClr val="000080"/>
+                </a:solidFill>
+                <a:effectLst/>
+                <a:latin typeface="Courier New" panose="02070309020205020404" pitchFamily="49" charset="0"/>
+                <a:cs typeface="Courier New" panose="02070309020205020404" pitchFamily="49" charset="0"/>
+              </a:rPr>
+            </a:br>
+            <a:r>
+              <a:rPr kumimoji="0" lang="en-US" altLang="en-US" sz="1100" b="1" i="0" u="none" strike="noStrike" cap="none" normalizeH="0" baseline="0" dirty="0" smtClean="0">
+                <a:ln>
+                  <a:noFill/>
+                </a:ln>
+                <a:solidFill>
+                  <a:srgbClr val="000080"/>
+                </a:solidFill>
+                <a:effectLst/>
+                <a:latin typeface="Courier New" panose="02070309020205020404" pitchFamily="49" charset="0"/>
+                <a:cs typeface="Courier New" panose="02070309020205020404" pitchFamily="49" charset="0"/>
+              </a:rPr>
+              <a:t>  </a:t>
+            </a:r>
+            <a:r>
+              <a:rPr kumimoji="0" lang="en-US" altLang="en-US" sz="1100" b="0" i="0" u="none" strike="noStrike" cap="none" normalizeH="0" baseline="0" dirty="0" smtClean="0">
+                <a:ln>
+                  <a:noFill/>
+                </a:ln>
+                <a:solidFill>
+                  <a:srgbClr val="000000"/>
+                </a:solidFill>
+                <a:effectLst/>
+                <a:latin typeface="Courier New" panose="02070309020205020404" pitchFamily="49" charset="0"/>
+                <a:cs typeface="Courier New" panose="02070309020205020404" pitchFamily="49" charset="0"/>
+              </a:rPr>
+              <a:t>}</a:t>
+            </a:r>
+            <a:br>
+              <a:rPr kumimoji="0" lang="en-US" altLang="en-US" sz="1100" b="0" i="0" u="none" strike="noStrike" cap="none" normalizeH="0" baseline="0" dirty="0" smtClean="0">
+                <a:ln>
+                  <a:noFill/>
+                </a:ln>
+                <a:solidFill>
+                  <a:srgbClr val="000000"/>
+                </a:solidFill>
+                <a:effectLst/>
+                <a:latin typeface="Courier New" panose="02070309020205020404" pitchFamily="49" charset="0"/>
+                <a:cs typeface="Courier New" panose="02070309020205020404" pitchFamily="49" charset="0"/>
+              </a:rPr>
+            </a:br>
+            <a:r>
+              <a:rPr kumimoji="0" lang="en-US" altLang="en-US" sz="1100" b="0" i="0" u="none" strike="noStrike" cap="none" normalizeH="0" baseline="0" dirty="0" smtClean="0">
+                <a:ln>
+                  <a:noFill/>
+                </a:ln>
+                <a:solidFill>
+                  <a:srgbClr val="000000"/>
+                </a:solidFill>
+                <a:effectLst/>
+                <a:latin typeface="Courier New" panose="02070309020205020404" pitchFamily="49" charset="0"/>
+                <a:cs typeface="Courier New" panose="02070309020205020404" pitchFamily="49" charset="0"/>
+              </a:rPr>
+              <a:t>}</a:t>
+            </a:r>
+            <a:br>
+              <a:rPr kumimoji="0" lang="en-US" altLang="en-US" sz="1100" b="0" i="0" u="none" strike="noStrike" cap="none" normalizeH="0" baseline="0" dirty="0" smtClean="0">
+                <a:ln>
+                  <a:noFill/>
+                </a:ln>
+                <a:solidFill>
+                  <a:srgbClr val="000000"/>
+                </a:solidFill>
+                <a:effectLst/>
+                <a:latin typeface="Courier New" panose="02070309020205020404" pitchFamily="49" charset="0"/>
+                <a:cs typeface="Courier New" panose="02070309020205020404" pitchFamily="49" charset="0"/>
+              </a:rPr>
+            </a:br>
+            <a:r>
+              <a:rPr kumimoji="0" lang="en-US" altLang="en-US" sz="1100" b="0" i="0" u="none" strike="noStrike" cap="none" normalizeH="0" baseline="0" dirty="0" smtClean="0">
+                <a:ln>
+                  <a:noFill/>
+                </a:ln>
+                <a:solidFill>
+                  <a:srgbClr val="000000"/>
+                </a:solidFill>
+                <a:effectLst/>
+                <a:latin typeface="Courier New" panose="02070309020205020404" pitchFamily="49" charset="0"/>
+                <a:cs typeface="Courier New" panose="02070309020205020404" pitchFamily="49" charset="0"/>
+              </a:rPr>
+              <a:t/>
+            </a:r>
+            <a:br>
+              <a:rPr kumimoji="0" lang="en-US" altLang="en-US" sz="1100" b="0" i="0" u="none" strike="noStrike" cap="none" normalizeH="0" baseline="0" dirty="0" smtClean="0">
+                <a:ln>
+                  <a:noFill/>
+                </a:ln>
+                <a:solidFill>
+                  <a:srgbClr val="000000"/>
+                </a:solidFill>
+                <a:effectLst/>
+                <a:latin typeface="Courier New" panose="02070309020205020404" pitchFamily="49" charset="0"/>
+                <a:cs typeface="Courier New" panose="02070309020205020404" pitchFamily="49" charset="0"/>
+              </a:rPr>
+            </a:br>
+            <a:r>
+              <a:rPr kumimoji="0" lang="en-US" altLang="en-US" sz="1100" b="1" i="0" u="none" strike="noStrike" cap="none" normalizeH="0" baseline="0" dirty="0" smtClean="0">
+                <a:ln>
+                  <a:noFill/>
+                </a:ln>
+                <a:solidFill>
+                  <a:srgbClr val="000080"/>
+                </a:solidFill>
+                <a:effectLst/>
+                <a:latin typeface="Courier New" panose="02070309020205020404" pitchFamily="49" charset="0"/>
+                <a:cs typeface="Courier New" panose="02070309020205020404" pitchFamily="49" charset="0"/>
+              </a:rPr>
+              <a:t>object </a:t>
+            </a:r>
+            <a:r>
+              <a:rPr kumimoji="0" lang="en-US" altLang="en-US" sz="1100" b="0" i="0" u="none" strike="noStrike" cap="none" normalizeH="0" baseline="0" dirty="0" smtClean="0">
+                <a:ln>
+                  <a:noFill/>
+                </a:ln>
+                <a:solidFill>
+                  <a:srgbClr val="000000"/>
+                </a:solidFill>
+                <a:effectLst/>
+                <a:latin typeface="Courier New" panose="02070309020205020404" pitchFamily="49" charset="0"/>
+                <a:cs typeface="Courier New" panose="02070309020205020404" pitchFamily="49" charset="0"/>
+              </a:rPr>
+              <a:t>Solution {</a:t>
+            </a:r>
+            <a:br>
+              <a:rPr kumimoji="0" lang="en-US" altLang="en-US" sz="1100" b="0" i="0" u="none" strike="noStrike" cap="none" normalizeH="0" baseline="0" dirty="0" smtClean="0">
+                <a:ln>
+                  <a:noFill/>
+                </a:ln>
+                <a:solidFill>
+                  <a:srgbClr val="000000"/>
+                </a:solidFill>
+                <a:effectLst/>
+                <a:latin typeface="Courier New" panose="02070309020205020404" pitchFamily="49" charset="0"/>
+                <a:cs typeface="Courier New" panose="02070309020205020404" pitchFamily="49" charset="0"/>
+              </a:rPr>
+            </a:br>
+            <a:r>
+              <a:rPr kumimoji="0" lang="en-US" altLang="en-US" sz="1100" b="0" i="0" u="none" strike="noStrike" cap="none" normalizeH="0" baseline="0" dirty="0" smtClean="0">
+                <a:ln>
+                  <a:noFill/>
+                </a:ln>
+                <a:solidFill>
+                  <a:srgbClr val="000000"/>
+                </a:solidFill>
+                <a:effectLst/>
+                <a:latin typeface="Courier New" panose="02070309020205020404" pitchFamily="49" charset="0"/>
+                <a:cs typeface="Courier New" panose="02070309020205020404" pitchFamily="49" charset="0"/>
+              </a:rPr>
+              <a:t>  </a:t>
+            </a:r>
+            <a:r>
+              <a:rPr kumimoji="0" lang="en-US" altLang="en-US" sz="1100" b="1" i="0" u="none" strike="noStrike" cap="none" normalizeH="0" baseline="0" dirty="0" err="1" smtClean="0">
+                <a:ln>
+                  <a:noFill/>
+                </a:ln>
+                <a:solidFill>
+                  <a:srgbClr val="000080"/>
+                </a:solidFill>
+                <a:effectLst/>
+                <a:latin typeface="Courier New" panose="02070309020205020404" pitchFamily="49" charset="0"/>
+                <a:cs typeface="Courier New" panose="02070309020205020404" pitchFamily="49" charset="0"/>
+              </a:rPr>
+              <a:t>def</a:t>
+            </a:r>
+            <a:r>
+              <a:rPr kumimoji="0" lang="en-US" altLang="en-US" sz="1100" b="1" i="0" u="none" strike="noStrike" cap="none" normalizeH="0" baseline="0" dirty="0" smtClean="0">
+                <a:ln>
+                  <a:noFill/>
+                </a:ln>
+                <a:solidFill>
+                  <a:srgbClr val="000080"/>
+                </a:solidFill>
+                <a:effectLst/>
+                <a:latin typeface="Courier New" panose="02070309020205020404" pitchFamily="49" charset="0"/>
+                <a:cs typeface="Courier New" panose="02070309020205020404" pitchFamily="49" charset="0"/>
+              </a:rPr>
+              <a:t> </a:t>
+            </a:r>
+            <a:r>
+              <a:rPr kumimoji="0" lang="en-US" altLang="en-US" sz="1100" b="0" i="0" u="none" strike="noStrike" cap="none" normalizeH="0" baseline="0" dirty="0" smtClean="0">
+                <a:ln>
+                  <a:noFill/>
+                </a:ln>
+                <a:solidFill>
+                  <a:srgbClr val="000000"/>
+                </a:solidFill>
+                <a:effectLst/>
+                <a:latin typeface="Courier New" panose="02070309020205020404" pitchFamily="49" charset="0"/>
+                <a:cs typeface="Courier New" panose="02070309020205020404" pitchFamily="49" charset="0"/>
+              </a:rPr>
+              <a:t>main(</a:t>
+            </a:r>
+            <a:r>
+              <a:rPr kumimoji="0" lang="en-US" altLang="en-US" sz="1100" b="0" i="0" u="none" strike="noStrike" cap="none" normalizeH="0" baseline="0" dirty="0" err="1" smtClean="0">
+                <a:ln>
+                  <a:noFill/>
+                </a:ln>
+                <a:solidFill>
+                  <a:srgbClr val="000000"/>
+                </a:solidFill>
+                <a:effectLst/>
+                <a:latin typeface="Courier New" panose="02070309020205020404" pitchFamily="49" charset="0"/>
+                <a:cs typeface="Courier New" panose="02070309020205020404" pitchFamily="49" charset="0"/>
+              </a:rPr>
+              <a:t>args</a:t>
+            </a:r>
+            <a:r>
+              <a:rPr kumimoji="0" lang="en-US" altLang="en-US" sz="1100" b="0" i="0" u="none" strike="noStrike" cap="none" normalizeH="0" baseline="0" dirty="0" smtClean="0">
+                <a:ln>
+                  <a:noFill/>
+                </a:ln>
+                <a:solidFill>
+                  <a:srgbClr val="000000"/>
+                </a:solidFill>
+                <a:effectLst/>
+                <a:latin typeface="Courier New" panose="02070309020205020404" pitchFamily="49" charset="0"/>
+                <a:cs typeface="Courier New" panose="02070309020205020404" pitchFamily="49" charset="0"/>
+              </a:rPr>
+              <a:t>: Array[</a:t>
+            </a:r>
+            <a:r>
+              <a:rPr kumimoji="0" lang="en-US" altLang="en-US" sz="1100" b="0" i="0" u="none" strike="noStrike" cap="none" normalizeH="0" baseline="0" dirty="0" smtClean="0">
+                <a:ln>
+                  <a:noFill/>
+                </a:ln>
+                <a:solidFill>
+                  <a:srgbClr val="20999D"/>
+                </a:solidFill>
+                <a:effectLst/>
+                <a:latin typeface="Courier New" panose="02070309020205020404" pitchFamily="49" charset="0"/>
+                <a:cs typeface="Courier New" panose="02070309020205020404" pitchFamily="49" charset="0"/>
+              </a:rPr>
+              <a:t>String</a:t>
+            </a:r>
+            <a:r>
+              <a:rPr kumimoji="0" lang="en-US" altLang="en-US" sz="1100" b="0" i="0" u="none" strike="noStrike" cap="none" normalizeH="0" baseline="0" dirty="0" smtClean="0">
+                <a:ln>
+                  <a:noFill/>
+                </a:ln>
+                <a:solidFill>
+                  <a:srgbClr val="000000"/>
+                </a:solidFill>
+                <a:effectLst/>
+                <a:latin typeface="Courier New" panose="02070309020205020404" pitchFamily="49" charset="0"/>
+                <a:cs typeface="Courier New" panose="02070309020205020404" pitchFamily="49" charset="0"/>
+              </a:rPr>
+              <a:t>]) {</a:t>
+            </a:r>
+            <a:br>
+              <a:rPr kumimoji="0" lang="en-US" altLang="en-US" sz="1100" b="0" i="0" u="none" strike="noStrike" cap="none" normalizeH="0" baseline="0" dirty="0" smtClean="0">
+                <a:ln>
+                  <a:noFill/>
+                </a:ln>
+                <a:solidFill>
+                  <a:srgbClr val="000000"/>
+                </a:solidFill>
+                <a:effectLst/>
+                <a:latin typeface="Courier New" panose="02070309020205020404" pitchFamily="49" charset="0"/>
+                <a:cs typeface="Courier New" panose="02070309020205020404" pitchFamily="49" charset="0"/>
+              </a:rPr>
+            </a:br>
+            <a:r>
+              <a:rPr kumimoji="0" lang="en-US" altLang="en-US" sz="1100" b="0" i="0" u="none" strike="noStrike" cap="none" normalizeH="0" baseline="0" dirty="0" smtClean="0">
+                <a:ln>
+                  <a:noFill/>
+                </a:ln>
+                <a:solidFill>
+                  <a:srgbClr val="000000"/>
+                </a:solidFill>
+                <a:effectLst/>
+                <a:latin typeface="Courier New" panose="02070309020205020404" pitchFamily="49" charset="0"/>
+                <a:cs typeface="Courier New" panose="02070309020205020404" pitchFamily="49" charset="0"/>
+              </a:rPr>
+              <a:t>    </a:t>
+            </a:r>
+            <a:r>
+              <a:rPr kumimoji="0" lang="en-US" altLang="en-US" sz="1100" b="1" i="0" u="none" strike="noStrike" cap="none" normalizeH="0" baseline="0" dirty="0" err="1" smtClean="0">
+                <a:ln>
+                  <a:noFill/>
+                </a:ln>
+                <a:solidFill>
+                  <a:srgbClr val="000080"/>
+                </a:solidFill>
+                <a:effectLst/>
+                <a:latin typeface="Courier New" panose="02070309020205020404" pitchFamily="49" charset="0"/>
+                <a:cs typeface="Courier New" panose="02070309020205020404" pitchFamily="49" charset="0"/>
+              </a:rPr>
+              <a:t>val</a:t>
+            </a:r>
+            <a:r>
+              <a:rPr kumimoji="0" lang="en-US" altLang="en-US" sz="1100" b="1" i="0" u="none" strike="noStrike" cap="none" normalizeH="0" baseline="0" dirty="0" smtClean="0">
+                <a:ln>
+                  <a:noFill/>
+                </a:ln>
+                <a:solidFill>
+                  <a:srgbClr val="000080"/>
+                </a:solidFill>
+                <a:effectLst/>
+                <a:latin typeface="Courier New" panose="02070309020205020404" pitchFamily="49" charset="0"/>
+                <a:cs typeface="Courier New" panose="02070309020205020404" pitchFamily="49" charset="0"/>
+              </a:rPr>
+              <a:t> </a:t>
+            </a:r>
+            <a:r>
+              <a:rPr kumimoji="0" lang="en-US" altLang="en-US" sz="1100" b="0" i="0" u="none" strike="noStrike" cap="none" normalizeH="0" baseline="0" dirty="0" err="1" smtClean="0">
+                <a:ln>
+                  <a:noFill/>
+                </a:ln>
+                <a:solidFill>
+                  <a:srgbClr val="000000"/>
+                </a:solidFill>
+                <a:effectLst/>
+                <a:latin typeface="Courier New" panose="02070309020205020404" pitchFamily="49" charset="0"/>
+                <a:cs typeface="Courier New" panose="02070309020205020404" pitchFamily="49" charset="0"/>
+              </a:rPr>
+              <a:t>funFunFun</a:t>
+            </a:r>
+            <a:r>
+              <a:rPr kumimoji="0" lang="en-US" altLang="en-US" sz="1100" b="0" i="0" u="none" strike="noStrike" cap="none" normalizeH="0" baseline="0" dirty="0" smtClean="0">
+                <a:ln>
+                  <a:noFill/>
+                </a:ln>
+                <a:solidFill>
+                  <a:srgbClr val="000000"/>
+                </a:solidFill>
+                <a:effectLst/>
+                <a:latin typeface="Courier New" panose="02070309020205020404" pitchFamily="49" charset="0"/>
+                <a:cs typeface="Courier New" panose="02070309020205020404" pitchFamily="49" charset="0"/>
+              </a:rPr>
+              <a:t> = {</a:t>
+            </a:r>
+            <a:r>
+              <a:rPr kumimoji="0" lang="en-US" altLang="en-US" sz="1100" b="0" i="1" u="none" strike="noStrike" cap="none" normalizeH="0" baseline="0" dirty="0" err="1" smtClean="0">
+                <a:ln>
+                  <a:noFill/>
+                </a:ln>
+                <a:solidFill>
+                  <a:srgbClr val="000000"/>
+                </a:solidFill>
+                <a:effectLst/>
+                <a:latin typeface="Courier New" panose="02070309020205020404" pitchFamily="49" charset="0"/>
+                <a:cs typeface="Courier New" panose="02070309020205020404" pitchFamily="49" charset="0"/>
+              </a:rPr>
+              <a:t>println</a:t>
+            </a:r>
+            <a:r>
+              <a:rPr kumimoji="0" lang="en-US" altLang="en-US" sz="1100" b="0" i="0" u="none" strike="noStrike" cap="none" normalizeH="0" baseline="0" dirty="0" smtClean="0">
+                <a:ln>
+                  <a:noFill/>
+                </a:ln>
+                <a:solidFill>
+                  <a:srgbClr val="000000"/>
+                </a:solidFill>
+                <a:effectLst/>
+                <a:latin typeface="Courier New" panose="02070309020205020404" pitchFamily="49" charset="0"/>
+                <a:cs typeface="Courier New" panose="02070309020205020404" pitchFamily="49" charset="0"/>
+              </a:rPr>
+              <a:t>(</a:t>
+            </a:r>
+            <a:r>
+              <a:rPr kumimoji="0" lang="en-US" altLang="en-US" sz="1100" b="1" i="0" u="none" strike="noStrike" cap="none" normalizeH="0" baseline="0" dirty="0" smtClean="0">
+                <a:ln>
+                  <a:noFill/>
+                </a:ln>
+                <a:solidFill>
+                  <a:srgbClr val="008000"/>
+                </a:solidFill>
+                <a:effectLst/>
+                <a:latin typeface="Courier New" panose="02070309020205020404" pitchFamily="49" charset="0"/>
+                <a:cs typeface="Courier New" panose="02070309020205020404" pitchFamily="49" charset="0"/>
+              </a:rPr>
+              <a:t>"Fun! Fun! Fun!"</a:t>
+            </a:r>
+            <a:r>
+              <a:rPr kumimoji="0" lang="en-US" altLang="en-US" sz="1100" b="0" i="0" u="none" strike="noStrike" cap="none" normalizeH="0" baseline="0" dirty="0" smtClean="0">
+                <a:ln>
+                  <a:noFill/>
+                </a:ln>
+                <a:solidFill>
+                  <a:srgbClr val="000000"/>
+                </a:solidFill>
+                <a:effectLst/>
+                <a:latin typeface="Courier New" panose="02070309020205020404" pitchFamily="49" charset="0"/>
+                <a:cs typeface="Courier New" panose="02070309020205020404" pitchFamily="49" charset="0"/>
+              </a:rPr>
+              <a:t>)}</a:t>
+            </a:r>
+            <a:br>
+              <a:rPr kumimoji="0" lang="en-US" altLang="en-US" sz="1100" b="0" i="0" u="none" strike="noStrike" cap="none" normalizeH="0" baseline="0" dirty="0" smtClean="0">
+                <a:ln>
+                  <a:noFill/>
+                </a:ln>
+                <a:solidFill>
+                  <a:srgbClr val="000000"/>
+                </a:solidFill>
+                <a:effectLst/>
+                <a:latin typeface="Courier New" panose="02070309020205020404" pitchFamily="49" charset="0"/>
+                <a:cs typeface="Courier New" panose="02070309020205020404" pitchFamily="49" charset="0"/>
+              </a:rPr>
+            </a:br>
+            <a:r>
+              <a:rPr kumimoji="0" lang="en-US" altLang="en-US" sz="1100" b="0" i="0" u="none" strike="noStrike" cap="none" normalizeH="0" baseline="0" dirty="0" smtClean="0">
+                <a:ln>
+                  <a:noFill/>
+                </a:ln>
+                <a:solidFill>
+                  <a:srgbClr val="000000"/>
+                </a:solidFill>
+                <a:effectLst/>
+                <a:latin typeface="Courier New" panose="02070309020205020404" pitchFamily="49" charset="0"/>
+                <a:cs typeface="Courier New" panose="02070309020205020404" pitchFamily="49" charset="0"/>
+              </a:rPr>
+              <a:t/>
+            </a:r>
+            <a:br>
+              <a:rPr kumimoji="0" lang="en-US" altLang="en-US" sz="1100" b="0" i="0" u="none" strike="noStrike" cap="none" normalizeH="0" baseline="0" dirty="0" smtClean="0">
+                <a:ln>
+                  <a:noFill/>
+                </a:ln>
+                <a:solidFill>
+                  <a:srgbClr val="000000"/>
+                </a:solidFill>
+                <a:effectLst/>
+                <a:latin typeface="Courier New" panose="02070309020205020404" pitchFamily="49" charset="0"/>
+                <a:cs typeface="Courier New" panose="02070309020205020404" pitchFamily="49" charset="0"/>
+              </a:rPr>
+            </a:br>
+            <a:r>
+              <a:rPr kumimoji="0" lang="en-US" altLang="en-US" sz="1100" b="0" i="0" u="none" strike="noStrike" cap="none" normalizeH="0" baseline="0" dirty="0" smtClean="0">
+                <a:ln>
+                  <a:noFill/>
+                </a:ln>
+                <a:solidFill>
+                  <a:srgbClr val="000000"/>
+                </a:solidFill>
+                <a:effectLst/>
+                <a:latin typeface="Courier New" panose="02070309020205020404" pitchFamily="49" charset="0"/>
+                <a:cs typeface="Courier New" panose="02070309020205020404" pitchFamily="49" charset="0"/>
+              </a:rPr>
+              <a:t>    </a:t>
+            </a:r>
+            <a:r>
+              <a:rPr kumimoji="0" lang="en-US" altLang="en-US" sz="1100" b="0" i="1" u="none" strike="noStrike" cap="none" normalizeH="0" baseline="0" dirty="0" smtClean="0">
+                <a:ln>
+                  <a:noFill/>
+                </a:ln>
+                <a:solidFill>
+                  <a:srgbClr val="000000"/>
+                </a:solidFill>
+                <a:effectLst/>
+                <a:latin typeface="Courier New" panose="02070309020205020404" pitchFamily="49" charset="0"/>
+                <a:cs typeface="Courier New" panose="02070309020205020404" pitchFamily="49" charset="0"/>
+              </a:rPr>
+              <a:t>She</a:t>
+            </a:r>
+            <a:r>
+              <a:rPr kumimoji="0" lang="en-US" altLang="en-US" sz="1100" b="0" i="0" u="none" strike="noStrike" cap="none" normalizeH="0" baseline="0" dirty="0" smtClean="0">
+                <a:ln>
+                  <a:noFill/>
+                </a:ln>
+                <a:solidFill>
+                  <a:srgbClr val="000000"/>
+                </a:solidFill>
+                <a:effectLst/>
+                <a:latin typeface="Courier New" panose="02070309020205020404" pitchFamily="49" charset="0"/>
+                <a:cs typeface="Courier New" panose="02070309020205020404" pitchFamily="49" charset="0"/>
+              </a:rPr>
+              <a:t>() have(</a:t>
+            </a:r>
+            <a:r>
+              <a:rPr kumimoji="0" lang="en-US" altLang="en-US" sz="1100" b="0" i="0" u="none" strike="noStrike" cap="none" normalizeH="0" baseline="0" dirty="0" err="1" smtClean="0">
+                <a:ln>
+                  <a:noFill/>
+                </a:ln>
+                <a:solidFill>
+                  <a:srgbClr val="000000"/>
+                </a:solidFill>
+                <a:effectLst/>
+                <a:latin typeface="Courier New" panose="02070309020205020404" pitchFamily="49" charset="0"/>
+                <a:cs typeface="Courier New" panose="02070309020205020404" pitchFamily="49" charset="0"/>
+              </a:rPr>
+              <a:t>funFunFun</a:t>
+            </a:r>
+            <a:r>
+              <a:rPr kumimoji="0" lang="en-US" altLang="en-US" sz="1100" b="0" i="0" u="none" strike="noStrike" cap="none" normalizeH="0" baseline="0" dirty="0" smtClean="0">
+                <a:ln>
+                  <a:noFill/>
+                </a:ln>
+                <a:solidFill>
+                  <a:srgbClr val="000000"/>
+                </a:solidFill>
+                <a:effectLst/>
+                <a:latin typeface="Courier New" panose="02070309020205020404" pitchFamily="49" charset="0"/>
+                <a:cs typeface="Courier New" panose="02070309020205020404" pitchFamily="49" charset="0"/>
+              </a:rPr>
+              <a:t>) </a:t>
+            </a:r>
+            <a:r>
+              <a:rPr kumimoji="0" lang="en-US" altLang="en-US" sz="1100" b="0" i="0" u="none" strike="noStrike" cap="none" normalizeH="0" baseline="0" dirty="0" err="1" smtClean="0">
+                <a:ln>
+                  <a:noFill/>
+                </a:ln>
+                <a:solidFill>
+                  <a:srgbClr val="000000"/>
+                </a:solidFill>
+                <a:effectLst/>
+                <a:latin typeface="Courier New" panose="02070309020205020404" pitchFamily="49" charset="0"/>
+                <a:cs typeface="Courier New" panose="02070309020205020404" pitchFamily="49" charset="0"/>
+              </a:rPr>
+              <a:t>til</a:t>
+            </a:r>
+            <a:r>
+              <a:rPr kumimoji="0" lang="en-US" altLang="en-US" sz="1100" b="0" i="0" u="none" strike="noStrike" cap="none" normalizeH="0" baseline="0" dirty="0" smtClean="0">
+                <a:ln>
+                  <a:noFill/>
+                </a:ln>
+                <a:solidFill>
+                  <a:srgbClr val="000000"/>
+                </a:solidFill>
+                <a:effectLst/>
+                <a:latin typeface="Courier New" panose="02070309020205020404" pitchFamily="49" charset="0"/>
+                <a:cs typeface="Courier New" panose="02070309020205020404" pitchFamily="49" charset="0"/>
+              </a:rPr>
+              <a:t>(</a:t>
+            </a:r>
+            <a:r>
+              <a:rPr kumimoji="0" lang="en-US" altLang="en-US" sz="1100" b="0" i="1" u="none" strike="noStrike" cap="none" normalizeH="0" baseline="0" dirty="0" smtClean="0">
+                <a:ln>
+                  <a:noFill/>
+                </a:ln>
+                <a:solidFill>
+                  <a:srgbClr val="000000"/>
+                </a:solidFill>
+                <a:effectLst/>
+                <a:latin typeface="Courier New" panose="02070309020205020404" pitchFamily="49" charset="0"/>
+                <a:cs typeface="Courier New" panose="02070309020205020404" pitchFamily="49" charset="0"/>
+              </a:rPr>
+              <a:t>Daddy</a:t>
+            </a:r>
+            <a:r>
+              <a:rPr kumimoji="0" lang="en-US" altLang="en-US" sz="1100" b="0" i="0" u="none" strike="noStrike" cap="none" normalizeH="0" baseline="0" dirty="0" smtClean="0">
+                <a:ln>
+                  <a:noFill/>
+                </a:ln>
+                <a:solidFill>
+                  <a:srgbClr val="000000"/>
+                </a:solidFill>
+                <a:effectLst/>
+                <a:latin typeface="Courier New" panose="02070309020205020404" pitchFamily="49" charset="0"/>
+                <a:cs typeface="Courier New" panose="02070309020205020404" pitchFamily="49" charset="0"/>
+              </a:rPr>
+              <a:t>() </a:t>
+            </a:r>
+            <a:r>
+              <a:rPr kumimoji="0" lang="en-US" altLang="en-US" sz="1100" b="0" i="0" u="none" strike="noStrike" cap="none" normalizeH="0" baseline="0" dirty="0" err="1" smtClean="0">
+                <a:ln>
+                  <a:noFill/>
+                </a:ln>
+                <a:solidFill>
+                  <a:srgbClr val="000000"/>
+                </a:solidFill>
+                <a:effectLst/>
+                <a:latin typeface="Courier New" panose="02070309020205020404" pitchFamily="49" charset="0"/>
+                <a:cs typeface="Courier New" panose="02070309020205020404" pitchFamily="49" charset="0"/>
+              </a:rPr>
+              <a:t>takeAway</a:t>
+            </a:r>
+            <a:r>
+              <a:rPr kumimoji="0" lang="en-US" altLang="en-US" sz="1100" b="0" i="0" u="none" strike="noStrike" cap="none" normalizeH="0" baseline="0" dirty="0" smtClean="0">
+                <a:ln>
+                  <a:noFill/>
+                </a:ln>
+                <a:solidFill>
+                  <a:srgbClr val="000000"/>
+                </a:solidFill>
+                <a:effectLst/>
+                <a:latin typeface="Courier New" panose="02070309020205020404" pitchFamily="49" charset="0"/>
+                <a:cs typeface="Courier New" panose="02070309020205020404" pitchFamily="49" charset="0"/>
+              </a:rPr>
+              <a:t>(</a:t>
+            </a:r>
+            <a:r>
+              <a:rPr kumimoji="0" lang="en-US" altLang="en-US" sz="1100" b="0" i="1" u="none" strike="noStrike" cap="none" normalizeH="0" baseline="0" dirty="0" err="1" smtClean="0">
+                <a:ln>
+                  <a:noFill/>
+                </a:ln>
+                <a:solidFill>
+                  <a:srgbClr val="000000"/>
+                </a:solidFill>
+                <a:effectLst/>
+                <a:latin typeface="Courier New" panose="02070309020205020404" pitchFamily="49" charset="0"/>
+                <a:cs typeface="Courier New" panose="02070309020205020404" pitchFamily="49" charset="0"/>
+              </a:rPr>
+              <a:t>TBird</a:t>
+            </a:r>
+            <a:r>
+              <a:rPr kumimoji="0" lang="en-US" altLang="en-US" sz="1100" b="0" i="0" u="none" strike="noStrike" cap="none" normalizeH="0" baseline="0" dirty="0" smtClean="0">
+                <a:ln>
+                  <a:noFill/>
+                </a:ln>
+                <a:solidFill>
+                  <a:srgbClr val="000000"/>
+                </a:solidFill>
+                <a:effectLst/>
+                <a:latin typeface="Courier New" panose="02070309020205020404" pitchFamily="49" charset="0"/>
+                <a:cs typeface="Courier New" panose="02070309020205020404" pitchFamily="49" charset="0"/>
+              </a:rPr>
+              <a:t>()))</a:t>
+            </a:r>
+            <a:br>
+              <a:rPr kumimoji="0" lang="en-US" altLang="en-US" sz="1100" b="0" i="0" u="none" strike="noStrike" cap="none" normalizeH="0" baseline="0" dirty="0" smtClean="0">
+                <a:ln>
+                  <a:noFill/>
+                </a:ln>
+                <a:solidFill>
+                  <a:srgbClr val="000000"/>
+                </a:solidFill>
+                <a:effectLst/>
+                <a:latin typeface="Courier New" panose="02070309020205020404" pitchFamily="49" charset="0"/>
+                <a:cs typeface="Courier New" panose="02070309020205020404" pitchFamily="49" charset="0"/>
+              </a:rPr>
+            </a:br>
+            <a:r>
+              <a:rPr kumimoji="0" lang="en-US" altLang="en-US" sz="1100" b="0" i="0" u="none" strike="noStrike" cap="none" normalizeH="0" baseline="0" dirty="0" smtClean="0">
+                <a:ln>
+                  <a:noFill/>
+                </a:ln>
+                <a:solidFill>
+                  <a:srgbClr val="000000"/>
+                </a:solidFill>
+                <a:effectLst/>
+                <a:latin typeface="Courier New" panose="02070309020205020404" pitchFamily="49" charset="0"/>
+                <a:cs typeface="Courier New" panose="02070309020205020404" pitchFamily="49" charset="0"/>
+              </a:rPr>
+              <a:t>  }</a:t>
+            </a:r>
+            <a:br>
+              <a:rPr kumimoji="0" lang="en-US" altLang="en-US" sz="1100" b="0" i="0" u="none" strike="noStrike" cap="none" normalizeH="0" baseline="0" dirty="0" smtClean="0">
+                <a:ln>
+                  <a:noFill/>
+                </a:ln>
+                <a:solidFill>
+                  <a:srgbClr val="000000"/>
+                </a:solidFill>
+                <a:effectLst/>
+                <a:latin typeface="Courier New" panose="02070309020205020404" pitchFamily="49" charset="0"/>
+                <a:cs typeface="Courier New" panose="02070309020205020404" pitchFamily="49" charset="0"/>
+              </a:rPr>
+            </a:br>
+            <a:r>
+              <a:rPr kumimoji="0" lang="en-US" altLang="en-US" sz="1100" b="0" i="0" u="none" strike="noStrike" cap="none" normalizeH="0" baseline="0" dirty="0" smtClean="0">
+                <a:ln>
+                  <a:noFill/>
+                </a:ln>
+                <a:solidFill>
+                  <a:srgbClr val="000000"/>
+                </a:solidFill>
+                <a:effectLst/>
+                <a:latin typeface="Courier New" panose="02070309020205020404" pitchFamily="49" charset="0"/>
+                <a:cs typeface="Courier New" panose="02070309020205020404" pitchFamily="49" charset="0"/>
+              </a:rPr>
+              <a:t>}</a:t>
+            </a:r>
+            <a:endParaRPr kumimoji="0" lang="en-US" altLang="en-US" sz="2800" b="0" i="0" u="none" strike="noStrike" cap="none" normalizeH="0" baseline="0" dirty="0" smtClean="0">
+              <a:ln>
+                <a:noFill/>
+              </a:ln>
+              <a:solidFill>
+                <a:schemeClr val="tx1"/>
+              </a:solidFill>
+              <a:effectLst/>
+              <a:latin typeface="Arial" panose="020B0604020202020204" pitchFamily="34" charset="0"/>
+            </a:endParaRPr>
+          </a:p>
+        </p:txBody>
+      </p:sp>
+      <p:sp>
+        <p:nvSpPr>
+          <p:cNvPr id="8" name="TextBox 7"/>
+          <p:cNvSpPr txBox="1"/>
+          <p:nvPr/>
+        </p:nvSpPr>
+        <p:spPr>
+          <a:xfrm>
+            <a:off x="4942379" y="541020"/>
+            <a:ext cx="2747099" cy="646331"/>
+          </a:xfrm>
+          <a:prstGeom prst="rect">
+            <a:avLst/>
+          </a:prstGeom>
+          <a:noFill/>
+        </p:spPr>
+        <p:txBody>
+          <a:bodyPr wrap="none" rtlCol="0">
+            <a:spAutoFit/>
+          </a:bodyPr>
+          <a:lstStyle/>
+          <a:p>
             <a:r>
               <a:rPr lang="en-US" dirty="0" smtClean="0"/>
-              <a:t>Why is it so hard to explain puns to kleptomaniacs?</a:t>
+              <a:t>Check </a:t>
+            </a:r>
+            <a:r>
+              <a:rPr lang="en-US" dirty="0"/>
+              <a:t>out Scala…</a:t>
+            </a:r>
+            <a:br>
+              <a:rPr lang="en-US" dirty="0"/>
+            </a:br>
+            <a:r>
+              <a:rPr lang="en-US" dirty="0">
+                <a:hlinkClick r:id="rId2"/>
+              </a:rPr>
+              <a:t>http://www.scala-lang.org/</a:t>
             </a:r>
             <a:endParaRPr lang="en-US" dirty="0"/>
           </a:p>
@@ -22327,7 +22327,7 @@
     </p:spTree>
     <p:extLst>
       <p:ext uri="{BB962C8B-B14F-4D97-AF65-F5344CB8AC3E}">
-        <p14:creationId xmlns:p14="http://schemas.microsoft.com/office/powerpoint/2010/main" val="1553533057"/>
+        <p14:creationId xmlns:p14="http://schemas.microsoft.com/office/powerpoint/2010/main" val="4015215728"/>
       </p:ext>
     </p:extLst>
   </p:cSld>

</xml_diff>

<commit_message>
Moved code windows to better fit slide.
</commit_message>
<xml_diff>
--- a/Presentation/THasINKync.pptx
+++ b/Presentation/THasINKync.pptx
@@ -146,7 +146,7 @@
   </p:defaultTextStyle>
   <p:extLst>
     <p:ext uri="{EFAFB233-063F-42B5-8137-9DF3F51BA10A}">
-      <p15:sldGuideLst xmlns:p15="http://schemas.microsoft.com/office/powerpoint/2012/main">
+      <p15:sldGuideLst xmlns:p15="http://schemas.microsoft.com/office/powerpoint/2012/main" xmlns="">
         <p15:guide id="1" orient="horz" pos="1620" userDrawn="1">
           <p15:clr>
             <a:srgbClr val="A4A3A4"/>
@@ -20719,7 +20719,7 @@
         </p:nvSpPr>
         <p:spPr bwMode="auto">
           <a:xfrm>
-            <a:off x="0" y="540690"/>
+            <a:off x="0" y="541020"/>
             <a:ext cx="4942379" cy="4154984"/>
           </a:xfrm>
           <a:prstGeom prst="rect">
@@ -22663,7 +22663,7 @@
   <a:extraClrSchemeLst/>
   <a:extLst>
     <a:ext uri="{05A4C25C-085E-4340-85A3-A5531E510DB2}">
-      <thm15:themeFamily xmlns:thm15="http://schemas.microsoft.com/office/thememl/2012/main" name="2013 Improving ppt template [Read-Only]" id="{9CD52372-1ABB-429C-AE8B-5116A847D281}" vid="{C9E045ED-5E7D-45F0-ABC2-8913C89F506A}"/>
+      <thm15:themeFamily xmlns:thm15="http://schemas.microsoft.com/office/thememl/2012/main" xmlns="" name="2013 Improving ppt template [Read-Only]" id="{9CD52372-1ABB-429C-AE8B-5116A847D281}" vid="{C9E045ED-5E7D-45F0-ABC2-8913C89F506A}"/>
     </a:ext>
   </a:extLst>
 </a:theme>
@@ -22924,16 +22924,19 @@
   <a:extraClrSchemeLst/>
   <a:extLst>
     <a:ext uri="{05A4C25C-085E-4340-85A3-A5531E510DB2}">
-      <thm15:themeFamily xmlns:thm15="http://schemas.microsoft.com/office/thememl/2012/main" name="Office Theme" id="{62F939B6-93AF-4DB8-9C6B-D6C7DFDC589F}" vid="{4A3C46E8-61CC-4603-A589-7422A47A8E4A}"/>
+      <thm15:themeFamily xmlns:thm15="http://schemas.microsoft.com/office/thememl/2012/main" xmlns="" name="Office Theme" id="{62F939B6-93AF-4DB8-9C6B-D6C7DFDC589F}" vid="{4A3C46E8-61CC-4603-A589-7422A47A8E4A}"/>
     </a:ext>
   </a:extLst>
 </a:theme>
 </file>
 
 <file path=customXml/item1.xml><?xml version="1.0" encoding="utf-8"?>
-<p:properties xmlns:p="http://schemas.microsoft.com/office/2006/metadata/properties" xmlns:xsi="http://www.w3.org/2001/XMLSchema-instance" xmlns:pc="http://schemas.microsoft.com/office/infopath/2007/PartnerControls">
-  <documentManagement/>
-</p:properties>
+<?mso-contentType ?>
+<FormTemplates xmlns="http://schemas.microsoft.com/sharepoint/v3/contenttype/forms">
+  <Display>DocumentLibraryForm</Display>
+  <Edit>DocumentLibraryForm</Edit>
+  <New>DocumentLibraryForm</New>
+</FormTemplates>
 </file>
 
 <file path=customXml/item2.xml><?xml version="1.0" encoding="utf-8"?>
@@ -23051,25 +23054,15 @@
 </file>
 
 <file path=customXml/item3.xml><?xml version="1.0" encoding="utf-8"?>
-<?mso-contentType ?>
-<FormTemplates xmlns="http://schemas.microsoft.com/sharepoint/v3/contenttype/forms">
-  <Display>DocumentLibraryForm</Display>
-  <Edit>DocumentLibraryForm</Edit>
-  <New>DocumentLibraryForm</New>
-</FormTemplates>
+<p:properties xmlns:p="http://schemas.microsoft.com/office/2006/metadata/properties" xmlns:xsi="http://www.w3.org/2001/XMLSchema-instance" xmlns:pc="http://schemas.microsoft.com/office/infopath/2007/PartnerControls">
+  <documentManagement/>
+</p:properties>
 </file>
 
 <file path=customXml/itemProps1.xml><?xml version="1.0" encoding="utf-8"?>
-<ds:datastoreItem xmlns:ds="http://schemas.openxmlformats.org/officeDocument/2006/customXml" ds:itemID="{A04551C0-1604-41A0-9B5C-A5F88AD2E0FE}">
+<ds:datastoreItem xmlns:ds="http://schemas.openxmlformats.org/officeDocument/2006/customXml" ds:itemID="{B857AB07-B2ED-439E-860F-4F56FB345D1B}">
   <ds:schemaRefs>
-    <ds:schemaRef ds:uri="http://schemas.microsoft.com/office/infopath/2007/PartnerControls"/>
-    <ds:schemaRef ds:uri="http://purl.org/dc/elements/1.1/"/>
-    <ds:schemaRef ds:uri="http://schemas.microsoft.com/office/2006/metadata/properties"/>
-    <ds:schemaRef ds:uri="http://purl.org/dc/terms/"/>
-    <ds:schemaRef ds:uri="http://schemas.openxmlformats.org/package/2006/metadata/core-properties"/>
-    <ds:schemaRef ds:uri="http://schemas.microsoft.com/office/2006/documentManagement/types"/>
-    <ds:schemaRef ds:uri="http://www.w3.org/XML/1998/namespace"/>
-    <ds:schemaRef ds:uri="http://purl.org/dc/dcmitype/"/>
+    <ds:schemaRef ds:uri="http://schemas.microsoft.com/sharepoint/v3/contenttype/forms"/>
   </ds:schemaRefs>
 </ds:datastoreItem>
 </file>
@@ -23091,9 +23084,16 @@
 </file>
 
 <file path=customXml/itemProps3.xml><?xml version="1.0" encoding="utf-8"?>
-<ds:datastoreItem xmlns:ds="http://schemas.openxmlformats.org/officeDocument/2006/customXml" ds:itemID="{B857AB07-B2ED-439E-860F-4F56FB345D1B}">
+<ds:datastoreItem xmlns:ds="http://schemas.openxmlformats.org/officeDocument/2006/customXml" ds:itemID="{A04551C0-1604-41A0-9B5C-A5F88AD2E0FE}">
   <ds:schemaRefs>
-    <ds:schemaRef ds:uri="http://schemas.microsoft.com/sharepoint/v3/contenttype/forms"/>
+    <ds:schemaRef ds:uri="http://schemas.microsoft.com/office/infopath/2007/PartnerControls"/>
+    <ds:schemaRef ds:uri="http://purl.org/dc/elements/1.1/"/>
+    <ds:schemaRef ds:uri="http://schemas.microsoft.com/office/2006/metadata/properties"/>
+    <ds:schemaRef ds:uri="http://purl.org/dc/terms/"/>
+    <ds:schemaRef ds:uri="http://schemas.openxmlformats.org/package/2006/metadata/core-properties"/>
+    <ds:schemaRef ds:uri="http://schemas.microsoft.com/office/2006/documentManagement/types"/>
+    <ds:schemaRef ds:uri="http://www.w3.org/XML/1998/namespace"/>
+    <ds:schemaRef ds:uri="http://purl.org/dc/dcmitype/"/>
   </ds:schemaRefs>
 </ds:datastoreItem>
 </file>
</xml_diff>

<commit_message>
Made Scala more readable.
</commit_message>
<xml_diff>
--- a/Presentation/THasINKync.pptx
+++ b/Presentation/THasINKync.pptx
@@ -146,7 +146,7 @@
   </p:defaultTextStyle>
   <p:extLst>
     <p:ext uri="{EFAFB233-063F-42B5-8137-9DF3F51BA10A}">
-      <p15:sldGuideLst xmlns:p15="http://schemas.microsoft.com/office/powerpoint/2012/main" xmlns="">
+      <p15:sldGuideLst xmlns="" xmlns:p15="http://schemas.microsoft.com/office/powerpoint/2012/main">
         <p15:guide id="1" orient="horz" pos="1620" userDrawn="1">
           <p15:clr>
             <a:srgbClr val="A4A3A4"/>
@@ -20720,7 +20720,7 @@
         <p:spPr bwMode="auto">
           <a:xfrm>
             <a:off x="0" y="541020"/>
-            <a:ext cx="4942379" cy="4154984"/>
+            <a:ext cx="4942379" cy="4524315"/>
           </a:xfrm>
           <a:prstGeom prst="rect">
             <a:avLst/>
@@ -20780,7 +20780,7 @@
               <a:tabLst/>
             </a:pPr>
             <a:r>
-              <a:rPr kumimoji="0" lang="en-US" altLang="en-US" sz="1100" b="1" i="0" u="none" strike="noStrike" cap="none" normalizeH="0" baseline="0" dirty="0" smtClean="0">
+              <a:rPr kumimoji="0" lang="en-US" altLang="en-US" sz="1200" b="1" i="0" u="none" strike="noStrike" cap="none" normalizeH="0" baseline="0" dirty="0" smtClean="0">
                 <a:ln>
                   <a:noFill/>
                 </a:ln>
@@ -20788,13 +20788,13 @@
                   <a:srgbClr val="000080"/>
                 </a:solidFill>
                 <a:effectLst/>
-                <a:latin typeface="Courier New" panose="02070309020205020404" pitchFamily="49" charset="0"/>
-                <a:cs typeface="Courier New" panose="02070309020205020404" pitchFamily="49" charset="0"/>
+                <a:latin typeface="Consolas" panose="020B0609020204030204" pitchFamily="49" charset="0"/>
+                <a:cs typeface="Consolas" panose="020B0609020204030204" pitchFamily="49" charset="0"/>
               </a:rPr>
               <a:t>case class </a:t>
             </a:r>
             <a:r>
-              <a:rPr kumimoji="0" lang="en-US" altLang="en-US" sz="1100" b="0" i="0" u="none" strike="noStrike" cap="none" normalizeH="0" baseline="0" dirty="0" smtClean="0">
+              <a:rPr kumimoji="0" lang="en-US" altLang="en-US" sz="1200" b="0" i="0" u="none" strike="noStrike" cap="none" normalizeH="0" baseline="0" dirty="0" smtClean="0">
                 <a:ln>
                   <a:noFill/>
                 </a:ln>
@@ -20802,13 +20802,13 @@
                   <a:srgbClr val="000000"/>
                 </a:solidFill>
                 <a:effectLst/>
-                <a:latin typeface="Courier New" panose="02070309020205020404" pitchFamily="49" charset="0"/>
-                <a:cs typeface="Courier New" panose="02070309020205020404" pitchFamily="49" charset="0"/>
+                <a:latin typeface="Consolas" panose="020B0609020204030204" pitchFamily="49" charset="0"/>
+                <a:cs typeface="Consolas" panose="020B0609020204030204" pitchFamily="49" charset="0"/>
               </a:rPr>
               <a:t>She(){</a:t>
             </a:r>
             <a:br>
-              <a:rPr kumimoji="0" lang="en-US" altLang="en-US" sz="1100" b="0" i="0" u="none" strike="noStrike" cap="none" normalizeH="0" baseline="0" dirty="0" smtClean="0">
+              <a:rPr kumimoji="0" lang="en-US" altLang="en-US" sz="1200" b="0" i="0" u="none" strike="noStrike" cap="none" normalizeH="0" baseline="0" dirty="0" smtClean="0">
                 <a:ln>
                   <a:noFill/>
                 </a:ln>
@@ -20816,12 +20816,12 @@
                   <a:srgbClr val="000000"/>
                 </a:solidFill>
                 <a:effectLst/>
-                <a:latin typeface="Courier New" panose="02070309020205020404" pitchFamily="49" charset="0"/>
-                <a:cs typeface="Courier New" panose="02070309020205020404" pitchFamily="49" charset="0"/>
+                <a:latin typeface="Consolas" panose="020B0609020204030204" pitchFamily="49" charset="0"/>
+                <a:cs typeface="Consolas" panose="020B0609020204030204" pitchFamily="49" charset="0"/>
               </a:rPr>
             </a:br>
             <a:r>
-              <a:rPr kumimoji="0" lang="en-US" altLang="en-US" sz="1100" b="0" i="0" u="none" strike="noStrike" cap="none" normalizeH="0" baseline="0" dirty="0" smtClean="0">
+              <a:rPr kumimoji="0" lang="en-US" altLang="en-US" sz="1200" b="0" i="0" u="none" strike="noStrike" cap="none" normalizeH="0" baseline="0" dirty="0" smtClean="0">
                 <a:ln>
                   <a:noFill/>
                 </a:ln>
@@ -20829,13 +20829,13 @@
                   <a:srgbClr val="000000"/>
                 </a:solidFill>
                 <a:effectLst/>
-                <a:latin typeface="Courier New" panose="02070309020205020404" pitchFamily="49" charset="0"/>
-                <a:cs typeface="Courier New" panose="02070309020205020404" pitchFamily="49" charset="0"/>
+                <a:latin typeface="Consolas" panose="020B0609020204030204" pitchFamily="49" charset="0"/>
+                <a:cs typeface="Consolas" panose="020B0609020204030204" pitchFamily="49" charset="0"/>
               </a:rPr>
               <a:t>  </a:t>
             </a:r>
             <a:r>
-              <a:rPr kumimoji="0" lang="en-US" altLang="en-US" sz="1100" b="1" i="0" u="none" strike="noStrike" cap="none" normalizeH="0" baseline="0" dirty="0" err="1" smtClean="0">
+              <a:rPr kumimoji="0" lang="en-US" altLang="en-US" sz="1200" b="1" i="0" u="none" strike="noStrike" cap="none" normalizeH="0" baseline="0" dirty="0" err="1" smtClean="0">
                 <a:ln>
                   <a:noFill/>
                 </a:ln>
@@ -20843,13 +20843,13 @@
                   <a:srgbClr val="000080"/>
                 </a:solidFill>
                 <a:effectLst/>
-                <a:latin typeface="Courier New" panose="02070309020205020404" pitchFamily="49" charset="0"/>
-                <a:cs typeface="Courier New" panose="02070309020205020404" pitchFamily="49" charset="0"/>
+                <a:latin typeface="Consolas" panose="020B0609020204030204" pitchFamily="49" charset="0"/>
+                <a:cs typeface="Consolas" panose="020B0609020204030204" pitchFamily="49" charset="0"/>
               </a:rPr>
               <a:t>def</a:t>
             </a:r>
             <a:r>
-              <a:rPr kumimoji="0" lang="en-US" altLang="en-US" sz="1100" b="1" i="0" u="none" strike="noStrike" cap="none" normalizeH="0" baseline="0" dirty="0" smtClean="0">
+              <a:rPr kumimoji="0" lang="en-US" altLang="en-US" sz="1200" b="1" i="0" u="none" strike="noStrike" cap="none" normalizeH="0" baseline="0" dirty="0" smtClean="0">
                 <a:ln>
                   <a:noFill/>
                 </a:ln>
@@ -20857,13 +20857,13 @@
                   <a:srgbClr val="000080"/>
                 </a:solidFill>
                 <a:effectLst/>
-                <a:latin typeface="Courier New" panose="02070309020205020404" pitchFamily="49" charset="0"/>
-                <a:cs typeface="Courier New" panose="02070309020205020404" pitchFamily="49" charset="0"/>
+                <a:latin typeface="Consolas" panose="020B0609020204030204" pitchFamily="49" charset="0"/>
+                <a:cs typeface="Consolas" panose="020B0609020204030204" pitchFamily="49" charset="0"/>
               </a:rPr>
               <a:t> </a:t>
             </a:r>
             <a:r>
-              <a:rPr kumimoji="0" lang="en-US" altLang="en-US" sz="1100" b="0" i="0" u="none" strike="noStrike" cap="none" normalizeH="0" baseline="0" dirty="0" smtClean="0">
+              <a:rPr kumimoji="0" lang="en-US" altLang="en-US" sz="1200" b="0" i="0" u="none" strike="noStrike" cap="none" normalizeH="0" baseline="0" dirty="0" smtClean="0">
                 <a:ln>
                   <a:noFill/>
                 </a:ln>
@@ -20871,13 +20871,13 @@
                   <a:srgbClr val="000000"/>
                 </a:solidFill>
                 <a:effectLst/>
-                <a:latin typeface="Courier New" panose="02070309020205020404" pitchFamily="49" charset="0"/>
-                <a:cs typeface="Courier New" panose="02070309020205020404" pitchFamily="49" charset="0"/>
+                <a:latin typeface="Consolas" panose="020B0609020204030204" pitchFamily="49" charset="0"/>
+                <a:cs typeface="Consolas" panose="020B0609020204030204" pitchFamily="49" charset="0"/>
               </a:rPr>
               <a:t>have(f: =&gt; </a:t>
             </a:r>
             <a:r>
-              <a:rPr kumimoji="0" lang="en-US" altLang="en-US" sz="1100" b="0" i="0" u="none" strike="noStrike" cap="none" normalizeH="0" baseline="0" dirty="0" smtClean="0">
+              <a:rPr kumimoji="0" lang="en-US" altLang="en-US" sz="1200" b="0" i="0" u="none" strike="noStrike" cap="none" normalizeH="0" baseline="0" dirty="0" smtClean="0">
                 <a:ln>
                   <a:noFill/>
                 </a:ln>
@@ -20885,13 +20885,13 @@
                   <a:srgbClr val="CC7832"/>
                 </a:solidFill>
                 <a:effectLst/>
-                <a:latin typeface="Courier New" panose="02070309020205020404" pitchFamily="49" charset="0"/>
-                <a:cs typeface="Courier New" panose="02070309020205020404" pitchFamily="49" charset="0"/>
+                <a:latin typeface="Consolas" panose="020B0609020204030204" pitchFamily="49" charset="0"/>
+                <a:cs typeface="Consolas" panose="020B0609020204030204" pitchFamily="49" charset="0"/>
               </a:rPr>
               <a:t>Unit</a:t>
             </a:r>
             <a:r>
-              <a:rPr kumimoji="0" lang="en-US" altLang="en-US" sz="1100" b="0" i="0" u="none" strike="noStrike" cap="none" normalizeH="0" baseline="0" dirty="0" smtClean="0">
+              <a:rPr kumimoji="0" lang="en-US" altLang="en-US" sz="1200" b="0" i="0" u="none" strike="noStrike" cap="none" normalizeH="0" baseline="0" dirty="0" smtClean="0">
                 <a:ln>
                   <a:noFill/>
                 </a:ln>
@@ -20899,13 +20899,13 @@
                   <a:srgbClr val="000000"/>
                 </a:solidFill>
                 <a:effectLst/>
-                <a:latin typeface="Courier New" panose="02070309020205020404" pitchFamily="49" charset="0"/>
-                <a:cs typeface="Courier New" panose="02070309020205020404" pitchFamily="49" charset="0"/>
+                <a:latin typeface="Consolas" panose="020B0609020204030204" pitchFamily="49" charset="0"/>
+                <a:cs typeface="Consolas" panose="020B0609020204030204" pitchFamily="49" charset="0"/>
               </a:rPr>
               <a:t>) = </a:t>
             </a:r>
             <a:r>
-              <a:rPr kumimoji="0" lang="en-US" altLang="en-US" sz="1100" b="1" i="0" u="none" strike="noStrike" cap="none" normalizeH="0" baseline="0" dirty="0" smtClean="0">
+              <a:rPr kumimoji="0" lang="en-US" altLang="en-US" sz="1200" b="1" i="0" u="none" strike="noStrike" cap="none" normalizeH="0" baseline="0" dirty="0" smtClean="0">
                 <a:ln>
                   <a:noFill/>
                 </a:ln>
@@ -20913,13 +20913,13 @@
                   <a:srgbClr val="000080"/>
                 </a:solidFill>
                 <a:effectLst/>
-                <a:latin typeface="Courier New" panose="02070309020205020404" pitchFamily="49" charset="0"/>
-                <a:cs typeface="Courier New" panose="02070309020205020404" pitchFamily="49" charset="0"/>
+                <a:latin typeface="Consolas" panose="020B0609020204030204" pitchFamily="49" charset="0"/>
+                <a:cs typeface="Consolas" panose="020B0609020204030204" pitchFamily="49" charset="0"/>
               </a:rPr>
               <a:t>new </a:t>
             </a:r>
             <a:r>
-              <a:rPr kumimoji="0" lang="en-US" altLang="en-US" sz="1100" b="0" i="0" u="none" strike="noStrike" cap="none" normalizeH="0" baseline="0" dirty="0" smtClean="0">
+              <a:rPr kumimoji="0" lang="en-US" altLang="en-US" sz="1200" b="0" i="0" u="none" strike="noStrike" cap="none" normalizeH="0" baseline="0" dirty="0" smtClean="0">
                 <a:ln>
                   <a:noFill/>
                 </a:ln>
@@ -20927,13 +20927,13 @@
                   <a:srgbClr val="000000"/>
                 </a:solidFill>
                 <a:effectLst/>
-                <a:latin typeface="Courier New" panose="02070309020205020404" pitchFamily="49" charset="0"/>
-                <a:cs typeface="Courier New" panose="02070309020205020404" pitchFamily="49" charset="0"/>
+                <a:latin typeface="Consolas" panose="020B0609020204030204" pitchFamily="49" charset="0"/>
+                <a:cs typeface="Consolas" panose="020B0609020204030204" pitchFamily="49" charset="0"/>
               </a:rPr>
               <a:t>{</a:t>
             </a:r>
             <a:br>
-              <a:rPr kumimoji="0" lang="en-US" altLang="en-US" sz="1100" b="0" i="0" u="none" strike="noStrike" cap="none" normalizeH="0" baseline="0" dirty="0" smtClean="0">
+              <a:rPr kumimoji="0" lang="en-US" altLang="en-US" sz="1200" b="0" i="0" u="none" strike="noStrike" cap="none" normalizeH="0" baseline="0" dirty="0" smtClean="0">
                 <a:ln>
                   <a:noFill/>
                 </a:ln>
@@ -20941,12 +20941,12 @@
                   <a:srgbClr val="000000"/>
                 </a:solidFill>
                 <a:effectLst/>
-                <a:latin typeface="Courier New" panose="02070309020205020404" pitchFamily="49" charset="0"/>
-                <a:cs typeface="Courier New" panose="02070309020205020404" pitchFamily="49" charset="0"/>
+                <a:latin typeface="Consolas" panose="020B0609020204030204" pitchFamily="49" charset="0"/>
+                <a:cs typeface="Consolas" panose="020B0609020204030204" pitchFamily="49" charset="0"/>
               </a:rPr>
             </a:br>
             <a:r>
-              <a:rPr kumimoji="0" lang="en-US" altLang="en-US" sz="1100" b="0" i="0" u="none" strike="noStrike" cap="none" normalizeH="0" baseline="0" dirty="0" smtClean="0">
+              <a:rPr kumimoji="0" lang="en-US" altLang="en-US" sz="1200" b="0" i="0" u="none" strike="noStrike" cap="none" normalizeH="0" baseline="0" dirty="0" smtClean="0">
                 <a:ln>
                   <a:noFill/>
                 </a:ln>
@@ -20954,13 +20954,13 @@
                   <a:srgbClr val="000000"/>
                 </a:solidFill>
                 <a:effectLst/>
-                <a:latin typeface="Courier New" panose="02070309020205020404" pitchFamily="49" charset="0"/>
-                <a:cs typeface="Courier New" panose="02070309020205020404" pitchFamily="49" charset="0"/>
+                <a:latin typeface="Consolas" panose="020B0609020204030204" pitchFamily="49" charset="0"/>
+                <a:cs typeface="Consolas" panose="020B0609020204030204" pitchFamily="49" charset="0"/>
               </a:rPr>
               <a:t>    </a:t>
             </a:r>
             <a:r>
-              <a:rPr kumimoji="0" lang="en-US" altLang="en-US" sz="1100" b="1" i="0" u="none" strike="noStrike" cap="none" normalizeH="0" baseline="0" dirty="0" err="1" smtClean="0">
+              <a:rPr kumimoji="0" lang="en-US" altLang="en-US" sz="1200" b="1" i="0" u="none" strike="noStrike" cap="none" normalizeH="0" baseline="0" dirty="0" err="1" smtClean="0">
                 <a:ln>
                   <a:noFill/>
                 </a:ln>
@@ -20968,13 +20968,13 @@
                   <a:srgbClr val="000080"/>
                 </a:solidFill>
                 <a:effectLst/>
-                <a:latin typeface="Courier New" panose="02070309020205020404" pitchFamily="49" charset="0"/>
-                <a:cs typeface="Courier New" panose="02070309020205020404" pitchFamily="49" charset="0"/>
+                <a:latin typeface="Consolas" panose="020B0609020204030204" pitchFamily="49" charset="0"/>
+                <a:cs typeface="Consolas" panose="020B0609020204030204" pitchFamily="49" charset="0"/>
               </a:rPr>
               <a:t>def</a:t>
             </a:r>
             <a:r>
-              <a:rPr kumimoji="0" lang="en-US" altLang="en-US" sz="1100" b="1" i="0" u="none" strike="noStrike" cap="none" normalizeH="0" baseline="0" dirty="0" smtClean="0">
+              <a:rPr kumimoji="0" lang="en-US" altLang="en-US" sz="1200" b="1" i="0" u="none" strike="noStrike" cap="none" normalizeH="0" baseline="0" dirty="0" smtClean="0">
                 <a:ln>
                   <a:noFill/>
                 </a:ln>
@@ -20982,13 +20982,13 @@
                   <a:srgbClr val="000080"/>
                 </a:solidFill>
                 <a:effectLst/>
-                <a:latin typeface="Courier New" panose="02070309020205020404" pitchFamily="49" charset="0"/>
-                <a:cs typeface="Courier New" panose="02070309020205020404" pitchFamily="49" charset="0"/>
+                <a:latin typeface="Consolas" panose="020B0609020204030204" pitchFamily="49" charset="0"/>
+                <a:cs typeface="Consolas" panose="020B0609020204030204" pitchFamily="49" charset="0"/>
               </a:rPr>
               <a:t> </a:t>
             </a:r>
             <a:r>
-              <a:rPr kumimoji="0" lang="en-US" altLang="en-US" sz="1100" b="0" i="0" u="none" strike="noStrike" cap="none" normalizeH="0" baseline="0" dirty="0" err="1" smtClean="0">
+              <a:rPr kumimoji="0" lang="en-US" altLang="en-US" sz="1200" b="0" i="0" u="none" strike="noStrike" cap="none" normalizeH="0" baseline="0" dirty="0" err="1" smtClean="0">
                 <a:ln>
                   <a:noFill/>
                 </a:ln>
@@ -20996,13 +20996,13 @@
                   <a:srgbClr val="000000"/>
                 </a:solidFill>
                 <a:effectLst/>
-                <a:latin typeface="Courier New" panose="02070309020205020404" pitchFamily="49" charset="0"/>
-                <a:cs typeface="Courier New" panose="02070309020205020404" pitchFamily="49" charset="0"/>
+                <a:latin typeface="Consolas" panose="020B0609020204030204" pitchFamily="49" charset="0"/>
+                <a:cs typeface="Consolas" panose="020B0609020204030204" pitchFamily="49" charset="0"/>
               </a:rPr>
               <a:t>til</a:t>
             </a:r>
             <a:r>
-              <a:rPr kumimoji="0" lang="en-US" altLang="en-US" sz="1100" b="0" i="0" u="none" strike="noStrike" cap="none" normalizeH="0" baseline="0" dirty="0" smtClean="0">
+              <a:rPr kumimoji="0" lang="en-US" altLang="en-US" sz="1200" b="0" i="0" u="none" strike="noStrike" cap="none" normalizeH="0" baseline="0" dirty="0" smtClean="0">
                 <a:ln>
                   <a:noFill/>
                 </a:ln>
@@ -21010,13 +21010,13 @@
                   <a:srgbClr val="000000"/>
                 </a:solidFill>
                 <a:effectLst/>
-                <a:latin typeface="Courier New" panose="02070309020205020404" pitchFamily="49" charset="0"/>
-                <a:cs typeface="Courier New" panose="02070309020205020404" pitchFamily="49" charset="0"/>
+                <a:latin typeface="Consolas" panose="020B0609020204030204" pitchFamily="49" charset="0"/>
+                <a:cs typeface="Consolas" panose="020B0609020204030204" pitchFamily="49" charset="0"/>
               </a:rPr>
               <a:t>(c: =&gt; </a:t>
             </a:r>
             <a:r>
-              <a:rPr kumimoji="0" lang="en-US" altLang="en-US" sz="1100" b="0" i="0" u="none" strike="noStrike" cap="none" normalizeH="0" baseline="0" dirty="0" smtClean="0">
+              <a:rPr kumimoji="0" lang="en-US" altLang="en-US" sz="1200" b="0" i="0" u="none" strike="noStrike" cap="none" normalizeH="0" baseline="0" dirty="0" smtClean="0">
                 <a:ln>
                   <a:noFill/>
                 </a:ln>
@@ -21024,13 +21024,13 @@
                   <a:srgbClr val="CC7832"/>
                 </a:solidFill>
                 <a:effectLst/>
-                <a:latin typeface="Courier New" panose="02070309020205020404" pitchFamily="49" charset="0"/>
-                <a:cs typeface="Courier New" panose="02070309020205020404" pitchFamily="49" charset="0"/>
+                <a:latin typeface="Consolas" panose="020B0609020204030204" pitchFamily="49" charset="0"/>
+                <a:cs typeface="Consolas" panose="020B0609020204030204" pitchFamily="49" charset="0"/>
               </a:rPr>
               <a:t>Boolean</a:t>
             </a:r>
             <a:r>
-              <a:rPr kumimoji="0" lang="en-US" altLang="en-US" sz="1100" b="0" i="0" u="none" strike="noStrike" cap="none" normalizeH="0" baseline="0" dirty="0" smtClean="0">
+              <a:rPr kumimoji="0" lang="en-US" altLang="en-US" sz="1200" b="0" i="0" u="none" strike="noStrike" cap="none" normalizeH="0" baseline="0" dirty="0" smtClean="0">
                 <a:ln>
                   <a:noFill/>
                 </a:ln>
@@ -21038,13 +21038,13 @@
                   <a:srgbClr val="000000"/>
                 </a:solidFill>
                 <a:effectLst/>
-                <a:latin typeface="Courier New" panose="02070309020205020404" pitchFamily="49" charset="0"/>
-                <a:cs typeface="Courier New" panose="02070309020205020404" pitchFamily="49" charset="0"/>
+                <a:latin typeface="Consolas" panose="020B0609020204030204" pitchFamily="49" charset="0"/>
+                <a:cs typeface="Consolas" panose="020B0609020204030204" pitchFamily="49" charset="0"/>
               </a:rPr>
               <a:t>) = {</a:t>
             </a:r>
             <a:r>
-              <a:rPr kumimoji="0" lang="en-US" altLang="en-US" sz="1100" b="1" i="0" u="none" strike="noStrike" cap="none" normalizeH="0" baseline="0" dirty="0" smtClean="0">
+              <a:rPr kumimoji="0" lang="en-US" altLang="en-US" sz="1200" b="1" i="0" u="none" strike="noStrike" cap="none" normalizeH="0" baseline="0" dirty="0" smtClean="0">
                 <a:ln>
                   <a:noFill/>
                 </a:ln>
@@ -21052,13 +21052,13 @@
                   <a:srgbClr val="000080"/>
                 </a:solidFill>
                 <a:effectLst/>
-                <a:latin typeface="Courier New" panose="02070309020205020404" pitchFamily="49" charset="0"/>
-                <a:cs typeface="Courier New" panose="02070309020205020404" pitchFamily="49" charset="0"/>
+                <a:latin typeface="Consolas" panose="020B0609020204030204" pitchFamily="49" charset="0"/>
+                <a:cs typeface="Consolas" panose="020B0609020204030204" pitchFamily="49" charset="0"/>
               </a:rPr>
               <a:t>do</a:t>
             </a:r>
             <a:r>
-              <a:rPr kumimoji="0" lang="en-US" altLang="en-US" sz="1100" b="0" i="0" u="none" strike="noStrike" cap="none" normalizeH="0" baseline="0" dirty="0" smtClean="0">
+              <a:rPr kumimoji="0" lang="en-US" altLang="en-US" sz="1200" b="0" i="0" u="none" strike="noStrike" cap="none" normalizeH="0" baseline="0" dirty="0" smtClean="0">
                 <a:ln>
                   <a:noFill/>
                 </a:ln>
@@ -21066,13 +21066,13 @@
                   <a:srgbClr val="000000"/>
                 </a:solidFill>
                 <a:effectLst/>
-                <a:latin typeface="Courier New" panose="02070309020205020404" pitchFamily="49" charset="0"/>
-                <a:cs typeface="Courier New" panose="02070309020205020404" pitchFamily="49" charset="0"/>
+                <a:latin typeface="Consolas" panose="020B0609020204030204" pitchFamily="49" charset="0"/>
+                <a:cs typeface="Consolas" panose="020B0609020204030204" pitchFamily="49" charset="0"/>
               </a:rPr>
               <a:t>{f} </a:t>
             </a:r>
             <a:r>
-              <a:rPr kumimoji="0" lang="en-US" altLang="en-US" sz="1100" b="1" i="0" u="none" strike="noStrike" cap="none" normalizeH="0" baseline="0" dirty="0" smtClean="0">
+              <a:rPr kumimoji="0" lang="en-US" altLang="en-US" sz="1200" b="1" i="0" u="none" strike="noStrike" cap="none" normalizeH="0" baseline="0" dirty="0" smtClean="0">
                 <a:ln>
                   <a:noFill/>
                 </a:ln>
@@ -21080,13 +21080,13 @@
                   <a:srgbClr val="000080"/>
                 </a:solidFill>
                 <a:effectLst/>
-                <a:latin typeface="Courier New" panose="02070309020205020404" pitchFamily="49" charset="0"/>
-                <a:cs typeface="Courier New" panose="02070309020205020404" pitchFamily="49" charset="0"/>
+                <a:latin typeface="Consolas" panose="020B0609020204030204" pitchFamily="49" charset="0"/>
+                <a:cs typeface="Consolas" panose="020B0609020204030204" pitchFamily="49" charset="0"/>
               </a:rPr>
               <a:t>while </a:t>
             </a:r>
             <a:r>
-              <a:rPr kumimoji="0" lang="en-US" altLang="en-US" sz="1100" b="0" i="0" u="none" strike="noStrike" cap="none" normalizeH="0" baseline="0" dirty="0" smtClean="0">
+              <a:rPr kumimoji="0" lang="en-US" altLang="en-US" sz="1200" b="0" i="0" u="none" strike="noStrike" cap="none" normalizeH="0" baseline="0" dirty="0" smtClean="0">
                 <a:ln>
                   <a:noFill/>
                 </a:ln>
@@ -21094,13 +21094,13 @@
                   <a:srgbClr val="000000"/>
                 </a:solidFill>
                 <a:effectLst/>
-                <a:latin typeface="Courier New" panose="02070309020205020404" pitchFamily="49" charset="0"/>
-                <a:cs typeface="Courier New" panose="02070309020205020404" pitchFamily="49" charset="0"/>
+                <a:latin typeface="Consolas" panose="020B0609020204030204" pitchFamily="49" charset="0"/>
+                <a:cs typeface="Consolas" panose="020B0609020204030204" pitchFamily="49" charset="0"/>
               </a:rPr>
               <a:t>(!c)}</a:t>
             </a:r>
             <a:br>
-              <a:rPr kumimoji="0" lang="en-US" altLang="en-US" sz="1100" b="0" i="0" u="none" strike="noStrike" cap="none" normalizeH="0" baseline="0" dirty="0" smtClean="0">
+              <a:rPr kumimoji="0" lang="en-US" altLang="en-US" sz="1200" b="0" i="0" u="none" strike="noStrike" cap="none" normalizeH="0" baseline="0" dirty="0" smtClean="0">
                 <a:ln>
                   <a:noFill/>
                 </a:ln>
@@ -21108,12 +21108,12 @@
                   <a:srgbClr val="000000"/>
                 </a:solidFill>
                 <a:effectLst/>
-                <a:latin typeface="Courier New" panose="02070309020205020404" pitchFamily="49" charset="0"/>
-                <a:cs typeface="Courier New" panose="02070309020205020404" pitchFamily="49" charset="0"/>
+                <a:latin typeface="Consolas" panose="020B0609020204030204" pitchFamily="49" charset="0"/>
+                <a:cs typeface="Consolas" panose="020B0609020204030204" pitchFamily="49" charset="0"/>
               </a:rPr>
             </a:br>
             <a:r>
-              <a:rPr kumimoji="0" lang="en-US" altLang="en-US" sz="1100" b="0" i="0" u="none" strike="noStrike" cap="none" normalizeH="0" baseline="0" dirty="0" smtClean="0">
+              <a:rPr kumimoji="0" lang="en-US" altLang="en-US" sz="1200" b="0" i="0" u="none" strike="noStrike" cap="none" normalizeH="0" baseline="0" dirty="0" smtClean="0">
                 <a:ln>
                   <a:noFill/>
                 </a:ln>
@@ -21121,13 +21121,13 @@
                   <a:srgbClr val="000000"/>
                 </a:solidFill>
                 <a:effectLst/>
-                <a:latin typeface="Courier New" panose="02070309020205020404" pitchFamily="49" charset="0"/>
-                <a:cs typeface="Courier New" panose="02070309020205020404" pitchFamily="49" charset="0"/>
+                <a:latin typeface="Consolas" panose="020B0609020204030204" pitchFamily="49" charset="0"/>
+                <a:cs typeface="Consolas" panose="020B0609020204030204" pitchFamily="49" charset="0"/>
               </a:rPr>
               <a:t>  }</a:t>
             </a:r>
             <a:br>
-              <a:rPr kumimoji="0" lang="en-US" altLang="en-US" sz="1100" b="0" i="0" u="none" strike="noStrike" cap="none" normalizeH="0" baseline="0" dirty="0" smtClean="0">
+              <a:rPr kumimoji="0" lang="en-US" altLang="en-US" sz="1200" b="0" i="0" u="none" strike="noStrike" cap="none" normalizeH="0" baseline="0" dirty="0" smtClean="0">
                 <a:ln>
                   <a:noFill/>
                 </a:ln>
@@ -21135,12 +21135,12 @@
                   <a:srgbClr val="000000"/>
                 </a:solidFill>
                 <a:effectLst/>
-                <a:latin typeface="Courier New" panose="02070309020205020404" pitchFamily="49" charset="0"/>
-                <a:cs typeface="Courier New" panose="02070309020205020404" pitchFamily="49" charset="0"/>
+                <a:latin typeface="Consolas" panose="020B0609020204030204" pitchFamily="49" charset="0"/>
+                <a:cs typeface="Consolas" panose="020B0609020204030204" pitchFamily="49" charset="0"/>
               </a:rPr>
             </a:br>
             <a:r>
-              <a:rPr kumimoji="0" lang="en-US" altLang="en-US" sz="1100" b="0" i="0" u="none" strike="noStrike" cap="none" normalizeH="0" baseline="0" dirty="0" smtClean="0">
+              <a:rPr kumimoji="0" lang="en-US" altLang="en-US" sz="1200" b="0" i="0" u="none" strike="noStrike" cap="none" normalizeH="0" baseline="0" dirty="0" smtClean="0">
                 <a:ln>
                   <a:noFill/>
                 </a:ln>
@@ -21148,13 +21148,13 @@
                   <a:srgbClr val="000000"/>
                 </a:solidFill>
                 <a:effectLst/>
-                <a:latin typeface="Courier New" panose="02070309020205020404" pitchFamily="49" charset="0"/>
-                <a:cs typeface="Courier New" panose="02070309020205020404" pitchFamily="49" charset="0"/>
+                <a:latin typeface="Consolas" panose="020B0609020204030204" pitchFamily="49" charset="0"/>
+                <a:cs typeface="Consolas" panose="020B0609020204030204" pitchFamily="49" charset="0"/>
               </a:rPr>
               <a:t>}</a:t>
             </a:r>
             <a:br>
-              <a:rPr kumimoji="0" lang="en-US" altLang="en-US" sz="1100" b="0" i="0" u="none" strike="noStrike" cap="none" normalizeH="0" baseline="0" dirty="0" smtClean="0">
+              <a:rPr kumimoji="0" lang="en-US" altLang="en-US" sz="1200" b="0" i="0" u="none" strike="noStrike" cap="none" normalizeH="0" baseline="0" dirty="0" smtClean="0">
                 <a:ln>
                   <a:noFill/>
                 </a:ln>
@@ -21162,12 +21162,12 @@
                   <a:srgbClr val="000000"/>
                 </a:solidFill>
                 <a:effectLst/>
-                <a:latin typeface="Courier New" panose="02070309020205020404" pitchFamily="49" charset="0"/>
-                <a:cs typeface="Courier New" panose="02070309020205020404" pitchFamily="49" charset="0"/>
+                <a:latin typeface="Consolas" panose="020B0609020204030204" pitchFamily="49" charset="0"/>
+                <a:cs typeface="Consolas" panose="020B0609020204030204" pitchFamily="49" charset="0"/>
               </a:rPr>
             </a:br>
             <a:r>
-              <a:rPr kumimoji="0" lang="en-US" altLang="en-US" sz="1100" b="0" i="0" u="none" strike="noStrike" cap="none" normalizeH="0" baseline="0" dirty="0" smtClean="0">
+              <a:rPr kumimoji="0" lang="en-US" altLang="en-US" sz="1200" b="0" i="0" u="none" strike="noStrike" cap="none" normalizeH="0" baseline="0" dirty="0" smtClean="0">
                 <a:ln>
                   <a:noFill/>
                 </a:ln>
@@ -21175,13 +21175,13 @@
                   <a:srgbClr val="000000"/>
                 </a:solidFill>
                 <a:effectLst/>
-                <a:latin typeface="Courier New" panose="02070309020205020404" pitchFamily="49" charset="0"/>
-                <a:cs typeface="Courier New" panose="02070309020205020404" pitchFamily="49" charset="0"/>
+                <a:latin typeface="Consolas" panose="020B0609020204030204" pitchFamily="49" charset="0"/>
+                <a:cs typeface="Consolas" panose="020B0609020204030204" pitchFamily="49" charset="0"/>
               </a:rPr>
               <a:t/>
             </a:r>
             <a:br>
-              <a:rPr kumimoji="0" lang="en-US" altLang="en-US" sz="1100" b="0" i="0" u="none" strike="noStrike" cap="none" normalizeH="0" baseline="0" dirty="0" smtClean="0">
+              <a:rPr kumimoji="0" lang="en-US" altLang="en-US" sz="1200" b="0" i="0" u="none" strike="noStrike" cap="none" normalizeH="0" baseline="0" dirty="0" smtClean="0">
                 <a:ln>
                   <a:noFill/>
                 </a:ln>
@@ -21189,12 +21189,12 @@
                   <a:srgbClr val="000000"/>
                 </a:solidFill>
                 <a:effectLst/>
-                <a:latin typeface="Courier New" panose="02070309020205020404" pitchFamily="49" charset="0"/>
-                <a:cs typeface="Courier New" panose="02070309020205020404" pitchFamily="49" charset="0"/>
+                <a:latin typeface="Consolas" panose="020B0609020204030204" pitchFamily="49" charset="0"/>
+                <a:cs typeface="Consolas" panose="020B0609020204030204" pitchFamily="49" charset="0"/>
               </a:rPr>
             </a:br>
             <a:r>
-              <a:rPr kumimoji="0" lang="en-US" altLang="en-US" sz="1100" b="1" i="0" u="none" strike="noStrike" cap="none" normalizeH="0" baseline="0" dirty="0" smtClean="0">
+              <a:rPr kumimoji="0" lang="en-US" altLang="en-US" sz="1200" b="1" i="0" u="none" strike="noStrike" cap="none" normalizeH="0" baseline="0" dirty="0" smtClean="0">
                 <a:ln>
                   <a:noFill/>
                 </a:ln>
@@ -21202,13 +21202,13 @@
                   <a:srgbClr val="000080"/>
                 </a:solidFill>
                 <a:effectLst/>
-                <a:latin typeface="Courier New" panose="02070309020205020404" pitchFamily="49" charset="0"/>
-                <a:cs typeface="Courier New" panose="02070309020205020404" pitchFamily="49" charset="0"/>
+                <a:latin typeface="Consolas" panose="020B0609020204030204" pitchFamily="49" charset="0"/>
+                <a:cs typeface="Consolas" panose="020B0609020204030204" pitchFamily="49" charset="0"/>
               </a:rPr>
               <a:t>case class </a:t>
             </a:r>
             <a:r>
-              <a:rPr kumimoji="0" lang="en-US" altLang="en-US" sz="1100" b="0" i="0" u="none" strike="noStrike" cap="none" normalizeH="0" baseline="0" dirty="0" err="1" smtClean="0">
+              <a:rPr kumimoji="0" lang="en-US" altLang="en-US" sz="1200" b="0" i="0" u="none" strike="noStrike" cap="none" normalizeH="0" baseline="0" dirty="0" err="1" smtClean="0">
                 <a:ln>
                   <a:noFill/>
                 </a:ln>
@@ -21216,13 +21216,13 @@
                   <a:srgbClr val="000000"/>
                 </a:solidFill>
                 <a:effectLst/>
-                <a:latin typeface="Courier New" panose="02070309020205020404" pitchFamily="49" charset="0"/>
-                <a:cs typeface="Courier New" panose="02070309020205020404" pitchFamily="49" charset="0"/>
+                <a:latin typeface="Consolas" panose="020B0609020204030204" pitchFamily="49" charset="0"/>
+                <a:cs typeface="Consolas" panose="020B0609020204030204" pitchFamily="49" charset="0"/>
               </a:rPr>
               <a:t>TBird</a:t>
             </a:r>
             <a:r>
-              <a:rPr kumimoji="0" lang="en-US" altLang="en-US" sz="1100" b="0" i="0" u="none" strike="noStrike" cap="none" normalizeH="0" baseline="0" dirty="0" smtClean="0">
+              <a:rPr kumimoji="0" lang="en-US" altLang="en-US" sz="1200" b="0" i="0" u="none" strike="noStrike" cap="none" normalizeH="0" baseline="0" dirty="0" smtClean="0">
                 <a:ln>
                   <a:noFill/>
                 </a:ln>
@@ -21230,13 +21230,13 @@
                   <a:srgbClr val="000000"/>
                 </a:solidFill>
                 <a:effectLst/>
-                <a:latin typeface="Courier New" panose="02070309020205020404" pitchFamily="49" charset="0"/>
-                <a:cs typeface="Courier New" panose="02070309020205020404" pitchFamily="49" charset="0"/>
+                <a:latin typeface="Consolas" panose="020B0609020204030204" pitchFamily="49" charset="0"/>
+                <a:cs typeface="Consolas" panose="020B0609020204030204" pitchFamily="49" charset="0"/>
               </a:rPr>
               <a:t>(){</a:t>
             </a:r>
             <a:br>
-              <a:rPr kumimoji="0" lang="en-US" altLang="en-US" sz="1100" b="0" i="0" u="none" strike="noStrike" cap="none" normalizeH="0" baseline="0" dirty="0" smtClean="0">
+              <a:rPr kumimoji="0" lang="en-US" altLang="en-US" sz="1200" b="0" i="0" u="none" strike="noStrike" cap="none" normalizeH="0" baseline="0" dirty="0" smtClean="0">
                 <a:ln>
                   <a:noFill/>
                 </a:ln>
@@ -21244,12 +21244,12 @@
                   <a:srgbClr val="000000"/>
                 </a:solidFill>
                 <a:effectLst/>
-                <a:latin typeface="Courier New" panose="02070309020205020404" pitchFamily="49" charset="0"/>
-                <a:cs typeface="Courier New" panose="02070309020205020404" pitchFamily="49" charset="0"/>
+                <a:latin typeface="Consolas" panose="020B0609020204030204" pitchFamily="49" charset="0"/>
+                <a:cs typeface="Consolas" panose="020B0609020204030204" pitchFamily="49" charset="0"/>
               </a:rPr>
             </a:br>
             <a:r>
-              <a:rPr kumimoji="0" lang="en-US" altLang="en-US" sz="1100" b="0" i="0" u="none" strike="noStrike" cap="none" normalizeH="0" baseline="0" dirty="0" smtClean="0">
+              <a:rPr kumimoji="0" lang="en-US" altLang="en-US" sz="1200" b="0" i="0" u="none" strike="noStrike" cap="none" normalizeH="0" baseline="0" dirty="0" smtClean="0">
                 <a:ln>
                   <a:noFill/>
                 </a:ln>
@@ -21257,13 +21257,13 @@
                   <a:srgbClr val="000000"/>
                 </a:solidFill>
                 <a:effectLst/>
-                <a:latin typeface="Courier New" panose="02070309020205020404" pitchFamily="49" charset="0"/>
-                <a:cs typeface="Courier New" panose="02070309020205020404" pitchFamily="49" charset="0"/>
+                <a:latin typeface="Consolas" panose="020B0609020204030204" pitchFamily="49" charset="0"/>
+                <a:cs typeface="Consolas" panose="020B0609020204030204" pitchFamily="49" charset="0"/>
               </a:rPr>
               <a:t/>
             </a:r>
             <a:br>
-              <a:rPr kumimoji="0" lang="en-US" altLang="en-US" sz="1100" b="0" i="0" u="none" strike="noStrike" cap="none" normalizeH="0" baseline="0" dirty="0" smtClean="0">
+              <a:rPr kumimoji="0" lang="en-US" altLang="en-US" sz="1200" b="0" i="0" u="none" strike="noStrike" cap="none" normalizeH="0" baseline="0" dirty="0" smtClean="0">
                 <a:ln>
                   <a:noFill/>
                 </a:ln>
@@ -21271,12 +21271,12 @@
                   <a:srgbClr val="000000"/>
                 </a:solidFill>
                 <a:effectLst/>
-                <a:latin typeface="Courier New" panose="02070309020205020404" pitchFamily="49" charset="0"/>
-                <a:cs typeface="Courier New" panose="02070309020205020404" pitchFamily="49" charset="0"/>
+                <a:latin typeface="Consolas" panose="020B0609020204030204" pitchFamily="49" charset="0"/>
+                <a:cs typeface="Consolas" panose="020B0609020204030204" pitchFamily="49" charset="0"/>
               </a:rPr>
             </a:br>
             <a:r>
-              <a:rPr kumimoji="0" lang="en-US" altLang="en-US" sz="1100" b="0" i="0" u="none" strike="noStrike" cap="none" normalizeH="0" baseline="0" dirty="0" smtClean="0">
+              <a:rPr kumimoji="0" lang="en-US" altLang="en-US" sz="1200" b="0" i="0" u="none" strike="noStrike" cap="none" normalizeH="0" baseline="0" dirty="0" smtClean="0">
                 <a:ln>
                   <a:noFill/>
                 </a:ln>
@@ -21284,13 +21284,13 @@
                   <a:srgbClr val="000000"/>
                 </a:solidFill>
                 <a:effectLst/>
-                <a:latin typeface="Courier New" panose="02070309020205020404" pitchFamily="49" charset="0"/>
-                <a:cs typeface="Courier New" panose="02070309020205020404" pitchFamily="49" charset="0"/>
+                <a:latin typeface="Consolas" panose="020B0609020204030204" pitchFamily="49" charset="0"/>
+                <a:cs typeface="Consolas" panose="020B0609020204030204" pitchFamily="49" charset="0"/>
               </a:rPr>
               <a:t>}</a:t>
             </a:r>
             <a:br>
-              <a:rPr kumimoji="0" lang="en-US" altLang="en-US" sz="1100" b="0" i="0" u="none" strike="noStrike" cap="none" normalizeH="0" baseline="0" dirty="0" smtClean="0">
+              <a:rPr kumimoji="0" lang="en-US" altLang="en-US" sz="1200" b="0" i="0" u="none" strike="noStrike" cap="none" normalizeH="0" baseline="0" dirty="0" smtClean="0">
                 <a:ln>
                   <a:noFill/>
                 </a:ln>
@@ -21298,12 +21298,12 @@
                   <a:srgbClr val="000000"/>
                 </a:solidFill>
                 <a:effectLst/>
-                <a:latin typeface="Courier New" panose="02070309020205020404" pitchFamily="49" charset="0"/>
-                <a:cs typeface="Courier New" panose="02070309020205020404" pitchFamily="49" charset="0"/>
+                <a:latin typeface="Consolas" panose="020B0609020204030204" pitchFamily="49" charset="0"/>
+                <a:cs typeface="Consolas" panose="020B0609020204030204" pitchFamily="49" charset="0"/>
               </a:rPr>
             </a:br>
             <a:r>
-              <a:rPr kumimoji="0" lang="en-US" altLang="en-US" sz="1100" b="0" i="0" u="none" strike="noStrike" cap="none" normalizeH="0" baseline="0" dirty="0" smtClean="0">
+              <a:rPr kumimoji="0" lang="en-US" altLang="en-US" sz="1200" b="0" i="0" u="none" strike="noStrike" cap="none" normalizeH="0" baseline="0" dirty="0" smtClean="0">
                 <a:ln>
                   <a:noFill/>
                 </a:ln>
@@ -21311,13 +21311,13 @@
                   <a:srgbClr val="000000"/>
                 </a:solidFill>
                 <a:effectLst/>
-                <a:latin typeface="Courier New" panose="02070309020205020404" pitchFamily="49" charset="0"/>
-                <a:cs typeface="Courier New" panose="02070309020205020404" pitchFamily="49" charset="0"/>
+                <a:latin typeface="Consolas" panose="020B0609020204030204" pitchFamily="49" charset="0"/>
+                <a:cs typeface="Consolas" panose="020B0609020204030204" pitchFamily="49" charset="0"/>
               </a:rPr>
               <a:t/>
             </a:r>
             <a:br>
-              <a:rPr kumimoji="0" lang="en-US" altLang="en-US" sz="1100" b="0" i="0" u="none" strike="noStrike" cap="none" normalizeH="0" baseline="0" dirty="0" smtClean="0">
+              <a:rPr kumimoji="0" lang="en-US" altLang="en-US" sz="1200" b="0" i="0" u="none" strike="noStrike" cap="none" normalizeH="0" baseline="0" dirty="0" smtClean="0">
                 <a:ln>
                   <a:noFill/>
                 </a:ln>
@@ -21325,12 +21325,12 @@
                   <a:srgbClr val="000000"/>
                 </a:solidFill>
                 <a:effectLst/>
-                <a:latin typeface="Courier New" panose="02070309020205020404" pitchFamily="49" charset="0"/>
-                <a:cs typeface="Courier New" panose="02070309020205020404" pitchFamily="49" charset="0"/>
+                <a:latin typeface="Consolas" panose="020B0609020204030204" pitchFamily="49" charset="0"/>
+                <a:cs typeface="Consolas" panose="020B0609020204030204" pitchFamily="49" charset="0"/>
               </a:rPr>
             </a:br>
             <a:r>
-              <a:rPr kumimoji="0" lang="en-US" altLang="en-US" sz="1100" b="1" i="0" u="none" strike="noStrike" cap="none" normalizeH="0" baseline="0" dirty="0" smtClean="0">
+              <a:rPr kumimoji="0" lang="en-US" altLang="en-US" sz="1200" b="1" i="0" u="none" strike="noStrike" cap="none" normalizeH="0" baseline="0" dirty="0" smtClean="0">
                 <a:ln>
                   <a:noFill/>
                 </a:ln>
@@ -21338,13 +21338,13 @@
                   <a:srgbClr val="000080"/>
                 </a:solidFill>
                 <a:effectLst/>
-                <a:latin typeface="Courier New" panose="02070309020205020404" pitchFamily="49" charset="0"/>
-                <a:cs typeface="Courier New" panose="02070309020205020404" pitchFamily="49" charset="0"/>
+                <a:latin typeface="Consolas" panose="020B0609020204030204" pitchFamily="49" charset="0"/>
+                <a:cs typeface="Consolas" panose="020B0609020204030204" pitchFamily="49" charset="0"/>
               </a:rPr>
               <a:t>case class </a:t>
             </a:r>
             <a:r>
-              <a:rPr kumimoji="0" lang="en-US" altLang="en-US" sz="1100" b="0" i="0" u="none" strike="noStrike" cap="none" normalizeH="0" baseline="0" dirty="0" smtClean="0">
+              <a:rPr kumimoji="0" lang="en-US" altLang="en-US" sz="1200" b="0" i="0" u="none" strike="noStrike" cap="none" normalizeH="0" baseline="0" dirty="0" smtClean="0">
                 <a:ln>
                   <a:noFill/>
                 </a:ln>
@@ -21352,13 +21352,13 @@
                   <a:srgbClr val="000000"/>
                 </a:solidFill>
                 <a:effectLst/>
-                <a:latin typeface="Courier New" panose="02070309020205020404" pitchFamily="49" charset="0"/>
-                <a:cs typeface="Courier New" panose="02070309020205020404" pitchFamily="49" charset="0"/>
+                <a:latin typeface="Consolas" panose="020B0609020204030204" pitchFamily="49" charset="0"/>
+                <a:cs typeface="Consolas" panose="020B0609020204030204" pitchFamily="49" charset="0"/>
               </a:rPr>
               <a:t>Daddy(){</a:t>
             </a:r>
             <a:br>
-              <a:rPr kumimoji="0" lang="en-US" altLang="en-US" sz="1100" b="0" i="0" u="none" strike="noStrike" cap="none" normalizeH="0" baseline="0" dirty="0" smtClean="0">
+              <a:rPr kumimoji="0" lang="en-US" altLang="en-US" sz="1200" b="0" i="0" u="none" strike="noStrike" cap="none" normalizeH="0" baseline="0" dirty="0" smtClean="0">
                 <a:ln>
                   <a:noFill/>
                 </a:ln>
@@ -21366,12 +21366,12 @@
                   <a:srgbClr val="000000"/>
                 </a:solidFill>
                 <a:effectLst/>
-                <a:latin typeface="Courier New" panose="02070309020205020404" pitchFamily="49" charset="0"/>
-                <a:cs typeface="Courier New" panose="02070309020205020404" pitchFamily="49" charset="0"/>
+                <a:latin typeface="Consolas" panose="020B0609020204030204" pitchFamily="49" charset="0"/>
+                <a:cs typeface="Consolas" panose="020B0609020204030204" pitchFamily="49" charset="0"/>
               </a:rPr>
             </a:br>
             <a:r>
-              <a:rPr kumimoji="0" lang="en-US" altLang="en-US" sz="1100" b="0" i="0" u="none" strike="noStrike" cap="none" normalizeH="0" baseline="0" dirty="0" smtClean="0">
+              <a:rPr kumimoji="0" lang="en-US" altLang="en-US" sz="1200" b="0" i="0" u="none" strike="noStrike" cap="none" normalizeH="0" baseline="0" dirty="0" smtClean="0">
                 <a:ln>
                   <a:noFill/>
                 </a:ln>
@@ -21379,13 +21379,13 @@
                   <a:srgbClr val="000000"/>
                 </a:solidFill>
                 <a:effectLst/>
-                <a:latin typeface="Courier New" panose="02070309020205020404" pitchFamily="49" charset="0"/>
-                <a:cs typeface="Courier New" panose="02070309020205020404" pitchFamily="49" charset="0"/>
+                <a:latin typeface="Consolas" panose="020B0609020204030204" pitchFamily="49" charset="0"/>
+                <a:cs typeface="Consolas" panose="020B0609020204030204" pitchFamily="49" charset="0"/>
               </a:rPr>
               <a:t>  </a:t>
             </a:r>
             <a:r>
-              <a:rPr kumimoji="0" lang="en-US" altLang="en-US" sz="1100" b="1" i="0" u="none" strike="noStrike" cap="none" normalizeH="0" baseline="0" dirty="0" err="1" smtClean="0">
+              <a:rPr kumimoji="0" lang="en-US" altLang="en-US" sz="1200" b="1" i="0" u="none" strike="noStrike" cap="none" normalizeH="0" baseline="0" dirty="0" err="1" smtClean="0">
                 <a:ln>
                   <a:noFill/>
                 </a:ln>
@@ -21393,13 +21393,13 @@
                   <a:srgbClr val="000080"/>
                 </a:solidFill>
                 <a:effectLst/>
-                <a:latin typeface="Courier New" panose="02070309020205020404" pitchFamily="49" charset="0"/>
-                <a:cs typeface="Courier New" panose="02070309020205020404" pitchFamily="49" charset="0"/>
+                <a:latin typeface="Consolas" panose="020B0609020204030204" pitchFamily="49" charset="0"/>
+                <a:cs typeface="Consolas" panose="020B0609020204030204" pitchFamily="49" charset="0"/>
               </a:rPr>
               <a:t>def</a:t>
             </a:r>
             <a:r>
-              <a:rPr kumimoji="0" lang="en-US" altLang="en-US" sz="1100" b="1" i="0" u="none" strike="noStrike" cap="none" normalizeH="0" baseline="0" dirty="0" smtClean="0">
+              <a:rPr kumimoji="0" lang="en-US" altLang="en-US" sz="1200" b="1" i="0" u="none" strike="noStrike" cap="none" normalizeH="0" baseline="0" dirty="0" smtClean="0">
                 <a:ln>
                   <a:noFill/>
                 </a:ln>
@@ -21407,13 +21407,13 @@
                   <a:srgbClr val="000080"/>
                 </a:solidFill>
                 <a:effectLst/>
-                <a:latin typeface="Courier New" panose="02070309020205020404" pitchFamily="49" charset="0"/>
-                <a:cs typeface="Courier New" panose="02070309020205020404" pitchFamily="49" charset="0"/>
+                <a:latin typeface="Consolas" panose="020B0609020204030204" pitchFamily="49" charset="0"/>
+                <a:cs typeface="Consolas" panose="020B0609020204030204" pitchFamily="49" charset="0"/>
               </a:rPr>
               <a:t> </a:t>
             </a:r>
             <a:r>
-              <a:rPr kumimoji="0" lang="en-US" altLang="en-US" sz="1100" b="0" i="0" u="none" strike="noStrike" cap="none" normalizeH="0" baseline="0" dirty="0" err="1" smtClean="0">
+              <a:rPr kumimoji="0" lang="en-US" altLang="en-US" sz="1200" b="0" i="0" u="none" strike="noStrike" cap="none" normalizeH="0" baseline="0" dirty="0" err="1" smtClean="0">
                 <a:ln>
                   <a:noFill/>
                 </a:ln>
@@ -21421,13 +21421,13 @@
                   <a:srgbClr val="000000"/>
                 </a:solidFill>
                 <a:effectLst/>
-                <a:latin typeface="Courier New" panose="02070309020205020404" pitchFamily="49" charset="0"/>
-                <a:cs typeface="Courier New" panose="02070309020205020404" pitchFamily="49" charset="0"/>
+                <a:latin typeface="Consolas" panose="020B0609020204030204" pitchFamily="49" charset="0"/>
+                <a:cs typeface="Consolas" panose="020B0609020204030204" pitchFamily="49" charset="0"/>
               </a:rPr>
               <a:t>takeAway</a:t>
             </a:r>
             <a:r>
-              <a:rPr kumimoji="0" lang="en-US" altLang="en-US" sz="1100" b="0" i="0" u="none" strike="noStrike" cap="none" normalizeH="0" baseline="0" dirty="0" smtClean="0">
+              <a:rPr kumimoji="0" lang="en-US" altLang="en-US" sz="1200" b="0" i="0" u="none" strike="noStrike" cap="none" normalizeH="0" baseline="0" dirty="0" smtClean="0">
                 <a:ln>
                   <a:noFill/>
                 </a:ln>
@@ -21435,13 +21435,13 @@
                   <a:srgbClr val="000000"/>
                 </a:solidFill>
                 <a:effectLst/>
-                <a:latin typeface="Courier New" panose="02070309020205020404" pitchFamily="49" charset="0"/>
-                <a:cs typeface="Courier New" panose="02070309020205020404" pitchFamily="49" charset="0"/>
+                <a:latin typeface="Consolas" panose="020B0609020204030204" pitchFamily="49" charset="0"/>
+                <a:cs typeface="Consolas" panose="020B0609020204030204" pitchFamily="49" charset="0"/>
               </a:rPr>
               <a:t>(t: </a:t>
             </a:r>
             <a:r>
-              <a:rPr kumimoji="0" lang="en-US" altLang="en-US" sz="1100" b="0" i="0" u="none" strike="noStrike" cap="none" normalizeH="0" baseline="0" dirty="0" err="1" smtClean="0">
+              <a:rPr kumimoji="0" lang="en-US" altLang="en-US" sz="1200" b="0" i="0" u="none" strike="noStrike" cap="none" normalizeH="0" baseline="0" dirty="0" err="1" smtClean="0">
                 <a:ln>
                   <a:noFill/>
                 </a:ln>
@@ -21449,13 +21449,13 @@
                   <a:srgbClr val="000000"/>
                 </a:solidFill>
                 <a:effectLst/>
-                <a:latin typeface="Courier New" panose="02070309020205020404" pitchFamily="49" charset="0"/>
-                <a:cs typeface="Courier New" panose="02070309020205020404" pitchFamily="49" charset="0"/>
+                <a:latin typeface="Consolas" panose="020B0609020204030204" pitchFamily="49" charset="0"/>
+                <a:cs typeface="Consolas" panose="020B0609020204030204" pitchFamily="49" charset="0"/>
               </a:rPr>
               <a:t>TBird</a:t>
             </a:r>
             <a:r>
-              <a:rPr kumimoji="0" lang="en-US" altLang="en-US" sz="1100" b="0" i="0" u="none" strike="noStrike" cap="none" normalizeH="0" baseline="0" dirty="0" smtClean="0">
+              <a:rPr kumimoji="0" lang="en-US" altLang="en-US" sz="1200" b="0" i="0" u="none" strike="noStrike" cap="none" normalizeH="0" baseline="0" dirty="0" smtClean="0">
                 <a:ln>
                   <a:noFill/>
                 </a:ln>
@@ -21463,13 +21463,13 @@
                   <a:srgbClr val="000000"/>
                 </a:solidFill>
                 <a:effectLst/>
-                <a:latin typeface="Courier New" panose="02070309020205020404" pitchFamily="49" charset="0"/>
-                <a:cs typeface="Courier New" panose="02070309020205020404" pitchFamily="49" charset="0"/>
+                <a:latin typeface="Consolas" panose="020B0609020204030204" pitchFamily="49" charset="0"/>
+                <a:cs typeface="Consolas" panose="020B0609020204030204" pitchFamily="49" charset="0"/>
               </a:rPr>
               <a:t>) = {</a:t>
             </a:r>
             <a:br>
-              <a:rPr kumimoji="0" lang="en-US" altLang="en-US" sz="1100" b="0" i="0" u="none" strike="noStrike" cap="none" normalizeH="0" baseline="0" dirty="0" smtClean="0">
+              <a:rPr kumimoji="0" lang="en-US" altLang="en-US" sz="1200" b="0" i="0" u="none" strike="noStrike" cap="none" normalizeH="0" baseline="0" dirty="0" smtClean="0">
                 <a:ln>
                   <a:noFill/>
                 </a:ln>
@@ -21477,12 +21477,12 @@
                   <a:srgbClr val="000000"/>
                 </a:solidFill>
                 <a:effectLst/>
-                <a:latin typeface="Courier New" panose="02070309020205020404" pitchFamily="49" charset="0"/>
-                <a:cs typeface="Courier New" panose="02070309020205020404" pitchFamily="49" charset="0"/>
+                <a:latin typeface="Consolas" panose="020B0609020204030204" pitchFamily="49" charset="0"/>
+                <a:cs typeface="Consolas" panose="020B0609020204030204" pitchFamily="49" charset="0"/>
               </a:rPr>
             </a:br>
             <a:r>
-              <a:rPr kumimoji="0" lang="en-US" altLang="en-US" sz="1100" b="0" i="0" u="none" strike="noStrike" cap="none" normalizeH="0" baseline="0" dirty="0" smtClean="0">
+              <a:rPr kumimoji="0" lang="en-US" altLang="en-US" sz="1200" b="0" i="0" u="none" strike="noStrike" cap="none" normalizeH="0" baseline="0" dirty="0" smtClean="0">
                 <a:ln>
                   <a:noFill/>
                 </a:ln>
@@ -21490,13 +21490,13 @@
                   <a:srgbClr val="000000"/>
                 </a:solidFill>
                 <a:effectLst/>
-                <a:latin typeface="Courier New" panose="02070309020205020404" pitchFamily="49" charset="0"/>
-                <a:cs typeface="Courier New" panose="02070309020205020404" pitchFamily="49" charset="0"/>
+                <a:latin typeface="Consolas" panose="020B0609020204030204" pitchFamily="49" charset="0"/>
+                <a:cs typeface="Consolas" panose="020B0609020204030204" pitchFamily="49" charset="0"/>
               </a:rPr>
               <a:t>    </a:t>
             </a:r>
             <a:r>
-              <a:rPr kumimoji="0" lang="en-US" altLang="en-US" sz="1100" b="0" i="1" u="none" strike="noStrike" cap="none" normalizeH="0" baseline="0" dirty="0" err="1" smtClean="0">
+              <a:rPr kumimoji="0" lang="en-US" altLang="en-US" sz="1200" b="0" i="1" u="none" strike="noStrike" cap="none" normalizeH="0" baseline="0" dirty="0" err="1" smtClean="0">
                 <a:ln>
                   <a:noFill/>
                 </a:ln>
@@ -21504,13 +21504,13 @@
                   <a:srgbClr val="000000"/>
                 </a:solidFill>
                 <a:effectLst/>
-                <a:latin typeface="Courier New" panose="02070309020205020404" pitchFamily="49" charset="0"/>
-                <a:cs typeface="Courier New" panose="02070309020205020404" pitchFamily="49" charset="0"/>
+                <a:latin typeface="Consolas" panose="020B0609020204030204" pitchFamily="49" charset="0"/>
+                <a:cs typeface="Consolas" panose="020B0609020204030204" pitchFamily="49" charset="0"/>
               </a:rPr>
               <a:t>println</a:t>
             </a:r>
             <a:r>
-              <a:rPr kumimoji="0" lang="en-US" altLang="en-US" sz="1100" b="0" i="0" u="none" strike="noStrike" cap="none" normalizeH="0" baseline="0" dirty="0" smtClean="0">
+              <a:rPr kumimoji="0" lang="en-US" altLang="en-US" sz="1200" b="0" i="0" u="none" strike="noStrike" cap="none" normalizeH="0" baseline="0" dirty="0" smtClean="0">
                 <a:ln>
                   <a:noFill/>
                 </a:ln>
@@ -21518,13 +21518,13 @@
                   <a:srgbClr val="000000"/>
                 </a:solidFill>
                 <a:effectLst/>
-                <a:latin typeface="Courier New" panose="02070309020205020404" pitchFamily="49" charset="0"/>
-                <a:cs typeface="Courier New" panose="02070309020205020404" pitchFamily="49" charset="0"/>
+                <a:latin typeface="Consolas" panose="020B0609020204030204" pitchFamily="49" charset="0"/>
+                <a:cs typeface="Consolas" panose="020B0609020204030204" pitchFamily="49" charset="0"/>
               </a:rPr>
               <a:t>(</a:t>
             </a:r>
             <a:r>
-              <a:rPr kumimoji="0" lang="en-US" altLang="en-US" sz="1100" b="1" i="0" u="none" strike="noStrike" cap="none" normalizeH="0" baseline="0" dirty="0" smtClean="0">
+              <a:rPr kumimoji="0" lang="en-US" altLang="en-US" sz="1200" b="1" i="0" u="none" strike="noStrike" cap="none" normalizeH="0" baseline="0" dirty="0" smtClean="0">
                 <a:ln>
                   <a:noFill/>
                 </a:ln>
@@ -21532,13 +21532,13 @@
                   <a:srgbClr val="008000"/>
                 </a:solidFill>
                 <a:effectLst/>
-                <a:latin typeface="Courier New" panose="02070309020205020404" pitchFamily="49" charset="0"/>
-                <a:cs typeface="Courier New" panose="02070309020205020404" pitchFamily="49" charset="0"/>
+                <a:latin typeface="Consolas" panose="020B0609020204030204" pitchFamily="49" charset="0"/>
+                <a:cs typeface="Consolas" panose="020B0609020204030204" pitchFamily="49" charset="0"/>
               </a:rPr>
               <a:t>"Daddy took the T-Bird away."</a:t>
             </a:r>
             <a:r>
-              <a:rPr kumimoji="0" lang="en-US" altLang="en-US" sz="1100" b="0" i="0" u="none" strike="noStrike" cap="none" normalizeH="0" baseline="0" dirty="0" smtClean="0">
+              <a:rPr kumimoji="0" lang="en-US" altLang="en-US" sz="1200" b="0" i="0" u="none" strike="noStrike" cap="none" normalizeH="0" baseline="0" dirty="0" smtClean="0">
                 <a:ln>
                   <a:noFill/>
                 </a:ln>
@@ -21546,13 +21546,13 @@
                   <a:srgbClr val="000000"/>
                 </a:solidFill>
                 <a:effectLst/>
-                <a:latin typeface="Courier New" panose="02070309020205020404" pitchFamily="49" charset="0"/>
-                <a:cs typeface="Courier New" panose="02070309020205020404" pitchFamily="49" charset="0"/>
+                <a:latin typeface="Consolas" panose="020B0609020204030204" pitchFamily="49" charset="0"/>
+                <a:cs typeface="Consolas" panose="020B0609020204030204" pitchFamily="49" charset="0"/>
               </a:rPr>
               <a:t>)</a:t>
             </a:r>
             <a:br>
-              <a:rPr kumimoji="0" lang="en-US" altLang="en-US" sz="1100" b="0" i="0" u="none" strike="noStrike" cap="none" normalizeH="0" baseline="0" dirty="0" smtClean="0">
+              <a:rPr kumimoji="0" lang="en-US" altLang="en-US" sz="1200" b="0" i="0" u="none" strike="noStrike" cap="none" normalizeH="0" baseline="0" dirty="0" smtClean="0">
                 <a:ln>
                   <a:noFill/>
                 </a:ln>
@@ -21560,12 +21560,12 @@
                   <a:srgbClr val="000000"/>
                 </a:solidFill>
                 <a:effectLst/>
-                <a:latin typeface="Courier New" panose="02070309020205020404" pitchFamily="49" charset="0"/>
-                <a:cs typeface="Courier New" panose="02070309020205020404" pitchFamily="49" charset="0"/>
+                <a:latin typeface="Consolas" panose="020B0609020204030204" pitchFamily="49" charset="0"/>
+                <a:cs typeface="Consolas" panose="020B0609020204030204" pitchFamily="49" charset="0"/>
               </a:rPr>
             </a:br>
             <a:r>
-              <a:rPr kumimoji="0" lang="en-US" altLang="en-US" sz="1100" b="0" i="0" u="none" strike="noStrike" cap="none" normalizeH="0" baseline="0" dirty="0" smtClean="0">
+              <a:rPr kumimoji="0" lang="en-US" altLang="en-US" sz="1200" b="0" i="0" u="none" strike="noStrike" cap="none" normalizeH="0" baseline="0" dirty="0" smtClean="0">
                 <a:ln>
                   <a:noFill/>
                 </a:ln>
@@ -21573,13 +21573,13 @@
                   <a:srgbClr val="000000"/>
                 </a:solidFill>
                 <a:effectLst/>
-                <a:latin typeface="Courier New" panose="02070309020205020404" pitchFamily="49" charset="0"/>
-                <a:cs typeface="Courier New" panose="02070309020205020404" pitchFamily="49" charset="0"/>
+                <a:latin typeface="Consolas" panose="020B0609020204030204" pitchFamily="49" charset="0"/>
+                <a:cs typeface="Consolas" panose="020B0609020204030204" pitchFamily="49" charset="0"/>
               </a:rPr>
               <a:t>    </a:t>
             </a:r>
             <a:r>
-              <a:rPr kumimoji="0" lang="en-US" altLang="en-US" sz="1100" b="1" i="0" u="none" strike="noStrike" cap="none" normalizeH="0" baseline="0" dirty="0" smtClean="0">
+              <a:rPr kumimoji="0" lang="en-US" altLang="en-US" sz="1200" b="1" i="0" u="none" strike="noStrike" cap="none" normalizeH="0" baseline="0" dirty="0" smtClean="0">
                 <a:ln>
                   <a:noFill/>
                 </a:ln>
@@ -21587,13 +21587,13 @@
                   <a:srgbClr val="000080"/>
                 </a:solidFill>
                 <a:effectLst/>
-                <a:latin typeface="Courier New" panose="02070309020205020404" pitchFamily="49" charset="0"/>
-                <a:cs typeface="Courier New" panose="02070309020205020404" pitchFamily="49" charset="0"/>
+                <a:latin typeface="Consolas" panose="020B0609020204030204" pitchFamily="49" charset="0"/>
+                <a:cs typeface="Consolas" panose="020B0609020204030204" pitchFamily="49" charset="0"/>
               </a:rPr>
               <a:t>true</a:t>
             </a:r>
             <a:br>
-              <a:rPr kumimoji="0" lang="en-US" altLang="en-US" sz="1100" b="1" i="0" u="none" strike="noStrike" cap="none" normalizeH="0" baseline="0" dirty="0" smtClean="0">
+              <a:rPr kumimoji="0" lang="en-US" altLang="en-US" sz="1200" b="1" i="0" u="none" strike="noStrike" cap="none" normalizeH="0" baseline="0" dirty="0" smtClean="0">
                 <a:ln>
                   <a:noFill/>
                 </a:ln>
@@ -21601,12 +21601,12 @@
                   <a:srgbClr val="000080"/>
                 </a:solidFill>
                 <a:effectLst/>
-                <a:latin typeface="Courier New" panose="02070309020205020404" pitchFamily="49" charset="0"/>
-                <a:cs typeface="Courier New" panose="02070309020205020404" pitchFamily="49" charset="0"/>
+                <a:latin typeface="Consolas" panose="020B0609020204030204" pitchFamily="49" charset="0"/>
+                <a:cs typeface="Consolas" panose="020B0609020204030204" pitchFamily="49" charset="0"/>
               </a:rPr>
             </a:br>
             <a:r>
-              <a:rPr kumimoji="0" lang="en-US" altLang="en-US" sz="1100" b="1" i="0" u="none" strike="noStrike" cap="none" normalizeH="0" baseline="0" dirty="0" smtClean="0">
+              <a:rPr kumimoji="0" lang="en-US" altLang="en-US" sz="1200" b="1" i="0" u="none" strike="noStrike" cap="none" normalizeH="0" baseline="0" dirty="0" smtClean="0">
                 <a:ln>
                   <a:noFill/>
                 </a:ln>
@@ -21614,13 +21614,13 @@
                   <a:srgbClr val="000080"/>
                 </a:solidFill>
                 <a:effectLst/>
-                <a:latin typeface="Courier New" panose="02070309020205020404" pitchFamily="49" charset="0"/>
-                <a:cs typeface="Courier New" panose="02070309020205020404" pitchFamily="49" charset="0"/>
+                <a:latin typeface="Consolas" panose="020B0609020204030204" pitchFamily="49" charset="0"/>
+                <a:cs typeface="Consolas" panose="020B0609020204030204" pitchFamily="49" charset="0"/>
               </a:rPr>
               <a:t>  </a:t>
             </a:r>
             <a:r>
-              <a:rPr kumimoji="0" lang="en-US" altLang="en-US" sz="1100" b="0" i="0" u="none" strike="noStrike" cap="none" normalizeH="0" baseline="0" dirty="0" smtClean="0">
+              <a:rPr kumimoji="0" lang="en-US" altLang="en-US" sz="1200" b="0" i="0" u="none" strike="noStrike" cap="none" normalizeH="0" baseline="0" dirty="0" smtClean="0">
                 <a:ln>
                   <a:noFill/>
                 </a:ln>
@@ -21628,13 +21628,13 @@
                   <a:srgbClr val="000000"/>
                 </a:solidFill>
                 <a:effectLst/>
-                <a:latin typeface="Courier New" panose="02070309020205020404" pitchFamily="49" charset="0"/>
-                <a:cs typeface="Courier New" panose="02070309020205020404" pitchFamily="49" charset="0"/>
+                <a:latin typeface="Consolas" panose="020B0609020204030204" pitchFamily="49" charset="0"/>
+                <a:cs typeface="Consolas" panose="020B0609020204030204" pitchFamily="49" charset="0"/>
               </a:rPr>
               <a:t>}</a:t>
             </a:r>
             <a:br>
-              <a:rPr kumimoji="0" lang="en-US" altLang="en-US" sz="1100" b="0" i="0" u="none" strike="noStrike" cap="none" normalizeH="0" baseline="0" dirty="0" smtClean="0">
+              <a:rPr kumimoji="0" lang="en-US" altLang="en-US" sz="1200" b="0" i="0" u="none" strike="noStrike" cap="none" normalizeH="0" baseline="0" dirty="0" smtClean="0">
                 <a:ln>
                   <a:noFill/>
                 </a:ln>
@@ -21642,12 +21642,12 @@
                   <a:srgbClr val="000000"/>
                 </a:solidFill>
                 <a:effectLst/>
-                <a:latin typeface="Courier New" panose="02070309020205020404" pitchFamily="49" charset="0"/>
-                <a:cs typeface="Courier New" panose="02070309020205020404" pitchFamily="49" charset="0"/>
+                <a:latin typeface="Consolas" panose="020B0609020204030204" pitchFamily="49" charset="0"/>
+                <a:cs typeface="Consolas" panose="020B0609020204030204" pitchFamily="49" charset="0"/>
               </a:rPr>
             </a:br>
             <a:r>
-              <a:rPr kumimoji="0" lang="en-US" altLang="en-US" sz="1100" b="0" i="0" u="none" strike="noStrike" cap="none" normalizeH="0" baseline="0" dirty="0" smtClean="0">
+              <a:rPr kumimoji="0" lang="en-US" altLang="en-US" sz="1200" b="0" i="0" u="none" strike="noStrike" cap="none" normalizeH="0" baseline="0" dirty="0" smtClean="0">
                 <a:ln>
                   <a:noFill/>
                 </a:ln>
@@ -21655,13 +21655,13 @@
                   <a:srgbClr val="000000"/>
                 </a:solidFill>
                 <a:effectLst/>
-                <a:latin typeface="Courier New" panose="02070309020205020404" pitchFamily="49" charset="0"/>
-                <a:cs typeface="Courier New" panose="02070309020205020404" pitchFamily="49" charset="0"/>
+                <a:latin typeface="Consolas" panose="020B0609020204030204" pitchFamily="49" charset="0"/>
+                <a:cs typeface="Consolas" panose="020B0609020204030204" pitchFamily="49" charset="0"/>
               </a:rPr>
               <a:t>}</a:t>
             </a:r>
             <a:br>
-              <a:rPr kumimoji="0" lang="en-US" altLang="en-US" sz="1100" b="0" i="0" u="none" strike="noStrike" cap="none" normalizeH="0" baseline="0" dirty="0" smtClean="0">
+              <a:rPr kumimoji="0" lang="en-US" altLang="en-US" sz="1200" b="0" i="0" u="none" strike="noStrike" cap="none" normalizeH="0" baseline="0" dirty="0" smtClean="0">
                 <a:ln>
                   <a:noFill/>
                 </a:ln>
@@ -21669,12 +21669,12 @@
                   <a:srgbClr val="000000"/>
                 </a:solidFill>
                 <a:effectLst/>
-                <a:latin typeface="Courier New" panose="02070309020205020404" pitchFamily="49" charset="0"/>
-                <a:cs typeface="Courier New" panose="02070309020205020404" pitchFamily="49" charset="0"/>
+                <a:latin typeface="Consolas" panose="020B0609020204030204" pitchFamily="49" charset="0"/>
+                <a:cs typeface="Consolas" panose="020B0609020204030204" pitchFamily="49" charset="0"/>
               </a:rPr>
             </a:br>
             <a:r>
-              <a:rPr kumimoji="0" lang="en-US" altLang="en-US" sz="1100" b="0" i="0" u="none" strike="noStrike" cap="none" normalizeH="0" baseline="0" dirty="0" smtClean="0">
+              <a:rPr kumimoji="0" lang="en-US" altLang="en-US" sz="1200" b="0" i="0" u="none" strike="noStrike" cap="none" normalizeH="0" baseline="0" dirty="0" smtClean="0">
                 <a:ln>
                   <a:noFill/>
                 </a:ln>
@@ -21682,13 +21682,13 @@
                   <a:srgbClr val="000000"/>
                 </a:solidFill>
                 <a:effectLst/>
-                <a:latin typeface="Courier New" panose="02070309020205020404" pitchFamily="49" charset="0"/>
-                <a:cs typeface="Courier New" panose="02070309020205020404" pitchFamily="49" charset="0"/>
+                <a:latin typeface="Consolas" panose="020B0609020204030204" pitchFamily="49" charset="0"/>
+                <a:cs typeface="Consolas" panose="020B0609020204030204" pitchFamily="49" charset="0"/>
               </a:rPr>
               <a:t/>
             </a:r>
             <a:br>
-              <a:rPr kumimoji="0" lang="en-US" altLang="en-US" sz="1100" b="0" i="0" u="none" strike="noStrike" cap="none" normalizeH="0" baseline="0" dirty="0" smtClean="0">
+              <a:rPr kumimoji="0" lang="en-US" altLang="en-US" sz="1200" b="0" i="0" u="none" strike="noStrike" cap="none" normalizeH="0" baseline="0" dirty="0" smtClean="0">
                 <a:ln>
                   <a:noFill/>
                 </a:ln>
@@ -21696,12 +21696,12 @@
                   <a:srgbClr val="000000"/>
                 </a:solidFill>
                 <a:effectLst/>
-                <a:latin typeface="Courier New" panose="02070309020205020404" pitchFamily="49" charset="0"/>
-                <a:cs typeface="Courier New" panose="02070309020205020404" pitchFamily="49" charset="0"/>
+                <a:latin typeface="Consolas" panose="020B0609020204030204" pitchFamily="49" charset="0"/>
+                <a:cs typeface="Consolas" panose="020B0609020204030204" pitchFamily="49" charset="0"/>
               </a:rPr>
             </a:br>
             <a:r>
-              <a:rPr kumimoji="0" lang="en-US" altLang="en-US" sz="1100" b="1" i="0" u="none" strike="noStrike" cap="none" normalizeH="0" baseline="0" dirty="0" smtClean="0">
+              <a:rPr kumimoji="0" lang="en-US" altLang="en-US" sz="1200" b="1" i="0" u="none" strike="noStrike" cap="none" normalizeH="0" baseline="0" dirty="0" smtClean="0">
                 <a:ln>
                   <a:noFill/>
                 </a:ln>
@@ -21709,13 +21709,13 @@
                   <a:srgbClr val="000080"/>
                 </a:solidFill>
                 <a:effectLst/>
-                <a:latin typeface="Courier New" panose="02070309020205020404" pitchFamily="49" charset="0"/>
-                <a:cs typeface="Courier New" panose="02070309020205020404" pitchFamily="49" charset="0"/>
+                <a:latin typeface="Consolas" panose="020B0609020204030204" pitchFamily="49" charset="0"/>
+                <a:cs typeface="Consolas" panose="020B0609020204030204" pitchFamily="49" charset="0"/>
               </a:rPr>
               <a:t>object </a:t>
             </a:r>
             <a:r>
-              <a:rPr kumimoji="0" lang="en-US" altLang="en-US" sz="1100" b="0" i="0" u="none" strike="noStrike" cap="none" normalizeH="0" baseline="0" dirty="0" smtClean="0">
+              <a:rPr kumimoji="0" lang="en-US" altLang="en-US" sz="1200" b="0" i="0" u="none" strike="noStrike" cap="none" normalizeH="0" baseline="0" dirty="0" smtClean="0">
                 <a:ln>
                   <a:noFill/>
                 </a:ln>
@@ -21723,13 +21723,13 @@
                   <a:srgbClr val="000000"/>
                 </a:solidFill>
                 <a:effectLst/>
-                <a:latin typeface="Courier New" panose="02070309020205020404" pitchFamily="49" charset="0"/>
-                <a:cs typeface="Courier New" panose="02070309020205020404" pitchFamily="49" charset="0"/>
+                <a:latin typeface="Consolas" panose="020B0609020204030204" pitchFamily="49" charset="0"/>
+                <a:cs typeface="Consolas" panose="020B0609020204030204" pitchFamily="49" charset="0"/>
               </a:rPr>
               <a:t>Solution {</a:t>
             </a:r>
             <a:br>
-              <a:rPr kumimoji="0" lang="en-US" altLang="en-US" sz="1100" b="0" i="0" u="none" strike="noStrike" cap="none" normalizeH="0" baseline="0" dirty="0" smtClean="0">
+              <a:rPr kumimoji="0" lang="en-US" altLang="en-US" sz="1200" b="0" i="0" u="none" strike="noStrike" cap="none" normalizeH="0" baseline="0" dirty="0" smtClean="0">
                 <a:ln>
                   <a:noFill/>
                 </a:ln>
@@ -21737,12 +21737,12 @@
                   <a:srgbClr val="000000"/>
                 </a:solidFill>
                 <a:effectLst/>
-                <a:latin typeface="Courier New" panose="02070309020205020404" pitchFamily="49" charset="0"/>
-                <a:cs typeface="Courier New" panose="02070309020205020404" pitchFamily="49" charset="0"/>
+                <a:latin typeface="Consolas" panose="020B0609020204030204" pitchFamily="49" charset="0"/>
+                <a:cs typeface="Consolas" panose="020B0609020204030204" pitchFamily="49" charset="0"/>
               </a:rPr>
             </a:br>
             <a:r>
-              <a:rPr kumimoji="0" lang="en-US" altLang="en-US" sz="1100" b="0" i="0" u="none" strike="noStrike" cap="none" normalizeH="0" baseline="0" dirty="0" smtClean="0">
+              <a:rPr kumimoji="0" lang="en-US" altLang="en-US" sz="1200" b="0" i="0" u="none" strike="noStrike" cap="none" normalizeH="0" baseline="0" dirty="0" smtClean="0">
                 <a:ln>
                   <a:noFill/>
                 </a:ln>
@@ -21750,13 +21750,13 @@
                   <a:srgbClr val="000000"/>
                 </a:solidFill>
                 <a:effectLst/>
-                <a:latin typeface="Courier New" panose="02070309020205020404" pitchFamily="49" charset="0"/>
-                <a:cs typeface="Courier New" panose="02070309020205020404" pitchFamily="49" charset="0"/>
+                <a:latin typeface="Consolas" panose="020B0609020204030204" pitchFamily="49" charset="0"/>
+                <a:cs typeface="Consolas" panose="020B0609020204030204" pitchFamily="49" charset="0"/>
               </a:rPr>
               <a:t>  </a:t>
             </a:r>
             <a:r>
-              <a:rPr kumimoji="0" lang="en-US" altLang="en-US" sz="1100" b="1" i="0" u="none" strike="noStrike" cap="none" normalizeH="0" baseline="0" dirty="0" err="1" smtClean="0">
+              <a:rPr kumimoji="0" lang="en-US" altLang="en-US" sz="1200" b="1" i="0" u="none" strike="noStrike" cap="none" normalizeH="0" baseline="0" dirty="0" err="1" smtClean="0">
                 <a:ln>
                   <a:noFill/>
                 </a:ln>
@@ -21764,13 +21764,13 @@
                   <a:srgbClr val="000080"/>
                 </a:solidFill>
                 <a:effectLst/>
-                <a:latin typeface="Courier New" panose="02070309020205020404" pitchFamily="49" charset="0"/>
-                <a:cs typeface="Courier New" panose="02070309020205020404" pitchFamily="49" charset="0"/>
+                <a:latin typeface="Consolas" panose="020B0609020204030204" pitchFamily="49" charset="0"/>
+                <a:cs typeface="Consolas" panose="020B0609020204030204" pitchFamily="49" charset="0"/>
               </a:rPr>
               <a:t>def</a:t>
             </a:r>
             <a:r>
-              <a:rPr kumimoji="0" lang="en-US" altLang="en-US" sz="1100" b="1" i="0" u="none" strike="noStrike" cap="none" normalizeH="0" baseline="0" dirty="0" smtClean="0">
+              <a:rPr kumimoji="0" lang="en-US" altLang="en-US" sz="1200" b="1" i="0" u="none" strike="noStrike" cap="none" normalizeH="0" baseline="0" dirty="0" smtClean="0">
                 <a:ln>
                   <a:noFill/>
                 </a:ln>
@@ -21778,13 +21778,13 @@
                   <a:srgbClr val="000080"/>
                 </a:solidFill>
                 <a:effectLst/>
-                <a:latin typeface="Courier New" panose="02070309020205020404" pitchFamily="49" charset="0"/>
-                <a:cs typeface="Courier New" panose="02070309020205020404" pitchFamily="49" charset="0"/>
+                <a:latin typeface="Consolas" panose="020B0609020204030204" pitchFamily="49" charset="0"/>
+                <a:cs typeface="Consolas" panose="020B0609020204030204" pitchFamily="49" charset="0"/>
               </a:rPr>
               <a:t> </a:t>
             </a:r>
             <a:r>
-              <a:rPr kumimoji="0" lang="en-US" altLang="en-US" sz="1100" b="0" i="0" u="none" strike="noStrike" cap="none" normalizeH="0" baseline="0" dirty="0" smtClean="0">
+              <a:rPr kumimoji="0" lang="en-US" altLang="en-US" sz="1200" b="0" i="0" u="none" strike="noStrike" cap="none" normalizeH="0" baseline="0" dirty="0" smtClean="0">
                 <a:ln>
                   <a:noFill/>
                 </a:ln>
@@ -21792,13 +21792,13 @@
                   <a:srgbClr val="000000"/>
                 </a:solidFill>
                 <a:effectLst/>
-                <a:latin typeface="Courier New" panose="02070309020205020404" pitchFamily="49" charset="0"/>
-                <a:cs typeface="Courier New" panose="02070309020205020404" pitchFamily="49" charset="0"/>
+                <a:latin typeface="Consolas" panose="020B0609020204030204" pitchFamily="49" charset="0"/>
+                <a:cs typeface="Consolas" panose="020B0609020204030204" pitchFamily="49" charset="0"/>
               </a:rPr>
               <a:t>main(</a:t>
             </a:r>
             <a:r>
-              <a:rPr kumimoji="0" lang="en-US" altLang="en-US" sz="1100" b="0" i="0" u="none" strike="noStrike" cap="none" normalizeH="0" baseline="0" dirty="0" err="1" smtClean="0">
+              <a:rPr kumimoji="0" lang="en-US" altLang="en-US" sz="1200" b="0" i="0" u="none" strike="noStrike" cap="none" normalizeH="0" baseline="0" dirty="0" err="1" smtClean="0">
                 <a:ln>
                   <a:noFill/>
                 </a:ln>
@@ -21806,13 +21806,13 @@
                   <a:srgbClr val="000000"/>
                 </a:solidFill>
                 <a:effectLst/>
-                <a:latin typeface="Courier New" panose="02070309020205020404" pitchFamily="49" charset="0"/>
-                <a:cs typeface="Courier New" panose="02070309020205020404" pitchFamily="49" charset="0"/>
+                <a:latin typeface="Consolas" panose="020B0609020204030204" pitchFamily="49" charset="0"/>
+                <a:cs typeface="Consolas" panose="020B0609020204030204" pitchFamily="49" charset="0"/>
               </a:rPr>
               <a:t>args</a:t>
             </a:r>
             <a:r>
-              <a:rPr kumimoji="0" lang="en-US" altLang="en-US" sz="1100" b="0" i="0" u="none" strike="noStrike" cap="none" normalizeH="0" baseline="0" dirty="0" smtClean="0">
+              <a:rPr kumimoji="0" lang="en-US" altLang="en-US" sz="1200" b="0" i="0" u="none" strike="noStrike" cap="none" normalizeH="0" baseline="0" dirty="0" smtClean="0">
                 <a:ln>
                   <a:noFill/>
                 </a:ln>
@@ -21820,13 +21820,13 @@
                   <a:srgbClr val="000000"/>
                 </a:solidFill>
                 <a:effectLst/>
-                <a:latin typeface="Courier New" panose="02070309020205020404" pitchFamily="49" charset="0"/>
-                <a:cs typeface="Courier New" panose="02070309020205020404" pitchFamily="49" charset="0"/>
+                <a:latin typeface="Consolas" panose="020B0609020204030204" pitchFamily="49" charset="0"/>
+                <a:cs typeface="Consolas" panose="020B0609020204030204" pitchFamily="49" charset="0"/>
               </a:rPr>
               <a:t>: Array[</a:t>
             </a:r>
             <a:r>
-              <a:rPr kumimoji="0" lang="en-US" altLang="en-US" sz="1100" b="0" i="0" u="none" strike="noStrike" cap="none" normalizeH="0" baseline="0" dirty="0" smtClean="0">
+              <a:rPr kumimoji="0" lang="en-US" altLang="en-US" sz="1200" b="0" i="0" u="none" strike="noStrike" cap="none" normalizeH="0" baseline="0" dirty="0" smtClean="0">
                 <a:ln>
                   <a:noFill/>
                 </a:ln>
@@ -21834,13 +21834,13 @@
                   <a:srgbClr val="20999D"/>
                 </a:solidFill>
                 <a:effectLst/>
-                <a:latin typeface="Courier New" panose="02070309020205020404" pitchFamily="49" charset="0"/>
-                <a:cs typeface="Courier New" panose="02070309020205020404" pitchFamily="49" charset="0"/>
+                <a:latin typeface="Consolas" panose="020B0609020204030204" pitchFamily="49" charset="0"/>
+                <a:cs typeface="Consolas" panose="020B0609020204030204" pitchFamily="49" charset="0"/>
               </a:rPr>
               <a:t>String</a:t>
             </a:r>
             <a:r>
-              <a:rPr kumimoji="0" lang="en-US" altLang="en-US" sz="1100" b="0" i="0" u="none" strike="noStrike" cap="none" normalizeH="0" baseline="0" dirty="0" smtClean="0">
+              <a:rPr kumimoji="0" lang="en-US" altLang="en-US" sz="1200" b="0" i="0" u="none" strike="noStrike" cap="none" normalizeH="0" baseline="0" dirty="0" smtClean="0">
                 <a:ln>
                   <a:noFill/>
                 </a:ln>
@@ -21848,13 +21848,13 @@
                   <a:srgbClr val="000000"/>
                 </a:solidFill>
                 <a:effectLst/>
-                <a:latin typeface="Courier New" panose="02070309020205020404" pitchFamily="49" charset="0"/>
-                <a:cs typeface="Courier New" panose="02070309020205020404" pitchFamily="49" charset="0"/>
+                <a:latin typeface="Consolas" panose="020B0609020204030204" pitchFamily="49" charset="0"/>
+                <a:cs typeface="Consolas" panose="020B0609020204030204" pitchFamily="49" charset="0"/>
               </a:rPr>
               <a:t>]) {</a:t>
             </a:r>
             <a:br>
-              <a:rPr kumimoji="0" lang="en-US" altLang="en-US" sz="1100" b="0" i="0" u="none" strike="noStrike" cap="none" normalizeH="0" baseline="0" dirty="0" smtClean="0">
+              <a:rPr kumimoji="0" lang="en-US" altLang="en-US" sz="1200" b="0" i="0" u="none" strike="noStrike" cap="none" normalizeH="0" baseline="0" dirty="0" smtClean="0">
                 <a:ln>
                   <a:noFill/>
                 </a:ln>
@@ -21862,12 +21862,12 @@
                   <a:srgbClr val="000000"/>
                 </a:solidFill>
                 <a:effectLst/>
-                <a:latin typeface="Courier New" panose="02070309020205020404" pitchFamily="49" charset="0"/>
-                <a:cs typeface="Courier New" panose="02070309020205020404" pitchFamily="49" charset="0"/>
+                <a:latin typeface="Consolas" panose="020B0609020204030204" pitchFamily="49" charset="0"/>
+                <a:cs typeface="Consolas" panose="020B0609020204030204" pitchFamily="49" charset="0"/>
               </a:rPr>
             </a:br>
             <a:r>
-              <a:rPr kumimoji="0" lang="en-US" altLang="en-US" sz="1100" b="0" i="0" u="none" strike="noStrike" cap="none" normalizeH="0" baseline="0" dirty="0" smtClean="0">
+              <a:rPr kumimoji="0" lang="en-US" altLang="en-US" sz="1200" b="0" i="0" u="none" strike="noStrike" cap="none" normalizeH="0" baseline="0" dirty="0" smtClean="0">
                 <a:ln>
                   <a:noFill/>
                 </a:ln>
@@ -21875,13 +21875,13 @@
                   <a:srgbClr val="000000"/>
                 </a:solidFill>
                 <a:effectLst/>
-                <a:latin typeface="Courier New" panose="02070309020205020404" pitchFamily="49" charset="0"/>
-                <a:cs typeface="Courier New" panose="02070309020205020404" pitchFamily="49" charset="0"/>
+                <a:latin typeface="Consolas" panose="020B0609020204030204" pitchFamily="49" charset="0"/>
+                <a:cs typeface="Consolas" panose="020B0609020204030204" pitchFamily="49" charset="0"/>
               </a:rPr>
               <a:t>    </a:t>
             </a:r>
             <a:r>
-              <a:rPr kumimoji="0" lang="en-US" altLang="en-US" sz="1100" b="1" i="0" u="none" strike="noStrike" cap="none" normalizeH="0" baseline="0" dirty="0" err="1" smtClean="0">
+              <a:rPr kumimoji="0" lang="en-US" altLang="en-US" sz="1200" b="1" i="0" u="none" strike="noStrike" cap="none" normalizeH="0" baseline="0" dirty="0" err="1" smtClean="0">
                 <a:ln>
                   <a:noFill/>
                 </a:ln>
@@ -21889,13 +21889,13 @@
                   <a:srgbClr val="000080"/>
                 </a:solidFill>
                 <a:effectLst/>
-                <a:latin typeface="Courier New" panose="02070309020205020404" pitchFamily="49" charset="0"/>
-                <a:cs typeface="Courier New" panose="02070309020205020404" pitchFamily="49" charset="0"/>
+                <a:latin typeface="Consolas" panose="020B0609020204030204" pitchFamily="49" charset="0"/>
+                <a:cs typeface="Consolas" panose="020B0609020204030204" pitchFamily="49" charset="0"/>
               </a:rPr>
               <a:t>val</a:t>
             </a:r>
             <a:r>
-              <a:rPr kumimoji="0" lang="en-US" altLang="en-US" sz="1100" b="1" i="0" u="none" strike="noStrike" cap="none" normalizeH="0" baseline="0" dirty="0" smtClean="0">
+              <a:rPr kumimoji="0" lang="en-US" altLang="en-US" sz="1200" b="1" i="0" u="none" strike="noStrike" cap="none" normalizeH="0" baseline="0" dirty="0" smtClean="0">
                 <a:ln>
                   <a:noFill/>
                 </a:ln>
@@ -21903,13 +21903,13 @@
                   <a:srgbClr val="000080"/>
                 </a:solidFill>
                 <a:effectLst/>
-                <a:latin typeface="Courier New" panose="02070309020205020404" pitchFamily="49" charset="0"/>
-                <a:cs typeface="Courier New" panose="02070309020205020404" pitchFamily="49" charset="0"/>
+                <a:latin typeface="Consolas" panose="020B0609020204030204" pitchFamily="49" charset="0"/>
+                <a:cs typeface="Consolas" panose="020B0609020204030204" pitchFamily="49" charset="0"/>
               </a:rPr>
               <a:t> </a:t>
             </a:r>
             <a:r>
-              <a:rPr kumimoji="0" lang="en-US" altLang="en-US" sz="1100" b="0" i="0" u="none" strike="noStrike" cap="none" normalizeH="0" baseline="0" dirty="0" err="1" smtClean="0">
+              <a:rPr kumimoji="0" lang="en-US" altLang="en-US" sz="1200" b="0" i="0" u="none" strike="noStrike" cap="none" normalizeH="0" baseline="0" dirty="0" err="1" smtClean="0">
                 <a:ln>
                   <a:noFill/>
                 </a:ln>
@@ -21917,13 +21917,13 @@
                   <a:srgbClr val="000000"/>
                 </a:solidFill>
                 <a:effectLst/>
-                <a:latin typeface="Courier New" panose="02070309020205020404" pitchFamily="49" charset="0"/>
-                <a:cs typeface="Courier New" panose="02070309020205020404" pitchFamily="49" charset="0"/>
+                <a:latin typeface="Consolas" panose="020B0609020204030204" pitchFamily="49" charset="0"/>
+                <a:cs typeface="Consolas" panose="020B0609020204030204" pitchFamily="49" charset="0"/>
               </a:rPr>
               <a:t>funFunFun</a:t>
             </a:r>
             <a:r>
-              <a:rPr kumimoji="0" lang="en-US" altLang="en-US" sz="1100" b="0" i="0" u="none" strike="noStrike" cap="none" normalizeH="0" baseline="0" dirty="0" smtClean="0">
+              <a:rPr kumimoji="0" lang="en-US" altLang="en-US" sz="1200" b="0" i="0" u="none" strike="noStrike" cap="none" normalizeH="0" baseline="0" dirty="0" smtClean="0">
                 <a:ln>
                   <a:noFill/>
                 </a:ln>
@@ -21931,13 +21931,13 @@
                   <a:srgbClr val="000000"/>
                 </a:solidFill>
                 <a:effectLst/>
-                <a:latin typeface="Courier New" panose="02070309020205020404" pitchFamily="49" charset="0"/>
-                <a:cs typeface="Courier New" panose="02070309020205020404" pitchFamily="49" charset="0"/>
+                <a:latin typeface="Consolas" panose="020B0609020204030204" pitchFamily="49" charset="0"/>
+                <a:cs typeface="Consolas" panose="020B0609020204030204" pitchFamily="49" charset="0"/>
               </a:rPr>
               <a:t> = {</a:t>
             </a:r>
             <a:r>
-              <a:rPr kumimoji="0" lang="en-US" altLang="en-US" sz="1100" b="0" i="1" u="none" strike="noStrike" cap="none" normalizeH="0" baseline="0" dirty="0" err="1" smtClean="0">
+              <a:rPr kumimoji="0" lang="en-US" altLang="en-US" sz="1200" b="0" i="1" u="none" strike="noStrike" cap="none" normalizeH="0" baseline="0" dirty="0" err="1" smtClean="0">
                 <a:ln>
                   <a:noFill/>
                 </a:ln>
@@ -21945,13 +21945,13 @@
                   <a:srgbClr val="000000"/>
                 </a:solidFill>
                 <a:effectLst/>
-                <a:latin typeface="Courier New" panose="02070309020205020404" pitchFamily="49" charset="0"/>
-                <a:cs typeface="Courier New" panose="02070309020205020404" pitchFamily="49" charset="0"/>
+                <a:latin typeface="Consolas" panose="020B0609020204030204" pitchFamily="49" charset="0"/>
+                <a:cs typeface="Consolas" panose="020B0609020204030204" pitchFamily="49" charset="0"/>
               </a:rPr>
               <a:t>println</a:t>
             </a:r>
             <a:r>
-              <a:rPr kumimoji="0" lang="en-US" altLang="en-US" sz="1100" b="0" i="0" u="none" strike="noStrike" cap="none" normalizeH="0" baseline="0" dirty="0" smtClean="0">
+              <a:rPr kumimoji="0" lang="en-US" altLang="en-US" sz="1200" b="0" i="0" u="none" strike="noStrike" cap="none" normalizeH="0" baseline="0" dirty="0" smtClean="0">
                 <a:ln>
                   <a:noFill/>
                 </a:ln>
@@ -21959,13 +21959,13 @@
                   <a:srgbClr val="000000"/>
                 </a:solidFill>
                 <a:effectLst/>
-                <a:latin typeface="Courier New" panose="02070309020205020404" pitchFamily="49" charset="0"/>
-                <a:cs typeface="Courier New" panose="02070309020205020404" pitchFamily="49" charset="0"/>
+                <a:latin typeface="Consolas" panose="020B0609020204030204" pitchFamily="49" charset="0"/>
+                <a:cs typeface="Consolas" panose="020B0609020204030204" pitchFamily="49" charset="0"/>
               </a:rPr>
               <a:t>(</a:t>
             </a:r>
             <a:r>
-              <a:rPr kumimoji="0" lang="en-US" altLang="en-US" sz="1100" b="1" i="0" u="none" strike="noStrike" cap="none" normalizeH="0" baseline="0" dirty="0" smtClean="0">
+              <a:rPr kumimoji="0" lang="en-US" altLang="en-US" sz="1200" b="1" i="0" u="none" strike="noStrike" cap="none" normalizeH="0" baseline="0" dirty="0" smtClean="0">
                 <a:ln>
                   <a:noFill/>
                 </a:ln>
@@ -21973,13 +21973,13 @@
                   <a:srgbClr val="008000"/>
                 </a:solidFill>
                 <a:effectLst/>
-                <a:latin typeface="Courier New" panose="02070309020205020404" pitchFamily="49" charset="0"/>
-                <a:cs typeface="Courier New" panose="02070309020205020404" pitchFamily="49" charset="0"/>
+                <a:latin typeface="Consolas" panose="020B0609020204030204" pitchFamily="49" charset="0"/>
+                <a:cs typeface="Consolas" panose="020B0609020204030204" pitchFamily="49" charset="0"/>
               </a:rPr>
               <a:t>"Fun! Fun! Fun!"</a:t>
             </a:r>
             <a:r>
-              <a:rPr kumimoji="0" lang="en-US" altLang="en-US" sz="1100" b="0" i="0" u="none" strike="noStrike" cap="none" normalizeH="0" baseline="0" dirty="0" smtClean="0">
+              <a:rPr kumimoji="0" lang="en-US" altLang="en-US" sz="1200" b="0" i="0" u="none" strike="noStrike" cap="none" normalizeH="0" baseline="0" dirty="0" smtClean="0">
                 <a:ln>
                   <a:noFill/>
                 </a:ln>
@@ -21987,13 +21987,13 @@
                   <a:srgbClr val="000000"/>
                 </a:solidFill>
                 <a:effectLst/>
-                <a:latin typeface="Courier New" panose="02070309020205020404" pitchFamily="49" charset="0"/>
-                <a:cs typeface="Courier New" panose="02070309020205020404" pitchFamily="49" charset="0"/>
+                <a:latin typeface="Consolas" panose="020B0609020204030204" pitchFamily="49" charset="0"/>
+                <a:cs typeface="Consolas" panose="020B0609020204030204" pitchFamily="49" charset="0"/>
               </a:rPr>
               <a:t>)}</a:t>
             </a:r>
             <a:br>
-              <a:rPr kumimoji="0" lang="en-US" altLang="en-US" sz="1100" b="0" i="0" u="none" strike="noStrike" cap="none" normalizeH="0" baseline="0" dirty="0" smtClean="0">
+              <a:rPr kumimoji="0" lang="en-US" altLang="en-US" sz="1200" b="0" i="0" u="none" strike="noStrike" cap="none" normalizeH="0" baseline="0" dirty="0" smtClean="0">
                 <a:ln>
                   <a:noFill/>
                 </a:ln>
@@ -22001,12 +22001,12 @@
                   <a:srgbClr val="000000"/>
                 </a:solidFill>
                 <a:effectLst/>
-                <a:latin typeface="Courier New" panose="02070309020205020404" pitchFamily="49" charset="0"/>
-                <a:cs typeface="Courier New" panose="02070309020205020404" pitchFamily="49" charset="0"/>
+                <a:latin typeface="Consolas" panose="020B0609020204030204" pitchFamily="49" charset="0"/>
+                <a:cs typeface="Consolas" panose="020B0609020204030204" pitchFamily="49" charset="0"/>
               </a:rPr>
             </a:br>
             <a:r>
-              <a:rPr kumimoji="0" lang="en-US" altLang="en-US" sz="1100" b="0" i="0" u="none" strike="noStrike" cap="none" normalizeH="0" baseline="0" dirty="0" smtClean="0">
+              <a:rPr kumimoji="0" lang="en-US" altLang="en-US" sz="1200" b="0" i="0" u="none" strike="noStrike" cap="none" normalizeH="0" baseline="0" dirty="0" smtClean="0">
                 <a:ln>
                   <a:noFill/>
                 </a:ln>
@@ -22014,13 +22014,13 @@
                   <a:srgbClr val="000000"/>
                 </a:solidFill>
                 <a:effectLst/>
-                <a:latin typeface="Courier New" panose="02070309020205020404" pitchFamily="49" charset="0"/>
-                <a:cs typeface="Courier New" panose="02070309020205020404" pitchFamily="49" charset="0"/>
+                <a:latin typeface="Consolas" panose="020B0609020204030204" pitchFamily="49" charset="0"/>
+                <a:cs typeface="Consolas" panose="020B0609020204030204" pitchFamily="49" charset="0"/>
               </a:rPr>
               <a:t/>
             </a:r>
             <a:br>
-              <a:rPr kumimoji="0" lang="en-US" altLang="en-US" sz="1100" b="0" i="0" u="none" strike="noStrike" cap="none" normalizeH="0" baseline="0" dirty="0" smtClean="0">
+              <a:rPr kumimoji="0" lang="en-US" altLang="en-US" sz="1200" b="0" i="0" u="none" strike="noStrike" cap="none" normalizeH="0" baseline="0" dirty="0" smtClean="0">
                 <a:ln>
                   <a:noFill/>
                 </a:ln>
@@ -22028,12 +22028,12 @@
                   <a:srgbClr val="000000"/>
                 </a:solidFill>
                 <a:effectLst/>
-                <a:latin typeface="Courier New" panose="02070309020205020404" pitchFamily="49" charset="0"/>
-                <a:cs typeface="Courier New" panose="02070309020205020404" pitchFamily="49" charset="0"/>
+                <a:latin typeface="Consolas" panose="020B0609020204030204" pitchFamily="49" charset="0"/>
+                <a:cs typeface="Consolas" panose="020B0609020204030204" pitchFamily="49" charset="0"/>
               </a:rPr>
             </a:br>
             <a:r>
-              <a:rPr kumimoji="0" lang="en-US" altLang="en-US" sz="1100" b="0" i="0" u="none" strike="noStrike" cap="none" normalizeH="0" baseline="0" dirty="0" smtClean="0">
+              <a:rPr kumimoji="0" lang="en-US" altLang="en-US" sz="1200" b="0" i="0" u="none" strike="noStrike" cap="none" normalizeH="0" baseline="0" dirty="0" smtClean="0">
                 <a:ln>
                   <a:noFill/>
                 </a:ln>
@@ -22041,13 +22041,13 @@
                   <a:srgbClr val="000000"/>
                 </a:solidFill>
                 <a:effectLst/>
-                <a:latin typeface="Courier New" panose="02070309020205020404" pitchFamily="49" charset="0"/>
-                <a:cs typeface="Courier New" panose="02070309020205020404" pitchFamily="49" charset="0"/>
+                <a:latin typeface="Consolas" panose="020B0609020204030204" pitchFamily="49" charset="0"/>
+                <a:cs typeface="Consolas" panose="020B0609020204030204" pitchFamily="49" charset="0"/>
               </a:rPr>
               <a:t>    </a:t>
             </a:r>
             <a:r>
-              <a:rPr kumimoji="0" lang="en-US" altLang="en-US" sz="1100" b="0" i="1" u="none" strike="noStrike" cap="none" normalizeH="0" baseline="0" dirty="0" smtClean="0">
+              <a:rPr kumimoji="0" lang="en-US" altLang="en-US" sz="1200" b="0" i="1" u="none" strike="noStrike" cap="none" normalizeH="0" baseline="0" dirty="0" smtClean="0">
                 <a:ln>
                   <a:noFill/>
                 </a:ln>
@@ -22055,13 +22055,13 @@
                   <a:srgbClr val="000000"/>
                 </a:solidFill>
                 <a:effectLst/>
-                <a:latin typeface="Courier New" panose="02070309020205020404" pitchFamily="49" charset="0"/>
-                <a:cs typeface="Courier New" panose="02070309020205020404" pitchFamily="49" charset="0"/>
+                <a:latin typeface="Consolas" panose="020B0609020204030204" pitchFamily="49" charset="0"/>
+                <a:cs typeface="Consolas" panose="020B0609020204030204" pitchFamily="49" charset="0"/>
               </a:rPr>
               <a:t>She</a:t>
             </a:r>
             <a:r>
-              <a:rPr kumimoji="0" lang="en-US" altLang="en-US" sz="1100" b="0" i="0" u="none" strike="noStrike" cap="none" normalizeH="0" baseline="0" dirty="0" smtClean="0">
+              <a:rPr kumimoji="0" lang="en-US" altLang="en-US" sz="1200" b="0" i="0" u="none" strike="noStrike" cap="none" normalizeH="0" baseline="0" dirty="0" smtClean="0">
                 <a:ln>
                   <a:noFill/>
                 </a:ln>
@@ -22069,13 +22069,13 @@
                   <a:srgbClr val="000000"/>
                 </a:solidFill>
                 <a:effectLst/>
-                <a:latin typeface="Courier New" panose="02070309020205020404" pitchFamily="49" charset="0"/>
-                <a:cs typeface="Courier New" panose="02070309020205020404" pitchFamily="49" charset="0"/>
+                <a:latin typeface="Consolas" panose="020B0609020204030204" pitchFamily="49" charset="0"/>
+                <a:cs typeface="Consolas" panose="020B0609020204030204" pitchFamily="49" charset="0"/>
               </a:rPr>
               <a:t>() have(</a:t>
             </a:r>
             <a:r>
-              <a:rPr kumimoji="0" lang="en-US" altLang="en-US" sz="1100" b="0" i="0" u="none" strike="noStrike" cap="none" normalizeH="0" baseline="0" dirty="0" err="1" smtClean="0">
+              <a:rPr kumimoji="0" lang="en-US" altLang="en-US" sz="1200" b="0" i="0" u="none" strike="noStrike" cap="none" normalizeH="0" baseline="0" dirty="0" err="1" smtClean="0">
                 <a:ln>
                   <a:noFill/>
                 </a:ln>
@@ -22083,13 +22083,13 @@
                   <a:srgbClr val="000000"/>
                 </a:solidFill>
                 <a:effectLst/>
-                <a:latin typeface="Courier New" panose="02070309020205020404" pitchFamily="49" charset="0"/>
-                <a:cs typeface="Courier New" panose="02070309020205020404" pitchFamily="49" charset="0"/>
+                <a:latin typeface="Consolas" panose="020B0609020204030204" pitchFamily="49" charset="0"/>
+                <a:cs typeface="Consolas" panose="020B0609020204030204" pitchFamily="49" charset="0"/>
               </a:rPr>
               <a:t>funFunFun</a:t>
             </a:r>
             <a:r>
-              <a:rPr kumimoji="0" lang="en-US" altLang="en-US" sz="1100" b="0" i="0" u="none" strike="noStrike" cap="none" normalizeH="0" baseline="0" dirty="0" smtClean="0">
+              <a:rPr kumimoji="0" lang="en-US" altLang="en-US" sz="1200" b="0" i="0" u="none" strike="noStrike" cap="none" normalizeH="0" baseline="0" dirty="0" smtClean="0">
                 <a:ln>
                   <a:noFill/>
                 </a:ln>
@@ -22097,13 +22097,13 @@
                   <a:srgbClr val="000000"/>
                 </a:solidFill>
                 <a:effectLst/>
-                <a:latin typeface="Courier New" panose="02070309020205020404" pitchFamily="49" charset="0"/>
-                <a:cs typeface="Courier New" panose="02070309020205020404" pitchFamily="49" charset="0"/>
+                <a:latin typeface="Consolas" panose="020B0609020204030204" pitchFamily="49" charset="0"/>
+                <a:cs typeface="Consolas" panose="020B0609020204030204" pitchFamily="49" charset="0"/>
               </a:rPr>
               <a:t>) </a:t>
             </a:r>
             <a:r>
-              <a:rPr kumimoji="0" lang="en-US" altLang="en-US" sz="1100" b="0" i="0" u="none" strike="noStrike" cap="none" normalizeH="0" baseline="0" dirty="0" err="1" smtClean="0">
+              <a:rPr kumimoji="0" lang="en-US" altLang="en-US" sz="1200" b="0" i="0" u="none" strike="noStrike" cap="none" normalizeH="0" baseline="0" dirty="0" err="1" smtClean="0">
                 <a:ln>
                   <a:noFill/>
                 </a:ln>
@@ -22111,13 +22111,13 @@
                   <a:srgbClr val="000000"/>
                 </a:solidFill>
                 <a:effectLst/>
-                <a:latin typeface="Courier New" panose="02070309020205020404" pitchFamily="49" charset="0"/>
-                <a:cs typeface="Courier New" panose="02070309020205020404" pitchFamily="49" charset="0"/>
+                <a:latin typeface="Consolas" panose="020B0609020204030204" pitchFamily="49" charset="0"/>
+                <a:cs typeface="Consolas" panose="020B0609020204030204" pitchFamily="49" charset="0"/>
               </a:rPr>
               <a:t>til</a:t>
             </a:r>
             <a:r>
-              <a:rPr kumimoji="0" lang="en-US" altLang="en-US" sz="1100" b="0" i="0" u="none" strike="noStrike" cap="none" normalizeH="0" baseline="0" dirty="0" smtClean="0">
+              <a:rPr kumimoji="0" lang="en-US" altLang="en-US" sz="1200" b="0" i="0" u="none" strike="noStrike" cap="none" normalizeH="0" baseline="0" dirty="0" smtClean="0">
                 <a:ln>
                   <a:noFill/>
                 </a:ln>
@@ -22125,13 +22125,13 @@
                   <a:srgbClr val="000000"/>
                 </a:solidFill>
                 <a:effectLst/>
-                <a:latin typeface="Courier New" panose="02070309020205020404" pitchFamily="49" charset="0"/>
-                <a:cs typeface="Courier New" panose="02070309020205020404" pitchFamily="49" charset="0"/>
+                <a:latin typeface="Consolas" panose="020B0609020204030204" pitchFamily="49" charset="0"/>
+                <a:cs typeface="Consolas" panose="020B0609020204030204" pitchFamily="49" charset="0"/>
               </a:rPr>
               <a:t>(</a:t>
             </a:r>
             <a:r>
-              <a:rPr kumimoji="0" lang="en-US" altLang="en-US" sz="1100" b="0" i="1" u="none" strike="noStrike" cap="none" normalizeH="0" baseline="0" dirty="0" smtClean="0">
+              <a:rPr kumimoji="0" lang="en-US" altLang="en-US" sz="1200" b="0" i="1" u="none" strike="noStrike" cap="none" normalizeH="0" baseline="0" dirty="0" smtClean="0">
                 <a:ln>
                   <a:noFill/>
                 </a:ln>
@@ -22139,13 +22139,13 @@
                   <a:srgbClr val="000000"/>
                 </a:solidFill>
                 <a:effectLst/>
-                <a:latin typeface="Courier New" panose="02070309020205020404" pitchFamily="49" charset="0"/>
-                <a:cs typeface="Courier New" panose="02070309020205020404" pitchFamily="49" charset="0"/>
+                <a:latin typeface="Consolas" panose="020B0609020204030204" pitchFamily="49" charset="0"/>
+                <a:cs typeface="Consolas" panose="020B0609020204030204" pitchFamily="49" charset="0"/>
               </a:rPr>
               <a:t>Daddy</a:t>
             </a:r>
             <a:r>
-              <a:rPr kumimoji="0" lang="en-US" altLang="en-US" sz="1100" b="0" i="0" u="none" strike="noStrike" cap="none" normalizeH="0" baseline="0" dirty="0" smtClean="0">
+              <a:rPr kumimoji="0" lang="en-US" altLang="en-US" sz="1200" b="0" i="0" u="none" strike="noStrike" cap="none" normalizeH="0" baseline="0" dirty="0" smtClean="0">
                 <a:ln>
                   <a:noFill/>
                 </a:ln>
@@ -22153,13 +22153,13 @@
                   <a:srgbClr val="000000"/>
                 </a:solidFill>
                 <a:effectLst/>
-                <a:latin typeface="Courier New" panose="02070309020205020404" pitchFamily="49" charset="0"/>
-                <a:cs typeface="Courier New" panose="02070309020205020404" pitchFamily="49" charset="0"/>
+                <a:latin typeface="Consolas" panose="020B0609020204030204" pitchFamily="49" charset="0"/>
+                <a:cs typeface="Consolas" panose="020B0609020204030204" pitchFamily="49" charset="0"/>
               </a:rPr>
               <a:t>() </a:t>
             </a:r>
             <a:r>
-              <a:rPr kumimoji="0" lang="en-US" altLang="en-US" sz="1100" b="0" i="0" u="none" strike="noStrike" cap="none" normalizeH="0" baseline="0" dirty="0" err="1" smtClean="0">
+              <a:rPr kumimoji="0" lang="en-US" altLang="en-US" sz="1200" b="0" i="0" u="none" strike="noStrike" cap="none" normalizeH="0" baseline="0" dirty="0" err="1" smtClean="0">
                 <a:ln>
                   <a:noFill/>
                 </a:ln>
@@ -22167,13 +22167,13 @@
                   <a:srgbClr val="000000"/>
                 </a:solidFill>
                 <a:effectLst/>
-                <a:latin typeface="Courier New" panose="02070309020205020404" pitchFamily="49" charset="0"/>
-                <a:cs typeface="Courier New" panose="02070309020205020404" pitchFamily="49" charset="0"/>
+                <a:latin typeface="Consolas" panose="020B0609020204030204" pitchFamily="49" charset="0"/>
+                <a:cs typeface="Consolas" panose="020B0609020204030204" pitchFamily="49" charset="0"/>
               </a:rPr>
               <a:t>takeAway</a:t>
             </a:r>
             <a:r>
-              <a:rPr kumimoji="0" lang="en-US" altLang="en-US" sz="1100" b="0" i="0" u="none" strike="noStrike" cap="none" normalizeH="0" baseline="0" dirty="0" smtClean="0">
+              <a:rPr kumimoji="0" lang="en-US" altLang="en-US" sz="1200" b="0" i="0" u="none" strike="noStrike" cap="none" normalizeH="0" baseline="0" dirty="0" smtClean="0">
                 <a:ln>
                   <a:noFill/>
                 </a:ln>
@@ -22181,13 +22181,13 @@
                   <a:srgbClr val="000000"/>
                 </a:solidFill>
                 <a:effectLst/>
-                <a:latin typeface="Courier New" panose="02070309020205020404" pitchFamily="49" charset="0"/>
-                <a:cs typeface="Courier New" panose="02070309020205020404" pitchFamily="49" charset="0"/>
+                <a:latin typeface="Consolas" panose="020B0609020204030204" pitchFamily="49" charset="0"/>
+                <a:cs typeface="Consolas" panose="020B0609020204030204" pitchFamily="49" charset="0"/>
               </a:rPr>
               <a:t>(</a:t>
             </a:r>
             <a:r>
-              <a:rPr kumimoji="0" lang="en-US" altLang="en-US" sz="1100" b="0" i="1" u="none" strike="noStrike" cap="none" normalizeH="0" baseline="0" dirty="0" err="1" smtClean="0">
+              <a:rPr kumimoji="0" lang="en-US" altLang="en-US" sz="1200" b="0" i="1" u="none" strike="noStrike" cap="none" normalizeH="0" baseline="0" dirty="0" err="1" smtClean="0">
                 <a:ln>
                   <a:noFill/>
                 </a:ln>
@@ -22195,13 +22195,13 @@
                   <a:srgbClr val="000000"/>
                 </a:solidFill>
                 <a:effectLst/>
-                <a:latin typeface="Courier New" panose="02070309020205020404" pitchFamily="49" charset="0"/>
-                <a:cs typeface="Courier New" panose="02070309020205020404" pitchFamily="49" charset="0"/>
+                <a:latin typeface="Consolas" panose="020B0609020204030204" pitchFamily="49" charset="0"/>
+                <a:cs typeface="Consolas" panose="020B0609020204030204" pitchFamily="49" charset="0"/>
               </a:rPr>
               <a:t>TBird</a:t>
             </a:r>
             <a:r>
-              <a:rPr kumimoji="0" lang="en-US" altLang="en-US" sz="1100" b="0" i="0" u="none" strike="noStrike" cap="none" normalizeH="0" baseline="0" dirty="0" smtClean="0">
+              <a:rPr kumimoji="0" lang="en-US" altLang="en-US" sz="1200" b="0" i="0" u="none" strike="noStrike" cap="none" normalizeH="0" baseline="0" dirty="0" smtClean="0">
                 <a:ln>
                   <a:noFill/>
                 </a:ln>
@@ -22209,13 +22209,13 @@
                   <a:srgbClr val="000000"/>
                 </a:solidFill>
                 <a:effectLst/>
-                <a:latin typeface="Courier New" panose="02070309020205020404" pitchFamily="49" charset="0"/>
-                <a:cs typeface="Courier New" panose="02070309020205020404" pitchFamily="49" charset="0"/>
+                <a:latin typeface="Consolas" panose="020B0609020204030204" pitchFamily="49" charset="0"/>
+                <a:cs typeface="Consolas" panose="020B0609020204030204" pitchFamily="49" charset="0"/>
               </a:rPr>
               <a:t>()))</a:t>
             </a:r>
             <a:br>
-              <a:rPr kumimoji="0" lang="en-US" altLang="en-US" sz="1100" b="0" i="0" u="none" strike="noStrike" cap="none" normalizeH="0" baseline="0" dirty="0" smtClean="0">
+              <a:rPr kumimoji="0" lang="en-US" altLang="en-US" sz="1200" b="0" i="0" u="none" strike="noStrike" cap="none" normalizeH="0" baseline="0" dirty="0" smtClean="0">
                 <a:ln>
                   <a:noFill/>
                 </a:ln>
@@ -22223,12 +22223,12 @@
                   <a:srgbClr val="000000"/>
                 </a:solidFill>
                 <a:effectLst/>
-                <a:latin typeface="Courier New" panose="02070309020205020404" pitchFamily="49" charset="0"/>
-                <a:cs typeface="Courier New" panose="02070309020205020404" pitchFamily="49" charset="0"/>
+                <a:latin typeface="Consolas" panose="020B0609020204030204" pitchFamily="49" charset="0"/>
+                <a:cs typeface="Consolas" panose="020B0609020204030204" pitchFamily="49" charset="0"/>
               </a:rPr>
             </a:br>
             <a:r>
-              <a:rPr kumimoji="0" lang="en-US" altLang="en-US" sz="1100" b="0" i="0" u="none" strike="noStrike" cap="none" normalizeH="0" baseline="0" dirty="0" smtClean="0">
+              <a:rPr kumimoji="0" lang="en-US" altLang="en-US" sz="1200" b="0" i="0" u="none" strike="noStrike" cap="none" normalizeH="0" baseline="0" dirty="0" smtClean="0">
                 <a:ln>
                   <a:noFill/>
                 </a:ln>
@@ -22236,13 +22236,13 @@
                   <a:srgbClr val="000000"/>
                 </a:solidFill>
                 <a:effectLst/>
-                <a:latin typeface="Courier New" panose="02070309020205020404" pitchFamily="49" charset="0"/>
-                <a:cs typeface="Courier New" panose="02070309020205020404" pitchFamily="49" charset="0"/>
+                <a:latin typeface="Consolas" panose="020B0609020204030204" pitchFamily="49" charset="0"/>
+                <a:cs typeface="Consolas" panose="020B0609020204030204" pitchFamily="49" charset="0"/>
               </a:rPr>
               <a:t>  }</a:t>
             </a:r>
             <a:br>
-              <a:rPr kumimoji="0" lang="en-US" altLang="en-US" sz="1100" b="0" i="0" u="none" strike="noStrike" cap="none" normalizeH="0" baseline="0" dirty="0" smtClean="0">
+              <a:rPr kumimoji="0" lang="en-US" altLang="en-US" sz="1200" b="0" i="0" u="none" strike="noStrike" cap="none" normalizeH="0" baseline="0" dirty="0" smtClean="0">
                 <a:ln>
                   <a:noFill/>
                 </a:ln>
@@ -22250,12 +22250,12 @@
                   <a:srgbClr val="000000"/>
                 </a:solidFill>
                 <a:effectLst/>
-                <a:latin typeface="Courier New" panose="02070309020205020404" pitchFamily="49" charset="0"/>
-                <a:cs typeface="Courier New" panose="02070309020205020404" pitchFamily="49" charset="0"/>
+                <a:latin typeface="Consolas" panose="020B0609020204030204" pitchFamily="49" charset="0"/>
+                <a:cs typeface="Consolas" panose="020B0609020204030204" pitchFamily="49" charset="0"/>
               </a:rPr>
             </a:br>
             <a:r>
-              <a:rPr kumimoji="0" lang="en-US" altLang="en-US" sz="1100" b="0" i="0" u="none" strike="noStrike" cap="none" normalizeH="0" baseline="0" dirty="0" smtClean="0">
+              <a:rPr kumimoji="0" lang="en-US" altLang="en-US" sz="1200" b="0" i="0" u="none" strike="noStrike" cap="none" normalizeH="0" baseline="0" dirty="0" smtClean="0">
                 <a:ln>
                   <a:noFill/>
                 </a:ln>
@@ -22263,12 +22263,12 @@
                   <a:srgbClr val="000000"/>
                 </a:solidFill>
                 <a:effectLst/>
-                <a:latin typeface="Courier New" panose="02070309020205020404" pitchFamily="49" charset="0"/>
-                <a:cs typeface="Courier New" panose="02070309020205020404" pitchFamily="49" charset="0"/>
+                <a:latin typeface="Consolas" panose="020B0609020204030204" pitchFamily="49" charset="0"/>
+                <a:cs typeface="Consolas" panose="020B0609020204030204" pitchFamily="49" charset="0"/>
               </a:rPr>
               <a:t>}</a:t>
             </a:r>
-            <a:endParaRPr kumimoji="0" lang="en-US" altLang="en-US" sz="2800" b="0" i="0" u="none" strike="noStrike" cap="none" normalizeH="0" baseline="0" dirty="0" smtClean="0">
+            <a:endParaRPr kumimoji="0" lang="en-US" altLang="en-US" sz="3200" b="0" i="0" u="none" strike="noStrike" cap="none" normalizeH="0" baseline="0" dirty="0" smtClean="0">
               <a:ln>
                 <a:noFill/>
               </a:ln>
@@ -22276,7 +22276,8 @@
                 <a:schemeClr val="tx1"/>
               </a:solidFill>
               <a:effectLst/>
-              <a:latin typeface="Arial" panose="020B0604020202020204" pitchFamily="34" charset="0"/>
+              <a:latin typeface="Consolas" panose="020B0609020204030204" pitchFamily="49" charset="0"/>
+              <a:cs typeface="Consolas" panose="020B0609020204030204" pitchFamily="49" charset="0"/>
             </a:endParaRPr>
           </a:p>
         </p:txBody>
@@ -22663,7 +22664,7 @@
   <a:extraClrSchemeLst/>
   <a:extLst>
     <a:ext uri="{05A4C25C-085E-4340-85A3-A5531E510DB2}">
-      <thm15:themeFamily xmlns:thm15="http://schemas.microsoft.com/office/thememl/2012/main" xmlns="" name="2013 Improving ppt template [Read-Only]" id="{9CD52372-1ABB-429C-AE8B-5116A847D281}" vid="{C9E045ED-5E7D-45F0-ABC2-8913C89F506A}"/>
+      <thm15:themeFamily xmlns="" xmlns:thm15="http://schemas.microsoft.com/office/thememl/2012/main" name="2013 Improving ppt template [Read-Only]" id="{9CD52372-1ABB-429C-AE8B-5116A847D281}" vid="{C9E045ED-5E7D-45F0-ABC2-8913C89F506A}"/>
     </a:ext>
   </a:extLst>
 </a:theme>
@@ -22924,19 +22925,16 @@
   <a:extraClrSchemeLst/>
   <a:extLst>
     <a:ext uri="{05A4C25C-085E-4340-85A3-A5531E510DB2}">
-      <thm15:themeFamily xmlns:thm15="http://schemas.microsoft.com/office/thememl/2012/main" xmlns="" name="Office Theme" id="{62F939B6-93AF-4DB8-9C6B-D6C7DFDC589F}" vid="{4A3C46E8-61CC-4603-A589-7422A47A8E4A}"/>
+      <thm15:themeFamily xmlns="" xmlns:thm15="http://schemas.microsoft.com/office/thememl/2012/main" name="Office Theme" id="{62F939B6-93AF-4DB8-9C6B-D6C7DFDC589F}" vid="{4A3C46E8-61CC-4603-A589-7422A47A8E4A}"/>
     </a:ext>
   </a:extLst>
 </a:theme>
 </file>
 
 <file path=customXml/item1.xml><?xml version="1.0" encoding="utf-8"?>
-<?mso-contentType ?>
-<FormTemplates xmlns="http://schemas.microsoft.com/sharepoint/v3/contenttype/forms">
-  <Display>DocumentLibraryForm</Display>
-  <Edit>DocumentLibraryForm</Edit>
-  <New>DocumentLibraryForm</New>
-</FormTemplates>
+<p:properties xmlns:p="http://schemas.microsoft.com/office/2006/metadata/properties" xmlns:xsi="http://www.w3.org/2001/XMLSchema-instance" xmlns:pc="http://schemas.microsoft.com/office/infopath/2007/PartnerControls">
+  <documentManagement/>
+</p:properties>
 </file>
 
 <file path=customXml/item2.xml><?xml version="1.0" encoding="utf-8"?>
@@ -23054,15 +23052,25 @@
 </file>
 
 <file path=customXml/item3.xml><?xml version="1.0" encoding="utf-8"?>
-<p:properties xmlns:p="http://schemas.microsoft.com/office/2006/metadata/properties" xmlns:xsi="http://www.w3.org/2001/XMLSchema-instance" xmlns:pc="http://schemas.microsoft.com/office/infopath/2007/PartnerControls">
-  <documentManagement/>
-</p:properties>
+<?mso-contentType ?>
+<FormTemplates xmlns="http://schemas.microsoft.com/sharepoint/v3/contenttype/forms">
+  <Display>DocumentLibraryForm</Display>
+  <Edit>DocumentLibraryForm</Edit>
+  <New>DocumentLibraryForm</New>
+</FormTemplates>
 </file>
 
 <file path=customXml/itemProps1.xml><?xml version="1.0" encoding="utf-8"?>
-<ds:datastoreItem xmlns:ds="http://schemas.openxmlformats.org/officeDocument/2006/customXml" ds:itemID="{B857AB07-B2ED-439E-860F-4F56FB345D1B}">
+<ds:datastoreItem xmlns:ds="http://schemas.openxmlformats.org/officeDocument/2006/customXml" ds:itemID="{A04551C0-1604-41A0-9B5C-A5F88AD2E0FE}">
   <ds:schemaRefs>
-    <ds:schemaRef ds:uri="http://schemas.microsoft.com/sharepoint/v3/contenttype/forms"/>
+    <ds:schemaRef ds:uri="http://schemas.microsoft.com/office/infopath/2007/PartnerControls"/>
+    <ds:schemaRef ds:uri="http://purl.org/dc/elements/1.1/"/>
+    <ds:schemaRef ds:uri="http://schemas.microsoft.com/office/2006/metadata/properties"/>
+    <ds:schemaRef ds:uri="http://purl.org/dc/terms/"/>
+    <ds:schemaRef ds:uri="http://schemas.openxmlformats.org/package/2006/metadata/core-properties"/>
+    <ds:schemaRef ds:uri="http://schemas.microsoft.com/office/2006/documentManagement/types"/>
+    <ds:schemaRef ds:uri="http://www.w3.org/XML/1998/namespace"/>
+    <ds:schemaRef ds:uri="http://purl.org/dc/dcmitype/"/>
   </ds:schemaRefs>
 </ds:datastoreItem>
 </file>
@@ -23084,16 +23092,9 @@
 </file>
 
 <file path=customXml/itemProps3.xml><?xml version="1.0" encoding="utf-8"?>
-<ds:datastoreItem xmlns:ds="http://schemas.openxmlformats.org/officeDocument/2006/customXml" ds:itemID="{A04551C0-1604-41A0-9B5C-A5F88AD2E0FE}">
+<ds:datastoreItem xmlns:ds="http://schemas.openxmlformats.org/officeDocument/2006/customXml" ds:itemID="{B857AB07-B2ED-439E-860F-4F56FB345D1B}">
   <ds:schemaRefs>
-    <ds:schemaRef ds:uri="http://schemas.microsoft.com/office/infopath/2007/PartnerControls"/>
-    <ds:schemaRef ds:uri="http://purl.org/dc/elements/1.1/"/>
-    <ds:schemaRef ds:uri="http://schemas.microsoft.com/office/2006/metadata/properties"/>
-    <ds:schemaRef ds:uri="http://purl.org/dc/terms/"/>
-    <ds:schemaRef ds:uri="http://schemas.openxmlformats.org/package/2006/metadata/core-properties"/>
-    <ds:schemaRef ds:uri="http://schemas.microsoft.com/office/2006/documentManagement/types"/>
-    <ds:schemaRef ds:uri="http://www.w3.org/XML/1998/namespace"/>
-    <ds:schemaRef ds:uri="http://purl.org/dc/dcmitype/"/>
+    <ds:schemaRef ds:uri="http://schemas.microsoft.com/sharepoint/v3/contenttype/forms"/>
   </ds:schemaRefs>
 </ds:datastoreItem>
 </file>
</xml_diff>